<commit_message>
Read through once. Slides look like they are in reasonable shape.
</commit_message>
<xml_diff>
--- a/marple_itx18.pptx
+++ b/marple_itx18.pptx
@@ -12722,7 +12722,7 @@
           <a:effectLst/>
           <a:extLst>
             <a:ext uri="{909E8E84-426E-40dd-AFC4-6F175D3DCCD1}">
-              <a14:hiddenFill xmlns="" xmlns:a14="http://schemas.microsoft.com/office/drawing/2010/main">
+              <a14:hiddenFill xmlns:a14="http://schemas.microsoft.com/office/drawing/2010/main" xmlns="">
                 <a:blipFill dpi="0" rotWithShape="0">
                   <a:blip/>
                   <a:srcRect/>
@@ -12733,7 +12733,7 @@
               </a14:hiddenFill>
             </a:ext>
             <a:ext uri="{91240B29-F687-4f45-9708-019B960494DF}">
-              <a14:hiddenLine xmlns="" xmlns:a14="http://schemas.microsoft.com/office/drawing/2010/main" w="9525">
+              <a14:hiddenLine xmlns:a14="http://schemas.microsoft.com/office/drawing/2010/main" xmlns="" w="9525">
                 <a:solidFill>
                   <a:srgbClr val="000000"/>
                 </a:solidFill>
@@ -12743,7 +12743,7 @@
               </a14:hiddenLine>
             </a:ext>
             <a:ext uri="{AF507438-7753-43e0-B8FC-AC1667EBCBE1}">
-              <a14:hiddenEffects xmlns="" xmlns:a14="http://schemas.microsoft.com/office/drawing/2010/main">
+              <a14:hiddenEffects xmlns:a14="http://schemas.microsoft.com/office/drawing/2010/main" xmlns="">
                 <a:effectLst>
                   <a:outerShdw blurRad="63500" dist="38099" dir="2700000" algn="ctr" rotWithShape="0">
                     <a:srgbClr val="000000">
@@ -12792,7 +12792,7 @@
           <a:effectLst/>
           <a:extLst>
             <a:ext uri="{909E8E84-426E-40dd-AFC4-6F175D3DCCD1}">
-              <a14:hiddenFill xmlns="" xmlns:a14="http://schemas.microsoft.com/office/drawing/2010/main">
+              <a14:hiddenFill xmlns:a14="http://schemas.microsoft.com/office/drawing/2010/main" xmlns="">
                 <a:blipFill dpi="0" rotWithShape="0">
                   <a:blip/>
                   <a:srcRect/>
@@ -12803,7 +12803,7 @@
               </a14:hiddenFill>
             </a:ext>
             <a:ext uri="{91240B29-F687-4f45-9708-019B960494DF}">
-              <a14:hiddenLine xmlns="" xmlns:a14="http://schemas.microsoft.com/office/drawing/2010/main" w="9525">
+              <a14:hiddenLine xmlns:a14="http://schemas.microsoft.com/office/drawing/2010/main" xmlns="" w="9525">
                 <a:solidFill>
                   <a:srgbClr val="000000"/>
                 </a:solidFill>
@@ -12813,7 +12813,7 @@
               </a14:hiddenLine>
             </a:ext>
             <a:ext uri="{AF507438-7753-43e0-B8FC-AC1667EBCBE1}">
-              <a14:hiddenEffects xmlns="" xmlns:a14="http://schemas.microsoft.com/office/drawing/2010/main">
+              <a14:hiddenEffects xmlns:a14="http://schemas.microsoft.com/office/drawing/2010/main" xmlns="">
                 <a:effectLst>
                   <a:outerShdw blurRad="63500" dist="38099" dir="2700000" algn="ctr" rotWithShape="0">
                     <a:srgbClr val="000000">
@@ -12948,7 +12948,7 @@
             <a:effectLst/>
             <a:extLst>
               <a:ext uri="{909E8E84-426E-40dd-AFC4-6F175D3DCCD1}">
-                <a14:hiddenFill xmlns:a14="http://schemas.microsoft.com/office/drawing/2010/main" xmlns="">
+                <a14:hiddenFill xmlns="" xmlns:a14="http://schemas.microsoft.com/office/drawing/2010/main">
                   <a:blipFill dpi="0" rotWithShape="0">
                     <a:blip/>
                     <a:srcRect/>
@@ -12959,7 +12959,7 @@
                 </a14:hiddenFill>
               </a:ext>
               <a:ext uri="{91240B29-F687-4f45-9708-019B960494DF}">
-                <a14:hiddenLine xmlns:a14="http://schemas.microsoft.com/office/drawing/2010/main" xmlns="" w="9525">
+                <a14:hiddenLine xmlns="" xmlns:a14="http://schemas.microsoft.com/office/drawing/2010/main" w="9525">
                   <a:solidFill>
                     <a:srgbClr val="000000"/>
                   </a:solidFill>
@@ -12969,7 +12969,7 @@
                 </a14:hiddenLine>
               </a:ext>
               <a:ext uri="{AF507438-7753-43e0-B8FC-AC1667EBCBE1}">
-                <a14:hiddenEffects xmlns:a14="http://schemas.microsoft.com/office/drawing/2010/main" xmlns="">
+                <a14:hiddenEffects xmlns="" xmlns:a14="http://schemas.microsoft.com/office/drawing/2010/main">
                   <a:effectLst>
                     <a:outerShdw blurRad="63500" dist="38099" dir="2700000" algn="ctr" rotWithShape="0">
                       <a:srgbClr val="000000">
@@ -13018,7 +13018,7 @@
             <a:effectLst/>
             <a:extLst>
               <a:ext uri="{909E8E84-426E-40dd-AFC4-6F175D3DCCD1}">
-                <a14:hiddenFill xmlns:a14="http://schemas.microsoft.com/office/drawing/2010/main" xmlns="">
+                <a14:hiddenFill xmlns="" xmlns:a14="http://schemas.microsoft.com/office/drawing/2010/main">
                   <a:blipFill dpi="0" rotWithShape="0">
                     <a:blip/>
                     <a:srcRect/>
@@ -13029,7 +13029,7 @@
                 </a14:hiddenFill>
               </a:ext>
               <a:ext uri="{91240B29-F687-4f45-9708-019B960494DF}">
-                <a14:hiddenLine xmlns:a14="http://schemas.microsoft.com/office/drawing/2010/main" xmlns="" w="9525">
+                <a14:hiddenLine xmlns="" xmlns:a14="http://schemas.microsoft.com/office/drawing/2010/main" w="9525">
                   <a:solidFill>
                     <a:srgbClr val="000000"/>
                   </a:solidFill>
@@ -13039,7 +13039,7 @@
                 </a14:hiddenLine>
               </a:ext>
               <a:ext uri="{AF507438-7753-43e0-B8FC-AC1667EBCBE1}">
-                <a14:hiddenEffects xmlns:a14="http://schemas.microsoft.com/office/drawing/2010/main" xmlns="">
+                <a14:hiddenEffects xmlns="" xmlns:a14="http://schemas.microsoft.com/office/drawing/2010/main">
                   <a:effectLst>
                     <a:outerShdw blurRad="63500" dist="38099" dir="2700000" algn="ctr" rotWithShape="0">
                       <a:srgbClr val="000000">
@@ -13088,7 +13088,7 @@
             <a:effectLst/>
             <a:extLst>
               <a:ext uri="{909E8E84-426E-40dd-AFC4-6F175D3DCCD1}">
-                <a14:hiddenFill xmlns:a14="http://schemas.microsoft.com/office/drawing/2010/main" xmlns="">
+                <a14:hiddenFill xmlns="" xmlns:a14="http://schemas.microsoft.com/office/drawing/2010/main">
                   <a:blipFill dpi="0" rotWithShape="0">
                     <a:blip/>
                     <a:srcRect/>
@@ -13099,7 +13099,7 @@
                 </a14:hiddenFill>
               </a:ext>
               <a:ext uri="{91240B29-F687-4f45-9708-019B960494DF}">
-                <a14:hiddenLine xmlns:a14="http://schemas.microsoft.com/office/drawing/2010/main" xmlns="" w="9525">
+                <a14:hiddenLine xmlns="" xmlns:a14="http://schemas.microsoft.com/office/drawing/2010/main" w="9525">
                   <a:solidFill>
                     <a:srgbClr val="000000"/>
                   </a:solidFill>
@@ -13109,7 +13109,7 @@
                 </a14:hiddenLine>
               </a:ext>
               <a:ext uri="{AF507438-7753-43e0-B8FC-AC1667EBCBE1}">
-                <a14:hiddenEffects xmlns:a14="http://schemas.microsoft.com/office/drawing/2010/main" xmlns="">
+                <a14:hiddenEffects xmlns="" xmlns:a14="http://schemas.microsoft.com/office/drawing/2010/main">
                   <a:effectLst>
                     <a:outerShdw blurRad="63500" dist="38099" dir="2700000" algn="ctr" rotWithShape="0">
                       <a:srgbClr val="000000">
@@ -13150,12 +13150,12 @@
             <a:effectLst/>
             <a:extLst>
               <a:ext uri="{909E8E84-426E-40dd-AFC4-6F175D3DCCD1}">
-                <a14:hiddenFill xmlns:a14="http://schemas.microsoft.com/office/drawing/2010/main" xmlns="">
+                <a14:hiddenFill xmlns="" xmlns:a14="http://schemas.microsoft.com/office/drawing/2010/main">
                   <a:noFill/>
                 </a14:hiddenFill>
               </a:ext>
               <a:ext uri="{AF507438-7753-43e0-B8FC-AC1667EBCBE1}">
-                <a14:hiddenEffects xmlns:a14="http://schemas.microsoft.com/office/drawing/2010/main" xmlns="">
+                <a14:hiddenEffects xmlns="" xmlns:a14="http://schemas.microsoft.com/office/drawing/2010/main">
                   <a:effectLst>
                     <a:outerShdw blurRad="63500" dist="38099" dir="2700000" algn="ctr" rotWithShape="0">
                       <a:srgbClr val="000000">
@@ -13208,12 +13208,12 @@
             <a:effectLst/>
             <a:extLst>
               <a:ext uri="{909E8E84-426E-40dd-AFC4-6F175D3DCCD1}">
-                <a14:hiddenFill xmlns:a14="http://schemas.microsoft.com/office/drawing/2010/main" xmlns="">
+                <a14:hiddenFill xmlns="" xmlns:a14="http://schemas.microsoft.com/office/drawing/2010/main">
                   <a:noFill/>
                 </a14:hiddenFill>
               </a:ext>
               <a:ext uri="{AF507438-7753-43e0-B8FC-AC1667EBCBE1}">
-                <a14:hiddenEffects xmlns:a14="http://schemas.microsoft.com/office/drawing/2010/main" xmlns="">
+                <a14:hiddenEffects xmlns="" xmlns:a14="http://schemas.microsoft.com/office/drawing/2010/main">
                   <a:effectLst>
                     <a:outerShdw blurRad="63500" dist="38099" dir="2700000" algn="ctr" rotWithShape="0">
                       <a:srgbClr val="000000">
@@ -13266,12 +13266,12 @@
             <a:effectLst/>
             <a:extLst>
               <a:ext uri="{909E8E84-426E-40dd-AFC4-6F175D3DCCD1}">
-                <a14:hiddenFill xmlns:a14="http://schemas.microsoft.com/office/drawing/2010/main" xmlns="">
+                <a14:hiddenFill xmlns="" xmlns:a14="http://schemas.microsoft.com/office/drawing/2010/main">
                   <a:noFill/>
                 </a14:hiddenFill>
               </a:ext>
               <a:ext uri="{AF507438-7753-43e0-B8FC-AC1667EBCBE1}">
-                <a14:hiddenEffects xmlns:a14="http://schemas.microsoft.com/office/drawing/2010/main" xmlns="">
+                <a14:hiddenEffects xmlns="" xmlns:a14="http://schemas.microsoft.com/office/drawing/2010/main">
                   <a:effectLst>
                     <a:outerShdw blurRad="63500" dist="38099" dir="2700000" algn="ctr" rotWithShape="0">
                       <a:srgbClr val="000000">
@@ -13324,12 +13324,12 @@
             <a:effectLst/>
             <a:extLst>
               <a:ext uri="{909E8E84-426E-40dd-AFC4-6F175D3DCCD1}">
-                <a14:hiddenFill xmlns:a14="http://schemas.microsoft.com/office/drawing/2010/main" xmlns="">
+                <a14:hiddenFill xmlns="" xmlns:a14="http://schemas.microsoft.com/office/drawing/2010/main">
                   <a:noFill/>
                 </a14:hiddenFill>
               </a:ext>
               <a:ext uri="{AF507438-7753-43e0-B8FC-AC1667EBCBE1}">
-                <a14:hiddenEffects xmlns:a14="http://schemas.microsoft.com/office/drawing/2010/main" xmlns="">
+                <a14:hiddenEffects xmlns="" xmlns:a14="http://schemas.microsoft.com/office/drawing/2010/main">
                   <a:effectLst>
                     <a:outerShdw blurRad="63500" dist="38099" dir="2700000" algn="ctr" rotWithShape="0">
                       <a:srgbClr val="000000">
@@ -13382,12 +13382,12 @@
             <a:effectLst/>
             <a:extLst>
               <a:ext uri="{909E8E84-426E-40dd-AFC4-6F175D3DCCD1}">
-                <a14:hiddenFill xmlns:a14="http://schemas.microsoft.com/office/drawing/2010/main" xmlns="">
+                <a14:hiddenFill xmlns="" xmlns:a14="http://schemas.microsoft.com/office/drawing/2010/main">
                   <a:noFill/>
                 </a14:hiddenFill>
               </a:ext>
               <a:ext uri="{AF507438-7753-43e0-B8FC-AC1667EBCBE1}">
-                <a14:hiddenEffects xmlns:a14="http://schemas.microsoft.com/office/drawing/2010/main" xmlns="">
+                <a14:hiddenEffects xmlns="" xmlns:a14="http://schemas.microsoft.com/office/drawing/2010/main">
                   <a:effectLst>
                     <a:outerShdw blurRad="63500" dist="38099" dir="2700000" algn="ctr" rotWithShape="0">
                       <a:srgbClr val="000000">
@@ -13440,12 +13440,12 @@
             <a:effectLst/>
             <a:extLst>
               <a:ext uri="{909E8E84-426E-40dd-AFC4-6F175D3DCCD1}">
-                <a14:hiddenFill xmlns:a14="http://schemas.microsoft.com/office/drawing/2010/main" xmlns="">
+                <a14:hiddenFill xmlns="" xmlns:a14="http://schemas.microsoft.com/office/drawing/2010/main">
                   <a:noFill/>
                 </a14:hiddenFill>
               </a:ext>
               <a:ext uri="{AF507438-7753-43e0-B8FC-AC1667EBCBE1}">
-                <a14:hiddenEffects xmlns:a14="http://schemas.microsoft.com/office/drawing/2010/main" xmlns="">
+                <a14:hiddenEffects xmlns="" xmlns:a14="http://schemas.microsoft.com/office/drawing/2010/main">
                   <a:effectLst>
                     <a:outerShdw blurRad="63500" dist="38099" dir="2700000" algn="ctr" rotWithShape="0">
                       <a:srgbClr val="000000">
@@ -13498,12 +13498,12 @@
             <a:effectLst/>
             <a:extLst>
               <a:ext uri="{909E8E84-426E-40dd-AFC4-6F175D3DCCD1}">
-                <a14:hiddenFill xmlns:a14="http://schemas.microsoft.com/office/drawing/2010/main" xmlns="">
+                <a14:hiddenFill xmlns="" xmlns:a14="http://schemas.microsoft.com/office/drawing/2010/main">
                   <a:noFill/>
                 </a14:hiddenFill>
               </a:ext>
               <a:ext uri="{AF507438-7753-43e0-B8FC-AC1667EBCBE1}">
-                <a14:hiddenEffects xmlns:a14="http://schemas.microsoft.com/office/drawing/2010/main" xmlns="">
+                <a14:hiddenEffects xmlns="" xmlns:a14="http://schemas.microsoft.com/office/drawing/2010/main">
                   <a:effectLst>
                     <a:outerShdw blurRad="63500" dist="38099" dir="2700000" algn="ctr" rotWithShape="0">
                       <a:srgbClr val="000000">
@@ -13556,12 +13556,12 @@
             <a:effectLst/>
             <a:extLst>
               <a:ext uri="{909E8E84-426E-40dd-AFC4-6F175D3DCCD1}">
-                <a14:hiddenFill xmlns:a14="http://schemas.microsoft.com/office/drawing/2010/main" xmlns="">
+                <a14:hiddenFill xmlns="" xmlns:a14="http://schemas.microsoft.com/office/drawing/2010/main">
                   <a:noFill/>
                 </a14:hiddenFill>
               </a:ext>
               <a:ext uri="{AF507438-7753-43e0-B8FC-AC1667EBCBE1}">
-                <a14:hiddenEffects xmlns:a14="http://schemas.microsoft.com/office/drawing/2010/main" xmlns="">
+                <a14:hiddenEffects xmlns="" xmlns:a14="http://schemas.microsoft.com/office/drawing/2010/main">
                   <a:effectLst>
                     <a:outerShdw blurRad="63500" dist="38099" dir="2700000" algn="ctr" rotWithShape="0">
                       <a:srgbClr val="000000">
@@ -13614,12 +13614,12 @@
             <a:effectLst/>
             <a:extLst>
               <a:ext uri="{909E8E84-426E-40dd-AFC4-6F175D3DCCD1}">
-                <a14:hiddenFill xmlns:a14="http://schemas.microsoft.com/office/drawing/2010/main" xmlns="">
+                <a14:hiddenFill xmlns="" xmlns:a14="http://schemas.microsoft.com/office/drawing/2010/main">
                   <a:noFill/>
                 </a14:hiddenFill>
               </a:ext>
               <a:ext uri="{AF507438-7753-43e0-B8FC-AC1667EBCBE1}">
-                <a14:hiddenEffects xmlns:a14="http://schemas.microsoft.com/office/drawing/2010/main" xmlns="">
+                <a14:hiddenEffects xmlns="" xmlns:a14="http://schemas.microsoft.com/office/drawing/2010/main">
                   <a:effectLst>
                     <a:outerShdw blurRad="63500" dist="38099" dir="2700000" algn="ctr" rotWithShape="0">
                       <a:srgbClr val="000000">
@@ -13672,12 +13672,12 @@
             <a:effectLst/>
             <a:extLst>
               <a:ext uri="{909E8E84-426E-40dd-AFC4-6F175D3DCCD1}">
-                <a14:hiddenFill xmlns:a14="http://schemas.microsoft.com/office/drawing/2010/main" xmlns="">
+                <a14:hiddenFill xmlns="" xmlns:a14="http://schemas.microsoft.com/office/drawing/2010/main">
                   <a:noFill/>
                 </a14:hiddenFill>
               </a:ext>
               <a:ext uri="{AF507438-7753-43e0-B8FC-AC1667EBCBE1}">
-                <a14:hiddenEffects xmlns:a14="http://schemas.microsoft.com/office/drawing/2010/main" xmlns="">
+                <a14:hiddenEffects xmlns="" xmlns:a14="http://schemas.microsoft.com/office/drawing/2010/main">
                   <a:effectLst>
                     <a:outerShdw blurRad="63500" dist="38099" dir="2700000" algn="ctr" rotWithShape="0">
                       <a:srgbClr val="000000">
@@ -13738,7 +13738,7 @@
             <a:effectLst/>
             <a:extLst>
               <a:ext uri="{909E8E84-426E-40dd-AFC4-6F175D3DCCD1}">
-                <a14:hiddenFill xmlns:a14="http://schemas.microsoft.com/office/drawing/2010/main" xmlns="">
+                <a14:hiddenFill xmlns="" xmlns:a14="http://schemas.microsoft.com/office/drawing/2010/main">
                   <a:blipFill dpi="0" rotWithShape="0">
                     <a:blip/>
                     <a:srcRect/>
@@ -13749,7 +13749,7 @@
                 </a14:hiddenFill>
               </a:ext>
               <a:ext uri="{91240B29-F687-4f45-9708-019B960494DF}">
-                <a14:hiddenLine xmlns:a14="http://schemas.microsoft.com/office/drawing/2010/main" xmlns="" w="9525">
+                <a14:hiddenLine xmlns="" xmlns:a14="http://schemas.microsoft.com/office/drawing/2010/main" w="9525">
                   <a:solidFill>
                     <a:srgbClr val="000000"/>
                   </a:solidFill>
@@ -13759,7 +13759,7 @@
                 </a14:hiddenLine>
               </a:ext>
               <a:ext uri="{AF507438-7753-43e0-B8FC-AC1667EBCBE1}">
-                <a14:hiddenEffects xmlns:a14="http://schemas.microsoft.com/office/drawing/2010/main" xmlns="">
+                <a14:hiddenEffects xmlns="" xmlns:a14="http://schemas.microsoft.com/office/drawing/2010/main">
                   <a:effectLst>
                     <a:outerShdw blurRad="63500" dist="38099" dir="2700000" algn="ctr" rotWithShape="0">
                       <a:srgbClr val="000000">
@@ -13808,7 +13808,7 @@
             <a:effectLst/>
             <a:extLst>
               <a:ext uri="{909E8E84-426E-40dd-AFC4-6F175D3DCCD1}">
-                <a14:hiddenFill xmlns:a14="http://schemas.microsoft.com/office/drawing/2010/main" xmlns="">
+                <a14:hiddenFill xmlns="" xmlns:a14="http://schemas.microsoft.com/office/drawing/2010/main">
                   <a:blipFill dpi="0" rotWithShape="0">
                     <a:blip/>
                     <a:srcRect/>
@@ -13819,7 +13819,7 @@
                 </a14:hiddenFill>
               </a:ext>
               <a:ext uri="{91240B29-F687-4f45-9708-019B960494DF}">
-                <a14:hiddenLine xmlns:a14="http://schemas.microsoft.com/office/drawing/2010/main" xmlns="" w="9525">
+                <a14:hiddenLine xmlns="" xmlns:a14="http://schemas.microsoft.com/office/drawing/2010/main" w="9525">
                   <a:solidFill>
                     <a:srgbClr val="000000"/>
                   </a:solidFill>
@@ -13829,7 +13829,7 @@
                 </a14:hiddenLine>
               </a:ext>
               <a:ext uri="{AF507438-7753-43e0-B8FC-AC1667EBCBE1}">
-                <a14:hiddenEffects xmlns:a14="http://schemas.microsoft.com/office/drawing/2010/main" xmlns="">
+                <a14:hiddenEffects xmlns="" xmlns:a14="http://schemas.microsoft.com/office/drawing/2010/main">
                   <a:effectLst>
                     <a:outerShdw blurRad="63500" dist="38099" dir="2700000" algn="ctr" rotWithShape="0">
                       <a:srgbClr val="000000">
@@ -13878,7 +13878,7 @@
             <a:effectLst/>
             <a:extLst>
               <a:ext uri="{909E8E84-426E-40dd-AFC4-6F175D3DCCD1}">
-                <a14:hiddenFill xmlns:a14="http://schemas.microsoft.com/office/drawing/2010/main" xmlns="">
+                <a14:hiddenFill xmlns="" xmlns:a14="http://schemas.microsoft.com/office/drawing/2010/main">
                   <a:blipFill dpi="0" rotWithShape="0">
                     <a:blip/>
                     <a:srcRect/>
@@ -13889,7 +13889,7 @@
                 </a14:hiddenFill>
               </a:ext>
               <a:ext uri="{91240B29-F687-4f45-9708-019B960494DF}">
-                <a14:hiddenLine xmlns:a14="http://schemas.microsoft.com/office/drawing/2010/main" xmlns="" w="9525">
+                <a14:hiddenLine xmlns="" xmlns:a14="http://schemas.microsoft.com/office/drawing/2010/main" w="9525">
                   <a:solidFill>
                     <a:srgbClr val="000000"/>
                   </a:solidFill>
@@ -13899,7 +13899,7 @@
                 </a14:hiddenLine>
               </a:ext>
               <a:ext uri="{AF507438-7753-43e0-B8FC-AC1667EBCBE1}">
-                <a14:hiddenEffects xmlns:a14="http://schemas.microsoft.com/office/drawing/2010/main" xmlns="">
+                <a14:hiddenEffects xmlns="" xmlns:a14="http://schemas.microsoft.com/office/drawing/2010/main">
                   <a:effectLst>
                     <a:outerShdw blurRad="63500" dist="38099" dir="2700000" algn="ctr" rotWithShape="0">
                       <a:srgbClr val="000000">
@@ -13948,7 +13948,7 @@
             <a:effectLst/>
             <a:extLst>
               <a:ext uri="{909E8E84-426E-40dd-AFC4-6F175D3DCCD1}">
-                <a14:hiddenFill xmlns:a14="http://schemas.microsoft.com/office/drawing/2010/main" xmlns="">
+                <a14:hiddenFill xmlns="" xmlns:a14="http://schemas.microsoft.com/office/drawing/2010/main">
                   <a:blipFill dpi="0" rotWithShape="0">
                     <a:blip/>
                     <a:srcRect/>
@@ -13959,7 +13959,7 @@
                 </a14:hiddenFill>
               </a:ext>
               <a:ext uri="{91240B29-F687-4f45-9708-019B960494DF}">
-                <a14:hiddenLine xmlns:a14="http://schemas.microsoft.com/office/drawing/2010/main" xmlns="" w="9525">
+                <a14:hiddenLine xmlns="" xmlns:a14="http://schemas.microsoft.com/office/drawing/2010/main" w="9525">
                   <a:solidFill>
                     <a:srgbClr val="000000"/>
                   </a:solidFill>
@@ -13969,7 +13969,7 @@
                 </a14:hiddenLine>
               </a:ext>
               <a:ext uri="{AF507438-7753-43e0-B8FC-AC1667EBCBE1}">
-                <a14:hiddenEffects xmlns:a14="http://schemas.microsoft.com/office/drawing/2010/main" xmlns="">
+                <a14:hiddenEffects xmlns="" xmlns:a14="http://schemas.microsoft.com/office/drawing/2010/main">
                   <a:effectLst>
                     <a:outerShdw blurRad="63500" dist="38099" dir="2700000" algn="ctr" rotWithShape="0">
                       <a:srgbClr val="000000">
@@ -14018,7 +14018,7 @@
             <a:effectLst/>
             <a:extLst>
               <a:ext uri="{909E8E84-426E-40dd-AFC4-6F175D3DCCD1}">
-                <a14:hiddenFill xmlns:a14="http://schemas.microsoft.com/office/drawing/2010/main" xmlns="">
+                <a14:hiddenFill xmlns="" xmlns:a14="http://schemas.microsoft.com/office/drawing/2010/main">
                   <a:blipFill dpi="0" rotWithShape="0">
                     <a:blip/>
                     <a:srcRect/>
@@ -14029,7 +14029,7 @@
                 </a14:hiddenFill>
               </a:ext>
               <a:ext uri="{91240B29-F687-4f45-9708-019B960494DF}">
-                <a14:hiddenLine xmlns:a14="http://schemas.microsoft.com/office/drawing/2010/main" xmlns="" w="9525">
+                <a14:hiddenLine xmlns="" xmlns:a14="http://schemas.microsoft.com/office/drawing/2010/main" w="9525">
                   <a:solidFill>
                     <a:srgbClr val="000000"/>
                   </a:solidFill>
@@ -14039,7 +14039,7 @@
                 </a14:hiddenLine>
               </a:ext>
               <a:ext uri="{AF507438-7753-43e0-B8FC-AC1667EBCBE1}">
-                <a14:hiddenEffects xmlns:a14="http://schemas.microsoft.com/office/drawing/2010/main" xmlns="">
+                <a14:hiddenEffects xmlns="" xmlns:a14="http://schemas.microsoft.com/office/drawing/2010/main">
                   <a:effectLst>
                     <a:outerShdw blurRad="63500" dist="38099" dir="2700000" algn="ctr" rotWithShape="0">
                       <a:srgbClr val="000000">
@@ -14080,12 +14080,12 @@
             <a:effectLst/>
             <a:extLst>
               <a:ext uri="{909E8E84-426E-40dd-AFC4-6F175D3DCCD1}">
-                <a14:hiddenFill xmlns:a14="http://schemas.microsoft.com/office/drawing/2010/main" xmlns="">
+                <a14:hiddenFill xmlns="" xmlns:a14="http://schemas.microsoft.com/office/drawing/2010/main">
                   <a:noFill/>
                 </a14:hiddenFill>
               </a:ext>
               <a:ext uri="{AF507438-7753-43e0-B8FC-AC1667EBCBE1}">
-                <a14:hiddenEffects xmlns:a14="http://schemas.microsoft.com/office/drawing/2010/main" xmlns="">
+                <a14:hiddenEffects xmlns="" xmlns:a14="http://schemas.microsoft.com/office/drawing/2010/main">
                   <a:effectLst>
                     <a:outerShdw blurRad="63500" dist="38099" dir="2700000" algn="ctr" rotWithShape="0">
                       <a:srgbClr val="000000">
@@ -14138,12 +14138,12 @@
             <a:effectLst/>
             <a:extLst>
               <a:ext uri="{909E8E84-426E-40dd-AFC4-6F175D3DCCD1}">
-                <a14:hiddenFill xmlns:a14="http://schemas.microsoft.com/office/drawing/2010/main" xmlns="">
+                <a14:hiddenFill xmlns="" xmlns:a14="http://schemas.microsoft.com/office/drawing/2010/main">
                   <a:noFill/>
                 </a14:hiddenFill>
               </a:ext>
               <a:ext uri="{AF507438-7753-43e0-B8FC-AC1667EBCBE1}">
-                <a14:hiddenEffects xmlns:a14="http://schemas.microsoft.com/office/drawing/2010/main" xmlns="">
+                <a14:hiddenEffects xmlns="" xmlns:a14="http://schemas.microsoft.com/office/drawing/2010/main">
                   <a:effectLst>
                     <a:outerShdw blurRad="63500" dist="38099" dir="2700000" algn="ctr" rotWithShape="0">
                       <a:srgbClr val="000000">
@@ -14204,7 +14204,7 @@
             <a:effectLst/>
             <a:extLst>
               <a:ext uri="{909E8E84-426E-40dd-AFC4-6F175D3DCCD1}">
-                <a14:hiddenFill xmlns:a14="http://schemas.microsoft.com/office/drawing/2010/main" xmlns="">
+                <a14:hiddenFill xmlns="" xmlns:a14="http://schemas.microsoft.com/office/drawing/2010/main">
                   <a:blipFill dpi="0" rotWithShape="0">
                     <a:blip/>
                     <a:srcRect/>
@@ -14215,7 +14215,7 @@
                 </a14:hiddenFill>
               </a:ext>
               <a:ext uri="{91240B29-F687-4f45-9708-019B960494DF}">
-                <a14:hiddenLine xmlns:a14="http://schemas.microsoft.com/office/drawing/2010/main" xmlns="" w="9525">
+                <a14:hiddenLine xmlns="" xmlns:a14="http://schemas.microsoft.com/office/drawing/2010/main" w="9525">
                   <a:solidFill>
                     <a:srgbClr val="000000"/>
                   </a:solidFill>
@@ -14225,7 +14225,7 @@
                 </a14:hiddenLine>
               </a:ext>
               <a:ext uri="{AF507438-7753-43e0-B8FC-AC1667EBCBE1}">
-                <a14:hiddenEffects xmlns:a14="http://schemas.microsoft.com/office/drawing/2010/main" xmlns="">
+                <a14:hiddenEffects xmlns="" xmlns:a14="http://schemas.microsoft.com/office/drawing/2010/main">
                   <a:effectLst>
                     <a:outerShdw blurRad="63500" dist="38099" dir="2700000" algn="ctr" rotWithShape="0">
                       <a:srgbClr val="000000">
@@ -14358,7 +14358,7 @@
           <a:effectLst/>
           <a:extLst>
             <a:ext uri="{909E8E84-426E-40dd-AFC4-6F175D3DCCD1}">
-              <a14:hiddenFill xmlns="" xmlns:a14="http://schemas.microsoft.com/office/drawing/2010/main">
+              <a14:hiddenFill xmlns:a14="http://schemas.microsoft.com/office/drawing/2010/main" xmlns="">
                 <a:blipFill dpi="0" rotWithShape="0">
                   <a:blip/>
                   <a:srcRect/>
@@ -14369,7 +14369,7 @@
               </a14:hiddenFill>
             </a:ext>
             <a:ext uri="{91240B29-F687-4f45-9708-019B960494DF}">
-              <a14:hiddenLine xmlns="" xmlns:a14="http://schemas.microsoft.com/office/drawing/2010/main" w="9525">
+              <a14:hiddenLine xmlns:a14="http://schemas.microsoft.com/office/drawing/2010/main" xmlns="" w="9525">
                 <a:solidFill>
                   <a:srgbClr val="000000"/>
                 </a:solidFill>
@@ -14379,7 +14379,7 @@
               </a14:hiddenLine>
             </a:ext>
             <a:ext uri="{AF507438-7753-43e0-B8FC-AC1667EBCBE1}">
-              <a14:hiddenEffects xmlns="" xmlns:a14="http://schemas.microsoft.com/office/drawing/2010/main">
+              <a14:hiddenEffects xmlns:a14="http://schemas.microsoft.com/office/drawing/2010/main" xmlns="">
                 <a:effectLst>
                   <a:outerShdw blurRad="63500" dist="38099" dir="2700000" algn="ctr" rotWithShape="0">
                     <a:srgbClr val="000000">
@@ -14464,7 +14464,7 @@
           <a:effectLst/>
           <a:extLst>
             <a:ext uri="{909E8E84-426E-40dd-AFC4-6F175D3DCCD1}">
-              <a14:hiddenFill xmlns="" xmlns:a14="http://schemas.microsoft.com/office/drawing/2010/main">
+              <a14:hiddenFill xmlns:a14="http://schemas.microsoft.com/office/drawing/2010/main" xmlns="">
                 <a:blipFill dpi="0" rotWithShape="0">
                   <a:blip/>
                   <a:srcRect/>
@@ -14475,7 +14475,7 @@
               </a14:hiddenFill>
             </a:ext>
             <a:ext uri="{91240B29-F687-4f45-9708-019B960494DF}">
-              <a14:hiddenLine xmlns="" xmlns:a14="http://schemas.microsoft.com/office/drawing/2010/main" w="9525">
+              <a14:hiddenLine xmlns:a14="http://schemas.microsoft.com/office/drawing/2010/main" xmlns="" w="9525">
                 <a:solidFill>
                   <a:srgbClr val="000000"/>
                 </a:solidFill>
@@ -14485,7 +14485,7 @@
               </a14:hiddenLine>
             </a:ext>
             <a:ext uri="{AF507438-7753-43e0-B8FC-AC1667EBCBE1}">
-              <a14:hiddenEffects xmlns="" xmlns:a14="http://schemas.microsoft.com/office/drawing/2010/main">
+              <a14:hiddenEffects xmlns:a14="http://schemas.microsoft.com/office/drawing/2010/main" xmlns="">
                 <a:effectLst>
                   <a:outerShdw blurRad="63500" dist="38099" dir="2700000" algn="ctr" rotWithShape="0">
                     <a:srgbClr val="000000">
@@ -14570,7 +14570,7 @@
           <a:effectLst/>
           <a:extLst>
             <a:ext uri="{909E8E84-426E-40dd-AFC4-6F175D3DCCD1}">
-              <a14:hiddenFill xmlns="" xmlns:a14="http://schemas.microsoft.com/office/drawing/2010/main">
+              <a14:hiddenFill xmlns:a14="http://schemas.microsoft.com/office/drawing/2010/main" xmlns="">
                 <a:blipFill dpi="0" rotWithShape="0">
                   <a:blip/>
                   <a:srcRect/>
@@ -14581,7 +14581,7 @@
               </a14:hiddenFill>
             </a:ext>
             <a:ext uri="{91240B29-F687-4f45-9708-019B960494DF}">
-              <a14:hiddenLine xmlns="" xmlns:a14="http://schemas.microsoft.com/office/drawing/2010/main" w="9525">
+              <a14:hiddenLine xmlns:a14="http://schemas.microsoft.com/office/drawing/2010/main" xmlns="" w="9525">
                 <a:solidFill>
                   <a:srgbClr val="000000"/>
                 </a:solidFill>
@@ -14591,7 +14591,7 @@
               </a14:hiddenLine>
             </a:ext>
             <a:ext uri="{AF507438-7753-43e0-B8FC-AC1667EBCBE1}">
-              <a14:hiddenEffects xmlns="" xmlns:a14="http://schemas.microsoft.com/office/drawing/2010/main">
+              <a14:hiddenEffects xmlns:a14="http://schemas.microsoft.com/office/drawing/2010/main" xmlns="">
                 <a:effectLst>
                   <a:outerShdw blurRad="63500" dist="38099" dir="2700000" algn="ctr" rotWithShape="0">
                     <a:srgbClr val="000000">
@@ -14771,7 +14771,7 @@
           <a:effectLst/>
           <a:extLst>
             <a:ext uri="{909E8E84-426E-40dd-AFC4-6F175D3DCCD1}">
-              <a14:hiddenFill xmlns="" xmlns:a14="http://schemas.microsoft.com/office/drawing/2010/main">
+              <a14:hiddenFill xmlns:a14="http://schemas.microsoft.com/office/drawing/2010/main" xmlns="">
                 <a:blipFill dpi="0" rotWithShape="0">
                   <a:blip/>
                   <a:srcRect/>
@@ -14782,7 +14782,7 @@
               </a14:hiddenFill>
             </a:ext>
             <a:ext uri="{91240B29-F687-4f45-9708-019B960494DF}">
-              <a14:hiddenLine xmlns="" xmlns:a14="http://schemas.microsoft.com/office/drawing/2010/main" w="9525">
+              <a14:hiddenLine xmlns:a14="http://schemas.microsoft.com/office/drawing/2010/main" xmlns="" w="9525">
                 <a:solidFill>
                   <a:srgbClr val="000000"/>
                 </a:solidFill>
@@ -14792,7 +14792,7 @@
               </a14:hiddenLine>
             </a:ext>
             <a:ext uri="{AF507438-7753-43e0-B8FC-AC1667EBCBE1}">
-              <a14:hiddenEffects xmlns="" xmlns:a14="http://schemas.microsoft.com/office/drawing/2010/main">
+              <a14:hiddenEffects xmlns:a14="http://schemas.microsoft.com/office/drawing/2010/main" xmlns="">
                 <a:effectLst>
                   <a:outerShdw blurRad="63500" dist="38099" dir="2700000" algn="ctr" rotWithShape="0">
                     <a:srgbClr val="000000">
@@ -14870,7 +14870,7 @@
           <a:effectLst/>
           <a:extLst>
             <a:ext uri="{909E8E84-426E-40dd-AFC4-6F175D3DCCD1}">
-              <a14:hiddenFill xmlns="" xmlns:a14="http://schemas.microsoft.com/office/drawing/2010/main">
+              <a14:hiddenFill xmlns:a14="http://schemas.microsoft.com/office/drawing/2010/main" xmlns="">
                 <a:blipFill dpi="0" rotWithShape="0">
                   <a:blip/>
                   <a:srcRect/>
@@ -14881,7 +14881,7 @@
               </a14:hiddenFill>
             </a:ext>
             <a:ext uri="{91240B29-F687-4f45-9708-019B960494DF}">
-              <a14:hiddenLine xmlns="" xmlns:a14="http://schemas.microsoft.com/office/drawing/2010/main" w="9525">
+              <a14:hiddenLine xmlns:a14="http://schemas.microsoft.com/office/drawing/2010/main" xmlns="" w="9525">
                 <a:solidFill>
                   <a:srgbClr val="000000"/>
                 </a:solidFill>
@@ -14891,7 +14891,7 @@
               </a14:hiddenLine>
             </a:ext>
             <a:ext uri="{AF507438-7753-43e0-B8FC-AC1667EBCBE1}">
-              <a14:hiddenEffects xmlns="" xmlns:a14="http://schemas.microsoft.com/office/drawing/2010/main">
+              <a14:hiddenEffects xmlns:a14="http://schemas.microsoft.com/office/drawing/2010/main" xmlns="">
                 <a:effectLst>
                   <a:outerShdw blurRad="63500" dist="38099" dir="2700000" algn="ctr" rotWithShape="0">
                     <a:srgbClr val="000000">
@@ -14969,7 +14969,7 @@
           <a:effectLst/>
           <a:extLst>
             <a:ext uri="{909E8E84-426E-40dd-AFC4-6F175D3DCCD1}">
-              <a14:hiddenFill xmlns="" xmlns:a14="http://schemas.microsoft.com/office/drawing/2010/main">
+              <a14:hiddenFill xmlns:a14="http://schemas.microsoft.com/office/drawing/2010/main" xmlns="">
                 <a:blipFill dpi="0" rotWithShape="0">
                   <a:blip/>
                   <a:srcRect/>
@@ -14980,7 +14980,7 @@
               </a14:hiddenFill>
             </a:ext>
             <a:ext uri="{91240B29-F687-4f45-9708-019B960494DF}">
-              <a14:hiddenLine xmlns="" xmlns:a14="http://schemas.microsoft.com/office/drawing/2010/main" w="9525">
+              <a14:hiddenLine xmlns:a14="http://schemas.microsoft.com/office/drawing/2010/main" xmlns="" w="9525">
                 <a:solidFill>
                   <a:srgbClr val="000000"/>
                 </a:solidFill>
@@ -14990,7 +14990,7 @@
               </a14:hiddenLine>
             </a:ext>
             <a:ext uri="{AF507438-7753-43e0-B8FC-AC1667EBCBE1}">
-              <a14:hiddenEffects xmlns="" xmlns:a14="http://schemas.microsoft.com/office/drawing/2010/main">
+              <a14:hiddenEffects xmlns:a14="http://schemas.microsoft.com/office/drawing/2010/main" xmlns="">
                 <a:effectLst>
                   <a:outerShdw blurRad="63500" dist="38099" dir="2700000" algn="ctr" rotWithShape="0">
                     <a:srgbClr val="000000">
@@ -16969,7 +16969,7 @@
           <a:effectLst/>
           <a:extLst>
             <a:ext uri="{909E8E84-426E-40dd-AFC4-6F175D3DCCD1}">
-              <a14:hiddenFill xmlns:a14="http://schemas.microsoft.com/office/drawing/2010/main" xmlns="">
+              <a14:hiddenFill xmlns="" xmlns:a14="http://schemas.microsoft.com/office/drawing/2010/main">
                 <a:blipFill dpi="0" rotWithShape="0">
                   <a:blip/>
                   <a:srcRect/>
@@ -16980,7 +16980,7 @@
               </a14:hiddenFill>
             </a:ext>
             <a:ext uri="{91240B29-F687-4f45-9708-019B960494DF}">
-              <a14:hiddenLine xmlns:a14="http://schemas.microsoft.com/office/drawing/2010/main" xmlns="" w="9525">
+              <a14:hiddenLine xmlns="" xmlns:a14="http://schemas.microsoft.com/office/drawing/2010/main" w="9525">
                 <a:solidFill>
                   <a:srgbClr val="000000"/>
                 </a:solidFill>
@@ -16990,7 +16990,7 @@
               </a14:hiddenLine>
             </a:ext>
             <a:ext uri="{AF507438-7753-43e0-B8FC-AC1667EBCBE1}">
-              <a14:hiddenEffects xmlns:a14="http://schemas.microsoft.com/office/drawing/2010/main" xmlns="">
+              <a14:hiddenEffects xmlns="" xmlns:a14="http://schemas.microsoft.com/office/drawing/2010/main">
                 <a:effectLst>
                   <a:outerShdw blurRad="63500" dist="38099" dir="2700000" algn="ctr" rotWithShape="0">
                     <a:srgbClr val="000000">
@@ -18479,7 +18479,7 @@
           <a:effectLst/>
           <a:extLst>
             <a:ext uri="{909E8E84-426E-40dd-AFC4-6F175D3DCCD1}">
-              <a14:hiddenFill xmlns:a14="http://schemas.microsoft.com/office/drawing/2010/main" xmlns="">
+              <a14:hiddenFill xmlns="" xmlns:a14="http://schemas.microsoft.com/office/drawing/2010/main">
                 <a:blipFill dpi="0" rotWithShape="0">
                   <a:blip/>
                   <a:srcRect/>
@@ -18490,7 +18490,7 @@
               </a14:hiddenFill>
             </a:ext>
             <a:ext uri="{91240B29-F687-4f45-9708-019B960494DF}">
-              <a14:hiddenLine xmlns:a14="http://schemas.microsoft.com/office/drawing/2010/main" xmlns="" w="9525">
+              <a14:hiddenLine xmlns="" xmlns:a14="http://schemas.microsoft.com/office/drawing/2010/main" w="9525">
                 <a:solidFill>
                   <a:srgbClr val="000000"/>
                 </a:solidFill>
@@ -18500,7 +18500,7 @@
               </a14:hiddenLine>
             </a:ext>
             <a:ext uri="{AF507438-7753-43e0-B8FC-AC1667EBCBE1}">
-              <a14:hiddenEffects xmlns:a14="http://schemas.microsoft.com/office/drawing/2010/main" xmlns="">
+              <a14:hiddenEffects xmlns="" xmlns:a14="http://schemas.microsoft.com/office/drawing/2010/main">
                 <a:effectLst>
                   <a:outerShdw blurRad="63500" dist="38099" dir="2700000" algn="ctr" rotWithShape="0">
                     <a:srgbClr val="000000">
@@ -19985,7 +19985,7 @@
           <a:effectLst/>
           <a:extLst>
             <a:ext uri="{909E8E84-426E-40dd-AFC4-6F175D3DCCD1}">
-              <a14:hiddenFill xmlns:a14="http://schemas.microsoft.com/office/drawing/2010/main" xmlns="">
+              <a14:hiddenFill xmlns="" xmlns:a14="http://schemas.microsoft.com/office/drawing/2010/main">
                 <a:blipFill dpi="0" rotWithShape="0">
                   <a:blip/>
                   <a:srcRect/>
@@ -19996,7 +19996,7 @@
               </a14:hiddenFill>
             </a:ext>
             <a:ext uri="{91240B29-F687-4f45-9708-019B960494DF}">
-              <a14:hiddenLine xmlns:a14="http://schemas.microsoft.com/office/drawing/2010/main" xmlns="" w="9525">
+              <a14:hiddenLine xmlns="" xmlns:a14="http://schemas.microsoft.com/office/drawing/2010/main" w="9525">
                 <a:solidFill>
                   <a:srgbClr val="000000"/>
                 </a:solidFill>
@@ -20006,7 +20006,7 @@
               </a14:hiddenLine>
             </a:ext>
             <a:ext uri="{AF507438-7753-43e0-B8FC-AC1667EBCBE1}">
-              <a14:hiddenEffects xmlns:a14="http://schemas.microsoft.com/office/drawing/2010/main" xmlns="">
+              <a14:hiddenEffects xmlns="" xmlns:a14="http://schemas.microsoft.com/office/drawing/2010/main">
                 <a:effectLst>
                   <a:outerShdw blurRad="63500" dist="38099" dir="2700000" algn="ctr" rotWithShape="0">
                     <a:srgbClr val="000000">
@@ -20160,7 +20160,7 @@
           <a:effectLst/>
           <a:extLst>
             <a:ext uri="{909E8E84-426E-40dd-AFC4-6F175D3DCCD1}">
-              <a14:hiddenFill xmlns:a14="http://schemas.microsoft.com/office/drawing/2010/main" xmlns="">
+              <a14:hiddenFill xmlns="" xmlns:a14="http://schemas.microsoft.com/office/drawing/2010/main">
                 <a:blipFill dpi="0" rotWithShape="0">
                   <a:blip/>
                   <a:srcRect/>
@@ -20171,7 +20171,7 @@
               </a14:hiddenFill>
             </a:ext>
             <a:ext uri="{91240B29-F687-4f45-9708-019B960494DF}">
-              <a14:hiddenLine xmlns:a14="http://schemas.microsoft.com/office/drawing/2010/main" xmlns="" w="9525">
+              <a14:hiddenLine xmlns="" xmlns:a14="http://schemas.microsoft.com/office/drawing/2010/main" w="9525">
                 <a:solidFill>
                   <a:srgbClr val="000000"/>
                 </a:solidFill>
@@ -20181,7 +20181,7 @@
               </a14:hiddenLine>
             </a:ext>
             <a:ext uri="{AF507438-7753-43e0-B8FC-AC1667EBCBE1}">
-              <a14:hiddenEffects xmlns:a14="http://schemas.microsoft.com/office/drawing/2010/main" xmlns="">
+              <a14:hiddenEffects xmlns="" xmlns:a14="http://schemas.microsoft.com/office/drawing/2010/main">
                 <a:effectLst>
                   <a:outerShdw blurRad="63500" dist="38099" dir="2700000" algn="ctr" rotWithShape="0">
                     <a:srgbClr val="000000">
@@ -21974,7 +21974,7 @@
           <a:effectLst/>
           <a:extLst>
             <a:ext uri="{909E8E84-426E-40dd-AFC4-6F175D3DCCD1}">
-              <a14:hiddenFill xmlns:a14="http://schemas.microsoft.com/office/drawing/2010/main" xmlns="">
+              <a14:hiddenFill xmlns="" xmlns:a14="http://schemas.microsoft.com/office/drawing/2010/main">
                 <a:blipFill dpi="0" rotWithShape="0">
                   <a:blip/>
                   <a:srcRect/>
@@ -21985,7 +21985,7 @@
               </a14:hiddenFill>
             </a:ext>
             <a:ext uri="{91240B29-F687-4f45-9708-019B960494DF}">
-              <a14:hiddenLine xmlns:a14="http://schemas.microsoft.com/office/drawing/2010/main" xmlns="" w="9525">
+              <a14:hiddenLine xmlns="" xmlns:a14="http://schemas.microsoft.com/office/drawing/2010/main" w="9525">
                 <a:solidFill>
                   <a:srgbClr val="000000"/>
                 </a:solidFill>
@@ -21995,7 +21995,7 @@
               </a14:hiddenLine>
             </a:ext>
             <a:ext uri="{AF507438-7753-43e0-B8FC-AC1667EBCBE1}">
-              <a14:hiddenEffects xmlns:a14="http://schemas.microsoft.com/office/drawing/2010/main" xmlns="">
+              <a14:hiddenEffects xmlns="" xmlns:a14="http://schemas.microsoft.com/office/drawing/2010/main">
                 <a:effectLst>
                   <a:outerShdw blurRad="63500" dist="38099" dir="2700000" algn="ctr" rotWithShape="0">
                     <a:srgbClr val="000000">
@@ -24950,7 +24950,7 @@
           <a:effectLst/>
           <a:extLst>
             <a:ext uri="{909E8E84-426E-40dd-AFC4-6F175D3DCCD1}">
-              <a14:hiddenFill xmlns:a14="http://schemas.microsoft.com/office/drawing/2010/main" xmlns="">
+              <a14:hiddenFill xmlns="" xmlns:a14="http://schemas.microsoft.com/office/drawing/2010/main">
                 <a:blipFill dpi="0" rotWithShape="0">
                   <a:blip/>
                   <a:srcRect/>
@@ -24961,7 +24961,7 @@
               </a14:hiddenFill>
             </a:ext>
             <a:ext uri="{91240B29-F687-4f45-9708-019B960494DF}">
-              <a14:hiddenLine xmlns:a14="http://schemas.microsoft.com/office/drawing/2010/main" xmlns="" w="9525">
+              <a14:hiddenLine xmlns="" xmlns:a14="http://schemas.microsoft.com/office/drawing/2010/main" w="9525">
                 <a:solidFill>
                   <a:srgbClr val="000000"/>
                 </a:solidFill>
@@ -24971,7 +24971,7 @@
               </a14:hiddenLine>
             </a:ext>
             <a:ext uri="{AF507438-7753-43e0-B8FC-AC1667EBCBE1}">
-              <a14:hiddenEffects xmlns:a14="http://schemas.microsoft.com/office/drawing/2010/main" xmlns="">
+              <a14:hiddenEffects xmlns="" xmlns:a14="http://schemas.microsoft.com/office/drawing/2010/main">
                 <a:effectLst>
                   <a:outerShdw blurRad="63500" dist="38099" dir="2700000" algn="ctr" rotWithShape="0">
                     <a:srgbClr val="000000">
@@ -25050,7 +25050,7 @@
           <a:effectLst/>
           <a:extLst>
             <a:ext uri="{909E8E84-426E-40dd-AFC4-6F175D3DCCD1}">
-              <a14:hiddenFill xmlns:a14="http://schemas.microsoft.com/office/drawing/2010/main" xmlns="">
+              <a14:hiddenFill xmlns="" xmlns:a14="http://schemas.microsoft.com/office/drawing/2010/main">
                 <a:blipFill dpi="0" rotWithShape="0">
                   <a:blip/>
                   <a:srcRect/>
@@ -25061,7 +25061,7 @@
               </a14:hiddenFill>
             </a:ext>
             <a:ext uri="{91240B29-F687-4f45-9708-019B960494DF}">
-              <a14:hiddenLine xmlns:a14="http://schemas.microsoft.com/office/drawing/2010/main" xmlns="" w="9525">
+              <a14:hiddenLine xmlns="" xmlns:a14="http://schemas.microsoft.com/office/drawing/2010/main" w="9525">
                 <a:solidFill>
                   <a:srgbClr val="000000"/>
                 </a:solidFill>
@@ -25071,7 +25071,7 @@
               </a14:hiddenLine>
             </a:ext>
             <a:ext uri="{AF507438-7753-43e0-B8FC-AC1667EBCBE1}">
-              <a14:hiddenEffects xmlns:a14="http://schemas.microsoft.com/office/drawing/2010/main" xmlns="">
+              <a14:hiddenEffects xmlns="" xmlns:a14="http://schemas.microsoft.com/office/drawing/2010/main">
                 <a:effectLst>
                   <a:outerShdw blurRad="63500" dist="38099" dir="2700000" algn="ctr" rotWithShape="0">
                     <a:srgbClr val="000000">
@@ -26666,7 +26666,7 @@
           <a:effectLst/>
           <a:extLst>
             <a:ext uri="{909E8E84-426E-40dd-AFC4-6F175D3DCCD1}">
-              <a14:hiddenFill xmlns:a14="http://schemas.microsoft.com/office/drawing/2010/main" xmlns="">
+              <a14:hiddenFill xmlns="" xmlns:a14="http://schemas.microsoft.com/office/drawing/2010/main">
                 <a:blipFill dpi="0" rotWithShape="0">
                   <a:blip/>
                   <a:srcRect/>
@@ -26677,7 +26677,7 @@
               </a14:hiddenFill>
             </a:ext>
             <a:ext uri="{91240B29-F687-4f45-9708-019B960494DF}">
-              <a14:hiddenLine xmlns:a14="http://schemas.microsoft.com/office/drawing/2010/main" xmlns="" w="9525">
+              <a14:hiddenLine xmlns="" xmlns:a14="http://schemas.microsoft.com/office/drawing/2010/main" w="9525">
                 <a:solidFill>
                   <a:srgbClr val="000000"/>
                 </a:solidFill>
@@ -26687,7 +26687,7 @@
               </a14:hiddenLine>
             </a:ext>
             <a:ext uri="{AF507438-7753-43e0-B8FC-AC1667EBCBE1}">
-              <a14:hiddenEffects xmlns:a14="http://schemas.microsoft.com/office/drawing/2010/main" xmlns="">
+              <a14:hiddenEffects xmlns="" xmlns:a14="http://schemas.microsoft.com/office/drawing/2010/main">
                 <a:effectLst>
                   <a:outerShdw blurRad="63500" dist="38099" dir="2700000" algn="ctr" rotWithShape="0">
                     <a:srgbClr val="000000">
@@ -28418,7 +28418,7 @@
           <a:effectLst/>
           <a:extLst>
             <a:ext uri="{909E8E84-426E-40dd-AFC4-6F175D3DCCD1}">
-              <a14:hiddenFill xmlns:a14="http://schemas.microsoft.com/office/drawing/2010/main" xmlns="">
+              <a14:hiddenFill xmlns="" xmlns:a14="http://schemas.microsoft.com/office/drawing/2010/main">
                 <a:blipFill dpi="0" rotWithShape="0">
                   <a:blip/>
                   <a:srcRect/>
@@ -28429,7 +28429,7 @@
               </a14:hiddenFill>
             </a:ext>
             <a:ext uri="{91240B29-F687-4f45-9708-019B960494DF}">
-              <a14:hiddenLine xmlns:a14="http://schemas.microsoft.com/office/drawing/2010/main" xmlns="" w="9525">
+              <a14:hiddenLine xmlns="" xmlns:a14="http://schemas.microsoft.com/office/drawing/2010/main" w="9525">
                 <a:solidFill>
                   <a:srgbClr val="000000"/>
                 </a:solidFill>
@@ -28439,7 +28439,7 @@
               </a14:hiddenLine>
             </a:ext>
             <a:ext uri="{AF507438-7753-43e0-B8FC-AC1667EBCBE1}">
-              <a14:hiddenEffects xmlns:a14="http://schemas.microsoft.com/office/drawing/2010/main" xmlns="">
+              <a14:hiddenEffects xmlns="" xmlns:a14="http://schemas.microsoft.com/office/drawing/2010/main">
                 <a:effectLst>
                   <a:outerShdw blurRad="63500" dist="38099" dir="2700000" algn="ctr" rotWithShape="0">
                     <a:srgbClr val="000000">
@@ -29872,7 +29872,7 @@
           <a:effectLst/>
           <a:extLst>
             <a:ext uri="{909E8E84-426E-40dd-AFC4-6F175D3DCCD1}">
-              <a14:hiddenFill xmlns:a14="http://schemas.microsoft.com/office/drawing/2010/main" xmlns="">
+              <a14:hiddenFill xmlns="" xmlns:a14="http://schemas.microsoft.com/office/drawing/2010/main">
                 <a:blipFill dpi="0" rotWithShape="0">
                   <a:blip/>
                   <a:srcRect/>
@@ -29883,7 +29883,7 @@
               </a14:hiddenFill>
             </a:ext>
             <a:ext uri="{91240B29-F687-4f45-9708-019B960494DF}">
-              <a14:hiddenLine xmlns:a14="http://schemas.microsoft.com/office/drawing/2010/main" xmlns="" w="9525">
+              <a14:hiddenLine xmlns="" xmlns:a14="http://schemas.microsoft.com/office/drawing/2010/main" w="9525">
                 <a:solidFill>
                   <a:srgbClr val="000000"/>
                 </a:solidFill>
@@ -29893,7 +29893,7 @@
               </a14:hiddenLine>
             </a:ext>
             <a:ext uri="{AF507438-7753-43e0-B8FC-AC1667EBCBE1}">
-              <a14:hiddenEffects xmlns:a14="http://schemas.microsoft.com/office/drawing/2010/main" xmlns="">
+              <a14:hiddenEffects xmlns="" xmlns:a14="http://schemas.microsoft.com/office/drawing/2010/main">
                 <a:effectLst>
                   <a:outerShdw blurRad="63500" dist="38099" dir="2700000" algn="ctr" rotWithShape="0">
                     <a:srgbClr val="000000">
@@ -30024,7 +30024,7 @@
           <a:effectLst/>
           <a:extLst>
             <a:ext uri="{909E8E84-426E-40dd-AFC4-6F175D3DCCD1}">
-              <a14:hiddenFill xmlns:a14="http://schemas.microsoft.com/office/drawing/2010/main" xmlns="">
+              <a14:hiddenFill xmlns="" xmlns:a14="http://schemas.microsoft.com/office/drawing/2010/main">
                 <a:blipFill dpi="0" rotWithShape="0">
                   <a:blip/>
                   <a:srcRect/>
@@ -30035,7 +30035,7 @@
               </a14:hiddenFill>
             </a:ext>
             <a:ext uri="{91240B29-F687-4f45-9708-019B960494DF}">
-              <a14:hiddenLine xmlns:a14="http://schemas.microsoft.com/office/drawing/2010/main" xmlns="" w="9525">
+              <a14:hiddenLine xmlns="" xmlns:a14="http://schemas.microsoft.com/office/drawing/2010/main" w="9525">
                 <a:solidFill>
                   <a:srgbClr val="000000"/>
                 </a:solidFill>
@@ -30045,7 +30045,7 @@
               </a14:hiddenLine>
             </a:ext>
             <a:ext uri="{AF507438-7753-43e0-B8FC-AC1667EBCBE1}">
-              <a14:hiddenEffects xmlns:a14="http://schemas.microsoft.com/office/drawing/2010/main" xmlns="">
+              <a14:hiddenEffects xmlns="" xmlns:a14="http://schemas.microsoft.com/office/drawing/2010/main">
                 <a:effectLst>
                   <a:outerShdw blurRad="63500" dist="38099" dir="2700000" algn="ctr" rotWithShape="0">
                     <a:srgbClr val="000000">
@@ -38262,7 +38262,7 @@
           <a:effectLst/>
           <a:extLst>
             <a:ext uri="{909E8E84-426E-40dd-AFC4-6F175D3DCCD1}">
-              <a14:hiddenFill xmlns="" xmlns:a14="http://schemas.microsoft.com/office/drawing/2010/main">
+              <a14:hiddenFill xmlns:a14="http://schemas.microsoft.com/office/drawing/2010/main" xmlns="">
                 <a:blipFill dpi="0" rotWithShape="0">
                   <a:blip/>
                   <a:srcRect/>
@@ -38273,7 +38273,7 @@
               </a14:hiddenFill>
             </a:ext>
             <a:ext uri="{91240B29-F687-4f45-9708-019B960494DF}">
-              <a14:hiddenLine xmlns="" xmlns:a14="http://schemas.microsoft.com/office/drawing/2010/main" w="9525">
+              <a14:hiddenLine xmlns:a14="http://schemas.microsoft.com/office/drawing/2010/main" xmlns="" w="9525">
                 <a:solidFill>
                   <a:srgbClr val="000000"/>
                 </a:solidFill>
@@ -38283,7 +38283,7 @@
               </a14:hiddenLine>
             </a:ext>
             <a:ext uri="{AF507438-7753-43e0-B8FC-AC1667EBCBE1}">
-              <a14:hiddenEffects xmlns="" xmlns:a14="http://schemas.microsoft.com/office/drawing/2010/main">
+              <a14:hiddenEffects xmlns:a14="http://schemas.microsoft.com/office/drawing/2010/main" xmlns="">
                 <a:effectLst>
                   <a:outerShdw blurRad="63500" dist="38099" dir="2700000" algn="ctr" rotWithShape="0">
                     <a:srgbClr val="000000">

</xml_diff>

<commit_message>
Some minor changes; make one pass
</commit_message>
<xml_diff>
--- a/marple_itx18.pptx
+++ b/marple_itx18.pptx
@@ -12722,7 +12722,7 @@
           <a:effectLst/>
           <a:extLst>
             <a:ext uri="{909E8E84-426E-40dd-AFC4-6F175D3DCCD1}">
-              <a14:hiddenFill xmlns:a14="http://schemas.microsoft.com/office/drawing/2010/main" xmlns="">
+              <a14:hiddenFill xmlns="" xmlns:a14="http://schemas.microsoft.com/office/drawing/2010/main">
                 <a:blipFill dpi="0" rotWithShape="0">
                   <a:blip/>
                   <a:srcRect/>
@@ -12733,7 +12733,7 @@
               </a14:hiddenFill>
             </a:ext>
             <a:ext uri="{91240B29-F687-4f45-9708-019B960494DF}">
-              <a14:hiddenLine xmlns:a14="http://schemas.microsoft.com/office/drawing/2010/main" xmlns="" w="9525">
+              <a14:hiddenLine xmlns="" xmlns:a14="http://schemas.microsoft.com/office/drawing/2010/main" w="9525">
                 <a:solidFill>
                   <a:srgbClr val="000000"/>
                 </a:solidFill>
@@ -12743,7 +12743,7 @@
               </a14:hiddenLine>
             </a:ext>
             <a:ext uri="{AF507438-7753-43e0-B8FC-AC1667EBCBE1}">
-              <a14:hiddenEffects xmlns:a14="http://schemas.microsoft.com/office/drawing/2010/main" xmlns="">
+              <a14:hiddenEffects xmlns="" xmlns:a14="http://schemas.microsoft.com/office/drawing/2010/main">
                 <a:effectLst>
                   <a:outerShdw blurRad="63500" dist="38099" dir="2700000" algn="ctr" rotWithShape="0">
                     <a:srgbClr val="000000">
@@ -12792,7 +12792,7 @@
           <a:effectLst/>
           <a:extLst>
             <a:ext uri="{909E8E84-426E-40dd-AFC4-6F175D3DCCD1}">
-              <a14:hiddenFill xmlns:a14="http://schemas.microsoft.com/office/drawing/2010/main" xmlns="">
+              <a14:hiddenFill xmlns="" xmlns:a14="http://schemas.microsoft.com/office/drawing/2010/main">
                 <a:blipFill dpi="0" rotWithShape="0">
                   <a:blip/>
                   <a:srcRect/>
@@ -12803,7 +12803,7 @@
               </a14:hiddenFill>
             </a:ext>
             <a:ext uri="{91240B29-F687-4f45-9708-019B960494DF}">
-              <a14:hiddenLine xmlns:a14="http://schemas.microsoft.com/office/drawing/2010/main" xmlns="" w="9525">
+              <a14:hiddenLine xmlns="" xmlns:a14="http://schemas.microsoft.com/office/drawing/2010/main" w="9525">
                 <a:solidFill>
                   <a:srgbClr val="000000"/>
                 </a:solidFill>
@@ -12813,7 +12813,7 @@
               </a14:hiddenLine>
             </a:ext>
             <a:ext uri="{AF507438-7753-43e0-B8FC-AC1667EBCBE1}">
-              <a14:hiddenEffects xmlns:a14="http://schemas.microsoft.com/office/drawing/2010/main" xmlns="">
+              <a14:hiddenEffects xmlns="" xmlns:a14="http://schemas.microsoft.com/office/drawing/2010/main">
                 <a:effectLst>
                   <a:outerShdw blurRad="63500" dist="38099" dir="2700000" algn="ctr" rotWithShape="0">
                     <a:srgbClr val="000000">
@@ -12948,7 +12948,7 @@
             <a:effectLst/>
             <a:extLst>
               <a:ext uri="{909E8E84-426E-40dd-AFC4-6F175D3DCCD1}">
-                <a14:hiddenFill xmlns="" xmlns:a14="http://schemas.microsoft.com/office/drawing/2010/main">
+                <a14:hiddenFill xmlns:a14="http://schemas.microsoft.com/office/drawing/2010/main" xmlns="">
                   <a:blipFill dpi="0" rotWithShape="0">
                     <a:blip/>
                     <a:srcRect/>
@@ -12959,7 +12959,7 @@
                 </a14:hiddenFill>
               </a:ext>
               <a:ext uri="{91240B29-F687-4f45-9708-019B960494DF}">
-                <a14:hiddenLine xmlns="" xmlns:a14="http://schemas.microsoft.com/office/drawing/2010/main" w="9525">
+                <a14:hiddenLine xmlns:a14="http://schemas.microsoft.com/office/drawing/2010/main" xmlns="" w="9525">
                   <a:solidFill>
                     <a:srgbClr val="000000"/>
                   </a:solidFill>
@@ -12969,7 +12969,7 @@
                 </a14:hiddenLine>
               </a:ext>
               <a:ext uri="{AF507438-7753-43e0-B8FC-AC1667EBCBE1}">
-                <a14:hiddenEffects xmlns="" xmlns:a14="http://schemas.microsoft.com/office/drawing/2010/main">
+                <a14:hiddenEffects xmlns:a14="http://schemas.microsoft.com/office/drawing/2010/main" xmlns="">
                   <a:effectLst>
                     <a:outerShdw blurRad="63500" dist="38099" dir="2700000" algn="ctr" rotWithShape="0">
                       <a:srgbClr val="000000">
@@ -13018,7 +13018,7 @@
             <a:effectLst/>
             <a:extLst>
               <a:ext uri="{909E8E84-426E-40dd-AFC4-6F175D3DCCD1}">
-                <a14:hiddenFill xmlns="" xmlns:a14="http://schemas.microsoft.com/office/drawing/2010/main">
+                <a14:hiddenFill xmlns:a14="http://schemas.microsoft.com/office/drawing/2010/main" xmlns="">
                   <a:blipFill dpi="0" rotWithShape="0">
                     <a:blip/>
                     <a:srcRect/>
@@ -13029,7 +13029,7 @@
                 </a14:hiddenFill>
               </a:ext>
               <a:ext uri="{91240B29-F687-4f45-9708-019B960494DF}">
-                <a14:hiddenLine xmlns="" xmlns:a14="http://schemas.microsoft.com/office/drawing/2010/main" w="9525">
+                <a14:hiddenLine xmlns:a14="http://schemas.microsoft.com/office/drawing/2010/main" xmlns="" w="9525">
                   <a:solidFill>
                     <a:srgbClr val="000000"/>
                   </a:solidFill>
@@ -13039,7 +13039,7 @@
                 </a14:hiddenLine>
               </a:ext>
               <a:ext uri="{AF507438-7753-43e0-B8FC-AC1667EBCBE1}">
-                <a14:hiddenEffects xmlns="" xmlns:a14="http://schemas.microsoft.com/office/drawing/2010/main">
+                <a14:hiddenEffects xmlns:a14="http://schemas.microsoft.com/office/drawing/2010/main" xmlns="">
                   <a:effectLst>
                     <a:outerShdw blurRad="63500" dist="38099" dir="2700000" algn="ctr" rotWithShape="0">
                       <a:srgbClr val="000000">
@@ -13088,7 +13088,7 @@
             <a:effectLst/>
             <a:extLst>
               <a:ext uri="{909E8E84-426E-40dd-AFC4-6F175D3DCCD1}">
-                <a14:hiddenFill xmlns="" xmlns:a14="http://schemas.microsoft.com/office/drawing/2010/main">
+                <a14:hiddenFill xmlns:a14="http://schemas.microsoft.com/office/drawing/2010/main" xmlns="">
                   <a:blipFill dpi="0" rotWithShape="0">
                     <a:blip/>
                     <a:srcRect/>
@@ -13099,7 +13099,7 @@
                 </a14:hiddenFill>
               </a:ext>
               <a:ext uri="{91240B29-F687-4f45-9708-019B960494DF}">
-                <a14:hiddenLine xmlns="" xmlns:a14="http://schemas.microsoft.com/office/drawing/2010/main" w="9525">
+                <a14:hiddenLine xmlns:a14="http://schemas.microsoft.com/office/drawing/2010/main" xmlns="" w="9525">
                   <a:solidFill>
                     <a:srgbClr val="000000"/>
                   </a:solidFill>
@@ -13109,7 +13109,7 @@
                 </a14:hiddenLine>
               </a:ext>
               <a:ext uri="{AF507438-7753-43e0-B8FC-AC1667EBCBE1}">
-                <a14:hiddenEffects xmlns="" xmlns:a14="http://schemas.microsoft.com/office/drawing/2010/main">
+                <a14:hiddenEffects xmlns:a14="http://schemas.microsoft.com/office/drawing/2010/main" xmlns="">
                   <a:effectLst>
                     <a:outerShdw blurRad="63500" dist="38099" dir="2700000" algn="ctr" rotWithShape="0">
                       <a:srgbClr val="000000">
@@ -13150,12 +13150,12 @@
             <a:effectLst/>
             <a:extLst>
               <a:ext uri="{909E8E84-426E-40dd-AFC4-6F175D3DCCD1}">
-                <a14:hiddenFill xmlns="" xmlns:a14="http://schemas.microsoft.com/office/drawing/2010/main">
+                <a14:hiddenFill xmlns:a14="http://schemas.microsoft.com/office/drawing/2010/main" xmlns="">
                   <a:noFill/>
                 </a14:hiddenFill>
               </a:ext>
               <a:ext uri="{AF507438-7753-43e0-B8FC-AC1667EBCBE1}">
-                <a14:hiddenEffects xmlns="" xmlns:a14="http://schemas.microsoft.com/office/drawing/2010/main">
+                <a14:hiddenEffects xmlns:a14="http://schemas.microsoft.com/office/drawing/2010/main" xmlns="">
                   <a:effectLst>
                     <a:outerShdw blurRad="63500" dist="38099" dir="2700000" algn="ctr" rotWithShape="0">
                       <a:srgbClr val="000000">
@@ -13208,12 +13208,12 @@
             <a:effectLst/>
             <a:extLst>
               <a:ext uri="{909E8E84-426E-40dd-AFC4-6F175D3DCCD1}">
-                <a14:hiddenFill xmlns="" xmlns:a14="http://schemas.microsoft.com/office/drawing/2010/main">
+                <a14:hiddenFill xmlns:a14="http://schemas.microsoft.com/office/drawing/2010/main" xmlns="">
                   <a:noFill/>
                 </a14:hiddenFill>
               </a:ext>
               <a:ext uri="{AF507438-7753-43e0-B8FC-AC1667EBCBE1}">
-                <a14:hiddenEffects xmlns="" xmlns:a14="http://schemas.microsoft.com/office/drawing/2010/main">
+                <a14:hiddenEffects xmlns:a14="http://schemas.microsoft.com/office/drawing/2010/main" xmlns="">
                   <a:effectLst>
                     <a:outerShdw blurRad="63500" dist="38099" dir="2700000" algn="ctr" rotWithShape="0">
                       <a:srgbClr val="000000">
@@ -13266,12 +13266,12 @@
             <a:effectLst/>
             <a:extLst>
               <a:ext uri="{909E8E84-426E-40dd-AFC4-6F175D3DCCD1}">
-                <a14:hiddenFill xmlns="" xmlns:a14="http://schemas.microsoft.com/office/drawing/2010/main">
+                <a14:hiddenFill xmlns:a14="http://schemas.microsoft.com/office/drawing/2010/main" xmlns="">
                   <a:noFill/>
                 </a14:hiddenFill>
               </a:ext>
               <a:ext uri="{AF507438-7753-43e0-B8FC-AC1667EBCBE1}">
-                <a14:hiddenEffects xmlns="" xmlns:a14="http://schemas.microsoft.com/office/drawing/2010/main">
+                <a14:hiddenEffects xmlns:a14="http://schemas.microsoft.com/office/drawing/2010/main" xmlns="">
                   <a:effectLst>
                     <a:outerShdw blurRad="63500" dist="38099" dir="2700000" algn="ctr" rotWithShape="0">
                       <a:srgbClr val="000000">
@@ -13324,12 +13324,12 @@
             <a:effectLst/>
             <a:extLst>
               <a:ext uri="{909E8E84-426E-40dd-AFC4-6F175D3DCCD1}">
-                <a14:hiddenFill xmlns="" xmlns:a14="http://schemas.microsoft.com/office/drawing/2010/main">
+                <a14:hiddenFill xmlns:a14="http://schemas.microsoft.com/office/drawing/2010/main" xmlns="">
                   <a:noFill/>
                 </a14:hiddenFill>
               </a:ext>
               <a:ext uri="{AF507438-7753-43e0-B8FC-AC1667EBCBE1}">
-                <a14:hiddenEffects xmlns="" xmlns:a14="http://schemas.microsoft.com/office/drawing/2010/main">
+                <a14:hiddenEffects xmlns:a14="http://schemas.microsoft.com/office/drawing/2010/main" xmlns="">
                   <a:effectLst>
                     <a:outerShdw blurRad="63500" dist="38099" dir="2700000" algn="ctr" rotWithShape="0">
                       <a:srgbClr val="000000">
@@ -13382,12 +13382,12 @@
             <a:effectLst/>
             <a:extLst>
               <a:ext uri="{909E8E84-426E-40dd-AFC4-6F175D3DCCD1}">
-                <a14:hiddenFill xmlns="" xmlns:a14="http://schemas.microsoft.com/office/drawing/2010/main">
+                <a14:hiddenFill xmlns:a14="http://schemas.microsoft.com/office/drawing/2010/main" xmlns="">
                   <a:noFill/>
                 </a14:hiddenFill>
               </a:ext>
               <a:ext uri="{AF507438-7753-43e0-B8FC-AC1667EBCBE1}">
-                <a14:hiddenEffects xmlns="" xmlns:a14="http://schemas.microsoft.com/office/drawing/2010/main">
+                <a14:hiddenEffects xmlns:a14="http://schemas.microsoft.com/office/drawing/2010/main" xmlns="">
                   <a:effectLst>
                     <a:outerShdw blurRad="63500" dist="38099" dir="2700000" algn="ctr" rotWithShape="0">
                       <a:srgbClr val="000000">
@@ -13440,12 +13440,12 @@
             <a:effectLst/>
             <a:extLst>
               <a:ext uri="{909E8E84-426E-40dd-AFC4-6F175D3DCCD1}">
-                <a14:hiddenFill xmlns="" xmlns:a14="http://schemas.microsoft.com/office/drawing/2010/main">
+                <a14:hiddenFill xmlns:a14="http://schemas.microsoft.com/office/drawing/2010/main" xmlns="">
                   <a:noFill/>
                 </a14:hiddenFill>
               </a:ext>
               <a:ext uri="{AF507438-7753-43e0-B8FC-AC1667EBCBE1}">
-                <a14:hiddenEffects xmlns="" xmlns:a14="http://schemas.microsoft.com/office/drawing/2010/main">
+                <a14:hiddenEffects xmlns:a14="http://schemas.microsoft.com/office/drawing/2010/main" xmlns="">
                   <a:effectLst>
                     <a:outerShdw blurRad="63500" dist="38099" dir="2700000" algn="ctr" rotWithShape="0">
                       <a:srgbClr val="000000">
@@ -13498,12 +13498,12 @@
             <a:effectLst/>
             <a:extLst>
               <a:ext uri="{909E8E84-426E-40dd-AFC4-6F175D3DCCD1}">
-                <a14:hiddenFill xmlns="" xmlns:a14="http://schemas.microsoft.com/office/drawing/2010/main">
+                <a14:hiddenFill xmlns:a14="http://schemas.microsoft.com/office/drawing/2010/main" xmlns="">
                   <a:noFill/>
                 </a14:hiddenFill>
               </a:ext>
               <a:ext uri="{AF507438-7753-43e0-B8FC-AC1667EBCBE1}">
-                <a14:hiddenEffects xmlns="" xmlns:a14="http://schemas.microsoft.com/office/drawing/2010/main">
+                <a14:hiddenEffects xmlns:a14="http://schemas.microsoft.com/office/drawing/2010/main" xmlns="">
                   <a:effectLst>
                     <a:outerShdw blurRad="63500" dist="38099" dir="2700000" algn="ctr" rotWithShape="0">
                       <a:srgbClr val="000000">
@@ -13556,12 +13556,12 @@
             <a:effectLst/>
             <a:extLst>
               <a:ext uri="{909E8E84-426E-40dd-AFC4-6F175D3DCCD1}">
-                <a14:hiddenFill xmlns="" xmlns:a14="http://schemas.microsoft.com/office/drawing/2010/main">
+                <a14:hiddenFill xmlns:a14="http://schemas.microsoft.com/office/drawing/2010/main" xmlns="">
                   <a:noFill/>
                 </a14:hiddenFill>
               </a:ext>
               <a:ext uri="{AF507438-7753-43e0-B8FC-AC1667EBCBE1}">
-                <a14:hiddenEffects xmlns="" xmlns:a14="http://schemas.microsoft.com/office/drawing/2010/main">
+                <a14:hiddenEffects xmlns:a14="http://schemas.microsoft.com/office/drawing/2010/main" xmlns="">
                   <a:effectLst>
                     <a:outerShdw blurRad="63500" dist="38099" dir="2700000" algn="ctr" rotWithShape="0">
                       <a:srgbClr val="000000">
@@ -13614,12 +13614,12 @@
             <a:effectLst/>
             <a:extLst>
               <a:ext uri="{909E8E84-426E-40dd-AFC4-6F175D3DCCD1}">
-                <a14:hiddenFill xmlns="" xmlns:a14="http://schemas.microsoft.com/office/drawing/2010/main">
+                <a14:hiddenFill xmlns:a14="http://schemas.microsoft.com/office/drawing/2010/main" xmlns="">
                   <a:noFill/>
                 </a14:hiddenFill>
               </a:ext>
               <a:ext uri="{AF507438-7753-43e0-B8FC-AC1667EBCBE1}">
-                <a14:hiddenEffects xmlns="" xmlns:a14="http://schemas.microsoft.com/office/drawing/2010/main">
+                <a14:hiddenEffects xmlns:a14="http://schemas.microsoft.com/office/drawing/2010/main" xmlns="">
                   <a:effectLst>
                     <a:outerShdw blurRad="63500" dist="38099" dir="2700000" algn="ctr" rotWithShape="0">
                       <a:srgbClr val="000000">
@@ -13672,12 +13672,12 @@
             <a:effectLst/>
             <a:extLst>
               <a:ext uri="{909E8E84-426E-40dd-AFC4-6F175D3DCCD1}">
-                <a14:hiddenFill xmlns="" xmlns:a14="http://schemas.microsoft.com/office/drawing/2010/main">
+                <a14:hiddenFill xmlns:a14="http://schemas.microsoft.com/office/drawing/2010/main" xmlns="">
                   <a:noFill/>
                 </a14:hiddenFill>
               </a:ext>
               <a:ext uri="{AF507438-7753-43e0-B8FC-AC1667EBCBE1}">
-                <a14:hiddenEffects xmlns="" xmlns:a14="http://schemas.microsoft.com/office/drawing/2010/main">
+                <a14:hiddenEffects xmlns:a14="http://schemas.microsoft.com/office/drawing/2010/main" xmlns="">
                   <a:effectLst>
                     <a:outerShdw blurRad="63500" dist="38099" dir="2700000" algn="ctr" rotWithShape="0">
                       <a:srgbClr val="000000">
@@ -13738,7 +13738,7 @@
             <a:effectLst/>
             <a:extLst>
               <a:ext uri="{909E8E84-426E-40dd-AFC4-6F175D3DCCD1}">
-                <a14:hiddenFill xmlns="" xmlns:a14="http://schemas.microsoft.com/office/drawing/2010/main">
+                <a14:hiddenFill xmlns:a14="http://schemas.microsoft.com/office/drawing/2010/main" xmlns="">
                   <a:blipFill dpi="0" rotWithShape="0">
                     <a:blip/>
                     <a:srcRect/>
@@ -13749,7 +13749,7 @@
                 </a14:hiddenFill>
               </a:ext>
               <a:ext uri="{91240B29-F687-4f45-9708-019B960494DF}">
-                <a14:hiddenLine xmlns="" xmlns:a14="http://schemas.microsoft.com/office/drawing/2010/main" w="9525">
+                <a14:hiddenLine xmlns:a14="http://schemas.microsoft.com/office/drawing/2010/main" xmlns="" w="9525">
                   <a:solidFill>
                     <a:srgbClr val="000000"/>
                   </a:solidFill>
@@ -13759,7 +13759,7 @@
                 </a14:hiddenLine>
               </a:ext>
               <a:ext uri="{AF507438-7753-43e0-B8FC-AC1667EBCBE1}">
-                <a14:hiddenEffects xmlns="" xmlns:a14="http://schemas.microsoft.com/office/drawing/2010/main">
+                <a14:hiddenEffects xmlns:a14="http://schemas.microsoft.com/office/drawing/2010/main" xmlns="">
                   <a:effectLst>
                     <a:outerShdw blurRad="63500" dist="38099" dir="2700000" algn="ctr" rotWithShape="0">
                       <a:srgbClr val="000000">
@@ -13808,7 +13808,7 @@
             <a:effectLst/>
             <a:extLst>
               <a:ext uri="{909E8E84-426E-40dd-AFC4-6F175D3DCCD1}">
-                <a14:hiddenFill xmlns="" xmlns:a14="http://schemas.microsoft.com/office/drawing/2010/main">
+                <a14:hiddenFill xmlns:a14="http://schemas.microsoft.com/office/drawing/2010/main" xmlns="">
                   <a:blipFill dpi="0" rotWithShape="0">
                     <a:blip/>
                     <a:srcRect/>
@@ -13819,7 +13819,7 @@
                 </a14:hiddenFill>
               </a:ext>
               <a:ext uri="{91240B29-F687-4f45-9708-019B960494DF}">
-                <a14:hiddenLine xmlns="" xmlns:a14="http://schemas.microsoft.com/office/drawing/2010/main" w="9525">
+                <a14:hiddenLine xmlns:a14="http://schemas.microsoft.com/office/drawing/2010/main" xmlns="" w="9525">
                   <a:solidFill>
                     <a:srgbClr val="000000"/>
                   </a:solidFill>
@@ -13829,7 +13829,7 @@
                 </a14:hiddenLine>
               </a:ext>
               <a:ext uri="{AF507438-7753-43e0-B8FC-AC1667EBCBE1}">
-                <a14:hiddenEffects xmlns="" xmlns:a14="http://schemas.microsoft.com/office/drawing/2010/main">
+                <a14:hiddenEffects xmlns:a14="http://schemas.microsoft.com/office/drawing/2010/main" xmlns="">
                   <a:effectLst>
                     <a:outerShdw blurRad="63500" dist="38099" dir="2700000" algn="ctr" rotWithShape="0">
                       <a:srgbClr val="000000">
@@ -13878,7 +13878,7 @@
             <a:effectLst/>
             <a:extLst>
               <a:ext uri="{909E8E84-426E-40dd-AFC4-6F175D3DCCD1}">
-                <a14:hiddenFill xmlns="" xmlns:a14="http://schemas.microsoft.com/office/drawing/2010/main">
+                <a14:hiddenFill xmlns:a14="http://schemas.microsoft.com/office/drawing/2010/main" xmlns="">
                   <a:blipFill dpi="0" rotWithShape="0">
                     <a:blip/>
                     <a:srcRect/>
@@ -13889,7 +13889,7 @@
                 </a14:hiddenFill>
               </a:ext>
               <a:ext uri="{91240B29-F687-4f45-9708-019B960494DF}">
-                <a14:hiddenLine xmlns="" xmlns:a14="http://schemas.microsoft.com/office/drawing/2010/main" w="9525">
+                <a14:hiddenLine xmlns:a14="http://schemas.microsoft.com/office/drawing/2010/main" xmlns="" w="9525">
                   <a:solidFill>
                     <a:srgbClr val="000000"/>
                   </a:solidFill>
@@ -13899,7 +13899,7 @@
                 </a14:hiddenLine>
               </a:ext>
               <a:ext uri="{AF507438-7753-43e0-B8FC-AC1667EBCBE1}">
-                <a14:hiddenEffects xmlns="" xmlns:a14="http://schemas.microsoft.com/office/drawing/2010/main">
+                <a14:hiddenEffects xmlns:a14="http://schemas.microsoft.com/office/drawing/2010/main" xmlns="">
                   <a:effectLst>
                     <a:outerShdw blurRad="63500" dist="38099" dir="2700000" algn="ctr" rotWithShape="0">
                       <a:srgbClr val="000000">
@@ -13948,7 +13948,7 @@
             <a:effectLst/>
             <a:extLst>
               <a:ext uri="{909E8E84-426E-40dd-AFC4-6F175D3DCCD1}">
-                <a14:hiddenFill xmlns="" xmlns:a14="http://schemas.microsoft.com/office/drawing/2010/main">
+                <a14:hiddenFill xmlns:a14="http://schemas.microsoft.com/office/drawing/2010/main" xmlns="">
                   <a:blipFill dpi="0" rotWithShape="0">
                     <a:blip/>
                     <a:srcRect/>
@@ -13959,7 +13959,7 @@
                 </a14:hiddenFill>
               </a:ext>
               <a:ext uri="{91240B29-F687-4f45-9708-019B960494DF}">
-                <a14:hiddenLine xmlns="" xmlns:a14="http://schemas.microsoft.com/office/drawing/2010/main" w="9525">
+                <a14:hiddenLine xmlns:a14="http://schemas.microsoft.com/office/drawing/2010/main" xmlns="" w="9525">
                   <a:solidFill>
                     <a:srgbClr val="000000"/>
                   </a:solidFill>
@@ -13969,7 +13969,7 @@
                 </a14:hiddenLine>
               </a:ext>
               <a:ext uri="{AF507438-7753-43e0-B8FC-AC1667EBCBE1}">
-                <a14:hiddenEffects xmlns="" xmlns:a14="http://schemas.microsoft.com/office/drawing/2010/main">
+                <a14:hiddenEffects xmlns:a14="http://schemas.microsoft.com/office/drawing/2010/main" xmlns="">
                   <a:effectLst>
                     <a:outerShdw blurRad="63500" dist="38099" dir="2700000" algn="ctr" rotWithShape="0">
                       <a:srgbClr val="000000">
@@ -14018,7 +14018,7 @@
             <a:effectLst/>
             <a:extLst>
               <a:ext uri="{909E8E84-426E-40dd-AFC4-6F175D3DCCD1}">
-                <a14:hiddenFill xmlns="" xmlns:a14="http://schemas.microsoft.com/office/drawing/2010/main">
+                <a14:hiddenFill xmlns:a14="http://schemas.microsoft.com/office/drawing/2010/main" xmlns="">
                   <a:blipFill dpi="0" rotWithShape="0">
                     <a:blip/>
                     <a:srcRect/>
@@ -14029,7 +14029,7 @@
                 </a14:hiddenFill>
               </a:ext>
               <a:ext uri="{91240B29-F687-4f45-9708-019B960494DF}">
-                <a14:hiddenLine xmlns="" xmlns:a14="http://schemas.microsoft.com/office/drawing/2010/main" w="9525">
+                <a14:hiddenLine xmlns:a14="http://schemas.microsoft.com/office/drawing/2010/main" xmlns="" w="9525">
                   <a:solidFill>
                     <a:srgbClr val="000000"/>
                   </a:solidFill>
@@ -14039,7 +14039,7 @@
                 </a14:hiddenLine>
               </a:ext>
               <a:ext uri="{AF507438-7753-43e0-B8FC-AC1667EBCBE1}">
-                <a14:hiddenEffects xmlns="" xmlns:a14="http://schemas.microsoft.com/office/drawing/2010/main">
+                <a14:hiddenEffects xmlns:a14="http://schemas.microsoft.com/office/drawing/2010/main" xmlns="">
                   <a:effectLst>
                     <a:outerShdw blurRad="63500" dist="38099" dir="2700000" algn="ctr" rotWithShape="0">
                       <a:srgbClr val="000000">
@@ -14080,12 +14080,12 @@
             <a:effectLst/>
             <a:extLst>
               <a:ext uri="{909E8E84-426E-40dd-AFC4-6F175D3DCCD1}">
-                <a14:hiddenFill xmlns="" xmlns:a14="http://schemas.microsoft.com/office/drawing/2010/main">
+                <a14:hiddenFill xmlns:a14="http://schemas.microsoft.com/office/drawing/2010/main" xmlns="">
                   <a:noFill/>
                 </a14:hiddenFill>
               </a:ext>
               <a:ext uri="{AF507438-7753-43e0-B8FC-AC1667EBCBE1}">
-                <a14:hiddenEffects xmlns="" xmlns:a14="http://schemas.microsoft.com/office/drawing/2010/main">
+                <a14:hiddenEffects xmlns:a14="http://schemas.microsoft.com/office/drawing/2010/main" xmlns="">
                   <a:effectLst>
                     <a:outerShdw blurRad="63500" dist="38099" dir="2700000" algn="ctr" rotWithShape="0">
                       <a:srgbClr val="000000">
@@ -14138,12 +14138,12 @@
             <a:effectLst/>
             <a:extLst>
               <a:ext uri="{909E8E84-426E-40dd-AFC4-6F175D3DCCD1}">
-                <a14:hiddenFill xmlns="" xmlns:a14="http://schemas.microsoft.com/office/drawing/2010/main">
+                <a14:hiddenFill xmlns:a14="http://schemas.microsoft.com/office/drawing/2010/main" xmlns="">
                   <a:noFill/>
                 </a14:hiddenFill>
               </a:ext>
               <a:ext uri="{AF507438-7753-43e0-B8FC-AC1667EBCBE1}">
-                <a14:hiddenEffects xmlns="" xmlns:a14="http://schemas.microsoft.com/office/drawing/2010/main">
+                <a14:hiddenEffects xmlns:a14="http://schemas.microsoft.com/office/drawing/2010/main" xmlns="">
                   <a:effectLst>
                     <a:outerShdw blurRad="63500" dist="38099" dir="2700000" algn="ctr" rotWithShape="0">
                       <a:srgbClr val="000000">
@@ -14204,7 +14204,7 @@
             <a:effectLst/>
             <a:extLst>
               <a:ext uri="{909E8E84-426E-40dd-AFC4-6F175D3DCCD1}">
-                <a14:hiddenFill xmlns="" xmlns:a14="http://schemas.microsoft.com/office/drawing/2010/main">
+                <a14:hiddenFill xmlns:a14="http://schemas.microsoft.com/office/drawing/2010/main" xmlns="">
                   <a:blipFill dpi="0" rotWithShape="0">
                     <a:blip/>
                     <a:srcRect/>
@@ -14215,7 +14215,7 @@
                 </a14:hiddenFill>
               </a:ext>
               <a:ext uri="{91240B29-F687-4f45-9708-019B960494DF}">
-                <a14:hiddenLine xmlns="" xmlns:a14="http://schemas.microsoft.com/office/drawing/2010/main" w="9525">
+                <a14:hiddenLine xmlns:a14="http://schemas.microsoft.com/office/drawing/2010/main" xmlns="" w="9525">
                   <a:solidFill>
                     <a:srgbClr val="000000"/>
                   </a:solidFill>
@@ -14225,7 +14225,7 @@
                 </a14:hiddenLine>
               </a:ext>
               <a:ext uri="{AF507438-7753-43e0-B8FC-AC1667EBCBE1}">
-                <a14:hiddenEffects xmlns="" xmlns:a14="http://schemas.microsoft.com/office/drawing/2010/main">
+                <a14:hiddenEffects xmlns:a14="http://schemas.microsoft.com/office/drawing/2010/main" xmlns="">
                   <a:effectLst>
                     <a:outerShdw blurRad="63500" dist="38099" dir="2700000" algn="ctr" rotWithShape="0">
                       <a:srgbClr val="000000">
@@ -14358,7 +14358,7 @@
           <a:effectLst/>
           <a:extLst>
             <a:ext uri="{909E8E84-426E-40dd-AFC4-6F175D3DCCD1}">
-              <a14:hiddenFill xmlns:a14="http://schemas.microsoft.com/office/drawing/2010/main" xmlns="">
+              <a14:hiddenFill xmlns="" xmlns:a14="http://schemas.microsoft.com/office/drawing/2010/main">
                 <a:blipFill dpi="0" rotWithShape="0">
                   <a:blip/>
                   <a:srcRect/>
@@ -14369,7 +14369,7 @@
               </a14:hiddenFill>
             </a:ext>
             <a:ext uri="{91240B29-F687-4f45-9708-019B960494DF}">
-              <a14:hiddenLine xmlns:a14="http://schemas.microsoft.com/office/drawing/2010/main" xmlns="" w="9525">
+              <a14:hiddenLine xmlns="" xmlns:a14="http://schemas.microsoft.com/office/drawing/2010/main" w="9525">
                 <a:solidFill>
                   <a:srgbClr val="000000"/>
                 </a:solidFill>
@@ -14379,7 +14379,7 @@
               </a14:hiddenLine>
             </a:ext>
             <a:ext uri="{AF507438-7753-43e0-B8FC-AC1667EBCBE1}">
-              <a14:hiddenEffects xmlns:a14="http://schemas.microsoft.com/office/drawing/2010/main" xmlns="">
+              <a14:hiddenEffects xmlns="" xmlns:a14="http://schemas.microsoft.com/office/drawing/2010/main">
                 <a:effectLst>
                   <a:outerShdw blurRad="63500" dist="38099" dir="2700000" algn="ctr" rotWithShape="0">
                     <a:srgbClr val="000000">
@@ -14464,7 +14464,7 @@
           <a:effectLst/>
           <a:extLst>
             <a:ext uri="{909E8E84-426E-40dd-AFC4-6F175D3DCCD1}">
-              <a14:hiddenFill xmlns:a14="http://schemas.microsoft.com/office/drawing/2010/main" xmlns="">
+              <a14:hiddenFill xmlns="" xmlns:a14="http://schemas.microsoft.com/office/drawing/2010/main">
                 <a:blipFill dpi="0" rotWithShape="0">
                   <a:blip/>
                   <a:srcRect/>
@@ -14475,7 +14475,7 @@
               </a14:hiddenFill>
             </a:ext>
             <a:ext uri="{91240B29-F687-4f45-9708-019B960494DF}">
-              <a14:hiddenLine xmlns:a14="http://schemas.microsoft.com/office/drawing/2010/main" xmlns="" w="9525">
+              <a14:hiddenLine xmlns="" xmlns:a14="http://schemas.microsoft.com/office/drawing/2010/main" w="9525">
                 <a:solidFill>
                   <a:srgbClr val="000000"/>
                 </a:solidFill>
@@ -14485,7 +14485,7 @@
               </a14:hiddenLine>
             </a:ext>
             <a:ext uri="{AF507438-7753-43e0-B8FC-AC1667EBCBE1}">
-              <a14:hiddenEffects xmlns:a14="http://schemas.microsoft.com/office/drawing/2010/main" xmlns="">
+              <a14:hiddenEffects xmlns="" xmlns:a14="http://schemas.microsoft.com/office/drawing/2010/main">
                 <a:effectLst>
                   <a:outerShdw blurRad="63500" dist="38099" dir="2700000" algn="ctr" rotWithShape="0">
                     <a:srgbClr val="000000">
@@ -14570,7 +14570,7 @@
           <a:effectLst/>
           <a:extLst>
             <a:ext uri="{909E8E84-426E-40dd-AFC4-6F175D3DCCD1}">
-              <a14:hiddenFill xmlns:a14="http://schemas.microsoft.com/office/drawing/2010/main" xmlns="">
+              <a14:hiddenFill xmlns="" xmlns:a14="http://schemas.microsoft.com/office/drawing/2010/main">
                 <a:blipFill dpi="0" rotWithShape="0">
                   <a:blip/>
                   <a:srcRect/>
@@ -14581,7 +14581,7 @@
               </a14:hiddenFill>
             </a:ext>
             <a:ext uri="{91240B29-F687-4f45-9708-019B960494DF}">
-              <a14:hiddenLine xmlns:a14="http://schemas.microsoft.com/office/drawing/2010/main" xmlns="" w="9525">
+              <a14:hiddenLine xmlns="" xmlns:a14="http://schemas.microsoft.com/office/drawing/2010/main" w="9525">
                 <a:solidFill>
                   <a:srgbClr val="000000"/>
                 </a:solidFill>
@@ -14591,7 +14591,7 @@
               </a14:hiddenLine>
             </a:ext>
             <a:ext uri="{AF507438-7753-43e0-B8FC-AC1667EBCBE1}">
-              <a14:hiddenEffects xmlns:a14="http://schemas.microsoft.com/office/drawing/2010/main" xmlns="">
+              <a14:hiddenEffects xmlns="" xmlns:a14="http://schemas.microsoft.com/office/drawing/2010/main">
                 <a:effectLst>
                   <a:outerShdw blurRad="63500" dist="38099" dir="2700000" algn="ctr" rotWithShape="0">
                     <a:srgbClr val="000000">
@@ -14771,7 +14771,7 @@
           <a:effectLst/>
           <a:extLst>
             <a:ext uri="{909E8E84-426E-40dd-AFC4-6F175D3DCCD1}">
-              <a14:hiddenFill xmlns:a14="http://schemas.microsoft.com/office/drawing/2010/main" xmlns="">
+              <a14:hiddenFill xmlns="" xmlns:a14="http://schemas.microsoft.com/office/drawing/2010/main">
                 <a:blipFill dpi="0" rotWithShape="0">
                   <a:blip/>
                   <a:srcRect/>
@@ -14782,7 +14782,7 @@
               </a14:hiddenFill>
             </a:ext>
             <a:ext uri="{91240B29-F687-4f45-9708-019B960494DF}">
-              <a14:hiddenLine xmlns:a14="http://schemas.microsoft.com/office/drawing/2010/main" xmlns="" w="9525">
+              <a14:hiddenLine xmlns="" xmlns:a14="http://schemas.microsoft.com/office/drawing/2010/main" w="9525">
                 <a:solidFill>
                   <a:srgbClr val="000000"/>
                 </a:solidFill>
@@ -14792,7 +14792,7 @@
               </a14:hiddenLine>
             </a:ext>
             <a:ext uri="{AF507438-7753-43e0-B8FC-AC1667EBCBE1}">
-              <a14:hiddenEffects xmlns:a14="http://schemas.microsoft.com/office/drawing/2010/main" xmlns="">
+              <a14:hiddenEffects xmlns="" xmlns:a14="http://schemas.microsoft.com/office/drawing/2010/main">
                 <a:effectLst>
                   <a:outerShdw blurRad="63500" dist="38099" dir="2700000" algn="ctr" rotWithShape="0">
                     <a:srgbClr val="000000">
@@ -14870,7 +14870,7 @@
           <a:effectLst/>
           <a:extLst>
             <a:ext uri="{909E8E84-426E-40dd-AFC4-6F175D3DCCD1}">
-              <a14:hiddenFill xmlns:a14="http://schemas.microsoft.com/office/drawing/2010/main" xmlns="">
+              <a14:hiddenFill xmlns="" xmlns:a14="http://schemas.microsoft.com/office/drawing/2010/main">
                 <a:blipFill dpi="0" rotWithShape="0">
                   <a:blip/>
                   <a:srcRect/>
@@ -14881,7 +14881,7 @@
               </a14:hiddenFill>
             </a:ext>
             <a:ext uri="{91240B29-F687-4f45-9708-019B960494DF}">
-              <a14:hiddenLine xmlns:a14="http://schemas.microsoft.com/office/drawing/2010/main" xmlns="" w="9525">
+              <a14:hiddenLine xmlns="" xmlns:a14="http://schemas.microsoft.com/office/drawing/2010/main" w="9525">
                 <a:solidFill>
                   <a:srgbClr val="000000"/>
                 </a:solidFill>
@@ -14891,7 +14891,7 @@
               </a14:hiddenLine>
             </a:ext>
             <a:ext uri="{AF507438-7753-43e0-B8FC-AC1667EBCBE1}">
-              <a14:hiddenEffects xmlns:a14="http://schemas.microsoft.com/office/drawing/2010/main" xmlns="">
+              <a14:hiddenEffects xmlns="" xmlns:a14="http://schemas.microsoft.com/office/drawing/2010/main">
                 <a:effectLst>
                   <a:outerShdw blurRad="63500" dist="38099" dir="2700000" algn="ctr" rotWithShape="0">
                     <a:srgbClr val="000000">
@@ -14969,7 +14969,7 @@
           <a:effectLst/>
           <a:extLst>
             <a:ext uri="{909E8E84-426E-40dd-AFC4-6F175D3DCCD1}">
-              <a14:hiddenFill xmlns:a14="http://schemas.microsoft.com/office/drawing/2010/main" xmlns="">
+              <a14:hiddenFill xmlns="" xmlns:a14="http://schemas.microsoft.com/office/drawing/2010/main">
                 <a:blipFill dpi="0" rotWithShape="0">
                   <a:blip/>
                   <a:srcRect/>
@@ -14980,7 +14980,7 @@
               </a14:hiddenFill>
             </a:ext>
             <a:ext uri="{91240B29-F687-4f45-9708-019B960494DF}">
-              <a14:hiddenLine xmlns:a14="http://schemas.microsoft.com/office/drawing/2010/main" xmlns="" w="9525">
+              <a14:hiddenLine xmlns="" xmlns:a14="http://schemas.microsoft.com/office/drawing/2010/main" w="9525">
                 <a:solidFill>
                   <a:srgbClr val="000000"/>
                 </a:solidFill>
@@ -14990,7 +14990,7 @@
               </a14:hiddenLine>
             </a:ext>
             <a:ext uri="{AF507438-7753-43e0-B8FC-AC1667EBCBE1}">
-              <a14:hiddenEffects xmlns:a14="http://schemas.microsoft.com/office/drawing/2010/main" xmlns="">
+              <a14:hiddenEffects xmlns="" xmlns:a14="http://schemas.microsoft.com/office/drawing/2010/main">
                 <a:effectLst>
                   <a:outerShdw blurRad="63500" dist="38099" dir="2700000" algn="ctr" rotWithShape="0">
                     <a:srgbClr val="000000">
@@ -16969,7 +16969,7 @@
           <a:effectLst/>
           <a:extLst>
             <a:ext uri="{909E8E84-426E-40dd-AFC4-6F175D3DCCD1}">
-              <a14:hiddenFill xmlns="" xmlns:a14="http://schemas.microsoft.com/office/drawing/2010/main">
+              <a14:hiddenFill xmlns:a14="http://schemas.microsoft.com/office/drawing/2010/main" xmlns="">
                 <a:blipFill dpi="0" rotWithShape="0">
                   <a:blip/>
                   <a:srcRect/>
@@ -16980,7 +16980,7 @@
               </a14:hiddenFill>
             </a:ext>
             <a:ext uri="{91240B29-F687-4f45-9708-019B960494DF}">
-              <a14:hiddenLine xmlns="" xmlns:a14="http://schemas.microsoft.com/office/drawing/2010/main" w="9525">
+              <a14:hiddenLine xmlns:a14="http://schemas.microsoft.com/office/drawing/2010/main" xmlns="" w="9525">
                 <a:solidFill>
                   <a:srgbClr val="000000"/>
                 </a:solidFill>
@@ -16990,7 +16990,7 @@
               </a14:hiddenLine>
             </a:ext>
             <a:ext uri="{AF507438-7753-43e0-B8FC-AC1667EBCBE1}">
-              <a14:hiddenEffects xmlns="" xmlns:a14="http://schemas.microsoft.com/office/drawing/2010/main">
+              <a14:hiddenEffects xmlns:a14="http://schemas.microsoft.com/office/drawing/2010/main" xmlns="">
                 <a:effectLst>
                   <a:outerShdw blurRad="63500" dist="38099" dir="2700000" algn="ctr" rotWithShape="0">
                     <a:srgbClr val="000000">
@@ -18479,7 +18479,7 @@
           <a:effectLst/>
           <a:extLst>
             <a:ext uri="{909E8E84-426E-40dd-AFC4-6F175D3DCCD1}">
-              <a14:hiddenFill xmlns="" xmlns:a14="http://schemas.microsoft.com/office/drawing/2010/main">
+              <a14:hiddenFill xmlns:a14="http://schemas.microsoft.com/office/drawing/2010/main" xmlns="">
                 <a:blipFill dpi="0" rotWithShape="0">
                   <a:blip/>
                   <a:srcRect/>
@@ -18490,7 +18490,7 @@
               </a14:hiddenFill>
             </a:ext>
             <a:ext uri="{91240B29-F687-4f45-9708-019B960494DF}">
-              <a14:hiddenLine xmlns="" xmlns:a14="http://schemas.microsoft.com/office/drawing/2010/main" w="9525">
+              <a14:hiddenLine xmlns:a14="http://schemas.microsoft.com/office/drawing/2010/main" xmlns="" w="9525">
                 <a:solidFill>
                   <a:srgbClr val="000000"/>
                 </a:solidFill>
@@ -18500,7 +18500,7 @@
               </a14:hiddenLine>
             </a:ext>
             <a:ext uri="{AF507438-7753-43e0-B8FC-AC1667EBCBE1}">
-              <a14:hiddenEffects xmlns="" xmlns:a14="http://schemas.microsoft.com/office/drawing/2010/main">
+              <a14:hiddenEffects xmlns:a14="http://schemas.microsoft.com/office/drawing/2010/main" xmlns="">
                 <a:effectLst>
                   <a:outerShdw blurRad="63500" dist="38099" dir="2700000" algn="ctr" rotWithShape="0">
                     <a:srgbClr val="000000">
@@ -19985,7 +19985,7 @@
           <a:effectLst/>
           <a:extLst>
             <a:ext uri="{909E8E84-426E-40dd-AFC4-6F175D3DCCD1}">
-              <a14:hiddenFill xmlns="" xmlns:a14="http://schemas.microsoft.com/office/drawing/2010/main">
+              <a14:hiddenFill xmlns:a14="http://schemas.microsoft.com/office/drawing/2010/main" xmlns="">
                 <a:blipFill dpi="0" rotWithShape="0">
                   <a:blip/>
                   <a:srcRect/>
@@ -19996,7 +19996,7 @@
               </a14:hiddenFill>
             </a:ext>
             <a:ext uri="{91240B29-F687-4f45-9708-019B960494DF}">
-              <a14:hiddenLine xmlns="" xmlns:a14="http://schemas.microsoft.com/office/drawing/2010/main" w="9525">
+              <a14:hiddenLine xmlns:a14="http://schemas.microsoft.com/office/drawing/2010/main" xmlns="" w="9525">
                 <a:solidFill>
                   <a:srgbClr val="000000"/>
                 </a:solidFill>
@@ -20006,7 +20006,7 @@
               </a14:hiddenLine>
             </a:ext>
             <a:ext uri="{AF507438-7753-43e0-B8FC-AC1667EBCBE1}">
-              <a14:hiddenEffects xmlns="" xmlns:a14="http://schemas.microsoft.com/office/drawing/2010/main">
+              <a14:hiddenEffects xmlns:a14="http://schemas.microsoft.com/office/drawing/2010/main" xmlns="">
                 <a:effectLst>
                   <a:outerShdw blurRad="63500" dist="38099" dir="2700000" algn="ctr" rotWithShape="0">
                     <a:srgbClr val="000000">
@@ -20160,7 +20160,7 @@
           <a:effectLst/>
           <a:extLst>
             <a:ext uri="{909E8E84-426E-40dd-AFC4-6F175D3DCCD1}">
-              <a14:hiddenFill xmlns="" xmlns:a14="http://schemas.microsoft.com/office/drawing/2010/main">
+              <a14:hiddenFill xmlns:a14="http://schemas.microsoft.com/office/drawing/2010/main" xmlns="">
                 <a:blipFill dpi="0" rotWithShape="0">
                   <a:blip/>
                   <a:srcRect/>
@@ -20171,7 +20171,7 @@
               </a14:hiddenFill>
             </a:ext>
             <a:ext uri="{91240B29-F687-4f45-9708-019B960494DF}">
-              <a14:hiddenLine xmlns="" xmlns:a14="http://schemas.microsoft.com/office/drawing/2010/main" w="9525">
+              <a14:hiddenLine xmlns:a14="http://schemas.microsoft.com/office/drawing/2010/main" xmlns="" w="9525">
                 <a:solidFill>
                   <a:srgbClr val="000000"/>
                 </a:solidFill>
@@ -20181,7 +20181,7 @@
               </a14:hiddenLine>
             </a:ext>
             <a:ext uri="{AF507438-7753-43e0-B8FC-AC1667EBCBE1}">
-              <a14:hiddenEffects xmlns="" xmlns:a14="http://schemas.microsoft.com/office/drawing/2010/main">
+              <a14:hiddenEffects xmlns:a14="http://schemas.microsoft.com/office/drawing/2010/main" xmlns="">
                 <a:effectLst>
                   <a:outerShdw blurRad="63500" dist="38099" dir="2700000" algn="ctr" rotWithShape="0">
                     <a:srgbClr val="000000">
@@ -21974,7 +21974,7 @@
           <a:effectLst/>
           <a:extLst>
             <a:ext uri="{909E8E84-426E-40dd-AFC4-6F175D3DCCD1}">
-              <a14:hiddenFill xmlns="" xmlns:a14="http://schemas.microsoft.com/office/drawing/2010/main">
+              <a14:hiddenFill xmlns:a14="http://schemas.microsoft.com/office/drawing/2010/main" xmlns="">
                 <a:blipFill dpi="0" rotWithShape="0">
                   <a:blip/>
                   <a:srcRect/>
@@ -21985,7 +21985,7 @@
               </a14:hiddenFill>
             </a:ext>
             <a:ext uri="{91240B29-F687-4f45-9708-019B960494DF}">
-              <a14:hiddenLine xmlns="" xmlns:a14="http://schemas.microsoft.com/office/drawing/2010/main" w="9525">
+              <a14:hiddenLine xmlns:a14="http://schemas.microsoft.com/office/drawing/2010/main" xmlns="" w="9525">
                 <a:solidFill>
                   <a:srgbClr val="000000"/>
                 </a:solidFill>
@@ -21995,7 +21995,7 @@
               </a14:hiddenLine>
             </a:ext>
             <a:ext uri="{AF507438-7753-43e0-B8FC-AC1667EBCBE1}">
-              <a14:hiddenEffects xmlns="" xmlns:a14="http://schemas.microsoft.com/office/drawing/2010/main">
+              <a14:hiddenEffects xmlns:a14="http://schemas.microsoft.com/office/drawing/2010/main" xmlns="">
                 <a:effectLst>
                   <a:outerShdw blurRad="63500" dist="38099" dir="2700000" algn="ctr" rotWithShape="0">
                     <a:srgbClr val="000000">
@@ -24950,7 +24950,7 @@
           <a:effectLst/>
           <a:extLst>
             <a:ext uri="{909E8E84-426E-40dd-AFC4-6F175D3DCCD1}">
-              <a14:hiddenFill xmlns="" xmlns:a14="http://schemas.microsoft.com/office/drawing/2010/main">
+              <a14:hiddenFill xmlns:a14="http://schemas.microsoft.com/office/drawing/2010/main" xmlns="">
                 <a:blipFill dpi="0" rotWithShape="0">
                   <a:blip/>
                   <a:srcRect/>
@@ -24961,7 +24961,7 @@
               </a14:hiddenFill>
             </a:ext>
             <a:ext uri="{91240B29-F687-4f45-9708-019B960494DF}">
-              <a14:hiddenLine xmlns="" xmlns:a14="http://schemas.microsoft.com/office/drawing/2010/main" w="9525">
+              <a14:hiddenLine xmlns:a14="http://schemas.microsoft.com/office/drawing/2010/main" xmlns="" w="9525">
                 <a:solidFill>
                   <a:srgbClr val="000000"/>
                 </a:solidFill>
@@ -24971,7 +24971,7 @@
               </a14:hiddenLine>
             </a:ext>
             <a:ext uri="{AF507438-7753-43e0-B8FC-AC1667EBCBE1}">
-              <a14:hiddenEffects xmlns="" xmlns:a14="http://schemas.microsoft.com/office/drawing/2010/main">
+              <a14:hiddenEffects xmlns:a14="http://schemas.microsoft.com/office/drawing/2010/main" xmlns="">
                 <a:effectLst>
                   <a:outerShdw blurRad="63500" dist="38099" dir="2700000" algn="ctr" rotWithShape="0">
                     <a:srgbClr val="000000">
@@ -25050,7 +25050,7 @@
           <a:effectLst/>
           <a:extLst>
             <a:ext uri="{909E8E84-426E-40dd-AFC4-6F175D3DCCD1}">
-              <a14:hiddenFill xmlns="" xmlns:a14="http://schemas.microsoft.com/office/drawing/2010/main">
+              <a14:hiddenFill xmlns:a14="http://schemas.microsoft.com/office/drawing/2010/main" xmlns="">
                 <a:blipFill dpi="0" rotWithShape="0">
                   <a:blip/>
                   <a:srcRect/>
@@ -25061,7 +25061,7 @@
               </a14:hiddenFill>
             </a:ext>
             <a:ext uri="{91240B29-F687-4f45-9708-019B960494DF}">
-              <a14:hiddenLine xmlns="" xmlns:a14="http://schemas.microsoft.com/office/drawing/2010/main" w="9525">
+              <a14:hiddenLine xmlns:a14="http://schemas.microsoft.com/office/drawing/2010/main" xmlns="" w="9525">
                 <a:solidFill>
                   <a:srgbClr val="000000"/>
                 </a:solidFill>
@@ -25071,7 +25071,7 @@
               </a14:hiddenLine>
             </a:ext>
             <a:ext uri="{AF507438-7753-43e0-B8FC-AC1667EBCBE1}">
-              <a14:hiddenEffects xmlns="" xmlns:a14="http://schemas.microsoft.com/office/drawing/2010/main">
+              <a14:hiddenEffects xmlns:a14="http://schemas.microsoft.com/office/drawing/2010/main" xmlns="">
                 <a:effectLst>
                   <a:outerShdw blurRad="63500" dist="38099" dir="2700000" algn="ctr" rotWithShape="0">
                     <a:srgbClr val="000000">
@@ -26666,7 +26666,7 @@
           <a:effectLst/>
           <a:extLst>
             <a:ext uri="{909E8E84-426E-40dd-AFC4-6F175D3DCCD1}">
-              <a14:hiddenFill xmlns="" xmlns:a14="http://schemas.microsoft.com/office/drawing/2010/main">
+              <a14:hiddenFill xmlns:a14="http://schemas.microsoft.com/office/drawing/2010/main" xmlns="">
                 <a:blipFill dpi="0" rotWithShape="0">
                   <a:blip/>
                   <a:srcRect/>
@@ -26677,7 +26677,7 @@
               </a14:hiddenFill>
             </a:ext>
             <a:ext uri="{91240B29-F687-4f45-9708-019B960494DF}">
-              <a14:hiddenLine xmlns="" xmlns:a14="http://schemas.microsoft.com/office/drawing/2010/main" w="9525">
+              <a14:hiddenLine xmlns:a14="http://schemas.microsoft.com/office/drawing/2010/main" xmlns="" w="9525">
                 <a:solidFill>
                   <a:srgbClr val="000000"/>
                 </a:solidFill>
@@ -26687,7 +26687,7 @@
               </a14:hiddenLine>
             </a:ext>
             <a:ext uri="{AF507438-7753-43e0-B8FC-AC1667EBCBE1}">
-              <a14:hiddenEffects xmlns="" xmlns:a14="http://schemas.microsoft.com/office/drawing/2010/main">
+              <a14:hiddenEffects xmlns:a14="http://schemas.microsoft.com/office/drawing/2010/main" xmlns="">
                 <a:effectLst>
                   <a:outerShdw blurRad="63500" dist="38099" dir="2700000" algn="ctr" rotWithShape="0">
                     <a:srgbClr val="000000">
@@ -28418,7 +28418,7 @@
           <a:effectLst/>
           <a:extLst>
             <a:ext uri="{909E8E84-426E-40dd-AFC4-6F175D3DCCD1}">
-              <a14:hiddenFill xmlns="" xmlns:a14="http://schemas.microsoft.com/office/drawing/2010/main">
+              <a14:hiddenFill xmlns:a14="http://schemas.microsoft.com/office/drawing/2010/main" xmlns="">
                 <a:blipFill dpi="0" rotWithShape="0">
                   <a:blip/>
                   <a:srcRect/>
@@ -28429,7 +28429,7 @@
               </a14:hiddenFill>
             </a:ext>
             <a:ext uri="{91240B29-F687-4f45-9708-019B960494DF}">
-              <a14:hiddenLine xmlns="" xmlns:a14="http://schemas.microsoft.com/office/drawing/2010/main" w="9525">
+              <a14:hiddenLine xmlns:a14="http://schemas.microsoft.com/office/drawing/2010/main" xmlns="" w="9525">
                 <a:solidFill>
                   <a:srgbClr val="000000"/>
                 </a:solidFill>
@@ -28439,7 +28439,7 @@
               </a14:hiddenLine>
             </a:ext>
             <a:ext uri="{AF507438-7753-43e0-B8FC-AC1667EBCBE1}">
-              <a14:hiddenEffects xmlns="" xmlns:a14="http://schemas.microsoft.com/office/drawing/2010/main">
+              <a14:hiddenEffects xmlns:a14="http://schemas.microsoft.com/office/drawing/2010/main" xmlns="">
                 <a:effectLst>
                   <a:outerShdw blurRad="63500" dist="38099" dir="2700000" algn="ctr" rotWithShape="0">
                     <a:srgbClr val="000000">
@@ -29872,7 +29872,7 @@
           <a:effectLst/>
           <a:extLst>
             <a:ext uri="{909E8E84-426E-40dd-AFC4-6F175D3DCCD1}">
-              <a14:hiddenFill xmlns="" xmlns:a14="http://schemas.microsoft.com/office/drawing/2010/main">
+              <a14:hiddenFill xmlns:a14="http://schemas.microsoft.com/office/drawing/2010/main" xmlns="">
                 <a:blipFill dpi="0" rotWithShape="0">
                   <a:blip/>
                   <a:srcRect/>
@@ -29883,7 +29883,7 @@
               </a14:hiddenFill>
             </a:ext>
             <a:ext uri="{91240B29-F687-4f45-9708-019B960494DF}">
-              <a14:hiddenLine xmlns="" xmlns:a14="http://schemas.microsoft.com/office/drawing/2010/main" w="9525">
+              <a14:hiddenLine xmlns:a14="http://schemas.microsoft.com/office/drawing/2010/main" xmlns="" w="9525">
                 <a:solidFill>
                   <a:srgbClr val="000000"/>
                 </a:solidFill>
@@ -29893,7 +29893,7 @@
               </a14:hiddenLine>
             </a:ext>
             <a:ext uri="{AF507438-7753-43e0-B8FC-AC1667EBCBE1}">
-              <a14:hiddenEffects xmlns="" xmlns:a14="http://schemas.microsoft.com/office/drawing/2010/main">
+              <a14:hiddenEffects xmlns:a14="http://schemas.microsoft.com/office/drawing/2010/main" xmlns="">
                 <a:effectLst>
                   <a:outerShdw blurRad="63500" dist="38099" dir="2700000" algn="ctr" rotWithShape="0">
                     <a:srgbClr val="000000">
@@ -30024,7 +30024,7 @@
           <a:effectLst/>
           <a:extLst>
             <a:ext uri="{909E8E84-426E-40dd-AFC4-6F175D3DCCD1}">
-              <a14:hiddenFill xmlns="" xmlns:a14="http://schemas.microsoft.com/office/drawing/2010/main">
+              <a14:hiddenFill xmlns:a14="http://schemas.microsoft.com/office/drawing/2010/main" xmlns="">
                 <a:blipFill dpi="0" rotWithShape="0">
                   <a:blip/>
                   <a:srcRect/>
@@ -30035,7 +30035,7 @@
               </a14:hiddenFill>
             </a:ext>
             <a:ext uri="{91240B29-F687-4f45-9708-019B960494DF}">
-              <a14:hiddenLine xmlns="" xmlns:a14="http://schemas.microsoft.com/office/drawing/2010/main" w="9525">
+              <a14:hiddenLine xmlns:a14="http://schemas.microsoft.com/office/drawing/2010/main" xmlns="" w="9525">
                 <a:solidFill>
                   <a:srgbClr val="000000"/>
                 </a:solidFill>
@@ -30045,7 +30045,7 @@
               </a14:hiddenLine>
             </a:ext>
             <a:ext uri="{AF507438-7753-43e0-B8FC-AC1667EBCBE1}">
-              <a14:hiddenEffects xmlns="" xmlns:a14="http://schemas.microsoft.com/office/drawing/2010/main">
+              <a14:hiddenEffects xmlns:a14="http://schemas.microsoft.com/office/drawing/2010/main" xmlns="">
                 <a:effectLst>
                   <a:outerShdw blurRad="63500" dist="38099" dir="2700000" algn="ctr" rotWithShape="0">
                     <a:srgbClr val="000000">
@@ -33363,7 +33363,7 @@
         </p:nvGrpSpPr>
         <p:grpSpPr>
           <a:xfrm>
-            <a:off x="10363200" y="3543300"/>
+            <a:off x="10363200" y="3687678"/>
             <a:ext cx="1524000" cy="1414168"/>
             <a:chOff x="9677400" y="3657598"/>
             <a:chExt cx="1524000" cy="1414168"/>
@@ -38262,7 +38262,7 @@
           <a:effectLst/>
           <a:extLst>
             <a:ext uri="{909E8E84-426E-40dd-AFC4-6F175D3DCCD1}">
-              <a14:hiddenFill xmlns:a14="http://schemas.microsoft.com/office/drawing/2010/main" xmlns="">
+              <a14:hiddenFill xmlns="" xmlns:a14="http://schemas.microsoft.com/office/drawing/2010/main">
                 <a:blipFill dpi="0" rotWithShape="0">
                   <a:blip/>
                   <a:srcRect/>
@@ -38273,7 +38273,7 @@
               </a14:hiddenFill>
             </a:ext>
             <a:ext uri="{91240B29-F687-4f45-9708-019B960494DF}">
-              <a14:hiddenLine xmlns:a14="http://schemas.microsoft.com/office/drawing/2010/main" xmlns="" w="9525">
+              <a14:hiddenLine xmlns="" xmlns:a14="http://schemas.microsoft.com/office/drawing/2010/main" w="9525">
                 <a:solidFill>
                   <a:srgbClr val="000000"/>
                 </a:solidFill>
@@ -38283,7 +38283,7 @@
               </a14:hiddenLine>
             </a:ext>
             <a:ext uri="{AF507438-7753-43e0-B8FC-AC1667EBCBE1}">
-              <a14:hiddenEffects xmlns:a14="http://schemas.microsoft.com/office/drawing/2010/main" xmlns="">
+              <a14:hiddenEffects xmlns="" xmlns:a14="http://schemas.microsoft.com/office/drawing/2010/main">
                 <a:effectLst>
                   <a:outerShdw blurRad="63500" dist="38099" dir="2700000" algn="ctr" rotWithShape="0">
                     <a:srgbClr val="000000">

</xml_diff>

<commit_message>
Write through until and including slide 6.
</commit_message>
<xml_diff>
--- a/marple_itx18.pptx
+++ b/marple_itx18.pptx
@@ -555,7 +555,36 @@
           <a:bodyPr/>
           <a:lstStyle/>
           <a:p>
+            <a:r>
+              <a:rPr lang="en-US" baseline="0" dirty="0"/>
+              <a:t>Thank you for the invitation. I am going to be speaking about work that I did as a grad student on designing hardware and software for fast and programmable network monitoring. This is joint work with many excellent collaborators. In particular, I want to mention the lead author on this work, Srinivas Narayana, who is a postdoc at MIT.</a:t>
+            </a:r>
+          </a:p>
+          <a:p>
             <a:endParaRPr lang="en-US" baseline="0" dirty="0"/>
+          </a:p>
+          <a:p>
+            <a:pPr marL="0" marR="0" lvl="0" indent="0" algn="l" defTabSz="914400" rtl="0" eaLnBrk="1" fontAlgn="auto" latinLnBrk="0" hangingPunct="1">
+              <a:lnSpc>
+                <a:spcPct val="100000"/>
+              </a:lnSpc>
+              <a:spcBef>
+                <a:spcPts val="0"/>
+              </a:spcBef>
+              <a:spcAft>
+                <a:spcPts val="0"/>
+              </a:spcAft>
+              <a:buClrTx/>
+              <a:buSzTx/>
+              <a:buFontTx/>
+              <a:buNone/>
+              <a:tabLst/>
+              <a:defRPr/>
+            </a:pPr>
+            <a:r>
+              <a:rPr lang="en-US" dirty="0"/>
+              <a:t>So let’s break down the talk’s title: we want both fast and programmable network monitoring. By fast, I mean the ability to run at a switch’s line rate. And by programmable, I mean the ability to express whatever network monitoring question you care about and get accurate results.</a:t>
+            </a:r>
           </a:p>
         </p:txBody>
       </p:sp>
@@ -639,7 +668,7 @@
           <a:bodyPr/>
           <a:lstStyle/>
           <a:p>
-            <a:endParaRPr lang="en-US" dirty="0"/>
+            <a:endParaRPr lang="en-US" baseline="0" dirty="0"/>
           </a:p>
         </p:txBody>
       </p:sp>
@@ -660,7 +689,7 @@
           <a:p>
             <a:fld id="{33793ACE-A489-1C41-B163-D1FF0130F898}" type="slidenum">
               <a:rPr lang="en-US" smtClean="0"/>
-              <a:t>13</a:t>
+              <a:t>11</a:t>
             </a:fld>
             <a:endParaRPr lang="en-US"/>
           </a:p>
@@ -669,7 +698,7 @@
     </p:spTree>
     <p:extLst>
       <p:ext uri="{BB962C8B-B14F-4D97-AF65-F5344CB8AC3E}">
-        <p14:creationId xmlns:p14="http://schemas.microsoft.com/office/powerpoint/2010/main" val="1793562882"/>
+        <p14:creationId xmlns:p14="http://schemas.microsoft.com/office/powerpoint/2010/main" val="965527152"/>
       </p:ext>
     </p:extLst>
   </p:cSld>
@@ -723,7 +752,7 @@
           <a:bodyPr/>
           <a:lstStyle/>
           <a:p>
-            <a:endParaRPr lang="en-US" baseline="0" dirty="0"/>
+            <a:endParaRPr lang="en-US" dirty="0"/>
           </a:p>
         </p:txBody>
       </p:sp>
@@ -744,7 +773,7 @@
           <a:p>
             <a:fld id="{33793ACE-A489-1C41-B163-D1FF0130F898}" type="slidenum">
               <a:rPr lang="en-US" smtClean="0"/>
-              <a:t>14</a:t>
+              <a:t>13</a:t>
             </a:fld>
             <a:endParaRPr lang="en-US"/>
           </a:p>
@@ -753,7 +782,7 @@
     </p:spTree>
     <p:extLst>
       <p:ext uri="{BB962C8B-B14F-4D97-AF65-F5344CB8AC3E}">
-        <p14:creationId xmlns:p14="http://schemas.microsoft.com/office/powerpoint/2010/main" val="1346195764"/>
+        <p14:creationId xmlns:p14="http://schemas.microsoft.com/office/powerpoint/2010/main" val="1793562882"/>
       </p:ext>
     </p:extLst>
   </p:cSld>
@@ -807,7 +836,7 @@
           <a:bodyPr/>
           <a:lstStyle/>
           <a:p>
-            <a:endParaRPr lang="en-US" dirty="0"/>
+            <a:endParaRPr lang="en-US" baseline="0" dirty="0"/>
           </a:p>
         </p:txBody>
       </p:sp>
@@ -828,7 +857,7 @@
           <a:p>
             <a:fld id="{33793ACE-A489-1C41-B163-D1FF0130F898}" type="slidenum">
               <a:rPr lang="en-US" smtClean="0"/>
-              <a:t>15</a:t>
+              <a:t>14</a:t>
             </a:fld>
             <a:endParaRPr lang="en-US"/>
           </a:p>
@@ -837,7 +866,7 @@
     </p:spTree>
     <p:extLst>
       <p:ext uri="{BB962C8B-B14F-4D97-AF65-F5344CB8AC3E}">
-        <p14:creationId xmlns:p14="http://schemas.microsoft.com/office/powerpoint/2010/main" val="1332604535"/>
+        <p14:creationId xmlns:p14="http://schemas.microsoft.com/office/powerpoint/2010/main" val="1346195764"/>
       </p:ext>
     </p:extLst>
   </p:cSld>
@@ -912,7 +941,7 @@
           <a:p>
             <a:fld id="{33793ACE-A489-1C41-B163-D1FF0130F898}" type="slidenum">
               <a:rPr lang="en-US" smtClean="0"/>
-              <a:t>16</a:t>
+              <a:t>15</a:t>
             </a:fld>
             <a:endParaRPr lang="en-US"/>
           </a:p>
@@ -921,7 +950,7 @@
     </p:spTree>
     <p:extLst>
       <p:ext uri="{BB962C8B-B14F-4D97-AF65-F5344CB8AC3E}">
-        <p14:creationId xmlns:p14="http://schemas.microsoft.com/office/powerpoint/2010/main" val="200401994"/>
+        <p14:creationId xmlns:p14="http://schemas.microsoft.com/office/powerpoint/2010/main" val="1332604535"/>
       </p:ext>
     </p:extLst>
   </p:cSld>
@@ -996,7 +1025,7 @@
           <a:p>
             <a:fld id="{33793ACE-A489-1C41-B163-D1FF0130F898}" type="slidenum">
               <a:rPr lang="en-US" smtClean="0"/>
-              <a:t>17</a:t>
+              <a:t>16</a:t>
             </a:fld>
             <a:endParaRPr lang="en-US"/>
           </a:p>
@@ -1005,7 +1034,7 @@
     </p:spTree>
     <p:extLst>
       <p:ext uri="{BB962C8B-B14F-4D97-AF65-F5344CB8AC3E}">
-        <p14:creationId xmlns:p14="http://schemas.microsoft.com/office/powerpoint/2010/main" val="758351784"/>
+        <p14:creationId xmlns:p14="http://schemas.microsoft.com/office/powerpoint/2010/main" val="200401994"/>
       </p:ext>
     </p:extLst>
   </p:cSld>
@@ -1080,7 +1109,7 @@
           <a:p>
             <a:fld id="{33793ACE-A489-1C41-B163-D1FF0130F898}" type="slidenum">
               <a:rPr lang="en-US" smtClean="0"/>
-              <a:t>19</a:t>
+              <a:t>17</a:t>
             </a:fld>
             <a:endParaRPr lang="en-US"/>
           </a:p>
@@ -1089,7 +1118,7 @@
     </p:spTree>
     <p:extLst>
       <p:ext uri="{BB962C8B-B14F-4D97-AF65-F5344CB8AC3E}">
-        <p14:creationId xmlns:p14="http://schemas.microsoft.com/office/powerpoint/2010/main" val="1038519295"/>
+        <p14:creationId xmlns:p14="http://schemas.microsoft.com/office/powerpoint/2010/main" val="758351784"/>
       </p:ext>
     </p:extLst>
   </p:cSld>
@@ -1164,7 +1193,7 @@
           <a:p>
             <a:fld id="{33793ACE-A489-1C41-B163-D1FF0130F898}" type="slidenum">
               <a:rPr lang="en-US" smtClean="0"/>
-              <a:t>20</a:t>
+              <a:t>19</a:t>
             </a:fld>
             <a:endParaRPr lang="en-US"/>
           </a:p>
@@ -1173,7 +1202,7 @@
     </p:spTree>
     <p:extLst>
       <p:ext uri="{BB962C8B-B14F-4D97-AF65-F5344CB8AC3E}">
-        <p14:creationId xmlns:p14="http://schemas.microsoft.com/office/powerpoint/2010/main" val="347832182"/>
+        <p14:creationId xmlns:p14="http://schemas.microsoft.com/office/powerpoint/2010/main" val="1038519295"/>
       </p:ext>
     </p:extLst>
   </p:cSld>
@@ -1227,30 +1256,6 @@
           <a:bodyPr/>
           <a:lstStyle/>
           <a:p>
-            <a:r>
-              <a:rPr lang="en-US" dirty="0"/>
-              <a:t>On-chip cache of the key-value store is in SRAM</a:t>
-            </a:r>
-          </a:p>
-          <a:p>
-            <a:endParaRPr lang="en-US" dirty="0"/>
-          </a:p>
-          <a:p>
-            <a:r>
-              <a:rPr lang="en-US" dirty="0"/>
-              <a:t>Off-chip backing store is in DRAM</a:t>
-            </a:r>
-          </a:p>
-          <a:p>
-            <a:endParaRPr lang="en-US" dirty="0"/>
-          </a:p>
-          <a:p>
-            <a:r>
-              <a:rPr lang="en-US" dirty="0"/>
-              <a:t>But: cache misses lead to router pipeline stalls and non-determinism</a:t>
-            </a:r>
-          </a:p>
-          <a:p>
             <a:endParaRPr lang="en-US" dirty="0"/>
           </a:p>
         </p:txBody>
@@ -1272,7 +1277,7 @@
           <a:p>
             <a:fld id="{33793ACE-A489-1C41-B163-D1FF0130F898}" type="slidenum">
               <a:rPr lang="en-US" smtClean="0"/>
-              <a:t>22</a:t>
+              <a:t>20</a:t>
             </a:fld>
             <a:endParaRPr lang="en-US"/>
           </a:p>
@@ -1281,7 +1286,7 @@
     </p:spTree>
     <p:extLst>
       <p:ext uri="{BB962C8B-B14F-4D97-AF65-F5344CB8AC3E}">
-        <p14:creationId xmlns:p14="http://schemas.microsoft.com/office/powerpoint/2010/main" val="952353752"/>
+        <p14:creationId xmlns:p14="http://schemas.microsoft.com/office/powerpoint/2010/main" val="347832182"/>
       </p:ext>
     </p:extLst>
   </p:cSld>
@@ -1335,6 +1340,30 @@
           <a:bodyPr/>
           <a:lstStyle/>
           <a:p>
+            <a:r>
+              <a:rPr lang="en-US" dirty="0"/>
+              <a:t>On-chip cache of the key-value store is in SRAM</a:t>
+            </a:r>
+          </a:p>
+          <a:p>
+            <a:endParaRPr lang="en-US" dirty="0"/>
+          </a:p>
+          <a:p>
+            <a:r>
+              <a:rPr lang="en-US" dirty="0"/>
+              <a:t>Off-chip backing store is in DRAM</a:t>
+            </a:r>
+          </a:p>
+          <a:p>
+            <a:endParaRPr lang="en-US" dirty="0"/>
+          </a:p>
+          <a:p>
+            <a:r>
+              <a:rPr lang="en-US" dirty="0"/>
+              <a:t>But: cache misses lead to router pipeline stalls and non-determinism</a:t>
+            </a:r>
+          </a:p>
+          <a:p>
             <a:endParaRPr lang="en-US" dirty="0"/>
           </a:p>
         </p:txBody>
@@ -1356,7 +1385,7 @@
           <a:p>
             <a:fld id="{33793ACE-A489-1C41-B163-D1FF0130F898}" type="slidenum">
               <a:rPr lang="en-US" smtClean="0"/>
-              <a:t>23</a:t>
+              <a:t>22</a:t>
             </a:fld>
             <a:endParaRPr lang="en-US"/>
           </a:p>
@@ -1365,7 +1394,7 @@
     </p:spTree>
     <p:extLst>
       <p:ext uri="{BB962C8B-B14F-4D97-AF65-F5344CB8AC3E}">
-        <p14:creationId xmlns:p14="http://schemas.microsoft.com/office/powerpoint/2010/main" val="522733436"/>
+        <p14:creationId xmlns:p14="http://schemas.microsoft.com/office/powerpoint/2010/main" val="952353752"/>
       </p:ext>
     </p:extLst>
   </p:cSld>
@@ -1440,7 +1469,7 @@
           <a:p>
             <a:fld id="{33793ACE-A489-1C41-B163-D1FF0130F898}" type="slidenum">
               <a:rPr lang="en-US" smtClean="0"/>
-              <a:t>24</a:t>
+              <a:t>23</a:t>
             </a:fld>
             <a:endParaRPr lang="en-US"/>
           </a:p>
@@ -1449,7 +1478,7 @@
     </p:spTree>
     <p:extLst>
       <p:ext uri="{BB962C8B-B14F-4D97-AF65-F5344CB8AC3E}">
-        <p14:creationId xmlns:p14="http://schemas.microsoft.com/office/powerpoint/2010/main" val="800855353"/>
+        <p14:creationId xmlns:p14="http://schemas.microsoft.com/office/powerpoint/2010/main" val="522733436"/>
       </p:ext>
     </p:extLst>
   </p:cSld>
@@ -1503,7 +1532,37 @@
           <a:bodyPr/>
           <a:lstStyle/>
           <a:p>
+            <a:r>
+              <a:rPr lang="en-US" dirty="0"/>
+              <a:t>So what might be an example of a performance monitoring question? One example is a microburst, which is common in many production networks. A microburst is a situation in which you occasionally experience latency spikes in the network. This might be for any number of reasons, but one common reason is that some switch in a network is occasionally seeing bursts of traffic from an ill-behaved flow.</a:t>
+            </a:r>
+          </a:p>
+          <a:p>
             <a:endParaRPr lang="en-US" dirty="0"/>
+          </a:p>
+          <a:p>
+            <a:r>
+              <a:rPr lang="en-US" dirty="0"/>
+              <a:t>When you see this problem, you want to localize which switch queue is contributing to the high latency, and what traffic is filling up the queue. There are a few ways to tackle this problem, none of which are completely satisfactory.</a:t>
+            </a:r>
+          </a:p>
+          <a:p>
+            <a:endParaRPr lang="en-US" dirty="0"/>
+          </a:p>
+          <a:p>
+            <a:r>
+              <a:rPr lang="en-US" dirty="0"/>
+              <a:t>You can send end-to-end probes, but that only tells you that the end-to-end latency is high. It doesn’t tell you where the latency is building up. You can sample the queue’s latency or packets, but then you need to decide what the sampling frequency is. You can use counters and approximate data structures like sketches, but they are tuned for volume statistics like link utilization and number of packets from a specific flow. They don’t effectively generalize beyond such statistics.</a:t>
+            </a:r>
+          </a:p>
+          <a:p>
+            <a:endParaRPr lang="en-US" dirty="0"/>
+          </a:p>
+          <a:p>
+            <a:r>
+              <a:rPr lang="en-US" dirty="0"/>
+              <a:t>One alternative to this to mirror packets and use emerging technologies like in-band-network telemetry to piggyback queue information on the packet. The problem now is that the packets that transit the problematic queue are now scattered all over the network. They need to be collected together to determine at which switch and when queues build up. And the overhead of doing this in software is quite prohibitive.</a:t>
+            </a:r>
           </a:p>
         </p:txBody>
       </p:sp>
@@ -1608,7 +1667,7 @@
           <a:p>
             <a:fld id="{33793ACE-A489-1C41-B163-D1FF0130F898}" type="slidenum">
               <a:rPr lang="en-US" smtClean="0"/>
-              <a:t>25</a:t>
+              <a:t>24</a:t>
             </a:fld>
             <a:endParaRPr lang="en-US"/>
           </a:p>
@@ -1617,7 +1676,7 @@
     </p:spTree>
     <p:extLst>
       <p:ext uri="{BB962C8B-B14F-4D97-AF65-F5344CB8AC3E}">
-        <p14:creationId xmlns:p14="http://schemas.microsoft.com/office/powerpoint/2010/main" val="1947867185"/>
+        <p14:creationId xmlns:p14="http://schemas.microsoft.com/office/powerpoint/2010/main" val="800855353"/>
       </p:ext>
     </p:extLst>
   </p:cSld>
@@ -1671,10 +1730,7 @@
           <a:bodyPr/>
           <a:lstStyle/>
           <a:p>
-            <a:r>
-              <a:rPr lang="en-US" dirty="0"/>
-              <a:t>Stress that DRAM is built for the average case.</a:t>
-            </a:r>
+            <a:endParaRPr lang="en-US" dirty="0"/>
           </a:p>
         </p:txBody>
       </p:sp>
@@ -1695,7 +1751,7 @@
           <a:p>
             <a:fld id="{33793ACE-A489-1C41-B163-D1FF0130F898}" type="slidenum">
               <a:rPr lang="en-US" smtClean="0"/>
-              <a:t>26</a:t>
+              <a:t>25</a:t>
             </a:fld>
             <a:endParaRPr lang="en-US"/>
           </a:p>
@@ -1704,7 +1760,7 @@
     </p:spTree>
     <p:extLst>
       <p:ext uri="{BB962C8B-B14F-4D97-AF65-F5344CB8AC3E}">
-        <p14:creationId xmlns:p14="http://schemas.microsoft.com/office/powerpoint/2010/main" val="990843651"/>
+        <p14:creationId xmlns:p14="http://schemas.microsoft.com/office/powerpoint/2010/main" val="1947867185"/>
       </p:ext>
     </p:extLst>
   </p:cSld>
@@ -1758,7 +1814,10 @@
           <a:bodyPr/>
           <a:lstStyle/>
           <a:p>
-            <a:endParaRPr lang="en-US" dirty="0"/>
+            <a:r>
+              <a:rPr lang="en-US" dirty="0"/>
+              <a:t>Stress that DRAM is built for the average case.</a:t>
+            </a:r>
           </a:p>
         </p:txBody>
       </p:sp>
@@ -1779,7 +1838,7 @@
           <a:p>
             <a:fld id="{33793ACE-A489-1C41-B163-D1FF0130F898}" type="slidenum">
               <a:rPr lang="en-US" smtClean="0"/>
-              <a:t>28</a:t>
+              <a:t>26</a:t>
             </a:fld>
             <a:endParaRPr lang="en-US"/>
           </a:p>
@@ -1788,7 +1847,7 @@
     </p:spTree>
     <p:extLst>
       <p:ext uri="{BB962C8B-B14F-4D97-AF65-F5344CB8AC3E}">
-        <p14:creationId xmlns:p14="http://schemas.microsoft.com/office/powerpoint/2010/main" val="900537696"/>
+        <p14:creationId xmlns:p14="http://schemas.microsoft.com/office/powerpoint/2010/main" val="990843651"/>
       </p:ext>
     </p:extLst>
   </p:cSld>
@@ -1863,7 +1922,7 @@
           <a:p>
             <a:fld id="{33793ACE-A489-1C41-B163-D1FF0130F898}" type="slidenum">
               <a:rPr lang="en-US" smtClean="0"/>
-              <a:t>29</a:t>
+              <a:t>28</a:t>
             </a:fld>
             <a:endParaRPr lang="en-US"/>
           </a:p>
@@ -1872,7 +1931,7 @@
     </p:spTree>
     <p:extLst>
       <p:ext uri="{BB962C8B-B14F-4D97-AF65-F5344CB8AC3E}">
-        <p14:creationId xmlns:p14="http://schemas.microsoft.com/office/powerpoint/2010/main" val="3327761693"/>
+        <p14:creationId xmlns:p14="http://schemas.microsoft.com/office/powerpoint/2010/main" val="900537696"/>
       </p:ext>
     </p:extLst>
   </p:cSld>
@@ -1947,7 +2006,7 @@
           <a:p>
             <a:fld id="{33793ACE-A489-1C41-B163-D1FF0130F898}" type="slidenum">
               <a:rPr lang="en-US" smtClean="0"/>
-              <a:t>30</a:t>
+              <a:t>29</a:t>
             </a:fld>
             <a:endParaRPr lang="en-US"/>
           </a:p>
@@ -1956,7 +2015,7 @@
     </p:spTree>
     <p:extLst>
       <p:ext uri="{BB962C8B-B14F-4D97-AF65-F5344CB8AC3E}">
-        <p14:creationId xmlns:p14="http://schemas.microsoft.com/office/powerpoint/2010/main" val="1966495659"/>
+        <p14:creationId xmlns:p14="http://schemas.microsoft.com/office/powerpoint/2010/main" val="3327761693"/>
       </p:ext>
     </p:extLst>
   </p:cSld>
@@ -2031,7 +2090,7 @@
           <a:p>
             <a:fld id="{33793ACE-A489-1C41-B163-D1FF0130F898}" type="slidenum">
               <a:rPr lang="en-US" smtClean="0"/>
-              <a:t>31</a:t>
+              <a:t>30</a:t>
             </a:fld>
             <a:endParaRPr lang="en-US"/>
           </a:p>
@@ -2040,7 +2099,7 @@
     </p:spTree>
     <p:extLst>
       <p:ext uri="{BB962C8B-B14F-4D97-AF65-F5344CB8AC3E}">
-        <p14:creationId xmlns:p14="http://schemas.microsoft.com/office/powerpoint/2010/main" val="242796124"/>
+        <p14:creationId xmlns:p14="http://schemas.microsoft.com/office/powerpoint/2010/main" val="1966495659"/>
       </p:ext>
     </p:extLst>
   </p:cSld>
@@ -2115,7 +2174,7 @@
           <a:p>
             <a:fld id="{33793ACE-A489-1C41-B163-D1FF0130F898}" type="slidenum">
               <a:rPr lang="en-US" smtClean="0"/>
-              <a:t>32</a:t>
+              <a:t>31</a:t>
             </a:fld>
             <a:endParaRPr lang="en-US"/>
           </a:p>
@@ -2124,7 +2183,7 @@
     </p:spTree>
     <p:extLst>
       <p:ext uri="{BB962C8B-B14F-4D97-AF65-F5344CB8AC3E}">
-        <p14:creationId xmlns:p14="http://schemas.microsoft.com/office/powerpoint/2010/main" val="1397397987"/>
+        <p14:creationId xmlns:p14="http://schemas.microsoft.com/office/powerpoint/2010/main" val="242796124"/>
       </p:ext>
     </p:extLst>
   </p:cSld>
@@ -2199,7 +2258,7 @@
           <a:p>
             <a:fld id="{33793ACE-A489-1C41-B163-D1FF0130F898}" type="slidenum">
               <a:rPr lang="en-US" smtClean="0"/>
-              <a:t>33</a:t>
+              <a:t>32</a:t>
             </a:fld>
             <a:endParaRPr lang="en-US"/>
           </a:p>
@@ -2208,7 +2267,7 @@
     </p:spTree>
     <p:extLst>
       <p:ext uri="{BB962C8B-B14F-4D97-AF65-F5344CB8AC3E}">
-        <p14:creationId xmlns:p14="http://schemas.microsoft.com/office/powerpoint/2010/main" val="4107288094"/>
+        <p14:creationId xmlns:p14="http://schemas.microsoft.com/office/powerpoint/2010/main" val="1397397987"/>
       </p:ext>
     </p:extLst>
   </p:cSld>
@@ -2283,7 +2342,7 @@
           <a:p>
             <a:fld id="{33793ACE-A489-1C41-B163-D1FF0130F898}" type="slidenum">
               <a:rPr lang="en-US" smtClean="0"/>
-              <a:t>34</a:t>
+              <a:t>33</a:t>
             </a:fld>
             <a:endParaRPr lang="en-US"/>
           </a:p>
@@ -2292,7 +2351,7 @@
     </p:spTree>
     <p:extLst>
       <p:ext uri="{BB962C8B-B14F-4D97-AF65-F5344CB8AC3E}">
-        <p14:creationId xmlns:p14="http://schemas.microsoft.com/office/powerpoint/2010/main" val="343367192"/>
+        <p14:creationId xmlns:p14="http://schemas.microsoft.com/office/powerpoint/2010/main" val="4107288094"/>
       </p:ext>
     </p:extLst>
   </p:cSld>
@@ -2367,7 +2426,7 @@
           <a:p>
             <a:fld id="{33793ACE-A489-1C41-B163-D1FF0130F898}" type="slidenum">
               <a:rPr lang="en-US" smtClean="0"/>
-              <a:t>35</a:t>
+              <a:t>34</a:t>
             </a:fld>
             <a:endParaRPr lang="en-US"/>
           </a:p>
@@ -2376,7 +2435,7 @@
     </p:spTree>
     <p:extLst>
       <p:ext uri="{BB962C8B-B14F-4D97-AF65-F5344CB8AC3E}">
-        <p14:creationId xmlns:p14="http://schemas.microsoft.com/office/powerpoint/2010/main" val="1604544374"/>
+        <p14:creationId xmlns:p14="http://schemas.microsoft.com/office/powerpoint/2010/main" val="343367192"/>
       </p:ext>
     </p:extLst>
   </p:cSld>
@@ -2430,7 +2489,10 @@
           <a:bodyPr/>
           <a:lstStyle/>
           <a:p>
-            <a:endParaRPr lang="en-US" dirty="0"/>
+            <a:r>
+              <a:rPr lang="en-US" dirty="0"/>
+              <a:t>Our focus in this talk will be on seeing if we can use switches as first-class citizens in performance monitoring by augmenting them with a small set of measurement primitives to enable programmable network monitoring. You can think of this as designing a hardware instruction set and a software programming language for network performance monitoring on high-speed switches.</a:t>
+            </a:r>
           </a:p>
         </p:txBody>
       </p:sp>
@@ -2451,7 +2513,7 @@
           <a:p>
             <a:fld id="{33793ACE-A489-1C41-B163-D1FF0130F898}" type="slidenum">
               <a:rPr lang="en-US" smtClean="0"/>
-              <a:t>4</a:t>
+              <a:t>3</a:t>
             </a:fld>
             <a:endParaRPr lang="en-US"/>
           </a:p>
@@ -2460,7 +2522,7 @@
     </p:spTree>
     <p:extLst>
       <p:ext uri="{BB962C8B-B14F-4D97-AF65-F5344CB8AC3E}">
-        <p14:creationId xmlns:p14="http://schemas.microsoft.com/office/powerpoint/2010/main" val="1950720462"/>
+        <p14:creationId xmlns:p14="http://schemas.microsoft.com/office/powerpoint/2010/main" val="698849041"/>
       </p:ext>
     </p:extLst>
   </p:cSld>
@@ -2535,7 +2597,7 @@
           <a:p>
             <a:fld id="{33793ACE-A489-1C41-B163-D1FF0130F898}" type="slidenum">
               <a:rPr lang="en-US" smtClean="0"/>
-              <a:t>36</a:t>
+              <a:t>35</a:t>
             </a:fld>
             <a:endParaRPr lang="en-US"/>
           </a:p>
@@ -2544,7 +2606,7 @@
     </p:spTree>
     <p:extLst>
       <p:ext uri="{BB962C8B-B14F-4D97-AF65-F5344CB8AC3E}">
-        <p14:creationId xmlns:p14="http://schemas.microsoft.com/office/powerpoint/2010/main" val="2674820201"/>
+        <p14:creationId xmlns:p14="http://schemas.microsoft.com/office/powerpoint/2010/main" val="1604544374"/>
       </p:ext>
     </p:extLst>
   </p:cSld>
@@ -2598,10 +2660,7 @@
           <a:bodyPr/>
           <a:lstStyle/>
           <a:p>
-            <a:r>
-              <a:rPr lang="en-US" dirty="0"/>
-              <a:t>Say that the more formal result is in the paper.</a:t>
-            </a:r>
+            <a:endParaRPr lang="en-US" dirty="0"/>
           </a:p>
         </p:txBody>
       </p:sp>
@@ -2622,7 +2681,7 @@
           <a:p>
             <a:fld id="{33793ACE-A489-1C41-B163-D1FF0130F898}" type="slidenum">
               <a:rPr lang="en-US" smtClean="0"/>
-              <a:t>37</a:t>
+              <a:t>36</a:t>
             </a:fld>
             <a:endParaRPr lang="en-US"/>
           </a:p>
@@ -2631,7 +2690,7 @@
     </p:spTree>
     <p:extLst>
       <p:ext uri="{BB962C8B-B14F-4D97-AF65-F5344CB8AC3E}">
-        <p14:creationId xmlns:p14="http://schemas.microsoft.com/office/powerpoint/2010/main" val="1598300738"/>
+        <p14:creationId xmlns:p14="http://schemas.microsoft.com/office/powerpoint/2010/main" val="2674820201"/>
       </p:ext>
     </p:extLst>
   </p:cSld>
@@ -2685,7 +2744,10 @@
           <a:bodyPr/>
           <a:lstStyle/>
           <a:p>
-            <a:endParaRPr lang="en-US" baseline="0" dirty="0"/>
+            <a:r>
+              <a:rPr lang="en-US" dirty="0"/>
+              <a:t>Say that the more formal result is in the paper.</a:t>
+            </a:r>
           </a:p>
         </p:txBody>
       </p:sp>
@@ -2706,7 +2768,7 @@
           <a:p>
             <a:fld id="{33793ACE-A489-1C41-B163-D1FF0130F898}" type="slidenum">
               <a:rPr lang="en-US" smtClean="0"/>
-              <a:t>38</a:t>
+              <a:t>37</a:t>
             </a:fld>
             <a:endParaRPr lang="en-US"/>
           </a:p>
@@ -2715,7 +2777,7 @@
     </p:spTree>
     <p:extLst>
       <p:ext uri="{BB962C8B-B14F-4D97-AF65-F5344CB8AC3E}">
-        <p14:creationId xmlns:p14="http://schemas.microsoft.com/office/powerpoint/2010/main" val="1247180721"/>
+        <p14:creationId xmlns:p14="http://schemas.microsoft.com/office/powerpoint/2010/main" val="1598300738"/>
       </p:ext>
     </p:extLst>
   </p:cSld>
@@ -2769,7 +2831,7 @@
           <a:bodyPr/>
           <a:lstStyle/>
           <a:p>
-            <a:endParaRPr lang="en-US" dirty="0"/>
+            <a:endParaRPr lang="en-US" baseline="0" dirty="0"/>
           </a:p>
         </p:txBody>
       </p:sp>
@@ -2788,9 +2850,9 @@
           <a:bodyPr/>
           <a:lstStyle/>
           <a:p>
-            <a:fld id="{16B09458-7AEF-4AD3-A567-0F11380064BE}" type="slidenum">
+            <a:fld id="{33793ACE-A489-1C41-B163-D1FF0130F898}" type="slidenum">
               <a:rPr lang="en-US" smtClean="0"/>
-              <a:t>39</a:t>
+              <a:t>38</a:t>
             </a:fld>
             <a:endParaRPr lang="en-US"/>
           </a:p>
@@ -2799,7 +2861,7 @@
     </p:spTree>
     <p:extLst>
       <p:ext uri="{BB962C8B-B14F-4D97-AF65-F5344CB8AC3E}">
-        <p14:creationId xmlns:p14="http://schemas.microsoft.com/office/powerpoint/2010/main" val="1026201290"/>
+        <p14:creationId xmlns:p14="http://schemas.microsoft.com/office/powerpoint/2010/main" val="1247180721"/>
       </p:ext>
     </p:extLst>
   </p:cSld>
@@ -2872,9 +2934,9 @@
           <a:bodyPr/>
           <a:lstStyle/>
           <a:p>
-            <a:fld id="{33793ACE-A489-1C41-B163-D1FF0130F898}" type="slidenum">
+            <a:fld id="{16B09458-7AEF-4AD3-A567-0F11380064BE}" type="slidenum">
               <a:rPr lang="en-US" smtClean="0"/>
-              <a:t>41</a:t>
+              <a:t>39</a:t>
             </a:fld>
             <a:endParaRPr lang="en-US"/>
           </a:p>
@@ -2883,7 +2945,7 @@
     </p:spTree>
     <p:extLst>
       <p:ext uri="{BB962C8B-B14F-4D97-AF65-F5344CB8AC3E}">
-        <p14:creationId xmlns:p14="http://schemas.microsoft.com/office/powerpoint/2010/main" val="715696249"/>
+        <p14:creationId xmlns:p14="http://schemas.microsoft.com/office/powerpoint/2010/main" val="1026201290"/>
       </p:ext>
     </p:extLst>
   </p:cSld>
@@ -2958,7 +3020,7 @@
           <a:p>
             <a:fld id="{33793ACE-A489-1C41-B163-D1FF0130F898}" type="slidenum">
               <a:rPr lang="en-US" smtClean="0"/>
-              <a:t>42</a:t>
+              <a:t>41</a:t>
             </a:fld>
             <a:endParaRPr lang="en-US"/>
           </a:p>
@@ -2967,7 +3029,7 @@
     </p:spTree>
     <p:extLst>
       <p:ext uri="{BB962C8B-B14F-4D97-AF65-F5344CB8AC3E}">
-        <p14:creationId xmlns:p14="http://schemas.microsoft.com/office/powerpoint/2010/main" val="1582905122"/>
+        <p14:creationId xmlns:p14="http://schemas.microsoft.com/office/powerpoint/2010/main" val="715696249"/>
       </p:ext>
     </p:extLst>
   </p:cSld>
@@ -3042,7 +3104,7 @@
           <a:p>
             <a:fld id="{33793ACE-A489-1C41-B163-D1FF0130F898}" type="slidenum">
               <a:rPr lang="en-US" smtClean="0"/>
-              <a:t>43</a:t>
+              <a:t>42</a:t>
             </a:fld>
             <a:endParaRPr lang="en-US"/>
           </a:p>
@@ -3051,7 +3113,7 @@
     </p:spTree>
     <p:extLst>
       <p:ext uri="{BB962C8B-B14F-4D97-AF65-F5344CB8AC3E}">
-        <p14:creationId xmlns:p14="http://schemas.microsoft.com/office/powerpoint/2010/main" val="996105604"/>
+        <p14:creationId xmlns:p14="http://schemas.microsoft.com/office/powerpoint/2010/main" val="1582905122"/>
       </p:ext>
     </p:extLst>
   </p:cSld>
@@ -3126,6 +3188,90 @@
           <a:p>
             <a:fld id="{33793ACE-A489-1C41-B163-D1FF0130F898}" type="slidenum">
               <a:rPr lang="en-US" smtClean="0"/>
+              <a:t>43</a:t>
+            </a:fld>
+            <a:endParaRPr lang="en-US"/>
+          </a:p>
+        </p:txBody>
+      </p:sp>
+    </p:spTree>
+    <p:extLst>
+      <p:ext uri="{BB962C8B-B14F-4D97-AF65-F5344CB8AC3E}">
+        <p14:creationId xmlns:p14="http://schemas.microsoft.com/office/powerpoint/2010/main" val="996105604"/>
+      </p:ext>
+    </p:extLst>
+  </p:cSld>
+  <p:clrMapOvr>
+    <a:masterClrMapping/>
+  </p:clrMapOvr>
+</p:notes>
+</file>
+
+<file path=ppt/notesSlides/notesSlide38.xml><?xml version="1.0" encoding="utf-8"?>
+<p:notes xmlns:a="http://schemas.openxmlformats.org/drawingml/2006/main" xmlns:r="http://schemas.openxmlformats.org/officeDocument/2006/relationships" xmlns:p="http://schemas.openxmlformats.org/presentationml/2006/main">
+  <p:cSld>
+    <p:spTree>
+      <p:nvGrpSpPr>
+        <p:cNvPr id="1" name=""/>
+        <p:cNvGrpSpPr/>
+        <p:nvPr/>
+      </p:nvGrpSpPr>
+      <p:grpSpPr>
+        <a:xfrm>
+          <a:off x="0" y="0"/>
+          <a:ext cx="0" cy="0"/>
+          <a:chOff x="0" y="0"/>
+          <a:chExt cx="0" cy="0"/>
+        </a:xfrm>
+      </p:grpSpPr>
+      <p:sp>
+        <p:nvSpPr>
+          <p:cNvPr id="2" name="Slide Image Placeholder 1"/>
+          <p:cNvSpPr>
+            <a:spLocks noGrp="1" noRot="1" noChangeAspect="1"/>
+          </p:cNvSpPr>
+          <p:nvPr>
+            <p:ph type="sldImg"/>
+          </p:nvPr>
+        </p:nvSpPr>
+        <p:spPr/>
+      </p:sp>
+      <p:sp>
+        <p:nvSpPr>
+          <p:cNvPr id="3" name="Notes Placeholder 2"/>
+          <p:cNvSpPr>
+            <a:spLocks noGrp="1"/>
+          </p:cNvSpPr>
+          <p:nvPr>
+            <p:ph type="body" idx="1"/>
+          </p:nvPr>
+        </p:nvSpPr>
+        <p:spPr/>
+        <p:txBody>
+          <a:bodyPr/>
+          <a:lstStyle/>
+          <a:p>
+            <a:endParaRPr lang="en-US" dirty="0"/>
+          </a:p>
+        </p:txBody>
+      </p:sp>
+      <p:sp>
+        <p:nvSpPr>
+          <p:cNvPr id="4" name="Slide Number Placeholder 3"/>
+          <p:cNvSpPr>
+            <a:spLocks noGrp="1"/>
+          </p:cNvSpPr>
+          <p:nvPr>
+            <p:ph type="sldNum" sz="quarter" idx="10"/>
+          </p:nvPr>
+        </p:nvSpPr>
+        <p:spPr/>
+        <p:txBody>
+          <a:bodyPr/>
+          <a:lstStyle/>
+          <a:p>
+            <a:fld id="{33793ACE-A489-1C41-B163-D1FF0130F898}" type="slidenum">
+              <a:rPr lang="en-US" smtClean="0"/>
               <a:t>46</a:t>
             </a:fld>
             <a:endParaRPr lang="en-US"/>
@@ -3145,7 +3291,7 @@
 </p:notes>
 </file>
 
-<file path=ppt/notesSlides/notesSlide38.xml><?xml version="1.0" encoding="utf-8"?>
+<file path=ppt/notesSlides/notesSlide39.xml><?xml version="1.0" encoding="utf-8"?>
 <p:notes xmlns:a="http://schemas.openxmlformats.org/drawingml/2006/main" xmlns:r="http://schemas.openxmlformats.org/officeDocument/2006/relationships" xmlns:p="http://schemas.openxmlformats.org/presentationml/2006/main">
   <p:cSld>
     <p:spTree>
@@ -3274,7 +3420,10 @@
           <a:bodyPr/>
           <a:lstStyle/>
           <a:p>
-            <a:endParaRPr lang="en-US" dirty="0"/>
+            <a:r>
+              <a:rPr lang="en-US" dirty="0"/>
+              <a:t>But just to reiterate, why would you want to monitor from switches. Here are a couple of reasons. In many cases the problem is localized to a single switch (or a small set of switches), and instrumenting those directly is more convenient than having the data be distributed across end points. The alternative of sending all data to an end point for external processing consumes too much network and compute capacity. So the concrete technical question we try to answer is whether we can perform filtering and aggregation on switches directly.</a:t>
+            </a:r>
           </a:p>
         </p:txBody>
       </p:sp>
@@ -3295,7 +3444,7 @@
           <a:p>
             <a:fld id="{33793ACE-A489-1C41-B163-D1FF0130F898}" type="slidenum">
               <a:rPr lang="en-US" smtClean="0"/>
-              <a:t>5</a:t>
+              <a:t>4</a:t>
             </a:fld>
             <a:endParaRPr lang="en-US"/>
           </a:p>
@@ -3304,7 +3453,7 @@
     </p:spTree>
     <p:extLst>
       <p:ext uri="{BB962C8B-B14F-4D97-AF65-F5344CB8AC3E}">
-        <p14:creationId xmlns:p14="http://schemas.microsoft.com/office/powerpoint/2010/main" val="1638931893"/>
+        <p14:creationId xmlns:p14="http://schemas.microsoft.com/office/powerpoint/2010/main" val="1950720462"/>
       </p:ext>
     </p:extLst>
   </p:cSld>
@@ -3358,7 +3507,10 @@
           <a:bodyPr/>
           <a:lstStyle/>
           <a:p>
-            <a:endParaRPr lang="en-US" dirty="0"/>
+            <a:r>
+              <a:rPr lang="en-US" dirty="0"/>
+              <a:t>Now, when you build an instruction set, you want it to be as general as possible. Otherwise, it ends up being overfitted in a sense to your current set of use cases, without any guarantee that it can generalize to other use cases. To avoid this, and to attempt to build somewhat future-proof hardware, we adopt a design methodology called language-directed hardware design where we start with an expressive programming language and then design hardware to efficiently support this programming language.</a:t>
+            </a:r>
           </a:p>
         </p:txBody>
       </p:sp>
@@ -3379,7 +3531,7 @@
           <a:p>
             <a:fld id="{33793ACE-A489-1C41-B163-D1FF0130F898}" type="slidenum">
               <a:rPr lang="en-US" smtClean="0"/>
-              <a:t>6</a:t>
+              <a:t>5</a:t>
             </a:fld>
             <a:endParaRPr lang="en-US"/>
           </a:p>
@@ -3388,7 +3540,7 @@
     </p:spTree>
     <p:extLst>
       <p:ext uri="{BB962C8B-B14F-4D97-AF65-F5344CB8AC3E}">
-        <p14:creationId xmlns:p14="http://schemas.microsoft.com/office/powerpoint/2010/main" val="426177400"/>
+        <p14:creationId xmlns:p14="http://schemas.microsoft.com/office/powerpoint/2010/main" val="1638931893"/>
       </p:ext>
     </p:extLst>
   </p:cSld>
@@ -3442,6 +3594,23 @@
           <a:bodyPr/>
           <a:lstStyle/>
           <a:p>
+            <a:r>
+              <a:rPr lang="en-US" dirty="0"/>
+              <a:t>In more detail, this is how our workflow looks. We start with an informal description of several performance monitoring use cases similar to our Microburst example before. We then design an expressive query language to capture all of these use cases and future unanticipated use cases that are similar to these use cases. Once we have designed this language, we use it to design switch hardware primitives as well.</a:t>
+            </a:r>
+          </a:p>
+          <a:p>
+            <a:endParaRPr lang="en-US" dirty="0"/>
+          </a:p>
+          <a:p>
+            <a:r>
+              <a:rPr lang="en-US" dirty="0"/>
+              <a:t>While this slide shows this process as mostly one directional from use cases to hardware, there is also a bit of feedback in practice. For instance, we restrict our language to what can be reasonably implemented in line-rate hardware. In particular, our language isn’t Turing complete so you can’t do everything with it that you can do with a CPU. In our minds, this was a reasonable tradeoff because that’s the price you pay for </a:t>
+            </a:r>
+            <a:r>
+              <a:rPr lang="en-US"/>
+              <a:t>high performance.</a:t>
+            </a:r>
             <a:endParaRPr lang="en-US" dirty="0"/>
           </a:p>
         </p:txBody>
@@ -3463,7 +3632,7 @@
           <a:p>
             <a:fld id="{33793ACE-A489-1C41-B163-D1FF0130F898}" type="slidenum">
               <a:rPr lang="en-US" smtClean="0"/>
-              <a:t>8</a:t>
+              <a:t>6</a:t>
             </a:fld>
             <a:endParaRPr lang="en-US"/>
           </a:p>
@@ -3472,7 +3641,7 @@
     </p:spTree>
     <p:extLst>
       <p:ext uri="{BB962C8B-B14F-4D97-AF65-F5344CB8AC3E}">
-        <p14:creationId xmlns:p14="http://schemas.microsoft.com/office/powerpoint/2010/main" val="417441199"/>
+        <p14:creationId xmlns:p14="http://schemas.microsoft.com/office/powerpoint/2010/main" val="426177400"/>
       </p:ext>
     </p:extLst>
   </p:cSld>
@@ -3547,7 +3716,7 @@
           <a:p>
             <a:fld id="{33793ACE-A489-1C41-B163-D1FF0130F898}" type="slidenum">
               <a:rPr lang="en-US" smtClean="0"/>
-              <a:t>9</a:t>
+              <a:t>8</a:t>
             </a:fld>
             <a:endParaRPr lang="en-US"/>
           </a:p>
@@ -3556,7 +3725,7 @@
     </p:spTree>
     <p:extLst>
       <p:ext uri="{BB962C8B-B14F-4D97-AF65-F5344CB8AC3E}">
-        <p14:creationId xmlns:p14="http://schemas.microsoft.com/office/powerpoint/2010/main" val="1392767371"/>
+        <p14:creationId xmlns:p14="http://schemas.microsoft.com/office/powerpoint/2010/main" val="417441199"/>
       </p:ext>
     </p:extLst>
   </p:cSld>
@@ -3631,7 +3800,7 @@
           <a:p>
             <a:fld id="{33793ACE-A489-1C41-B163-D1FF0130F898}" type="slidenum">
               <a:rPr lang="en-US" smtClean="0"/>
-              <a:t>10</a:t>
+              <a:t>9</a:t>
             </a:fld>
             <a:endParaRPr lang="en-US"/>
           </a:p>
@@ -3640,7 +3809,7 @@
     </p:spTree>
     <p:extLst>
       <p:ext uri="{BB962C8B-B14F-4D97-AF65-F5344CB8AC3E}">
-        <p14:creationId xmlns:p14="http://schemas.microsoft.com/office/powerpoint/2010/main" val="1638992475"/>
+        <p14:creationId xmlns:p14="http://schemas.microsoft.com/office/powerpoint/2010/main" val="1392767371"/>
       </p:ext>
     </p:extLst>
   </p:cSld>
@@ -3694,7 +3863,7 @@
           <a:bodyPr/>
           <a:lstStyle/>
           <a:p>
-            <a:endParaRPr lang="en-US" baseline="0" dirty="0"/>
+            <a:endParaRPr lang="en-US" dirty="0"/>
           </a:p>
         </p:txBody>
       </p:sp>
@@ -3715,7 +3884,7 @@
           <a:p>
             <a:fld id="{33793ACE-A489-1C41-B163-D1FF0130F898}" type="slidenum">
               <a:rPr lang="en-US" smtClean="0"/>
-              <a:t>11</a:t>
+              <a:t>10</a:t>
             </a:fld>
             <a:endParaRPr lang="en-US"/>
           </a:p>
@@ -3724,7 +3893,7 @@
     </p:spTree>
     <p:extLst>
       <p:ext uri="{BB962C8B-B14F-4D97-AF65-F5344CB8AC3E}">
-        <p14:creationId xmlns:p14="http://schemas.microsoft.com/office/powerpoint/2010/main" val="965527152"/>
+        <p14:creationId xmlns:p14="http://schemas.microsoft.com/office/powerpoint/2010/main" val="1638992475"/>
       </p:ext>
     </p:extLst>
   </p:cSld>
@@ -12722,7 +12891,7 @@
           <a:effectLst/>
           <a:extLst>
             <a:ext uri="{909E8E84-426E-40dd-AFC4-6F175D3DCCD1}">
-              <a14:hiddenFill xmlns="" xmlns:a14="http://schemas.microsoft.com/office/drawing/2010/main">
+              <a14:hiddenFill xmlns:a14="http://schemas.microsoft.com/office/drawing/2010/main" xmlns="">
                 <a:blipFill dpi="0" rotWithShape="0">
                   <a:blip/>
                   <a:srcRect/>
@@ -12733,7 +12902,7 @@
               </a14:hiddenFill>
             </a:ext>
             <a:ext uri="{91240B29-F687-4f45-9708-019B960494DF}">
-              <a14:hiddenLine xmlns="" xmlns:a14="http://schemas.microsoft.com/office/drawing/2010/main" w="9525">
+              <a14:hiddenLine xmlns:a14="http://schemas.microsoft.com/office/drawing/2010/main" xmlns="" w="9525">
                 <a:solidFill>
                   <a:srgbClr val="000000"/>
                 </a:solidFill>
@@ -12743,7 +12912,7 @@
               </a14:hiddenLine>
             </a:ext>
             <a:ext uri="{AF507438-7753-43e0-B8FC-AC1667EBCBE1}">
-              <a14:hiddenEffects xmlns="" xmlns:a14="http://schemas.microsoft.com/office/drawing/2010/main">
+              <a14:hiddenEffects xmlns:a14="http://schemas.microsoft.com/office/drawing/2010/main" xmlns="">
                 <a:effectLst>
                   <a:outerShdw blurRad="63500" dist="38099" dir="2700000" algn="ctr" rotWithShape="0">
                     <a:srgbClr val="000000">
@@ -12792,7 +12961,7 @@
           <a:effectLst/>
           <a:extLst>
             <a:ext uri="{909E8E84-426E-40dd-AFC4-6F175D3DCCD1}">
-              <a14:hiddenFill xmlns="" xmlns:a14="http://schemas.microsoft.com/office/drawing/2010/main">
+              <a14:hiddenFill xmlns:a14="http://schemas.microsoft.com/office/drawing/2010/main" xmlns="">
                 <a:blipFill dpi="0" rotWithShape="0">
                   <a:blip/>
                   <a:srcRect/>
@@ -12803,7 +12972,7 @@
               </a14:hiddenFill>
             </a:ext>
             <a:ext uri="{91240B29-F687-4f45-9708-019B960494DF}">
-              <a14:hiddenLine xmlns="" xmlns:a14="http://schemas.microsoft.com/office/drawing/2010/main" w="9525">
+              <a14:hiddenLine xmlns:a14="http://schemas.microsoft.com/office/drawing/2010/main" xmlns="" w="9525">
                 <a:solidFill>
                   <a:srgbClr val="000000"/>
                 </a:solidFill>
@@ -12813,7 +12982,7 @@
               </a14:hiddenLine>
             </a:ext>
             <a:ext uri="{AF507438-7753-43e0-B8FC-AC1667EBCBE1}">
-              <a14:hiddenEffects xmlns="" xmlns:a14="http://schemas.microsoft.com/office/drawing/2010/main">
+              <a14:hiddenEffects xmlns:a14="http://schemas.microsoft.com/office/drawing/2010/main" xmlns="">
                 <a:effectLst>
                   <a:outerShdw blurRad="63500" dist="38099" dir="2700000" algn="ctr" rotWithShape="0">
                     <a:srgbClr val="000000">
@@ -12948,7 +13117,7 @@
             <a:effectLst/>
             <a:extLst>
               <a:ext uri="{909E8E84-426E-40dd-AFC4-6F175D3DCCD1}">
-                <a14:hiddenFill xmlns:a14="http://schemas.microsoft.com/office/drawing/2010/main" xmlns="">
+                <a14:hiddenFill xmlns="" xmlns:a14="http://schemas.microsoft.com/office/drawing/2010/main">
                   <a:blipFill dpi="0" rotWithShape="0">
                     <a:blip/>
                     <a:srcRect/>
@@ -12959,7 +13128,7 @@
                 </a14:hiddenFill>
               </a:ext>
               <a:ext uri="{91240B29-F687-4f45-9708-019B960494DF}">
-                <a14:hiddenLine xmlns:a14="http://schemas.microsoft.com/office/drawing/2010/main" xmlns="" w="9525">
+                <a14:hiddenLine xmlns="" xmlns:a14="http://schemas.microsoft.com/office/drawing/2010/main" w="9525">
                   <a:solidFill>
                     <a:srgbClr val="000000"/>
                   </a:solidFill>
@@ -12969,7 +13138,7 @@
                 </a14:hiddenLine>
               </a:ext>
               <a:ext uri="{AF507438-7753-43e0-B8FC-AC1667EBCBE1}">
-                <a14:hiddenEffects xmlns:a14="http://schemas.microsoft.com/office/drawing/2010/main" xmlns="">
+                <a14:hiddenEffects xmlns="" xmlns:a14="http://schemas.microsoft.com/office/drawing/2010/main">
                   <a:effectLst>
                     <a:outerShdw blurRad="63500" dist="38099" dir="2700000" algn="ctr" rotWithShape="0">
                       <a:srgbClr val="000000">
@@ -13018,7 +13187,7 @@
             <a:effectLst/>
             <a:extLst>
               <a:ext uri="{909E8E84-426E-40dd-AFC4-6F175D3DCCD1}">
-                <a14:hiddenFill xmlns:a14="http://schemas.microsoft.com/office/drawing/2010/main" xmlns="">
+                <a14:hiddenFill xmlns="" xmlns:a14="http://schemas.microsoft.com/office/drawing/2010/main">
                   <a:blipFill dpi="0" rotWithShape="0">
                     <a:blip/>
                     <a:srcRect/>
@@ -13029,7 +13198,7 @@
                 </a14:hiddenFill>
               </a:ext>
               <a:ext uri="{91240B29-F687-4f45-9708-019B960494DF}">
-                <a14:hiddenLine xmlns:a14="http://schemas.microsoft.com/office/drawing/2010/main" xmlns="" w="9525">
+                <a14:hiddenLine xmlns="" xmlns:a14="http://schemas.microsoft.com/office/drawing/2010/main" w="9525">
                   <a:solidFill>
                     <a:srgbClr val="000000"/>
                   </a:solidFill>
@@ -13039,7 +13208,7 @@
                 </a14:hiddenLine>
               </a:ext>
               <a:ext uri="{AF507438-7753-43e0-B8FC-AC1667EBCBE1}">
-                <a14:hiddenEffects xmlns:a14="http://schemas.microsoft.com/office/drawing/2010/main" xmlns="">
+                <a14:hiddenEffects xmlns="" xmlns:a14="http://schemas.microsoft.com/office/drawing/2010/main">
                   <a:effectLst>
                     <a:outerShdw blurRad="63500" dist="38099" dir="2700000" algn="ctr" rotWithShape="0">
                       <a:srgbClr val="000000">
@@ -13088,7 +13257,7 @@
             <a:effectLst/>
             <a:extLst>
               <a:ext uri="{909E8E84-426E-40dd-AFC4-6F175D3DCCD1}">
-                <a14:hiddenFill xmlns:a14="http://schemas.microsoft.com/office/drawing/2010/main" xmlns="">
+                <a14:hiddenFill xmlns="" xmlns:a14="http://schemas.microsoft.com/office/drawing/2010/main">
                   <a:blipFill dpi="0" rotWithShape="0">
                     <a:blip/>
                     <a:srcRect/>
@@ -13099,7 +13268,7 @@
                 </a14:hiddenFill>
               </a:ext>
               <a:ext uri="{91240B29-F687-4f45-9708-019B960494DF}">
-                <a14:hiddenLine xmlns:a14="http://schemas.microsoft.com/office/drawing/2010/main" xmlns="" w="9525">
+                <a14:hiddenLine xmlns="" xmlns:a14="http://schemas.microsoft.com/office/drawing/2010/main" w="9525">
                   <a:solidFill>
                     <a:srgbClr val="000000"/>
                   </a:solidFill>
@@ -13109,7 +13278,7 @@
                 </a14:hiddenLine>
               </a:ext>
               <a:ext uri="{AF507438-7753-43e0-B8FC-AC1667EBCBE1}">
-                <a14:hiddenEffects xmlns:a14="http://schemas.microsoft.com/office/drawing/2010/main" xmlns="">
+                <a14:hiddenEffects xmlns="" xmlns:a14="http://schemas.microsoft.com/office/drawing/2010/main">
                   <a:effectLst>
                     <a:outerShdw blurRad="63500" dist="38099" dir="2700000" algn="ctr" rotWithShape="0">
                       <a:srgbClr val="000000">
@@ -13150,12 +13319,12 @@
             <a:effectLst/>
             <a:extLst>
               <a:ext uri="{909E8E84-426E-40dd-AFC4-6F175D3DCCD1}">
-                <a14:hiddenFill xmlns:a14="http://schemas.microsoft.com/office/drawing/2010/main" xmlns="">
+                <a14:hiddenFill xmlns="" xmlns:a14="http://schemas.microsoft.com/office/drawing/2010/main">
                   <a:noFill/>
                 </a14:hiddenFill>
               </a:ext>
               <a:ext uri="{AF507438-7753-43e0-B8FC-AC1667EBCBE1}">
-                <a14:hiddenEffects xmlns:a14="http://schemas.microsoft.com/office/drawing/2010/main" xmlns="">
+                <a14:hiddenEffects xmlns="" xmlns:a14="http://schemas.microsoft.com/office/drawing/2010/main">
                   <a:effectLst>
                     <a:outerShdw blurRad="63500" dist="38099" dir="2700000" algn="ctr" rotWithShape="0">
                       <a:srgbClr val="000000">
@@ -13208,12 +13377,12 @@
             <a:effectLst/>
             <a:extLst>
               <a:ext uri="{909E8E84-426E-40dd-AFC4-6F175D3DCCD1}">
-                <a14:hiddenFill xmlns:a14="http://schemas.microsoft.com/office/drawing/2010/main" xmlns="">
+                <a14:hiddenFill xmlns="" xmlns:a14="http://schemas.microsoft.com/office/drawing/2010/main">
                   <a:noFill/>
                 </a14:hiddenFill>
               </a:ext>
               <a:ext uri="{AF507438-7753-43e0-B8FC-AC1667EBCBE1}">
-                <a14:hiddenEffects xmlns:a14="http://schemas.microsoft.com/office/drawing/2010/main" xmlns="">
+                <a14:hiddenEffects xmlns="" xmlns:a14="http://schemas.microsoft.com/office/drawing/2010/main">
                   <a:effectLst>
                     <a:outerShdw blurRad="63500" dist="38099" dir="2700000" algn="ctr" rotWithShape="0">
                       <a:srgbClr val="000000">
@@ -13266,12 +13435,12 @@
             <a:effectLst/>
             <a:extLst>
               <a:ext uri="{909E8E84-426E-40dd-AFC4-6F175D3DCCD1}">
-                <a14:hiddenFill xmlns:a14="http://schemas.microsoft.com/office/drawing/2010/main" xmlns="">
+                <a14:hiddenFill xmlns="" xmlns:a14="http://schemas.microsoft.com/office/drawing/2010/main">
                   <a:noFill/>
                 </a14:hiddenFill>
               </a:ext>
               <a:ext uri="{AF507438-7753-43e0-B8FC-AC1667EBCBE1}">
-                <a14:hiddenEffects xmlns:a14="http://schemas.microsoft.com/office/drawing/2010/main" xmlns="">
+                <a14:hiddenEffects xmlns="" xmlns:a14="http://schemas.microsoft.com/office/drawing/2010/main">
                   <a:effectLst>
                     <a:outerShdw blurRad="63500" dist="38099" dir="2700000" algn="ctr" rotWithShape="0">
                       <a:srgbClr val="000000">
@@ -13324,12 +13493,12 @@
             <a:effectLst/>
             <a:extLst>
               <a:ext uri="{909E8E84-426E-40dd-AFC4-6F175D3DCCD1}">
-                <a14:hiddenFill xmlns:a14="http://schemas.microsoft.com/office/drawing/2010/main" xmlns="">
+                <a14:hiddenFill xmlns="" xmlns:a14="http://schemas.microsoft.com/office/drawing/2010/main">
                   <a:noFill/>
                 </a14:hiddenFill>
               </a:ext>
               <a:ext uri="{AF507438-7753-43e0-B8FC-AC1667EBCBE1}">
-                <a14:hiddenEffects xmlns:a14="http://schemas.microsoft.com/office/drawing/2010/main" xmlns="">
+                <a14:hiddenEffects xmlns="" xmlns:a14="http://schemas.microsoft.com/office/drawing/2010/main">
                   <a:effectLst>
                     <a:outerShdw blurRad="63500" dist="38099" dir="2700000" algn="ctr" rotWithShape="0">
                       <a:srgbClr val="000000">
@@ -13382,12 +13551,12 @@
             <a:effectLst/>
             <a:extLst>
               <a:ext uri="{909E8E84-426E-40dd-AFC4-6F175D3DCCD1}">
-                <a14:hiddenFill xmlns:a14="http://schemas.microsoft.com/office/drawing/2010/main" xmlns="">
+                <a14:hiddenFill xmlns="" xmlns:a14="http://schemas.microsoft.com/office/drawing/2010/main">
                   <a:noFill/>
                 </a14:hiddenFill>
               </a:ext>
               <a:ext uri="{AF507438-7753-43e0-B8FC-AC1667EBCBE1}">
-                <a14:hiddenEffects xmlns:a14="http://schemas.microsoft.com/office/drawing/2010/main" xmlns="">
+                <a14:hiddenEffects xmlns="" xmlns:a14="http://schemas.microsoft.com/office/drawing/2010/main">
                   <a:effectLst>
                     <a:outerShdw blurRad="63500" dist="38099" dir="2700000" algn="ctr" rotWithShape="0">
                       <a:srgbClr val="000000">
@@ -13440,12 +13609,12 @@
             <a:effectLst/>
             <a:extLst>
               <a:ext uri="{909E8E84-426E-40dd-AFC4-6F175D3DCCD1}">
-                <a14:hiddenFill xmlns:a14="http://schemas.microsoft.com/office/drawing/2010/main" xmlns="">
+                <a14:hiddenFill xmlns="" xmlns:a14="http://schemas.microsoft.com/office/drawing/2010/main">
                   <a:noFill/>
                 </a14:hiddenFill>
               </a:ext>
               <a:ext uri="{AF507438-7753-43e0-B8FC-AC1667EBCBE1}">
-                <a14:hiddenEffects xmlns:a14="http://schemas.microsoft.com/office/drawing/2010/main" xmlns="">
+                <a14:hiddenEffects xmlns="" xmlns:a14="http://schemas.microsoft.com/office/drawing/2010/main">
                   <a:effectLst>
                     <a:outerShdw blurRad="63500" dist="38099" dir="2700000" algn="ctr" rotWithShape="0">
                       <a:srgbClr val="000000">
@@ -13498,12 +13667,12 @@
             <a:effectLst/>
             <a:extLst>
               <a:ext uri="{909E8E84-426E-40dd-AFC4-6F175D3DCCD1}">
-                <a14:hiddenFill xmlns:a14="http://schemas.microsoft.com/office/drawing/2010/main" xmlns="">
+                <a14:hiddenFill xmlns="" xmlns:a14="http://schemas.microsoft.com/office/drawing/2010/main">
                   <a:noFill/>
                 </a14:hiddenFill>
               </a:ext>
               <a:ext uri="{AF507438-7753-43e0-B8FC-AC1667EBCBE1}">
-                <a14:hiddenEffects xmlns:a14="http://schemas.microsoft.com/office/drawing/2010/main" xmlns="">
+                <a14:hiddenEffects xmlns="" xmlns:a14="http://schemas.microsoft.com/office/drawing/2010/main">
                   <a:effectLst>
                     <a:outerShdw blurRad="63500" dist="38099" dir="2700000" algn="ctr" rotWithShape="0">
                       <a:srgbClr val="000000">
@@ -13556,12 +13725,12 @@
             <a:effectLst/>
             <a:extLst>
               <a:ext uri="{909E8E84-426E-40dd-AFC4-6F175D3DCCD1}">
-                <a14:hiddenFill xmlns:a14="http://schemas.microsoft.com/office/drawing/2010/main" xmlns="">
+                <a14:hiddenFill xmlns="" xmlns:a14="http://schemas.microsoft.com/office/drawing/2010/main">
                   <a:noFill/>
                 </a14:hiddenFill>
               </a:ext>
               <a:ext uri="{AF507438-7753-43e0-B8FC-AC1667EBCBE1}">
-                <a14:hiddenEffects xmlns:a14="http://schemas.microsoft.com/office/drawing/2010/main" xmlns="">
+                <a14:hiddenEffects xmlns="" xmlns:a14="http://schemas.microsoft.com/office/drawing/2010/main">
                   <a:effectLst>
                     <a:outerShdw blurRad="63500" dist="38099" dir="2700000" algn="ctr" rotWithShape="0">
                       <a:srgbClr val="000000">
@@ -13614,12 +13783,12 @@
             <a:effectLst/>
             <a:extLst>
               <a:ext uri="{909E8E84-426E-40dd-AFC4-6F175D3DCCD1}">
-                <a14:hiddenFill xmlns:a14="http://schemas.microsoft.com/office/drawing/2010/main" xmlns="">
+                <a14:hiddenFill xmlns="" xmlns:a14="http://schemas.microsoft.com/office/drawing/2010/main">
                   <a:noFill/>
                 </a14:hiddenFill>
               </a:ext>
               <a:ext uri="{AF507438-7753-43e0-B8FC-AC1667EBCBE1}">
-                <a14:hiddenEffects xmlns:a14="http://schemas.microsoft.com/office/drawing/2010/main" xmlns="">
+                <a14:hiddenEffects xmlns="" xmlns:a14="http://schemas.microsoft.com/office/drawing/2010/main">
                   <a:effectLst>
                     <a:outerShdw blurRad="63500" dist="38099" dir="2700000" algn="ctr" rotWithShape="0">
                       <a:srgbClr val="000000">
@@ -13672,12 +13841,12 @@
             <a:effectLst/>
             <a:extLst>
               <a:ext uri="{909E8E84-426E-40dd-AFC4-6F175D3DCCD1}">
-                <a14:hiddenFill xmlns:a14="http://schemas.microsoft.com/office/drawing/2010/main" xmlns="">
+                <a14:hiddenFill xmlns="" xmlns:a14="http://schemas.microsoft.com/office/drawing/2010/main">
                   <a:noFill/>
                 </a14:hiddenFill>
               </a:ext>
               <a:ext uri="{AF507438-7753-43e0-B8FC-AC1667EBCBE1}">
-                <a14:hiddenEffects xmlns:a14="http://schemas.microsoft.com/office/drawing/2010/main" xmlns="">
+                <a14:hiddenEffects xmlns="" xmlns:a14="http://schemas.microsoft.com/office/drawing/2010/main">
                   <a:effectLst>
                     <a:outerShdw blurRad="63500" dist="38099" dir="2700000" algn="ctr" rotWithShape="0">
                       <a:srgbClr val="000000">
@@ -13738,7 +13907,7 @@
             <a:effectLst/>
             <a:extLst>
               <a:ext uri="{909E8E84-426E-40dd-AFC4-6F175D3DCCD1}">
-                <a14:hiddenFill xmlns:a14="http://schemas.microsoft.com/office/drawing/2010/main" xmlns="">
+                <a14:hiddenFill xmlns="" xmlns:a14="http://schemas.microsoft.com/office/drawing/2010/main">
                   <a:blipFill dpi="0" rotWithShape="0">
                     <a:blip/>
                     <a:srcRect/>
@@ -13749,7 +13918,7 @@
                 </a14:hiddenFill>
               </a:ext>
               <a:ext uri="{91240B29-F687-4f45-9708-019B960494DF}">
-                <a14:hiddenLine xmlns:a14="http://schemas.microsoft.com/office/drawing/2010/main" xmlns="" w="9525">
+                <a14:hiddenLine xmlns="" xmlns:a14="http://schemas.microsoft.com/office/drawing/2010/main" w="9525">
                   <a:solidFill>
                     <a:srgbClr val="000000"/>
                   </a:solidFill>
@@ -13759,7 +13928,7 @@
                 </a14:hiddenLine>
               </a:ext>
               <a:ext uri="{AF507438-7753-43e0-B8FC-AC1667EBCBE1}">
-                <a14:hiddenEffects xmlns:a14="http://schemas.microsoft.com/office/drawing/2010/main" xmlns="">
+                <a14:hiddenEffects xmlns="" xmlns:a14="http://schemas.microsoft.com/office/drawing/2010/main">
                   <a:effectLst>
                     <a:outerShdw blurRad="63500" dist="38099" dir="2700000" algn="ctr" rotWithShape="0">
                       <a:srgbClr val="000000">
@@ -13808,7 +13977,7 @@
             <a:effectLst/>
             <a:extLst>
               <a:ext uri="{909E8E84-426E-40dd-AFC4-6F175D3DCCD1}">
-                <a14:hiddenFill xmlns:a14="http://schemas.microsoft.com/office/drawing/2010/main" xmlns="">
+                <a14:hiddenFill xmlns="" xmlns:a14="http://schemas.microsoft.com/office/drawing/2010/main">
                   <a:blipFill dpi="0" rotWithShape="0">
                     <a:blip/>
                     <a:srcRect/>
@@ -13819,7 +13988,7 @@
                 </a14:hiddenFill>
               </a:ext>
               <a:ext uri="{91240B29-F687-4f45-9708-019B960494DF}">
-                <a14:hiddenLine xmlns:a14="http://schemas.microsoft.com/office/drawing/2010/main" xmlns="" w="9525">
+                <a14:hiddenLine xmlns="" xmlns:a14="http://schemas.microsoft.com/office/drawing/2010/main" w="9525">
                   <a:solidFill>
                     <a:srgbClr val="000000"/>
                   </a:solidFill>
@@ -13829,7 +13998,7 @@
                 </a14:hiddenLine>
               </a:ext>
               <a:ext uri="{AF507438-7753-43e0-B8FC-AC1667EBCBE1}">
-                <a14:hiddenEffects xmlns:a14="http://schemas.microsoft.com/office/drawing/2010/main" xmlns="">
+                <a14:hiddenEffects xmlns="" xmlns:a14="http://schemas.microsoft.com/office/drawing/2010/main">
                   <a:effectLst>
                     <a:outerShdw blurRad="63500" dist="38099" dir="2700000" algn="ctr" rotWithShape="0">
                       <a:srgbClr val="000000">
@@ -13878,7 +14047,7 @@
             <a:effectLst/>
             <a:extLst>
               <a:ext uri="{909E8E84-426E-40dd-AFC4-6F175D3DCCD1}">
-                <a14:hiddenFill xmlns:a14="http://schemas.microsoft.com/office/drawing/2010/main" xmlns="">
+                <a14:hiddenFill xmlns="" xmlns:a14="http://schemas.microsoft.com/office/drawing/2010/main">
                   <a:blipFill dpi="0" rotWithShape="0">
                     <a:blip/>
                     <a:srcRect/>
@@ -13889,7 +14058,7 @@
                 </a14:hiddenFill>
               </a:ext>
               <a:ext uri="{91240B29-F687-4f45-9708-019B960494DF}">
-                <a14:hiddenLine xmlns:a14="http://schemas.microsoft.com/office/drawing/2010/main" xmlns="" w="9525">
+                <a14:hiddenLine xmlns="" xmlns:a14="http://schemas.microsoft.com/office/drawing/2010/main" w="9525">
                   <a:solidFill>
                     <a:srgbClr val="000000"/>
                   </a:solidFill>
@@ -13899,7 +14068,7 @@
                 </a14:hiddenLine>
               </a:ext>
               <a:ext uri="{AF507438-7753-43e0-B8FC-AC1667EBCBE1}">
-                <a14:hiddenEffects xmlns:a14="http://schemas.microsoft.com/office/drawing/2010/main" xmlns="">
+                <a14:hiddenEffects xmlns="" xmlns:a14="http://schemas.microsoft.com/office/drawing/2010/main">
                   <a:effectLst>
                     <a:outerShdw blurRad="63500" dist="38099" dir="2700000" algn="ctr" rotWithShape="0">
                       <a:srgbClr val="000000">
@@ -13948,7 +14117,7 @@
             <a:effectLst/>
             <a:extLst>
               <a:ext uri="{909E8E84-426E-40dd-AFC4-6F175D3DCCD1}">
-                <a14:hiddenFill xmlns:a14="http://schemas.microsoft.com/office/drawing/2010/main" xmlns="">
+                <a14:hiddenFill xmlns="" xmlns:a14="http://schemas.microsoft.com/office/drawing/2010/main">
                   <a:blipFill dpi="0" rotWithShape="0">
                     <a:blip/>
                     <a:srcRect/>
@@ -13959,7 +14128,7 @@
                 </a14:hiddenFill>
               </a:ext>
               <a:ext uri="{91240B29-F687-4f45-9708-019B960494DF}">
-                <a14:hiddenLine xmlns:a14="http://schemas.microsoft.com/office/drawing/2010/main" xmlns="" w="9525">
+                <a14:hiddenLine xmlns="" xmlns:a14="http://schemas.microsoft.com/office/drawing/2010/main" w="9525">
                   <a:solidFill>
                     <a:srgbClr val="000000"/>
                   </a:solidFill>
@@ -13969,7 +14138,7 @@
                 </a14:hiddenLine>
               </a:ext>
               <a:ext uri="{AF507438-7753-43e0-B8FC-AC1667EBCBE1}">
-                <a14:hiddenEffects xmlns:a14="http://schemas.microsoft.com/office/drawing/2010/main" xmlns="">
+                <a14:hiddenEffects xmlns="" xmlns:a14="http://schemas.microsoft.com/office/drawing/2010/main">
                   <a:effectLst>
                     <a:outerShdw blurRad="63500" dist="38099" dir="2700000" algn="ctr" rotWithShape="0">
                       <a:srgbClr val="000000">
@@ -14018,7 +14187,7 @@
             <a:effectLst/>
             <a:extLst>
               <a:ext uri="{909E8E84-426E-40dd-AFC4-6F175D3DCCD1}">
-                <a14:hiddenFill xmlns:a14="http://schemas.microsoft.com/office/drawing/2010/main" xmlns="">
+                <a14:hiddenFill xmlns="" xmlns:a14="http://schemas.microsoft.com/office/drawing/2010/main">
                   <a:blipFill dpi="0" rotWithShape="0">
                     <a:blip/>
                     <a:srcRect/>
@@ -14029,7 +14198,7 @@
                 </a14:hiddenFill>
               </a:ext>
               <a:ext uri="{91240B29-F687-4f45-9708-019B960494DF}">
-                <a14:hiddenLine xmlns:a14="http://schemas.microsoft.com/office/drawing/2010/main" xmlns="" w="9525">
+                <a14:hiddenLine xmlns="" xmlns:a14="http://schemas.microsoft.com/office/drawing/2010/main" w="9525">
                   <a:solidFill>
                     <a:srgbClr val="000000"/>
                   </a:solidFill>
@@ -14039,7 +14208,7 @@
                 </a14:hiddenLine>
               </a:ext>
               <a:ext uri="{AF507438-7753-43e0-B8FC-AC1667EBCBE1}">
-                <a14:hiddenEffects xmlns:a14="http://schemas.microsoft.com/office/drawing/2010/main" xmlns="">
+                <a14:hiddenEffects xmlns="" xmlns:a14="http://schemas.microsoft.com/office/drawing/2010/main">
                   <a:effectLst>
                     <a:outerShdw blurRad="63500" dist="38099" dir="2700000" algn="ctr" rotWithShape="0">
                       <a:srgbClr val="000000">
@@ -14080,12 +14249,12 @@
             <a:effectLst/>
             <a:extLst>
               <a:ext uri="{909E8E84-426E-40dd-AFC4-6F175D3DCCD1}">
-                <a14:hiddenFill xmlns:a14="http://schemas.microsoft.com/office/drawing/2010/main" xmlns="">
+                <a14:hiddenFill xmlns="" xmlns:a14="http://schemas.microsoft.com/office/drawing/2010/main">
                   <a:noFill/>
                 </a14:hiddenFill>
               </a:ext>
               <a:ext uri="{AF507438-7753-43e0-B8FC-AC1667EBCBE1}">
-                <a14:hiddenEffects xmlns:a14="http://schemas.microsoft.com/office/drawing/2010/main" xmlns="">
+                <a14:hiddenEffects xmlns="" xmlns:a14="http://schemas.microsoft.com/office/drawing/2010/main">
                   <a:effectLst>
                     <a:outerShdw blurRad="63500" dist="38099" dir="2700000" algn="ctr" rotWithShape="0">
                       <a:srgbClr val="000000">
@@ -14138,12 +14307,12 @@
             <a:effectLst/>
             <a:extLst>
               <a:ext uri="{909E8E84-426E-40dd-AFC4-6F175D3DCCD1}">
-                <a14:hiddenFill xmlns:a14="http://schemas.microsoft.com/office/drawing/2010/main" xmlns="">
+                <a14:hiddenFill xmlns="" xmlns:a14="http://schemas.microsoft.com/office/drawing/2010/main">
                   <a:noFill/>
                 </a14:hiddenFill>
               </a:ext>
               <a:ext uri="{AF507438-7753-43e0-B8FC-AC1667EBCBE1}">
-                <a14:hiddenEffects xmlns:a14="http://schemas.microsoft.com/office/drawing/2010/main" xmlns="">
+                <a14:hiddenEffects xmlns="" xmlns:a14="http://schemas.microsoft.com/office/drawing/2010/main">
                   <a:effectLst>
                     <a:outerShdw blurRad="63500" dist="38099" dir="2700000" algn="ctr" rotWithShape="0">
                       <a:srgbClr val="000000">
@@ -14204,7 +14373,7 @@
             <a:effectLst/>
             <a:extLst>
               <a:ext uri="{909E8E84-426E-40dd-AFC4-6F175D3DCCD1}">
-                <a14:hiddenFill xmlns:a14="http://schemas.microsoft.com/office/drawing/2010/main" xmlns="">
+                <a14:hiddenFill xmlns="" xmlns:a14="http://schemas.microsoft.com/office/drawing/2010/main">
                   <a:blipFill dpi="0" rotWithShape="0">
                     <a:blip/>
                     <a:srcRect/>
@@ -14215,7 +14384,7 @@
                 </a14:hiddenFill>
               </a:ext>
               <a:ext uri="{91240B29-F687-4f45-9708-019B960494DF}">
-                <a14:hiddenLine xmlns:a14="http://schemas.microsoft.com/office/drawing/2010/main" xmlns="" w="9525">
+                <a14:hiddenLine xmlns="" xmlns:a14="http://schemas.microsoft.com/office/drawing/2010/main" w="9525">
                   <a:solidFill>
                     <a:srgbClr val="000000"/>
                   </a:solidFill>
@@ -14225,7 +14394,7 @@
                 </a14:hiddenLine>
               </a:ext>
               <a:ext uri="{AF507438-7753-43e0-B8FC-AC1667EBCBE1}">
-                <a14:hiddenEffects xmlns:a14="http://schemas.microsoft.com/office/drawing/2010/main" xmlns="">
+                <a14:hiddenEffects xmlns="" xmlns:a14="http://schemas.microsoft.com/office/drawing/2010/main">
                   <a:effectLst>
                     <a:outerShdw blurRad="63500" dist="38099" dir="2700000" algn="ctr" rotWithShape="0">
                       <a:srgbClr val="000000">
@@ -14358,7 +14527,7 @@
           <a:effectLst/>
           <a:extLst>
             <a:ext uri="{909E8E84-426E-40dd-AFC4-6F175D3DCCD1}">
-              <a14:hiddenFill xmlns="" xmlns:a14="http://schemas.microsoft.com/office/drawing/2010/main">
+              <a14:hiddenFill xmlns:a14="http://schemas.microsoft.com/office/drawing/2010/main" xmlns="">
                 <a:blipFill dpi="0" rotWithShape="0">
                   <a:blip/>
                   <a:srcRect/>
@@ -14369,7 +14538,7 @@
               </a14:hiddenFill>
             </a:ext>
             <a:ext uri="{91240B29-F687-4f45-9708-019B960494DF}">
-              <a14:hiddenLine xmlns="" xmlns:a14="http://schemas.microsoft.com/office/drawing/2010/main" w="9525">
+              <a14:hiddenLine xmlns:a14="http://schemas.microsoft.com/office/drawing/2010/main" xmlns="" w="9525">
                 <a:solidFill>
                   <a:srgbClr val="000000"/>
                 </a:solidFill>
@@ -14379,7 +14548,7 @@
               </a14:hiddenLine>
             </a:ext>
             <a:ext uri="{AF507438-7753-43e0-B8FC-AC1667EBCBE1}">
-              <a14:hiddenEffects xmlns="" xmlns:a14="http://schemas.microsoft.com/office/drawing/2010/main">
+              <a14:hiddenEffects xmlns:a14="http://schemas.microsoft.com/office/drawing/2010/main" xmlns="">
                 <a:effectLst>
                   <a:outerShdw blurRad="63500" dist="38099" dir="2700000" algn="ctr" rotWithShape="0">
                     <a:srgbClr val="000000">
@@ -14464,7 +14633,7 @@
           <a:effectLst/>
           <a:extLst>
             <a:ext uri="{909E8E84-426E-40dd-AFC4-6F175D3DCCD1}">
-              <a14:hiddenFill xmlns="" xmlns:a14="http://schemas.microsoft.com/office/drawing/2010/main">
+              <a14:hiddenFill xmlns:a14="http://schemas.microsoft.com/office/drawing/2010/main" xmlns="">
                 <a:blipFill dpi="0" rotWithShape="0">
                   <a:blip/>
                   <a:srcRect/>
@@ -14475,7 +14644,7 @@
               </a14:hiddenFill>
             </a:ext>
             <a:ext uri="{91240B29-F687-4f45-9708-019B960494DF}">
-              <a14:hiddenLine xmlns="" xmlns:a14="http://schemas.microsoft.com/office/drawing/2010/main" w="9525">
+              <a14:hiddenLine xmlns:a14="http://schemas.microsoft.com/office/drawing/2010/main" xmlns="" w="9525">
                 <a:solidFill>
                   <a:srgbClr val="000000"/>
                 </a:solidFill>
@@ -14485,7 +14654,7 @@
               </a14:hiddenLine>
             </a:ext>
             <a:ext uri="{AF507438-7753-43e0-B8FC-AC1667EBCBE1}">
-              <a14:hiddenEffects xmlns="" xmlns:a14="http://schemas.microsoft.com/office/drawing/2010/main">
+              <a14:hiddenEffects xmlns:a14="http://schemas.microsoft.com/office/drawing/2010/main" xmlns="">
                 <a:effectLst>
                   <a:outerShdw blurRad="63500" dist="38099" dir="2700000" algn="ctr" rotWithShape="0">
                     <a:srgbClr val="000000">
@@ -14570,7 +14739,7 @@
           <a:effectLst/>
           <a:extLst>
             <a:ext uri="{909E8E84-426E-40dd-AFC4-6F175D3DCCD1}">
-              <a14:hiddenFill xmlns="" xmlns:a14="http://schemas.microsoft.com/office/drawing/2010/main">
+              <a14:hiddenFill xmlns:a14="http://schemas.microsoft.com/office/drawing/2010/main" xmlns="">
                 <a:blipFill dpi="0" rotWithShape="0">
                   <a:blip/>
                   <a:srcRect/>
@@ -14581,7 +14750,7 @@
               </a14:hiddenFill>
             </a:ext>
             <a:ext uri="{91240B29-F687-4f45-9708-019B960494DF}">
-              <a14:hiddenLine xmlns="" xmlns:a14="http://schemas.microsoft.com/office/drawing/2010/main" w="9525">
+              <a14:hiddenLine xmlns:a14="http://schemas.microsoft.com/office/drawing/2010/main" xmlns="" w="9525">
                 <a:solidFill>
                   <a:srgbClr val="000000"/>
                 </a:solidFill>
@@ -14591,7 +14760,7 @@
               </a14:hiddenLine>
             </a:ext>
             <a:ext uri="{AF507438-7753-43e0-B8FC-AC1667EBCBE1}">
-              <a14:hiddenEffects xmlns="" xmlns:a14="http://schemas.microsoft.com/office/drawing/2010/main">
+              <a14:hiddenEffects xmlns:a14="http://schemas.microsoft.com/office/drawing/2010/main" xmlns="">
                 <a:effectLst>
                   <a:outerShdw blurRad="63500" dist="38099" dir="2700000" algn="ctr" rotWithShape="0">
                     <a:srgbClr val="000000">
@@ -14771,7 +14940,7 @@
           <a:effectLst/>
           <a:extLst>
             <a:ext uri="{909E8E84-426E-40dd-AFC4-6F175D3DCCD1}">
-              <a14:hiddenFill xmlns="" xmlns:a14="http://schemas.microsoft.com/office/drawing/2010/main">
+              <a14:hiddenFill xmlns:a14="http://schemas.microsoft.com/office/drawing/2010/main" xmlns="">
                 <a:blipFill dpi="0" rotWithShape="0">
                   <a:blip/>
                   <a:srcRect/>
@@ -14782,7 +14951,7 @@
               </a14:hiddenFill>
             </a:ext>
             <a:ext uri="{91240B29-F687-4f45-9708-019B960494DF}">
-              <a14:hiddenLine xmlns="" xmlns:a14="http://schemas.microsoft.com/office/drawing/2010/main" w="9525">
+              <a14:hiddenLine xmlns:a14="http://schemas.microsoft.com/office/drawing/2010/main" xmlns="" w="9525">
                 <a:solidFill>
                   <a:srgbClr val="000000"/>
                 </a:solidFill>
@@ -14792,7 +14961,7 @@
               </a14:hiddenLine>
             </a:ext>
             <a:ext uri="{AF507438-7753-43e0-B8FC-AC1667EBCBE1}">
-              <a14:hiddenEffects xmlns="" xmlns:a14="http://schemas.microsoft.com/office/drawing/2010/main">
+              <a14:hiddenEffects xmlns:a14="http://schemas.microsoft.com/office/drawing/2010/main" xmlns="">
                 <a:effectLst>
                   <a:outerShdw blurRad="63500" dist="38099" dir="2700000" algn="ctr" rotWithShape="0">
                     <a:srgbClr val="000000">
@@ -14870,7 +15039,7 @@
           <a:effectLst/>
           <a:extLst>
             <a:ext uri="{909E8E84-426E-40dd-AFC4-6F175D3DCCD1}">
-              <a14:hiddenFill xmlns="" xmlns:a14="http://schemas.microsoft.com/office/drawing/2010/main">
+              <a14:hiddenFill xmlns:a14="http://schemas.microsoft.com/office/drawing/2010/main" xmlns="">
                 <a:blipFill dpi="0" rotWithShape="0">
                   <a:blip/>
                   <a:srcRect/>
@@ -14881,7 +15050,7 @@
               </a14:hiddenFill>
             </a:ext>
             <a:ext uri="{91240B29-F687-4f45-9708-019B960494DF}">
-              <a14:hiddenLine xmlns="" xmlns:a14="http://schemas.microsoft.com/office/drawing/2010/main" w="9525">
+              <a14:hiddenLine xmlns:a14="http://schemas.microsoft.com/office/drawing/2010/main" xmlns="" w="9525">
                 <a:solidFill>
                   <a:srgbClr val="000000"/>
                 </a:solidFill>
@@ -14891,7 +15060,7 @@
               </a14:hiddenLine>
             </a:ext>
             <a:ext uri="{AF507438-7753-43e0-B8FC-AC1667EBCBE1}">
-              <a14:hiddenEffects xmlns="" xmlns:a14="http://schemas.microsoft.com/office/drawing/2010/main">
+              <a14:hiddenEffects xmlns:a14="http://schemas.microsoft.com/office/drawing/2010/main" xmlns="">
                 <a:effectLst>
                   <a:outerShdw blurRad="63500" dist="38099" dir="2700000" algn="ctr" rotWithShape="0">
                     <a:srgbClr val="000000">
@@ -14969,7 +15138,7 @@
           <a:effectLst/>
           <a:extLst>
             <a:ext uri="{909E8E84-426E-40dd-AFC4-6F175D3DCCD1}">
-              <a14:hiddenFill xmlns="" xmlns:a14="http://schemas.microsoft.com/office/drawing/2010/main">
+              <a14:hiddenFill xmlns:a14="http://schemas.microsoft.com/office/drawing/2010/main" xmlns="">
                 <a:blipFill dpi="0" rotWithShape="0">
                   <a:blip/>
                   <a:srcRect/>
@@ -14980,7 +15149,7 @@
               </a14:hiddenFill>
             </a:ext>
             <a:ext uri="{91240B29-F687-4f45-9708-019B960494DF}">
-              <a14:hiddenLine xmlns="" xmlns:a14="http://schemas.microsoft.com/office/drawing/2010/main" w="9525">
+              <a14:hiddenLine xmlns:a14="http://schemas.microsoft.com/office/drawing/2010/main" xmlns="" w="9525">
                 <a:solidFill>
                   <a:srgbClr val="000000"/>
                 </a:solidFill>
@@ -14990,7 +15159,7 @@
               </a14:hiddenLine>
             </a:ext>
             <a:ext uri="{AF507438-7753-43e0-B8FC-AC1667EBCBE1}">
-              <a14:hiddenEffects xmlns="" xmlns:a14="http://schemas.microsoft.com/office/drawing/2010/main">
+              <a14:hiddenEffects xmlns:a14="http://schemas.microsoft.com/office/drawing/2010/main" xmlns="">
                 <a:effectLst>
                   <a:outerShdw blurRad="63500" dist="38099" dir="2700000" algn="ctr" rotWithShape="0">
                     <a:srgbClr val="000000">
@@ -16969,7 +17138,7 @@
           <a:effectLst/>
           <a:extLst>
             <a:ext uri="{909E8E84-426E-40dd-AFC4-6F175D3DCCD1}">
-              <a14:hiddenFill xmlns:a14="http://schemas.microsoft.com/office/drawing/2010/main" xmlns="">
+              <a14:hiddenFill xmlns="" xmlns:a14="http://schemas.microsoft.com/office/drawing/2010/main">
                 <a:blipFill dpi="0" rotWithShape="0">
                   <a:blip/>
                   <a:srcRect/>
@@ -16980,7 +17149,7 @@
               </a14:hiddenFill>
             </a:ext>
             <a:ext uri="{91240B29-F687-4f45-9708-019B960494DF}">
-              <a14:hiddenLine xmlns:a14="http://schemas.microsoft.com/office/drawing/2010/main" xmlns="" w="9525">
+              <a14:hiddenLine xmlns="" xmlns:a14="http://schemas.microsoft.com/office/drawing/2010/main" w="9525">
                 <a:solidFill>
                   <a:srgbClr val="000000"/>
                 </a:solidFill>
@@ -16990,7 +17159,7 @@
               </a14:hiddenLine>
             </a:ext>
             <a:ext uri="{AF507438-7753-43e0-B8FC-AC1667EBCBE1}">
-              <a14:hiddenEffects xmlns:a14="http://schemas.microsoft.com/office/drawing/2010/main" xmlns="">
+              <a14:hiddenEffects xmlns="" xmlns:a14="http://schemas.microsoft.com/office/drawing/2010/main">
                 <a:effectLst>
                   <a:outerShdw blurRad="63500" dist="38099" dir="2700000" algn="ctr" rotWithShape="0">
                     <a:srgbClr val="000000">
@@ -18479,7 +18648,7 @@
           <a:effectLst/>
           <a:extLst>
             <a:ext uri="{909E8E84-426E-40dd-AFC4-6F175D3DCCD1}">
-              <a14:hiddenFill xmlns:a14="http://schemas.microsoft.com/office/drawing/2010/main" xmlns="">
+              <a14:hiddenFill xmlns="" xmlns:a14="http://schemas.microsoft.com/office/drawing/2010/main">
                 <a:blipFill dpi="0" rotWithShape="0">
                   <a:blip/>
                   <a:srcRect/>
@@ -18490,7 +18659,7 @@
               </a14:hiddenFill>
             </a:ext>
             <a:ext uri="{91240B29-F687-4f45-9708-019B960494DF}">
-              <a14:hiddenLine xmlns:a14="http://schemas.microsoft.com/office/drawing/2010/main" xmlns="" w="9525">
+              <a14:hiddenLine xmlns="" xmlns:a14="http://schemas.microsoft.com/office/drawing/2010/main" w="9525">
                 <a:solidFill>
                   <a:srgbClr val="000000"/>
                 </a:solidFill>
@@ -18500,7 +18669,7 @@
               </a14:hiddenLine>
             </a:ext>
             <a:ext uri="{AF507438-7753-43e0-B8FC-AC1667EBCBE1}">
-              <a14:hiddenEffects xmlns:a14="http://schemas.microsoft.com/office/drawing/2010/main" xmlns="">
+              <a14:hiddenEffects xmlns="" xmlns:a14="http://schemas.microsoft.com/office/drawing/2010/main">
                 <a:effectLst>
                   <a:outerShdw blurRad="63500" dist="38099" dir="2700000" algn="ctr" rotWithShape="0">
                     <a:srgbClr val="000000">
@@ -19985,7 +20154,7 @@
           <a:effectLst/>
           <a:extLst>
             <a:ext uri="{909E8E84-426E-40dd-AFC4-6F175D3DCCD1}">
-              <a14:hiddenFill xmlns:a14="http://schemas.microsoft.com/office/drawing/2010/main" xmlns="">
+              <a14:hiddenFill xmlns="" xmlns:a14="http://schemas.microsoft.com/office/drawing/2010/main">
                 <a:blipFill dpi="0" rotWithShape="0">
                   <a:blip/>
                   <a:srcRect/>
@@ -19996,7 +20165,7 @@
               </a14:hiddenFill>
             </a:ext>
             <a:ext uri="{91240B29-F687-4f45-9708-019B960494DF}">
-              <a14:hiddenLine xmlns:a14="http://schemas.microsoft.com/office/drawing/2010/main" xmlns="" w="9525">
+              <a14:hiddenLine xmlns="" xmlns:a14="http://schemas.microsoft.com/office/drawing/2010/main" w="9525">
                 <a:solidFill>
                   <a:srgbClr val="000000"/>
                 </a:solidFill>
@@ -20006,7 +20175,7 @@
               </a14:hiddenLine>
             </a:ext>
             <a:ext uri="{AF507438-7753-43e0-B8FC-AC1667EBCBE1}">
-              <a14:hiddenEffects xmlns:a14="http://schemas.microsoft.com/office/drawing/2010/main" xmlns="">
+              <a14:hiddenEffects xmlns="" xmlns:a14="http://schemas.microsoft.com/office/drawing/2010/main">
                 <a:effectLst>
                   <a:outerShdw blurRad="63500" dist="38099" dir="2700000" algn="ctr" rotWithShape="0">
                     <a:srgbClr val="000000">
@@ -20160,7 +20329,7 @@
           <a:effectLst/>
           <a:extLst>
             <a:ext uri="{909E8E84-426E-40dd-AFC4-6F175D3DCCD1}">
-              <a14:hiddenFill xmlns:a14="http://schemas.microsoft.com/office/drawing/2010/main" xmlns="">
+              <a14:hiddenFill xmlns="" xmlns:a14="http://schemas.microsoft.com/office/drawing/2010/main">
                 <a:blipFill dpi="0" rotWithShape="0">
                   <a:blip/>
                   <a:srcRect/>
@@ -20171,7 +20340,7 @@
               </a14:hiddenFill>
             </a:ext>
             <a:ext uri="{91240B29-F687-4f45-9708-019B960494DF}">
-              <a14:hiddenLine xmlns:a14="http://schemas.microsoft.com/office/drawing/2010/main" xmlns="" w="9525">
+              <a14:hiddenLine xmlns="" xmlns:a14="http://schemas.microsoft.com/office/drawing/2010/main" w="9525">
                 <a:solidFill>
                   <a:srgbClr val="000000"/>
                 </a:solidFill>
@@ -20181,7 +20350,7 @@
               </a14:hiddenLine>
             </a:ext>
             <a:ext uri="{AF507438-7753-43e0-B8FC-AC1667EBCBE1}">
-              <a14:hiddenEffects xmlns:a14="http://schemas.microsoft.com/office/drawing/2010/main" xmlns="">
+              <a14:hiddenEffects xmlns="" xmlns:a14="http://schemas.microsoft.com/office/drawing/2010/main">
                 <a:effectLst>
                   <a:outerShdw blurRad="63500" dist="38099" dir="2700000" algn="ctr" rotWithShape="0">
                     <a:srgbClr val="000000">
@@ -21974,7 +22143,7 @@
           <a:effectLst/>
           <a:extLst>
             <a:ext uri="{909E8E84-426E-40dd-AFC4-6F175D3DCCD1}">
-              <a14:hiddenFill xmlns:a14="http://schemas.microsoft.com/office/drawing/2010/main" xmlns="">
+              <a14:hiddenFill xmlns="" xmlns:a14="http://schemas.microsoft.com/office/drawing/2010/main">
                 <a:blipFill dpi="0" rotWithShape="0">
                   <a:blip/>
                   <a:srcRect/>
@@ -21985,7 +22154,7 @@
               </a14:hiddenFill>
             </a:ext>
             <a:ext uri="{91240B29-F687-4f45-9708-019B960494DF}">
-              <a14:hiddenLine xmlns:a14="http://schemas.microsoft.com/office/drawing/2010/main" xmlns="" w="9525">
+              <a14:hiddenLine xmlns="" xmlns:a14="http://schemas.microsoft.com/office/drawing/2010/main" w="9525">
                 <a:solidFill>
                   <a:srgbClr val="000000"/>
                 </a:solidFill>
@@ -21995,7 +22164,7 @@
               </a14:hiddenLine>
             </a:ext>
             <a:ext uri="{AF507438-7753-43e0-B8FC-AC1667EBCBE1}">
-              <a14:hiddenEffects xmlns:a14="http://schemas.microsoft.com/office/drawing/2010/main" xmlns="">
+              <a14:hiddenEffects xmlns="" xmlns:a14="http://schemas.microsoft.com/office/drawing/2010/main">
                 <a:effectLst>
                   <a:outerShdw blurRad="63500" dist="38099" dir="2700000" algn="ctr" rotWithShape="0">
                     <a:srgbClr val="000000">
@@ -24950,7 +25119,7 @@
           <a:effectLst/>
           <a:extLst>
             <a:ext uri="{909E8E84-426E-40dd-AFC4-6F175D3DCCD1}">
-              <a14:hiddenFill xmlns:a14="http://schemas.microsoft.com/office/drawing/2010/main" xmlns="">
+              <a14:hiddenFill xmlns="" xmlns:a14="http://schemas.microsoft.com/office/drawing/2010/main">
                 <a:blipFill dpi="0" rotWithShape="0">
                   <a:blip/>
                   <a:srcRect/>
@@ -24961,7 +25130,7 @@
               </a14:hiddenFill>
             </a:ext>
             <a:ext uri="{91240B29-F687-4f45-9708-019B960494DF}">
-              <a14:hiddenLine xmlns:a14="http://schemas.microsoft.com/office/drawing/2010/main" xmlns="" w="9525">
+              <a14:hiddenLine xmlns="" xmlns:a14="http://schemas.microsoft.com/office/drawing/2010/main" w="9525">
                 <a:solidFill>
                   <a:srgbClr val="000000"/>
                 </a:solidFill>
@@ -24971,7 +25140,7 @@
               </a14:hiddenLine>
             </a:ext>
             <a:ext uri="{AF507438-7753-43e0-B8FC-AC1667EBCBE1}">
-              <a14:hiddenEffects xmlns:a14="http://schemas.microsoft.com/office/drawing/2010/main" xmlns="">
+              <a14:hiddenEffects xmlns="" xmlns:a14="http://schemas.microsoft.com/office/drawing/2010/main">
                 <a:effectLst>
                   <a:outerShdw blurRad="63500" dist="38099" dir="2700000" algn="ctr" rotWithShape="0">
                     <a:srgbClr val="000000">
@@ -25050,7 +25219,7 @@
           <a:effectLst/>
           <a:extLst>
             <a:ext uri="{909E8E84-426E-40dd-AFC4-6F175D3DCCD1}">
-              <a14:hiddenFill xmlns:a14="http://schemas.microsoft.com/office/drawing/2010/main" xmlns="">
+              <a14:hiddenFill xmlns="" xmlns:a14="http://schemas.microsoft.com/office/drawing/2010/main">
                 <a:blipFill dpi="0" rotWithShape="0">
                   <a:blip/>
                   <a:srcRect/>
@@ -25061,7 +25230,7 @@
               </a14:hiddenFill>
             </a:ext>
             <a:ext uri="{91240B29-F687-4f45-9708-019B960494DF}">
-              <a14:hiddenLine xmlns:a14="http://schemas.microsoft.com/office/drawing/2010/main" xmlns="" w="9525">
+              <a14:hiddenLine xmlns="" xmlns:a14="http://schemas.microsoft.com/office/drawing/2010/main" w="9525">
                 <a:solidFill>
                   <a:srgbClr val="000000"/>
                 </a:solidFill>
@@ -25071,7 +25240,7 @@
               </a14:hiddenLine>
             </a:ext>
             <a:ext uri="{AF507438-7753-43e0-B8FC-AC1667EBCBE1}">
-              <a14:hiddenEffects xmlns:a14="http://schemas.microsoft.com/office/drawing/2010/main" xmlns="">
+              <a14:hiddenEffects xmlns="" xmlns:a14="http://schemas.microsoft.com/office/drawing/2010/main">
                 <a:effectLst>
                   <a:outerShdw blurRad="63500" dist="38099" dir="2700000" algn="ctr" rotWithShape="0">
                     <a:srgbClr val="000000">
@@ -26666,7 +26835,7 @@
           <a:effectLst/>
           <a:extLst>
             <a:ext uri="{909E8E84-426E-40dd-AFC4-6F175D3DCCD1}">
-              <a14:hiddenFill xmlns:a14="http://schemas.microsoft.com/office/drawing/2010/main" xmlns="">
+              <a14:hiddenFill xmlns="" xmlns:a14="http://schemas.microsoft.com/office/drawing/2010/main">
                 <a:blipFill dpi="0" rotWithShape="0">
                   <a:blip/>
                   <a:srcRect/>
@@ -26677,7 +26846,7 @@
               </a14:hiddenFill>
             </a:ext>
             <a:ext uri="{91240B29-F687-4f45-9708-019B960494DF}">
-              <a14:hiddenLine xmlns:a14="http://schemas.microsoft.com/office/drawing/2010/main" xmlns="" w="9525">
+              <a14:hiddenLine xmlns="" xmlns:a14="http://schemas.microsoft.com/office/drawing/2010/main" w="9525">
                 <a:solidFill>
                   <a:srgbClr val="000000"/>
                 </a:solidFill>
@@ -26687,7 +26856,7 @@
               </a14:hiddenLine>
             </a:ext>
             <a:ext uri="{AF507438-7753-43e0-B8FC-AC1667EBCBE1}">
-              <a14:hiddenEffects xmlns:a14="http://schemas.microsoft.com/office/drawing/2010/main" xmlns="">
+              <a14:hiddenEffects xmlns="" xmlns:a14="http://schemas.microsoft.com/office/drawing/2010/main">
                 <a:effectLst>
                   <a:outerShdw blurRad="63500" dist="38099" dir="2700000" algn="ctr" rotWithShape="0">
                     <a:srgbClr val="000000">
@@ -28418,7 +28587,7 @@
           <a:effectLst/>
           <a:extLst>
             <a:ext uri="{909E8E84-426E-40dd-AFC4-6F175D3DCCD1}">
-              <a14:hiddenFill xmlns:a14="http://schemas.microsoft.com/office/drawing/2010/main" xmlns="">
+              <a14:hiddenFill xmlns="" xmlns:a14="http://schemas.microsoft.com/office/drawing/2010/main">
                 <a:blipFill dpi="0" rotWithShape="0">
                   <a:blip/>
                   <a:srcRect/>
@@ -28429,7 +28598,7 @@
               </a14:hiddenFill>
             </a:ext>
             <a:ext uri="{91240B29-F687-4f45-9708-019B960494DF}">
-              <a14:hiddenLine xmlns:a14="http://schemas.microsoft.com/office/drawing/2010/main" xmlns="" w="9525">
+              <a14:hiddenLine xmlns="" xmlns:a14="http://schemas.microsoft.com/office/drawing/2010/main" w="9525">
                 <a:solidFill>
                   <a:srgbClr val="000000"/>
                 </a:solidFill>
@@ -28439,7 +28608,7 @@
               </a14:hiddenLine>
             </a:ext>
             <a:ext uri="{AF507438-7753-43e0-B8FC-AC1667EBCBE1}">
-              <a14:hiddenEffects xmlns:a14="http://schemas.microsoft.com/office/drawing/2010/main" xmlns="">
+              <a14:hiddenEffects xmlns="" xmlns:a14="http://schemas.microsoft.com/office/drawing/2010/main">
                 <a:effectLst>
                   <a:outerShdw blurRad="63500" dist="38099" dir="2700000" algn="ctr" rotWithShape="0">
                     <a:srgbClr val="000000">
@@ -29872,7 +30041,7 @@
           <a:effectLst/>
           <a:extLst>
             <a:ext uri="{909E8E84-426E-40dd-AFC4-6F175D3DCCD1}">
-              <a14:hiddenFill xmlns:a14="http://schemas.microsoft.com/office/drawing/2010/main" xmlns="">
+              <a14:hiddenFill xmlns="" xmlns:a14="http://schemas.microsoft.com/office/drawing/2010/main">
                 <a:blipFill dpi="0" rotWithShape="0">
                   <a:blip/>
                   <a:srcRect/>
@@ -29883,7 +30052,7 @@
               </a14:hiddenFill>
             </a:ext>
             <a:ext uri="{91240B29-F687-4f45-9708-019B960494DF}">
-              <a14:hiddenLine xmlns:a14="http://schemas.microsoft.com/office/drawing/2010/main" xmlns="" w="9525">
+              <a14:hiddenLine xmlns="" xmlns:a14="http://schemas.microsoft.com/office/drawing/2010/main" w="9525">
                 <a:solidFill>
                   <a:srgbClr val="000000"/>
                 </a:solidFill>
@@ -29893,7 +30062,7 @@
               </a14:hiddenLine>
             </a:ext>
             <a:ext uri="{AF507438-7753-43e0-B8FC-AC1667EBCBE1}">
-              <a14:hiddenEffects xmlns:a14="http://schemas.microsoft.com/office/drawing/2010/main" xmlns="">
+              <a14:hiddenEffects xmlns="" xmlns:a14="http://schemas.microsoft.com/office/drawing/2010/main">
                 <a:effectLst>
                   <a:outerShdw blurRad="63500" dist="38099" dir="2700000" algn="ctr" rotWithShape="0">
                     <a:srgbClr val="000000">
@@ -30024,7 +30193,7 @@
           <a:effectLst/>
           <a:extLst>
             <a:ext uri="{909E8E84-426E-40dd-AFC4-6F175D3DCCD1}">
-              <a14:hiddenFill xmlns:a14="http://schemas.microsoft.com/office/drawing/2010/main" xmlns="">
+              <a14:hiddenFill xmlns="" xmlns:a14="http://schemas.microsoft.com/office/drawing/2010/main">
                 <a:blipFill dpi="0" rotWithShape="0">
                   <a:blip/>
                   <a:srcRect/>
@@ -30035,7 +30204,7 @@
               </a14:hiddenFill>
             </a:ext>
             <a:ext uri="{91240B29-F687-4f45-9708-019B960494DF}">
-              <a14:hiddenLine xmlns:a14="http://schemas.microsoft.com/office/drawing/2010/main" xmlns="" w="9525">
+              <a14:hiddenLine xmlns="" xmlns:a14="http://schemas.microsoft.com/office/drawing/2010/main" w="9525">
                 <a:solidFill>
                   <a:srgbClr val="000000"/>
                 </a:solidFill>
@@ -30045,7 +30214,7 @@
               </a14:hiddenLine>
             </a:ext>
             <a:ext uri="{AF507438-7753-43e0-B8FC-AC1667EBCBE1}">
-              <a14:hiddenEffects xmlns:a14="http://schemas.microsoft.com/office/drawing/2010/main" xmlns="">
+              <a14:hiddenEffects xmlns="" xmlns:a14="http://schemas.microsoft.com/office/drawing/2010/main">
                 <a:effectLst>
                   <a:outerShdw blurRad="63500" dist="38099" dir="2700000" algn="ctr" rotWithShape="0">
                     <a:srgbClr val="000000">
@@ -38262,7 +38431,7 @@
           <a:effectLst/>
           <a:extLst>
             <a:ext uri="{909E8E84-426E-40dd-AFC4-6F175D3DCCD1}">
-              <a14:hiddenFill xmlns="" xmlns:a14="http://schemas.microsoft.com/office/drawing/2010/main">
+              <a14:hiddenFill xmlns:a14="http://schemas.microsoft.com/office/drawing/2010/main" xmlns="">
                 <a:blipFill dpi="0" rotWithShape="0">
                   <a:blip/>
                   <a:srcRect/>
@@ -38273,7 +38442,7 @@
               </a14:hiddenFill>
             </a:ext>
             <a:ext uri="{91240B29-F687-4f45-9708-019B960494DF}">
-              <a14:hiddenLine xmlns="" xmlns:a14="http://schemas.microsoft.com/office/drawing/2010/main" w="9525">
+              <a14:hiddenLine xmlns:a14="http://schemas.microsoft.com/office/drawing/2010/main" xmlns="" w="9525">
                 <a:solidFill>
                   <a:srgbClr val="000000"/>
                 </a:solidFill>
@@ -38283,7 +38452,7 @@
               </a14:hiddenLine>
             </a:ext>
             <a:ext uri="{AF507438-7753-43e0-B8FC-AC1667EBCBE1}">
-              <a14:hiddenEffects xmlns="" xmlns:a14="http://schemas.microsoft.com/office/drawing/2010/main">
+              <a14:hiddenEffects xmlns:a14="http://schemas.microsoft.com/office/drawing/2010/main" xmlns="">
                 <a:effectLst>
                   <a:outerShdw blurRad="63500" dist="38099" dir="2700000" algn="ctr" rotWithShape="0">
                     <a:srgbClr val="000000">

</xml_diff>

<commit_message>
Write talk through slide 33
</commit_message>
<xml_diff>
--- a/marple_itx18.pptx
+++ b/marple_itx18.pptx
@@ -557,7 +557,7 @@
           <a:p>
             <a:r>
               <a:rPr lang="en-US" baseline="0" dirty="0"/>
-              <a:t>Thank you for the invitation. I am going to be speaking about work that I did as a grad student on designing hardware and software for fast and programmable network monitoring. This is joint work with many excellent collaborators. In particular, I want to mention the lead author on this work, Srinivas Narayana, who is a postdoc at MIT.</a:t>
+              <a:t>Thank you for the invitation. I am going to be speaking about work that I did as a grad student on designing hardware and software for fast and programmable network monitoring. This was published at SIGCOMM 2017 and won the best paper award. This is joint work with many excellent collaborators. In particular, I want to mention the lead author on this work, Srinivas Narayana, who is a postdoc at MIT.</a:t>
             </a:r>
           </a:p>
           <a:p>
@@ -668,7 +668,28 @@
           <a:bodyPr/>
           <a:lstStyle/>
           <a:p>
-            <a:endParaRPr lang="en-US" baseline="0" dirty="0"/>
+            <a:r>
+              <a:rPr lang="en-US" dirty="0"/>
+              <a:t>Since we wanted the language to be as high level as possible, we chose a query language as the format for expressing these queries. Let me describe the query language’s constructs one by one. The first language construct is that of a stream. You can think of the query language as consisting of operators that take streams of tuples as inputs and produce streams of tuples as outputs---like standard stream processing systems. This allows us to easily compose operators in the language.</a:t>
+            </a:r>
+          </a:p>
+          <a:p>
+            <a:endParaRPr lang="en-US" dirty="0"/>
+          </a:p>
+          <a:p>
+            <a:r>
+              <a:rPr lang="en-US" dirty="0"/>
+              <a:t>The original input packet stream consists of a tuple for each appearance of a packet at each queue inside the network. Each tuple consists of the following fields: the switch the packet appeared at, the queue within the switch that the packet appeared at, the packet’s headers, a UID identifying each packet uniquely, the time at which it arrived at this queue, the time at which it departed from this queue, and the queue size at the time at which the packet arrived at this queue.</a:t>
+            </a:r>
+          </a:p>
+          <a:p>
+            <a:endParaRPr lang="en-US" dirty="0"/>
+          </a:p>
+          <a:p>
+            <a:r>
+              <a:rPr lang="en-US" dirty="0"/>
+              <a:t>Right now, I am not discussing exactly how the information required in this tuple is materialized. I’ll get to that when I get to the hardware portion of this talk.</a:t>
+            </a:r>
           </a:p>
         </p:txBody>
       </p:sp>
@@ -689,7 +710,7 @@
           <a:p>
             <a:fld id="{33793ACE-A489-1C41-B163-D1FF0130F898}" type="slidenum">
               <a:rPr lang="en-US" smtClean="0"/>
-              <a:t>11</a:t>
+              <a:t>10</a:t>
             </a:fld>
             <a:endParaRPr lang="en-US"/>
           </a:p>
@@ -698,7 +719,7 @@
     </p:spTree>
     <p:extLst>
       <p:ext uri="{BB962C8B-B14F-4D97-AF65-F5344CB8AC3E}">
-        <p14:creationId xmlns:p14="http://schemas.microsoft.com/office/powerpoint/2010/main" val="965527152"/>
+        <p14:creationId xmlns:p14="http://schemas.microsoft.com/office/powerpoint/2010/main" val="1638992475"/>
       </p:ext>
     </p:extLst>
   </p:cSld>
@@ -752,7 +773,18 @@
           <a:bodyPr/>
           <a:lstStyle/>
           <a:p>
-            <a:endParaRPr lang="en-US" dirty="0"/>
+            <a:r>
+              <a:rPr lang="en-US" baseline="0" dirty="0"/>
+              <a:t>Let’s see what we can do to these streams. You can operate on these streams using familiar functional operators such as filter, map, zip, and </a:t>
+            </a:r>
+            <a:r>
+              <a:rPr lang="en-US" baseline="0" dirty="0" err="1"/>
+              <a:t>groupby</a:t>
+            </a:r>
+            <a:r>
+              <a:rPr lang="en-US" baseline="0" dirty="0"/>
+              <a:t>, which allow you to restrict the stream, transform it, and aggregate state across tuples in the stream.</a:t>
+            </a:r>
           </a:p>
         </p:txBody>
       </p:sp>
@@ -773,7 +805,7 @@
           <a:p>
             <a:fld id="{33793ACE-A489-1C41-B163-D1FF0130F898}" type="slidenum">
               <a:rPr lang="en-US" smtClean="0"/>
-              <a:t>13</a:t>
+              <a:t>11</a:t>
             </a:fld>
             <a:endParaRPr lang="en-US"/>
           </a:p>
@@ -782,7 +814,7 @@
     </p:spTree>
     <p:extLst>
       <p:ext uri="{BB962C8B-B14F-4D97-AF65-F5344CB8AC3E}">
-        <p14:creationId xmlns:p14="http://schemas.microsoft.com/office/powerpoint/2010/main" val="1793562882"/>
+        <p14:creationId xmlns:p14="http://schemas.microsoft.com/office/powerpoint/2010/main" val="965527152"/>
       </p:ext>
     </p:extLst>
   </p:cSld>
@@ -836,7 +868,15 @@
           <a:bodyPr/>
           <a:lstStyle/>
           <a:p>
-            <a:endParaRPr lang="en-US" baseline="0" dirty="0"/>
+            <a:r>
+              <a:rPr lang="en-US" dirty="0"/>
+              <a:t>The first construct is a filter. In this example, we filter the original input packet stream to only look at packets that have a queueing latency greater than 1 </a:t>
+            </a:r>
+            <a:r>
+              <a:rPr lang="en-US" dirty="0" err="1"/>
+              <a:t>ms.</a:t>
+            </a:r>
+            <a:endParaRPr lang="en-US" dirty="0"/>
           </a:p>
         </p:txBody>
       </p:sp>
@@ -857,7 +897,7 @@
           <a:p>
             <a:fld id="{33793ACE-A489-1C41-B163-D1FF0130F898}" type="slidenum">
               <a:rPr lang="en-US" smtClean="0"/>
-              <a:t>14</a:t>
+              <a:t>12</a:t>
             </a:fld>
             <a:endParaRPr lang="en-US"/>
           </a:p>
@@ -866,7 +906,7 @@
     </p:spTree>
     <p:extLst>
       <p:ext uri="{BB962C8B-B14F-4D97-AF65-F5344CB8AC3E}">
-        <p14:creationId xmlns:p14="http://schemas.microsoft.com/office/powerpoint/2010/main" val="1346195764"/>
+        <p14:creationId xmlns:p14="http://schemas.microsoft.com/office/powerpoint/2010/main" val="1043058576"/>
       </p:ext>
     </p:extLst>
   </p:cSld>
@@ -920,7 +960,26 @@
           <a:bodyPr/>
           <a:lstStyle/>
           <a:p>
-            <a:endParaRPr lang="en-US" dirty="0"/>
+            <a:r>
+              <a:rPr lang="en-US" dirty="0"/>
+              <a:t>The next example is to compute a per-flow average latency. The way this works is that you take all packets belonging to a flow, run a moving average filter over some attribute of the packet (such as the queueing latency) on every new packet that you receive. Our construct for this is the </a:t>
+            </a:r>
+            <a:r>
+              <a:rPr lang="en-US" dirty="0" err="1"/>
+              <a:t>groupby</a:t>
+            </a:r>
+            <a:r>
+              <a:rPr lang="en-US" dirty="0"/>
+              <a:t>, which is present both in SQL and many recent functional programming APIs. The </a:t>
+            </a:r>
+            <a:r>
+              <a:rPr lang="en-US" dirty="0" err="1"/>
+              <a:t>groupby</a:t>
+            </a:r>
+            <a:r>
+              <a:rPr lang="en-US" dirty="0"/>
+              <a:t> tells you how to partition the original stream into sub-streams. Here, you partition the filtered stream R1 using the packet’s 5 tuple. Then you supply what’s called a fold function that tells you how to maintain and update state across packets in each sub stream. Here, the fold function maintains an exponentially weighted moving average filter over the packets of each sub stream by applying a gain of alpha to the queuing latency of each packet and a gain of 1-alpha to the previous value of the exponentially weight moving average.</a:t>
+            </a:r>
           </a:p>
         </p:txBody>
       </p:sp>
@@ -941,7 +1000,7 @@
           <a:p>
             <a:fld id="{33793ACE-A489-1C41-B163-D1FF0130F898}" type="slidenum">
               <a:rPr lang="en-US" smtClean="0"/>
-              <a:t>15</a:t>
+              <a:t>13</a:t>
             </a:fld>
             <a:endParaRPr lang="en-US"/>
           </a:p>
@@ -950,7 +1009,7 @@
     </p:spTree>
     <p:extLst>
       <p:ext uri="{BB962C8B-B14F-4D97-AF65-F5344CB8AC3E}">
-        <p14:creationId xmlns:p14="http://schemas.microsoft.com/office/powerpoint/2010/main" val="1332604535"/>
+        <p14:creationId xmlns:p14="http://schemas.microsoft.com/office/powerpoint/2010/main" val="1793562882"/>
       </p:ext>
     </p:extLst>
   </p:cSld>
@@ -1004,7 +1063,75 @@
           <a:bodyPr/>
           <a:lstStyle/>
           <a:p>
-            <a:endParaRPr lang="en-US" dirty="0"/>
+            <a:r>
+              <a:rPr lang="en-US" baseline="0" dirty="0"/>
+              <a:t>Here’s a slightly more involved example of using the </a:t>
+            </a:r>
+            <a:r>
+              <a:rPr lang="en-US" baseline="0" dirty="0" err="1"/>
+              <a:t>groupby</a:t>
+            </a:r>
+            <a:r>
+              <a:rPr lang="en-US" baseline="0" dirty="0"/>
+              <a:t> construct. Again, we divide up the packet stream by 5tuple like the previous example. The fold function is different now and we use the fold function </a:t>
+            </a:r>
+            <a:r>
+              <a:rPr lang="en-US" baseline="0" dirty="0" err="1"/>
+              <a:t>bursty</a:t>
+            </a:r>
+            <a:r>
+              <a:rPr lang="en-US" baseline="0" dirty="0"/>
+              <a:t> to estimate how </a:t>
+            </a:r>
+            <a:r>
+              <a:rPr lang="en-US" baseline="0" dirty="0" err="1"/>
+              <a:t>bursty</a:t>
+            </a:r>
+            <a:r>
+              <a:rPr lang="en-US" baseline="0" dirty="0"/>
+              <a:t> each flow is. We do this by maintaining two pieces of state, </a:t>
+            </a:r>
+            <a:r>
+              <a:rPr lang="en-US" baseline="0" dirty="0" err="1"/>
+              <a:t>last_time</a:t>
+            </a:r>
+            <a:r>
+              <a:rPr lang="en-US" baseline="0" dirty="0"/>
+              <a:t> and </a:t>
+            </a:r>
+            <a:r>
+              <a:rPr lang="en-US" baseline="0" dirty="0" err="1"/>
+              <a:t>nbursts</a:t>
+            </a:r>
+            <a:r>
+              <a:rPr lang="en-US" baseline="0" dirty="0"/>
+              <a:t>. </a:t>
+            </a:r>
+            <a:r>
+              <a:rPr lang="en-US" baseline="0" dirty="0" err="1"/>
+              <a:t>Last_time</a:t>
+            </a:r>
+            <a:r>
+              <a:rPr lang="en-US" baseline="0" dirty="0"/>
+              <a:t> tracks the last time at which a packet from this flow was received and </a:t>
+            </a:r>
+            <a:r>
+              <a:rPr lang="en-US" baseline="0" dirty="0" err="1"/>
+              <a:t>nbursts</a:t>
+            </a:r>
+            <a:r>
+              <a:rPr lang="en-US" baseline="0" dirty="0"/>
+              <a:t> tracks the number of packet bursts so far.</a:t>
+            </a:r>
+          </a:p>
+          <a:p>
+            <a:endParaRPr lang="en-US" baseline="0" dirty="0"/>
+          </a:p>
+          <a:p>
+            <a:r>
+              <a:rPr lang="en-US" baseline="0" dirty="0"/>
+              <a:t>As you can see, the operator can write whatever they want in the fold function. Later, when we get to the hardware section, we’ll see what kinds of fold functions are efficiently implementable on such switch hardware.</a:t>
+            </a:r>
           </a:p>
         </p:txBody>
       </p:sp>
@@ -1025,7 +1152,7 @@
           <a:p>
             <a:fld id="{33793ACE-A489-1C41-B163-D1FF0130F898}" type="slidenum">
               <a:rPr lang="en-US" smtClean="0"/>
-              <a:t>16</a:t>
+              <a:t>14</a:t>
             </a:fld>
             <a:endParaRPr lang="en-US"/>
           </a:p>
@@ -1034,7 +1161,7 @@
     </p:spTree>
     <p:extLst>
       <p:ext uri="{BB962C8B-B14F-4D97-AF65-F5344CB8AC3E}">
-        <p14:creationId xmlns:p14="http://schemas.microsoft.com/office/powerpoint/2010/main" val="200401994"/>
+        <p14:creationId xmlns:p14="http://schemas.microsoft.com/office/powerpoint/2010/main" val="1346195764"/>
       </p:ext>
     </p:extLst>
   </p:cSld>
@@ -1088,7 +1215,18 @@
           <a:bodyPr/>
           <a:lstStyle/>
           <a:p>
-            <a:endParaRPr lang="en-US" dirty="0"/>
+            <a:r>
+              <a:rPr lang="en-US" dirty="0"/>
+              <a:t>To wrap up the language section, here’s a list of queries that we can express using the Marple query language. These include diagnosing problems at the transport level like </a:t>
+            </a:r>
+            <a:r>
+              <a:rPr lang="en-US" dirty="0" err="1"/>
+              <a:t>incast</a:t>
+            </a:r>
+            <a:r>
+              <a:rPr lang="en-US" dirty="0"/>
+              <a:t>, retransmissions, and microbursts. They also include flow-level metrics and network-level questions that span multiple switches such as high end-to-end latencies. The details of these queries are in our SIGCOMM 2017 paper.</a:t>
+            </a:r>
           </a:p>
         </p:txBody>
       </p:sp>
@@ -1109,7 +1247,7 @@
           <a:p>
             <a:fld id="{33793ACE-A489-1C41-B163-D1FF0130F898}" type="slidenum">
               <a:rPr lang="en-US" smtClean="0"/>
-              <a:t>17</a:t>
+              <a:t>15</a:t>
             </a:fld>
             <a:endParaRPr lang="en-US"/>
           </a:p>
@@ -1118,7 +1256,7 @@
     </p:spTree>
     <p:extLst>
       <p:ext uri="{BB962C8B-B14F-4D97-AF65-F5344CB8AC3E}">
-        <p14:creationId xmlns:p14="http://schemas.microsoft.com/office/powerpoint/2010/main" val="758351784"/>
+        <p14:creationId xmlns:p14="http://schemas.microsoft.com/office/powerpoint/2010/main" val="1332604535"/>
       </p:ext>
     </p:extLst>
   </p:cSld>
@@ -1172,7 +1310,10 @@
           <a:bodyPr/>
           <a:lstStyle/>
           <a:p>
-            <a:endParaRPr lang="en-US" dirty="0"/>
+            <a:r>
+              <a:rPr lang="en-US" dirty="0"/>
+              <a:t>OK. So far we have discussed the software or language portion of this work. Now let me talk about the hardware portion of the work. In other words, how do you implement Marple on switch hardware?</a:t>
+            </a:r>
           </a:p>
         </p:txBody>
       </p:sp>
@@ -1193,7 +1334,7 @@
           <a:p>
             <a:fld id="{33793ACE-A489-1C41-B163-D1FF0130F898}" type="slidenum">
               <a:rPr lang="en-US" smtClean="0"/>
-              <a:t>19</a:t>
+              <a:t>16</a:t>
             </a:fld>
             <a:endParaRPr lang="en-US"/>
           </a:p>
@@ -1202,7 +1343,7 @@
     </p:spTree>
     <p:extLst>
       <p:ext uri="{BB962C8B-B14F-4D97-AF65-F5344CB8AC3E}">
-        <p14:creationId xmlns:p14="http://schemas.microsoft.com/office/powerpoint/2010/main" val="1038519295"/>
+        <p14:creationId xmlns:p14="http://schemas.microsoft.com/office/powerpoint/2010/main" val="200401994"/>
       </p:ext>
     </p:extLst>
   </p:cSld>
@@ -1256,7 +1397,35 @@
           <a:bodyPr/>
           <a:lstStyle/>
           <a:p>
+            <a:r>
+              <a:rPr lang="en-US" dirty="0"/>
+              <a:t>Some of the constructs that Marple supports can be implemented in a straightforward manner using features of recent programmable switches like </a:t>
+            </a:r>
+            <a:r>
+              <a:rPr lang="en-US" dirty="0" err="1"/>
+              <a:t>Barefoot’s</a:t>
+            </a:r>
+            <a:r>
+              <a:rPr lang="en-US" dirty="0"/>
+              <a:t> Tofino and Cavium’s </a:t>
+            </a:r>
+            <a:r>
+              <a:rPr lang="en-US" dirty="0" err="1"/>
+              <a:t>Xpliant</a:t>
+            </a:r>
+            <a:r>
+              <a:rPr lang="en-US" dirty="0"/>
+              <a:t>. For instance, the queue ID, enqueue time (tin), dequeue time (tout), and queue size at enqueue are available as part of proposals like in-band network telemetry.</a:t>
+            </a:r>
+          </a:p>
+          <a:p>
             <a:endParaRPr lang="en-US" dirty="0"/>
+          </a:p>
+          <a:p>
+            <a:r>
+              <a:rPr lang="en-US" dirty="0"/>
+              <a:t>Next, the filter, map, and zip operate on packet headers without touching any state on the switch. They map to match-action rules within emerging programmable switch architectures such as RMT, which is the basis for the Barefoot Tofino switch.</a:t>
+            </a:r>
           </a:p>
         </p:txBody>
       </p:sp>
@@ -1277,7 +1446,7 @@
           <a:p>
             <a:fld id="{33793ACE-A489-1C41-B163-D1FF0130F898}" type="slidenum">
               <a:rPr lang="en-US" smtClean="0"/>
-              <a:t>20</a:t>
+              <a:t>17</a:t>
             </a:fld>
             <a:endParaRPr lang="en-US"/>
           </a:p>
@@ -1286,7 +1455,7 @@
     </p:spTree>
     <p:extLst>
       <p:ext uri="{BB962C8B-B14F-4D97-AF65-F5344CB8AC3E}">
-        <p14:creationId xmlns:p14="http://schemas.microsoft.com/office/powerpoint/2010/main" val="347832182"/>
+        <p14:creationId xmlns:p14="http://schemas.microsoft.com/office/powerpoint/2010/main" val="758351784"/>
       </p:ext>
     </p:extLst>
   </p:cSld>
@@ -1342,29 +1511,24 @@
           <a:p>
             <a:r>
               <a:rPr lang="en-US" dirty="0"/>
-              <a:t>On-chip cache of the key-value store is in SRAM</a:t>
-            </a:r>
-          </a:p>
-          <a:p>
-            <a:endParaRPr lang="en-US" dirty="0"/>
-          </a:p>
-          <a:p>
+              <a:t>So now let’s turn to the Marple language construct </a:t>
+            </a:r>
+            <a:r>
+              <a:rPr lang="en-US" dirty="0" err="1"/>
+              <a:t>groupby</a:t>
+            </a:r>
             <a:r>
               <a:rPr lang="en-US" dirty="0"/>
-              <a:t>Off-chip backing store is in DRAM</a:t>
-            </a:r>
-          </a:p>
-          <a:p>
-            <a:endParaRPr lang="en-US" dirty="0"/>
-          </a:p>
-          <a:p>
+              <a:t>. Unlike the previous constructs, the </a:t>
+            </a:r>
+            <a:r>
+              <a:rPr lang="en-US" dirty="0" err="1"/>
+              <a:t>groupby</a:t>
+            </a:r>
             <a:r>
               <a:rPr lang="en-US" dirty="0"/>
-              <a:t>But: cache misses lead to router pipeline stalls and non-determinism</a:t>
-            </a:r>
-          </a:p>
-          <a:p>
-            <a:endParaRPr lang="en-US" dirty="0"/>
+              <a:t> construct _cannot_ be efficiently supported by programmable switches as they stand today. In other words, we need to design a new hardware instruction for this construct. Let’s look at how we do that.</a:t>
+            </a:r>
           </a:p>
         </p:txBody>
       </p:sp>
@@ -1385,7 +1549,7 @@
           <a:p>
             <a:fld id="{33793ACE-A489-1C41-B163-D1FF0130F898}" type="slidenum">
               <a:rPr lang="en-US" smtClean="0"/>
-              <a:t>22</a:t>
+              <a:t>18</a:t>
             </a:fld>
             <a:endParaRPr lang="en-US"/>
           </a:p>
@@ -1394,7 +1558,7 @@
     </p:spTree>
     <p:extLst>
       <p:ext uri="{BB962C8B-B14F-4D97-AF65-F5344CB8AC3E}">
-        <p14:creationId xmlns:p14="http://schemas.microsoft.com/office/powerpoint/2010/main" val="952353752"/>
+        <p14:creationId xmlns:p14="http://schemas.microsoft.com/office/powerpoint/2010/main" val="4081407173"/>
       </p:ext>
     </p:extLst>
   </p:cSld>
@@ -1448,7 +1612,66 @@
           <a:bodyPr/>
           <a:lstStyle/>
           <a:p>
-            <a:endParaRPr lang="en-US" dirty="0"/>
+            <a:r>
+              <a:rPr lang="en-US" dirty="0"/>
+              <a:t>Let’s look at the EWMA </a:t>
+            </a:r>
+            <a:r>
+              <a:rPr lang="en-US" dirty="0" err="1"/>
+              <a:t>groupby</a:t>
+            </a:r>
+            <a:r>
+              <a:rPr lang="en-US" dirty="0"/>
+              <a:t> query to understand the challenges involved in implementing </a:t>
+            </a:r>
+            <a:r>
+              <a:rPr lang="en-US" dirty="0" err="1"/>
+              <a:t>groupbys</a:t>
+            </a:r>
+            <a:r>
+              <a:rPr lang="en-US" dirty="0"/>
+              <a:t> efficiently in switch hardware. This query needs to do two things: it needs to be fast so that it can compute and update the </a:t>
+            </a:r>
+            <a:r>
+              <a:rPr lang="en-US" dirty="0" err="1"/>
+              <a:t>ewma</a:t>
+            </a:r>
+            <a:r>
+              <a:rPr lang="en-US" dirty="0"/>
+              <a:t> value </a:t>
+            </a:r>
+            <a:r>
+              <a:rPr lang="en-US" dirty="0" err="1"/>
+              <a:t>avg</a:t>
+            </a:r>
+            <a:r>
+              <a:rPr lang="en-US" dirty="0"/>
+              <a:t> every packet, which is roughly every ns on high-end switches today. It also needs to have sufficient space to store a large number of </a:t>
+            </a:r>
+            <a:r>
+              <a:rPr lang="en-US" dirty="0" err="1"/>
+              <a:t>groupby</a:t>
+            </a:r>
+            <a:r>
+              <a:rPr lang="en-US" dirty="0"/>
+              <a:t> partitions because the </a:t>
+            </a:r>
+            <a:r>
+              <a:rPr lang="en-US" dirty="0" err="1"/>
+              <a:t>groupby</a:t>
+            </a:r>
+            <a:r>
+              <a:rPr lang="en-US" dirty="0"/>
+              <a:t> can run at very fine granularity such as a 5-tuple. In other words, we need the memory implementing this </a:t>
+            </a:r>
+            <a:r>
+              <a:rPr lang="en-US" dirty="0" err="1"/>
+              <a:t>groupby</a:t>
+            </a:r>
+            <a:r>
+              <a:rPr lang="en-US" dirty="0"/>
+              <a:t> to be both fast to support quick updates and large to store the average for a large number of flows.</a:t>
+            </a:r>
           </a:p>
         </p:txBody>
       </p:sp>
@@ -1469,7 +1692,7 @@
           <a:p>
             <a:fld id="{33793ACE-A489-1C41-B163-D1FF0130F898}" type="slidenum">
               <a:rPr lang="en-US" smtClean="0"/>
-              <a:t>23</a:t>
+              <a:t>19</a:t>
             </a:fld>
             <a:endParaRPr lang="en-US"/>
           </a:p>
@@ -1478,7 +1701,7 @@
     </p:spTree>
     <p:extLst>
       <p:ext uri="{BB962C8B-B14F-4D97-AF65-F5344CB8AC3E}">
-        <p14:creationId xmlns:p14="http://schemas.microsoft.com/office/powerpoint/2010/main" val="522733436"/>
+        <p14:creationId xmlns:p14="http://schemas.microsoft.com/office/powerpoint/2010/main" val="1038519295"/>
       </p:ext>
     </p:extLst>
   </p:cSld>
@@ -1646,7 +1869,10 @@
           <a:bodyPr/>
           <a:lstStyle/>
           <a:p>
-            <a:endParaRPr lang="en-US" dirty="0"/>
+            <a:r>
+              <a:rPr lang="en-US" dirty="0"/>
+              <a:t>But the problem is no existing mainstream memory technology guarantees both fast access and is sufficiently dense to store a large number of flows. SRAM is fast, but you can’t store too many flow entries in SRAM. DRAM is dense and allows you to store many entries, but DRAM is slow.</a:t>
+            </a:r>
           </a:p>
         </p:txBody>
       </p:sp>
@@ -1667,7 +1893,7 @@
           <a:p>
             <a:fld id="{33793ACE-A489-1C41-B163-D1FF0130F898}" type="slidenum">
               <a:rPr lang="en-US" smtClean="0"/>
-              <a:t>24</a:t>
+              <a:t>20</a:t>
             </a:fld>
             <a:endParaRPr lang="en-US"/>
           </a:p>
@@ -1676,7 +1902,7 @@
     </p:spTree>
     <p:extLst>
       <p:ext uri="{BB962C8B-B14F-4D97-AF65-F5344CB8AC3E}">
-        <p14:creationId xmlns:p14="http://schemas.microsoft.com/office/powerpoint/2010/main" val="800855353"/>
+        <p14:creationId xmlns:p14="http://schemas.microsoft.com/office/powerpoint/2010/main" val="347832182"/>
       </p:ext>
     </p:extLst>
   </p:cSld>
@@ -1730,7 +1956,10 @@
           <a:bodyPr/>
           <a:lstStyle/>
           <a:p>
-            <a:endParaRPr lang="en-US" dirty="0"/>
+            <a:r>
+              <a:rPr lang="en-US" dirty="0"/>
+              <a:t>The standard systems solution to this is caching, which is used in processors to provide the illusion of both fast and large memory. You essentially use a fast SRAM key-value store as a cache for the larger backing store for the k-v store in DRAM.</a:t>
+            </a:r>
           </a:p>
         </p:txBody>
       </p:sp>
@@ -1751,7 +1980,7 @@
           <a:p>
             <a:fld id="{33793ACE-A489-1C41-B163-D1FF0130F898}" type="slidenum">
               <a:rPr lang="en-US" smtClean="0"/>
-              <a:t>25</a:t>
+              <a:t>21</a:t>
             </a:fld>
             <a:endParaRPr lang="en-US"/>
           </a:p>
@@ -1760,7 +1989,7 @@
     </p:spTree>
     <p:extLst>
       <p:ext uri="{BB962C8B-B14F-4D97-AF65-F5344CB8AC3E}">
-        <p14:creationId xmlns:p14="http://schemas.microsoft.com/office/powerpoint/2010/main" val="1947867185"/>
+        <p14:creationId xmlns:p14="http://schemas.microsoft.com/office/powerpoint/2010/main" val="4192375948"/>
       </p:ext>
     </p:extLst>
   </p:cSld>
@@ -1816,8 +2045,19 @@
           <a:p>
             <a:r>
               <a:rPr lang="en-US" dirty="0"/>
-              <a:t>Stress that DRAM is built for the average case.</a:t>
-            </a:r>
+              <a:t>So this is how it looks. There is an on-chip cache that stores keys and values corresponding to </a:t>
+            </a:r>
+            <a:r>
+              <a:rPr lang="en-US" dirty="0" err="1"/>
+              <a:t>groupby</a:t>
+            </a:r>
+            <a:r>
+              <a:rPr lang="en-US" dirty="0"/>
+              <a:t> partitions and the state maintained by the fold function. In the EWMA case, the key stores the 5-tuple and the value stores the avg.</a:t>
+            </a:r>
+          </a:p>
+          <a:p>
+            <a:endParaRPr lang="en-US" dirty="0"/>
           </a:p>
         </p:txBody>
       </p:sp>
@@ -1838,7 +2078,7 @@
           <a:p>
             <a:fld id="{33793ACE-A489-1C41-B163-D1FF0130F898}" type="slidenum">
               <a:rPr lang="en-US" smtClean="0"/>
-              <a:t>26</a:t>
+              <a:t>22</a:t>
             </a:fld>
             <a:endParaRPr lang="en-US"/>
           </a:p>
@@ -1847,7 +2087,7 @@
     </p:spTree>
     <p:extLst>
       <p:ext uri="{BB962C8B-B14F-4D97-AF65-F5344CB8AC3E}">
-        <p14:creationId xmlns:p14="http://schemas.microsoft.com/office/powerpoint/2010/main" val="990843651"/>
+        <p14:creationId xmlns:p14="http://schemas.microsoft.com/office/powerpoint/2010/main" val="952353752"/>
       </p:ext>
     </p:extLst>
   </p:cSld>
@@ -1901,7 +2141,10 @@
           <a:bodyPr/>
           <a:lstStyle/>
           <a:p>
-            <a:endParaRPr lang="en-US" dirty="0"/>
+            <a:r>
+              <a:rPr lang="en-US" dirty="0"/>
+              <a:t>During normal operation when there is a hit in the cache, this is how things work. You attempt to read the value for a particular 5-tuple key K. You modify the value using the EWMA fold function. You then write back the updated value in the cache. So far so good.</a:t>
+            </a:r>
           </a:p>
         </p:txBody>
       </p:sp>
@@ -1922,7 +2165,7 @@
           <a:p>
             <a:fld id="{33793ACE-A489-1C41-B163-D1FF0130F898}" type="slidenum">
               <a:rPr lang="en-US" smtClean="0"/>
-              <a:t>28</a:t>
+              <a:t>23</a:t>
             </a:fld>
             <a:endParaRPr lang="en-US"/>
           </a:p>
@@ -1931,7 +2174,7 @@
     </p:spTree>
     <p:extLst>
       <p:ext uri="{BB962C8B-B14F-4D97-AF65-F5344CB8AC3E}">
-        <p14:creationId xmlns:p14="http://schemas.microsoft.com/office/powerpoint/2010/main" val="900537696"/>
+        <p14:creationId xmlns:p14="http://schemas.microsoft.com/office/powerpoint/2010/main" val="522733436"/>
       </p:ext>
     </p:extLst>
   </p:cSld>
@@ -1985,7 +2228,10 @@
           <a:bodyPr/>
           <a:lstStyle/>
           <a:p>
-            <a:endParaRPr lang="en-US" dirty="0"/>
+            <a:r>
+              <a:rPr lang="en-US" dirty="0"/>
+              <a:t>Now, let’s look at what happens on a cache miss. You don’t find the key, So you go to the backing store to request it. It sends it back. You insert it into the cache as you would in a processor cache. Then you update it in place.</a:t>
+            </a:r>
           </a:p>
         </p:txBody>
       </p:sp>
@@ -2006,7 +2252,7 @@
           <a:p>
             <a:fld id="{33793ACE-A489-1C41-B163-D1FF0130F898}" type="slidenum">
               <a:rPr lang="en-US" smtClean="0"/>
-              <a:t>29</a:t>
+              <a:t>24</a:t>
             </a:fld>
             <a:endParaRPr lang="en-US"/>
           </a:p>
@@ -2015,7 +2261,7 @@
     </p:spTree>
     <p:extLst>
       <p:ext uri="{BB962C8B-B14F-4D97-AF65-F5344CB8AC3E}">
-        <p14:creationId xmlns:p14="http://schemas.microsoft.com/office/powerpoint/2010/main" val="3327761693"/>
+        <p14:creationId xmlns:p14="http://schemas.microsoft.com/office/powerpoint/2010/main" val="800855353"/>
       </p:ext>
     </p:extLst>
   </p:cSld>
@@ -2090,7 +2336,7 @@
           <a:p>
             <a:fld id="{33793ACE-A489-1C41-B163-D1FF0130F898}" type="slidenum">
               <a:rPr lang="en-US" smtClean="0"/>
-              <a:t>30</a:t>
+              <a:t>25</a:t>
             </a:fld>
             <a:endParaRPr lang="en-US"/>
           </a:p>
@@ -2099,7 +2345,7 @@
     </p:spTree>
     <p:extLst>
       <p:ext uri="{BB962C8B-B14F-4D97-AF65-F5344CB8AC3E}">
-        <p14:creationId xmlns:p14="http://schemas.microsoft.com/office/powerpoint/2010/main" val="1966495659"/>
+        <p14:creationId xmlns:p14="http://schemas.microsoft.com/office/powerpoint/2010/main" val="1947867185"/>
       </p:ext>
     </p:extLst>
   </p:cSld>
@@ -2153,7 +2399,10 @@
           <a:bodyPr/>
           <a:lstStyle/>
           <a:p>
-            <a:endParaRPr lang="en-US" dirty="0"/>
+            <a:r>
+              <a:rPr lang="en-US" dirty="0"/>
+              <a:t>The problem is that the modify and write must wait for the DRAM access latency to fetch the backing store’s information and insert it into the cache. DRAM access latencies are highly variable depending on the access pattern. This is because DRAMs are typically built for good average case performance and the worst-case performance can be quite bad.</a:t>
+            </a:r>
           </a:p>
         </p:txBody>
       </p:sp>
@@ -2174,7 +2423,7 @@
           <a:p>
             <a:fld id="{33793ACE-A489-1C41-B163-D1FF0130F898}" type="slidenum">
               <a:rPr lang="en-US" smtClean="0"/>
-              <a:t>31</a:t>
+              <a:t>26</a:t>
             </a:fld>
             <a:endParaRPr lang="en-US"/>
           </a:p>
@@ -2183,7 +2432,7 @@
     </p:spTree>
     <p:extLst>
       <p:ext uri="{BB962C8B-B14F-4D97-AF65-F5344CB8AC3E}">
-        <p14:creationId xmlns:p14="http://schemas.microsoft.com/office/powerpoint/2010/main" val="242796124"/>
+        <p14:creationId xmlns:p14="http://schemas.microsoft.com/office/powerpoint/2010/main" val="990843651"/>
       </p:ext>
     </p:extLst>
   </p:cSld>
@@ -2237,7 +2486,10 @@
           <a:bodyPr/>
           <a:lstStyle/>
           <a:p>
-            <a:endParaRPr lang="en-US" dirty="0"/>
+            <a:r>
+              <a:rPr lang="en-US" dirty="0"/>
+              <a:t>Instead, our main design difference in the key-value store is to treat cache misses as packets from new flows.</a:t>
+            </a:r>
           </a:p>
         </p:txBody>
       </p:sp>
@@ -2258,7 +2510,7 @@
           <a:p>
             <a:fld id="{33793ACE-A489-1C41-B163-D1FF0130F898}" type="slidenum">
               <a:rPr lang="en-US" smtClean="0"/>
-              <a:t>32</a:t>
+              <a:t>27</a:t>
             </a:fld>
             <a:endParaRPr lang="en-US"/>
           </a:p>
@@ -2267,7 +2519,7 @@
     </p:spTree>
     <p:extLst>
       <p:ext uri="{BB962C8B-B14F-4D97-AF65-F5344CB8AC3E}">
-        <p14:creationId xmlns:p14="http://schemas.microsoft.com/office/powerpoint/2010/main" val="1397397987"/>
+        <p14:creationId xmlns:p14="http://schemas.microsoft.com/office/powerpoint/2010/main" val="3452678492"/>
       </p:ext>
     </p:extLst>
   </p:cSld>
@@ -2321,7 +2573,10 @@
           <a:bodyPr/>
           <a:lstStyle/>
           <a:p>
-            <a:endParaRPr lang="en-US" dirty="0"/>
+            <a:r>
+              <a:rPr lang="en-US" dirty="0"/>
+              <a:t>What does this mean? When a key that isn’t present in the key-value store shows up, we treat it like a new key-–even if this key was previously evicted and written to the backing store.</a:t>
+            </a:r>
           </a:p>
         </p:txBody>
       </p:sp>
@@ -2342,7 +2597,7 @@
           <a:p>
             <a:fld id="{33793ACE-A489-1C41-B163-D1FF0130F898}" type="slidenum">
               <a:rPr lang="en-US" smtClean="0"/>
-              <a:t>33</a:t>
+              <a:t>28</a:t>
             </a:fld>
             <a:endParaRPr lang="en-US"/>
           </a:p>
@@ -2351,7 +2606,7 @@
     </p:spTree>
     <p:extLst>
       <p:ext uri="{BB962C8B-B14F-4D97-AF65-F5344CB8AC3E}">
-        <p14:creationId xmlns:p14="http://schemas.microsoft.com/office/powerpoint/2010/main" val="4107288094"/>
+        <p14:creationId xmlns:p14="http://schemas.microsoft.com/office/powerpoint/2010/main" val="900537696"/>
       </p:ext>
     </p:extLst>
   </p:cSld>
@@ -2405,7 +2660,10 @@
           <a:bodyPr/>
           <a:lstStyle/>
           <a:p>
-            <a:endParaRPr lang="en-US" dirty="0"/>
+            <a:r>
+              <a:rPr lang="en-US" dirty="0"/>
+              <a:t>Then, eventually at some point, this key will be evicted to the backing store to make room for a new key.</a:t>
+            </a:r>
           </a:p>
         </p:txBody>
       </p:sp>
@@ -2426,7 +2684,7 @@
           <a:p>
             <a:fld id="{33793ACE-A489-1C41-B163-D1FF0130F898}" type="slidenum">
               <a:rPr lang="en-US" smtClean="0"/>
-              <a:t>34</a:t>
+              <a:t>29</a:t>
             </a:fld>
             <a:endParaRPr lang="en-US"/>
           </a:p>
@@ -2435,7 +2693,7 @@
     </p:spTree>
     <p:extLst>
       <p:ext uri="{BB962C8B-B14F-4D97-AF65-F5344CB8AC3E}">
-        <p14:creationId xmlns:p14="http://schemas.microsoft.com/office/powerpoint/2010/main" val="343367192"/>
+        <p14:creationId xmlns:p14="http://schemas.microsoft.com/office/powerpoint/2010/main" val="3327761693"/>
       </p:ext>
     </p:extLst>
   </p:cSld>
@@ -2576,7 +2834,18 @@
           <a:bodyPr/>
           <a:lstStyle/>
           <a:p>
-            <a:endParaRPr lang="en-US" dirty="0"/>
+            <a:r>
+              <a:rPr lang="en-US" dirty="0"/>
+              <a:t>At this point, we merge the key’s value with the old value for the same key in the backing store. If the key doesn’t already exist in the backing store, we just write the </a:t>
+            </a:r>
+            <a:r>
+              <a:rPr lang="en-US" dirty="0" err="1"/>
+              <a:t>evlcted</a:t>
+            </a:r>
+            <a:r>
+              <a:rPr lang="en-US" dirty="0"/>
+              <a:t> value into the backing store.</a:t>
+            </a:r>
           </a:p>
         </p:txBody>
       </p:sp>
@@ -2597,7 +2866,7 @@
           <a:p>
             <a:fld id="{33793ACE-A489-1C41-B163-D1FF0130F898}" type="slidenum">
               <a:rPr lang="en-US" smtClean="0"/>
-              <a:t>35</a:t>
+              <a:t>30</a:t>
             </a:fld>
             <a:endParaRPr lang="en-US"/>
           </a:p>
@@ -2606,7 +2875,7 @@
     </p:spTree>
     <p:extLst>
       <p:ext uri="{BB962C8B-B14F-4D97-AF65-F5344CB8AC3E}">
-        <p14:creationId xmlns:p14="http://schemas.microsoft.com/office/powerpoint/2010/main" val="1604544374"/>
+        <p14:creationId xmlns:p14="http://schemas.microsoft.com/office/powerpoint/2010/main" val="1966495659"/>
       </p:ext>
     </p:extLst>
   </p:cSld>
@@ -2660,7 +2929,10 @@
           <a:bodyPr/>
           <a:lstStyle/>
           <a:p>
-            <a:endParaRPr lang="en-US" dirty="0"/>
+            <a:r>
+              <a:rPr lang="en-US" dirty="0"/>
+              <a:t>The benefit of this design  is that there is no waiting on the critical path of packet processing and packet processing can proceed as usual.</a:t>
+            </a:r>
           </a:p>
         </p:txBody>
       </p:sp>
@@ -2681,7 +2953,7 @@
           <a:p>
             <a:fld id="{33793ACE-A489-1C41-B163-D1FF0130F898}" type="slidenum">
               <a:rPr lang="en-US" smtClean="0"/>
-              <a:t>36</a:t>
+              <a:t>31</a:t>
             </a:fld>
             <a:endParaRPr lang="en-US"/>
           </a:p>
@@ -2690,7 +2962,7 @@
     </p:spTree>
     <p:extLst>
       <p:ext uri="{BB962C8B-B14F-4D97-AF65-F5344CB8AC3E}">
-        <p14:creationId xmlns:p14="http://schemas.microsoft.com/office/powerpoint/2010/main" val="2674820201"/>
+        <p14:creationId xmlns:p14="http://schemas.microsoft.com/office/powerpoint/2010/main" val="242796124"/>
       </p:ext>
     </p:extLst>
   </p:cSld>
@@ -2746,7 +3018,7 @@
           <a:p>
             <a:r>
               <a:rPr lang="en-US" dirty="0"/>
-              <a:t>Say that the more formal result is in the paper.</a:t>
+              <a:t>But how do I merge an old and new value for a given key? What does that even mean? Let’s look at this problem more formally. We want to merge the two values, old and new, so that it is as if the fold function ran over the entire packet stream without any evictions. That way we can retain full accuracy while merging. Let’s introduce some notation for this. Let’s represent the statistics operation as a function g over the packet sequence. For a simple counter, the function is the sum of the packet lengths (or any other packet header).</a:t>
             </a:r>
           </a:p>
         </p:txBody>
@@ -2768,7 +3040,7 @@
           <a:p>
             <a:fld id="{33793ACE-A489-1C41-B163-D1FF0130F898}" type="slidenum">
               <a:rPr lang="en-US" smtClean="0"/>
-              <a:t>37</a:t>
+              <a:t>32</a:t>
             </a:fld>
             <a:endParaRPr lang="en-US"/>
           </a:p>
@@ -2777,7 +3049,7 @@
     </p:spTree>
     <p:extLst>
       <p:ext uri="{BB962C8B-B14F-4D97-AF65-F5344CB8AC3E}">
-        <p14:creationId xmlns:p14="http://schemas.microsoft.com/office/powerpoint/2010/main" val="1598300738"/>
+        <p14:creationId xmlns:p14="http://schemas.microsoft.com/office/powerpoint/2010/main" val="1397397987"/>
       </p:ext>
     </p:extLst>
   </p:cSld>
@@ -2831,7 +3103,21 @@
           <a:bodyPr/>
           <a:lstStyle/>
           <a:p>
-            <a:endParaRPr lang="en-US" baseline="0" dirty="0"/>
+            <a:r>
+              <a:rPr lang="en-US" dirty="0"/>
+              <a:t>Now what does it formally mean to merge the old and new values of a key?</a:t>
+            </a:r>
+          </a:p>
+          <a:p>
+            <a:r>
+              <a:rPr lang="en-US" dirty="0"/>
+              <a:t>TODO</a:t>
+            </a:r>
+            <a:r>
+              <a:rPr lang="en-US"/>
+              <a:t>: resume here.</a:t>
+            </a:r>
+            <a:endParaRPr lang="en-US" dirty="0"/>
           </a:p>
         </p:txBody>
       </p:sp>
@@ -2852,7 +3138,7 @@
           <a:p>
             <a:fld id="{33793ACE-A489-1C41-B163-D1FF0130F898}" type="slidenum">
               <a:rPr lang="en-US" smtClean="0"/>
-              <a:t>38</a:t>
+              <a:t>33</a:t>
             </a:fld>
             <a:endParaRPr lang="en-US"/>
           </a:p>
@@ -2861,7 +3147,7 @@
     </p:spTree>
     <p:extLst>
       <p:ext uri="{BB962C8B-B14F-4D97-AF65-F5344CB8AC3E}">
-        <p14:creationId xmlns:p14="http://schemas.microsoft.com/office/powerpoint/2010/main" val="1247180721"/>
+        <p14:creationId xmlns:p14="http://schemas.microsoft.com/office/powerpoint/2010/main" val="4107288094"/>
       </p:ext>
     </p:extLst>
   </p:cSld>
@@ -2934,9 +3220,9 @@
           <a:bodyPr/>
           <a:lstStyle/>
           <a:p>
-            <a:fld id="{16B09458-7AEF-4AD3-A567-0F11380064BE}" type="slidenum">
+            <a:fld id="{33793ACE-A489-1C41-B163-D1FF0130F898}" type="slidenum">
               <a:rPr lang="en-US" smtClean="0"/>
-              <a:t>39</a:t>
+              <a:t>34</a:t>
             </a:fld>
             <a:endParaRPr lang="en-US"/>
           </a:p>
@@ -2945,7 +3231,7 @@
     </p:spTree>
     <p:extLst>
       <p:ext uri="{BB962C8B-B14F-4D97-AF65-F5344CB8AC3E}">
-        <p14:creationId xmlns:p14="http://schemas.microsoft.com/office/powerpoint/2010/main" val="1026201290"/>
+        <p14:creationId xmlns:p14="http://schemas.microsoft.com/office/powerpoint/2010/main" val="343367192"/>
       </p:ext>
     </p:extLst>
   </p:cSld>
@@ -3020,7 +3306,7 @@
           <a:p>
             <a:fld id="{33793ACE-A489-1C41-B163-D1FF0130F898}" type="slidenum">
               <a:rPr lang="en-US" smtClean="0"/>
-              <a:t>41</a:t>
+              <a:t>35</a:t>
             </a:fld>
             <a:endParaRPr lang="en-US"/>
           </a:p>
@@ -3029,7 +3315,7 @@
     </p:spTree>
     <p:extLst>
       <p:ext uri="{BB962C8B-B14F-4D97-AF65-F5344CB8AC3E}">
-        <p14:creationId xmlns:p14="http://schemas.microsoft.com/office/powerpoint/2010/main" val="715696249"/>
+        <p14:creationId xmlns:p14="http://schemas.microsoft.com/office/powerpoint/2010/main" val="1604544374"/>
       </p:ext>
     </p:extLst>
   </p:cSld>
@@ -3104,7 +3390,7 @@
           <a:p>
             <a:fld id="{33793ACE-A489-1C41-B163-D1FF0130F898}" type="slidenum">
               <a:rPr lang="en-US" smtClean="0"/>
-              <a:t>42</a:t>
+              <a:t>36</a:t>
             </a:fld>
             <a:endParaRPr lang="en-US"/>
           </a:p>
@@ -3113,7 +3399,7 @@
     </p:spTree>
     <p:extLst>
       <p:ext uri="{BB962C8B-B14F-4D97-AF65-F5344CB8AC3E}">
-        <p14:creationId xmlns:p14="http://schemas.microsoft.com/office/powerpoint/2010/main" val="1582905122"/>
+        <p14:creationId xmlns:p14="http://schemas.microsoft.com/office/powerpoint/2010/main" val="2674820201"/>
       </p:ext>
     </p:extLst>
   </p:cSld>
@@ -3167,7 +3453,10 @@
           <a:bodyPr/>
           <a:lstStyle/>
           <a:p>
-            <a:endParaRPr lang="en-US" dirty="0"/>
+            <a:r>
+              <a:rPr lang="en-US" dirty="0"/>
+              <a:t>Say that the more formal result is in the paper.</a:t>
+            </a:r>
           </a:p>
         </p:txBody>
       </p:sp>
@@ -3188,7 +3477,7 @@
           <a:p>
             <a:fld id="{33793ACE-A489-1C41-B163-D1FF0130F898}" type="slidenum">
               <a:rPr lang="en-US" smtClean="0"/>
-              <a:t>43</a:t>
+              <a:t>37</a:t>
             </a:fld>
             <a:endParaRPr lang="en-US"/>
           </a:p>
@@ -3197,7 +3486,7 @@
     </p:spTree>
     <p:extLst>
       <p:ext uri="{BB962C8B-B14F-4D97-AF65-F5344CB8AC3E}">
-        <p14:creationId xmlns:p14="http://schemas.microsoft.com/office/powerpoint/2010/main" val="996105604"/>
+        <p14:creationId xmlns:p14="http://schemas.microsoft.com/office/powerpoint/2010/main" val="1598300738"/>
       </p:ext>
     </p:extLst>
   </p:cSld>
@@ -3251,7 +3540,7 @@
           <a:bodyPr/>
           <a:lstStyle/>
           <a:p>
-            <a:endParaRPr lang="en-US" dirty="0"/>
+            <a:endParaRPr lang="en-US" baseline="0" dirty="0"/>
           </a:p>
         </p:txBody>
       </p:sp>
@@ -3272,7 +3561,7 @@
           <a:p>
             <a:fld id="{33793ACE-A489-1C41-B163-D1FF0130F898}" type="slidenum">
               <a:rPr lang="en-US" smtClean="0"/>
-              <a:t>46</a:t>
+              <a:t>38</a:t>
             </a:fld>
             <a:endParaRPr lang="en-US"/>
           </a:p>
@@ -3281,7 +3570,7 @@
     </p:spTree>
     <p:extLst>
       <p:ext uri="{BB962C8B-B14F-4D97-AF65-F5344CB8AC3E}">
-        <p14:creationId xmlns:p14="http://schemas.microsoft.com/office/powerpoint/2010/main" val="8400029"/>
+        <p14:creationId xmlns:p14="http://schemas.microsoft.com/office/powerpoint/2010/main" val="1247180721"/>
       </p:ext>
     </p:extLst>
   </p:cSld>
@@ -3335,7 +3624,6 @@
           <a:bodyPr/>
           <a:lstStyle/>
           <a:p>
-            <a:pPr lvl="1"/>
             <a:endParaRPr lang="en-US" dirty="0"/>
           </a:p>
         </p:txBody>
@@ -3355,9 +3643,9 @@
           <a:bodyPr/>
           <a:lstStyle/>
           <a:p>
-            <a:fld id="{33793ACE-A489-1C41-B163-D1FF0130F898}" type="slidenum">
+            <a:fld id="{16B09458-7AEF-4AD3-A567-0F11380064BE}" type="slidenum">
               <a:rPr lang="en-US" smtClean="0"/>
-              <a:t>48</a:t>
+              <a:t>39</a:t>
             </a:fld>
             <a:endParaRPr lang="en-US"/>
           </a:p>
@@ -3366,7 +3654,7 @@
     </p:spTree>
     <p:extLst>
       <p:ext uri="{BB962C8B-B14F-4D97-AF65-F5344CB8AC3E}">
-        <p14:creationId xmlns:p14="http://schemas.microsoft.com/office/powerpoint/2010/main" val="1117120813"/>
+        <p14:creationId xmlns:p14="http://schemas.microsoft.com/office/powerpoint/2010/main" val="1026201290"/>
       </p:ext>
     </p:extLst>
   </p:cSld>
@@ -3454,6 +3742,427 @@
     <p:extLst>
       <p:ext uri="{BB962C8B-B14F-4D97-AF65-F5344CB8AC3E}">
         <p14:creationId xmlns:p14="http://schemas.microsoft.com/office/powerpoint/2010/main" val="1950720462"/>
+      </p:ext>
+    </p:extLst>
+  </p:cSld>
+  <p:clrMapOvr>
+    <a:masterClrMapping/>
+  </p:clrMapOvr>
+</p:notes>
+</file>
+
+<file path=ppt/notesSlides/notesSlide40.xml><?xml version="1.0" encoding="utf-8"?>
+<p:notes xmlns:a="http://schemas.openxmlformats.org/drawingml/2006/main" xmlns:r="http://schemas.openxmlformats.org/officeDocument/2006/relationships" xmlns:p="http://schemas.openxmlformats.org/presentationml/2006/main">
+  <p:cSld>
+    <p:spTree>
+      <p:nvGrpSpPr>
+        <p:cNvPr id="1" name=""/>
+        <p:cNvGrpSpPr/>
+        <p:nvPr/>
+      </p:nvGrpSpPr>
+      <p:grpSpPr>
+        <a:xfrm>
+          <a:off x="0" y="0"/>
+          <a:ext cx="0" cy="0"/>
+          <a:chOff x="0" y="0"/>
+          <a:chExt cx="0" cy="0"/>
+        </a:xfrm>
+      </p:grpSpPr>
+      <p:sp>
+        <p:nvSpPr>
+          <p:cNvPr id="2" name="Slide Image Placeholder 1"/>
+          <p:cNvSpPr>
+            <a:spLocks noGrp="1" noRot="1" noChangeAspect="1"/>
+          </p:cNvSpPr>
+          <p:nvPr>
+            <p:ph type="sldImg"/>
+          </p:nvPr>
+        </p:nvSpPr>
+        <p:spPr/>
+      </p:sp>
+      <p:sp>
+        <p:nvSpPr>
+          <p:cNvPr id="3" name="Notes Placeholder 2"/>
+          <p:cNvSpPr>
+            <a:spLocks noGrp="1"/>
+          </p:cNvSpPr>
+          <p:nvPr>
+            <p:ph type="body" idx="1"/>
+          </p:nvPr>
+        </p:nvSpPr>
+        <p:spPr/>
+        <p:txBody>
+          <a:bodyPr/>
+          <a:lstStyle/>
+          <a:p>
+            <a:endParaRPr lang="en-US" dirty="0"/>
+          </a:p>
+        </p:txBody>
+      </p:sp>
+      <p:sp>
+        <p:nvSpPr>
+          <p:cNvPr id="4" name="Slide Number Placeholder 3"/>
+          <p:cNvSpPr>
+            <a:spLocks noGrp="1"/>
+          </p:cNvSpPr>
+          <p:nvPr>
+            <p:ph type="sldNum" sz="quarter" idx="10"/>
+          </p:nvPr>
+        </p:nvSpPr>
+        <p:spPr/>
+        <p:txBody>
+          <a:bodyPr/>
+          <a:lstStyle/>
+          <a:p>
+            <a:fld id="{33793ACE-A489-1C41-B163-D1FF0130F898}" type="slidenum">
+              <a:rPr lang="en-US" smtClean="0"/>
+              <a:t>41</a:t>
+            </a:fld>
+            <a:endParaRPr lang="en-US"/>
+          </a:p>
+        </p:txBody>
+      </p:sp>
+    </p:spTree>
+    <p:extLst>
+      <p:ext uri="{BB962C8B-B14F-4D97-AF65-F5344CB8AC3E}">
+        <p14:creationId xmlns:p14="http://schemas.microsoft.com/office/powerpoint/2010/main" val="715696249"/>
+      </p:ext>
+    </p:extLst>
+  </p:cSld>
+  <p:clrMapOvr>
+    <a:masterClrMapping/>
+  </p:clrMapOvr>
+</p:notes>
+</file>
+
+<file path=ppt/notesSlides/notesSlide41.xml><?xml version="1.0" encoding="utf-8"?>
+<p:notes xmlns:a="http://schemas.openxmlformats.org/drawingml/2006/main" xmlns:r="http://schemas.openxmlformats.org/officeDocument/2006/relationships" xmlns:p="http://schemas.openxmlformats.org/presentationml/2006/main">
+  <p:cSld>
+    <p:spTree>
+      <p:nvGrpSpPr>
+        <p:cNvPr id="1" name=""/>
+        <p:cNvGrpSpPr/>
+        <p:nvPr/>
+      </p:nvGrpSpPr>
+      <p:grpSpPr>
+        <a:xfrm>
+          <a:off x="0" y="0"/>
+          <a:ext cx="0" cy="0"/>
+          <a:chOff x="0" y="0"/>
+          <a:chExt cx="0" cy="0"/>
+        </a:xfrm>
+      </p:grpSpPr>
+      <p:sp>
+        <p:nvSpPr>
+          <p:cNvPr id="2" name="Slide Image Placeholder 1"/>
+          <p:cNvSpPr>
+            <a:spLocks noGrp="1" noRot="1" noChangeAspect="1"/>
+          </p:cNvSpPr>
+          <p:nvPr>
+            <p:ph type="sldImg"/>
+          </p:nvPr>
+        </p:nvSpPr>
+        <p:spPr/>
+      </p:sp>
+      <p:sp>
+        <p:nvSpPr>
+          <p:cNvPr id="3" name="Notes Placeholder 2"/>
+          <p:cNvSpPr>
+            <a:spLocks noGrp="1"/>
+          </p:cNvSpPr>
+          <p:nvPr>
+            <p:ph type="body" idx="1"/>
+          </p:nvPr>
+        </p:nvSpPr>
+        <p:spPr/>
+        <p:txBody>
+          <a:bodyPr/>
+          <a:lstStyle/>
+          <a:p>
+            <a:endParaRPr lang="en-US" dirty="0"/>
+          </a:p>
+        </p:txBody>
+      </p:sp>
+      <p:sp>
+        <p:nvSpPr>
+          <p:cNvPr id="4" name="Slide Number Placeholder 3"/>
+          <p:cNvSpPr>
+            <a:spLocks noGrp="1"/>
+          </p:cNvSpPr>
+          <p:nvPr>
+            <p:ph type="sldNum" sz="quarter" idx="10"/>
+          </p:nvPr>
+        </p:nvSpPr>
+        <p:spPr/>
+        <p:txBody>
+          <a:bodyPr/>
+          <a:lstStyle/>
+          <a:p>
+            <a:fld id="{33793ACE-A489-1C41-B163-D1FF0130F898}" type="slidenum">
+              <a:rPr lang="en-US" smtClean="0"/>
+              <a:t>42</a:t>
+            </a:fld>
+            <a:endParaRPr lang="en-US"/>
+          </a:p>
+        </p:txBody>
+      </p:sp>
+    </p:spTree>
+    <p:extLst>
+      <p:ext uri="{BB962C8B-B14F-4D97-AF65-F5344CB8AC3E}">
+        <p14:creationId xmlns:p14="http://schemas.microsoft.com/office/powerpoint/2010/main" val="1582905122"/>
+      </p:ext>
+    </p:extLst>
+  </p:cSld>
+  <p:clrMapOvr>
+    <a:masterClrMapping/>
+  </p:clrMapOvr>
+</p:notes>
+</file>
+
+<file path=ppt/notesSlides/notesSlide42.xml><?xml version="1.0" encoding="utf-8"?>
+<p:notes xmlns:a="http://schemas.openxmlformats.org/drawingml/2006/main" xmlns:r="http://schemas.openxmlformats.org/officeDocument/2006/relationships" xmlns:p="http://schemas.openxmlformats.org/presentationml/2006/main">
+  <p:cSld>
+    <p:spTree>
+      <p:nvGrpSpPr>
+        <p:cNvPr id="1" name=""/>
+        <p:cNvGrpSpPr/>
+        <p:nvPr/>
+      </p:nvGrpSpPr>
+      <p:grpSpPr>
+        <a:xfrm>
+          <a:off x="0" y="0"/>
+          <a:ext cx="0" cy="0"/>
+          <a:chOff x="0" y="0"/>
+          <a:chExt cx="0" cy="0"/>
+        </a:xfrm>
+      </p:grpSpPr>
+      <p:sp>
+        <p:nvSpPr>
+          <p:cNvPr id="2" name="Slide Image Placeholder 1"/>
+          <p:cNvSpPr>
+            <a:spLocks noGrp="1" noRot="1" noChangeAspect="1"/>
+          </p:cNvSpPr>
+          <p:nvPr>
+            <p:ph type="sldImg"/>
+          </p:nvPr>
+        </p:nvSpPr>
+        <p:spPr/>
+      </p:sp>
+      <p:sp>
+        <p:nvSpPr>
+          <p:cNvPr id="3" name="Notes Placeholder 2"/>
+          <p:cNvSpPr>
+            <a:spLocks noGrp="1"/>
+          </p:cNvSpPr>
+          <p:nvPr>
+            <p:ph type="body" idx="1"/>
+          </p:nvPr>
+        </p:nvSpPr>
+        <p:spPr/>
+        <p:txBody>
+          <a:bodyPr/>
+          <a:lstStyle/>
+          <a:p>
+            <a:endParaRPr lang="en-US" dirty="0"/>
+          </a:p>
+        </p:txBody>
+      </p:sp>
+      <p:sp>
+        <p:nvSpPr>
+          <p:cNvPr id="4" name="Slide Number Placeholder 3"/>
+          <p:cNvSpPr>
+            <a:spLocks noGrp="1"/>
+          </p:cNvSpPr>
+          <p:nvPr>
+            <p:ph type="sldNum" sz="quarter" idx="10"/>
+          </p:nvPr>
+        </p:nvSpPr>
+        <p:spPr/>
+        <p:txBody>
+          <a:bodyPr/>
+          <a:lstStyle/>
+          <a:p>
+            <a:fld id="{33793ACE-A489-1C41-B163-D1FF0130F898}" type="slidenum">
+              <a:rPr lang="en-US" smtClean="0"/>
+              <a:t>43</a:t>
+            </a:fld>
+            <a:endParaRPr lang="en-US"/>
+          </a:p>
+        </p:txBody>
+      </p:sp>
+    </p:spTree>
+    <p:extLst>
+      <p:ext uri="{BB962C8B-B14F-4D97-AF65-F5344CB8AC3E}">
+        <p14:creationId xmlns:p14="http://schemas.microsoft.com/office/powerpoint/2010/main" val="996105604"/>
+      </p:ext>
+    </p:extLst>
+  </p:cSld>
+  <p:clrMapOvr>
+    <a:masterClrMapping/>
+  </p:clrMapOvr>
+</p:notes>
+</file>
+
+<file path=ppt/notesSlides/notesSlide43.xml><?xml version="1.0" encoding="utf-8"?>
+<p:notes xmlns:a="http://schemas.openxmlformats.org/drawingml/2006/main" xmlns:r="http://schemas.openxmlformats.org/officeDocument/2006/relationships" xmlns:p="http://schemas.openxmlformats.org/presentationml/2006/main">
+  <p:cSld>
+    <p:spTree>
+      <p:nvGrpSpPr>
+        <p:cNvPr id="1" name=""/>
+        <p:cNvGrpSpPr/>
+        <p:nvPr/>
+      </p:nvGrpSpPr>
+      <p:grpSpPr>
+        <a:xfrm>
+          <a:off x="0" y="0"/>
+          <a:ext cx="0" cy="0"/>
+          <a:chOff x="0" y="0"/>
+          <a:chExt cx="0" cy="0"/>
+        </a:xfrm>
+      </p:grpSpPr>
+      <p:sp>
+        <p:nvSpPr>
+          <p:cNvPr id="2" name="Slide Image Placeholder 1"/>
+          <p:cNvSpPr>
+            <a:spLocks noGrp="1" noRot="1" noChangeAspect="1"/>
+          </p:cNvSpPr>
+          <p:nvPr>
+            <p:ph type="sldImg"/>
+          </p:nvPr>
+        </p:nvSpPr>
+        <p:spPr/>
+      </p:sp>
+      <p:sp>
+        <p:nvSpPr>
+          <p:cNvPr id="3" name="Notes Placeholder 2"/>
+          <p:cNvSpPr>
+            <a:spLocks noGrp="1"/>
+          </p:cNvSpPr>
+          <p:nvPr>
+            <p:ph type="body" idx="1"/>
+          </p:nvPr>
+        </p:nvSpPr>
+        <p:spPr/>
+        <p:txBody>
+          <a:bodyPr/>
+          <a:lstStyle/>
+          <a:p>
+            <a:endParaRPr lang="en-US" dirty="0"/>
+          </a:p>
+        </p:txBody>
+      </p:sp>
+      <p:sp>
+        <p:nvSpPr>
+          <p:cNvPr id="4" name="Slide Number Placeholder 3"/>
+          <p:cNvSpPr>
+            <a:spLocks noGrp="1"/>
+          </p:cNvSpPr>
+          <p:nvPr>
+            <p:ph type="sldNum" sz="quarter" idx="10"/>
+          </p:nvPr>
+        </p:nvSpPr>
+        <p:spPr/>
+        <p:txBody>
+          <a:bodyPr/>
+          <a:lstStyle/>
+          <a:p>
+            <a:fld id="{33793ACE-A489-1C41-B163-D1FF0130F898}" type="slidenum">
+              <a:rPr lang="en-US" smtClean="0"/>
+              <a:t>46</a:t>
+            </a:fld>
+            <a:endParaRPr lang="en-US"/>
+          </a:p>
+        </p:txBody>
+      </p:sp>
+    </p:spTree>
+    <p:extLst>
+      <p:ext uri="{BB962C8B-B14F-4D97-AF65-F5344CB8AC3E}">
+        <p14:creationId xmlns:p14="http://schemas.microsoft.com/office/powerpoint/2010/main" val="8400029"/>
+      </p:ext>
+    </p:extLst>
+  </p:cSld>
+  <p:clrMapOvr>
+    <a:masterClrMapping/>
+  </p:clrMapOvr>
+</p:notes>
+</file>
+
+<file path=ppt/notesSlides/notesSlide44.xml><?xml version="1.0" encoding="utf-8"?>
+<p:notes xmlns:a="http://schemas.openxmlformats.org/drawingml/2006/main" xmlns:r="http://schemas.openxmlformats.org/officeDocument/2006/relationships" xmlns:p="http://schemas.openxmlformats.org/presentationml/2006/main">
+  <p:cSld>
+    <p:spTree>
+      <p:nvGrpSpPr>
+        <p:cNvPr id="1" name=""/>
+        <p:cNvGrpSpPr/>
+        <p:nvPr/>
+      </p:nvGrpSpPr>
+      <p:grpSpPr>
+        <a:xfrm>
+          <a:off x="0" y="0"/>
+          <a:ext cx="0" cy="0"/>
+          <a:chOff x="0" y="0"/>
+          <a:chExt cx="0" cy="0"/>
+        </a:xfrm>
+      </p:grpSpPr>
+      <p:sp>
+        <p:nvSpPr>
+          <p:cNvPr id="2" name="Slide Image Placeholder 1"/>
+          <p:cNvSpPr>
+            <a:spLocks noGrp="1" noRot="1" noChangeAspect="1"/>
+          </p:cNvSpPr>
+          <p:nvPr>
+            <p:ph type="sldImg"/>
+          </p:nvPr>
+        </p:nvSpPr>
+        <p:spPr/>
+      </p:sp>
+      <p:sp>
+        <p:nvSpPr>
+          <p:cNvPr id="3" name="Notes Placeholder 2"/>
+          <p:cNvSpPr>
+            <a:spLocks noGrp="1"/>
+          </p:cNvSpPr>
+          <p:nvPr>
+            <p:ph type="body" idx="1"/>
+          </p:nvPr>
+        </p:nvSpPr>
+        <p:spPr/>
+        <p:txBody>
+          <a:bodyPr/>
+          <a:lstStyle/>
+          <a:p>
+            <a:pPr lvl="1"/>
+            <a:endParaRPr lang="en-US" dirty="0"/>
+          </a:p>
+        </p:txBody>
+      </p:sp>
+      <p:sp>
+        <p:nvSpPr>
+          <p:cNvPr id="4" name="Slide Number Placeholder 3"/>
+          <p:cNvSpPr>
+            <a:spLocks noGrp="1"/>
+          </p:cNvSpPr>
+          <p:nvPr>
+            <p:ph type="sldNum" sz="quarter" idx="10"/>
+          </p:nvPr>
+        </p:nvSpPr>
+        <p:spPr/>
+        <p:txBody>
+          <a:bodyPr/>
+          <a:lstStyle/>
+          <a:p>
+            <a:fld id="{33793ACE-A489-1C41-B163-D1FF0130F898}" type="slidenum">
+              <a:rPr lang="en-US" smtClean="0"/>
+              <a:t>48</a:t>
+            </a:fld>
+            <a:endParaRPr lang="en-US"/>
+          </a:p>
+        </p:txBody>
+      </p:sp>
+    </p:spTree>
+    <p:extLst>
+      <p:ext uri="{BB962C8B-B14F-4D97-AF65-F5344CB8AC3E}">
+        <p14:creationId xmlns:p14="http://schemas.microsoft.com/office/powerpoint/2010/main" val="1117120813"/>
       </p:ext>
     </p:extLst>
   </p:cSld>
@@ -3695,7 +4404,10 @@
           <a:bodyPr/>
           <a:lstStyle/>
           <a:p>
-            <a:endParaRPr lang="en-US" dirty="0"/>
+            <a:r>
+              <a:rPr lang="en-US" dirty="0"/>
+              <a:t>We made three contributions as part of this work: a query language, a hardware design to support this query language, and a query compiler to compile from this language to this hardware. I’ll discuss the first two as part of this talk. The third is described in our paper.</a:t>
+            </a:r>
           </a:p>
         </p:txBody>
       </p:sp>
@@ -3716,7 +4428,7 @@
           <a:p>
             <a:fld id="{33793ACE-A489-1C41-B163-D1FF0130F898}" type="slidenum">
               <a:rPr lang="en-US" smtClean="0"/>
-              <a:t>8</a:t>
+              <a:t>7</a:t>
             </a:fld>
             <a:endParaRPr lang="en-US"/>
           </a:p>
@@ -3725,7 +4437,7 @@
     </p:spTree>
     <p:extLst>
       <p:ext uri="{BB962C8B-B14F-4D97-AF65-F5344CB8AC3E}">
-        <p14:creationId xmlns:p14="http://schemas.microsoft.com/office/powerpoint/2010/main" val="417441199"/>
+        <p14:creationId xmlns:p14="http://schemas.microsoft.com/office/powerpoint/2010/main" val="172049703"/>
       </p:ext>
     </p:extLst>
   </p:cSld>
@@ -3779,7 +4491,10 @@
           <a:bodyPr/>
           <a:lstStyle/>
           <a:p>
-            <a:endParaRPr lang="en-US" dirty="0"/>
+            <a:r>
+              <a:rPr lang="en-US" dirty="0"/>
+              <a:t>Here’s a bird’s eye view of the entire system. A network operator writes queries in a language that we call Marple and feeds it into a query compiler, which then translates these queries into switch programs that run on the network’s switches. These switch programs carry out filtering and aggregation to execute the queries. They stream out the resulting data to collection servers. The operator can then inspect these results and refine their query if required. When I get to the evaluation, we’ll see how using the switch for filtering and aggregation helps reduce the load on these collection servers significantly relative to the simplistic solution of having the collection server process every packet from the network.</a:t>
+            </a:r>
           </a:p>
         </p:txBody>
       </p:sp>
@@ -3800,7 +4515,7 @@
           <a:p>
             <a:fld id="{33793ACE-A489-1C41-B163-D1FF0130F898}" type="slidenum">
               <a:rPr lang="en-US" smtClean="0"/>
-              <a:t>9</a:t>
+              <a:t>8</a:t>
             </a:fld>
             <a:endParaRPr lang="en-US"/>
           </a:p>
@@ -3809,7 +4524,7 @@
     </p:spTree>
     <p:extLst>
       <p:ext uri="{BB962C8B-B14F-4D97-AF65-F5344CB8AC3E}">
-        <p14:creationId xmlns:p14="http://schemas.microsoft.com/office/powerpoint/2010/main" val="1392767371"/>
+        <p14:creationId xmlns:p14="http://schemas.microsoft.com/office/powerpoint/2010/main" val="417441199"/>
       </p:ext>
     </p:extLst>
   </p:cSld>
@@ -3863,7 +4578,10 @@
           <a:bodyPr/>
           <a:lstStyle/>
           <a:p>
-            <a:endParaRPr lang="en-US" dirty="0"/>
+            <a:r>
+              <a:rPr lang="en-US" dirty="0"/>
+              <a:t>So let’s start with the language that operators use to express their queries. Our goal was to make it easy for operators to express performance questions without worrying about how exactly these get implemented in the underlying programmable switches.</a:t>
+            </a:r>
           </a:p>
         </p:txBody>
       </p:sp>
@@ -3884,7 +4602,7 @@
           <a:p>
             <a:fld id="{33793ACE-A489-1C41-B163-D1FF0130F898}" type="slidenum">
               <a:rPr lang="en-US" smtClean="0"/>
-              <a:t>10</a:t>
+              <a:t>9</a:t>
             </a:fld>
             <a:endParaRPr lang="en-US"/>
           </a:p>
@@ -3893,7 +4611,7 @@
     </p:spTree>
     <p:extLst>
       <p:ext uri="{BB962C8B-B14F-4D97-AF65-F5344CB8AC3E}">
-        <p14:creationId xmlns:p14="http://schemas.microsoft.com/office/powerpoint/2010/main" val="1638992475"/>
+        <p14:creationId xmlns:p14="http://schemas.microsoft.com/office/powerpoint/2010/main" val="1392767371"/>
       </p:ext>
     </p:extLst>
   </p:cSld>
@@ -12411,7 +13129,15 @@
                 <a:ea typeface="Ayuthaya" charset="-34"/>
                 <a:cs typeface="Ayuthaya" charset="-34"/>
               </a:rPr>
-              <a:t>Implementing aggregation</a:t>
+              <a:t>Implementing </a:t>
+            </a:r>
+            <a:r>
+              <a:rPr lang="en-US" dirty="0" err="1">
+                <a:latin typeface="+mn-lt"/>
+                <a:ea typeface="Ayuthaya" charset="-34"/>
+                <a:cs typeface="Ayuthaya" charset="-34"/>
+              </a:rPr>
+              <a:t>groupby</a:t>
             </a:r>
             <a:endParaRPr lang="en-US" dirty="0"/>
           </a:p>
@@ -12646,7 +13372,15 @@
           <a:p>
             <a:r>
               <a:rPr lang="en-US" dirty="0"/>
-              <a:t>Scale to millions of aggregation keys (e.g., 5-tuples)</a:t>
+              <a:t>Scale to millions of </a:t>
+            </a:r>
+            <a:r>
+              <a:rPr lang="en-US" dirty="0" err="1"/>
+              <a:t>groupby</a:t>
+            </a:r>
+            <a:r>
+              <a:rPr lang="en-US" dirty="0"/>
+              <a:t> partitions (e.g., 5-tuples)</a:t>
             </a:r>
           </a:p>
           <a:p>
@@ -12891,7 +13625,7 @@
           <a:effectLst/>
           <a:extLst>
             <a:ext uri="{909E8E84-426E-40dd-AFC4-6F175D3DCCD1}">
-              <a14:hiddenFill xmlns:a14="http://schemas.microsoft.com/office/drawing/2010/main" xmlns="">
+              <a14:hiddenFill xmlns="" xmlns:a14="http://schemas.microsoft.com/office/drawing/2010/main">
                 <a:blipFill dpi="0" rotWithShape="0">
                   <a:blip/>
                   <a:srcRect/>
@@ -12902,7 +13636,7 @@
               </a14:hiddenFill>
             </a:ext>
             <a:ext uri="{91240B29-F687-4f45-9708-019B960494DF}">
-              <a14:hiddenLine xmlns:a14="http://schemas.microsoft.com/office/drawing/2010/main" xmlns="" w="9525">
+              <a14:hiddenLine xmlns="" xmlns:a14="http://schemas.microsoft.com/office/drawing/2010/main" w="9525">
                 <a:solidFill>
                   <a:srgbClr val="000000"/>
                 </a:solidFill>
@@ -12912,7 +13646,7 @@
               </a14:hiddenLine>
             </a:ext>
             <a:ext uri="{AF507438-7753-43e0-B8FC-AC1667EBCBE1}">
-              <a14:hiddenEffects xmlns:a14="http://schemas.microsoft.com/office/drawing/2010/main" xmlns="">
+              <a14:hiddenEffects xmlns="" xmlns:a14="http://schemas.microsoft.com/office/drawing/2010/main">
                 <a:effectLst>
                   <a:outerShdw blurRad="63500" dist="38099" dir="2700000" algn="ctr" rotWithShape="0">
                     <a:srgbClr val="000000">
@@ -12961,7 +13695,7 @@
           <a:effectLst/>
           <a:extLst>
             <a:ext uri="{909E8E84-426E-40dd-AFC4-6F175D3DCCD1}">
-              <a14:hiddenFill xmlns:a14="http://schemas.microsoft.com/office/drawing/2010/main" xmlns="">
+              <a14:hiddenFill xmlns="" xmlns:a14="http://schemas.microsoft.com/office/drawing/2010/main">
                 <a:blipFill dpi="0" rotWithShape="0">
                   <a:blip/>
                   <a:srcRect/>
@@ -12972,7 +13706,7 @@
               </a14:hiddenFill>
             </a:ext>
             <a:ext uri="{91240B29-F687-4f45-9708-019B960494DF}">
-              <a14:hiddenLine xmlns:a14="http://schemas.microsoft.com/office/drawing/2010/main" xmlns="" w="9525">
+              <a14:hiddenLine xmlns="" xmlns:a14="http://schemas.microsoft.com/office/drawing/2010/main" w="9525">
                 <a:solidFill>
                   <a:srgbClr val="000000"/>
                 </a:solidFill>
@@ -12982,7 +13716,7 @@
               </a14:hiddenLine>
             </a:ext>
             <a:ext uri="{AF507438-7753-43e0-B8FC-AC1667EBCBE1}">
-              <a14:hiddenEffects xmlns:a14="http://schemas.microsoft.com/office/drawing/2010/main" xmlns="">
+              <a14:hiddenEffects xmlns="" xmlns:a14="http://schemas.microsoft.com/office/drawing/2010/main">
                 <a:effectLst>
                   <a:outerShdw blurRad="63500" dist="38099" dir="2700000" algn="ctr" rotWithShape="0">
                     <a:srgbClr val="000000">
@@ -13117,7 +13851,7 @@
             <a:effectLst/>
             <a:extLst>
               <a:ext uri="{909E8E84-426E-40dd-AFC4-6F175D3DCCD1}">
-                <a14:hiddenFill xmlns="" xmlns:a14="http://schemas.microsoft.com/office/drawing/2010/main">
+                <a14:hiddenFill xmlns:a14="http://schemas.microsoft.com/office/drawing/2010/main" xmlns="">
                   <a:blipFill dpi="0" rotWithShape="0">
                     <a:blip/>
                     <a:srcRect/>
@@ -13128,7 +13862,7 @@
                 </a14:hiddenFill>
               </a:ext>
               <a:ext uri="{91240B29-F687-4f45-9708-019B960494DF}">
-                <a14:hiddenLine xmlns="" xmlns:a14="http://schemas.microsoft.com/office/drawing/2010/main" w="9525">
+                <a14:hiddenLine xmlns:a14="http://schemas.microsoft.com/office/drawing/2010/main" xmlns="" w="9525">
                   <a:solidFill>
                     <a:srgbClr val="000000"/>
                   </a:solidFill>
@@ -13138,7 +13872,7 @@
                 </a14:hiddenLine>
               </a:ext>
               <a:ext uri="{AF507438-7753-43e0-B8FC-AC1667EBCBE1}">
-                <a14:hiddenEffects xmlns="" xmlns:a14="http://schemas.microsoft.com/office/drawing/2010/main">
+                <a14:hiddenEffects xmlns:a14="http://schemas.microsoft.com/office/drawing/2010/main" xmlns="">
                   <a:effectLst>
                     <a:outerShdw blurRad="63500" dist="38099" dir="2700000" algn="ctr" rotWithShape="0">
                       <a:srgbClr val="000000">
@@ -13187,7 +13921,7 @@
             <a:effectLst/>
             <a:extLst>
               <a:ext uri="{909E8E84-426E-40dd-AFC4-6F175D3DCCD1}">
-                <a14:hiddenFill xmlns="" xmlns:a14="http://schemas.microsoft.com/office/drawing/2010/main">
+                <a14:hiddenFill xmlns:a14="http://schemas.microsoft.com/office/drawing/2010/main" xmlns="">
                   <a:blipFill dpi="0" rotWithShape="0">
                     <a:blip/>
                     <a:srcRect/>
@@ -13198,7 +13932,7 @@
                 </a14:hiddenFill>
               </a:ext>
               <a:ext uri="{91240B29-F687-4f45-9708-019B960494DF}">
-                <a14:hiddenLine xmlns="" xmlns:a14="http://schemas.microsoft.com/office/drawing/2010/main" w="9525">
+                <a14:hiddenLine xmlns:a14="http://schemas.microsoft.com/office/drawing/2010/main" xmlns="" w="9525">
                   <a:solidFill>
                     <a:srgbClr val="000000"/>
                   </a:solidFill>
@@ -13208,7 +13942,7 @@
                 </a14:hiddenLine>
               </a:ext>
               <a:ext uri="{AF507438-7753-43e0-B8FC-AC1667EBCBE1}">
-                <a14:hiddenEffects xmlns="" xmlns:a14="http://schemas.microsoft.com/office/drawing/2010/main">
+                <a14:hiddenEffects xmlns:a14="http://schemas.microsoft.com/office/drawing/2010/main" xmlns="">
                   <a:effectLst>
                     <a:outerShdw blurRad="63500" dist="38099" dir="2700000" algn="ctr" rotWithShape="0">
                       <a:srgbClr val="000000">
@@ -13257,7 +13991,7 @@
             <a:effectLst/>
             <a:extLst>
               <a:ext uri="{909E8E84-426E-40dd-AFC4-6F175D3DCCD1}">
-                <a14:hiddenFill xmlns="" xmlns:a14="http://schemas.microsoft.com/office/drawing/2010/main">
+                <a14:hiddenFill xmlns:a14="http://schemas.microsoft.com/office/drawing/2010/main" xmlns="">
                   <a:blipFill dpi="0" rotWithShape="0">
                     <a:blip/>
                     <a:srcRect/>
@@ -13268,7 +14002,7 @@
                 </a14:hiddenFill>
               </a:ext>
               <a:ext uri="{91240B29-F687-4f45-9708-019B960494DF}">
-                <a14:hiddenLine xmlns="" xmlns:a14="http://schemas.microsoft.com/office/drawing/2010/main" w="9525">
+                <a14:hiddenLine xmlns:a14="http://schemas.microsoft.com/office/drawing/2010/main" xmlns="" w="9525">
                   <a:solidFill>
                     <a:srgbClr val="000000"/>
                   </a:solidFill>
@@ -13278,7 +14012,7 @@
                 </a14:hiddenLine>
               </a:ext>
               <a:ext uri="{AF507438-7753-43e0-B8FC-AC1667EBCBE1}">
-                <a14:hiddenEffects xmlns="" xmlns:a14="http://schemas.microsoft.com/office/drawing/2010/main">
+                <a14:hiddenEffects xmlns:a14="http://schemas.microsoft.com/office/drawing/2010/main" xmlns="">
                   <a:effectLst>
                     <a:outerShdw blurRad="63500" dist="38099" dir="2700000" algn="ctr" rotWithShape="0">
                       <a:srgbClr val="000000">
@@ -13319,12 +14053,12 @@
             <a:effectLst/>
             <a:extLst>
               <a:ext uri="{909E8E84-426E-40dd-AFC4-6F175D3DCCD1}">
-                <a14:hiddenFill xmlns="" xmlns:a14="http://schemas.microsoft.com/office/drawing/2010/main">
+                <a14:hiddenFill xmlns:a14="http://schemas.microsoft.com/office/drawing/2010/main" xmlns="">
                   <a:noFill/>
                 </a14:hiddenFill>
               </a:ext>
               <a:ext uri="{AF507438-7753-43e0-B8FC-AC1667EBCBE1}">
-                <a14:hiddenEffects xmlns="" xmlns:a14="http://schemas.microsoft.com/office/drawing/2010/main">
+                <a14:hiddenEffects xmlns:a14="http://schemas.microsoft.com/office/drawing/2010/main" xmlns="">
                   <a:effectLst>
                     <a:outerShdw blurRad="63500" dist="38099" dir="2700000" algn="ctr" rotWithShape="0">
                       <a:srgbClr val="000000">
@@ -13377,12 +14111,12 @@
             <a:effectLst/>
             <a:extLst>
               <a:ext uri="{909E8E84-426E-40dd-AFC4-6F175D3DCCD1}">
-                <a14:hiddenFill xmlns="" xmlns:a14="http://schemas.microsoft.com/office/drawing/2010/main">
+                <a14:hiddenFill xmlns:a14="http://schemas.microsoft.com/office/drawing/2010/main" xmlns="">
                   <a:noFill/>
                 </a14:hiddenFill>
               </a:ext>
               <a:ext uri="{AF507438-7753-43e0-B8FC-AC1667EBCBE1}">
-                <a14:hiddenEffects xmlns="" xmlns:a14="http://schemas.microsoft.com/office/drawing/2010/main">
+                <a14:hiddenEffects xmlns:a14="http://schemas.microsoft.com/office/drawing/2010/main" xmlns="">
                   <a:effectLst>
                     <a:outerShdw blurRad="63500" dist="38099" dir="2700000" algn="ctr" rotWithShape="0">
                       <a:srgbClr val="000000">
@@ -13435,12 +14169,12 @@
             <a:effectLst/>
             <a:extLst>
               <a:ext uri="{909E8E84-426E-40dd-AFC4-6F175D3DCCD1}">
-                <a14:hiddenFill xmlns="" xmlns:a14="http://schemas.microsoft.com/office/drawing/2010/main">
+                <a14:hiddenFill xmlns:a14="http://schemas.microsoft.com/office/drawing/2010/main" xmlns="">
                   <a:noFill/>
                 </a14:hiddenFill>
               </a:ext>
               <a:ext uri="{AF507438-7753-43e0-B8FC-AC1667EBCBE1}">
-                <a14:hiddenEffects xmlns="" xmlns:a14="http://schemas.microsoft.com/office/drawing/2010/main">
+                <a14:hiddenEffects xmlns:a14="http://schemas.microsoft.com/office/drawing/2010/main" xmlns="">
                   <a:effectLst>
                     <a:outerShdw blurRad="63500" dist="38099" dir="2700000" algn="ctr" rotWithShape="0">
                       <a:srgbClr val="000000">
@@ -13493,12 +14227,12 @@
             <a:effectLst/>
             <a:extLst>
               <a:ext uri="{909E8E84-426E-40dd-AFC4-6F175D3DCCD1}">
-                <a14:hiddenFill xmlns="" xmlns:a14="http://schemas.microsoft.com/office/drawing/2010/main">
+                <a14:hiddenFill xmlns:a14="http://schemas.microsoft.com/office/drawing/2010/main" xmlns="">
                   <a:noFill/>
                 </a14:hiddenFill>
               </a:ext>
               <a:ext uri="{AF507438-7753-43e0-B8FC-AC1667EBCBE1}">
-                <a14:hiddenEffects xmlns="" xmlns:a14="http://schemas.microsoft.com/office/drawing/2010/main">
+                <a14:hiddenEffects xmlns:a14="http://schemas.microsoft.com/office/drawing/2010/main" xmlns="">
                   <a:effectLst>
                     <a:outerShdw blurRad="63500" dist="38099" dir="2700000" algn="ctr" rotWithShape="0">
                       <a:srgbClr val="000000">
@@ -13551,12 +14285,12 @@
             <a:effectLst/>
             <a:extLst>
               <a:ext uri="{909E8E84-426E-40dd-AFC4-6F175D3DCCD1}">
-                <a14:hiddenFill xmlns="" xmlns:a14="http://schemas.microsoft.com/office/drawing/2010/main">
+                <a14:hiddenFill xmlns:a14="http://schemas.microsoft.com/office/drawing/2010/main" xmlns="">
                   <a:noFill/>
                 </a14:hiddenFill>
               </a:ext>
               <a:ext uri="{AF507438-7753-43e0-B8FC-AC1667EBCBE1}">
-                <a14:hiddenEffects xmlns="" xmlns:a14="http://schemas.microsoft.com/office/drawing/2010/main">
+                <a14:hiddenEffects xmlns:a14="http://schemas.microsoft.com/office/drawing/2010/main" xmlns="">
                   <a:effectLst>
                     <a:outerShdw blurRad="63500" dist="38099" dir="2700000" algn="ctr" rotWithShape="0">
                       <a:srgbClr val="000000">
@@ -13609,12 +14343,12 @@
             <a:effectLst/>
             <a:extLst>
               <a:ext uri="{909E8E84-426E-40dd-AFC4-6F175D3DCCD1}">
-                <a14:hiddenFill xmlns="" xmlns:a14="http://schemas.microsoft.com/office/drawing/2010/main">
+                <a14:hiddenFill xmlns:a14="http://schemas.microsoft.com/office/drawing/2010/main" xmlns="">
                   <a:noFill/>
                 </a14:hiddenFill>
               </a:ext>
               <a:ext uri="{AF507438-7753-43e0-B8FC-AC1667EBCBE1}">
-                <a14:hiddenEffects xmlns="" xmlns:a14="http://schemas.microsoft.com/office/drawing/2010/main">
+                <a14:hiddenEffects xmlns:a14="http://schemas.microsoft.com/office/drawing/2010/main" xmlns="">
                   <a:effectLst>
                     <a:outerShdw blurRad="63500" dist="38099" dir="2700000" algn="ctr" rotWithShape="0">
                       <a:srgbClr val="000000">
@@ -13667,12 +14401,12 @@
             <a:effectLst/>
             <a:extLst>
               <a:ext uri="{909E8E84-426E-40dd-AFC4-6F175D3DCCD1}">
-                <a14:hiddenFill xmlns="" xmlns:a14="http://schemas.microsoft.com/office/drawing/2010/main">
+                <a14:hiddenFill xmlns:a14="http://schemas.microsoft.com/office/drawing/2010/main" xmlns="">
                   <a:noFill/>
                 </a14:hiddenFill>
               </a:ext>
               <a:ext uri="{AF507438-7753-43e0-B8FC-AC1667EBCBE1}">
-                <a14:hiddenEffects xmlns="" xmlns:a14="http://schemas.microsoft.com/office/drawing/2010/main">
+                <a14:hiddenEffects xmlns:a14="http://schemas.microsoft.com/office/drawing/2010/main" xmlns="">
                   <a:effectLst>
                     <a:outerShdw blurRad="63500" dist="38099" dir="2700000" algn="ctr" rotWithShape="0">
                       <a:srgbClr val="000000">
@@ -13725,12 +14459,12 @@
             <a:effectLst/>
             <a:extLst>
               <a:ext uri="{909E8E84-426E-40dd-AFC4-6F175D3DCCD1}">
-                <a14:hiddenFill xmlns="" xmlns:a14="http://schemas.microsoft.com/office/drawing/2010/main">
+                <a14:hiddenFill xmlns:a14="http://schemas.microsoft.com/office/drawing/2010/main" xmlns="">
                   <a:noFill/>
                 </a14:hiddenFill>
               </a:ext>
               <a:ext uri="{AF507438-7753-43e0-B8FC-AC1667EBCBE1}">
-                <a14:hiddenEffects xmlns="" xmlns:a14="http://schemas.microsoft.com/office/drawing/2010/main">
+                <a14:hiddenEffects xmlns:a14="http://schemas.microsoft.com/office/drawing/2010/main" xmlns="">
                   <a:effectLst>
                     <a:outerShdw blurRad="63500" dist="38099" dir="2700000" algn="ctr" rotWithShape="0">
                       <a:srgbClr val="000000">
@@ -13783,12 +14517,12 @@
             <a:effectLst/>
             <a:extLst>
               <a:ext uri="{909E8E84-426E-40dd-AFC4-6F175D3DCCD1}">
-                <a14:hiddenFill xmlns="" xmlns:a14="http://schemas.microsoft.com/office/drawing/2010/main">
+                <a14:hiddenFill xmlns:a14="http://schemas.microsoft.com/office/drawing/2010/main" xmlns="">
                   <a:noFill/>
                 </a14:hiddenFill>
               </a:ext>
               <a:ext uri="{AF507438-7753-43e0-B8FC-AC1667EBCBE1}">
-                <a14:hiddenEffects xmlns="" xmlns:a14="http://schemas.microsoft.com/office/drawing/2010/main">
+                <a14:hiddenEffects xmlns:a14="http://schemas.microsoft.com/office/drawing/2010/main" xmlns="">
                   <a:effectLst>
                     <a:outerShdw blurRad="63500" dist="38099" dir="2700000" algn="ctr" rotWithShape="0">
                       <a:srgbClr val="000000">
@@ -13841,12 +14575,12 @@
             <a:effectLst/>
             <a:extLst>
               <a:ext uri="{909E8E84-426E-40dd-AFC4-6F175D3DCCD1}">
-                <a14:hiddenFill xmlns="" xmlns:a14="http://schemas.microsoft.com/office/drawing/2010/main">
+                <a14:hiddenFill xmlns:a14="http://schemas.microsoft.com/office/drawing/2010/main" xmlns="">
                   <a:noFill/>
                 </a14:hiddenFill>
               </a:ext>
               <a:ext uri="{AF507438-7753-43e0-B8FC-AC1667EBCBE1}">
-                <a14:hiddenEffects xmlns="" xmlns:a14="http://schemas.microsoft.com/office/drawing/2010/main">
+                <a14:hiddenEffects xmlns:a14="http://schemas.microsoft.com/office/drawing/2010/main" xmlns="">
                   <a:effectLst>
                     <a:outerShdw blurRad="63500" dist="38099" dir="2700000" algn="ctr" rotWithShape="0">
                       <a:srgbClr val="000000">
@@ -13907,7 +14641,7 @@
             <a:effectLst/>
             <a:extLst>
               <a:ext uri="{909E8E84-426E-40dd-AFC4-6F175D3DCCD1}">
-                <a14:hiddenFill xmlns="" xmlns:a14="http://schemas.microsoft.com/office/drawing/2010/main">
+                <a14:hiddenFill xmlns:a14="http://schemas.microsoft.com/office/drawing/2010/main" xmlns="">
                   <a:blipFill dpi="0" rotWithShape="0">
                     <a:blip/>
                     <a:srcRect/>
@@ -13918,7 +14652,7 @@
                 </a14:hiddenFill>
               </a:ext>
               <a:ext uri="{91240B29-F687-4f45-9708-019B960494DF}">
-                <a14:hiddenLine xmlns="" xmlns:a14="http://schemas.microsoft.com/office/drawing/2010/main" w="9525">
+                <a14:hiddenLine xmlns:a14="http://schemas.microsoft.com/office/drawing/2010/main" xmlns="" w="9525">
                   <a:solidFill>
                     <a:srgbClr val="000000"/>
                   </a:solidFill>
@@ -13928,7 +14662,7 @@
                 </a14:hiddenLine>
               </a:ext>
               <a:ext uri="{AF507438-7753-43e0-B8FC-AC1667EBCBE1}">
-                <a14:hiddenEffects xmlns="" xmlns:a14="http://schemas.microsoft.com/office/drawing/2010/main">
+                <a14:hiddenEffects xmlns:a14="http://schemas.microsoft.com/office/drawing/2010/main" xmlns="">
                   <a:effectLst>
                     <a:outerShdw blurRad="63500" dist="38099" dir="2700000" algn="ctr" rotWithShape="0">
                       <a:srgbClr val="000000">
@@ -13977,7 +14711,7 @@
             <a:effectLst/>
             <a:extLst>
               <a:ext uri="{909E8E84-426E-40dd-AFC4-6F175D3DCCD1}">
-                <a14:hiddenFill xmlns="" xmlns:a14="http://schemas.microsoft.com/office/drawing/2010/main">
+                <a14:hiddenFill xmlns:a14="http://schemas.microsoft.com/office/drawing/2010/main" xmlns="">
                   <a:blipFill dpi="0" rotWithShape="0">
                     <a:blip/>
                     <a:srcRect/>
@@ -13988,7 +14722,7 @@
                 </a14:hiddenFill>
               </a:ext>
               <a:ext uri="{91240B29-F687-4f45-9708-019B960494DF}">
-                <a14:hiddenLine xmlns="" xmlns:a14="http://schemas.microsoft.com/office/drawing/2010/main" w="9525">
+                <a14:hiddenLine xmlns:a14="http://schemas.microsoft.com/office/drawing/2010/main" xmlns="" w="9525">
                   <a:solidFill>
                     <a:srgbClr val="000000"/>
                   </a:solidFill>
@@ -13998,7 +14732,7 @@
                 </a14:hiddenLine>
               </a:ext>
               <a:ext uri="{AF507438-7753-43e0-B8FC-AC1667EBCBE1}">
-                <a14:hiddenEffects xmlns="" xmlns:a14="http://schemas.microsoft.com/office/drawing/2010/main">
+                <a14:hiddenEffects xmlns:a14="http://schemas.microsoft.com/office/drawing/2010/main" xmlns="">
                   <a:effectLst>
                     <a:outerShdw blurRad="63500" dist="38099" dir="2700000" algn="ctr" rotWithShape="0">
                       <a:srgbClr val="000000">
@@ -14047,7 +14781,7 @@
             <a:effectLst/>
             <a:extLst>
               <a:ext uri="{909E8E84-426E-40dd-AFC4-6F175D3DCCD1}">
-                <a14:hiddenFill xmlns="" xmlns:a14="http://schemas.microsoft.com/office/drawing/2010/main">
+                <a14:hiddenFill xmlns:a14="http://schemas.microsoft.com/office/drawing/2010/main" xmlns="">
                   <a:blipFill dpi="0" rotWithShape="0">
                     <a:blip/>
                     <a:srcRect/>
@@ -14058,7 +14792,7 @@
                 </a14:hiddenFill>
               </a:ext>
               <a:ext uri="{91240B29-F687-4f45-9708-019B960494DF}">
-                <a14:hiddenLine xmlns="" xmlns:a14="http://schemas.microsoft.com/office/drawing/2010/main" w="9525">
+                <a14:hiddenLine xmlns:a14="http://schemas.microsoft.com/office/drawing/2010/main" xmlns="" w="9525">
                   <a:solidFill>
                     <a:srgbClr val="000000"/>
                   </a:solidFill>
@@ -14068,7 +14802,7 @@
                 </a14:hiddenLine>
               </a:ext>
               <a:ext uri="{AF507438-7753-43e0-B8FC-AC1667EBCBE1}">
-                <a14:hiddenEffects xmlns="" xmlns:a14="http://schemas.microsoft.com/office/drawing/2010/main">
+                <a14:hiddenEffects xmlns:a14="http://schemas.microsoft.com/office/drawing/2010/main" xmlns="">
                   <a:effectLst>
                     <a:outerShdw blurRad="63500" dist="38099" dir="2700000" algn="ctr" rotWithShape="0">
                       <a:srgbClr val="000000">
@@ -14117,7 +14851,7 @@
             <a:effectLst/>
             <a:extLst>
               <a:ext uri="{909E8E84-426E-40dd-AFC4-6F175D3DCCD1}">
-                <a14:hiddenFill xmlns="" xmlns:a14="http://schemas.microsoft.com/office/drawing/2010/main">
+                <a14:hiddenFill xmlns:a14="http://schemas.microsoft.com/office/drawing/2010/main" xmlns="">
                   <a:blipFill dpi="0" rotWithShape="0">
                     <a:blip/>
                     <a:srcRect/>
@@ -14128,7 +14862,7 @@
                 </a14:hiddenFill>
               </a:ext>
               <a:ext uri="{91240B29-F687-4f45-9708-019B960494DF}">
-                <a14:hiddenLine xmlns="" xmlns:a14="http://schemas.microsoft.com/office/drawing/2010/main" w="9525">
+                <a14:hiddenLine xmlns:a14="http://schemas.microsoft.com/office/drawing/2010/main" xmlns="" w="9525">
                   <a:solidFill>
                     <a:srgbClr val="000000"/>
                   </a:solidFill>
@@ -14138,7 +14872,7 @@
                 </a14:hiddenLine>
               </a:ext>
               <a:ext uri="{AF507438-7753-43e0-B8FC-AC1667EBCBE1}">
-                <a14:hiddenEffects xmlns="" xmlns:a14="http://schemas.microsoft.com/office/drawing/2010/main">
+                <a14:hiddenEffects xmlns:a14="http://schemas.microsoft.com/office/drawing/2010/main" xmlns="">
                   <a:effectLst>
                     <a:outerShdw blurRad="63500" dist="38099" dir="2700000" algn="ctr" rotWithShape="0">
                       <a:srgbClr val="000000">
@@ -14187,7 +14921,7 @@
             <a:effectLst/>
             <a:extLst>
               <a:ext uri="{909E8E84-426E-40dd-AFC4-6F175D3DCCD1}">
-                <a14:hiddenFill xmlns="" xmlns:a14="http://schemas.microsoft.com/office/drawing/2010/main">
+                <a14:hiddenFill xmlns:a14="http://schemas.microsoft.com/office/drawing/2010/main" xmlns="">
                   <a:blipFill dpi="0" rotWithShape="0">
                     <a:blip/>
                     <a:srcRect/>
@@ -14198,7 +14932,7 @@
                 </a14:hiddenFill>
               </a:ext>
               <a:ext uri="{91240B29-F687-4f45-9708-019B960494DF}">
-                <a14:hiddenLine xmlns="" xmlns:a14="http://schemas.microsoft.com/office/drawing/2010/main" w="9525">
+                <a14:hiddenLine xmlns:a14="http://schemas.microsoft.com/office/drawing/2010/main" xmlns="" w="9525">
                   <a:solidFill>
                     <a:srgbClr val="000000"/>
                   </a:solidFill>
@@ -14208,7 +14942,7 @@
                 </a14:hiddenLine>
               </a:ext>
               <a:ext uri="{AF507438-7753-43e0-B8FC-AC1667EBCBE1}">
-                <a14:hiddenEffects xmlns="" xmlns:a14="http://schemas.microsoft.com/office/drawing/2010/main">
+                <a14:hiddenEffects xmlns:a14="http://schemas.microsoft.com/office/drawing/2010/main" xmlns="">
                   <a:effectLst>
                     <a:outerShdw blurRad="63500" dist="38099" dir="2700000" algn="ctr" rotWithShape="0">
                       <a:srgbClr val="000000">
@@ -14249,12 +14983,12 @@
             <a:effectLst/>
             <a:extLst>
               <a:ext uri="{909E8E84-426E-40dd-AFC4-6F175D3DCCD1}">
-                <a14:hiddenFill xmlns="" xmlns:a14="http://schemas.microsoft.com/office/drawing/2010/main">
+                <a14:hiddenFill xmlns:a14="http://schemas.microsoft.com/office/drawing/2010/main" xmlns="">
                   <a:noFill/>
                 </a14:hiddenFill>
               </a:ext>
               <a:ext uri="{AF507438-7753-43e0-B8FC-AC1667EBCBE1}">
-                <a14:hiddenEffects xmlns="" xmlns:a14="http://schemas.microsoft.com/office/drawing/2010/main">
+                <a14:hiddenEffects xmlns:a14="http://schemas.microsoft.com/office/drawing/2010/main" xmlns="">
                   <a:effectLst>
                     <a:outerShdw blurRad="63500" dist="38099" dir="2700000" algn="ctr" rotWithShape="0">
                       <a:srgbClr val="000000">
@@ -14307,12 +15041,12 @@
             <a:effectLst/>
             <a:extLst>
               <a:ext uri="{909E8E84-426E-40dd-AFC4-6F175D3DCCD1}">
-                <a14:hiddenFill xmlns="" xmlns:a14="http://schemas.microsoft.com/office/drawing/2010/main">
+                <a14:hiddenFill xmlns:a14="http://schemas.microsoft.com/office/drawing/2010/main" xmlns="">
                   <a:noFill/>
                 </a14:hiddenFill>
               </a:ext>
               <a:ext uri="{AF507438-7753-43e0-B8FC-AC1667EBCBE1}">
-                <a14:hiddenEffects xmlns="" xmlns:a14="http://schemas.microsoft.com/office/drawing/2010/main">
+                <a14:hiddenEffects xmlns:a14="http://schemas.microsoft.com/office/drawing/2010/main" xmlns="">
                   <a:effectLst>
                     <a:outerShdw blurRad="63500" dist="38099" dir="2700000" algn="ctr" rotWithShape="0">
                       <a:srgbClr val="000000">
@@ -14373,7 +15107,7 @@
             <a:effectLst/>
             <a:extLst>
               <a:ext uri="{909E8E84-426E-40dd-AFC4-6F175D3DCCD1}">
-                <a14:hiddenFill xmlns="" xmlns:a14="http://schemas.microsoft.com/office/drawing/2010/main">
+                <a14:hiddenFill xmlns:a14="http://schemas.microsoft.com/office/drawing/2010/main" xmlns="">
                   <a:blipFill dpi="0" rotWithShape="0">
                     <a:blip/>
                     <a:srcRect/>
@@ -14384,7 +15118,7 @@
                 </a14:hiddenFill>
               </a:ext>
               <a:ext uri="{91240B29-F687-4f45-9708-019B960494DF}">
-                <a14:hiddenLine xmlns="" xmlns:a14="http://schemas.microsoft.com/office/drawing/2010/main" w="9525">
+                <a14:hiddenLine xmlns:a14="http://schemas.microsoft.com/office/drawing/2010/main" xmlns="" w="9525">
                   <a:solidFill>
                     <a:srgbClr val="000000"/>
                   </a:solidFill>
@@ -14394,7 +15128,7 @@
                 </a14:hiddenLine>
               </a:ext>
               <a:ext uri="{AF507438-7753-43e0-B8FC-AC1667EBCBE1}">
-                <a14:hiddenEffects xmlns="" xmlns:a14="http://schemas.microsoft.com/office/drawing/2010/main">
+                <a14:hiddenEffects xmlns:a14="http://schemas.microsoft.com/office/drawing/2010/main" xmlns="">
                   <a:effectLst>
                     <a:outerShdw blurRad="63500" dist="38099" dir="2700000" algn="ctr" rotWithShape="0">
                       <a:srgbClr val="000000">
@@ -14527,7 +15261,7 @@
           <a:effectLst/>
           <a:extLst>
             <a:ext uri="{909E8E84-426E-40dd-AFC4-6F175D3DCCD1}">
-              <a14:hiddenFill xmlns:a14="http://schemas.microsoft.com/office/drawing/2010/main" xmlns="">
+              <a14:hiddenFill xmlns="" xmlns:a14="http://schemas.microsoft.com/office/drawing/2010/main">
                 <a:blipFill dpi="0" rotWithShape="0">
                   <a:blip/>
                   <a:srcRect/>
@@ -14538,7 +15272,7 @@
               </a14:hiddenFill>
             </a:ext>
             <a:ext uri="{91240B29-F687-4f45-9708-019B960494DF}">
-              <a14:hiddenLine xmlns:a14="http://schemas.microsoft.com/office/drawing/2010/main" xmlns="" w="9525">
+              <a14:hiddenLine xmlns="" xmlns:a14="http://schemas.microsoft.com/office/drawing/2010/main" w="9525">
                 <a:solidFill>
                   <a:srgbClr val="000000"/>
                 </a:solidFill>
@@ -14548,7 +15282,7 @@
               </a14:hiddenLine>
             </a:ext>
             <a:ext uri="{AF507438-7753-43e0-B8FC-AC1667EBCBE1}">
-              <a14:hiddenEffects xmlns:a14="http://schemas.microsoft.com/office/drawing/2010/main" xmlns="">
+              <a14:hiddenEffects xmlns="" xmlns:a14="http://schemas.microsoft.com/office/drawing/2010/main">
                 <a:effectLst>
                   <a:outerShdw blurRad="63500" dist="38099" dir="2700000" algn="ctr" rotWithShape="0">
                     <a:srgbClr val="000000">
@@ -14633,7 +15367,7 @@
           <a:effectLst/>
           <a:extLst>
             <a:ext uri="{909E8E84-426E-40dd-AFC4-6F175D3DCCD1}">
-              <a14:hiddenFill xmlns:a14="http://schemas.microsoft.com/office/drawing/2010/main" xmlns="">
+              <a14:hiddenFill xmlns="" xmlns:a14="http://schemas.microsoft.com/office/drawing/2010/main">
                 <a:blipFill dpi="0" rotWithShape="0">
                   <a:blip/>
                   <a:srcRect/>
@@ -14644,7 +15378,7 @@
               </a14:hiddenFill>
             </a:ext>
             <a:ext uri="{91240B29-F687-4f45-9708-019B960494DF}">
-              <a14:hiddenLine xmlns:a14="http://schemas.microsoft.com/office/drawing/2010/main" xmlns="" w="9525">
+              <a14:hiddenLine xmlns="" xmlns:a14="http://schemas.microsoft.com/office/drawing/2010/main" w="9525">
                 <a:solidFill>
                   <a:srgbClr val="000000"/>
                 </a:solidFill>
@@ -14654,7 +15388,7 @@
               </a14:hiddenLine>
             </a:ext>
             <a:ext uri="{AF507438-7753-43e0-B8FC-AC1667EBCBE1}">
-              <a14:hiddenEffects xmlns:a14="http://schemas.microsoft.com/office/drawing/2010/main" xmlns="">
+              <a14:hiddenEffects xmlns="" xmlns:a14="http://schemas.microsoft.com/office/drawing/2010/main">
                 <a:effectLst>
                   <a:outerShdw blurRad="63500" dist="38099" dir="2700000" algn="ctr" rotWithShape="0">
                     <a:srgbClr val="000000">
@@ -14739,7 +15473,7 @@
           <a:effectLst/>
           <a:extLst>
             <a:ext uri="{909E8E84-426E-40dd-AFC4-6F175D3DCCD1}">
-              <a14:hiddenFill xmlns:a14="http://schemas.microsoft.com/office/drawing/2010/main" xmlns="">
+              <a14:hiddenFill xmlns="" xmlns:a14="http://schemas.microsoft.com/office/drawing/2010/main">
                 <a:blipFill dpi="0" rotWithShape="0">
                   <a:blip/>
                   <a:srcRect/>
@@ -14750,7 +15484,7 @@
               </a14:hiddenFill>
             </a:ext>
             <a:ext uri="{91240B29-F687-4f45-9708-019B960494DF}">
-              <a14:hiddenLine xmlns:a14="http://schemas.microsoft.com/office/drawing/2010/main" xmlns="" w="9525">
+              <a14:hiddenLine xmlns="" xmlns:a14="http://schemas.microsoft.com/office/drawing/2010/main" w="9525">
                 <a:solidFill>
                   <a:srgbClr val="000000"/>
                 </a:solidFill>
@@ -14760,7 +15494,7 @@
               </a14:hiddenLine>
             </a:ext>
             <a:ext uri="{AF507438-7753-43e0-B8FC-AC1667EBCBE1}">
-              <a14:hiddenEffects xmlns:a14="http://schemas.microsoft.com/office/drawing/2010/main" xmlns="">
+              <a14:hiddenEffects xmlns="" xmlns:a14="http://schemas.microsoft.com/office/drawing/2010/main">
                 <a:effectLst>
                   <a:outerShdw blurRad="63500" dist="38099" dir="2700000" algn="ctr" rotWithShape="0">
                     <a:srgbClr val="000000">
@@ -14940,7 +15674,7 @@
           <a:effectLst/>
           <a:extLst>
             <a:ext uri="{909E8E84-426E-40dd-AFC4-6F175D3DCCD1}">
-              <a14:hiddenFill xmlns:a14="http://schemas.microsoft.com/office/drawing/2010/main" xmlns="">
+              <a14:hiddenFill xmlns="" xmlns:a14="http://schemas.microsoft.com/office/drawing/2010/main">
                 <a:blipFill dpi="0" rotWithShape="0">
                   <a:blip/>
                   <a:srcRect/>
@@ -14951,7 +15685,7 @@
               </a14:hiddenFill>
             </a:ext>
             <a:ext uri="{91240B29-F687-4f45-9708-019B960494DF}">
-              <a14:hiddenLine xmlns:a14="http://schemas.microsoft.com/office/drawing/2010/main" xmlns="" w="9525">
+              <a14:hiddenLine xmlns="" xmlns:a14="http://schemas.microsoft.com/office/drawing/2010/main" w="9525">
                 <a:solidFill>
                   <a:srgbClr val="000000"/>
                 </a:solidFill>
@@ -14961,7 +15695,7 @@
               </a14:hiddenLine>
             </a:ext>
             <a:ext uri="{AF507438-7753-43e0-B8FC-AC1667EBCBE1}">
-              <a14:hiddenEffects xmlns:a14="http://schemas.microsoft.com/office/drawing/2010/main" xmlns="">
+              <a14:hiddenEffects xmlns="" xmlns:a14="http://schemas.microsoft.com/office/drawing/2010/main">
                 <a:effectLst>
                   <a:outerShdw blurRad="63500" dist="38099" dir="2700000" algn="ctr" rotWithShape="0">
                     <a:srgbClr val="000000">
@@ -15039,7 +15773,7 @@
           <a:effectLst/>
           <a:extLst>
             <a:ext uri="{909E8E84-426E-40dd-AFC4-6F175D3DCCD1}">
-              <a14:hiddenFill xmlns:a14="http://schemas.microsoft.com/office/drawing/2010/main" xmlns="">
+              <a14:hiddenFill xmlns="" xmlns:a14="http://schemas.microsoft.com/office/drawing/2010/main">
                 <a:blipFill dpi="0" rotWithShape="0">
                   <a:blip/>
                   <a:srcRect/>
@@ -15050,7 +15784,7 @@
               </a14:hiddenFill>
             </a:ext>
             <a:ext uri="{91240B29-F687-4f45-9708-019B960494DF}">
-              <a14:hiddenLine xmlns:a14="http://schemas.microsoft.com/office/drawing/2010/main" xmlns="" w="9525">
+              <a14:hiddenLine xmlns="" xmlns:a14="http://schemas.microsoft.com/office/drawing/2010/main" w="9525">
                 <a:solidFill>
                   <a:srgbClr val="000000"/>
                 </a:solidFill>
@@ -15060,7 +15794,7 @@
               </a14:hiddenLine>
             </a:ext>
             <a:ext uri="{AF507438-7753-43e0-B8FC-AC1667EBCBE1}">
-              <a14:hiddenEffects xmlns:a14="http://schemas.microsoft.com/office/drawing/2010/main" xmlns="">
+              <a14:hiddenEffects xmlns="" xmlns:a14="http://schemas.microsoft.com/office/drawing/2010/main">
                 <a:effectLst>
                   <a:outerShdw blurRad="63500" dist="38099" dir="2700000" algn="ctr" rotWithShape="0">
                     <a:srgbClr val="000000">
@@ -15138,7 +15872,7 @@
           <a:effectLst/>
           <a:extLst>
             <a:ext uri="{909E8E84-426E-40dd-AFC4-6F175D3DCCD1}">
-              <a14:hiddenFill xmlns:a14="http://schemas.microsoft.com/office/drawing/2010/main" xmlns="">
+              <a14:hiddenFill xmlns="" xmlns:a14="http://schemas.microsoft.com/office/drawing/2010/main">
                 <a:blipFill dpi="0" rotWithShape="0">
                   <a:blip/>
                   <a:srcRect/>
@@ -15149,7 +15883,7 @@
               </a14:hiddenFill>
             </a:ext>
             <a:ext uri="{91240B29-F687-4f45-9708-019B960494DF}">
-              <a14:hiddenLine xmlns:a14="http://schemas.microsoft.com/office/drawing/2010/main" xmlns="" w="9525">
+              <a14:hiddenLine xmlns="" xmlns:a14="http://schemas.microsoft.com/office/drawing/2010/main" w="9525">
                 <a:solidFill>
                   <a:srgbClr val="000000"/>
                 </a:solidFill>
@@ -15159,7 +15893,7 @@
               </a14:hiddenLine>
             </a:ext>
             <a:ext uri="{AF507438-7753-43e0-B8FC-AC1667EBCBE1}">
-              <a14:hiddenEffects xmlns:a14="http://schemas.microsoft.com/office/drawing/2010/main" xmlns="">
+              <a14:hiddenEffects xmlns="" xmlns:a14="http://schemas.microsoft.com/office/drawing/2010/main">
                 <a:effectLst>
                   <a:outerShdw blurRad="63500" dist="38099" dir="2700000" algn="ctr" rotWithShape="0">
                     <a:srgbClr val="000000">
@@ -17138,7 +17872,7 @@
           <a:effectLst/>
           <a:extLst>
             <a:ext uri="{909E8E84-426E-40dd-AFC4-6F175D3DCCD1}">
-              <a14:hiddenFill xmlns="" xmlns:a14="http://schemas.microsoft.com/office/drawing/2010/main">
+              <a14:hiddenFill xmlns:a14="http://schemas.microsoft.com/office/drawing/2010/main" xmlns="">
                 <a:blipFill dpi="0" rotWithShape="0">
                   <a:blip/>
                   <a:srcRect/>
@@ -17149,7 +17883,7 @@
               </a14:hiddenFill>
             </a:ext>
             <a:ext uri="{91240B29-F687-4f45-9708-019B960494DF}">
-              <a14:hiddenLine xmlns="" xmlns:a14="http://schemas.microsoft.com/office/drawing/2010/main" w="9525">
+              <a14:hiddenLine xmlns:a14="http://schemas.microsoft.com/office/drawing/2010/main" xmlns="" w="9525">
                 <a:solidFill>
                   <a:srgbClr val="000000"/>
                 </a:solidFill>
@@ -17159,7 +17893,7 @@
               </a14:hiddenLine>
             </a:ext>
             <a:ext uri="{AF507438-7753-43e0-B8FC-AC1667EBCBE1}">
-              <a14:hiddenEffects xmlns="" xmlns:a14="http://schemas.microsoft.com/office/drawing/2010/main">
+              <a14:hiddenEffects xmlns:a14="http://schemas.microsoft.com/office/drawing/2010/main" xmlns="">
                 <a:effectLst>
                   <a:outerShdw blurRad="63500" dist="38099" dir="2700000" algn="ctr" rotWithShape="0">
                     <a:srgbClr val="000000">
@@ -18648,7 +19382,7 @@
           <a:effectLst/>
           <a:extLst>
             <a:ext uri="{909E8E84-426E-40dd-AFC4-6F175D3DCCD1}">
-              <a14:hiddenFill xmlns="" xmlns:a14="http://schemas.microsoft.com/office/drawing/2010/main">
+              <a14:hiddenFill xmlns:a14="http://schemas.microsoft.com/office/drawing/2010/main" xmlns="">
                 <a:blipFill dpi="0" rotWithShape="0">
                   <a:blip/>
                   <a:srcRect/>
@@ -18659,7 +19393,7 @@
               </a14:hiddenFill>
             </a:ext>
             <a:ext uri="{91240B29-F687-4f45-9708-019B960494DF}">
-              <a14:hiddenLine xmlns="" xmlns:a14="http://schemas.microsoft.com/office/drawing/2010/main" w="9525">
+              <a14:hiddenLine xmlns:a14="http://schemas.microsoft.com/office/drawing/2010/main" xmlns="" w="9525">
                 <a:solidFill>
                   <a:srgbClr val="000000"/>
                 </a:solidFill>
@@ -18669,7 +19403,7 @@
               </a14:hiddenLine>
             </a:ext>
             <a:ext uri="{AF507438-7753-43e0-B8FC-AC1667EBCBE1}">
-              <a14:hiddenEffects xmlns="" xmlns:a14="http://schemas.microsoft.com/office/drawing/2010/main">
+              <a14:hiddenEffects xmlns:a14="http://schemas.microsoft.com/office/drawing/2010/main" xmlns="">
                 <a:effectLst>
                   <a:outerShdw blurRad="63500" dist="38099" dir="2700000" algn="ctr" rotWithShape="0">
                     <a:srgbClr val="000000">
@@ -20154,7 +20888,7 @@
           <a:effectLst/>
           <a:extLst>
             <a:ext uri="{909E8E84-426E-40dd-AFC4-6F175D3DCCD1}">
-              <a14:hiddenFill xmlns="" xmlns:a14="http://schemas.microsoft.com/office/drawing/2010/main">
+              <a14:hiddenFill xmlns:a14="http://schemas.microsoft.com/office/drawing/2010/main" xmlns="">
                 <a:blipFill dpi="0" rotWithShape="0">
                   <a:blip/>
                   <a:srcRect/>
@@ -20165,7 +20899,7 @@
               </a14:hiddenFill>
             </a:ext>
             <a:ext uri="{91240B29-F687-4f45-9708-019B960494DF}">
-              <a14:hiddenLine xmlns="" xmlns:a14="http://schemas.microsoft.com/office/drawing/2010/main" w="9525">
+              <a14:hiddenLine xmlns:a14="http://schemas.microsoft.com/office/drawing/2010/main" xmlns="" w="9525">
                 <a:solidFill>
                   <a:srgbClr val="000000"/>
                 </a:solidFill>
@@ -20175,7 +20909,7 @@
               </a14:hiddenLine>
             </a:ext>
             <a:ext uri="{AF507438-7753-43e0-B8FC-AC1667EBCBE1}">
-              <a14:hiddenEffects xmlns="" xmlns:a14="http://schemas.microsoft.com/office/drawing/2010/main">
+              <a14:hiddenEffects xmlns:a14="http://schemas.microsoft.com/office/drawing/2010/main" xmlns="">
                 <a:effectLst>
                   <a:outerShdw blurRad="63500" dist="38099" dir="2700000" algn="ctr" rotWithShape="0">
                     <a:srgbClr val="000000">
@@ -20329,7 +21063,7 @@
           <a:effectLst/>
           <a:extLst>
             <a:ext uri="{909E8E84-426E-40dd-AFC4-6F175D3DCCD1}">
-              <a14:hiddenFill xmlns="" xmlns:a14="http://schemas.microsoft.com/office/drawing/2010/main">
+              <a14:hiddenFill xmlns:a14="http://schemas.microsoft.com/office/drawing/2010/main" xmlns="">
                 <a:blipFill dpi="0" rotWithShape="0">
                   <a:blip/>
                   <a:srcRect/>
@@ -20340,7 +21074,7 @@
               </a14:hiddenFill>
             </a:ext>
             <a:ext uri="{91240B29-F687-4f45-9708-019B960494DF}">
-              <a14:hiddenLine xmlns="" xmlns:a14="http://schemas.microsoft.com/office/drawing/2010/main" w="9525">
+              <a14:hiddenLine xmlns:a14="http://schemas.microsoft.com/office/drawing/2010/main" xmlns="" w="9525">
                 <a:solidFill>
                   <a:srgbClr val="000000"/>
                 </a:solidFill>
@@ -20350,7 +21084,7 @@
               </a14:hiddenLine>
             </a:ext>
             <a:ext uri="{AF507438-7753-43e0-B8FC-AC1667EBCBE1}">
-              <a14:hiddenEffects xmlns="" xmlns:a14="http://schemas.microsoft.com/office/drawing/2010/main">
+              <a14:hiddenEffects xmlns:a14="http://schemas.microsoft.com/office/drawing/2010/main" xmlns="">
                 <a:effectLst>
                   <a:outerShdw blurRad="63500" dist="38099" dir="2700000" algn="ctr" rotWithShape="0">
                     <a:srgbClr val="000000">
@@ -22143,7 +22877,7 @@
           <a:effectLst/>
           <a:extLst>
             <a:ext uri="{909E8E84-426E-40dd-AFC4-6F175D3DCCD1}">
-              <a14:hiddenFill xmlns="" xmlns:a14="http://schemas.microsoft.com/office/drawing/2010/main">
+              <a14:hiddenFill xmlns:a14="http://schemas.microsoft.com/office/drawing/2010/main" xmlns="">
                 <a:blipFill dpi="0" rotWithShape="0">
                   <a:blip/>
                   <a:srcRect/>
@@ -22154,7 +22888,7 @@
               </a14:hiddenFill>
             </a:ext>
             <a:ext uri="{91240B29-F687-4f45-9708-019B960494DF}">
-              <a14:hiddenLine xmlns="" xmlns:a14="http://schemas.microsoft.com/office/drawing/2010/main" w="9525">
+              <a14:hiddenLine xmlns:a14="http://schemas.microsoft.com/office/drawing/2010/main" xmlns="" w="9525">
                 <a:solidFill>
                   <a:srgbClr val="000000"/>
                 </a:solidFill>
@@ -22164,7 +22898,7 @@
               </a14:hiddenLine>
             </a:ext>
             <a:ext uri="{AF507438-7753-43e0-B8FC-AC1667EBCBE1}">
-              <a14:hiddenEffects xmlns="" xmlns:a14="http://schemas.microsoft.com/office/drawing/2010/main">
+              <a14:hiddenEffects xmlns:a14="http://schemas.microsoft.com/office/drawing/2010/main" xmlns="">
                 <a:effectLst>
                   <a:outerShdw blurRad="63500" dist="38099" dir="2700000" algn="ctr" rotWithShape="0">
                     <a:srgbClr val="000000">
@@ -25119,7 +25853,7 @@
           <a:effectLst/>
           <a:extLst>
             <a:ext uri="{909E8E84-426E-40dd-AFC4-6F175D3DCCD1}">
-              <a14:hiddenFill xmlns="" xmlns:a14="http://schemas.microsoft.com/office/drawing/2010/main">
+              <a14:hiddenFill xmlns:a14="http://schemas.microsoft.com/office/drawing/2010/main" xmlns="">
                 <a:blipFill dpi="0" rotWithShape="0">
                   <a:blip/>
                   <a:srcRect/>
@@ -25130,7 +25864,7 @@
               </a14:hiddenFill>
             </a:ext>
             <a:ext uri="{91240B29-F687-4f45-9708-019B960494DF}">
-              <a14:hiddenLine xmlns="" xmlns:a14="http://schemas.microsoft.com/office/drawing/2010/main" w="9525">
+              <a14:hiddenLine xmlns:a14="http://schemas.microsoft.com/office/drawing/2010/main" xmlns="" w="9525">
                 <a:solidFill>
                   <a:srgbClr val="000000"/>
                 </a:solidFill>
@@ -25140,7 +25874,7 @@
               </a14:hiddenLine>
             </a:ext>
             <a:ext uri="{AF507438-7753-43e0-B8FC-AC1667EBCBE1}">
-              <a14:hiddenEffects xmlns="" xmlns:a14="http://schemas.microsoft.com/office/drawing/2010/main">
+              <a14:hiddenEffects xmlns:a14="http://schemas.microsoft.com/office/drawing/2010/main" xmlns="">
                 <a:effectLst>
                   <a:outerShdw blurRad="63500" dist="38099" dir="2700000" algn="ctr" rotWithShape="0">
                     <a:srgbClr val="000000">
@@ -25219,7 +25953,7 @@
           <a:effectLst/>
           <a:extLst>
             <a:ext uri="{909E8E84-426E-40dd-AFC4-6F175D3DCCD1}">
-              <a14:hiddenFill xmlns="" xmlns:a14="http://schemas.microsoft.com/office/drawing/2010/main">
+              <a14:hiddenFill xmlns:a14="http://schemas.microsoft.com/office/drawing/2010/main" xmlns="">
                 <a:blipFill dpi="0" rotWithShape="0">
                   <a:blip/>
                   <a:srcRect/>
@@ -25230,7 +25964,7 @@
               </a14:hiddenFill>
             </a:ext>
             <a:ext uri="{91240B29-F687-4f45-9708-019B960494DF}">
-              <a14:hiddenLine xmlns="" xmlns:a14="http://schemas.microsoft.com/office/drawing/2010/main" w="9525">
+              <a14:hiddenLine xmlns:a14="http://schemas.microsoft.com/office/drawing/2010/main" xmlns="" w="9525">
                 <a:solidFill>
                   <a:srgbClr val="000000"/>
                 </a:solidFill>
@@ -25240,7 +25974,7 @@
               </a14:hiddenLine>
             </a:ext>
             <a:ext uri="{AF507438-7753-43e0-B8FC-AC1667EBCBE1}">
-              <a14:hiddenEffects xmlns="" xmlns:a14="http://schemas.microsoft.com/office/drawing/2010/main">
+              <a14:hiddenEffects xmlns:a14="http://schemas.microsoft.com/office/drawing/2010/main" xmlns="">
                 <a:effectLst>
                   <a:outerShdw blurRad="63500" dist="38099" dir="2700000" algn="ctr" rotWithShape="0">
                     <a:srgbClr val="000000">
@@ -26835,7 +27569,7 @@
           <a:effectLst/>
           <a:extLst>
             <a:ext uri="{909E8E84-426E-40dd-AFC4-6F175D3DCCD1}">
-              <a14:hiddenFill xmlns="" xmlns:a14="http://schemas.microsoft.com/office/drawing/2010/main">
+              <a14:hiddenFill xmlns:a14="http://schemas.microsoft.com/office/drawing/2010/main" xmlns="">
                 <a:blipFill dpi="0" rotWithShape="0">
                   <a:blip/>
                   <a:srcRect/>
@@ -26846,7 +27580,7 @@
               </a14:hiddenFill>
             </a:ext>
             <a:ext uri="{91240B29-F687-4f45-9708-019B960494DF}">
-              <a14:hiddenLine xmlns="" xmlns:a14="http://schemas.microsoft.com/office/drawing/2010/main" w="9525">
+              <a14:hiddenLine xmlns:a14="http://schemas.microsoft.com/office/drawing/2010/main" xmlns="" w="9525">
                 <a:solidFill>
                   <a:srgbClr val="000000"/>
                 </a:solidFill>
@@ -26856,7 +27590,7 @@
               </a14:hiddenLine>
             </a:ext>
             <a:ext uri="{AF507438-7753-43e0-B8FC-AC1667EBCBE1}">
-              <a14:hiddenEffects xmlns="" xmlns:a14="http://schemas.microsoft.com/office/drawing/2010/main">
+              <a14:hiddenEffects xmlns:a14="http://schemas.microsoft.com/office/drawing/2010/main" xmlns="">
                 <a:effectLst>
                   <a:outerShdw blurRad="63500" dist="38099" dir="2700000" algn="ctr" rotWithShape="0">
                     <a:srgbClr val="000000">
@@ -28587,7 +29321,7 @@
           <a:effectLst/>
           <a:extLst>
             <a:ext uri="{909E8E84-426E-40dd-AFC4-6F175D3DCCD1}">
-              <a14:hiddenFill xmlns="" xmlns:a14="http://schemas.microsoft.com/office/drawing/2010/main">
+              <a14:hiddenFill xmlns:a14="http://schemas.microsoft.com/office/drawing/2010/main" xmlns="">
                 <a:blipFill dpi="0" rotWithShape="0">
                   <a:blip/>
                   <a:srcRect/>
@@ -28598,7 +29332,7 @@
               </a14:hiddenFill>
             </a:ext>
             <a:ext uri="{91240B29-F687-4f45-9708-019B960494DF}">
-              <a14:hiddenLine xmlns="" xmlns:a14="http://schemas.microsoft.com/office/drawing/2010/main" w="9525">
+              <a14:hiddenLine xmlns:a14="http://schemas.microsoft.com/office/drawing/2010/main" xmlns="" w="9525">
                 <a:solidFill>
                   <a:srgbClr val="000000"/>
                 </a:solidFill>
@@ -28608,7 +29342,7 @@
               </a14:hiddenLine>
             </a:ext>
             <a:ext uri="{AF507438-7753-43e0-B8FC-AC1667EBCBE1}">
-              <a14:hiddenEffects xmlns="" xmlns:a14="http://schemas.microsoft.com/office/drawing/2010/main">
+              <a14:hiddenEffects xmlns:a14="http://schemas.microsoft.com/office/drawing/2010/main" xmlns="">
                 <a:effectLst>
                   <a:outerShdw blurRad="63500" dist="38099" dir="2700000" algn="ctr" rotWithShape="0">
                     <a:srgbClr val="000000">
@@ -30041,7 +30775,7 @@
           <a:effectLst/>
           <a:extLst>
             <a:ext uri="{909E8E84-426E-40dd-AFC4-6F175D3DCCD1}">
-              <a14:hiddenFill xmlns="" xmlns:a14="http://schemas.microsoft.com/office/drawing/2010/main">
+              <a14:hiddenFill xmlns:a14="http://schemas.microsoft.com/office/drawing/2010/main" xmlns="">
                 <a:blipFill dpi="0" rotWithShape="0">
                   <a:blip/>
                   <a:srcRect/>
@@ -30052,7 +30786,7 @@
               </a14:hiddenFill>
             </a:ext>
             <a:ext uri="{91240B29-F687-4f45-9708-019B960494DF}">
-              <a14:hiddenLine xmlns="" xmlns:a14="http://schemas.microsoft.com/office/drawing/2010/main" w="9525">
+              <a14:hiddenLine xmlns:a14="http://schemas.microsoft.com/office/drawing/2010/main" xmlns="" w="9525">
                 <a:solidFill>
                   <a:srgbClr val="000000"/>
                 </a:solidFill>
@@ -30062,7 +30796,7 @@
               </a14:hiddenLine>
             </a:ext>
             <a:ext uri="{AF507438-7753-43e0-B8FC-AC1667EBCBE1}">
-              <a14:hiddenEffects xmlns="" xmlns:a14="http://schemas.microsoft.com/office/drawing/2010/main">
+              <a14:hiddenEffects xmlns:a14="http://schemas.microsoft.com/office/drawing/2010/main" xmlns="">
                 <a:effectLst>
                   <a:outerShdw blurRad="63500" dist="38099" dir="2700000" algn="ctr" rotWithShape="0">
                     <a:srgbClr val="000000">
@@ -30193,7 +30927,7 @@
           <a:effectLst/>
           <a:extLst>
             <a:ext uri="{909E8E84-426E-40dd-AFC4-6F175D3DCCD1}">
-              <a14:hiddenFill xmlns="" xmlns:a14="http://schemas.microsoft.com/office/drawing/2010/main">
+              <a14:hiddenFill xmlns:a14="http://schemas.microsoft.com/office/drawing/2010/main" xmlns="">
                 <a:blipFill dpi="0" rotWithShape="0">
                   <a:blip/>
                   <a:srcRect/>
@@ -30204,7 +30938,7 @@
               </a14:hiddenFill>
             </a:ext>
             <a:ext uri="{91240B29-F687-4f45-9708-019B960494DF}">
-              <a14:hiddenLine xmlns="" xmlns:a14="http://schemas.microsoft.com/office/drawing/2010/main" w="9525">
+              <a14:hiddenLine xmlns:a14="http://schemas.microsoft.com/office/drawing/2010/main" xmlns="" w="9525">
                 <a:solidFill>
                   <a:srgbClr val="000000"/>
                 </a:solidFill>
@@ -30214,7 +30948,7 @@
               </a14:hiddenLine>
             </a:ext>
             <a:ext uri="{AF507438-7753-43e0-B8FC-AC1667EBCBE1}">
-              <a14:hiddenEffects xmlns="" xmlns:a14="http://schemas.microsoft.com/office/drawing/2010/main">
+              <a14:hiddenEffects xmlns:a14="http://schemas.microsoft.com/office/drawing/2010/main" xmlns="">
                 <a:effectLst>
                   <a:outerShdw blurRad="63500" dist="38099" dir="2700000" algn="ctr" rotWithShape="0">
                     <a:srgbClr val="000000">
@@ -38431,7 +39165,7 @@
           <a:effectLst/>
           <a:extLst>
             <a:ext uri="{909E8E84-426E-40dd-AFC4-6F175D3DCCD1}">
-              <a14:hiddenFill xmlns:a14="http://schemas.microsoft.com/office/drawing/2010/main" xmlns="">
+              <a14:hiddenFill xmlns="" xmlns:a14="http://schemas.microsoft.com/office/drawing/2010/main">
                 <a:blipFill dpi="0" rotWithShape="0">
                   <a:blip/>
                   <a:srcRect/>
@@ -38442,7 +39176,7 @@
               </a14:hiddenFill>
             </a:ext>
             <a:ext uri="{91240B29-F687-4f45-9708-019B960494DF}">
-              <a14:hiddenLine xmlns:a14="http://schemas.microsoft.com/office/drawing/2010/main" xmlns="" w="9525">
+              <a14:hiddenLine xmlns="" xmlns:a14="http://schemas.microsoft.com/office/drawing/2010/main" w="9525">
                 <a:solidFill>
                   <a:srgbClr val="000000"/>
                 </a:solidFill>
@@ -38452,7 +39186,7 @@
               </a14:hiddenLine>
             </a:ext>
             <a:ext uri="{AF507438-7753-43e0-B8FC-AC1667EBCBE1}">
-              <a14:hiddenEffects xmlns:a14="http://schemas.microsoft.com/office/drawing/2010/main" xmlns="">
+              <a14:hiddenEffects xmlns="" xmlns:a14="http://schemas.microsoft.com/office/drawing/2010/main">
                 <a:effectLst>
                   <a:outerShdw blurRad="63500" dist="38099" dir="2700000" algn="ctr" rotWithShape="0">
                     <a:srgbClr val="000000">
@@ -38699,7 +39433,7 @@
           <a:p>
             <a:r>
               <a:rPr lang="en-US" dirty="0"/>
-              <a:t>Query aggregates by 5-tuple (key)</a:t>
+              <a:t>Query groups by by 5-tuple (key)</a:t>
             </a:r>
           </a:p>
           <a:p>
@@ -40074,13 +40808,13 @@
           <a:p>
             <a:r>
               <a:rPr lang="en-US" dirty="0"/>
-              <a:t>On-switch aggregation reduces software data processing</a:t>
+              <a:t>Query language for network performance monitoring</a:t>
             </a:r>
           </a:p>
           <a:p>
             <a:r>
               <a:rPr lang="en-US" dirty="0"/>
-              <a:t>Linear in state: fully accurate per-flow aggregation at line rate</a:t>
+              <a:t>Hardware design to support query language</a:t>
             </a:r>
           </a:p>
           <a:p>

</xml_diff>

<commit_message>
Write through until the end
</commit_message>
<xml_diff>
--- a/marple_itx18.pptx
+++ b/marple_itx18.pptx
@@ -5,7 +5,7 @@
     <p:sldMasterId id="2147483648" r:id="rId1"/>
   </p:sldMasterIdLst>
   <p:notesMasterIdLst>
-    <p:notesMasterId r:id="rId50"/>
+    <p:notesMasterId r:id="rId47"/>
   </p:notesMasterIdLst>
   <p:sldIdLst>
     <p:sldId id="256" r:id="rId2"/>
@@ -47,15 +47,12 @@
     <p:sldId id="634" r:id="rId38"/>
     <p:sldId id="577" r:id="rId39"/>
     <p:sldId id="624" r:id="rId40"/>
-    <p:sldId id="561" r:id="rId41"/>
-    <p:sldId id="451" r:id="rId42"/>
-    <p:sldId id="580" r:id="rId43"/>
-    <p:sldId id="347" r:id="rId44"/>
-    <p:sldId id="500" r:id="rId45"/>
-    <p:sldId id="501" r:id="rId46"/>
-    <p:sldId id="581" r:id="rId47"/>
-    <p:sldId id="553" r:id="rId48"/>
-    <p:sldId id="305" r:id="rId49"/>
+    <p:sldId id="580" r:id="rId41"/>
+    <p:sldId id="347" r:id="rId42"/>
+    <p:sldId id="500" r:id="rId43"/>
+    <p:sldId id="501" r:id="rId44"/>
+    <p:sldId id="581" r:id="rId45"/>
+    <p:sldId id="305" r:id="rId46"/>
   </p:sldIdLst>
   <p:sldSz cx="12192000" cy="6858000"/>
   <p:notesSz cx="6858000" cy="9144000"/>
@@ -3111,13 +3108,17 @@
           <a:p>
             <a:r>
               <a:rPr lang="en-US" dirty="0"/>
-              <a:t>TODO</a:t>
-            </a:r>
-            <a:r>
-              <a:rPr lang="en-US"/>
-              <a:t>: resume here.</a:t>
-            </a:r>
+              <a:t>Mathematically, it means this. That if you computed the statistics over the first sequence of packets (prior to eviction) and computed the statistics over the second sequence of the packets (after the eviction) and then merged them, it is equivalent to computing the statistics over the entire packet sequence.</a:t>
+            </a:r>
+          </a:p>
+          <a:p>
             <a:endParaRPr lang="en-US" dirty="0"/>
+          </a:p>
+          <a:p>
+            <a:r>
+              <a:rPr lang="en-US" dirty="0"/>
+              <a:t>Let’s take a simple example. If g is a counter, the merge is a simple addition. You can probably see that this is easily generalizable to other associative statistics such as min/max/product, etc. Essentially, you track the minimum in the cache and take the minimum of the new value in the cache and the old value in the backing store.</a:t>
+            </a:r>
           </a:p>
         </p:txBody>
       </p:sp>
@@ -3201,6 +3202,33 @@
           <a:bodyPr/>
           <a:lstStyle/>
           <a:p>
+            <a:r>
+              <a:rPr lang="en-US" dirty="0"/>
+              <a:t>But what about operations that are not associative? Let’s think about this for a bit. We can merge any arbitrary statistic g by storing the entire sequence of packets in the cache, sending this sequence of packets to the backing store upon eviction, and merging by simply replaying the statistic computation over this sequence of packets.</a:t>
+            </a:r>
+          </a:p>
+          <a:p>
+            <a:endParaRPr lang="en-US" dirty="0"/>
+          </a:p>
+          <a:p>
+            <a:r>
+              <a:rPr lang="en-US" dirty="0"/>
+              <a:t>But that’s a lot of additional state just for merging and it grows with the number of packets that have been processed so far. In fact, this is no better than just sending a copy of every packet to a collection server, which is what we wanted to avoid in the first place.</a:t>
+            </a:r>
+          </a:p>
+          <a:p>
+            <a:endParaRPr lang="en-US" dirty="0"/>
+          </a:p>
+          <a:p>
+            <a:r>
+              <a:rPr lang="en-US" dirty="0"/>
+              <a:t>So the real question is whether we can merge with a small amount of extra state over and above the state that is being tracked by the statistics function itself? More precisely, we want the extra state to have size similar to the statistic being tracked.</a:t>
+            </a:r>
+          </a:p>
+          <a:p>
+            <a:endParaRPr lang="en-US" dirty="0"/>
+          </a:p>
+          <a:p>
             <a:endParaRPr lang="en-US" dirty="0"/>
           </a:p>
         </p:txBody>
@@ -3285,7 +3313,19 @@
           <a:bodyPr/>
           <a:lstStyle/>
           <a:p>
+            <a:r>
+              <a:rPr lang="en-US" dirty="0"/>
+              <a:t>One theoretical contribution of this work was identifying a class of fold functions where we could in fact carry out the merge using a small amount of additional state. This class we call the linear-in-state aggregation functions. The reason for this name should be clear from looking at the form of the state update in these fold functions: the updated state is a linear function of the previous state. Here the coefficients A and B can either be constants or functions of a bounded number of packets in the past starting from the current packet. S can also be generalized to a vector and A and B can be matrices.</a:t>
+            </a:r>
+          </a:p>
+          <a:p>
             <a:endParaRPr lang="en-US" dirty="0"/>
+          </a:p>
+          <a:p>
+            <a:r>
+              <a:rPr lang="en-US" dirty="0"/>
+              <a:t>As a few quick examples, you can imagine a packet counter, where A is 1 and B is 1. You can have a byte counter where A is 1 and B is the packet’s length field. Or you could have the EWMA which we have seen a few times so far, where A is (1 – alpha) and B is alpha times the packet’s queueing latency. You can also have degenerate cases where A is 0 and B is a function of the last k packets like a windowed average.</a:t>
+            </a:r>
           </a:p>
         </p:txBody>
       </p:sp>
@@ -3369,7 +3409,19 @@
           <a:bodyPr/>
           <a:lstStyle/>
           <a:p>
+            <a:r>
+              <a:rPr lang="en-US" dirty="0"/>
+              <a:t>Why does this work. Let me provide some intuition for this linear-in-state property. Suppose we are tracking an EWMA that takes the packet’s length, multiplies it by a gain alpha, and adds it to 1 – alpha  times the previous value of the EWMA. Now, let’s say the EWMA starts at I1 or I2 and ends at F1 or F2 after N packets, then the following equation holds. You can see why this is true by recursively expanding the equation for the EWMA above where S is written in terms of the previous value of S and the packet’s length.</a:t>
+            </a:r>
+          </a:p>
+          <a:p>
             <a:endParaRPr lang="en-US" dirty="0"/>
+          </a:p>
+          <a:p>
+            <a:r>
+              <a:rPr lang="en-US" dirty="0"/>
+              <a:t>OK, what does this equation tell us? It tells us that we can take a final value F1 calculate from an initial value I1 and then ask what the final value F2 would have been for an initial state I2 using a very simple computation.</a:t>
+            </a:r>
           </a:p>
         </p:txBody>
       </p:sp>
@@ -3455,7 +3507,57 @@
           <a:p>
             <a:r>
               <a:rPr lang="en-US" dirty="0"/>
-              <a:t>Say that the more formal result is in the paper.</a:t>
+              <a:t>How does it help here? Let’s map the initial and final values to our problem setting. The initial value for the EWMA in the cache is V0 and the final value is </a:t>
+            </a:r>
+            <a:r>
+              <a:rPr lang="en-US" dirty="0" err="1"/>
+              <a:t>Vcache</a:t>
+            </a:r>
+            <a:r>
+              <a:rPr lang="en-US" dirty="0"/>
+              <a:t>. Now we want to calculate what the final value should have been if the initial value was the value in the backing store and the entry had never been evicted. So I2 is </a:t>
+            </a:r>
+            <a:r>
+              <a:rPr lang="en-US" dirty="0" err="1"/>
+              <a:t>Vback</a:t>
+            </a:r>
+            <a:r>
+              <a:rPr lang="en-US" dirty="0"/>
+              <a:t>. Then what will F2 be. We can just substitute variables in the equation from the last slide and get this equation.</a:t>
+            </a:r>
+          </a:p>
+          <a:p>
+            <a:endParaRPr lang="en-US" dirty="0"/>
+          </a:p>
+          <a:p>
+            <a:r>
+              <a:rPr lang="en-US" dirty="0"/>
+              <a:t>The implication of this is that we have just found our merge function to merge the old value (</a:t>
+            </a:r>
+            <a:r>
+              <a:rPr lang="en-US" dirty="0" err="1"/>
+              <a:t>Vback</a:t>
+            </a:r>
+            <a:r>
+              <a:rPr lang="en-US" dirty="0"/>
+              <a:t>) and the new value (</a:t>
+            </a:r>
+            <a:r>
+              <a:rPr lang="en-US" dirty="0" err="1"/>
+              <a:t>Vcache</a:t>
+            </a:r>
+            <a:r>
+              <a:rPr lang="en-US" dirty="0"/>
+              <a:t>) using some additional state: the number of packets seen in the cache.</a:t>
+            </a:r>
+          </a:p>
+          <a:p>
+            <a:endParaRPr lang="en-US" dirty="0"/>
+          </a:p>
+          <a:p>
+            <a:r>
+              <a:rPr lang="en-US" dirty="0"/>
+              <a:t>The key point is that this additional state is small. It is only the number of packets (N), and doesn’t include some value per packet.</a:t>
             </a:r>
           </a:p>
         </p:txBody>
@@ -3540,7 +3642,18 @@
           <a:bodyPr/>
           <a:lstStyle/>
           <a:p>
-            <a:endParaRPr lang="en-US" baseline="0" dirty="0"/>
+            <a:r>
+              <a:rPr lang="en-US" baseline="0" dirty="0"/>
+              <a:t>The linear-in-state condition is surprisingly broad. The microburst example that we talked about earlier is linear-in-state even though it doesn’t appear so at first brush. Here A is 1. B is a function of the last packets and is defined piece wise as follows: it’s 1 is the current packet is within 800 </a:t>
+            </a:r>
+            <a:r>
+              <a:rPr lang="en-US" baseline="0" dirty="0" err="1"/>
+              <a:t>ms</a:t>
+            </a:r>
+            <a:r>
+              <a:rPr lang="en-US" baseline="0" dirty="0"/>
+              <a:t> from the last one and 0 otherwise.</a:t>
+            </a:r>
           </a:p>
         </p:txBody>
       </p:sp>
@@ -3624,7 +3737,10 @@
           <a:bodyPr/>
           <a:lstStyle/>
           <a:p>
-            <a:endParaRPr lang="en-US" dirty="0"/>
+            <a:r>
+              <a:rPr lang="en-US" dirty="0"/>
+              <a:t>The paper contains several more examples of linear-in-state statistics. The important thing if you’re a switching chip manufacturer is that you can implement this quite cheaply in hardware using a multiply-accumulate hardware instruction---something that is quite well understood today.</a:t>
+            </a:r>
           </a:p>
         </p:txBody>
       </p:sp>
@@ -3795,7 +3911,27 @@
           <a:bodyPr/>
           <a:lstStyle/>
           <a:p>
-            <a:endParaRPr lang="en-US" dirty="0"/>
+            <a:pPr marL="0" marR="0" lvl="0" indent="0" algn="l" defTabSz="914400" rtl="0" eaLnBrk="1" fontAlgn="auto" latinLnBrk="0" hangingPunct="1">
+              <a:lnSpc>
+                <a:spcPct val="100000"/>
+              </a:lnSpc>
+              <a:spcBef>
+                <a:spcPts val="0"/>
+              </a:spcBef>
+              <a:spcAft>
+                <a:spcPts val="0"/>
+              </a:spcAft>
+              <a:buClrTx/>
+              <a:buSzTx/>
+              <a:buFontTx/>
+              <a:buNone/>
+              <a:tabLst/>
+              <a:defRPr/>
+            </a:pPr>
+            <a:r>
+              <a:rPr lang="en-US" dirty="0"/>
+              <a:t>Finally, I’ll talk about some evaluation results. Our main question is how much benefit the cache brings us in terms of reducing the number of key-value-store pairs that are sent to the backing store.</a:t>
+            </a:r>
           </a:p>
         </p:txBody>
       </p:sp>
@@ -3816,7 +3952,7 @@
           <a:p>
             <a:fld id="{33793ACE-A489-1C41-B163-D1FF0130F898}" type="slidenum">
               <a:rPr lang="en-US" smtClean="0"/>
-              <a:t>41</a:t>
+              <a:t>40</a:t>
             </a:fld>
             <a:endParaRPr lang="en-US"/>
           </a:p>
@@ -3825,7 +3961,7 @@
     </p:spTree>
     <p:extLst>
       <p:ext uri="{BB962C8B-B14F-4D97-AF65-F5344CB8AC3E}">
-        <p14:creationId xmlns:p14="http://schemas.microsoft.com/office/powerpoint/2010/main" val="715696249"/>
+        <p14:creationId xmlns:p14="http://schemas.microsoft.com/office/powerpoint/2010/main" val="1582905122"/>
       </p:ext>
     </p:extLst>
   </p:cSld>
@@ -3879,7 +4015,35 @@
           <a:bodyPr/>
           <a:lstStyle/>
           <a:p>
+            <a:r>
+              <a:rPr lang="en-US" dirty="0"/>
+              <a:t>Here are some relevant experimental setup details for our evaluation of the cache eviction rate. We used trace-based evaluation to evaluate the eviction rate using a core router and a data center trace. Our query was a </a:t>
+            </a:r>
+            <a:r>
+              <a:rPr lang="en-US" dirty="0" err="1"/>
+              <a:t>groupby</a:t>
+            </a:r>
+            <a:r>
+              <a:rPr lang="en-US" dirty="0"/>
+              <a:t> that partitioned by 5-tuple. The caching eviction policy was 8-way LRU similar to many processor caches simply because it is easy to implement.</a:t>
+            </a:r>
+          </a:p>
+          <a:p>
             <a:endParaRPr lang="en-US" dirty="0"/>
+          </a:p>
+          <a:p>
+            <a:r>
+              <a:rPr lang="en-US" dirty="0"/>
+              <a:t>We first measure the eviction ratio because this doesn’t depend on the packet rate or the size of keys and values. We then translate this into a concrete eviction rate for some specific packet rates and </a:t>
+            </a:r>
+            <a:r>
+              <a:rPr lang="en-US" dirty="0" err="1"/>
+              <a:t>key+value</a:t>
+            </a:r>
+            <a:r>
+              <a:rPr lang="en-US" dirty="0"/>
+              <a:t> sizes.</a:t>
+            </a:r>
           </a:p>
         </p:txBody>
       </p:sp>
@@ -3900,7 +4064,7 @@
           <a:p>
             <a:fld id="{33793ACE-A489-1C41-B163-D1FF0130F898}" type="slidenum">
               <a:rPr lang="en-US" smtClean="0"/>
-              <a:t>42</a:t>
+              <a:t>41</a:t>
             </a:fld>
             <a:endParaRPr lang="en-US"/>
           </a:p>
@@ -3909,7 +4073,7 @@
     </p:spTree>
     <p:extLst>
       <p:ext uri="{BB962C8B-B14F-4D97-AF65-F5344CB8AC3E}">
-        <p14:creationId xmlns:p14="http://schemas.microsoft.com/office/powerpoint/2010/main" val="1582905122"/>
+        <p14:creationId xmlns:p14="http://schemas.microsoft.com/office/powerpoint/2010/main" val="996105604"/>
       </p:ext>
     </p:extLst>
   </p:cSld>
@@ -3963,7 +4127,10 @@
           <a:bodyPr/>
           <a:lstStyle/>
           <a:p>
-            <a:endParaRPr lang="en-US" dirty="0"/>
+            <a:r>
+              <a:rPr lang="en-US" dirty="0"/>
+              <a:t>So here’s the result. As expected, the eviction ratio goes down as the number of cache slots increases. One other interesting takeaway is that a dc environment has much more locality allowing us to get away with a much smaller size cache.</a:t>
+            </a:r>
           </a:p>
         </p:txBody>
       </p:sp>
@@ -3984,7 +4151,7 @@
           <a:p>
             <a:fld id="{33793ACE-A489-1C41-B163-D1FF0130F898}" type="slidenum">
               <a:rPr lang="en-US" smtClean="0"/>
-              <a:t>43</a:t>
+              <a:t>42</a:t>
             </a:fld>
             <a:endParaRPr lang="en-US"/>
           </a:p>
@@ -3993,7 +4160,7 @@
     </p:spTree>
     <p:extLst>
       <p:ext uri="{BB962C8B-B14F-4D97-AF65-F5344CB8AC3E}">
-        <p14:creationId xmlns:p14="http://schemas.microsoft.com/office/powerpoint/2010/main" val="996105604"/>
+        <p14:creationId xmlns:p14="http://schemas.microsoft.com/office/powerpoint/2010/main" val="3768091958"/>
       </p:ext>
     </p:extLst>
   </p:cSld>
@@ -4047,7 +4214,18 @@
           <a:bodyPr/>
           <a:lstStyle/>
           <a:p>
-            <a:endParaRPr lang="en-US" dirty="0"/>
+            <a:r>
+              <a:rPr lang="en-US" dirty="0"/>
+              <a:t>Now, let’s translate this into a concrete number. Let’s pick 2**18 keys. Assuming a combined key and value size of 256 bits, that corresponds to 64 </a:t>
+            </a:r>
+            <a:r>
+              <a:rPr lang="en-US" dirty="0" err="1"/>
+              <a:t>Mbits</a:t>
+            </a:r>
+            <a:r>
+              <a:rPr lang="en-US" dirty="0"/>
+              <a:t>. That’s a 4% packet eviction ratio, which means it’s 25X smaller than processing every packet at a collection server directly.</a:t>
+            </a:r>
           </a:p>
         </p:txBody>
       </p:sp>
@@ -4068,7 +4246,7 @@
           <a:p>
             <a:fld id="{33793ACE-A489-1C41-B163-D1FF0130F898}" type="slidenum">
               <a:rPr lang="en-US" smtClean="0"/>
-              <a:t>46</a:t>
+              <a:t>43</a:t>
             </a:fld>
             <a:endParaRPr lang="en-US"/>
           </a:p>
@@ -4077,7 +4255,7 @@
     </p:spTree>
     <p:extLst>
       <p:ext uri="{BB962C8B-B14F-4D97-AF65-F5344CB8AC3E}">
-        <p14:creationId xmlns:p14="http://schemas.microsoft.com/office/powerpoint/2010/main" val="8400029"/>
+        <p14:creationId xmlns:p14="http://schemas.microsoft.com/office/powerpoint/2010/main" val="4082612346"/>
       </p:ext>
     </p:extLst>
   </p:cSld>
@@ -4131,8 +4309,18 @@
           <a:bodyPr/>
           <a:lstStyle/>
           <a:p>
-            <a:pPr lvl="1"/>
-            <a:endParaRPr lang="en-US" dirty="0"/>
+            <a:r>
+              <a:rPr lang="en-US" dirty="0"/>
+              <a:t>TO put this into context. For a 64-poort 100-Gbits/switch, if we assume 2**20 slots, that’s a memory requirement of 256 </a:t>
+            </a:r>
+            <a:r>
+              <a:rPr lang="en-US" dirty="0" err="1"/>
+              <a:t>Mbits</a:t>
+            </a:r>
+            <a:r>
+              <a:rPr lang="en-US" dirty="0"/>
+              <a:t>, which is about 7.5% of the switching chip’s area. Assuming typical traffic patterns for this switch, this translates into an eviction rate of 8M records every second, which we estimate can be handled by a 32-core server. So the way to think about this is that we can service the eviction rate for a 64 server cluster connected to a TOR switch by using a single 32-core server for typical workloads. This is a simplified summary of the results. The paper has many more details on this.</a:t>
+            </a:r>
           </a:p>
         </p:txBody>
       </p:sp>
@@ -4153,7 +4341,95 @@
           <a:p>
             <a:fld id="{33793ACE-A489-1C41-B163-D1FF0130F898}" type="slidenum">
               <a:rPr lang="en-US" smtClean="0"/>
-              <a:t>48</a:t>
+              <a:t>44</a:t>
+            </a:fld>
+            <a:endParaRPr lang="en-US"/>
+          </a:p>
+        </p:txBody>
+      </p:sp>
+    </p:spTree>
+    <p:extLst>
+      <p:ext uri="{BB962C8B-B14F-4D97-AF65-F5344CB8AC3E}">
+        <p14:creationId xmlns:p14="http://schemas.microsoft.com/office/powerpoint/2010/main" val="8400029"/>
+      </p:ext>
+    </p:extLst>
+  </p:cSld>
+  <p:clrMapOvr>
+    <a:masterClrMapping/>
+  </p:clrMapOvr>
+</p:notes>
+</file>
+
+<file path=ppt/notesSlides/notesSlide45.xml><?xml version="1.0" encoding="utf-8"?>
+<p:notes xmlns:a="http://schemas.openxmlformats.org/drawingml/2006/main" xmlns:r="http://schemas.openxmlformats.org/officeDocument/2006/relationships" xmlns:p="http://schemas.openxmlformats.org/presentationml/2006/main">
+  <p:cSld>
+    <p:spTree>
+      <p:nvGrpSpPr>
+        <p:cNvPr id="1" name=""/>
+        <p:cNvGrpSpPr/>
+        <p:nvPr/>
+      </p:nvGrpSpPr>
+      <p:grpSpPr>
+        <a:xfrm>
+          <a:off x="0" y="0"/>
+          <a:ext cx="0" cy="0"/>
+          <a:chOff x="0" y="0"/>
+          <a:chExt cx="0" cy="0"/>
+        </a:xfrm>
+      </p:grpSpPr>
+      <p:sp>
+        <p:nvSpPr>
+          <p:cNvPr id="2" name="Slide Image Placeholder 1"/>
+          <p:cNvSpPr>
+            <a:spLocks noGrp="1" noRot="1" noChangeAspect="1"/>
+          </p:cNvSpPr>
+          <p:nvPr>
+            <p:ph type="sldImg"/>
+          </p:nvPr>
+        </p:nvSpPr>
+        <p:spPr/>
+      </p:sp>
+      <p:sp>
+        <p:nvSpPr>
+          <p:cNvPr id="3" name="Notes Placeholder 2"/>
+          <p:cNvSpPr>
+            <a:spLocks noGrp="1"/>
+          </p:cNvSpPr>
+          <p:nvPr>
+            <p:ph type="body" idx="1"/>
+          </p:nvPr>
+        </p:nvSpPr>
+        <p:spPr/>
+        <p:txBody>
+          <a:bodyPr/>
+          <a:lstStyle/>
+          <a:p>
+            <a:pPr lvl="1"/>
+            <a:r>
+              <a:rPr lang="en-US" dirty="0"/>
+              <a:t>So in summary this talk was about two main ideas: (1) a query language for network performance monitoring that is designed to capture a variety of new and old network monitoring use cases and (2) a hardware design that supports this query language at high speeds. The full paper and supporting code are available at this web site, and I am happy to take questions.</a:t>
+            </a:r>
+          </a:p>
+        </p:txBody>
+      </p:sp>
+      <p:sp>
+        <p:nvSpPr>
+          <p:cNvPr id="4" name="Slide Number Placeholder 3"/>
+          <p:cNvSpPr>
+            <a:spLocks noGrp="1"/>
+          </p:cNvSpPr>
+          <p:nvPr>
+            <p:ph type="sldNum" sz="quarter" idx="10"/>
+          </p:nvPr>
+        </p:nvSpPr>
+        <p:spPr/>
+        <p:txBody>
+          <a:bodyPr/>
+          <a:lstStyle/>
+          <a:p>
+            <a:fld id="{33793ACE-A489-1C41-B163-D1FF0130F898}" type="slidenum">
+              <a:rPr lang="en-US" smtClean="0"/>
+              <a:t>45</a:t>
             </a:fld>
             <a:endParaRPr lang="en-US"/>
           </a:p>
@@ -13625,7 +13901,7 @@
           <a:effectLst/>
           <a:extLst>
             <a:ext uri="{909E8E84-426E-40dd-AFC4-6F175D3DCCD1}">
-              <a14:hiddenFill xmlns="" xmlns:a14="http://schemas.microsoft.com/office/drawing/2010/main">
+              <a14:hiddenFill xmlns:a14="http://schemas.microsoft.com/office/drawing/2010/main" xmlns="">
                 <a:blipFill dpi="0" rotWithShape="0">
                   <a:blip/>
                   <a:srcRect/>
@@ -13636,7 +13912,7 @@
               </a14:hiddenFill>
             </a:ext>
             <a:ext uri="{91240B29-F687-4f45-9708-019B960494DF}">
-              <a14:hiddenLine xmlns="" xmlns:a14="http://schemas.microsoft.com/office/drawing/2010/main" w="9525">
+              <a14:hiddenLine xmlns:a14="http://schemas.microsoft.com/office/drawing/2010/main" xmlns="" w="9525">
                 <a:solidFill>
                   <a:srgbClr val="000000"/>
                 </a:solidFill>
@@ -13646,7 +13922,7 @@
               </a14:hiddenLine>
             </a:ext>
             <a:ext uri="{AF507438-7753-43e0-B8FC-AC1667EBCBE1}">
-              <a14:hiddenEffects xmlns="" xmlns:a14="http://schemas.microsoft.com/office/drawing/2010/main">
+              <a14:hiddenEffects xmlns:a14="http://schemas.microsoft.com/office/drawing/2010/main" xmlns="">
                 <a:effectLst>
                   <a:outerShdw blurRad="63500" dist="38099" dir="2700000" algn="ctr" rotWithShape="0">
                     <a:srgbClr val="000000">
@@ -13695,7 +13971,7 @@
           <a:effectLst/>
           <a:extLst>
             <a:ext uri="{909E8E84-426E-40dd-AFC4-6F175D3DCCD1}">
-              <a14:hiddenFill xmlns="" xmlns:a14="http://schemas.microsoft.com/office/drawing/2010/main">
+              <a14:hiddenFill xmlns:a14="http://schemas.microsoft.com/office/drawing/2010/main" xmlns="">
                 <a:blipFill dpi="0" rotWithShape="0">
                   <a:blip/>
                   <a:srcRect/>
@@ -13706,7 +13982,7 @@
               </a14:hiddenFill>
             </a:ext>
             <a:ext uri="{91240B29-F687-4f45-9708-019B960494DF}">
-              <a14:hiddenLine xmlns="" xmlns:a14="http://schemas.microsoft.com/office/drawing/2010/main" w="9525">
+              <a14:hiddenLine xmlns:a14="http://schemas.microsoft.com/office/drawing/2010/main" xmlns="" w="9525">
                 <a:solidFill>
                   <a:srgbClr val="000000"/>
                 </a:solidFill>
@@ -13716,7 +13992,7 @@
               </a14:hiddenLine>
             </a:ext>
             <a:ext uri="{AF507438-7753-43e0-B8FC-AC1667EBCBE1}">
-              <a14:hiddenEffects xmlns="" xmlns:a14="http://schemas.microsoft.com/office/drawing/2010/main">
+              <a14:hiddenEffects xmlns:a14="http://schemas.microsoft.com/office/drawing/2010/main" xmlns="">
                 <a:effectLst>
                   <a:outerShdw blurRad="63500" dist="38099" dir="2700000" algn="ctr" rotWithShape="0">
                     <a:srgbClr val="000000">
@@ -13851,7 +14127,7 @@
             <a:effectLst/>
             <a:extLst>
               <a:ext uri="{909E8E84-426E-40dd-AFC4-6F175D3DCCD1}">
-                <a14:hiddenFill xmlns:a14="http://schemas.microsoft.com/office/drawing/2010/main" xmlns="">
+                <a14:hiddenFill xmlns="" xmlns:a14="http://schemas.microsoft.com/office/drawing/2010/main">
                   <a:blipFill dpi="0" rotWithShape="0">
                     <a:blip/>
                     <a:srcRect/>
@@ -13862,7 +14138,7 @@
                 </a14:hiddenFill>
               </a:ext>
               <a:ext uri="{91240B29-F687-4f45-9708-019B960494DF}">
-                <a14:hiddenLine xmlns:a14="http://schemas.microsoft.com/office/drawing/2010/main" xmlns="" w="9525">
+                <a14:hiddenLine xmlns="" xmlns:a14="http://schemas.microsoft.com/office/drawing/2010/main" w="9525">
                   <a:solidFill>
                     <a:srgbClr val="000000"/>
                   </a:solidFill>
@@ -13872,7 +14148,7 @@
                 </a14:hiddenLine>
               </a:ext>
               <a:ext uri="{AF507438-7753-43e0-B8FC-AC1667EBCBE1}">
-                <a14:hiddenEffects xmlns:a14="http://schemas.microsoft.com/office/drawing/2010/main" xmlns="">
+                <a14:hiddenEffects xmlns="" xmlns:a14="http://schemas.microsoft.com/office/drawing/2010/main">
                   <a:effectLst>
                     <a:outerShdw blurRad="63500" dist="38099" dir="2700000" algn="ctr" rotWithShape="0">
                       <a:srgbClr val="000000">
@@ -13921,7 +14197,7 @@
             <a:effectLst/>
             <a:extLst>
               <a:ext uri="{909E8E84-426E-40dd-AFC4-6F175D3DCCD1}">
-                <a14:hiddenFill xmlns:a14="http://schemas.microsoft.com/office/drawing/2010/main" xmlns="">
+                <a14:hiddenFill xmlns="" xmlns:a14="http://schemas.microsoft.com/office/drawing/2010/main">
                   <a:blipFill dpi="0" rotWithShape="0">
                     <a:blip/>
                     <a:srcRect/>
@@ -13932,7 +14208,7 @@
                 </a14:hiddenFill>
               </a:ext>
               <a:ext uri="{91240B29-F687-4f45-9708-019B960494DF}">
-                <a14:hiddenLine xmlns:a14="http://schemas.microsoft.com/office/drawing/2010/main" xmlns="" w="9525">
+                <a14:hiddenLine xmlns="" xmlns:a14="http://schemas.microsoft.com/office/drawing/2010/main" w="9525">
                   <a:solidFill>
                     <a:srgbClr val="000000"/>
                   </a:solidFill>
@@ -13942,7 +14218,7 @@
                 </a14:hiddenLine>
               </a:ext>
               <a:ext uri="{AF507438-7753-43e0-B8FC-AC1667EBCBE1}">
-                <a14:hiddenEffects xmlns:a14="http://schemas.microsoft.com/office/drawing/2010/main" xmlns="">
+                <a14:hiddenEffects xmlns="" xmlns:a14="http://schemas.microsoft.com/office/drawing/2010/main">
                   <a:effectLst>
                     <a:outerShdw blurRad="63500" dist="38099" dir="2700000" algn="ctr" rotWithShape="0">
                       <a:srgbClr val="000000">
@@ -13991,7 +14267,7 @@
             <a:effectLst/>
             <a:extLst>
               <a:ext uri="{909E8E84-426E-40dd-AFC4-6F175D3DCCD1}">
-                <a14:hiddenFill xmlns:a14="http://schemas.microsoft.com/office/drawing/2010/main" xmlns="">
+                <a14:hiddenFill xmlns="" xmlns:a14="http://schemas.microsoft.com/office/drawing/2010/main">
                   <a:blipFill dpi="0" rotWithShape="0">
                     <a:blip/>
                     <a:srcRect/>
@@ -14002,7 +14278,7 @@
                 </a14:hiddenFill>
               </a:ext>
               <a:ext uri="{91240B29-F687-4f45-9708-019B960494DF}">
-                <a14:hiddenLine xmlns:a14="http://schemas.microsoft.com/office/drawing/2010/main" xmlns="" w="9525">
+                <a14:hiddenLine xmlns="" xmlns:a14="http://schemas.microsoft.com/office/drawing/2010/main" w="9525">
                   <a:solidFill>
                     <a:srgbClr val="000000"/>
                   </a:solidFill>
@@ -14012,7 +14288,7 @@
                 </a14:hiddenLine>
               </a:ext>
               <a:ext uri="{AF507438-7753-43e0-B8FC-AC1667EBCBE1}">
-                <a14:hiddenEffects xmlns:a14="http://schemas.microsoft.com/office/drawing/2010/main" xmlns="">
+                <a14:hiddenEffects xmlns="" xmlns:a14="http://schemas.microsoft.com/office/drawing/2010/main">
                   <a:effectLst>
                     <a:outerShdw blurRad="63500" dist="38099" dir="2700000" algn="ctr" rotWithShape="0">
                       <a:srgbClr val="000000">
@@ -14053,12 +14329,12 @@
             <a:effectLst/>
             <a:extLst>
               <a:ext uri="{909E8E84-426E-40dd-AFC4-6F175D3DCCD1}">
-                <a14:hiddenFill xmlns:a14="http://schemas.microsoft.com/office/drawing/2010/main" xmlns="">
+                <a14:hiddenFill xmlns="" xmlns:a14="http://schemas.microsoft.com/office/drawing/2010/main">
                   <a:noFill/>
                 </a14:hiddenFill>
               </a:ext>
               <a:ext uri="{AF507438-7753-43e0-B8FC-AC1667EBCBE1}">
-                <a14:hiddenEffects xmlns:a14="http://schemas.microsoft.com/office/drawing/2010/main" xmlns="">
+                <a14:hiddenEffects xmlns="" xmlns:a14="http://schemas.microsoft.com/office/drawing/2010/main">
                   <a:effectLst>
                     <a:outerShdw blurRad="63500" dist="38099" dir="2700000" algn="ctr" rotWithShape="0">
                       <a:srgbClr val="000000">
@@ -14111,12 +14387,12 @@
             <a:effectLst/>
             <a:extLst>
               <a:ext uri="{909E8E84-426E-40dd-AFC4-6F175D3DCCD1}">
-                <a14:hiddenFill xmlns:a14="http://schemas.microsoft.com/office/drawing/2010/main" xmlns="">
+                <a14:hiddenFill xmlns="" xmlns:a14="http://schemas.microsoft.com/office/drawing/2010/main">
                   <a:noFill/>
                 </a14:hiddenFill>
               </a:ext>
               <a:ext uri="{AF507438-7753-43e0-B8FC-AC1667EBCBE1}">
-                <a14:hiddenEffects xmlns:a14="http://schemas.microsoft.com/office/drawing/2010/main" xmlns="">
+                <a14:hiddenEffects xmlns="" xmlns:a14="http://schemas.microsoft.com/office/drawing/2010/main">
                   <a:effectLst>
                     <a:outerShdw blurRad="63500" dist="38099" dir="2700000" algn="ctr" rotWithShape="0">
                       <a:srgbClr val="000000">
@@ -14169,12 +14445,12 @@
             <a:effectLst/>
             <a:extLst>
               <a:ext uri="{909E8E84-426E-40dd-AFC4-6F175D3DCCD1}">
-                <a14:hiddenFill xmlns:a14="http://schemas.microsoft.com/office/drawing/2010/main" xmlns="">
+                <a14:hiddenFill xmlns="" xmlns:a14="http://schemas.microsoft.com/office/drawing/2010/main">
                   <a:noFill/>
                 </a14:hiddenFill>
               </a:ext>
               <a:ext uri="{AF507438-7753-43e0-B8FC-AC1667EBCBE1}">
-                <a14:hiddenEffects xmlns:a14="http://schemas.microsoft.com/office/drawing/2010/main" xmlns="">
+                <a14:hiddenEffects xmlns="" xmlns:a14="http://schemas.microsoft.com/office/drawing/2010/main">
                   <a:effectLst>
                     <a:outerShdw blurRad="63500" dist="38099" dir="2700000" algn="ctr" rotWithShape="0">
                       <a:srgbClr val="000000">
@@ -14227,12 +14503,12 @@
             <a:effectLst/>
             <a:extLst>
               <a:ext uri="{909E8E84-426E-40dd-AFC4-6F175D3DCCD1}">
-                <a14:hiddenFill xmlns:a14="http://schemas.microsoft.com/office/drawing/2010/main" xmlns="">
+                <a14:hiddenFill xmlns="" xmlns:a14="http://schemas.microsoft.com/office/drawing/2010/main">
                   <a:noFill/>
                 </a14:hiddenFill>
               </a:ext>
               <a:ext uri="{AF507438-7753-43e0-B8FC-AC1667EBCBE1}">
-                <a14:hiddenEffects xmlns:a14="http://schemas.microsoft.com/office/drawing/2010/main" xmlns="">
+                <a14:hiddenEffects xmlns="" xmlns:a14="http://schemas.microsoft.com/office/drawing/2010/main">
                   <a:effectLst>
                     <a:outerShdw blurRad="63500" dist="38099" dir="2700000" algn="ctr" rotWithShape="0">
                       <a:srgbClr val="000000">
@@ -14285,12 +14561,12 @@
             <a:effectLst/>
             <a:extLst>
               <a:ext uri="{909E8E84-426E-40dd-AFC4-6F175D3DCCD1}">
-                <a14:hiddenFill xmlns:a14="http://schemas.microsoft.com/office/drawing/2010/main" xmlns="">
+                <a14:hiddenFill xmlns="" xmlns:a14="http://schemas.microsoft.com/office/drawing/2010/main">
                   <a:noFill/>
                 </a14:hiddenFill>
               </a:ext>
               <a:ext uri="{AF507438-7753-43e0-B8FC-AC1667EBCBE1}">
-                <a14:hiddenEffects xmlns:a14="http://schemas.microsoft.com/office/drawing/2010/main" xmlns="">
+                <a14:hiddenEffects xmlns="" xmlns:a14="http://schemas.microsoft.com/office/drawing/2010/main">
                   <a:effectLst>
                     <a:outerShdw blurRad="63500" dist="38099" dir="2700000" algn="ctr" rotWithShape="0">
                       <a:srgbClr val="000000">
@@ -14343,12 +14619,12 @@
             <a:effectLst/>
             <a:extLst>
               <a:ext uri="{909E8E84-426E-40dd-AFC4-6F175D3DCCD1}">
-                <a14:hiddenFill xmlns:a14="http://schemas.microsoft.com/office/drawing/2010/main" xmlns="">
+                <a14:hiddenFill xmlns="" xmlns:a14="http://schemas.microsoft.com/office/drawing/2010/main">
                   <a:noFill/>
                 </a14:hiddenFill>
               </a:ext>
               <a:ext uri="{AF507438-7753-43e0-B8FC-AC1667EBCBE1}">
-                <a14:hiddenEffects xmlns:a14="http://schemas.microsoft.com/office/drawing/2010/main" xmlns="">
+                <a14:hiddenEffects xmlns="" xmlns:a14="http://schemas.microsoft.com/office/drawing/2010/main">
                   <a:effectLst>
                     <a:outerShdw blurRad="63500" dist="38099" dir="2700000" algn="ctr" rotWithShape="0">
                       <a:srgbClr val="000000">
@@ -14401,12 +14677,12 @@
             <a:effectLst/>
             <a:extLst>
               <a:ext uri="{909E8E84-426E-40dd-AFC4-6F175D3DCCD1}">
-                <a14:hiddenFill xmlns:a14="http://schemas.microsoft.com/office/drawing/2010/main" xmlns="">
+                <a14:hiddenFill xmlns="" xmlns:a14="http://schemas.microsoft.com/office/drawing/2010/main">
                   <a:noFill/>
                 </a14:hiddenFill>
               </a:ext>
               <a:ext uri="{AF507438-7753-43e0-B8FC-AC1667EBCBE1}">
-                <a14:hiddenEffects xmlns:a14="http://schemas.microsoft.com/office/drawing/2010/main" xmlns="">
+                <a14:hiddenEffects xmlns="" xmlns:a14="http://schemas.microsoft.com/office/drawing/2010/main">
                   <a:effectLst>
                     <a:outerShdw blurRad="63500" dist="38099" dir="2700000" algn="ctr" rotWithShape="0">
                       <a:srgbClr val="000000">
@@ -14459,12 +14735,12 @@
             <a:effectLst/>
             <a:extLst>
               <a:ext uri="{909E8E84-426E-40dd-AFC4-6F175D3DCCD1}">
-                <a14:hiddenFill xmlns:a14="http://schemas.microsoft.com/office/drawing/2010/main" xmlns="">
+                <a14:hiddenFill xmlns="" xmlns:a14="http://schemas.microsoft.com/office/drawing/2010/main">
                   <a:noFill/>
                 </a14:hiddenFill>
               </a:ext>
               <a:ext uri="{AF507438-7753-43e0-B8FC-AC1667EBCBE1}">
-                <a14:hiddenEffects xmlns:a14="http://schemas.microsoft.com/office/drawing/2010/main" xmlns="">
+                <a14:hiddenEffects xmlns="" xmlns:a14="http://schemas.microsoft.com/office/drawing/2010/main">
                   <a:effectLst>
                     <a:outerShdw blurRad="63500" dist="38099" dir="2700000" algn="ctr" rotWithShape="0">
                       <a:srgbClr val="000000">
@@ -14517,12 +14793,12 @@
             <a:effectLst/>
             <a:extLst>
               <a:ext uri="{909E8E84-426E-40dd-AFC4-6F175D3DCCD1}">
-                <a14:hiddenFill xmlns:a14="http://schemas.microsoft.com/office/drawing/2010/main" xmlns="">
+                <a14:hiddenFill xmlns="" xmlns:a14="http://schemas.microsoft.com/office/drawing/2010/main">
                   <a:noFill/>
                 </a14:hiddenFill>
               </a:ext>
               <a:ext uri="{AF507438-7753-43e0-B8FC-AC1667EBCBE1}">
-                <a14:hiddenEffects xmlns:a14="http://schemas.microsoft.com/office/drawing/2010/main" xmlns="">
+                <a14:hiddenEffects xmlns="" xmlns:a14="http://schemas.microsoft.com/office/drawing/2010/main">
                   <a:effectLst>
                     <a:outerShdw blurRad="63500" dist="38099" dir="2700000" algn="ctr" rotWithShape="0">
                       <a:srgbClr val="000000">
@@ -14575,12 +14851,12 @@
             <a:effectLst/>
             <a:extLst>
               <a:ext uri="{909E8E84-426E-40dd-AFC4-6F175D3DCCD1}">
-                <a14:hiddenFill xmlns:a14="http://schemas.microsoft.com/office/drawing/2010/main" xmlns="">
+                <a14:hiddenFill xmlns="" xmlns:a14="http://schemas.microsoft.com/office/drawing/2010/main">
                   <a:noFill/>
                 </a14:hiddenFill>
               </a:ext>
               <a:ext uri="{AF507438-7753-43e0-B8FC-AC1667EBCBE1}">
-                <a14:hiddenEffects xmlns:a14="http://schemas.microsoft.com/office/drawing/2010/main" xmlns="">
+                <a14:hiddenEffects xmlns="" xmlns:a14="http://schemas.microsoft.com/office/drawing/2010/main">
                   <a:effectLst>
                     <a:outerShdw blurRad="63500" dist="38099" dir="2700000" algn="ctr" rotWithShape="0">
                       <a:srgbClr val="000000">
@@ -14641,7 +14917,7 @@
             <a:effectLst/>
             <a:extLst>
               <a:ext uri="{909E8E84-426E-40dd-AFC4-6F175D3DCCD1}">
-                <a14:hiddenFill xmlns:a14="http://schemas.microsoft.com/office/drawing/2010/main" xmlns="">
+                <a14:hiddenFill xmlns="" xmlns:a14="http://schemas.microsoft.com/office/drawing/2010/main">
                   <a:blipFill dpi="0" rotWithShape="0">
                     <a:blip/>
                     <a:srcRect/>
@@ -14652,7 +14928,7 @@
                 </a14:hiddenFill>
               </a:ext>
               <a:ext uri="{91240B29-F687-4f45-9708-019B960494DF}">
-                <a14:hiddenLine xmlns:a14="http://schemas.microsoft.com/office/drawing/2010/main" xmlns="" w="9525">
+                <a14:hiddenLine xmlns="" xmlns:a14="http://schemas.microsoft.com/office/drawing/2010/main" w="9525">
                   <a:solidFill>
                     <a:srgbClr val="000000"/>
                   </a:solidFill>
@@ -14662,7 +14938,7 @@
                 </a14:hiddenLine>
               </a:ext>
               <a:ext uri="{AF507438-7753-43e0-B8FC-AC1667EBCBE1}">
-                <a14:hiddenEffects xmlns:a14="http://schemas.microsoft.com/office/drawing/2010/main" xmlns="">
+                <a14:hiddenEffects xmlns="" xmlns:a14="http://schemas.microsoft.com/office/drawing/2010/main">
                   <a:effectLst>
                     <a:outerShdw blurRad="63500" dist="38099" dir="2700000" algn="ctr" rotWithShape="0">
                       <a:srgbClr val="000000">
@@ -14711,7 +14987,7 @@
             <a:effectLst/>
             <a:extLst>
               <a:ext uri="{909E8E84-426E-40dd-AFC4-6F175D3DCCD1}">
-                <a14:hiddenFill xmlns:a14="http://schemas.microsoft.com/office/drawing/2010/main" xmlns="">
+                <a14:hiddenFill xmlns="" xmlns:a14="http://schemas.microsoft.com/office/drawing/2010/main">
                   <a:blipFill dpi="0" rotWithShape="0">
                     <a:blip/>
                     <a:srcRect/>
@@ -14722,7 +14998,7 @@
                 </a14:hiddenFill>
               </a:ext>
               <a:ext uri="{91240B29-F687-4f45-9708-019B960494DF}">
-                <a14:hiddenLine xmlns:a14="http://schemas.microsoft.com/office/drawing/2010/main" xmlns="" w="9525">
+                <a14:hiddenLine xmlns="" xmlns:a14="http://schemas.microsoft.com/office/drawing/2010/main" w="9525">
                   <a:solidFill>
                     <a:srgbClr val="000000"/>
                   </a:solidFill>
@@ -14732,7 +15008,7 @@
                 </a14:hiddenLine>
               </a:ext>
               <a:ext uri="{AF507438-7753-43e0-B8FC-AC1667EBCBE1}">
-                <a14:hiddenEffects xmlns:a14="http://schemas.microsoft.com/office/drawing/2010/main" xmlns="">
+                <a14:hiddenEffects xmlns="" xmlns:a14="http://schemas.microsoft.com/office/drawing/2010/main">
                   <a:effectLst>
                     <a:outerShdw blurRad="63500" dist="38099" dir="2700000" algn="ctr" rotWithShape="0">
                       <a:srgbClr val="000000">
@@ -14781,7 +15057,7 @@
             <a:effectLst/>
             <a:extLst>
               <a:ext uri="{909E8E84-426E-40dd-AFC4-6F175D3DCCD1}">
-                <a14:hiddenFill xmlns:a14="http://schemas.microsoft.com/office/drawing/2010/main" xmlns="">
+                <a14:hiddenFill xmlns="" xmlns:a14="http://schemas.microsoft.com/office/drawing/2010/main">
                   <a:blipFill dpi="0" rotWithShape="0">
                     <a:blip/>
                     <a:srcRect/>
@@ -14792,7 +15068,7 @@
                 </a14:hiddenFill>
               </a:ext>
               <a:ext uri="{91240B29-F687-4f45-9708-019B960494DF}">
-                <a14:hiddenLine xmlns:a14="http://schemas.microsoft.com/office/drawing/2010/main" xmlns="" w="9525">
+                <a14:hiddenLine xmlns="" xmlns:a14="http://schemas.microsoft.com/office/drawing/2010/main" w="9525">
                   <a:solidFill>
                     <a:srgbClr val="000000"/>
                   </a:solidFill>
@@ -14802,7 +15078,7 @@
                 </a14:hiddenLine>
               </a:ext>
               <a:ext uri="{AF507438-7753-43e0-B8FC-AC1667EBCBE1}">
-                <a14:hiddenEffects xmlns:a14="http://schemas.microsoft.com/office/drawing/2010/main" xmlns="">
+                <a14:hiddenEffects xmlns="" xmlns:a14="http://schemas.microsoft.com/office/drawing/2010/main">
                   <a:effectLst>
                     <a:outerShdw blurRad="63500" dist="38099" dir="2700000" algn="ctr" rotWithShape="0">
                       <a:srgbClr val="000000">
@@ -14851,7 +15127,7 @@
             <a:effectLst/>
             <a:extLst>
               <a:ext uri="{909E8E84-426E-40dd-AFC4-6F175D3DCCD1}">
-                <a14:hiddenFill xmlns:a14="http://schemas.microsoft.com/office/drawing/2010/main" xmlns="">
+                <a14:hiddenFill xmlns="" xmlns:a14="http://schemas.microsoft.com/office/drawing/2010/main">
                   <a:blipFill dpi="0" rotWithShape="0">
                     <a:blip/>
                     <a:srcRect/>
@@ -14862,7 +15138,7 @@
                 </a14:hiddenFill>
               </a:ext>
               <a:ext uri="{91240B29-F687-4f45-9708-019B960494DF}">
-                <a14:hiddenLine xmlns:a14="http://schemas.microsoft.com/office/drawing/2010/main" xmlns="" w="9525">
+                <a14:hiddenLine xmlns="" xmlns:a14="http://schemas.microsoft.com/office/drawing/2010/main" w="9525">
                   <a:solidFill>
                     <a:srgbClr val="000000"/>
                   </a:solidFill>
@@ -14872,7 +15148,7 @@
                 </a14:hiddenLine>
               </a:ext>
               <a:ext uri="{AF507438-7753-43e0-B8FC-AC1667EBCBE1}">
-                <a14:hiddenEffects xmlns:a14="http://schemas.microsoft.com/office/drawing/2010/main" xmlns="">
+                <a14:hiddenEffects xmlns="" xmlns:a14="http://schemas.microsoft.com/office/drawing/2010/main">
                   <a:effectLst>
                     <a:outerShdw blurRad="63500" dist="38099" dir="2700000" algn="ctr" rotWithShape="0">
                       <a:srgbClr val="000000">
@@ -14921,7 +15197,7 @@
             <a:effectLst/>
             <a:extLst>
               <a:ext uri="{909E8E84-426E-40dd-AFC4-6F175D3DCCD1}">
-                <a14:hiddenFill xmlns:a14="http://schemas.microsoft.com/office/drawing/2010/main" xmlns="">
+                <a14:hiddenFill xmlns="" xmlns:a14="http://schemas.microsoft.com/office/drawing/2010/main">
                   <a:blipFill dpi="0" rotWithShape="0">
                     <a:blip/>
                     <a:srcRect/>
@@ -14932,7 +15208,7 @@
                 </a14:hiddenFill>
               </a:ext>
               <a:ext uri="{91240B29-F687-4f45-9708-019B960494DF}">
-                <a14:hiddenLine xmlns:a14="http://schemas.microsoft.com/office/drawing/2010/main" xmlns="" w="9525">
+                <a14:hiddenLine xmlns="" xmlns:a14="http://schemas.microsoft.com/office/drawing/2010/main" w="9525">
                   <a:solidFill>
                     <a:srgbClr val="000000"/>
                   </a:solidFill>
@@ -14942,7 +15218,7 @@
                 </a14:hiddenLine>
               </a:ext>
               <a:ext uri="{AF507438-7753-43e0-B8FC-AC1667EBCBE1}">
-                <a14:hiddenEffects xmlns:a14="http://schemas.microsoft.com/office/drawing/2010/main" xmlns="">
+                <a14:hiddenEffects xmlns="" xmlns:a14="http://schemas.microsoft.com/office/drawing/2010/main">
                   <a:effectLst>
                     <a:outerShdw blurRad="63500" dist="38099" dir="2700000" algn="ctr" rotWithShape="0">
                       <a:srgbClr val="000000">
@@ -14983,12 +15259,12 @@
             <a:effectLst/>
             <a:extLst>
               <a:ext uri="{909E8E84-426E-40dd-AFC4-6F175D3DCCD1}">
-                <a14:hiddenFill xmlns:a14="http://schemas.microsoft.com/office/drawing/2010/main" xmlns="">
+                <a14:hiddenFill xmlns="" xmlns:a14="http://schemas.microsoft.com/office/drawing/2010/main">
                   <a:noFill/>
                 </a14:hiddenFill>
               </a:ext>
               <a:ext uri="{AF507438-7753-43e0-B8FC-AC1667EBCBE1}">
-                <a14:hiddenEffects xmlns:a14="http://schemas.microsoft.com/office/drawing/2010/main" xmlns="">
+                <a14:hiddenEffects xmlns="" xmlns:a14="http://schemas.microsoft.com/office/drawing/2010/main">
                   <a:effectLst>
                     <a:outerShdw blurRad="63500" dist="38099" dir="2700000" algn="ctr" rotWithShape="0">
                       <a:srgbClr val="000000">
@@ -15041,12 +15317,12 @@
             <a:effectLst/>
             <a:extLst>
               <a:ext uri="{909E8E84-426E-40dd-AFC4-6F175D3DCCD1}">
-                <a14:hiddenFill xmlns:a14="http://schemas.microsoft.com/office/drawing/2010/main" xmlns="">
+                <a14:hiddenFill xmlns="" xmlns:a14="http://schemas.microsoft.com/office/drawing/2010/main">
                   <a:noFill/>
                 </a14:hiddenFill>
               </a:ext>
               <a:ext uri="{AF507438-7753-43e0-B8FC-AC1667EBCBE1}">
-                <a14:hiddenEffects xmlns:a14="http://schemas.microsoft.com/office/drawing/2010/main" xmlns="">
+                <a14:hiddenEffects xmlns="" xmlns:a14="http://schemas.microsoft.com/office/drawing/2010/main">
                   <a:effectLst>
                     <a:outerShdw blurRad="63500" dist="38099" dir="2700000" algn="ctr" rotWithShape="0">
                       <a:srgbClr val="000000">
@@ -15107,7 +15383,7 @@
             <a:effectLst/>
             <a:extLst>
               <a:ext uri="{909E8E84-426E-40dd-AFC4-6F175D3DCCD1}">
-                <a14:hiddenFill xmlns:a14="http://schemas.microsoft.com/office/drawing/2010/main" xmlns="">
+                <a14:hiddenFill xmlns="" xmlns:a14="http://schemas.microsoft.com/office/drawing/2010/main">
                   <a:blipFill dpi="0" rotWithShape="0">
                     <a:blip/>
                     <a:srcRect/>
@@ -15118,7 +15394,7 @@
                 </a14:hiddenFill>
               </a:ext>
               <a:ext uri="{91240B29-F687-4f45-9708-019B960494DF}">
-                <a14:hiddenLine xmlns:a14="http://schemas.microsoft.com/office/drawing/2010/main" xmlns="" w="9525">
+                <a14:hiddenLine xmlns="" xmlns:a14="http://schemas.microsoft.com/office/drawing/2010/main" w="9525">
                   <a:solidFill>
                     <a:srgbClr val="000000"/>
                   </a:solidFill>
@@ -15128,7 +15404,7 @@
                 </a14:hiddenLine>
               </a:ext>
               <a:ext uri="{AF507438-7753-43e0-B8FC-AC1667EBCBE1}">
-                <a14:hiddenEffects xmlns:a14="http://schemas.microsoft.com/office/drawing/2010/main" xmlns="">
+                <a14:hiddenEffects xmlns="" xmlns:a14="http://schemas.microsoft.com/office/drawing/2010/main">
                   <a:effectLst>
                     <a:outerShdw blurRad="63500" dist="38099" dir="2700000" algn="ctr" rotWithShape="0">
                       <a:srgbClr val="000000">
@@ -15261,7 +15537,7 @@
           <a:effectLst/>
           <a:extLst>
             <a:ext uri="{909E8E84-426E-40dd-AFC4-6F175D3DCCD1}">
-              <a14:hiddenFill xmlns="" xmlns:a14="http://schemas.microsoft.com/office/drawing/2010/main">
+              <a14:hiddenFill xmlns:a14="http://schemas.microsoft.com/office/drawing/2010/main" xmlns="">
                 <a:blipFill dpi="0" rotWithShape="0">
                   <a:blip/>
                   <a:srcRect/>
@@ -15272,7 +15548,7 @@
               </a14:hiddenFill>
             </a:ext>
             <a:ext uri="{91240B29-F687-4f45-9708-019B960494DF}">
-              <a14:hiddenLine xmlns="" xmlns:a14="http://schemas.microsoft.com/office/drawing/2010/main" w="9525">
+              <a14:hiddenLine xmlns:a14="http://schemas.microsoft.com/office/drawing/2010/main" xmlns="" w="9525">
                 <a:solidFill>
                   <a:srgbClr val="000000"/>
                 </a:solidFill>
@@ -15282,7 +15558,7 @@
               </a14:hiddenLine>
             </a:ext>
             <a:ext uri="{AF507438-7753-43e0-B8FC-AC1667EBCBE1}">
-              <a14:hiddenEffects xmlns="" xmlns:a14="http://schemas.microsoft.com/office/drawing/2010/main">
+              <a14:hiddenEffects xmlns:a14="http://schemas.microsoft.com/office/drawing/2010/main" xmlns="">
                 <a:effectLst>
                   <a:outerShdw blurRad="63500" dist="38099" dir="2700000" algn="ctr" rotWithShape="0">
                     <a:srgbClr val="000000">
@@ -15367,7 +15643,7 @@
           <a:effectLst/>
           <a:extLst>
             <a:ext uri="{909E8E84-426E-40dd-AFC4-6F175D3DCCD1}">
-              <a14:hiddenFill xmlns="" xmlns:a14="http://schemas.microsoft.com/office/drawing/2010/main">
+              <a14:hiddenFill xmlns:a14="http://schemas.microsoft.com/office/drawing/2010/main" xmlns="">
                 <a:blipFill dpi="0" rotWithShape="0">
                   <a:blip/>
                   <a:srcRect/>
@@ -15378,7 +15654,7 @@
               </a14:hiddenFill>
             </a:ext>
             <a:ext uri="{91240B29-F687-4f45-9708-019B960494DF}">
-              <a14:hiddenLine xmlns="" xmlns:a14="http://schemas.microsoft.com/office/drawing/2010/main" w="9525">
+              <a14:hiddenLine xmlns:a14="http://schemas.microsoft.com/office/drawing/2010/main" xmlns="" w="9525">
                 <a:solidFill>
                   <a:srgbClr val="000000"/>
                 </a:solidFill>
@@ -15388,7 +15664,7 @@
               </a14:hiddenLine>
             </a:ext>
             <a:ext uri="{AF507438-7753-43e0-B8FC-AC1667EBCBE1}">
-              <a14:hiddenEffects xmlns="" xmlns:a14="http://schemas.microsoft.com/office/drawing/2010/main">
+              <a14:hiddenEffects xmlns:a14="http://schemas.microsoft.com/office/drawing/2010/main" xmlns="">
                 <a:effectLst>
                   <a:outerShdw blurRad="63500" dist="38099" dir="2700000" algn="ctr" rotWithShape="0">
                     <a:srgbClr val="000000">
@@ -15473,7 +15749,7 @@
           <a:effectLst/>
           <a:extLst>
             <a:ext uri="{909E8E84-426E-40dd-AFC4-6F175D3DCCD1}">
-              <a14:hiddenFill xmlns="" xmlns:a14="http://schemas.microsoft.com/office/drawing/2010/main">
+              <a14:hiddenFill xmlns:a14="http://schemas.microsoft.com/office/drawing/2010/main" xmlns="">
                 <a:blipFill dpi="0" rotWithShape="0">
                   <a:blip/>
                   <a:srcRect/>
@@ -15484,7 +15760,7 @@
               </a14:hiddenFill>
             </a:ext>
             <a:ext uri="{91240B29-F687-4f45-9708-019B960494DF}">
-              <a14:hiddenLine xmlns="" xmlns:a14="http://schemas.microsoft.com/office/drawing/2010/main" w="9525">
+              <a14:hiddenLine xmlns:a14="http://schemas.microsoft.com/office/drawing/2010/main" xmlns="" w="9525">
                 <a:solidFill>
                   <a:srgbClr val="000000"/>
                 </a:solidFill>
@@ -15494,7 +15770,7 @@
               </a14:hiddenLine>
             </a:ext>
             <a:ext uri="{AF507438-7753-43e0-B8FC-AC1667EBCBE1}">
-              <a14:hiddenEffects xmlns="" xmlns:a14="http://schemas.microsoft.com/office/drawing/2010/main">
+              <a14:hiddenEffects xmlns:a14="http://schemas.microsoft.com/office/drawing/2010/main" xmlns="">
                 <a:effectLst>
                   <a:outerShdw blurRad="63500" dist="38099" dir="2700000" algn="ctr" rotWithShape="0">
                     <a:srgbClr val="000000">
@@ -15674,7 +15950,7 @@
           <a:effectLst/>
           <a:extLst>
             <a:ext uri="{909E8E84-426E-40dd-AFC4-6F175D3DCCD1}">
-              <a14:hiddenFill xmlns="" xmlns:a14="http://schemas.microsoft.com/office/drawing/2010/main">
+              <a14:hiddenFill xmlns:a14="http://schemas.microsoft.com/office/drawing/2010/main" xmlns="">
                 <a:blipFill dpi="0" rotWithShape="0">
                   <a:blip/>
                   <a:srcRect/>
@@ -15685,7 +15961,7 @@
               </a14:hiddenFill>
             </a:ext>
             <a:ext uri="{91240B29-F687-4f45-9708-019B960494DF}">
-              <a14:hiddenLine xmlns="" xmlns:a14="http://schemas.microsoft.com/office/drawing/2010/main" w="9525">
+              <a14:hiddenLine xmlns:a14="http://schemas.microsoft.com/office/drawing/2010/main" xmlns="" w="9525">
                 <a:solidFill>
                   <a:srgbClr val="000000"/>
                 </a:solidFill>
@@ -15695,7 +15971,7 @@
               </a14:hiddenLine>
             </a:ext>
             <a:ext uri="{AF507438-7753-43e0-B8FC-AC1667EBCBE1}">
-              <a14:hiddenEffects xmlns="" xmlns:a14="http://schemas.microsoft.com/office/drawing/2010/main">
+              <a14:hiddenEffects xmlns:a14="http://schemas.microsoft.com/office/drawing/2010/main" xmlns="">
                 <a:effectLst>
                   <a:outerShdw blurRad="63500" dist="38099" dir="2700000" algn="ctr" rotWithShape="0">
                     <a:srgbClr val="000000">
@@ -15773,7 +16049,7 @@
           <a:effectLst/>
           <a:extLst>
             <a:ext uri="{909E8E84-426E-40dd-AFC4-6F175D3DCCD1}">
-              <a14:hiddenFill xmlns="" xmlns:a14="http://schemas.microsoft.com/office/drawing/2010/main">
+              <a14:hiddenFill xmlns:a14="http://schemas.microsoft.com/office/drawing/2010/main" xmlns="">
                 <a:blipFill dpi="0" rotWithShape="0">
                   <a:blip/>
                   <a:srcRect/>
@@ -15784,7 +16060,7 @@
               </a14:hiddenFill>
             </a:ext>
             <a:ext uri="{91240B29-F687-4f45-9708-019B960494DF}">
-              <a14:hiddenLine xmlns="" xmlns:a14="http://schemas.microsoft.com/office/drawing/2010/main" w="9525">
+              <a14:hiddenLine xmlns:a14="http://schemas.microsoft.com/office/drawing/2010/main" xmlns="" w="9525">
                 <a:solidFill>
                   <a:srgbClr val="000000"/>
                 </a:solidFill>
@@ -15794,7 +16070,7 @@
               </a14:hiddenLine>
             </a:ext>
             <a:ext uri="{AF507438-7753-43e0-B8FC-AC1667EBCBE1}">
-              <a14:hiddenEffects xmlns="" xmlns:a14="http://schemas.microsoft.com/office/drawing/2010/main">
+              <a14:hiddenEffects xmlns:a14="http://schemas.microsoft.com/office/drawing/2010/main" xmlns="">
                 <a:effectLst>
                   <a:outerShdw blurRad="63500" dist="38099" dir="2700000" algn="ctr" rotWithShape="0">
                     <a:srgbClr val="000000">
@@ -15872,7 +16148,7 @@
           <a:effectLst/>
           <a:extLst>
             <a:ext uri="{909E8E84-426E-40dd-AFC4-6F175D3DCCD1}">
-              <a14:hiddenFill xmlns="" xmlns:a14="http://schemas.microsoft.com/office/drawing/2010/main">
+              <a14:hiddenFill xmlns:a14="http://schemas.microsoft.com/office/drawing/2010/main" xmlns="">
                 <a:blipFill dpi="0" rotWithShape="0">
                   <a:blip/>
                   <a:srcRect/>
@@ -15883,7 +16159,7 @@
               </a14:hiddenFill>
             </a:ext>
             <a:ext uri="{91240B29-F687-4f45-9708-019B960494DF}">
-              <a14:hiddenLine xmlns="" xmlns:a14="http://schemas.microsoft.com/office/drawing/2010/main" w="9525">
+              <a14:hiddenLine xmlns:a14="http://schemas.microsoft.com/office/drawing/2010/main" xmlns="" w="9525">
                 <a:solidFill>
                   <a:srgbClr val="000000"/>
                 </a:solidFill>
@@ -15893,7 +16169,7 @@
               </a14:hiddenLine>
             </a:ext>
             <a:ext uri="{AF507438-7753-43e0-B8FC-AC1667EBCBE1}">
-              <a14:hiddenEffects xmlns="" xmlns:a14="http://schemas.microsoft.com/office/drawing/2010/main">
+              <a14:hiddenEffects xmlns:a14="http://schemas.microsoft.com/office/drawing/2010/main" xmlns="">
                 <a:effectLst>
                   <a:outerShdw blurRad="63500" dist="38099" dir="2700000" algn="ctr" rotWithShape="0">
                     <a:srgbClr val="000000">
@@ -17872,7 +18148,7 @@
           <a:effectLst/>
           <a:extLst>
             <a:ext uri="{909E8E84-426E-40dd-AFC4-6F175D3DCCD1}">
-              <a14:hiddenFill xmlns:a14="http://schemas.microsoft.com/office/drawing/2010/main" xmlns="">
+              <a14:hiddenFill xmlns="" xmlns:a14="http://schemas.microsoft.com/office/drawing/2010/main">
                 <a:blipFill dpi="0" rotWithShape="0">
                   <a:blip/>
                   <a:srcRect/>
@@ -17883,7 +18159,7 @@
               </a14:hiddenFill>
             </a:ext>
             <a:ext uri="{91240B29-F687-4f45-9708-019B960494DF}">
-              <a14:hiddenLine xmlns:a14="http://schemas.microsoft.com/office/drawing/2010/main" xmlns="" w="9525">
+              <a14:hiddenLine xmlns="" xmlns:a14="http://schemas.microsoft.com/office/drawing/2010/main" w="9525">
                 <a:solidFill>
                   <a:srgbClr val="000000"/>
                 </a:solidFill>
@@ -17893,7 +18169,7 @@
               </a14:hiddenLine>
             </a:ext>
             <a:ext uri="{AF507438-7753-43e0-B8FC-AC1667EBCBE1}">
-              <a14:hiddenEffects xmlns:a14="http://schemas.microsoft.com/office/drawing/2010/main" xmlns="">
+              <a14:hiddenEffects xmlns="" xmlns:a14="http://schemas.microsoft.com/office/drawing/2010/main">
                 <a:effectLst>
                   <a:outerShdw blurRad="63500" dist="38099" dir="2700000" algn="ctr" rotWithShape="0">
                     <a:srgbClr val="000000">
@@ -19382,7 +19658,7 @@
           <a:effectLst/>
           <a:extLst>
             <a:ext uri="{909E8E84-426E-40dd-AFC4-6F175D3DCCD1}">
-              <a14:hiddenFill xmlns:a14="http://schemas.microsoft.com/office/drawing/2010/main" xmlns="">
+              <a14:hiddenFill xmlns="" xmlns:a14="http://schemas.microsoft.com/office/drawing/2010/main">
                 <a:blipFill dpi="0" rotWithShape="0">
                   <a:blip/>
                   <a:srcRect/>
@@ -19393,7 +19669,7 @@
               </a14:hiddenFill>
             </a:ext>
             <a:ext uri="{91240B29-F687-4f45-9708-019B960494DF}">
-              <a14:hiddenLine xmlns:a14="http://schemas.microsoft.com/office/drawing/2010/main" xmlns="" w="9525">
+              <a14:hiddenLine xmlns="" xmlns:a14="http://schemas.microsoft.com/office/drawing/2010/main" w="9525">
                 <a:solidFill>
                   <a:srgbClr val="000000"/>
                 </a:solidFill>
@@ -19403,7 +19679,7 @@
               </a14:hiddenLine>
             </a:ext>
             <a:ext uri="{AF507438-7753-43e0-B8FC-AC1667EBCBE1}">
-              <a14:hiddenEffects xmlns:a14="http://schemas.microsoft.com/office/drawing/2010/main" xmlns="">
+              <a14:hiddenEffects xmlns="" xmlns:a14="http://schemas.microsoft.com/office/drawing/2010/main">
                 <a:effectLst>
                   <a:outerShdw blurRad="63500" dist="38099" dir="2700000" algn="ctr" rotWithShape="0">
                     <a:srgbClr val="000000">
@@ -20888,7 +21164,7 @@
           <a:effectLst/>
           <a:extLst>
             <a:ext uri="{909E8E84-426E-40dd-AFC4-6F175D3DCCD1}">
-              <a14:hiddenFill xmlns:a14="http://schemas.microsoft.com/office/drawing/2010/main" xmlns="">
+              <a14:hiddenFill xmlns="" xmlns:a14="http://schemas.microsoft.com/office/drawing/2010/main">
                 <a:blipFill dpi="0" rotWithShape="0">
                   <a:blip/>
                   <a:srcRect/>
@@ -20899,7 +21175,7 @@
               </a14:hiddenFill>
             </a:ext>
             <a:ext uri="{91240B29-F687-4f45-9708-019B960494DF}">
-              <a14:hiddenLine xmlns:a14="http://schemas.microsoft.com/office/drawing/2010/main" xmlns="" w="9525">
+              <a14:hiddenLine xmlns="" xmlns:a14="http://schemas.microsoft.com/office/drawing/2010/main" w="9525">
                 <a:solidFill>
                   <a:srgbClr val="000000"/>
                 </a:solidFill>
@@ -20909,7 +21185,7 @@
               </a14:hiddenLine>
             </a:ext>
             <a:ext uri="{AF507438-7753-43e0-B8FC-AC1667EBCBE1}">
-              <a14:hiddenEffects xmlns:a14="http://schemas.microsoft.com/office/drawing/2010/main" xmlns="">
+              <a14:hiddenEffects xmlns="" xmlns:a14="http://schemas.microsoft.com/office/drawing/2010/main">
                 <a:effectLst>
                   <a:outerShdw blurRad="63500" dist="38099" dir="2700000" algn="ctr" rotWithShape="0">
                     <a:srgbClr val="000000">
@@ -21063,7 +21339,7 @@
           <a:effectLst/>
           <a:extLst>
             <a:ext uri="{909E8E84-426E-40dd-AFC4-6F175D3DCCD1}">
-              <a14:hiddenFill xmlns:a14="http://schemas.microsoft.com/office/drawing/2010/main" xmlns="">
+              <a14:hiddenFill xmlns="" xmlns:a14="http://schemas.microsoft.com/office/drawing/2010/main">
                 <a:blipFill dpi="0" rotWithShape="0">
                   <a:blip/>
                   <a:srcRect/>
@@ -21074,7 +21350,7 @@
               </a14:hiddenFill>
             </a:ext>
             <a:ext uri="{91240B29-F687-4f45-9708-019B960494DF}">
-              <a14:hiddenLine xmlns:a14="http://schemas.microsoft.com/office/drawing/2010/main" xmlns="" w="9525">
+              <a14:hiddenLine xmlns="" xmlns:a14="http://schemas.microsoft.com/office/drawing/2010/main" w="9525">
                 <a:solidFill>
                   <a:srgbClr val="000000"/>
                 </a:solidFill>
@@ -21084,7 +21360,7 @@
               </a14:hiddenLine>
             </a:ext>
             <a:ext uri="{AF507438-7753-43e0-B8FC-AC1667EBCBE1}">
-              <a14:hiddenEffects xmlns:a14="http://schemas.microsoft.com/office/drawing/2010/main" xmlns="">
+              <a14:hiddenEffects xmlns="" xmlns:a14="http://schemas.microsoft.com/office/drawing/2010/main">
                 <a:effectLst>
                   <a:outerShdw blurRad="63500" dist="38099" dir="2700000" algn="ctr" rotWithShape="0">
                     <a:srgbClr val="000000">
@@ -22877,7 +23153,7 @@
           <a:effectLst/>
           <a:extLst>
             <a:ext uri="{909E8E84-426E-40dd-AFC4-6F175D3DCCD1}">
-              <a14:hiddenFill xmlns:a14="http://schemas.microsoft.com/office/drawing/2010/main" xmlns="">
+              <a14:hiddenFill xmlns="" xmlns:a14="http://schemas.microsoft.com/office/drawing/2010/main">
                 <a:blipFill dpi="0" rotWithShape="0">
                   <a:blip/>
                   <a:srcRect/>
@@ -22888,7 +23164,7 @@
               </a14:hiddenFill>
             </a:ext>
             <a:ext uri="{91240B29-F687-4f45-9708-019B960494DF}">
-              <a14:hiddenLine xmlns:a14="http://schemas.microsoft.com/office/drawing/2010/main" xmlns="" w="9525">
+              <a14:hiddenLine xmlns="" xmlns:a14="http://schemas.microsoft.com/office/drawing/2010/main" w="9525">
                 <a:solidFill>
                   <a:srgbClr val="000000"/>
                 </a:solidFill>
@@ -22898,7 +23174,7 @@
               </a14:hiddenLine>
             </a:ext>
             <a:ext uri="{AF507438-7753-43e0-B8FC-AC1667EBCBE1}">
-              <a14:hiddenEffects xmlns:a14="http://schemas.microsoft.com/office/drawing/2010/main" xmlns="">
+              <a14:hiddenEffects xmlns="" xmlns:a14="http://schemas.microsoft.com/office/drawing/2010/main">
                 <a:effectLst>
                   <a:outerShdw blurRad="63500" dist="38099" dir="2700000" algn="ctr" rotWithShape="0">
                     <a:srgbClr val="000000">
@@ -25853,7 +26129,7 @@
           <a:effectLst/>
           <a:extLst>
             <a:ext uri="{909E8E84-426E-40dd-AFC4-6F175D3DCCD1}">
-              <a14:hiddenFill xmlns:a14="http://schemas.microsoft.com/office/drawing/2010/main" xmlns="">
+              <a14:hiddenFill xmlns="" xmlns:a14="http://schemas.microsoft.com/office/drawing/2010/main">
                 <a:blipFill dpi="0" rotWithShape="0">
                   <a:blip/>
                   <a:srcRect/>
@@ -25864,7 +26140,7 @@
               </a14:hiddenFill>
             </a:ext>
             <a:ext uri="{91240B29-F687-4f45-9708-019B960494DF}">
-              <a14:hiddenLine xmlns:a14="http://schemas.microsoft.com/office/drawing/2010/main" xmlns="" w="9525">
+              <a14:hiddenLine xmlns="" xmlns:a14="http://schemas.microsoft.com/office/drawing/2010/main" w="9525">
                 <a:solidFill>
                   <a:srgbClr val="000000"/>
                 </a:solidFill>
@@ -25874,7 +26150,7 @@
               </a14:hiddenLine>
             </a:ext>
             <a:ext uri="{AF507438-7753-43e0-B8FC-AC1667EBCBE1}">
-              <a14:hiddenEffects xmlns:a14="http://schemas.microsoft.com/office/drawing/2010/main" xmlns="">
+              <a14:hiddenEffects xmlns="" xmlns:a14="http://schemas.microsoft.com/office/drawing/2010/main">
                 <a:effectLst>
                   <a:outerShdw blurRad="63500" dist="38099" dir="2700000" algn="ctr" rotWithShape="0">
                     <a:srgbClr val="000000">
@@ -25953,7 +26229,7 @@
           <a:effectLst/>
           <a:extLst>
             <a:ext uri="{909E8E84-426E-40dd-AFC4-6F175D3DCCD1}">
-              <a14:hiddenFill xmlns:a14="http://schemas.microsoft.com/office/drawing/2010/main" xmlns="">
+              <a14:hiddenFill xmlns="" xmlns:a14="http://schemas.microsoft.com/office/drawing/2010/main">
                 <a:blipFill dpi="0" rotWithShape="0">
                   <a:blip/>
                   <a:srcRect/>
@@ -25964,7 +26240,7 @@
               </a14:hiddenFill>
             </a:ext>
             <a:ext uri="{91240B29-F687-4f45-9708-019B960494DF}">
-              <a14:hiddenLine xmlns:a14="http://schemas.microsoft.com/office/drawing/2010/main" xmlns="" w="9525">
+              <a14:hiddenLine xmlns="" xmlns:a14="http://schemas.microsoft.com/office/drawing/2010/main" w="9525">
                 <a:solidFill>
                   <a:srgbClr val="000000"/>
                 </a:solidFill>
@@ -25974,7 +26250,7 @@
               </a14:hiddenLine>
             </a:ext>
             <a:ext uri="{AF507438-7753-43e0-B8FC-AC1667EBCBE1}">
-              <a14:hiddenEffects xmlns:a14="http://schemas.microsoft.com/office/drawing/2010/main" xmlns="">
+              <a14:hiddenEffects xmlns="" xmlns:a14="http://schemas.microsoft.com/office/drawing/2010/main">
                 <a:effectLst>
                   <a:outerShdw blurRad="63500" dist="38099" dir="2700000" algn="ctr" rotWithShape="0">
                     <a:srgbClr val="000000">
@@ -27569,7 +27845,7 @@
           <a:effectLst/>
           <a:extLst>
             <a:ext uri="{909E8E84-426E-40dd-AFC4-6F175D3DCCD1}">
-              <a14:hiddenFill xmlns:a14="http://schemas.microsoft.com/office/drawing/2010/main" xmlns="">
+              <a14:hiddenFill xmlns="" xmlns:a14="http://schemas.microsoft.com/office/drawing/2010/main">
                 <a:blipFill dpi="0" rotWithShape="0">
                   <a:blip/>
                   <a:srcRect/>
@@ -27580,7 +27856,7 @@
               </a14:hiddenFill>
             </a:ext>
             <a:ext uri="{91240B29-F687-4f45-9708-019B960494DF}">
-              <a14:hiddenLine xmlns:a14="http://schemas.microsoft.com/office/drawing/2010/main" xmlns="" w="9525">
+              <a14:hiddenLine xmlns="" xmlns:a14="http://schemas.microsoft.com/office/drawing/2010/main" w="9525">
                 <a:solidFill>
                   <a:srgbClr val="000000"/>
                 </a:solidFill>
@@ -27590,7 +27866,7 @@
               </a14:hiddenLine>
             </a:ext>
             <a:ext uri="{AF507438-7753-43e0-B8FC-AC1667EBCBE1}">
-              <a14:hiddenEffects xmlns:a14="http://schemas.microsoft.com/office/drawing/2010/main" xmlns="">
+              <a14:hiddenEffects xmlns="" xmlns:a14="http://schemas.microsoft.com/office/drawing/2010/main">
                 <a:effectLst>
                   <a:outerShdw blurRad="63500" dist="38099" dir="2700000" algn="ctr" rotWithShape="0">
                     <a:srgbClr val="000000">
@@ -29321,7 +29597,7 @@
           <a:effectLst/>
           <a:extLst>
             <a:ext uri="{909E8E84-426E-40dd-AFC4-6F175D3DCCD1}">
-              <a14:hiddenFill xmlns:a14="http://schemas.microsoft.com/office/drawing/2010/main" xmlns="">
+              <a14:hiddenFill xmlns="" xmlns:a14="http://schemas.microsoft.com/office/drawing/2010/main">
                 <a:blipFill dpi="0" rotWithShape="0">
                   <a:blip/>
                   <a:srcRect/>
@@ -29332,7 +29608,7 @@
               </a14:hiddenFill>
             </a:ext>
             <a:ext uri="{91240B29-F687-4f45-9708-019B960494DF}">
-              <a14:hiddenLine xmlns:a14="http://schemas.microsoft.com/office/drawing/2010/main" xmlns="" w="9525">
+              <a14:hiddenLine xmlns="" xmlns:a14="http://schemas.microsoft.com/office/drawing/2010/main" w="9525">
                 <a:solidFill>
                   <a:srgbClr val="000000"/>
                 </a:solidFill>
@@ -29342,7 +29618,7 @@
               </a14:hiddenLine>
             </a:ext>
             <a:ext uri="{AF507438-7753-43e0-B8FC-AC1667EBCBE1}">
-              <a14:hiddenEffects xmlns:a14="http://schemas.microsoft.com/office/drawing/2010/main" xmlns="">
+              <a14:hiddenEffects xmlns="" xmlns:a14="http://schemas.microsoft.com/office/drawing/2010/main">
                 <a:effectLst>
                   <a:outerShdw blurRad="63500" dist="38099" dir="2700000" algn="ctr" rotWithShape="0">
                     <a:srgbClr val="000000">
@@ -30775,7 +31051,7 @@
           <a:effectLst/>
           <a:extLst>
             <a:ext uri="{909E8E84-426E-40dd-AFC4-6F175D3DCCD1}">
-              <a14:hiddenFill xmlns:a14="http://schemas.microsoft.com/office/drawing/2010/main" xmlns="">
+              <a14:hiddenFill xmlns="" xmlns:a14="http://schemas.microsoft.com/office/drawing/2010/main">
                 <a:blipFill dpi="0" rotWithShape="0">
                   <a:blip/>
                   <a:srcRect/>
@@ -30786,7 +31062,7 @@
               </a14:hiddenFill>
             </a:ext>
             <a:ext uri="{91240B29-F687-4f45-9708-019B960494DF}">
-              <a14:hiddenLine xmlns:a14="http://schemas.microsoft.com/office/drawing/2010/main" xmlns="" w="9525">
+              <a14:hiddenLine xmlns="" xmlns:a14="http://schemas.microsoft.com/office/drawing/2010/main" w="9525">
                 <a:solidFill>
                   <a:srgbClr val="000000"/>
                 </a:solidFill>
@@ -30796,7 +31072,7 @@
               </a14:hiddenLine>
             </a:ext>
             <a:ext uri="{AF507438-7753-43e0-B8FC-AC1667EBCBE1}">
-              <a14:hiddenEffects xmlns:a14="http://schemas.microsoft.com/office/drawing/2010/main" xmlns="">
+              <a14:hiddenEffects xmlns="" xmlns:a14="http://schemas.microsoft.com/office/drawing/2010/main">
                 <a:effectLst>
                   <a:outerShdw blurRad="63500" dist="38099" dir="2700000" algn="ctr" rotWithShape="0">
                     <a:srgbClr val="000000">
@@ -30927,7 +31203,7 @@
           <a:effectLst/>
           <a:extLst>
             <a:ext uri="{909E8E84-426E-40dd-AFC4-6F175D3DCCD1}">
-              <a14:hiddenFill xmlns:a14="http://schemas.microsoft.com/office/drawing/2010/main" xmlns="">
+              <a14:hiddenFill xmlns="" xmlns:a14="http://schemas.microsoft.com/office/drawing/2010/main">
                 <a:blipFill dpi="0" rotWithShape="0">
                   <a:blip/>
                   <a:srcRect/>
@@ -30938,7 +31214,7 @@
               </a14:hiddenFill>
             </a:ext>
             <a:ext uri="{91240B29-F687-4f45-9708-019B960494DF}">
-              <a14:hiddenLine xmlns:a14="http://schemas.microsoft.com/office/drawing/2010/main" xmlns="" w="9525">
+              <a14:hiddenLine xmlns="" xmlns:a14="http://schemas.microsoft.com/office/drawing/2010/main" w="9525">
                 <a:solidFill>
                   <a:srgbClr val="000000"/>
                 </a:solidFill>
@@ -30948,7 +31224,7 @@
               </a14:hiddenLine>
             </a:ext>
             <a:ext uri="{AF507438-7753-43e0-B8FC-AC1667EBCBE1}">
-              <a14:hiddenEffects xmlns:a14="http://schemas.microsoft.com/office/drawing/2010/main" xmlns="">
+              <a14:hiddenEffects xmlns="" xmlns:a14="http://schemas.microsoft.com/office/drawing/2010/main">
                 <a:effectLst>
                   <a:outerShdw blurRad="63500" dist="38099" dir="2700000" algn="ctr" rotWithShape="0">
                     <a:srgbClr val="000000">
@@ -35048,8 +35324,8 @@
           </a:p>
         </p:txBody>
       </p:sp>
-      <mc:AlternateContent xmlns:mc="http://schemas.openxmlformats.org/markup-compatibility/2006" xmlns:a14="http://schemas.microsoft.com/office/drawing/2010/main">
-        <mc:Choice Requires="a14">
+      <mc:AlternateContent xmlns:mc="http://schemas.openxmlformats.org/markup-compatibility/2006">
+        <mc:Choice xmlns:a14="http://schemas.microsoft.com/office/drawing/2010/main" Requires="a14">
           <p:sp>
             <p:nvSpPr>
               <p:cNvPr id="3" name="Content Placeholder 2"/>
@@ -35147,7 +35423,15 @@
                           <a:ea typeface="Ayuthaya" charset="-34"/>
                           <a:cs typeface="Consolas" charset="0"/>
                         </a:rPr>
-                        <m:t>𝑑𝑒𝑓𝑎𝑢𝑙𝑡</m:t>
+                        <m:t>𝑑𝑒𝑓</m:t>
+                      </m:r>
+                      <m:r>
+                        <a:rPr lang="en-US" sz="2800" i="1" dirty="0">
+                          <a:latin typeface="Cambria Math" panose="02040503050406030204" pitchFamily="18" charset="0"/>
+                          <a:ea typeface="Ayuthaya" charset="-34"/>
+                          <a:cs typeface="Consolas" charset="0"/>
+                        </a:rPr>
+                        <m:t>𝑎𝑢𝑙𝑡</m:t>
                       </m:r>
                       <m:r>
                         <a:rPr lang="en-US" sz="2800" i="1" dirty="0">
@@ -35682,7 +35966,7 @@
             </p:txBody>
           </p:sp>
         </mc:Choice>
-        <mc:Fallback xmlns="">
+        <mc:Fallback>
           <p:sp>
             <p:nvSpPr>
               <p:cNvPr id="3" name="Content Placeholder 2"/>
@@ -35697,7 +35981,7 @@
               <a:blipFill>
                 <a:blip r:embed="rId4"/>
                 <a:stretch>
-                  <a:fillRect l="-965" t="-2632" r="-121"/>
+                  <a:fillRect l="-965" t="-2632" r="-1448"/>
                 </a:stretch>
               </a:blipFill>
             </p:spPr>
@@ -36158,7 +36442,11 @@
                                           </p:stCondLst>
                                         </p:cTn>
                                         <p:tgtEl>
-                                          <p:spTgt spid="13"/>
+                                          <p:spTgt spid="3">
+                                            <p:txEl>
+                                              <p:pRg st="1" end="1"/>
+                                            </p:txEl>
+                                          </p:spTgt>
                                         </p:tgtEl>
                                         <p:attrNameLst>
                                           <p:attrName>style.visibility</p:attrName>
@@ -36205,37 +36493,6 @@
                                         <p:tgtEl>
                                           <p:spTgt spid="3">
                                             <p:txEl>
-                                              <p:pRg st="1" end="1"/>
-                                            </p:txEl>
-                                          </p:spTgt>
-                                        </p:tgtEl>
-                                        <p:attrNameLst>
-                                          <p:attrName>style.visibility</p:attrName>
-                                        </p:attrNameLst>
-                                      </p:cBhvr>
-                                      <p:to>
-                                        <p:strVal val="visible"/>
-                                      </p:to>
-                                    </p:set>
-                                  </p:childTnLst>
-                                </p:cTn>
-                              </p:par>
-                              <p:par>
-                                <p:cTn id="15" presetID="1" presetClass="entr" presetSubtype="0" fill="hold" nodeType="withEffect">
-                                  <p:stCondLst>
-                                    <p:cond delay="0"/>
-                                  </p:stCondLst>
-                                  <p:childTnLst>
-                                    <p:set>
-                                      <p:cBhvr>
-                                        <p:cTn id="16" dur="1" fill="hold">
-                                          <p:stCondLst>
-                                            <p:cond delay="0"/>
-                                          </p:stCondLst>
-                                        </p:cTn>
-                                        <p:tgtEl>
-                                          <p:spTgt spid="3">
-                                            <p:txEl>
                                               <p:pRg st="2" end="2"/>
                                             </p:txEl>
                                           </p:spTgt>
@@ -36251,8 +36508,26 @@
                                   </p:childTnLst>
                                 </p:cTn>
                               </p:par>
+                            </p:childTnLst>
+                          </p:cTn>
+                        </p:par>
+                      </p:childTnLst>
+                    </p:cTn>
+                  </p:par>
+                  <p:par>
+                    <p:cTn id="15" fill="hold">
+                      <p:stCondLst>
+                        <p:cond delay="indefinite"/>
+                      </p:stCondLst>
+                      <p:childTnLst>
+                        <p:par>
+                          <p:cTn id="16" fill="hold">
+                            <p:stCondLst>
+                              <p:cond delay="0"/>
+                            </p:stCondLst>
+                            <p:childTnLst>
                               <p:par>
-                                <p:cTn id="17" presetID="1" presetClass="entr" presetSubtype="0" fill="hold" nodeType="withEffect">
+                                <p:cTn id="17" presetID="1" presetClass="entr" presetSubtype="0" fill="hold" nodeType="clickEffect">
                                   <p:stCondLst>
                                     <p:cond delay="0"/>
                                   </p:stCondLst>
@@ -36282,15 +36557,33 @@
                                   </p:childTnLst>
                                 </p:cTn>
                               </p:par>
+                            </p:childTnLst>
+                          </p:cTn>
+                        </p:par>
+                      </p:childTnLst>
+                    </p:cTn>
+                  </p:par>
+                  <p:par>
+                    <p:cTn id="19" fill="hold">
+                      <p:stCondLst>
+                        <p:cond delay="indefinite"/>
+                      </p:stCondLst>
+                      <p:childTnLst>
+                        <p:par>
+                          <p:cTn id="20" fill="hold">
+                            <p:stCondLst>
+                              <p:cond delay="0"/>
+                            </p:stCondLst>
+                            <p:childTnLst>
                               <p:par>
-                                <p:cTn id="19" presetID="1" presetClass="entr" presetSubtype="0" fill="hold" nodeType="withEffect">
+                                <p:cTn id="21" presetID="1" presetClass="entr" presetSubtype="0" fill="hold" nodeType="clickEffect">
                                   <p:stCondLst>
                                     <p:cond delay="0"/>
                                   </p:stCondLst>
                                   <p:childTnLst>
                                     <p:set>
                                       <p:cBhvr>
-                                        <p:cTn id="20" dur="1" fill="hold">
+                                        <p:cTn id="22" dur="1" fill="hold">
                                           <p:stCondLst>
                                             <p:cond delay="0"/>
                                           </p:stCondLst>
@@ -36320,26 +36613,26 @@
                     </p:cTn>
                   </p:par>
                   <p:par>
-                    <p:cTn id="21" fill="hold">
+                    <p:cTn id="23" fill="hold">
                       <p:stCondLst>
                         <p:cond delay="indefinite"/>
                       </p:stCondLst>
                       <p:childTnLst>
                         <p:par>
-                          <p:cTn id="22" fill="hold">
+                          <p:cTn id="24" fill="hold">
                             <p:stCondLst>
                               <p:cond delay="0"/>
                             </p:stCondLst>
                             <p:childTnLst>
                               <p:par>
-                                <p:cTn id="23" presetID="1" presetClass="entr" presetSubtype="0" fill="hold" nodeType="clickEffect">
+                                <p:cTn id="25" presetID="1" presetClass="entr" presetSubtype="0" fill="hold" nodeType="clickEffect">
                                   <p:stCondLst>
                                     <p:cond delay="0"/>
                                   </p:stCondLst>
                                   <p:childTnLst>
                                     <p:set>
                                       <p:cBhvr>
-                                        <p:cTn id="24" dur="1" fill="hold">
+                                        <p:cTn id="26" dur="1" fill="hold">
                                           <p:stCondLst>
                                             <p:cond delay="0"/>
                                           </p:stCondLst>
@@ -36350,6 +36643,51 @@
                                               <p:pRg st="6" end="6"/>
                                             </p:txEl>
                                           </p:spTgt>
+                                        </p:tgtEl>
+                                        <p:attrNameLst>
+                                          <p:attrName>style.visibility</p:attrName>
+                                        </p:attrNameLst>
+                                      </p:cBhvr>
+                                      <p:to>
+                                        <p:strVal val="visible"/>
+                                      </p:to>
+                                    </p:set>
+                                  </p:childTnLst>
+                                </p:cTn>
+                              </p:par>
+                            </p:childTnLst>
+                          </p:cTn>
+                        </p:par>
+                      </p:childTnLst>
+                    </p:cTn>
+                  </p:par>
+                  <p:par>
+                    <p:cTn id="27" fill="hold">
+                      <p:stCondLst>
+                        <p:cond delay="indefinite"/>
+                      </p:stCondLst>
+                      <p:childTnLst>
+                        <p:par>
+                          <p:cTn id="28" fill="hold">
+                            <p:stCondLst>
+                              <p:cond delay="0"/>
+                            </p:stCondLst>
+                            <p:childTnLst>
+                              <p:par>
+                                <p:cTn id="29" presetID="1" presetClass="entr" presetSubtype="0" fill="hold" nodeType="clickEffect">
+                                  <p:stCondLst>
+                                    <p:cond delay="0"/>
+                                  </p:stCondLst>
+                                  <p:childTnLst>
+                                    <p:set>
+                                      <p:cBhvr>
+                                        <p:cTn id="30" dur="1" fill="hold">
+                                          <p:stCondLst>
+                                            <p:cond delay="0"/>
+                                          </p:stCondLst>
+                                        </p:cTn>
+                                        <p:tgtEl>
+                                          <p:spTgt spid="13"/>
                                         </p:tgtEl>
                                         <p:attrNameLst>
                                           <p:attrName>style.visibility</p:attrName>
@@ -36427,7 +36765,7 @@
           <a:p>
             <a:r>
               <a:rPr lang="en-US" dirty="0"/>
-              <a:t>Microbursts: Linear-in-state!</a:t>
+              <a:t>Microburst computation is linear-in-state</a:t>
             </a:r>
           </a:p>
         </p:txBody>
@@ -36784,7 +37122,21 @@
                 <a:ea typeface="Ayuthaya" charset="-34"/>
                 <a:cs typeface="Ayuthaya" charset="-34"/>
               </a:rPr>
-              <a:t> within time gap from last; </a:t>
+              <a:t> within 800 </a:t>
+            </a:r>
+            <a:r>
+              <a:rPr lang="en-US" sz="2800" dirty="0" err="1">
+                <a:ea typeface="Ayuthaya" charset="-34"/>
+                <a:cs typeface="Ayuthaya" charset="-34"/>
+              </a:rPr>
+              <a:t>ms</a:t>
+            </a:r>
+            <a:r>
+              <a:rPr lang="en-US" sz="2800" dirty="0">
+                <a:ea typeface="Ayuthaya" charset="-34"/>
+                <a:cs typeface="Ayuthaya" charset="-34"/>
+              </a:rPr>
+              <a:t> from last; </a:t>
             </a:r>
           </a:p>
           <a:p>
@@ -37615,248 +37967,15 @@
         </p:nvSpPr>
         <p:spPr/>
         <p:txBody>
-          <a:bodyPr/>
-          <a:lstStyle/>
-          <a:p>
-            <a:r>
-              <a:rPr lang="en-US" dirty="0"/>
-              <a:t>Other linear-in-state queries</a:t>
-            </a:r>
-          </a:p>
-        </p:txBody>
-      </p:sp>
-      <p:sp>
-        <p:nvSpPr>
-          <p:cNvPr id="3" name="Content Placeholder 2"/>
-          <p:cNvSpPr>
-            <a:spLocks noGrp="1"/>
-          </p:cNvSpPr>
-          <p:nvPr>
-            <p:ph idx="1"/>
-          </p:nvPr>
-        </p:nvSpPr>
-        <p:spPr/>
-        <p:txBody>
-          <a:bodyPr/>
-          <a:lstStyle/>
-          <a:p>
-            <a:r>
-              <a:rPr lang="en-US" dirty="0"/>
-              <a:t>Counting successive TCP packets that are out of order</a:t>
-            </a:r>
-          </a:p>
-          <a:p>
-            <a:r>
-              <a:rPr lang="en-US" dirty="0"/>
-              <a:t>Histogram of </a:t>
-            </a:r>
-            <a:r>
-              <a:rPr lang="en-US" dirty="0" err="1"/>
-              <a:t>flowlet</a:t>
-            </a:r>
-            <a:r>
-              <a:rPr lang="en-US" dirty="0"/>
-              <a:t> sizes</a:t>
-            </a:r>
-          </a:p>
-          <a:p>
-            <a:r>
-              <a:rPr lang="en-US" dirty="0"/>
-              <a:t>Counting number of timeouts in a TCP connection</a:t>
-            </a:r>
-          </a:p>
-          <a:p>
-            <a:endParaRPr lang="en-US" dirty="0"/>
-          </a:p>
-          <a:p>
-            <a:r>
-              <a:rPr lang="is-IS" dirty="0"/>
-              <a:t>… </a:t>
-            </a:r>
-            <a:r>
-              <a:rPr lang="en-US" dirty="0"/>
-              <a:t>7/10 example queries in our paper</a:t>
-            </a:r>
-          </a:p>
-        </p:txBody>
-      </p:sp>
-      <p:sp>
-        <p:nvSpPr>
-          <p:cNvPr id="4" name="Slide Number Placeholder 3"/>
-          <p:cNvSpPr>
-            <a:spLocks noGrp="1"/>
-          </p:cNvSpPr>
-          <p:nvPr>
-            <p:ph type="sldNum" sz="quarter" idx="12"/>
-          </p:nvPr>
-        </p:nvSpPr>
-        <p:spPr/>
-        <p:txBody>
-          <a:bodyPr/>
-          <a:lstStyle/>
-          <a:p>
-            <a:fld id="{7ADDFCCE-7BFB-9F43-8A65-C6CBBDF8F088}" type="slidenum">
-              <a:rPr lang="en-US" smtClean="0"/>
-              <a:t>40</a:t>
-            </a:fld>
-            <a:endParaRPr lang="en-US"/>
-          </a:p>
-        </p:txBody>
-      </p:sp>
-    </p:spTree>
-    <p:extLst>
-      <p:ext uri="{BB962C8B-B14F-4D97-AF65-F5344CB8AC3E}">
-        <p14:creationId xmlns:p14="http://schemas.microsoft.com/office/powerpoint/2010/main" val="217731041"/>
-      </p:ext>
-    </p:extLst>
-  </p:cSld>
-  <p:clrMapOvr>
-    <a:masterClrMapping/>
-  </p:clrMapOvr>
-  <mc:AlternateContent xmlns:mc="http://schemas.openxmlformats.org/markup-compatibility/2006" xmlns:p14="http://schemas.microsoft.com/office/powerpoint/2010/main">
-    <mc:Choice Requires="p14">
-      <p:transition spd="slow" p14:dur="2000" advTm="36797"/>
-    </mc:Choice>
-    <mc:Fallback xmlns="">
-      <p:transition spd="slow" advTm="36797"/>
-    </mc:Fallback>
-  </mc:AlternateContent>
-</p:sld>
-</file>
-
-<file path=ppt/slides/slide41.xml><?xml version="1.0" encoding="utf-8"?>
-<p:sld xmlns:a="http://schemas.openxmlformats.org/drawingml/2006/main" xmlns:r="http://schemas.openxmlformats.org/officeDocument/2006/relationships" xmlns:p="http://schemas.openxmlformats.org/presentationml/2006/main">
-  <p:cSld>
-    <p:spTree>
-      <p:nvGrpSpPr>
-        <p:cNvPr id="1" name=""/>
-        <p:cNvGrpSpPr/>
-        <p:nvPr/>
-      </p:nvGrpSpPr>
-      <p:grpSpPr>
-        <a:xfrm>
-          <a:off x="0" y="0"/>
-          <a:ext cx="0" cy="0"/>
-          <a:chOff x="0" y="0"/>
-          <a:chExt cx="0" cy="0"/>
-        </a:xfrm>
-      </p:grpSpPr>
-      <p:sp>
-        <p:nvSpPr>
-          <p:cNvPr id="2" name="TextBox 1"/>
-          <p:cNvSpPr txBox="1"/>
-          <p:nvPr/>
-        </p:nvSpPr>
-        <p:spPr>
-          <a:xfrm>
-            <a:off x="589935" y="2899031"/>
-            <a:ext cx="10913807" cy="1446550"/>
-          </a:xfrm>
-          <a:prstGeom prst="rect">
-            <a:avLst/>
-          </a:prstGeom>
-          <a:noFill/>
-        </p:spPr>
-        <p:txBody>
-          <a:bodyPr wrap="square" rtlCol="0">
-            <a:spAutoFit/>
+          <a:bodyPr>
+            <a:normAutofit/>
           </a:bodyPr>
           <a:lstStyle/>
           <a:p>
             <a:pPr algn="ctr"/>
             <a:r>
-              <a:rPr lang="en-US" sz="4400" dirty="0"/>
-              <a:t>Evaluation:</a:t>
-            </a:r>
-          </a:p>
-          <a:p>
-            <a:pPr algn="ctr"/>
-            <a:r>
-              <a:rPr lang="en-US" sz="4400" dirty="0"/>
-              <a:t>Is processing the evictions feasible?</a:t>
-            </a:r>
-          </a:p>
-        </p:txBody>
-      </p:sp>
-      <p:sp>
-        <p:nvSpPr>
-          <p:cNvPr id="3" name="Slide Number Placeholder 2"/>
-          <p:cNvSpPr>
-            <a:spLocks noGrp="1"/>
-          </p:cNvSpPr>
-          <p:nvPr>
-            <p:ph type="sldNum" sz="quarter" idx="12"/>
-          </p:nvPr>
-        </p:nvSpPr>
-        <p:spPr/>
-        <p:txBody>
-          <a:bodyPr/>
-          <a:lstStyle/>
-          <a:p>
-            <a:fld id="{7ADDFCCE-7BFB-9F43-8A65-C6CBBDF8F088}" type="slidenum">
-              <a:rPr lang="en-US" smtClean="0"/>
-              <a:t>41</a:t>
-            </a:fld>
-            <a:endParaRPr lang="en-US"/>
-          </a:p>
-        </p:txBody>
-      </p:sp>
-    </p:spTree>
-    <p:extLst>
-      <p:ext uri="{BB962C8B-B14F-4D97-AF65-F5344CB8AC3E}">
-        <p14:creationId xmlns:p14="http://schemas.microsoft.com/office/powerpoint/2010/main" val="143660182"/>
-      </p:ext>
-    </p:extLst>
-  </p:cSld>
-  <p:clrMapOvr>
-    <a:masterClrMapping/>
-  </p:clrMapOvr>
-  <mc:AlternateContent xmlns:mc="http://schemas.openxmlformats.org/markup-compatibility/2006" xmlns:p14="http://schemas.microsoft.com/office/powerpoint/2010/main">
-    <mc:Choice Requires="p14">
-      <p:transition spd="slow" p14:dur="2000" advTm="13824"/>
-    </mc:Choice>
-    <mc:Fallback xmlns="">
-      <p:transition spd="slow" advTm="13824"/>
-    </mc:Fallback>
-  </mc:AlternateContent>
-</p:sld>
-</file>
-
-<file path=ppt/slides/slide42.xml><?xml version="1.0" encoding="utf-8"?>
-<p:sld xmlns:a="http://schemas.openxmlformats.org/drawingml/2006/main" xmlns:r="http://schemas.openxmlformats.org/officeDocument/2006/relationships" xmlns:p="http://schemas.openxmlformats.org/presentationml/2006/main">
-  <p:cSld>
-    <p:spTree>
-      <p:nvGrpSpPr>
-        <p:cNvPr id="1" name=""/>
-        <p:cNvGrpSpPr/>
-        <p:nvPr/>
-      </p:nvGrpSpPr>
-      <p:grpSpPr>
-        <a:xfrm>
-          <a:off x="0" y="0"/>
-          <a:ext cx="0" cy="0"/>
-          <a:chOff x="0" y="0"/>
-          <a:chExt cx="0" cy="0"/>
-        </a:xfrm>
-      </p:grpSpPr>
-      <p:sp>
-        <p:nvSpPr>
-          <p:cNvPr id="2" name="Title 1"/>
-          <p:cNvSpPr>
-            <a:spLocks noGrp="1"/>
-          </p:cNvSpPr>
-          <p:nvPr>
-            <p:ph type="title"/>
-          </p:nvPr>
-        </p:nvSpPr>
-        <p:spPr/>
-        <p:txBody>
-          <a:bodyPr/>
-          <a:lstStyle/>
-          <a:p>
-            <a:r>
               <a:rPr lang="en-US" dirty="0"/>
-              <a:t>Eviction processing</a:t>
+              <a:t>Evaluation: Cache eviction rate</a:t>
             </a:r>
           </a:p>
         </p:txBody>
@@ -38804,7 +38923,7 @@
         </p:nvSpPr>
         <p:spPr>
           <a:xfrm>
-            <a:off x="3219704" y="1438375"/>
+            <a:off x="3264308" y="1549885"/>
             <a:ext cx="2711786" cy="954107"/>
           </a:xfrm>
           <a:prstGeom prst="rect">
@@ -39054,7 +39173,7 @@
         </p:nvSpPr>
         <p:spPr>
           <a:xfrm>
-            <a:off x="8085866" y="965029"/>
+            <a:off x="8085866" y="1188049"/>
             <a:ext cx="3115533" cy="954107"/>
           </a:xfrm>
           <a:prstGeom prst="rect">
@@ -39093,7 +39212,7 @@
           <a:p>
             <a:fld id="{7ADDFCCE-7BFB-9F43-8A65-C6CBBDF8F088}" type="slidenum">
               <a:rPr lang="en-US" smtClean="0"/>
-              <a:t>42</a:t>
+              <a:t>40</a:t>
             </a:fld>
             <a:endParaRPr lang="en-US"/>
           </a:p>
@@ -39152,7 +39271,7 @@
         </p:blipFill>
         <p:spPr bwMode="auto">
           <a:xfrm>
-            <a:off x="10883376" y="1073824"/>
+            <a:off x="10883376" y="1296844"/>
             <a:ext cx="1014181" cy="1343947"/>
           </a:xfrm>
           <a:prstGeom prst="rect">
@@ -39165,7 +39284,7 @@
           <a:effectLst/>
           <a:extLst>
             <a:ext uri="{909E8E84-426E-40dd-AFC4-6F175D3DCCD1}">
-              <a14:hiddenFill xmlns="" xmlns:a14="http://schemas.microsoft.com/office/drawing/2010/main">
+              <a14:hiddenFill xmlns:a14="http://schemas.microsoft.com/office/drawing/2010/main" xmlns="">
                 <a:blipFill dpi="0" rotWithShape="0">
                   <a:blip/>
                   <a:srcRect/>
@@ -39176,7 +39295,7 @@
               </a14:hiddenFill>
             </a:ext>
             <a:ext uri="{91240B29-F687-4f45-9708-019B960494DF}">
-              <a14:hiddenLine xmlns="" xmlns:a14="http://schemas.microsoft.com/office/drawing/2010/main" w="9525">
+              <a14:hiddenLine xmlns:a14="http://schemas.microsoft.com/office/drawing/2010/main" xmlns="" w="9525">
                 <a:solidFill>
                   <a:srgbClr val="000000"/>
                 </a:solidFill>
@@ -39186,7 +39305,7 @@
               </a14:hiddenLine>
             </a:ext>
             <a:ext uri="{AF507438-7753-43e0-B8FC-AC1667EBCBE1}">
-              <a14:hiddenEffects xmlns="" xmlns:a14="http://schemas.microsoft.com/office/drawing/2010/main">
+              <a14:hiddenEffects xmlns:a14="http://schemas.microsoft.com/office/drawing/2010/main" xmlns="">
                 <a:effectLst>
                   <a:outerShdw blurRad="63500" dist="38099" dir="2700000" algn="ctr" rotWithShape="0">
                     <a:srgbClr val="000000">
@@ -39331,7 +39450,7 @@
 </p:sld>
 </file>
 
-<file path=ppt/slides/slide43.xml><?xml version="1.0" encoding="utf-8"?>
+<file path=ppt/slides/slide41.xml><?xml version="1.0" encoding="utf-8"?>
 <p:sld xmlns:a="http://schemas.openxmlformats.org/drawingml/2006/main" xmlns:r="http://schemas.openxmlformats.org/officeDocument/2006/relationships" xmlns:p="http://schemas.openxmlformats.org/presentationml/2006/main">
   <p:cSld>
     <p:spTree>
@@ -39437,22 +39556,6 @@
             </a:r>
           </a:p>
           <a:p>
-            <a:pPr lvl="1"/>
-            <a:r>
-              <a:rPr lang="en-US" dirty="0"/>
-              <a:t>Show results for </a:t>
-            </a:r>
-            <a:r>
-              <a:rPr lang="en-US" dirty="0" err="1"/>
-              <a:t>key+value</a:t>
-            </a:r>
-            <a:r>
-              <a:rPr lang="en-US" dirty="0"/>
-              <a:t> size of 256 bits</a:t>
-            </a:r>
-          </a:p>
-          <a:p>
-            <a:pPr lvl="1"/>
             <a:endParaRPr lang="en-US" dirty="0"/>
           </a:p>
           <a:p>
@@ -39505,7 +39608,7 @@
           <a:p>
             <a:fld id="{7ADDFCCE-7BFB-9F43-8A65-C6CBBDF8F088}" type="slidenum">
               <a:rPr lang="en-US" smtClean="0"/>
-              <a:t>43</a:t>
+              <a:t>41</a:t>
             </a:fld>
             <a:endParaRPr lang="en-US"/>
           </a:p>
@@ -39707,15 +39810,33 @@
                                   </p:childTnLst>
                                 </p:cTn>
                               </p:par>
+                            </p:childTnLst>
+                          </p:cTn>
+                        </p:par>
+                      </p:childTnLst>
+                    </p:cTn>
+                  </p:par>
+                  <p:par>
+                    <p:cTn id="15" fill="hold">
+                      <p:stCondLst>
+                        <p:cond delay="indefinite"/>
+                      </p:stCondLst>
+                      <p:childTnLst>
+                        <p:par>
+                          <p:cTn id="16" fill="hold">
+                            <p:stCondLst>
+                              <p:cond delay="0"/>
+                            </p:stCondLst>
+                            <p:childTnLst>
                               <p:par>
-                                <p:cTn id="15" presetID="1" presetClass="entr" presetSubtype="0" fill="hold" nodeType="withEffect">
+                                <p:cTn id="17" presetID="1" presetClass="entr" presetSubtype="0" fill="hold" nodeType="clickEffect">
                                   <p:stCondLst>
                                     <p:cond delay="0"/>
                                   </p:stCondLst>
                                   <p:childTnLst>
                                     <p:set>
                                       <p:cBhvr>
-                                        <p:cTn id="16" dur="1" fill="hold">
+                                        <p:cTn id="18" dur="1" fill="hold">
                                           <p:stCondLst>
                                             <p:cond delay="0"/>
                                           </p:stCondLst>
@@ -39723,7 +39844,7 @@
                                         <p:tgtEl>
                                           <p:spTgt spid="3">
                                             <p:txEl>
-                                              <p:pRg st="6" end="6"/>
+                                              <p:pRg st="7" end="7"/>
                                             </p:txEl>
                                           </p:spTgt>
                                         </p:tgtEl>
@@ -39745,26 +39866,26 @@
                     </p:cTn>
                   </p:par>
                   <p:par>
-                    <p:cTn id="17" fill="hold">
+                    <p:cTn id="19" fill="hold">
                       <p:stCondLst>
                         <p:cond delay="indefinite"/>
                       </p:stCondLst>
                       <p:childTnLst>
                         <p:par>
-                          <p:cTn id="18" fill="hold">
+                          <p:cTn id="20" fill="hold">
                             <p:stCondLst>
                               <p:cond delay="0"/>
                             </p:stCondLst>
                             <p:childTnLst>
                               <p:par>
-                                <p:cTn id="19" presetID="1" presetClass="entr" presetSubtype="0" fill="hold" nodeType="clickEffect">
+                                <p:cTn id="21" presetID="1" presetClass="entr" presetSubtype="0" fill="hold" nodeType="clickEffect">
                                   <p:stCondLst>
                                     <p:cond delay="0"/>
                                   </p:stCondLst>
                                   <p:childTnLst>
                                     <p:set>
                                       <p:cBhvr>
-                                        <p:cTn id="20" dur="1" fill="hold">
+                                        <p:cTn id="22" dur="1" fill="hold">
                                           <p:stCondLst>
                                             <p:cond delay="0"/>
                                           </p:stCondLst>
@@ -39772,56 +39893,7 @@
                                         <p:tgtEl>
                                           <p:spTgt spid="3">
                                             <p:txEl>
-                                              <p:pRg st="8" end="8"/>
-                                            </p:txEl>
-                                          </p:spTgt>
-                                        </p:tgtEl>
-                                        <p:attrNameLst>
-                                          <p:attrName>style.visibility</p:attrName>
-                                        </p:attrNameLst>
-                                      </p:cBhvr>
-                                      <p:to>
-                                        <p:strVal val="visible"/>
-                                      </p:to>
-                                    </p:set>
-                                  </p:childTnLst>
-                                </p:cTn>
-                              </p:par>
-                            </p:childTnLst>
-                          </p:cTn>
-                        </p:par>
-                      </p:childTnLst>
-                    </p:cTn>
-                  </p:par>
-                  <p:par>
-                    <p:cTn id="21" fill="hold">
-                      <p:stCondLst>
-                        <p:cond delay="indefinite"/>
-                      </p:stCondLst>
-                      <p:childTnLst>
-                        <p:par>
-                          <p:cTn id="22" fill="hold">
-                            <p:stCondLst>
-                              <p:cond delay="0"/>
-                            </p:stCondLst>
-                            <p:childTnLst>
-                              <p:par>
-                                <p:cTn id="23" presetID="1" presetClass="entr" presetSubtype="0" fill="hold" nodeType="clickEffect">
-                                  <p:stCondLst>
-                                    <p:cond delay="0"/>
-                                  </p:stCondLst>
-                                  <p:childTnLst>
-                                    <p:set>
-                                      <p:cBhvr>
-                                        <p:cTn id="24" dur="1" fill="hold">
-                                          <p:stCondLst>
-                                            <p:cond delay="0"/>
-                                          </p:stCondLst>
-                                        </p:cTn>
-                                        <p:tgtEl>
-                                          <p:spTgt spid="3">
-                                            <p:txEl>
-                                              <p:pRg st="10" end="10"/>
+                                              <p:pRg st="9" end="9"/>
                                             </p:txEl>
                                           </p:spTgt>
                                         </p:tgtEl>
@@ -39867,7 +39939,7 @@
 </p:sld>
 </file>
 
-<file path=ppt/slides/slide44.xml><?xml version="1.0" encoding="utf-8"?>
+<file path=ppt/slides/slide42.xml><?xml version="1.0" encoding="utf-8"?>
 <p:sld xmlns:a="http://schemas.openxmlformats.org/drawingml/2006/main" xmlns:r="http://schemas.openxmlformats.org/officeDocument/2006/relationships" xmlns:p="http://schemas.openxmlformats.org/presentationml/2006/main">
   <p:cSld>
     <p:spTree>
@@ -39915,7 +39987,7 @@
           <p:nvPr/>
         </p:nvPicPr>
         <p:blipFill>
-          <a:blip r:embed="rId2">
+          <a:blip r:embed="rId3">
             <a:extLst>
               <a:ext uri="{28A0092B-C50C-407E-A947-70E740481C1C}">
                 <a14:useLocalDpi xmlns:a14="http://schemas.microsoft.com/office/drawing/2010/main" val="0"/>
@@ -39953,7 +40025,7 @@
           <a:p>
             <a:fld id="{7ADDFCCE-7BFB-9F43-8A65-C6CBBDF8F088}" type="slidenum">
               <a:rPr lang="en-US" smtClean="0"/>
-              <a:t>44</a:t>
+              <a:t>42</a:t>
             </a:fld>
             <a:endParaRPr lang="en-US"/>
           </a:p>
@@ -39980,7 +40052,7 @@
 </p:sld>
 </file>
 
-<file path=ppt/slides/slide45.xml><?xml version="1.0" encoding="utf-8"?>
+<file path=ppt/slides/slide43.xml><?xml version="1.0" encoding="utf-8"?>
 <p:sld xmlns:a="http://schemas.openxmlformats.org/drawingml/2006/main" xmlns:r="http://schemas.openxmlformats.org/officeDocument/2006/relationships" xmlns:p="http://schemas.openxmlformats.org/presentationml/2006/main">
   <p:cSld>
     <p:spTree>
@@ -40028,7 +40100,7 @@
           <p:nvPr/>
         </p:nvPicPr>
         <p:blipFill>
-          <a:blip r:embed="rId3">
+          <a:blip r:embed="rId4">
             <a:extLst>
               <a:ext uri="{28A0092B-C50C-407E-A947-70E740481C1C}">
                 <a14:useLocalDpi xmlns:a14="http://schemas.microsoft.com/office/drawing/2010/main" val="0"/>
@@ -40057,8 +40129,8 @@
         </p:nvSpPr>
         <p:spPr>
           <a:xfrm>
-            <a:off x="8453845" y="1964268"/>
-            <a:ext cx="3738155" cy="3108543"/>
+            <a:off x="8253127" y="1964268"/>
+            <a:ext cx="4059283" cy="3539430"/>
           </a:xfrm>
           <a:prstGeom prst="rect">
             <a:avLst/>
@@ -40088,6 +40160,20 @@
               <a:t>Mbits</a:t>
             </a:r>
             <a:endParaRPr lang="en-US" sz="2800" dirty="0"/>
+          </a:p>
+          <a:p>
+            <a:r>
+              <a:rPr lang="en-US" sz="2800" dirty="0"/>
+              <a:t>(256 bits per </a:t>
+            </a:r>
+            <a:r>
+              <a:rPr lang="en-US" sz="2800" dirty="0" err="1"/>
+              <a:t>key+value</a:t>
+            </a:r>
+            <a:r>
+              <a:rPr lang="en-US" sz="2800" dirty="0"/>
+              <a:t>)</a:t>
+            </a:r>
           </a:p>
           <a:p>
             <a:endParaRPr lang="en-US" sz="2800" dirty="0"/>
@@ -40150,7 +40236,7 @@
           <a:p>
             <a:fld id="{7ADDFCCE-7BFB-9F43-8A65-C6CBBDF8F088}" type="slidenum">
               <a:rPr lang="en-US" smtClean="0"/>
-              <a:t>45</a:t>
+              <a:t>43</a:t>
             </a:fld>
             <a:endParaRPr lang="en-US" dirty="0"/>
           </a:p>
@@ -40330,7 +40416,7 @@
 </p:sld>
 </file>
 
-<file path=ppt/slides/slide46.xml><?xml version="1.0" encoding="utf-8"?>
+<file path=ppt/slides/slide44.xml><?xml version="1.0" encoding="utf-8"?>
 <p:sld xmlns:a="http://schemas.openxmlformats.org/drawingml/2006/main" xmlns:r="http://schemas.openxmlformats.org/officeDocument/2006/relationships" xmlns:p="http://schemas.openxmlformats.org/presentationml/2006/main">
   <p:cSld>
     <p:spTree>
@@ -40499,7 +40585,7 @@
           <a:p>
             <a:fld id="{7ADDFCCE-7BFB-9F43-8A65-C6CBBDF8F088}" type="slidenum">
               <a:rPr lang="en-US" smtClean="0"/>
-              <a:t>46</a:t>
+              <a:t>44</a:t>
             </a:fld>
             <a:endParaRPr lang="en-US"/>
           </a:p>
@@ -40598,154 +40684,7 @@
 </p:sld>
 </file>
 
-<file path=ppt/slides/slide47.xml><?xml version="1.0" encoding="utf-8"?>
-<p:sld xmlns:a="http://schemas.openxmlformats.org/drawingml/2006/main" xmlns:r="http://schemas.openxmlformats.org/officeDocument/2006/relationships" xmlns:p="http://schemas.openxmlformats.org/presentationml/2006/main">
-  <p:cSld>
-    <p:spTree>
-      <p:nvGrpSpPr>
-        <p:cNvPr id="1" name=""/>
-        <p:cNvGrpSpPr/>
-        <p:nvPr/>
-      </p:nvGrpSpPr>
-      <p:grpSpPr>
-        <a:xfrm>
-          <a:off x="0" y="0"/>
-          <a:ext cx="0" cy="0"/>
-          <a:chOff x="0" y="0"/>
-          <a:chExt cx="0" cy="0"/>
-        </a:xfrm>
-      </p:grpSpPr>
-      <p:sp>
-        <p:nvSpPr>
-          <p:cNvPr id="2" name="Title 1"/>
-          <p:cNvSpPr>
-            <a:spLocks noGrp="1"/>
-          </p:cNvSpPr>
-          <p:nvPr>
-            <p:ph type="title"/>
-          </p:nvPr>
-        </p:nvSpPr>
-        <p:spPr/>
-        <p:txBody>
-          <a:bodyPr/>
-          <a:lstStyle/>
-          <a:p>
-            <a:r>
-              <a:rPr lang="en-US" dirty="0"/>
-              <a:t>See more in the paper</a:t>
-            </a:r>
-            <a:r>
-              <a:rPr lang="is-IS" dirty="0"/>
-              <a:t>…</a:t>
-            </a:r>
-            <a:endParaRPr lang="en-US" dirty="0"/>
-          </a:p>
-        </p:txBody>
-      </p:sp>
-      <p:sp>
-        <p:nvSpPr>
-          <p:cNvPr id="3" name="Content Placeholder 2"/>
-          <p:cNvSpPr>
-            <a:spLocks noGrp="1"/>
-          </p:cNvSpPr>
-          <p:nvPr>
-            <p:ph idx="1"/>
-          </p:nvPr>
-        </p:nvSpPr>
-        <p:spPr/>
-        <p:txBody>
-          <a:bodyPr>
-            <a:normAutofit/>
-          </a:bodyPr>
-          <a:lstStyle/>
-          <a:p>
-            <a:r>
-              <a:rPr lang="en-US" dirty="0"/>
-              <a:t>More performance query examples</a:t>
-            </a:r>
-          </a:p>
-          <a:p>
-            <a:endParaRPr lang="en-US" dirty="0"/>
-          </a:p>
-          <a:p>
-            <a:r>
-              <a:rPr lang="en-US" dirty="0"/>
-              <a:t>Query compilation algorithms</a:t>
-            </a:r>
-          </a:p>
-          <a:p>
-            <a:endParaRPr lang="en-US" dirty="0"/>
-          </a:p>
-          <a:p>
-            <a:r>
-              <a:rPr lang="en-US" dirty="0"/>
-              <a:t>Evaluating hardware resources for stateful computations</a:t>
-            </a:r>
-          </a:p>
-          <a:p>
-            <a:endParaRPr lang="en-US" dirty="0"/>
-          </a:p>
-          <a:p>
-            <a:r>
-              <a:rPr lang="en-US" dirty="0"/>
-              <a:t>Implementation &amp; end-to-end walkthroughs on </a:t>
-            </a:r>
-            <a:r>
-              <a:rPr lang="en-US" dirty="0" err="1"/>
-              <a:t>mininet</a:t>
-            </a:r>
-            <a:endParaRPr lang="en-US" dirty="0"/>
-          </a:p>
-          <a:p>
-            <a:endParaRPr lang="en-US" dirty="0"/>
-          </a:p>
-        </p:txBody>
-      </p:sp>
-      <p:sp>
-        <p:nvSpPr>
-          <p:cNvPr id="4" name="Slide Number Placeholder 3"/>
-          <p:cNvSpPr>
-            <a:spLocks noGrp="1"/>
-          </p:cNvSpPr>
-          <p:nvPr>
-            <p:ph type="sldNum" sz="quarter" idx="12"/>
-          </p:nvPr>
-        </p:nvSpPr>
-        <p:spPr/>
-        <p:txBody>
-          <a:bodyPr/>
-          <a:lstStyle/>
-          <a:p>
-            <a:fld id="{7ADDFCCE-7BFB-9F43-8A65-C6CBBDF8F088}" type="slidenum">
-              <a:rPr lang="en-US" smtClean="0"/>
-              <a:t>47</a:t>
-            </a:fld>
-            <a:endParaRPr lang="en-US"/>
-          </a:p>
-        </p:txBody>
-      </p:sp>
-    </p:spTree>
-    <p:extLst>
-      <p:ext uri="{BB962C8B-B14F-4D97-AF65-F5344CB8AC3E}">
-        <p14:creationId xmlns:p14="http://schemas.microsoft.com/office/powerpoint/2010/main" val="363709466"/>
-      </p:ext>
-    </p:extLst>
-  </p:cSld>
-  <p:clrMapOvr>
-    <a:masterClrMapping/>
-  </p:clrMapOvr>
-  <mc:AlternateContent xmlns:mc="http://schemas.openxmlformats.org/markup-compatibility/2006" xmlns:p14="http://schemas.microsoft.com/office/powerpoint/2010/main">
-    <mc:Choice Requires="p14">
-      <p:transition spd="slow" p14:dur="2000" advTm="26276"/>
-    </mc:Choice>
-    <mc:Fallback xmlns="">
-      <p:transition spd="slow" advTm="26276"/>
-    </mc:Fallback>
-  </mc:AlternateContent>
-</p:sld>
-</file>
-
-<file path=ppt/slides/slide48.xml><?xml version="1.0" encoding="utf-8"?>
+<file path=ppt/slides/slide45.xml><?xml version="1.0" encoding="utf-8"?>
 <p:sld xmlns:a="http://schemas.openxmlformats.org/drawingml/2006/main" xmlns:r="http://schemas.openxmlformats.org/officeDocument/2006/relationships" xmlns:p="http://schemas.openxmlformats.org/presentationml/2006/main">
   <p:cSld>
     <p:spTree>

</xml_diff>

<commit_message>
42 minutes, but can trim down some talking in parts
</commit_message>
<xml_diff>
--- a/marple_itx18.pptx
+++ b/marple_itx18.pptx
@@ -240,7 +240,7 @@
           <a:p>
             <a:fld id="{4D1C7D58-6592-1846-B3DB-D549DDE8371F}" type="datetimeFigureOut">
               <a:rPr lang="en-US" smtClean="0"/>
-              <a:t>5/15/18</a:t>
+              <a:t>5/16/18</a:t>
             </a:fld>
             <a:endParaRPr lang="en-US"/>
           </a:p>
@@ -4938,7 +4938,7 @@
           <a:p>
             <a:fld id="{322F8514-B853-0C46-A81F-E0731AB349E8}" type="datetime1">
               <a:rPr lang="en-US" smtClean="0"/>
-              <a:t>5/15/18</a:t>
+              <a:t>5/16/18</a:t>
             </a:fld>
             <a:endParaRPr lang="en-US"/>
           </a:p>
@@ -5106,7 +5106,7 @@
           <a:p>
             <a:fld id="{23C5F1DA-22DA-D940-A217-FFBE15E0DDE8}" type="datetime1">
               <a:rPr lang="en-US" smtClean="0"/>
-              <a:t>5/15/18</a:t>
+              <a:t>5/16/18</a:t>
             </a:fld>
             <a:endParaRPr lang="en-US"/>
           </a:p>
@@ -5284,7 +5284,7 @@
           <a:p>
             <a:fld id="{1A558203-445F-D64D-B862-54D95728A44C}" type="datetime1">
               <a:rPr lang="en-US" smtClean="0"/>
-              <a:t>5/15/18</a:t>
+              <a:t>5/16/18</a:t>
             </a:fld>
             <a:endParaRPr lang="en-US"/>
           </a:p>
@@ -5456,7 +5456,7 @@
           <a:p>
             <a:fld id="{A94C3D64-A7CF-E345-8135-82052729E57F}" type="datetime1">
               <a:rPr lang="en-US" smtClean="0"/>
-              <a:t>5/15/18</a:t>
+              <a:t>5/16/18</a:t>
             </a:fld>
             <a:endParaRPr lang="en-US"/>
           </a:p>
@@ -5701,7 +5701,7 @@
           <a:p>
             <a:fld id="{A2360604-B943-F842-B0A2-A9270375B0F4}" type="datetime1">
               <a:rPr lang="en-US" smtClean="0"/>
-              <a:t>5/15/18</a:t>
+              <a:t>5/16/18</a:t>
             </a:fld>
             <a:endParaRPr lang="en-US"/>
           </a:p>
@@ -5930,7 +5930,7 @@
           <a:p>
             <a:fld id="{E98D8315-B472-DE40-9FE5-5E88F15B417F}" type="datetime1">
               <a:rPr lang="en-US" smtClean="0"/>
-              <a:t>5/15/18</a:t>
+              <a:t>5/16/18</a:t>
             </a:fld>
             <a:endParaRPr lang="en-US"/>
           </a:p>
@@ -6294,7 +6294,7 @@
           <a:p>
             <a:fld id="{A67FB5DB-6186-5241-90BB-5F644CFF2E1A}" type="datetime1">
               <a:rPr lang="en-US" smtClean="0"/>
-              <a:t>5/15/18</a:t>
+              <a:t>5/16/18</a:t>
             </a:fld>
             <a:endParaRPr lang="en-US"/>
           </a:p>
@@ -6411,7 +6411,7 @@
           <a:p>
             <a:fld id="{EDF6AEAB-0CFD-5744-A7B0-E3AD8533E672}" type="datetime1">
               <a:rPr lang="en-US" smtClean="0"/>
-              <a:t>5/15/18</a:t>
+              <a:t>5/16/18</a:t>
             </a:fld>
             <a:endParaRPr lang="en-US"/>
           </a:p>
@@ -6506,7 +6506,7 @@
           <a:p>
             <a:fld id="{0FF14B85-2279-734D-A5F8-F7888835E992}" type="datetime1">
               <a:rPr lang="en-US" smtClean="0"/>
-              <a:t>5/15/18</a:t>
+              <a:t>5/16/18</a:t>
             </a:fld>
             <a:endParaRPr lang="en-US"/>
           </a:p>
@@ -6781,7 +6781,7 @@
           <a:p>
             <a:fld id="{A95E9814-BD68-6C42-A851-02A28615CD15}" type="datetime1">
               <a:rPr lang="en-US" smtClean="0"/>
-              <a:t>5/15/18</a:t>
+              <a:t>5/16/18</a:t>
             </a:fld>
             <a:endParaRPr lang="en-US"/>
           </a:p>
@@ -7033,7 +7033,7 @@
           <a:p>
             <a:fld id="{DC1B7620-F13D-D84C-9B55-138232F1E6E3}" type="datetime1">
               <a:rPr lang="en-US" smtClean="0"/>
-              <a:t>5/15/18</a:t>
+              <a:t>5/16/18</a:t>
             </a:fld>
             <a:endParaRPr lang="en-US"/>
           </a:p>
@@ -7244,7 +7244,7 @@
           <a:p>
             <a:fld id="{85935A7D-0949-144C-9583-9EA17A42DAAD}" type="datetime1">
               <a:rPr lang="en-US" smtClean="0"/>
-              <a:t>5/15/18</a:t>
+              <a:t>5/16/18</a:t>
             </a:fld>
             <a:endParaRPr lang="en-US"/>
           </a:p>
@@ -7662,7 +7662,7 @@
         </p:nvSpPr>
         <p:spPr>
           <a:xfrm>
-            <a:off x="152400" y="1636295"/>
+            <a:off x="152400" y="476570"/>
             <a:ext cx="11887200" cy="1714798"/>
           </a:xfrm>
         </p:spPr>
@@ -7692,7 +7692,7 @@
         </p:nvSpPr>
         <p:spPr>
           <a:xfrm>
-            <a:off x="476865" y="3580817"/>
+            <a:off x="476865" y="2421092"/>
             <a:ext cx="11238271" cy="1764217"/>
           </a:xfrm>
         </p:spPr>
@@ -7813,7 +7813,7 @@
         </p:nvSpPr>
         <p:spPr>
           <a:xfrm>
-            <a:off x="1030317" y="6392480"/>
+            <a:off x="1030317" y="5232755"/>
             <a:ext cx="10131366" cy="642978"/>
           </a:xfrm>
           <a:prstGeom prst="rect">
@@ -8024,7 +8024,7 @@
         </p:blipFill>
         <p:spPr>
           <a:xfrm>
-            <a:off x="3549650" y="5150914"/>
+            <a:off x="3549650" y="3991189"/>
             <a:ext cx="5092700" cy="1070702"/>
           </a:xfrm>
           <a:prstGeom prst="rect">
@@ -10026,98 +10026,6 @@
           </a:p>
         </p:txBody>
       </p:sp>
-      <p:sp>
-        <p:nvSpPr>
-          <p:cNvPr id="10" name="Down Arrow 9"/>
-          <p:cNvSpPr/>
-          <p:nvPr/>
-        </p:nvSpPr>
-        <p:spPr>
-          <a:xfrm rot="5400000">
-            <a:off x="8795815" y="2037422"/>
-            <a:ext cx="548615" cy="1209013"/>
-          </a:xfrm>
-          <a:prstGeom prst="downArrow">
-            <a:avLst/>
-          </a:prstGeom>
-          <a:noFill/>
-          <a:ln w="63500">
-            <a:solidFill>
-              <a:schemeClr val="tx1"/>
-            </a:solidFill>
-          </a:ln>
-        </p:spPr>
-        <p:style>
-          <a:lnRef idx="2">
-            <a:schemeClr val="accent1">
-              <a:shade val="50000"/>
-            </a:schemeClr>
-          </a:lnRef>
-          <a:fillRef idx="1">
-            <a:schemeClr val="accent1"/>
-          </a:fillRef>
-          <a:effectRef idx="0">
-            <a:schemeClr val="accent1"/>
-          </a:effectRef>
-          <a:fontRef idx="minor">
-            <a:schemeClr val="lt1"/>
-          </a:fontRef>
-        </p:style>
-        <p:txBody>
-          <a:bodyPr rtlCol="0" anchor="ctr"/>
-          <a:lstStyle/>
-          <a:p>
-            <a:pPr algn="ctr"/>
-            <a:endParaRPr lang="en-US"/>
-          </a:p>
-        </p:txBody>
-      </p:sp>
-      <p:sp>
-        <p:nvSpPr>
-          <p:cNvPr id="11" name="Down Arrow 10"/>
-          <p:cNvSpPr/>
-          <p:nvPr/>
-        </p:nvSpPr>
-        <p:spPr>
-          <a:xfrm rot="5400000">
-            <a:off x="7731786" y="2586037"/>
-            <a:ext cx="548615" cy="1209013"/>
-          </a:xfrm>
-          <a:prstGeom prst="downArrow">
-            <a:avLst/>
-          </a:prstGeom>
-          <a:noFill/>
-          <a:ln w="63500">
-            <a:solidFill>
-              <a:schemeClr val="tx1"/>
-            </a:solidFill>
-          </a:ln>
-        </p:spPr>
-        <p:style>
-          <a:lnRef idx="2">
-            <a:schemeClr val="accent1">
-              <a:shade val="50000"/>
-            </a:schemeClr>
-          </a:lnRef>
-          <a:fillRef idx="1">
-            <a:schemeClr val="accent1"/>
-          </a:fillRef>
-          <a:effectRef idx="0">
-            <a:schemeClr val="accent1"/>
-          </a:effectRef>
-          <a:fontRef idx="minor">
-            <a:schemeClr val="lt1"/>
-          </a:fontRef>
-        </p:style>
-        <p:txBody>
-          <a:bodyPr rtlCol="0" anchor="ctr"/>
-          <a:lstStyle/>
-          <a:p>
-            <a:pPr algn="ctr"/>
-            <a:endParaRPr lang="en-US"/>
-          </a:p>
-        </p:txBody>
-      </p:sp>
     </p:spTree>
     <p:custDataLst>
       <p:tags r:id="rId1"/>
@@ -10139,158 +10047,6 @@
       <p:transition spd="slow" advTm="40658"/>
     </mc:Fallback>
   </mc:AlternateContent>
-  <p:timing>
-    <p:tnLst>
-      <p:par>
-        <p:cTn id="1" dur="indefinite" restart="never" nodeType="tmRoot">
-          <p:childTnLst>
-            <p:seq concurrent="1" nextAc="seek">
-              <p:cTn id="2" dur="indefinite" nodeType="mainSeq">
-                <p:childTnLst>
-                  <p:par>
-                    <p:cTn id="3" fill="hold">
-                      <p:stCondLst>
-                        <p:cond delay="indefinite"/>
-                      </p:stCondLst>
-                      <p:childTnLst>
-                        <p:par>
-                          <p:cTn id="4" fill="hold">
-                            <p:stCondLst>
-                              <p:cond delay="0"/>
-                            </p:stCondLst>
-                            <p:childTnLst>
-                              <p:par>
-                                <p:cTn id="5" presetID="1" presetClass="entr" presetSubtype="0" fill="hold" grpId="1" nodeType="clickEffect">
-                                  <p:stCondLst>
-                                    <p:cond delay="0"/>
-                                  </p:stCondLst>
-                                  <p:childTnLst>
-                                    <p:set>
-                                      <p:cBhvr>
-                                        <p:cTn id="6" dur="1" fill="hold">
-                                          <p:stCondLst>
-                                            <p:cond delay="0"/>
-                                          </p:stCondLst>
-                                        </p:cTn>
-                                        <p:tgtEl>
-                                          <p:spTgt spid="10"/>
-                                        </p:tgtEl>
-                                        <p:attrNameLst>
-                                          <p:attrName>style.visibility</p:attrName>
-                                        </p:attrNameLst>
-                                      </p:cBhvr>
-                                      <p:to>
-                                        <p:strVal val="visible"/>
-                                      </p:to>
-                                    </p:set>
-                                  </p:childTnLst>
-                                </p:cTn>
-                              </p:par>
-                            </p:childTnLst>
-                          </p:cTn>
-                        </p:par>
-                      </p:childTnLst>
-                    </p:cTn>
-                  </p:par>
-                  <p:par>
-                    <p:cTn id="7" fill="hold">
-                      <p:stCondLst>
-                        <p:cond delay="indefinite"/>
-                      </p:stCondLst>
-                      <p:childTnLst>
-                        <p:par>
-                          <p:cTn id="8" fill="hold">
-                            <p:stCondLst>
-                              <p:cond delay="0"/>
-                            </p:stCondLst>
-                            <p:childTnLst>
-                              <p:par>
-                                <p:cTn id="9" presetID="1" presetClass="exit" presetSubtype="0" fill="hold" grpId="0" nodeType="clickEffect">
-                                  <p:stCondLst>
-                                    <p:cond delay="0"/>
-                                  </p:stCondLst>
-                                  <p:childTnLst>
-                                    <p:set>
-                                      <p:cBhvr>
-                                        <p:cTn id="10" dur="1" fill="hold">
-                                          <p:stCondLst>
-                                            <p:cond delay="0"/>
-                                          </p:stCondLst>
-                                        </p:cTn>
-                                        <p:tgtEl>
-                                          <p:spTgt spid="10"/>
-                                        </p:tgtEl>
-                                        <p:attrNameLst>
-                                          <p:attrName>style.visibility</p:attrName>
-                                        </p:attrNameLst>
-                                      </p:cBhvr>
-                                      <p:to>
-                                        <p:strVal val="hidden"/>
-                                      </p:to>
-                                    </p:set>
-                                  </p:childTnLst>
-                                </p:cTn>
-                              </p:par>
-                              <p:par>
-                                <p:cTn id="11" presetID="1" presetClass="entr" presetSubtype="0" fill="hold" grpId="0" nodeType="withEffect">
-                                  <p:stCondLst>
-                                    <p:cond delay="0"/>
-                                  </p:stCondLst>
-                                  <p:childTnLst>
-                                    <p:set>
-                                      <p:cBhvr>
-                                        <p:cTn id="12" dur="1" fill="hold">
-                                          <p:stCondLst>
-                                            <p:cond delay="0"/>
-                                          </p:stCondLst>
-                                        </p:cTn>
-                                        <p:tgtEl>
-                                          <p:spTgt spid="11"/>
-                                        </p:tgtEl>
-                                        <p:attrNameLst>
-                                          <p:attrName>style.visibility</p:attrName>
-                                        </p:attrNameLst>
-                                      </p:cBhvr>
-                                      <p:to>
-                                        <p:strVal val="visible"/>
-                                      </p:to>
-                                    </p:set>
-                                  </p:childTnLst>
-                                </p:cTn>
-                              </p:par>
-                            </p:childTnLst>
-                          </p:cTn>
-                        </p:par>
-                      </p:childTnLst>
-                    </p:cTn>
-                  </p:par>
-                </p:childTnLst>
-              </p:cTn>
-              <p:prevCondLst>
-                <p:cond evt="onPrev" delay="0">
-                  <p:tgtEl>
-                    <p:sldTgt/>
-                  </p:tgtEl>
-                </p:cond>
-              </p:prevCondLst>
-              <p:nextCondLst>
-                <p:cond evt="onNext" delay="0">
-                  <p:tgtEl>
-                    <p:sldTgt/>
-                  </p:tgtEl>
-                </p:cond>
-              </p:nextCondLst>
-            </p:seq>
-          </p:childTnLst>
-        </p:cTn>
-      </p:par>
-    </p:tnLst>
-    <p:bldLst>
-      <p:bldP spid="10" grpId="0" animBg="1"/>
-      <p:bldP spid="10" grpId="1" animBg="1"/>
-      <p:bldP spid="11" grpId="0" animBg="1"/>
-    </p:bldLst>
-  </p:timing>
 </p:sld>
 </file>
 
@@ -12898,7 +12654,7 @@
           <a:effectLst/>
           <a:extLst>
             <a:ext uri="{909E8E84-426E-40dd-AFC4-6F175D3DCCD1}">
-              <a14:hiddenFill xmlns:a14="http://schemas.microsoft.com/office/drawing/2010/main" xmlns="">
+              <a14:hiddenFill xmlns="" xmlns:a14="http://schemas.microsoft.com/office/drawing/2010/main">
                 <a:blipFill dpi="0" rotWithShape="0">
                   <a:blip/>
                   <a:srcRect/>
@@ -12909,7 +12665,7 @@
               </a14:hiddenFill>
             </a:ext>
             <a:ext uri="{91240B29-F687-4f45-9708-019B960494DF}">
-              <a14:hiddenLine xmlns:a14="http://schemas.microsoft.com/office/drawing/2010/main" xmlns="" w="9525">
+              <a14:hiddenLine xmlns="" xmlns:a14="http://schemas.microsoft.com/office/drawing/2010/main" w="9525">
                 <a:solidFill>
                   <a:srgbClr val="000000"/>
                 </a:solidFill>
@@ -12919,7 +12675,7 @@
               </a14:hiddenLine>
             </a:ext>
             <a:ext uri="{AF507438-7753-43e0-B8FC-AC1667EBCBE1}">
-              <a14:hiddenEffects xmlns:a14="http://schemas.microsoft.com/office/drawing/2010/main" xmlns="">
+              <a14:hiddenEffects xmlns="" xmlns:a14="http://schemas.microsoft.com/office/drawing/2010/main">
                 <a:effectLst>
                   <a:outerShdw blurRad="63500" dist="38099" dir="2700000" algn="ctr" rotWithShape="0">
                     <a:srgbClr val="000000">
@@ -12968,7 +12724,7 @@
           <a:effectLst/>
           <a:extLst>
             <a:ext uri="{909E8E84-426E-40dd-AFC4-6F175D3DCCD1}">
-              <a14:hiddenFill xmlns:a14="http://schemas.microsoft.com/office/drawing/2010/main" xmlns="">
+              <a14:hiddenFill xmlns="" xmlns:a14="http://schemas.microsoft.com/office/drawing/2010/main">
                 <a:blipFill dpi="0" rotWithShape="0">
                   <a:blip/>
                   <a:srcRect/>
@@ -12979,7 +12735,7 @@
               </a14:hiddenFill>
             </a:ext>
             <a:ext uri="{91240B29-F687-4f45-9708-019B960494DF}">
-              <a14:hiddenLine xmlns:a14="http://schemas.microsoft.com/office/drawing/2010/main" xmlns="" w="9525">
+              <a14:hiddenLine xmlns="" xmlns:a14="http://schemas.microsoft.com/office/drawing/2010/main" w="9525">
                 <a:solidFill>
                   <a:srgbClr val="000000"/>
                 </a:solidFill>
@@ -12989,7 +12745,7 @@
               </a14:hiddenLine>
             </a:ext>
             <a:ext uri="{AF507438-7753-43e0-B8FC-AC1667EBCBE1}">
-              <a14:hiddenEffects xmlns:a14="http://schemas.microsoft.com/office/drawing/2010/main" xmlns="">
+              <a14:hiddenEffects xmlns="" xmlns:a14="http://schemas.microsoft.com/office/drawing/2010/main">
                 <a:effectLst>
                   <a:outerShdw blurRad="63500" dist="38099" dir="2700000" algn="ctr" rotWithShape="0">
                     <a:srgbClr val="000000">
@@ -13124,7 +12880,7 @@
             <a:effectLst/>
             <a:extLst>
               <a:ext uri="{909E8E84-426E-40dd-AFC4-6F175D3DCCD1}">
-                <a14:hiddenFill xmlns="" xmlns:a14="http://schemas.microsoft.com/office/drawing/2010/main">
+                <a14:hiddenFill xmlns:a14="http://schemas.microsoft.com/office/drawing/2010/main" xmlns="">
                   <a:blipFill dpi="0" rotWithShape="0">
                     <a:blip/>
                     <a:srcRect/>
@@ -13135,7 +12891,7 @@
                 </a14:hiddenFill>
               </a:ext>
               <a:ext uri="{91240B29-F687-4f45-9708-019B960494DF}">
-                <a14:hiddenLine xmlns="" xmlns:a14="http://schemas.microsoft.com/office/drawing/2010/main" w="9525">
+                <a14:hiddenLine xmlns:a14="http://schemas.microsoft.com/office/drawing/2010/main" xmlns="" w="9525">
                   <a:solidFill>
                     <a:srgbClr val="000000"/>
                   </a:solidFill>
@@ -13145,7 +12901,7 @@
                 </a14:hiddenLine>
               </a:ext>
               <a:ext uri="{AF507438-7753-43e0-B8FC-AC1667EBCBE1}">
-                <a14:hiddenEffects xmlns="" xmlns:a14="http://schemas.microsoft.com/office/drawing/2010/main">
+                <a14:hiddenEffects xmlns:a14="http://schemas.microsoft.com/office/drawing/2010/main" xmlns="">
                   <a:effectLst>
                     <a:outerShdw blurRad="63500" dist="38099" dir="2700000" algn="ctr" rotWithShape="0">
                       <a:srgbClr val="000000">
@@ -13194,7 +12950,7 @@
             <a:effectLst/>
             <a:extLst>
               <a:ext uri="{909E8E84-426E-40dd-AFC4-6F175D3DCCD1}">
-                <a14:hiddenFill xmlns="" xmlns:a14="http://schemas.microsoft.com/office/drawing/2010/main">
+                <a14:hiddenFill xmlns:a14="http://schemas.microsoft.com/office/drawing/2010/main" xmlns="">
                   <a:blipFill dpi="0" rotWithShape="0">
                     <a:blip/>
                     <a:srcRect/>
@@ -13205,7 +12961,7 @@
                 </a14:hiddenFill>
               </a:ext>
               <a:ext uri="{91240B29-F687-4f45-9708-019B960494DF}">
-                <a14:hiddenLine xmlns="" xmlns:a14="http://schemas.microsoft.com/office/drawing/2010/main" w="9525">
+                <a14:hiddenLine xmlns:a14="http://schemas.microsoft.com/office/drawing/2010/main" xmlns="" w="9525">
                   <a:solidFill>
                     <a:srgbClr val="000000"/>
                   </a:solidFill>
@@ -13215,7 +12971,7 @@
                 </a14:hiddenLine>
               </a:ext>
               <a:ext uri="{AF507438-7753-43e0-B8FC-AC1667EBCBE1}">
-                <a14:hiddenEffects xmlns="" xmlns:a14="http://schemas.microsoft.com/office/drawing/2010/main">
+                <a14:hiddenEffects xmlns:a14="http://schemas.microsoft.com/office/drawing/2010/main" xmlns="">
                   <a:effectLst>
                     <a:outerShdw blurRad="63500" dist="38099" dir="2700000" algn="ctr" rotWithShape="0">
                       <a:srgbClr val="000000">
@@ -13264,7 +13020,7 @@
             <a:effectLst/>
             <a:extLst>
               <a:ext uri="{909E8E84-426E-40dd-AFC4-6F175D3DCCD1}">
-                <a14:hiddenFill xmlns="" xmlns:a14="http://schemas.microsoft.com/office/drawing/2010/main">
+                <a14:hiddenFill xmlns:a14="http://schemas.microsoft.com/office/drawing/2010/main" xmlns="">
                   <a:blipFill dpi="0" rotWithShape="0">
                     <a:blip/>
                     <a:srcRect/>
@@ -13275,7 +13031,7 @@
                 </a14:hiddenFill>
               </a:ext>
               <a:ext uri="{91240B29-F687-4f45-9708-019B960494DF}">
-                <a14:hiddenLine xmlns="" xmlns:a14="http://schemas.microsoft.com/office/drawing/2010/main" w="9525">
+                <a14:hiddenLine xmlns:a14="http://schemas.microsoft.com/office/drawing/2010/main" xmlns="" w="9525">
                   <a:solidFill>
                     <a:srgbClr val="000000"/>
                   </a:solidFill>
@@ -13285,7 +13041,7 @@
                 </a14:hiddenLine>
               </a:ext>
               <a:ext uri="{AF507438-7753-43e0-B8FC-AC1667EBCBE1}">
-                <a14:hiddenEffects xmlns="" xmlns:a14="http://schemas.microsoft.com/office/drawing/2010/main">
+                <a14:hiddenEffects xmlns:a14="http://schemas.microsoft.com/office/drawing/2010/main" xmlns="">
                   <a:effectLst>
                     <a:outerShdw blurRad="63500" dist="38099" dir="2700000" algn="ctr" rotWithShape="0">
                       <a:srgbClr val="000000">
@@ -13326,12 +13082,12 @@
             <a:effectLst/>
             <a:extLst>
               <a:ext uri="{909E8E84-426E-40dd-AFC4-6F175D3DCCD1}">
-                <a14:hiddenFill xmlns="" xmlns:a14="http://schemas.microsoft.com/office/drawing/2010/main">
+                <a14:hiddenFill xmlns:a14="http://schemas.microsoft.com/office/drawing/2010/main" xmlns="">
                   <a:noFill/>
                 </a14:hiddenFill>
               </a:ext>
               <a:ext uri="{AF507438-7753-43e0-B8FC-AC1667EBCBE1}">
-                <a14:hiddenEffects xmlns="" xmlns:a14="http://schemas.microsoft.com/office/drawing/2010/main">
+                <a14:hiddenEffects xmlns:a14="http://schemas.microsoft.com/office/drawing/2010/main" xmlns="">
                   <a:effectLst>
                     <a:outerShdw blurRad="63500" dist="38099" dir="2700000" algn="ctr" rotWithShape="0">
                       <a:srgbClr val="000000">
@@ -13384,12 +13140,12 @@
             <a:effectLst/>
             <a:extLst>
               <a:ext uri="{909E8E84-426E-40dd-AFC4-6F175D3DCCD1}">
-                <a14:hiddenFill xmlns="" xmlns:a14="http://schemas.microsoft.com/office/drawing/2010/main">
+                <a14:hiddenFill xmlns:a14="http://schemas.microsoft.com/office/drawing/2010/main" xmlns="">
                   <a:noFill/>
                 </a14:hiddenFill>
               </a:ext>
               <a:ext uri="{AF507438-7753-43e0-B8FC-AC1667EBCBE1}">
-                <a14:hiddenEffects xmlns="" xmlns:a14="http://schemas.microsoft.com/office/drawing/2010/main">
+                <a14:hiddenEffects xmlns:a14="http://schemas.microsoft.com/office/drawing/2010/main" xmlns="">
                   <a:effectLst>
                     <a:outerShdw blurRad="63500" dist="38099" dir="2700000" algn="ctr" rotWithShape="0">
                       <a:srgbClr val="000000">
@@ -13442,12 +13198,12 @@
             <a:effectLst/>
             <a:extLst>
               <a:ext uri="{909E8E84-426E-40dd-AFC4-6F175D3DCCD1}">
-                <a14:hiddenFill xmlns="" xmlns:a14="http://schemas.microsoft.com/office/drawing/2010/main">
+                <a14:hiddenFill xmlns:a14="http://schemas.microsoft.com/office/drawing/2010/main" xmlns="">
                   <a:noFill/>
                 </a14:hiddenFill>
               </a:ext>
               <a:ext uri="{AF507438-7753-43e0-B8FC-AC1667EBCBE1}">
-                <a14:hiddenEffects xmlns="" xmlns:a14="http://schemas.microsoft.com/office/drawing/2010/main">
+                <a14:hiddenEffects xmlns:a14="http://schemas.microsoft.com/office/drawing/2010/main" xmlns="">
                   <a:effectLst>
                     <a:outerShdw blurRad="63500" dist="38099" dir="2700000" algn="ctr" rotWithShape="0">
                       <a:srgbClr val="000000">
@@ -13500,12 +13256,12 @@
             <a:effectLst/>
             <a:extLst>
               <a:ext uri="{909E8E84-426E-40dd-AFC4-6F175D3DCCD1}">
-                <a14:hiddenFill xmlns="" xmlns:a14="http://schemas.microsoft.com/office/drawing/2010/main">
+                <a14:hiddenFill xmlns:a14="http://schemas.microsoft.com/office/drawing/2010/main" xmlns="">
                   <a:noFill/>
                 </a14:hiddenFill>
               </a:ext>
               <a:ext uri="{AF507438-7753-43e0-B8FC-AC1667EBCBE1}">
-                <a14:hiddenEffects xmlns="" xmlns:a14="http://schemas.microsoft.com/office/drawing/2010/main">
+                <a14:hiddenEffects xmlns:a14="http://schemas.microsoft.com/office/drawing/2010/main" xmlns="">
                   <a:effectLst>
                     <a:outerShdw blurRad="63500" dist="38099" dir="2700000" algn="ctr" rotWithShape="0">
                       <a:srgbClr val="000000">
@@ -13558,12 +13314,12 @@
             <a:effectLst/>
             <a:extLst>
               <a:ext uri="{909E8E84-426E-40dd-AFC4-6F175D3DCCD1}">
-                <a14:hiddenFill xmlns="" xmlns:a14="http://schemas.microsoft.com/office/drawing/2010/main">
+                <a14:hiddenFill xmlns:a14="http://schemas.microsoft.com/office/drawing/2010/main" xmlns="">
                   <a:noFill/>
                 </a14:hiddenFill>
               </a:ext>
               <a:ext uri="{AF507438-7753-43e0-B8FC-AC1667EBCBE1}">
-                <a14:hiddenEffects xmlns="" xmlns:a14="http://schemas.microsoft.com/office/drawing/2010/main">
+                <a14:hiddenEffects xmlns:a14="http://schemas.microsoft.com/office/drawing/2010/main" xmlns="">
                   <a:effectLst>
                     <a:outerShdw blurRad="63500" dist="38099" dir="2700000" algn="ctr" rotWithShape="0">
                       <a:srgbClr val="000000">
@@ -13616,12 +13372,12 @@
             <a:effectLst/>
             <a:extLst>
               <a:ext uri="{909E8E84-426E-40dd-AFC4-6F175D3DCCD1}">
-                <a14:hiddenFill xmlns="" xmlns:a14="http://schemas.microsoft.com/office/drawing/2010/main">
+                <a14:hiddenFill xmlns:a14="http://schemas.microsoft.com/office/drawing/2010/main" xmlns="">
                   <a:noFill/>
                 </a14:hiddenFill>
               </a:ext>
               <a:ext uri="{AF507438-7753-43e0-B8FC-AC1667EBCBE1}">
-                <a14:hiddenEffects xmlns="" xmlns:a14="http://schemas.microsoft.com/office/drawing/2010/main">
+                <a14:hiddenEffects xmlns:a14="http://schemas.microsoft.com/office/drawing/2010/main" xmlns="">
                   <a:effectLst>
                     <a:outerShdw blurRad="63500" dist="38099" dir="2700000" algn="ctr" rotWithShape="0">
                       <a:srgbClr val="000000">
@@ -13674,12 +13430,12 @@
             <a:effectLst/>
             <a:extLst>
               <a:ext uri="{909E8E84-426E-40dd-AFC4-6F175D3DCCD1}">
-                <a14:hiddenFill xmlns="" xmlns:a14="http://schemas.microsoft.com/office/drawing/2010/main">
+                <a14:hiddenFill xmlns:a14="http://schemas.microsoft.com/office/drawing/2010/main" xmlns="">
                   <a:noFill/>
                 </a14:hiddenFill>
               </a:ext>
               <a:ext uri="{AF507438-7753-43e0-B8FC-AC1667EBCBE1}">
-                <a14:hiddenEffects xmlns="" xmlns:a14="http://schemas.microsoft.com/office/drawing/2010/main">
+                <a14:hiddenEffects xmlns:a14="http://schemas.microsoft.com/office/drawing/2010/main" xmlns="">
                   <a:effectLst>
                     <a:outerShdw blurRad="63500" dist="38099" dir="2700000" algn="ctr" rotWithShape="0">
                       <a:srgbClr val="000000">
@@ -13732,12 +13488,12 @@
             <a:effectLst/>
             <a:extLst>
               <a:ext uri="{909E8E84-426E-40dd-AFC4-6F175D3DCCD1}">
-                <a14:hiddenFill xmlns="" xmlns:a14="http://schemas.microsoft.com/office/drawing/2010/main">
+                <a14:hiddenFill xmlns:a14="http://schemas.microsoft.com/office/drawing/2010/main" xmlns="">
                   <a:noFill/>
                 </a14:hiddenFill>
               </a:ext>
               <a:ext uri="{AF507438-7753-43e0-B8FC-AC1667EBCBE1}">
-                <a14:hiddenEffects xmlns="" xmlns:a14="http://schemas.microsoft.com/office/drawing/2010/main">
+                <a14:hiddenEffects xmlns:a14="http://schemas.microsoft.com/office/drawing/2010/main" xmlns="">
                   <a:effectLst>
                     <a:outerShdw blurRad="63500" dist="38099" dir="2700000" algn="ctr" rotWithShape="0">
                       <a:srgbClr val="000000">
@@ -13790,12 +13546,12 @@
             <a:effectLst/>
             <a:extLst>
               <a:ext uri="{909E8E84-426E-40dd-AFC4-6F175D3DCCD1}">
-                <a14:hiddenFill xmlns="" xmlns:a14="http://schemas.microsoft.com/office/drawing/2010/main">
+                <a14:hiddenFill xmlns:a14="http://schemas.microsoft.com/office/drawing/2010/main" xmlns="">
                   <a:noFill/>
                 </a14:hiddenFill>
               </a:ext>
               <a:ext uri="{AF507438-7753-43e0-B8FC-AC1667EBCBE1}">
-                <a14:hiddenEffects xmlns="" xmlns:a14="http://schemas.microsoft.com/office/drawing/2010/main">
+                <a14:hiddenEffects xmlns:a14="http://schemas.microsoft.com/office/drawing/2010/main" xmlns="">
                   <a:effectLst>
                     <a:outerShdw blurRad="63500" dist="38099" dir="2700000" algn="ctr" rotWithShape="0">
                       <a:srgbClr val="000000">
@@ -13848,12 +13604,12 @@
             <a:effectLst/>
             <a:extLst>
               <a:ext uri="{909E8E84-426E-40dd-AFC4-6F175D3DCCD1}">
-                <a14:hiddenFill xmlns="" xmlns:a14="http://schemas.microsoft.com/office/drawing/2010/main">
+                <a14:hiddenFill xmlns:a14="http://schemas.microsoft.com/office/drawing/2010/main" xmlns="">
                   <a:noFill/>
                 </a14:hiddenFill>
               </a:ext>
               <a:ext uri="{AF507438-7753-43e0-B8FC-AC1667EBCBE1}">
-                <a14:hiddenEffects xmlns="" xmlns:a14="http://schemas.microsoft.com/office/drawing/2010/main">
+                <a14:hiddenEffects xmlns:a14="http://schemas.microsoft.com/office/drawing/2010/main" xmlns="">
                   <a:effectLst>
                     <a:outerShdw blurRad="63500" dist="38099" dir="2700000" algn="ctr" rotWithShape="0">
                       <a:srgbClr val="000000">
@@ -13914,7 +13670,7 @@
             <a:effectLst/>
             <a:extLst>
               <a:ext uri="{909E8E84-426E-40dd-AFC4-6F175D3DCCD1}">
-                <a14:hiddenFill xmlns="" xmlns:a14="http://schemas.microsoft.com/office/drawing/2010/main">
+                <a14:hiddenFill xmlns:a14="http://schemas.microsoft.com/office/drawing/2010/main" xmlns="">
                   <a:blipFill dpi="0" rotWithShape="0">
                     <a:blip/>
                     <a:srcRect/>
@@ -13925,7 +13681,7 @@
                 </a14:hiddenFill>
               </a:ext>
               <a:ext uri="{91240B29-F687-4f45-9708-019B960494DF}">
-                <a14:hiddenLine xmlns="" xmlns:a14="http://schemas.microsoft.com/office/drawing/2010/main" w="9525">
+                <a14:hiddenLine xmlns:a14="http://schemas.microsoft.com/office/drawing/2010/main" xmlns="" w="9525">
                   <a:solidFill>
                     <a:srgbClr val="000000"/>
                   </a:solidFill>
@@ -13935,7 +13691,7 @@
                 </a14:hiddenLine>
               </a:ext>
               <a:ext uri="{AF507438-7753-43e0-B8FC-AC1667EBCBE1}">
-                <a14:hiddenEffects xmlns="" xmlns:a14="http://schemas.microsoft.com/office/drawing/2010/main">
+                <a14:hiddenEffects xmlns:a14="http://schemas.microsoft.com/office/drawing/2010/main" xmlns="">
                   <a:effectLst>
                     <a:outerShdw blurRad="63500" dist="38099" dir="2700000" algn="ctr" rotWithShape="0">
                       <a:srgbClr val="000000">
@@ -13984,7 +13740,7 @@
             <a:effectLst/>
             <a:extLst>
               <a:ext uri="{909E8E84-426E-40dd-AFC4-6F175D3DCCD1}">
-                <a14:hiddenFill xmlns="" xmlns:a14="http://schemas.microsoft.com/office/drawing/2010/main">
+                <a14:hiddenFill xmlns:a14="http://schemas.microsoft.com/office/drawing/2010/main" xmlns="">
                   <a:blipFill dpi="0" rotWithShape="0">
                     <a:blip/>
                     <a:srcRect/>
@@ -13995,7 +13751,7 @@
                 </a14:hiddenFill>
               </a:ext>
               <a:ext uri="{91240B29-F687-4f45-9708-019B960494DF}">
-                <a14:hiddenLine xmlns="" xmlns:a14="http://schemas.microsoft.com/office/drawing/2010/main" w="9525">
+                <a14:hiddenLine xmlns:a14="http://schemas.microsoft.com/office/drawing/2010/main" xmlns="" w="9525">
                   <a:solidFill>
                     <a:srgbClr val="000000"/>
                   </a:solidFill>
@@ -14005,7 +13761,7 @@
                 </a14:hiddenLine>
               </a:ext>
               <a:ext uri="{AF507438-7753-43e0-B8FC-AC1667EBCBE1}">
-                <a14:hiddenEffects xmlns="" xmlns:a14="http://schemas.microsoft.com/office/drawing/2010/main">
+                <a14:hiddenEffects xmlns:a14="http://schemas.microsoft.com/office/drawing/2010/main" xmlns="">
                   <a:effectLst>
                     <a:outerShdw blurRad="63500" dist="38099" dir="2700000" algn="ctr" rotWithShape="0">
                       <a:srgbClr val="000000">
@@ -14054,7 +13810,7 @@
             <a:effectLst/>
             <a:extLst>
               <a:ext uri="{909E8E84-426E-40dd-AFC4-6F175D3DCCD1}">
-                <a14:hiddenFill xmlns="" xmlns:a14="http://schemas.microsoft.com/office/drawing/2010/main">
+                <a14:hiddenFill xmlns:a14="http://schemas.microsoft.com/office/drawing/2010/main" xmlns="">
                   <a:blipFill dpi="0" rotWithShape="0">
                     <a:blip/>
                     <a:srcRect/>
@@ -14065,7 +13821,7 @@
                 </a14:hiddenFill>
               </a:ext>
               <a:ext uri="{91240B29-F687-4f45-9708-019B960494DF}">
-                <a14:hiddenLine xmlns="" xmlns:a14="http://schemas.microsoft.com/office/drawing/2010/main" w="9525">
+                <a14:hiddenLine xmlns:a14="http://schemas.microsoft.com/office/drawing/2010/main" xmlns="" w="9525">
                   <a:solidFill>
                     <a:srgbClr val="000000"/>
                   </a:solidFill>
@@ -14075,7 +13831,7 @@
                 </a14:hiddenLine>
               </a:ext>
               <a:ext uri="{AF507438-7753-43e0-B8FC-AC1667EBCBE1}">
-                <a14:hiddenEffects xmlns="" xmlns:a14="http://schemas.microsoft.com/office/drawing/2010/main">
+                <a14:hiddenEffects xmlns:a14="http://schemas.microsoft.com/office/drawing/2010/main" xmlns="">
                   <a:effectLst>
                     <a:outerShdw blurRad="63500" dist="38099" dir="2700000" algn="ctr" rotWithShape="0">
                       <a:srgbClr val="000000">
@@ -14124,7 +13880,7 @@
             <a:effectLst/>
             <a:extLst>
               <a:ext uri="{909E8E84-426E-40dd-AFC4-6F175D3DCCD1}">
-                <a14:hiddenFill xmlns="" xmlns:a14="http://schemas.microsoft.com/office/drawing/2010/main">
+                <a14:hiddenFill xmlns:a14="http://schemas.microsoft.com/office/drawing/2010/main" xmlns="">
                   <a:blipFill dpi="0" rotWithShape="0">
                     <a:blip/>
                     <a:srcRect/>
@@ -14135,7 +13891,7 @@
                 </a14:hiddenFill>
               </a:ext>
               <a:ext uri="{91240B29-F687-4f45-9708-019B960494DF}">
-                <a14:hiddenLine xmlns="" xmlns:a14="http://schemas.microsoft.com/office/drawing/2010/main" w="9525">
+                <a14:hiddenLine xmlns:a14="http://schemas.microsoft.com/office/drawing/2010/main" xmlns="" w="9525">
                   <a:solidFill>
                     <a:srgbClr val="000000"/>
                   </a:solidFill>
@@ -14145,7 +13901,7 @@
                 </a14:hiddenLine>
               </a:ext>
               <a:ext uri="{AF507438-7753-43e0-B8FC-AC1667EBCBE1}">
-                <a14:hiddenEffects xmlns="" xmlns:a14="http://schemas.microsoft.com/office/drawing/2010/main">
+                <a14:hiddenEffects xmlns:a14="http://schemas.microsoft.com/office/drawing/2010/main" xmlns="">
                   <a:effectLst>
                     <a:outerShdw blurRad="63500" dist="38099" dir="2700000" algn="ctr" rotWithShape="0">
                       <a:srgbClr val="000000">
@@ -14194,7 +13950,7 @@
             <a:effectLst/>
             <a:extLst>
               <a:ext uri="{909E8E84-426E-40dd-AFC4-6F175D3DCCD1}">
-                <a14:hiddenFill xmlns="" xmlns:a14="http://schemas.microsoft.com/office/drawing/2010/main">
+                <a14:hiddenFill xmlns:a14="http://schemas.microsoft.com/office/drawing/2010/main" xmlns="">
                   <a:blipFill dpi="0" rotWithShape="0">
                     <a:blip/>
                     <a:srcRect/>
@@ -14205,7 +13961,7 @@
                 </a14:hiddenFill>
               </a:ext>
               <a:ext uri="{91240B29-F687-4f45-9708-019B960494DF}">
-                <a14:hiddenLine xmlns="" xmlns:a14="http://schemas.microsoft.com/office/drawing/2010/main" w="9525">
+                <a14:hiddenLine xmlns:a14="http://schemas.microsoft.com/office/drawing/2010/main" xmlns="" w="9525">
                   <a:solidFill>
                     <a:srgbClr val="000000"/>
                   </a:solidFill>
@@ -14215,7 +13971,7 @@
                 </a14:hiddenLine>
               </a:ext>
               <a:ext uri="{AF507438-7753-43e0-B8FC-AC1667EBCBE1}">
-                <a14:hiddenEffects xmlns="" xmlns:a14="http://schemas.microsoft.com/office/drawing/2010/main">
+                <a14:hiddenEffects xmlns:a14="http://schemas.microsoft.com/office/drawing/2010/main" xmlns="">
                   <a:effectLst>
                     <a:outerShdw blurRad="63500" dist="38099" dir="2700000" algn="ctr" rotWithShape="0">
                       <a:srgbClr val="000000">
@@ -14256,12 +14012,12 @@
             <a:effectLst/>
             <a:extLst>
               <a:ext uri="{909E8E84-426E-40dd-AFC4-6F175D3DCCD1}">
-                <a14:hiddenFill xmlns="" xmlns:a14="http://schemas.microsoft.com/office/drawing/2010/main">
+                <a14:hiddenFill xmlns:a14="http://schemas.microsoft.com/office/drawing/2010/main" xmlns="">
                   <a:noFill/>
                 </a14:hiddenFill>
               </a:ext>
               <a:ext uri="{AF507438-7753-43e0-B8FC-AC1667EBCBE1}">
-                <a14:hiddenEffects xmlns="" xmlns:a14="http://schemas.microsoft.com/office/drawing/2010/main">
+                <a14:hiddenEffects xmlns:a14="http://schemas.microsoft.com/office/drawing/2010/main" xmlns="">
                   <a:effectLst>
                     <a:outerShdw blurRad="63500" dist="38099" dir="2700000" algn="ctr" rotWithShape="0">
                       <a:srgbClr val="000000">
@@ -14314,12 +14070,12 @@
             <a:effectLst/>
             <a:extLst>
               <a:ext uri="{909E8E84-426E-40dd-AFC4-6F175D3DCCD1}">
-                <a14:hiddenFill xmlns="" xmlns:a14="http://schemas.microsoft.com/office/drawing/2010/main">
+                <a14:hiddenFill xmlns:a14="http://schemas.microsoft.com/office/drawing/2010/main" xmlns="">
                   <a:noFill/>
                 </a14:hiddenFill>
               </a:ext>
               <a:ext uri="{AF507438-7753-43e0-B8FC-AC1667EBCBE1}">
-                <a14:hiddenEffects xmlns="" xmlns:a14="http://schemas.microsoft.com/office/drawing/2010/main">
+                <a14:hiddenEffects xmlns:a14="http://schemas.microsoft.com/office/drawing/2010/main" xmlns="">
                   <a:effectLst>
                     <a:outerShdw blurRad="63500" dist="38099" dir="2700000" algn="ctr" rotWithShape="0">
                       <a:srgbClr val="000000">
@@ -14380,7 +14136,7 @@
             <a:effectLst/>
             <a:extLst>
               <a:ext uri="{909E8E84-426E-40dd-AFC4-6F175D3DCCD1}">
-                <a14:hiddenFill xmlns="" xmlns:a14="http://schemas.microsoft.com/office/drawing/2010/main">
+                <a14:hiddenFill xmlns:a14="http://schemas.microsoft.com/office/drawing/2010/main" xmlns="">
                   <a:blipFill dpi="0" rotWithShape="0">
                     <a:blip/>
                     <a:srcRect/>
@@ -14391,7 +14147,7 @@
                 </a14:hiddenFill>
               </a:ext>
               <a:ext uri="{91240B29-F687-4f45-9708-019B960494DF}">
-                <a14:hiddenLine xmlns="" xmlns:a14="http://schemas.microsoft.com/office/drawing/2010/main" w="9525">
+                <a14:hiddenLine xmlns:a14="http://schemas.microsoft.com/office/drawing/2010/main" xmlns="" w="9525">
                   <a:solidFill>
                     <a:srgbClr val="000000"/>
                   </a:solidFill>
@@ -14401,7 +14157,7 @@
                 </a14:hiddenLine>
               </a:ext>
               <a:ext uri="{AF507438-7753-43e0-B8FC-AC1667EBCBE1}">
-                <a14:hiddenEffects xmlns="" xmlns:a14="http://schemas.microsoft.com/office/drawing/2010/main">
+                <a14:hiddenEffects xmlns:a14="http://schemas.microsoft.com/office/drawing/2010/main" xmlns="">
                   <a:effectLst>
                     <a:outerShdw blurRad="63500" dist="38099" dir="2700000" algn="ctr" rotWithShape="0">
                       <a:srgbClr val="000000">
@@ -14534,7 +14290,7 @@
           <a:effectLst/>
           <a:extLst>
             <a:ext uri="{909E8E84-426E-40dd-AFC4-6F175D3DCCD1}">
-              <a14:hiddenFill xmlns:a14="http://schemas.microsoft.com/office/drawing/2010/main" xmlns="">
+              <a14:hiddenFill xmlns="" xmlns:a14="http://schemas.microsoft.com/office/drawing/2010/main">
                 <a:blipFill dpi="0" rotWithShape="0">
                   <a:blip/>
                   <a:srcRect/>
@@ -14545,7 +14301,7 @@
               </a14:hiddenFill>
             </a:ext>
             <a:ext uri="{91240B29-F687-4f45-9708-019B960494DF}">
-              <a14:hiddenLine xmlns:a14="http://schemas.microsoft.com/office/drawing/2010/main" xmlns="" w="9525">
+              <a14:hiddenLine xmlns="" xmlns:a14="http://schemas.microsoft.com/office/drawing/2010/main" w="9525">
                 <a:solidFill>
                   <a:srgbClr val="000000"/>
                 </a:solidFill>
@@ -14555,7 +14311,7 @@
               </a14:hiddenLine>
             </a:ext>
             <a:ext uri="{AF507438-7753-43e0-B8FC-AC1667EBCBE1}">
-              <a14:hiddenEffects xmlns:a14="http://schemas.microsoft.com/office/drawing/2010/main" xmlns="">
+              <a14:hiddenEffects xmlns="" xmlns:a14="http://schemas.microsoft.com/office/drawing/2010/main">
                 <a:effectLst>
                   <a:outerShdw blurRad="63500" dist="38099" dir="2700000" algn="ctr" rotWithShape="0">
                     <a:srgbClr val="000000">
@@ -14640,7 +14396,7 @@
           <a:effectLst/>
           <a:extLst>
             <a:ext uri="{909E8E84-426E-40dd-AFC4-6F175D3DCCD1}">
-              <a14:hiddenFill xmlns:a14="http://schemas.microsoft.com/office/drawing/2010/main" xmlns="">
+              <a14:hiddenFill xmlns="" xmlns:a14="http://schemas.microsoft.com/office/drawing/2010/main">
                 <a:blipFill dpi="0" rotWithShape="0">
                   <a:blip/>
                   <a:srcRect/>
@@ -14651,7 +14407,7 @@
               </a14:hiddenFill>
             </a:ext>
             <a:ext uri="{91240B29-F687-4f45-9708-019B960494DF}">
-              <a14:hiddenLine xmlns:a14="http://schemas.microsoft.com/office/drawing/2010/main" xmlns="" w="9525">
+              <a14:hiddenLine xmlns="" xmlns:a14="http://schemas.microsoft.com/office/drawing/2010/main" w="9525">
                 <a:solidFill>
                   <a:srgbClr val="000000"/>
                 </a:solidFill>
@@ -14661,7 +14417,7 @@
               </a14:hiddenLine>
             </a:ext>
             <a:ext uri="{AF507438-7753-43e0-B8FC-AC1667EBCBE1}">
-              <a14:hiddenEffects xmlns:a14="http://schemas.microsoft.com/office/drawing/2010/main" xmlns="">
+              <a14:hiddenEffects xmlns="" xmlns:a14="http://schemas.microsoft.com/office/drawing/2010/main">
                 <a:effectLst>
                   <a:outerShdw blurRad="63500" dist="38099" dir="2700000" algn="ctr" rotWithShape="0">
                     <a:srgbClr val="000000">
@@ -14746,7 +14502,7 @@
           <a:effectLst/>
           <a:extLst>
             <a:ext uri="{909E8E84-426E-40dd-AFC4-6F175D3DCCD1}">
-              <a14:hiddenFill xmlns:a14="http://schemas.microsoft.com/office/drawing/2010/main" xmlns="">
+              <a14:hiddenFill xmlns="" xmlns:a14="http://schemas.microsoft.com/office/drawing/2010/main">
                 <a:blipFill dpi="0" rotWithShape="0">
                   <a:blip/>
                   <a:srcRect/>
@@ -14757,7 +14513,7 @@
               </a14:hiddenFill>
             </a:ext>
             <a:ext uri="{91240B29-F687-4f45-9708-019B960494DF}">
-              <a14:hiddenLine xmlns:a14="http://schemas.microsoft.com/office/drawing/2010/main" xmlns="" w="9525">
+              <a14:hiddenLine xmlns="" xmlns:a14="http://schemas.microsoft.com/office/drawing/2010/main" w="9525">
                 <a:solidFill>
                   <a:srgbClr val="000000"/>
                 </a:solidFill>
@@ -14767,7 +14523,7 @@
               </a14:hiddenLine>
             </a:ext>
             <a:ext uri="{AF507438-7753-43e0-B8FC-AC1667EBCBE1}">
-              <a14:hiddenEffects xmlns:a14="http://schemas.microsoft.com/office/drawing/2010/main" xmlns="">
+              <a14:hiddenEffects xmlns="" xmlns:a14="http://schemas.microsoft.com/office/drawing/2010/main">
                 <a:effectLst>
                   <a:outerShdw blurRad="63500" dist="38099" dir="2700000" algn="ctr" rotWithShape="0">
                     <a:srgbClr val="000000">
@@ -14947,7 +14703,7 @@
           <a:effectLst/>
           <a:extLst>
             <a:ext uri="{909E8E84-426E-40dd-AFC4-6F175D3DCCD1}">
-              <a14:hiddenFill xmlns:a14="http://schemas.microsoft.com/office/drawing/2010/main" xmlns="">
+              <a14:hiddenFill xmlns="" xmlns:a14="http://schemas.microsoft.com/office/drawing/2010/main">
                 <a:blipFill dpi="0" rotWithShape="0">
                   <a:blip/>
                   <a:srcRect/>
@@ -14958,7 +14714,7 @@
               </a14:hiddenFill>
             </a:ext>
             <a:ext uri="{91240B29-F687-4f45-9708-019B960494DF}">
-              <a14:hiddenLine xmlns:a14="http://schemas.microsoft.com/office/drawing/2010/main" xmlns="" w="9525">
+              <a14:hiddenLine xmlns="" xmlns:a14="http://schemas.microsoft.com/office/drawing/2010/main" w="9525">
                 <a:solidFill>
                   <a:srgbClr val="000000"/>
                 </a:solidFill>
@@ -14968,7 +14724,7 @@
               </a14:hiddenLine>
             </a:ext>
             <a:ext uri="{AF507438-7753-43e0-B8FC-AC1667EBCBE1}">
-              <a14:hiddenEffects xmlns:a14="http://schemas.microsoft.com/office/drawing/2010/main" xmlns="">
+              <a14:hiddenEffects xmlns="" xmlns:a14="http://schemas.microsoft.com/office/drawing/2010/main">
                 <a:effectLst>
                   <a:outerShdw blurRad="63500" dist="38099" dir="2700000" algn="ctr" rotWithShape="0">
                     <a:srgbClr val="000000">
@@ -15046,7 +14802,7 @@
           <a:effectLst/>
           <a:extLst>
             <a:ext uri="{909E8E84-426E-40dd-AFC4-6F175D3DCCD1}">
-              <a14:hiddenFill xmlns:a14="http://schemas.microsoft.com/office/drawing/2010/main" xmlns="">
+              <a14:hiddenFill xmlns="" xmlns:a14="http://schemas.microsoft.com/office/drawing/2010/main">
                 <a:blipFill dpi="0" rotWithShape="0">
                   <a:blip/>
                   <a:srcRect/>
@@ -15057,7 +14813,7 @@
               </a14:hiddenFill>
             </a:ext>
             <a:ext uri="{91240B29-F687-4f45-9708-019B960494DF}">
-              <a14:hiddenLine xmlns:a14="http://schemas.microsoft.com/office/drawing/2010/main" xmlns="" w="9525">
+              <a14:hiddenLine xmlns="" xmlns:a14="http://schemas.microsoft.com/office/drawing/2010/main" w="9525">
                 <a:solidFill>
                   <a:srgbClr val="000000"/>
                 </a:solidFill>
@@ -15067,7 +14823,7 @@
               </a14:hiddenLine>
             </a:ext>
             <a:ext uri="{AF507438-7753-43e0-B8FC-AC1667EBCBE1}">
-              <a14:hiddenEffects xmlns:a14="http://schemas.microsoft.com/office/drawing/2010/main" xmlns="">
+              <a14:hiddenEffects xmlns="" xmlns:a14="http://schemas.microsoft.com/office/drawing/2010/main">
                 <a:effectLst>
                   <a:outerShdw blurRad="63500" dist="38099" dir="2700000" algn="ctr" rotWithShape="0">
                     <a:srgbClr val="000000">
@@ -15145,7 +14901,7 @@
           <a:effectLst/>
           <a:extLst>
             <a:ext uri="{909E8E84-426E-40dd-AFC4-6F175D3DCCD1}">
-              <a14:hiddenFill xmlns:a14="http://schemas.microsoft.com/office/drawing/2010/main" xmlns="">
+              <a14:hiddenFill xmlns="" xmlns:a14="http://schemas.microsoft.com/office/drawing/2010/main">
                 <a:blipFill dpi="0" rotWithShape="0">
                   <a:blip/>
                   <a:srcRect/>
@@ -15156,7 +14912,7 @@
               </a14:hiddenFill>
             </a:ext>
             <a:ext uri="{91240B29-F687-4f45-9708-019B960494DF}">
-              <a14:hiddenLine xmlns:a14="http://schemas.microsoft.com/office/drawing/2010/main" xmlns="" w="9525">
+              <a14:hiddenLine xmlns="" xmlns:a14="http://schemas.microsoft.com/office/drawing/2010/main" w="9525">
                 <a:solidFill>
                   <a:srgbClr val="000000"/>
                 </a:solidFill>
@@ -15166,7 +14922,7 @@
               </a14:hiddenLine>
             </a:ext>
             <a:ext uri="{AF507438-7753-43e0-B8FC-AC1667EBCBE1}">
-              <a14:hiddenEffects xmlns:a14="http://schemas.microsoft.com/office/drawing/2010/main" xmlns="">
+              <a14:hiddenEffects xmlns="" xmlns:a14="http://schemas.microsoft.com/office/drawing/2010/main">
                 <a:effectLst>
                   <a:outerShdw blurRad="63500" dist="38099" dir="2700000" algn="ctr" rotWithShape="0">
                     <a:srgbClr val="000000">
@@ -15203,7 +14959,7 @@
           <a:p>
             <a:r>
               <a:rPr lang="en-US" sz="2000" dirty="0"/>
-              <a:t>Counters &amp; Sketches</a:t>
+              <a:t>Sketches</a:t>
             </a:r>
           </a:p>
         </p:txBody>
@@ -17035,7 +16791,7 @@
           <a:effectLst/>
           <a:extLst>
             <a:ext uri="{909E8E84-426E-40dd-AFC4-6F175D3DCCD1}">
-              <a14:hiddenFill xmlns="" xmlns:a14="http://schemas.microsoft.com/office/drawing/2010/main">
+              <a14:hiddenFill xmlns:a14="http://schemas.microsoft.com/office/drawing/2010/main" xmlns="">
                 <a:blipFill dpi="0" rotWithShape="0">
                   <a:blip/>
                   <a:srcRect/>
@@ -17046,7 +16802,7 @@
               </a14:hiddenFill>
             </a:ext>
             <a:ext uri="{91240B29-F687-4f45-9708-019B960494DF}">
-              <a14:hiddenLine xmlns="" xmlns:a14="http://schemas.microsoft.com/office/drawing/2010/main" w="9525">
+              <a14:hiddenLine xmlns:a14="http://schemas.microsoft.com/office/drawing/2010/main" xmlns="" w="9525">
                 <a:solidFill>
                   <a:srgbClr val="000000"/>
                 </a:solidFill>
@@ -17056,7 +16812,7 @@
               </a14:hiddenLine>
             </a:ext>
             <a:ext uri="{AF507438-7753-43e0-B8FC-AC1667EBCBE1}">
-              <a14:hiddenEffects xmlns="" xmlns:a14="http://schemas.microsoft.com/office/drawing/2010/main">
+              <a14:hiddenEffects xmlns:a14="http://schemas.microsoft.com/office/drawing/2010/main" xmlns="">
                 <a:effectLst>
                   <a:outerShdw blurRad="63500" dist="38099" dir="2700000" algn="ctr" rotWithShape="0">
                     <a:srgbClr val="000000">
@@ -18545,7 +18301,7 @@
           <a:effectLst/>
           <a:extLst>
             <a:ext uri="{909E8E84-426E-40dd-AFC4-6F175D3DCCD1}">
-              <a14:hiddenFill xmlns="" xmlns:a14="http://schemas.microsoft.com/office/drawing/2010/main">
+              <a14:hiddenFill xmlns:a14="http://schemas.microsoft.com/office/drawing/2010/main" xmlns="">
                 <a:blipFill dpi="0" rotWithShape="0">
                   <a:blip/>
                   <a:srcRect/>
@@ -18556,7 +18312,7 @@
               </a14:hiddenFill>
             </a:ext>
             <a:ext uri="{91240B29-F687-4f45-9708-019B960494DF}">
-              <a14:hiddenLine xmlns="" xmlns:a14="http://schemas.microsoft.com/office/drawing/2010/main" w="9525">
+              <a14:hiddenLine xmlns:a14="http://schemas.microsoft.com/office/drawing/2010/main" xmlns="" w="9525">
                 <a:solidFill>
                   <a:srgbClr val="000000"/>
                 </a:solidFill>
@@ -18566,7 +18322,7 @@
               </a14:hiddenLine>
             </a:ext>
             <a:ext uri="{AF507438-7753-43e0-B8FC-AC1667EBCBE1}">
-              <a14:hiddenEffects xmlns="" xmlns:a14="http://schemas.microsoft.com/office/drawing/2010/main">
+              <a14:hiddenEffects xmlns:a14="http://schemas.microsoft.com/office/drawing/2010/main" xmlns="">
                 <a:effectLst>
                   <a:outerShdw blurRad="63500" dist="38099" dir="2700000" algn="ctr" rotWithShape="0">
                     <a:srgbClr val="000000">
@@ -20051,7 +19807,7 @@
           <a:effectLst/>
           <a:extLst>
             <a:ext uri="{909E8E84-426E-40dd-AFC4-6F175D3DCCD1}">
-              <a14:hiddenFill xmlns="" xmlns:a14="http://schemas.microsoft.com/office/drawing/2010/main">
+              <a14:hiddenFill xmlns:a14="http://schemas.microsoft.com/office/drawing/2010/main" xmlns="">
                 <a:blipFill dpi="0" rotWithShape="0">
                   <a:blip/>
                   <a:srcRect/>
@@ -20062,7 +19818,7 @@
               </a14:hiddenFill>
             </a:ext>
             <a:ext uri="{91240B29-F687-4f45-9708-019B960494DF}">
-              <a14:hiddenLine xmlns="" xmlns:a14="http://schemas.microsoft.com/office/drawing/2010/main" w="9525">
+              <a14:hiddenLine xmlns:a14="http://schemas.microsoft.com/office/drawing/2010/main" xmlns="" w="9525">
                 <a:solidFill>
                   <a:srgbClr val="000000"/>
                 </a:solidFill>
@@ -20072,7 +19828,7 @@
               </a14:hiddenLine>
             </a:ext>
             <a:ext uri="{AF507438-7753-43e0-B8FC-AC1667EBCBE1}">
-              <a14:hiddenEffects xmlns="" xmlns:a14="http://schemas.microsoft.com/office/drawing/2010/main">
+              <a14:hiddenEffects xmlns:a14="http://schemas.microsoft.com/office/drawing/2010/main" xmlns="">
                 <a:effectLst>
                   <a:outerShdw blurRad="63500" dist="38099" dir="2700000" algn="ctr" rotWithShape="0">
                     <a:srgbClr val="000000">
@@ -20226,7 +19982,7 @@
           <a:effectLst/>
           <a:extLst>
             <a:ext uri="{909E8E84-426E-40dd-AFC4-6F175D3DCCD1}">
-              <a14:hiddenFill xmlns="" xmlns:a14="http://schemas.microsoft.com/office/drawing/2010/main">
+              <a14:hiddenFill xmlns:a14="http://schemas.microsoft.com/office/drawing/2010/main" xmlns="">
                 <a:blipFill dpi="0" rotWithShape="0">
                   <a:blip/>
                   <a:srcRect/>
@@ -20237,7 +19993,7 @@
               </a14:hiddenFill>
             </a:ext>
             <a:ext uri="{91240B29-F687-4f45-9708-019B960494DF}">
-              <a14:hiddenLine xmlns="" xmlns:a14="http://schemas.microsoft.com/office/drawing/2010/main" w="9525">
+              <a14:hiddenLine xmlns:a14="http://schemas.microsoft.com/office/drawing/2010/main" xmlns="" w="9525">
                 <a:solidFill>
                   <a:srgbClr val="000000"/>
                 </a:solidFill>
@@ -20247,7 +20003,7 @@
               </a14:hiddenLine>
             </a:ext>
             <a:ext uri="{AF507438-7753-43e0-B8FC-AC1667EBCBE1}">
-              <a14:hiddenEffects xmlns="" xmlns:a14="http://schemas.microsoft.com/office/drawing/2010/main">
+              <a14:hiddenEffects xmlns:a14="http://schemas.microsoft.com/office/drawing/2010/main" xmlns="">
                 <a:effectLst>
                   <a:outerShdw blurRad="63500" dist="38099" dir="2700000" algn="ctr" rotWithShape="0">
                     <a:srgbClr val="000000">
@@ -22040,7 +21796,7 @@
           <a:effectLst/>
           <a:extLst>
             <a:ext uri="{909E8E84-426E-40dd-AFC4-6F175D3DCCD1}">
-              <a14:hiddenFill xmlns="" xmlns:a14="http://schemas.microsoft.com/office/drawing/2010/main">
+              <a14:hiddenFill xmlns:a14="http://schemas.microsoft.com/office/drawing/2010/main" xmlns="">
                 <a:blipFill dpi="0" rotWithShape="0">
                   <a:blip/>
                   <a:srcRect/>
@@ -22051,7 +21807,7 @@
               </a14:hiddenFill>
             </a:ext>
             <a:ext uri="{91240B29-F687-4f45-9708-019B960494DF}">
-              <a14:hiddenLine xmlns="" xmlns:a14="http://schemas.microsoft.com/office/drawing/2010/main" w="9525">
+              <a14:hiddenLine xmlns:a14="http://schemas.microsoft.com/office/drawing/2010/main" xmlns="" w="9525">
                 <a:solidFill>
                   <a:srgbClr val="000000"/>
                 </a:solidFill>
@@ -22061,7 +21817,7 @@
               </a14:hiddenLine>
             </a:ext>
             <a:ext uri="{AF507438-7753-43e0-B8FC-AC1667EBCBE1}">
-              <a14:hiddenEffects xmlns="" xmlns:a14="http://schemas.microsoft.com/office/drawing/2010/main">
+              <a14:hiddenEffects xmlns:a14="http://schemas.microsoft.com/office/drawing/2010/main" xmlns="">
                 <a:effectLst>
                   <a:outerShdw blurRad="63500" dist="38099" dir="2700000" algn="ctr" rotWithShape="0">
                     <a:srgbClr val="000000">
@@ -25016,7 +24772,7 @@
           <a:effectLst/>
           <a:extLst>
             <a:ext uri="{909E8E84-426E-40dd-AFC4-6F175D3DCCD1}">
-              <a14:hiddenFill xmlns="" xmlns:a14="http://schemas.microsoft.com/office/drawing/2010/main">
+              <a14:hiddenFill xmlns:a14="http://schemas.microsoft.com/office/drawing/2010/main" xmlns="">
                 <a:blipFill dpi="0" rotWithShape="0">
                   <a:blip/>
                   <a:srcRect/>
@@ -25027,7 +24783,7 @@
               </a14:hiddenFill>
             </a:ext>
             <a:ext uri="{91240B29-F687-4f45-9708-019B960494DF}">
-              <a14:hiddenLine xmlns="" xmlns:a14="http://schemas.microsoft.com/office/drawing/2010/main" w="9525">
+              <a14:hiddenLine xmlns:a14="http://schemas.microsoft.com/office/drawing/2010/main" xmlns="" w="9525">
                 <a:solidFill>
                   <a:srgbClr val="000000"/>
                 </a:solidFill>
@@ -25037,7 +24793,7 @@
               </a14:hiddenLine>
             </a:ext>
             <a:ext uri="{AF507438-7753-43e0-B8FC-AC1667EBCBE1}">
-              <a14:hiddenEffects xmlns="" xmlns:a14="http://schemas.microsoft.com/office/drawing/2010/main">
+              <a14:hiddenEffects xmlns:a14="http://schemas.microsoft.com/office/drawing/2010/main" xmlns="">
                 <a:effectLst>
                   <a:outerShdw blurRad="63500" dist="38099" dir="2700000" algn="ctr" rotWithShape="0">
                     <a:srgbClr val="000000">
@@ -25116,7 +24872,7 @@
           <a:effectLst/>
           <a:extLst>
             <a:ext uri="{909E8E84-426E-40dd-AFC4-6F175D3DCCD1}">
-              <a14:hiddenFill xmlns="" xmlns:a14="http://schemas.microsoft.com/office/drawing/2010/main">
+              <a14:hiddenFill xmlns:a14="http://schemas.microsoft.com/office/drawing/2010/main" xmlns="">
                 <a:blipFill dpi="0" rotWithShape="0">
                   <a:blip/>
                   <a:srcRect/>
@@ -25127,7 +24883,7 @@
               </a14:hiddenFill>
             </a:ext>
             <a:ext uri="{91240B29-F687-4f45-9708-019B960494DF}">
-              <a14:hiddenLine xmlns="" xmlns:a14="http://schemas.microsoft.com/office/drawing/2010/main" w="9525">
+              <a14:hiddenLine xmlns:a14="http://schemas.microsoft.com/office/drawing/2010/main" xmlns="" w="9525">
                 <a:solidFill>
                   <a:srgbClr val="000000"/>
                 </a:solidFill>
@@ -25137,7 +24893,7 @@
               </a14:hiddenLine>
             </a:ext>
             <a:ext uri="{AF507438-7753-43e0-B8FC-AC1667EBCBE1}">
-              <a14:hiddenEffects xmlns="" xmlns:a14="http://schemas.microsoft.com/office/drawing/2010/main">
+              <a14:hiddenEffects xmlns:a14="http://schemas.microsoft.com/office/drawing/2010/main" xmlns="">
                 <a:effectLst>
                   <a:outerShdw blurRad="63500" dist="38099" dir="2700000" algn="ctr" rotWithShape="0">
                     <a:srgbClr val="000000">
@@ -26732,7 +26488,7 @@
           <a:effectLst/>
           <a:extLst>
             <a:ext uri="{909E8E84-426E-40dd-AFC4-6F175D3DCCD1}">
-              <a14:hiddenFill xmlns="" xmlns:a14="http://schemas.microsoft.com/office/drawing/2010/main">
+              <a14:hiddenFill xmlns:a14="http://schemas.microsoft.com/office/drawing/2010/main" xmlns="">
                 <a:blipFill dpi="0" rotWithShape="0">
                   <a:blip/>
                   <a:srcRect/>
@@ -26743,7 +26499,7 @@
               </a14:hiddenFill>
             </a:ext>
             <a:ext uri="{91240B29-F687-4f45-9708-019B960494DF}">
-              <a14:hiddenLine xmlns="" xmlns:a14="http://schemas.microsoft.com/office/drawing/2010/main" w="9525">
+              <a14:hiddenLine xmlns:a14="http://schemas.microsoft.com/office/drawing/2010/main" xmlns="" w="9525">
                 <a:solidFill>
                   <a:srgbClr val="000000"/>
                 </a:solidFill>
@@ -26753,7 +26509,7 @@
               </a14:hiddenLine>
             </a:ext>
             <a:ext uri="{AF507438-7753-43e0-B8FC-AC1667EBCBE1}">
-              <a14:hiddenEffects xmlns="" xmlns:a14="http://schemas.microsoft.com/office/drawing/2010/main">
+              <a14:hiddenEffects xmlns:a14="http://schemas.microsoft.com/office/drawing/2010/main" xmlns="">
                 <a:effectLst>
                   <a:outerShdw blurRad="63500" dist="38099" dir="2700000" algn="ctr" rotWithShape="0">
                     <a:srgbClr val="000000">
@@ -28401,7 +28157,7 @@
           <a:effectLst/>
           <a:extLst>
             <a:ext uri="{909E8E84-426E-40dd-AFC4-6F175D3DCCD1}">
-              <a14:hiddenFill xmlns="" xmlns:a14="http://schemas.microsoft.com/office/drawing/2010/main">
+              <a14:hiddenFill xmlns:a14="http://schemas.microsoft.com/office/drawing/2010/main" xmlns="">
                 <a:blipFill dpi="0" rotWithShape="0">
                   <a:blip/>
                   <a:srcRect/>
@@ -28412,7 +28168,7 @@
               </a14:hiddenFill>
             </a:ext>
             <a:ext uri="{91240B29-F687-4f45-9708-019B960494DF}">
-              <a14:hiddenLine xmlns="" xmlns:a14="http://schemas.microsoft.com/office/drawing/2010/main" w="9525">
+              <a14:hiddenLine xmlns:a14="http://schemas.microsoft.com/office/drawing/2010/main" xmlns="" w="9525">
                 <a:solidFill>
                   <a:srgbClr val="000000"/>
                 </a:solidFill>
@@ -28422,7 +28178,7 @@
               </a14:hiddenLine>
             </a:ext>
             <a:ext uri="{AF507438-7753-43e0-B8FC-AC1667EBCBE1}">
-              <a14:hiddenEffects xmlns="" xmlns:a14="http://schemas.microsoft.com/office/drawing/2010/main">
+              <a14:hiddenEffects xmlns:a14="http://schemas.microsoft.com/office/drawing/2010/main" xmlns="">
                 <a:effectLst>
                   <a:outerShdw blurRad="63500" dist="38099" dir="2700000" algn="ctr" rotWithShape="0">
                     <a:srgbClr val="000000">
@@ -29938,7 +29694,7 @@
           <a:effectLst/>
           <a:extLst>
             <a:ext uri="{909E8E84-426E-40dd-AFC4-6F175D3DCCD1}">
-              <a14:hiddenFill xmlns="" xmlns:a14="http://schemas.microsoft.com/office/drawing/2010/main">
+              <a14:hiddenFill xmlns:a14="http://schemas.microsoft.com/office/drawing/2010/main" xmlns="">
                 <a:blipFill dpi="0" rotWithShape="0">
                   <a:blip/>
                   <a:srcRect/>
@@ -29949,7 +29705,7 @@
               </a14:hiddenFill>
             </a:ext>
             <a:ext uri="{91240B29-F687-4f45-9708-019B960494DF}">
-              <a14:hiddenLine xmlns="" xmlns:a14="http://schemas.microsoft.com/office/drawing/2010/main" w="9525">
+              <a14:hiddenLine xmlns:a14="http://schemas.microsoft.com/office/drawing/2010/main" xmlns="" w="9525">
                 <a:solidFill>
                   <a:srgbClr val="000000"/>
                 </a:solidFill>
@@ -29959,7 +29715,7 @@
               </a14:hiddenLine>
             </a:ext>
             <a:ext uri="{AF507438-7753-43e0-B8FC-AC1667EBCBE1}">
-              <a14:hiddenEffects xmlns="" xmlns:a14="http://schemas.microsoft.com/office/drawing/2010/main">
+              <a14:hiddenEffects xmlns:a14="http://schemas.microsoft.com/office/drawing/2010/main" xmlns="">
                 <a:effectLst>
                   <a:outerShdw blurRad="63500" dist="38099" dir="2700000" algn="ctr" rotWithShape="0">
                     <a:srgbClr val="000000">
@@ -30090,7 +29846,7 @@
           <a:effectLst/>
           <a:extLst>
             <a:ext uri="{909E8E84-426E-40dd-AFC4-6F175D3DCCD1}">
-              <a14:hiddenFill xmlns="" xmlns:a14="http://schemas.microsoft.com/office/drawing/2010/main">
+              <a14:hiddenFill xmlns:a14="http://schemas.microsoft.com/office/drawing/2010/main" xmlns="">
                 <a:blipFill dpi="0" rotWithShape="0">
                   <a:blip/>
                   <a:srcRect/>
@@ -30101,7 +29857,7 @@
               </a14:hiddenFill>
             </a:ext>
             <a:ext uri="{91240B29-F687-4f45-9708-019B960494DF}">
-              <a14:hiddenLine xmlns="" xmlns:a14="http://schemas.microsoft.com/office/drawing/2010/main" w="9525">
+              <a14:hiddenLine xmlns:a14="http://schemas.microsoft.com/office/drawing/2010/main" xmlns="" w="9525">
                 <a:solidFill>
                   <a:srgbClr val="000000"/>
                 </a:solidFill>
@@ -30111,7 +29867,7 @@
               </a14:hiddenLine>
             </a:ext>
             <a:ext uri="{AF507438-7753-43e0-B8FC-AC1667EBCBE1}">
-              <a14:hiddenEffects xmlns="" xmlns:a14="http://schemas.microsoft.com/office/drawing/2010/main">
+              <a14:hiddenEffects xmlns:a14="http://schemas.microsoft.com/office/drawing/2010/main" xmlns="">
                 <a:effectLst>
                   <a:outerShdw blurRad="63500" dist="38099" dir="2700000" algn="ctr" rotWithShape="0">
                     <a:srgbClr val="000000">
@@ -30178,12 +29934,8 @@
           <a:lstStyle/>
           <a:p>
             <a:r>
-              <a:rPr lang="en-US"/>
-              <a:t>How about </a:t>
-            </a:r>
-            <a:r>
               <a:rPr lang="en-US" dirty="0"/>
-              <a:t>value accuracy after evictions?</a:t>
+              <a:t>Value accuracy after evictions</a:t>
             </a:r>
           </a:p>
         </p:txBody>
@@ -30201,13 +29953,13 @@
         <p:spPr/>
         <p:txBody>
           <a:bodyPr>
-            <a:normAutofit fontScale="85000" lnSpcReduction="10000"/>
+            <a:normAutofit fontScale="92500" lnSpcReduction="20000"/>
           </a:bodyPr>
           <a:lstStyle/>
           <a:p>
             <a:r>
               <a:rPr lang="en-US" dirty="0"/>
-              <a:t>How do we merge evicted statistics value with previous value accurately?</a:t>
+              <a:t>How do we merge evicted value with previous value accurately?</a:t>
             </a:r>
           </a:p>
           <a:p>
@@ -31183,7 +30935,7 @@
                   <a:srgbClr val="A31E34"/>
                 </a:solidFill>
               </a:rPr>
-              <a:t>Statistics over the entire packet sequence</a:t>
+              <a:t>Fold over the entire packet sequence</a:t>
             </a:r>
             <a:endParaRPr lang="en-US" baseline="-25000" dirty="0">
               <a:solidFill>
@@ -32571,8 +32323,8 @@
           </a:p>
         </p:txBody>
       </p:sp>
-      <mc:AlternateContent xmlns:mc="http://schemas.openxmlformats.org/markup-compatibility/2006" xmlns:a14="http://schemas.microsoft.com/office/drawing/2010/main">
-        <mc:Choice Requires="a14">
+      <mc:AlternateContent xmlns:mc="http://schemas.openxmlformats.org/markup-compatibility/2006">
+        <mc:Choice xmlns:a14="http://schemas.microsoft.com/office/drawing/2010/main" Requires="a14">
           <p:sp>
             <p:nvSpPr>
               <p:cNvPr id="3" name="Content Placeholder 2"/>
@@ -33177,7 +32929,7 @@
                     <a:ea typeface="Ayuthaya" charset="-34"/>
                     <a:cs typeface="Consolas" charset="0"/>
                   </a:rPr>
-                  <a:t>calculated from initial value </a:t>
+                  <a:t>calculated for an initial value </a:t>
                 </a:r>
                 <a14:m>
                   <m:oMath xmlns:m="http://schemas.openxmlformats.org/officeDocument/2006/math">
@@ -33381,7 +33133,7 @@
             </p:txBody>
           </p:sp>
         </mc:Choice>
-        <mc:Fallback xmlns="">
+        <mc:Fallback>
           <p:sp>
             <p:nvSpPr>
               <p:cNvPr id="3" name="Content Placeholder 2"/>
@@ -36329,7 +36081,7 @@
           <a:p>
             <a:r>
               <a:rPr lang="en-US" dirty="0"/>
-              <a:t>Several useful linear-in-state statistics</a:t>
+              <a:t>Several fold functions are linear-in-state</a:t>
             </a:r>
           </a:p>
         </p:txBody>
@@ -38039,7 +37791,7 @@
           <a:effectLst/>
           <a:extLst>
             <a:ext uri="{909E8E84-426E-40dd-AFC4-6F175D3DCCD1}">
-              <a14:hiddenFill xmlns:a14="http://schemas.microsoft.com/office/drawing/2010/main" xmlns="">
+              <a14:hiddenFill xmlns="" xmlns:a14="http://schemas.microsoft.com/office/drawing/2010/main">
                 <a:blipFill dpi="0" rotWithShape="0">
                   <a:blip/>
                   <a:srcRect/>
@@ -38050,7 +37802,7 @@
               </a14:hiddenFill>
             </a:ext>
             <a:ext uri="{91240B29-F687-4f45-9708-019B960494DF}">
-              <a14:hiddenLine xmlns:a14="http://schemas.microsoft.com/office/drawing/2010/main" xmlns="" w="9525">
+              <a14:hiddenLine xmlns="" xmlns:a14="http://schemas.microsoft.com/office/drawing/2010/main" w="9525">
                 <a:solidFill>
                   <a:srgbClr val="000000"/>
                 </a:solidFill>
@@ -38060,7 +37812,7 @@
               </a14:hiddenLine>
             </a:ext>
             <a:ext uri="{AF507438-7753-43e0-B8FC-AC1667EBCBE1}">
-              <a14:hiddenEffects xmlns:a14="http://schemas.microsoft.com/office/drawing/2010/main" xmlns="">
+              <a14:hiddenEffects xmlns="" xmlns:a14="http://schemas.microsoft.com/office/drawing/2010/main">
                 <a:effectLst>
                   <a:outerShdw blurRad="63500" dist="38099" dir="2700000" algn="ctr" rotWithShape="0">
                     <a:srgbClr val="000000">

</xml_diff>

<commit_message>
Simplify a few things.
</commit_message>
<xml_diff>
--- a/marple_itx18.pptx
+++ b/marple_itx18.pptx
@@ -674,7 +674,15 @@
             </a:r>
             <a:r>
               <a:rPr lang="en-US" baseline="0" dirty="0"/>
-              <a:t>, which allow you to restrict the stream, transform it, and aggregate state across tuples in the stream.</a:t>
+              <a:t>, which allow you to restrict the stream, transform it, </a:t>
+            </a:r>
+            <a:r>
+              <a:rPr lang="en-US" baseline="0"/>
+              <a:t>and maintain </a:t>
+            </a:r>
+            <a:r>
+              <a:rPr lang="en-US" baseline="0" dirty="0"/>
+              <a:t>state across tuples in the stream.</a:t>
             </a:r>
           </a:p>
         </p:txBody>
@@ -1753,7 +1761,7 @@
           <a:p>
             <a:r>
               <a:rPr lang="en-US" dirty="0"/>
-              <a:t>You can send end-to-end probes, but that only tells you that the end-to-end latency is high. It doesn’t tell you where the latency is building up. You can sample the queue’s latency or packets, but then you need to decide what the sampling frequency is. You can use counters and approximate data structures like sketches, but they are tuned for volume statistics like link utilization and number of packets from a specific flow. They don’t effectively generalize beyond such statistics.</a:t>
+              <a:t>You can send end-to-end probes, but that only tells you that the end-to-end latency is high. It doesn’t tell you where the latency is building up. You can sample the queue’s latency or packets, but then you need to decide what the sampling frequency is.</a:t>
             </a:r>
           </a:p>
           <a:p>
@@ -2909,7 +2917,7 @@
           <a:p>
             <a:r>
               <a:rPr lang="en-US" dirty="0"/>
-              <a:t>But how do I merge an old and new value for a given key? What does that even mean? Let’s look at this problem more formally. We want to merge the two values, old and new, so that it is as if the fold function ran over the entire packet stream without any evictions. That way we can retain full accuracy while merging. Let’s introduce some notation for this. Let’s represent the statistics operation as a function g over the packet sequence. For a simple counter, the function is the sum of the packet lengths (or any other packet header).</a:t>
+              <a:t>But how do I merge an old and new value for a given key? What does that even mean? Let’s look at this problem more formally. We want to merge the two values, old and new, so that it is as if the fold function ran over the entire packet stream without any evictions. That way we can retain full accuracy while merging. Let’s introduce some notation for this. Let’s represent the fold function as a function g over the packet sequence. For a simple counter, the function is the sum of the packet lengths (or any other packet header).</a:t>
             </a:r>
           </a:p>
         </p:txBody>
@@ -3002,7 +3010,7 @@
           <a:p>
             <a:r>
               <a:rPr lang="en-US" dirty="0"/>
-              <a:t>Mathematically, it means this. That if you computed the statistics over the first sequence of packets (prior to eviction) and computed the statistics over the second sequence of the packets (after the eviction) and then merged them, it is equivalent to computing the statistics over the entire packet sequence.</a:t>
+              <a:t>Mathematically, it means this. That if you computed the fold function over the first sequence of packets (prior to eviction) and computed the fold over the second sequence of the packets (after the eviction) and then merged them, it is equivalent to computing the fold over the entire packet sequence.</a:t>
             </a:r>
           </a:p>
           <a:p>
@@ -3011,7 +3019,7 @@
           <a:p>
             <a:r>
               <a:rPr lang="en-US" dirty="0"/>
-              <a:t>Let’s take a simple example. If g is a counter, the merge is a simple addition. You can probably see that this is easily generalizable to other associative statistics such as min/max/product, etc. Essentially, you track the minimum in the cache and take the minimum of the new value in the cache and the old value in the backing store.</a:t>
+              <a:t>Let’s take a simple example. If g is a counter, the merge is a simple addition. You can probably see that this is easily generalizable to other associative folds such as min/max/product, etc. Essentially, you track the minimum in the cache and take the minimum of the new value in the cache and the old value in the backing store.</a:t>
             </a:r>
           </a:p>
         </p:txBody>
@@ -3098,7 +3106,7 @@
           <a:p>
             <a:r>
               <a:rPr lang="en-US" dirty="0"/>
-              <a:t>But what about operations that are not associative? Let’s think about this for a bit. We can merge any arbitrary statistic g by storing the entire sequence of packets in the cache, sending this sequence of packets to the backing store upon eviction, and merging by simply replaying the statistic computation over this sequence of packets.</a:t>
+              <a:t>But what about operations that are not associative? Let’s think about this for a bit. We can merge any arbitrary fold by storing the entire sequence of packets in the cache, sending this sequence of packets to the backing store upon eviction, and merging by simply replaying the fold computation over this sequence of packets.</a:t>
             </a:r>
           </a:p>
           <a:p>
@@ -3116,7 +3124,7 @@
           <a:p>
             <a:r>
               <a:rPr lang="en-US" dirty="0"/>
-              <a:t>So the real question is whether we can merge with a small amount of extra state over and above the state that is being tracked by the statistics function itself? More precisely, we want the extra state to have size similar to the statistic being tracked.</a:t>
+              <a:t>So the real question is whether we can merge with a small amount of extra state over and above the state that is being tracked by the fold function itself? More precisely, we want the extra state to have size similar to the state being tracked.</a:t>
             </a:r>
           </a:p>
           <a:p>
@@ -3209,7 +3217,7 @@
           <a:p>
             <a:r>
               <a:rPr lang="en-US" dirty="0"/>
-              <a:t>One theoretical contribution of this work was identifying a class of fold functions where we could in fact carry out the merge using a small amount of additional state. This class we call the linear-in-state aggregation functions. The reason for this name should be clear from looking at the form of the state update in these fold functions: the updated state is a linear function of the previous state. Here the coefficients A and B can either be constants or functions of a bounded number of packets in the past starting from the current packet. S can also be generalized to a vector and A and B can be matrices.</a:t>
+              <a:t>One theoretical contribution of this work was identifying a class of fold functions where we could in fact carry out the merge using a small amount of additional state. This class we call the linear-in-state class of fold functions. The reason for this name should be clear from looking at the form of the state update in these fold functions: the updated state is a linear function of the previous state. Here the coefficients A and B can either be constants or functions of a bounded number of packets in the past starting from the current packet. S can also be generalized to a vector and A and B can be matrices.</a:t>
             </a:r>
           </a:p>
           <a:p>
@@ -3633,7 +3641,7 @@
           <a:p>
             <a:r>
               <a:rPr lang="en-US" dirty="0"/>
-              <a:t>The paper contains several more examples of linear-in-state statistics. The important thing if you’re a switching chip manufacturer is that you can implement this quite cheaply in hardware using a multiply-accumulate hardware instruction---something that is quite well understood today.</a:t>
+              <a:t>The paper contains several more examples of linear-in-state folds. The important thing if you’re a switching chip manufacturer is that you can implement this quite cheaply in hardware using a multiply-accumulate hardware instruction---something that is quite well understood today.</a:t>
             </a:r>
           </a:p>
         </p:txBody>
@@ -4576,7 +4584,7 @@
           <a:p>
             <a:r>
               <a:rPr lang="en-US" dirty="0"/>
-              <a:t>Here’s a bird’s eye view of the entire system. A network operator writes queries in a language that we call Marple and feeds it into a query compiler, which then translates these queries into switch programs that run on the network’s switches. These switch programs carry out filtering and aggregation to execute the queries. They stream out the resulting data to collection servers. The operator can then inspect these results and refine their query if required. When I get to the evaluation, we’ll see how using the switch for filtering and aggregation helps reduce the load on these collection servers significantly relative to the simplistic solution of having the collection server process every packet from the network.</a:t>
+              <a:t>Here’s a bird’s eye view of the entire system. A network operator writes queries in a language that we call Marple and feeds it into a query compiler, which then translates these queries into switch programs that run on the network’s switches. These switch programs carry out some packet processing to execute the queries. They stream out the resulting data to collection servers. The operator can then inspect these results and refine their query if required. When I get to the evaluation, we’ll see how using the switch for packet processing helps reduce the load on these collection servers significantly relative to the simplistic solution of having the collection server process every packet from the network.</a:t>
             </a:r>
           </a:p>
         </p:txBody>
@@ -7797,205 +7805,6 @@
           </a:p>
         </p:txBody>
       </p:sp>
-      <p:sp>
-        <p:nvSpPr>
-          <p:cNvPr id="4" name="Subtitle 2">
-            <a:extLst>
-              <a:ext uri="{FF2B5EF4-FFF2-40B4-BE49-F238E27FC236}">
-                <a16:creationId xmlns:a16="http://schemas.microsoft.com/office/drawing/2014/main" id="{4ACCBFFC-FE3A-1B40-9908-225227B200C6}"/>
-              </a:ext>
-            </a:extLst>
-          </p:cNvPr>
-          <p:cNvSpPr txBox="1">
-            <a:spLocks/>
-          </p:cNvSpPr>
-          <p:nvPr/>
-        </p:nvSpPr>
-        <p:spPr>
-          <a:xfrm>
-            <a:off x="1030317" y="5232755"/>
-            <a:ext cx="10131366" cy="642978"/>
-          </a:xfrm>
-          <a:prstGeom prst="rect">
-            <a:avLst/>
-          </a:prstGeom>
-        </p:spPr>
-        <p:txBody>
-          <a:bodyPr vert="horz" lIns="91440" tIns="45720" rIns="91440" bIns="45720" rtlCol="0">
-            <a:normAutofit/>
-          </a:bodyPr>
-          <a:lstStyle>
-            <a:lvl1pPr marL="0" indent="0" algn="ctr" defTabSz="914400" rtl="0" eaLnBrk="1" latinLnBrk="0" hangingPunct="1">
-              <a:lnSpc>
-                <a:spcPct val="90000"/>
-              </a:lnSpc>
-              <a:spcBef>
-                <a:spcPts val="1000"/>
-              </a:spcBef>
-              <a:buFont typeface="Arial"/>
-              <a:buNone/>
-              <a:defRPr sz="2400" kern="1200">
-                <a:solidFill>
-                  <a:schemeClr val="tx1"/>
-                </a:solidFill>
-                <a:latin typeface="+mn-lt"/>
-                <a:ea typeface="+mn-ea"/>
-                <a:cs typeface="+mn-cs"/>
-              </a:defRPr>
-            </a:lvl1pPr>
-            <a:lvl2pPr marL="457200" indent="0" algn="ctr" defTabSz="914400" rtl="0" eaLnBrk="1" latinLnBrk="0" hangingPunct="1">
-              <a:lnSpc>
-                <a:spcPct val="90000"/>
-              </a:lnSpc>
-              <a:spcBef>
-                <a:spcPts val="500"/>
-              </a:spcBef>
-              <a:buFont typeface="Arial"/>
-              <a:buNone/>
-              <a:defRPr sz="2000" kern="1200">
-                <a:solidFill>
-                  <a:schemeClr val="tx1"/>
-                </a:solidFill>
-                <a:latin typeface="+mn-lt"/>
-                <a:ea typeface="+mn-ea"/>
-                <a:cs typeface="+mn-cs"/>
-              </a:defRPr>
-            </a:lvl2pPr>
-            <a:lvl3pPr marL="914400" indent="0" algn="ctr" defTabSz="914400" rtl="0" eaLnBrk="1" latinLnBrk="0" hangingPunct="1">
-              <a:lnSpc>
-                <a:spcPct val="90000"/>
-              </a:lnSpc>
-              <a:spcBef>
-                <a:spcPts val="500"/>
-              </a:spcBef>
-              <a:buFont typeface="Arial"/>
-              <a:buNone/>
-              <a:defRPr sz="1800" kern="1200">
-                <a:solidFill>
-                  <a:schemeClr val="tx1"/>
-                </a:solidFill>
-                <a:latin typeface="+mn-lt"/>
-                <a:ea typeface="+mn-ea"/>
-                <a:cs typeface="+mn-cs"/>
-              </a:defRPr>
-            </a:lvl3pPr>
-            <a:lvl4pPr marL="1371600" indent="0" algn="ctr" defTabSz="914400" rtl="0" eaLnBrk="1" latinLnBrk="0" hangingPunct="1">
-              <a:lnSpc>
-                <a:spcPct val="90000"/>
-              </a:lnSpc>
-              <a:spcBef>
-                <a:spcPts val="500"/>
-              </a:spcBef>
-              <a:buFont typeface="Arial"/>
-              <a:buNone/>
-              <a:defRPr sz="1600" kern="1200">
-                <a:solidFill>
-                  <a:schemeClr val="tx1"/>
-                </a:solidFill>
-                <a:latin typeface="+mn-lt"/>
-                <a:ea typeface="+mn-ea"/>
-                <a:cs typeface="+mn-cs"/>
-              </a:defRPr>
-            </a:lvl4pPr>
-            <a:lvl5pPr marL="1828800" indent="0" algn="ctr" defTabSz="914400" rtl="0" eaLnBrk="1" latinLnBrk="0" hangingPunct="1">
-              <a:lnSpc>
-                <a:spcPct val="90000"/>
-              </a:lnSpc>
-              <a:spcBef>
-                <a:spcPts val="500"/>
-              </a:spcBef>
-              <a:buFont typeface="Arial"/>
-              <a:buNone/>
-              <a:defRPr sz="1600" kern="1200">
-                <a:solidFill>
-                  <a:schemeClr val="tx1"/>
-                </a:solidFill>
-                <a:latin typeface="+mn-lt"/>
-                <a:ea typeface="+mn-ea"/>
-                <a:cs typeface="+mn-cs"/>
-              </a:defRPr>
-            </a:lvl5pPr>
-            <a:lvl6pPr marL="2286000" indent="0" algn="ctr" defTabSz="914400" rtl="0" eaLnBrk="1" latinLnBrk="0" hangingPunct="1">
-              <a:lnSpc>
-                <a:spcPct val="90000"/>
-              </a:lnSpc>
-              <a:spcBef>
-                <a:spcPts val="500"/>
-              </a:spcBef>
-              <a:buFont typeface="Arial"/>
-              <a:buNone/>
-              <a:defRPr sz="1600" kern="1200">
-                <a:solidFill>
-                  <a:schemeClr val="tx1"/>
-                </a:solidFill>
-                <a:latin typeface="+mn-lt"/>
-                <a:ea typeface="+mn-ea"/>
-                <a:cs typeface="+mn-cs"/>
-              </a:defRPr>
-            </a:lvl6pPr>
-            <a:lvl7pPr marL="2743200" indent="0" algn="ctr" defTabSz="914400" rtl="0" eaLnBrk="1" latinLnBrk="0" hangingPunct="1">
-              <a:lnSpc>
-                <a:spcPct val="90000"/>
-              </a:lnSpc>
-              <a:spcBef>
-                <a:spcPts val="500"/>
-              </a:spcBef>
-              <a:buFont typeface="Arial"/>
-              <a:buNone/>
-              <a:defRPr sz="1600" kern="1200">
-                <a:solidFill>
-                  <a:schemeClr val="tx1"/>
-                </a:solidFill>
-                <a:latin typeface="+mn-lt"/>
-                <a:ea typeface="+mn-ea"/>
-                <a:cs typeface="+mn-cs"/>
-              </a:defRPr>
-            </a:lvl7pPr>
-            <a:lvl8pPr marL="3200400" indent="0" algn="ctr" defTabSz="914400" rtl="0" eaLnBrk="1" latinLnBrk="0" hangingPunct="1">
-              <a:lnSpc>
-                <a:spcPct val="90000"/>
-              </a:lnSpc>
-              <a:spcBef>
-                <a:spcPts val="500"/>
-              </a:spcBef>
-              <a:buFont typeface="Arial"/>
-              <a:buNone/>
-              <a:defRPr sz="1600" kern="1200">
-                <a:solidFill>
-                  <a:schemeClr val="tx1"/>
-                </a:solidFill>
-                <a:latin typeface="+mn-lt"/>
-                <a:ea typeface="+mn-ea"/>
-                <a:cs typeface="+mn-cs"/>
-              </a:defRPr>
-            </a:lvl8pPr>
-            <a:lvl9pPr marL="3657600" indent="0" algn="ctr" defTabSz="914400" rtl="0" eaLnBrk="1" latinLnBrk="0" hangingPunct="1">
-              <a:lnSpc>
-                <a:spcPct val="90000"/>
-              </a:lnSpc>
-              <a:spcBef>
-                <a:spcPts val="500"/>
-              </a:spcBef>
-              <a:buFont typeface="Arial"/>
-              <a:buNone/>
-              <a:defRPr sz="1600" kern="1200">
-                <a:solidFill>
-                  <a:schemeClr val="tx1"/>
-                </a:solidFill>
-                <a:latin typeface="+mn-lt"/>
-                <a:ea typeface="+mn-ea"/>
-                <a:cs typeface="+mn-cs"/>
-              </a:defRPr>
-            </a:lvl9pPr>
-          </a:lstStyle>
-          <a:p>
-            <a:r>
-              <a:rPr lang="en-US" sz="3200" dirty="0"/>
-              <a:t>Slides courtesy Srinivas Narayana</a:t>
-            </a:r>
-          </a:p>
-        </p:txBody>
-      </p:sp>
       <p:pic>
         <p:nvPicPr>
           <p:cNvPr id="5" name="Picture 4">
@@ -8024,7 +7833,7 @@
         </p:blipFill>
         <p:spPr>
           <a:xfrm>
-            <a:off x="3549650" y="3991189"/>
+            <a:off x="3549650" y="4415033"/>
             <a:ext cx="5092700" cy="1070702"/>
           </a:xfrm>
           <a:prstGeom prst="rect">
@@ -12387,6 +12196,55 @@
                                         <p:tgtEl>
                                           <p:spTgt spid="3">
                                             <p:txEl>
+                                              <p:pRg st="4" end="4"/>
+                                            </p:txEl>
+                                          </p:spTgt>
+                                        </p:tgtEl>
+                                        <p:attrNameLst>
+                                          <p:attrName>style.visibility</p:attrName>
+                                        </p:attrNameLst>
+                                      </p:cBhvr>
+                                      <p:to>
+                                        <p:strVal val="visible"/>
+                                      </p:to>
+                                    </p:set>
+                                  </p:childTnLst>
+                                </p:cTn>
+                              </p:par>
+                            </p:childTnLst>
+                          </p:cTn>
+                        </p:par>
+                      </p:childTnLst>
+                    </p:cTn>
+                  </p:par>
+                  <p:par>
+                    <p:cTn id="7" fill="hold">
+                      <p:stCondLst>
+                        <p:cond delay="indefinite"/>
+                      </p:stCondLst>
+                      <p:childTnLst>
+                        <p:par>
+                          <p:cTn id="8" fill="hold">
+                            <p:stCondLst>
+                              <p:cond delay="0"/>
+                            </p:stCondLst>
+                            <p:childTnLst>
+                              <p:par>
+                                <p:cTn id="9" presetID="1" presetClass="entr" presetSubtype="0" fill="hold" nodeType="clickEffect">
+                                  <p:stCondLst>
+                                    <p:cond delay="0"/>
+                                  </p:stCondLst>
+                                  <p:childTnLst>
+                                    <p:set>
+                                      <p:cBhvr>
+                                        <p:cTn id="10" dur="1" fill="hold">
+                                          <p:stCondLst>
+                                            <p:cond delay="0"/>
+                                          </p:stCondLst>
+                                        </p:cTn>
+                                        <p:tgtEl>
+                                          <p:spTgt spid="3">
+                                            <p:txEl>
                                               <p:pRg st="6" end="6"/>
                                             </p:txEl>
                                           </p:spTgt>
@@ -12654,7 +12512,7 @@
           <a:effectLst/>
           <a:extLst>
             <a:ext uri="{909E8E84-426E-40dd-AFC4-6F175D3DCCD1}">
-              <a14:hiddenFill xmlns:a14="http://schemas.microsoft.com/office/drawing/2010/main" xmlns="">
+              <a14:hiddenFill xmlns="" xmlns:a14="http://schemas.microsoft.com/office/drawing/2010/main">
                 <a:blipFill dpi="0" rotWithShape="0">
                   <a:blip/>
                   <a:srcRect/>
@@ -12665,7 +12523,7 @@
               </a14:hiddenFill>
             </a:ext>
             <a:ext uri="{91240B29-F687-4f45-9708-019B960494DF}">
-              <a14:hiddenLine xmlns:a14="http://schemas.microsoft.com/office/drawing/2010/main" xmlns="" w="9525">
+              <a14:hiddenLine xmlns="" xmlns:a14="http://schemas.microsoft.com/office/drawing/2010/main" w="9525">
                 <a:solidFill>
                   <a:srgbClr val="000000"/>
                 </a:solidFill>
@@ -12675,7 +12533,7 @@
               </a14:hiddenLine>
             </a:ext>
             <a:ext uri="{AF507438-7753-43e0-B8FC-AC1667EBCBE1}">
-              <a14:hiddenEffects xmlns:a14="http://schemas.microsoft.com/office/drawing/2010/main" xmlns="">
+              <a14:hiddenEffects xmlns="" xmlns:a14="http://schemas.microsoft.com/office/drawing/2010/main">
                 <a:effectLst>
                   <a:outerShdw blurRad="63500" dist="38099" dir="2700000" algn="ctr" rotWithShape="0">
                     <a:srgbClr val="000000">
@@ -12724,7 +12582,7 @@
           <a:effectLst/>
           <a:extLst>
             <a:ext uri="{909E8E84-426E-40dd-AFC4-6F175D3DCCD1}">
-              <a14:hiddenFill xmlns:a14="http://schemas.microsoft.com/office/drawing/2010/main" xmlns="">
+              <a14:hiddenFill xmlns="" xmlns:a14="http://schemas.microsoft.com/office/drawing/2010/main">
                 <a:blipFill dpi="0" rotWithShape="0">
                   <a:blip/>
                   <a:srcRect/>
@@ -12735,7 +12593,7 @@
               </a14:hiddenFill>
             </a:ext>
             <a:ext uri="{91240B29-F687-4f45-9708-019B960494DF}">
-              <a14:hiddenLine xmlns:a14="http://schemas.microsoft.com/office/drawing/2010/main" xmlns="" w="9525">
+              <a14:hiddenLine xmlns="" xmlns:a14="http://schemas.microsoft.com/office/drawing/2010/main" w="9525">
                 <a:solidFill>
                   <a:srgbClr val="000000"/>
                 </a:solidFill>
@@ -12745,7 +12603,7 @@
               </a14:hiddenLine>
             </a:ext>
             <a:ext uri="{AF507438-7753-43e0-B8FC-AC1667EBCBE1}">
-              <a14:hiddenEffects xmlns:a14="http://schemas.microsoft.com/office/drawing/2010/main" xmlns="">
+              <a14:hiddenEffects xmlns="" xmlns:a14="http://schemas.microsoft.com/office/drawing/2010/main">
                 <a:effectLst>
                   <a:outerShdw blurRad="63500" dist="38099" dir="2700000" algn="ctr" rotWithShape="0">
                     <a:srgbClr val="000000">
@@ -12880,7 +12738,7 @@
             <a:effectLst/>
             <a:extLst>
               <a:ext uri="{909E8E84-426E-40dd-AFC4-6F175D3DCCD1}">
-                <a14:hiddenFill xmlns="" xmlns:a14="http://schemas.microsoft.com/office/drawing/2010/main">
+                <a14:hiddenFill xmlns:a14="http://schemas.microsoft.com/office/drawing/2010/main" xmlns="">
                   <a:blipFill dpi="0" rotWithShape="0">
                     <a:blip/>
                     <a:srcRect/>
@@ -12891,7 +12749,7 @@
                 </a14:hiddenFill>
               </a:ext>
               <a:ext uri="{91240B29-F687-4f45-9708-019B960494DF}">
-                <a14:hiddenLine xmlns="" xmlns:a14="http://schemas.microsoft.com/office/drawing/2010/main" w="9525">
+                <a14:hiddenLine xmlns:a14="http://schemas.microsoft.com/office/drawing/2010/main" xmlns="" w="9525">
                   <a:solidFill>
                     <a:srgbClr val="000000"/>
                   </a:solidFill>
@@ -12901,7 +12759,7 @@
                 </a14:hiddenLine>
               </a:ext>
               <a:ext uri="{AF507438-7753-43e0-B8FC-AC1667EBCBE1}">
-                <a14:hiddenEffects xmlns="" xmlns:a14="http://schemas.microsoft.com/office/drawing/2010/main">
+                <a14:hiddenEffects xmlns:a14="http://schemas.microsoft.com/office/drawing/2010/main" xmlns="">
                   <a:effectLst>
                     <a:outerShdw blurRad="63500" dist="38099" dir="2700000" algn="ctr" rotWithShape="0">
                       <a:srgbClr val="000000">
@@ -12950,7 +12808,7 @@
             <a:effectLst/>
             <a:extLst>
               <a:ext uri="{909E8E84-426E-40dd-AFC4-6F175D3DCCD1}">
-                <a14:hiddenFill xmlns="" xmlns:a14="http://schemas.microsoft.com/office/drawing/2010/main">
+                <a14:hiddenFill xmlns:a14="http://schemas.microsoft.com/office/drawing/2010/main" xmlns="">
                   <a:blipFill dpi="0" rotWithShape="0">
                     <a:blip/>
                     <a:srcRect/>
@@ -12961,7 +12819,7 @@
                 </a14:hiddenFill>
               </a:ext>
               <a:ext uri="{91240B29-F687-4f45-9708-019B960494DF}">
-                <a14:hiddenLine xmlns="" xmlns:a14="http://schemas.microsoft.com/office/drawing/2010/main" w="9525">
+                <a14:hiddenLine xmlns:a14="http://schemas.microsoft.com/office/drawing/2010/main" xmlns="" w="9525">
                   <a:solidFill>
                     <a:srgbClr val="000000"/>
                   </a:solidFill>
@@ -12971,7 +12829,7 @@
                 </a14:hiddenLine>
               </a:ext>
               <a:ext uri="{AF507438-7753-43e0-B8FC-AC1667EBCBE1}">
-                <a14:hiddenEffects xmlns="" xmlns:a14="http://schemas.microsoft.com/office/drawing/2010/main">
+                <a14:hiddenEffects xmlns:a14="http://schemas.microsoft.com/office/drawing/2010/main" xmlns="">
                   <a:effectLst>
                     <a:outerShdw blurRad="63500" dist="38099" dir="2700000" algn="ctr" rotWithShape="0">
                       <a:srgbClr val="000000">
@@ -13020,7 +12878,7 @@
             <a:effectLst/>
             <a:extLst>
               <a:ext uri="{909E8E84-426E-40dd-AFC4-6F175D3DCCD1}">
-                <a14:hiddenFill xmlns="" xmlns:a14="http://schemas.microsoft.com/office/drawing/2010/main">
+                <a14:hiddenFill xmlns:a14="http://schemas.microsoft.com/office/drawing/2010/main" xmlns="">
                   <a:blipFill dpi="0" rotWithShape="0">
                     <a:blip/>
                     <a:srcRect/>
@@ -13031,7 +12889,7 @@
                 </a14:hiddenFill>
               </a:ext>
               <a:ext uri="{91240B29-F687-4f45-9708-019B960494DF}">
-                <a14:hiddenLine xmlns="" xmlns:a14="http://schemas.microsoft.com/office/drawing/2010/main" w="9525">
+                <a14:hiddenLine xmlns:a14="http://schemas.microsoft.com/office/drawing/2010/main" xmlns="" w="9525">
                   <a:solidFill>
                     <a:srgbClr val="000000"/>
                   </a:solidFill>
@@ -13041,7 +12899,7 @@
                 </a14:hiddenLine>
               </a:ext>
               <a:ext uri="{AF507438-7753-43e0-B8FC-AC1667EBCBE1}">
-                <a14:hiddenEffects xmlns="" xmlns:a14="http://schemas.microsoft.com/office/drawing/2010/main">
+                <a14:hiddenEffects xmlns:a14="http://schemas.microsoft.com/office/drawing/2010/main" xmlns="">
                   <a:effectLst>
                     <a:outerShdw blurRad="63500" dist="38099" dir="2700000" algn="ctr" rotWithShape="0">
                       <a:srgbClr val="000000">
@@ -13082,12 +12940,12 @@
             <a:effectLst/>
             <a:extLst>
               <a:ext uri="{909E8E84-426E-40dd-AFC4-6F175D3DCCD1}">
-                <a14:hiddenFill xmlns="" xmlns:a14="http://schemas.microsoft.com/office/drawing/2010/main">
+                <a14:hiddenFill xmlns:a14="http://schemas.microsoft.com/office/drawing/2010/main" xmlns="">
                   <a:noFill/>
                 </a14:hiddenFill>
               </a:ext>
               <a:ext uri="{AF507438-7753-43e0-B8FC-AC1667EBCBE1}">
-                <a14:hiddenEffects xmlns="" xmlns:a14="http://schemas.microsoft.com/office/drawing/2010/main">
+                <a14:hiddenEffects xmlns:a14="http://schemas.microsoft.com/office/drawing/2010/main" xmlns="">
                   <a:effectLst>
                     <a:outerShdw blurRad="63500" dist="38099" dir="2700000" algn="ctr" rotWithShape="0">
                       <a:srgbClr val="000000">
@@ -13140,12 +12998,12 @@
             <a:effectLst/>
             <a:extLst>
               <a:ext uri="{909E8E84-426E-40dd-AFC4-6F175D3DCCD1}">
-                <a14:hiddenFill xmlns="" xmlns:a14="http://schemas.microsoft.com/office/drawing/2010/main">
+                <a14:hiddenFill xmlns:a14="http://schemas.microsoft.com/office/drawing/2010/main" xmlns="">
                   <a:noFill/>
                 </a14:hiddenFill>
               </a:ext>
               <a:ext uri="{AF507438-7753-43e0-B8FC-AC1667EBCBE1}">
-                <a14:hiddenEffects xmlns="" xmlns:a14="http://schemas.microsoft.com/office/drawing/2010/main">
+                <a14:hiddenEffects xmlns:a14="http://schemas.microsoft.com/office/drawing/2010/main" xmlns="">
                   <a:effectLst>
                     <a:outerShdw blurRad="63500" dist="38099" dir="2700000" algn="ctr" rotWithShape="0">
                       <a:srgbClr val="000000">
@@ -13198,12 +13056,12 @@
             <a:effectLst/>
             <a:extLst>
               <a:ext uri="{909E8E84-426E-40dd-AFC4-6F175D3DCCD1}">
-                <a14:hiddenFill xmlns="" xmlns:a14="http://schemas.microsoft.com/office/drawing/2010/main">
+                <a14:hiddenFill xmlns:a14="http://schemas.microsoft.com/office/drawing/2010/main" xmlns="">
                   <a:noFill/>
                 </a14:hiddenFill>
               </a:ext>
               <a:ext uri="{AF507438-7753-43e0-B8FC-AC1667EBCBE1}">
-                <a14:hiddenEffects xmlns="" xmlns:a14="http://schemas.microsoft.com/office/drawing/2010/main">
+                <a14:hiddenEffects xmlns:a14="http://schemas.microsoft.com/office/drawing/2010/main" xmlns="">
                   <a:effectLst>
                     <a:outerShdw blurRad="63500" dist="38099" dir="2700000" algn="ctr" rotWithShape="0">
                       <a:srgbClr val="000000">
@@ -13256,12 +13114,12 @@
             <a:effectLst/>
             <a:extLst>
               <a:ext uri="{909E8E84-426E-40dd-AFC4-6F175D3DCCD1}">
-                <a14:hiddenFill xmlns="" xmlns:a14="http://schemas.microsoft.com/office/drawing/2010/main">
+                <a14:hiddenFill xmlns:a14="http://schemas.microsoft.com/office/drawing/2010/main" xmlns="">
                   <a:noFill/>
                 </a14:hiddenFill>
               </a:ext>
               <a:ext uri="{AF507438-7753-43e0-B8FC-AC1667EBCBE1}">
-                <a14:hiddenEffects xmlns="" xmlns:a14="http://schemas.microsoft.com/office/drawing/2010/main">
+                <a14:hiddenEffects xmlns:a14="http://schemas.microsoft.com/office/drawing/2010/main" xmlns="">
                   <a:effectLst>
                     <a:outerShdw blurRad="63500" dist="38099" dir="2700000" algn="ctr" rotWithShape="0">
                       <a:srgbClr val="000000">
@@ -13314,12 +13172,12 @@
             <a:effectLst/>
             <a:extLst>
               <a:ext uri="{909E8E84-426E-40dd-AFC4-6F175D3DCCD1}">
-                <a14:hiddenFill xmlns="" xmlns:a14="http://schemas.microsoft.com/office/drawing/2010/main">
+                <a14:hiddenFill xmlns:a14="http://schemas.microsoft.com/office/drawing/2010/main" xmlns="">
                   <a:noFill/>
                 </a14:hiddenFill>
               </a:ext>
               <a:ext uri="{AF507438-7753-43e0-B8FC-AC1667EBCBE1}">
-                <a14:hiddenEffects xmlns="" xmlns:a14="http://schemas.microsoft.com/office/drawing/2010/main">
+                <a14:hiddenEffects xmlns:a14="http://schemas.microsoft.com/office/drawing/2010/main" xmlns="">
                   <a:effectLst>
                     <a:outerShdw blurRad="63500" dist="38099" dir="2700000" algn="ctr" rotWithShape="0">
                       <a:srgbClr val="000000">
@@ -13372,12 +13230,12 @@
             <a:effectLst/>
             <a:extLst>
               <a:ext uri="{909E8E84-426E-40dd-AFC4-6F175D3DCCD1}">
-                <a14:hiddenFill xmlns="" xmlns:a14="http://schemas.microsoft.com/office/drawing/2010/main">
+                <a14:hiddenFill xmlns:a14="http://schemas.microsoft.com/office/drawing/2010/main" xmlns="">
                   <a:noFill/>
                 </a14:hiddenFill>
               </a:ext>
               <a:ext uri="{AF507438-7753-43e0-B8FC-AC1667EBCBE1}">
-                <a14:hiddenEffects xmlns="" xmlns:a14="http://schemas.microsoft.com/office/drawing/2010/main">
+                <a14:hiddenEffects xmlns:a14="http://schemas.microsoft.com/office/drawing/2010/main" xmlns="">
                   <a:effectLst>
                     <a:outerShdw blurRad="63500" dist="38099" dir="2700000" algn="ctr" rotWithShape="0">
                       <a:srgbClr val="000000">
@@ -13430,12 +13288,12 @@
             <a:effectLst/>
             <a:extLst>
               <a:ext uri="{909E8E84-426E-40dd-AFC4-6F175D3DCCD1}">
-                <a14:hiddenFill xmlns="" xmlns:a14="http://schemas.microsoft.com/office/drawing/2010/main">
+                <a14:hiddenFill xmlns:a14="http://schemas.microsoft.com/office/drawing/2010/main" xmlns="">
                   <a:noFill/>
                 </a14:hiddenFill>
               </a:ext>
               <a:ext uri="{AF507438-7753-43e0-B8FC-AC1667EBCBE1}">
-                <a14:hiddenEffects xmlns="" xmlns:a14="http://schemas.microsoft.com/office/drawing/2010/main">
+                <a14:hiddenEffects xmlns:a14="http://schemas.microsoft.com/office/drawing/2010/main" xmlns="">
                   <a:effectLst>
                     <a:outerShdw blurRad="63500" dist="38099" dir="2700000" algn="ctr" rotWithShape="0">
                       <a:srgbClr val="000000">
@@ -13488,12 +13346,12 @@
             <a:effectLst/>
             <a:extLst>
               <a:ext uri="{909E8E84-426E-40dd-AFC4-6F175D3DCCD1}">
-                <a14:hiddenFill xmlns="" xmlns:a14="http://schemas.microsoft.com/office/drawing/2010/main">
+                <a14:hiddenFill xmlns:a14="http://schemas.microsoft.com/office/drawing/2010/main" xmlns="">
                   <a:noFill/>
                 </a14:hiddenFill>
               </a:ext>
               <a:ext uri="{AF507438-7753-43e0-B8FC-AC1667EBCBE1}">
-                <a14:hiddenEffects xmlns="" xmlns:a14="http://schemas.microsoft.com/office/drawing/2010/main">
+                <a14:hiddenEffects xmlns:a14="http://schemas.microsoft.com/office/drawing/2010/main" xmlns="">
                   <a:effectLst>
                     <a:outerShdw blurRad="63500" dist="38099" dir="2700000" algn="ctr" rotWithShape="0">
                       <a:srgbClr val="000000">
@@ -13546,12 +13404,12 @@
             <a:effectLst/>
             <a:extLst>
               <a:ext uri="{909E8E84-426E-40dd-AFC4-6F175D3DCCD1}">
-                <a14:hiddenFill xmlns="" xmlns:a14="http://schemas.microsoft.com/office/drawing/2010/main">
+                <a14:hiddenFill xmlns:a14="http://schemas.microsoft.com/office/drawing/2010/main" xmlns="">
                   <a:noFill/>
                 </a14:hiddenFill>
               </a:ext>
               <a:ext uri="{AF507438-7753-43e0-B8FC-AC1667EBCBE1}">
-                <a14:hiddenEffects xmlns="" xmlns:a14="http://schemas.microsoft.com/office/drawing/2010/main">
+                <a14:hiddenEffects xmlns:a14="http://schemas.microsoft.com/office/drawing/2010/main" xmlns="">
                   <a:effectLst>
                     <a:outerShdw blurRad="63500" dist="38099" dir="2700000" algn="ctr" rotWithShape="0">
                       <a:srgbClr val="000000">
@@ -13604,12 +13462,12 @@
             <a:effectLst/>
             <a:extLst>
               <a:ext uri="{909E8E84-426E-40dd-AFC4-6F175D3DCCD1}">
-                <a14:hiddenFill xmlns="" xmlns:a14="http://schemas.microsoft.com/office/drawing/2010/main">
+                <a14:hiddenFill xmlns:a14="http://schemas.microsoft.com/office/drawing/2010/main" xmlns="">
                   <a:noFill/>
                 </a14:hiddenFill>
               </a:ext>
               <a:ext uri="{AF507438-7753-43e0-B8FC-AC1667EBCBE1}">
-                <a14:hiddenEffects xmlns="" xmlns:a14="http://schemas.microsoft.com/office/drawing/2010/main">
+                <a14:hiddenEffects xmlns:a14="http://schemas.microsoft.com/office/drawing/2010/main" xmlns="">
                   <a:effectLst>
                     <a:outerShdw blurRad="63500" dist="38099" dir="2700000" algn="ctr" rotWithShape="0">
                       <a:srgbClr val="000000">
@@ -13670,7 +13528,7 @@
             <a:effectLst/>
             <a:extLst>
               <a:ext uri="{909E8E84-426E-40dd-AFC4-6F175D3DCCD1}">
-                <a14:hiddenFill xmlns="" xmlns:a14="http://schemas.microsoft.com/office/drawing/2010/main">
+                <a14:hiddenFill xmlns:a14="http://schemas.microsoft.com/office/drawing/2010/main" xmlns="">
                   <a:blipFill dpi="0" rotWithShape="0">
                     <a:blip/>
                     <a:srcRect/>
@@ -13681,7 +13539,7 @@
                 </a14:hiddenFill>
               </a:ext>
               <a:ext uri="{91240B29-F687-4f45-9708-019B960494DF}">
-                <a14:hiddenLine xmlns="" xmlns:a14="http://schemas.microsoft.com/office/drawing/2010/main" w="9525">
+                <a14:hiddenLine xmlns:a14="http://schemas.microsoft.com/office/drawing/2010/main" xmlns="" w="9525">
                   <a:solidFill>
                     <a:srgbClr val="000000"/>
                   </a:solidFill>
@@ -13691,7 +13549,7 @@
                 </a14:hiddenLine>
               </a:ext>
               <a:ext uri="{AF507438-7753-43e0-B8FC-AC1667EBCBE1}">
-                <a14:hiddenEffects xmlns="" xmlns:a14="http://schemas.microsoft.com/office/drawing/2010/main">
+                <a14:hiddenEffects xmlns:a14="http://schemas.microsoft.com/office/drawing/2010/main" xmlns="">
                   <a:effectLst>
                     <a:outerShdw blurRad="63500" dist="38099" dir="2700000" algn="ctr" rotWithShape="0">
                       <a:srgbClr val="000000">
@@ -13740,7 +13598,7 @@
             <a:effectLst/>
             <a:extLst>
               <a:ext uri="{909E8E84-426E-40dd-AFC4-6F175D3DCCD1}">
-                <a14:hiddenFill xmlns="" xmlns:a14="http://schemas.microsoft.com/office/drawing/2010/main">
+                <a14:hiddenFill xmlns:a14="http://schemas.microsoft.com/office/drawing/2010/main" xmlns="">
                   <a:blipFill dpi="0" rotWithShape="0">
                     <a:blip/>
                     <a:srcRect/>
@@ -13751,7 +13609,7 @@
                 </a14:hiddenFill>
               </a:ext>
               <a:ext uri="{91240B29-F687-4f45-9708-019B960494DF}">
-                <a14:hiddenLine xmlns="" xmlns:a14="http://schemas.microsoft.com/office/drawing/2010/main" w="9525">
+                <a14:hiddenLine xmlns:a14="http://schemas.microsoft.com/office/drawing/2010/main" xmlns="" w="9525">
                   <a:solidFill>
                     <a:srgbClr val="000000"/>
                   </a:solidFill>
@@ -13761,7 +13619,7 @@
                 </a14:hiddenLine>
               </a:ext>
               <a:ext uri="{AF507438-7753-43e0-B8FC-AC1667EBCBE1}">
-                <a14:hiddenEffects xmlns="" xmlns:a14="http://schemas.microsoft.com/office/drawing/2010/main">
+                <a14:hiddenEffects xmlns:a14="http://schemas.microsoft.com/office/drawing/2010/main" xmlns="">
                   <a:effectLst>
                     <a:outerShdw blurRad="63500" dist="38099" dir="2700000" algn="ctr" rotWithShape="0">
                       <a:srgbClr val="000000">
@@ -13810,7 +13668,7 @@
             <a:effectLst/>
             <a:extLst>
               <a:ext uri="{909E8E84-426E-40dd-AFC4-6F175D3DCCD1}">
-                <a14:hiddenFill xmlns="" xmlns:a14="http://schemas.microsoft.com/office/drawing/2010/main">
+                <a14:hiddenFill xmlns:a14="http://schemas.microsoft.com/office/drawing/2010/main" xmlns="">
                   <a:blipFill dpi="0" rotWithShape="0">
                     <a:blip/>
                     <a:srcRect/>
@@ -13821,7 +13679,7 @@
                 </a14:hiddenFill>
               </a:ext>
               <a:ext uri="{91240B29-F687-4f45-9708-019B960494DF}">
-                <a14:hiddenLine xmlns="" xmlns:a14="http://schemas.microsoft.com/office/drawing/2010/main" w="9525">
+                <a14:hiddenLine xmlns:a14="http://schemas.microsoft.com/office/drawing/2010/main" xmlns="" w="9525">
                   <a:solidFill>
                     <a:srgbClr val="000000"/>
                   </a:solidFill>
@@ -13831,7 +13689,7 @@
                 </a14:hiddenLine>
               </a:ext>
               <a:ext uri="{AF507438-7753-43e0-B8FC-AC1667EBCBE1}">
-                <a14:hiddenEffects xmlns="" xmlns:a14="http://schemas.microsoft.com/office/drawing/2010/main">
+                <a14:hiddenEffects xmlns:a14="http://schemas.microsoft.com/office/drawing/2010/main" xmlns="">
                   <a:effectLst>
                     <a:outerShdw blurRad="63500" dist="38099" dir="2700000" algn="ctr" rotWithShape="0">
                       <a:srgbClr val="000000">
@@ -13880,7 +13738,7 @@
             <a:effectLst/>
             <a:extLst>
               <a:ext uri="{909E8E84-426E-40dd-AFC4-6F175D3DCCD1}">
-                <a14:hiddenFill xmlns="" xmlns:a14="http://schemas.microsoft.com/office/drawing/2010/main">
+                <a14:hiddenFill xmlns:a14="http://schemas.microsoft.com/office/drawing/2010/main" xmlns="">
                   <a:blipFill dpi="0" rotWithShape="0">
                     <a:blip/>
                     <a:srcRect/>
@@ -13891,7 +13749,7 @@
                 </a14:hiddenFill>
               </a:ext>
               <a:ext uri="{91240B29-F687-4f45-9708-019B960494DF}">
-                <a14:hiddenLine xmlns="" xmlns:a14="http://schemas.microsoft.com/office/drawing/2010/main" w="9525">
+                <a14:hiddenLine xmlns:a14="http://schemas.microsoft.com/office/drawing/2010/main" xmlns="" w="9525">
                   <a:solidFill>
                     <a:srgbClr val="000000"/>
                   </a:solidFill>
@@ -13901,7 +13759,7 @@
                 </a14:hiddenLine>
               </a:ext>
               <a:ext uri="{AF507438-7753-43e0-B8FC-AC1667EBCBE1}">
-                <a14:hiddenEffects xmlns="" xmlns:a14="http://schemas.microsoft.com/office/drawing/2010/main">
+                <a14:hiddenEffects xmlns:a14="http://schemas.microsoft.com/office/drawing/2010/main" xmlns="">
                   <a:effectLst>
                     <a:outerShdw blurRad="63500" dist="38099" dir="2700000" algn="ctr" rotWithShape="0">
                       <a:srgbClr val="000000">
@@ -13950,7 +13808,7 @@
             <a:effectLst/>
             <a:extLst>
               <a:ext uri="{909E8E84-426E-40dd-AFC4-6F175D3DCCD1}">
-                <a14:hiddenFill xmlns="" xmlns:a14="http://schemas.microsoft.com/office/drawing/2010/main">
+                <a14:hiddenFill xmlns:a14="http://schemas.microsoft.com/office/drawing/2010/main" xmlns="">
                   <a:blipFill dpi="0" rotWithShape="0">
                     <a:blip/>
                     <a:srcRect/>
@@ -13961,7 +13819,7 @@
                 </a14:hiddenFill>
               </a:ext>
               <a:ext uri="{91240B29-F687-4f45-9708-019B960494DF}">
-                <a14:hiddenLine xmlns="" xmlns:a14="http://schemas.microsoft.com/office/drawing/2010/main" w="9525">
+                <a14:hiddenLine xmlns:a14="http://schemas.microsoft.com/office/drawing/2010/main" xmlns="" w="9525">
                   <a:solidFill>
                     <a:srgbClr val="000000"/>
                   </a:solidFill>
@@ -13971,7 +13829,7 @@
                 </a14:hiddenLine>
               </a:ext>
               <a:ext uri="{AF507438-7753-43e0-B8FC-AC1667EBCBE1}">
-                <a14:hiddenEffects xmlns="" xmlns:a14="http://schemas.microsoft.com/office/drawing/2010/main">
+                <a14:hiddenEffects xmlns:a14="http://schemas.microsoft.com/office/drawing/2010/main" xmlns="">
                   <a:effectLst>
                     <a:outerShdw blurRad="63500" dist="38099" dir="2700000" algn="ctr" rotWithShape="0">
                       <a:srgbClr val="000000">
@@ -14012,12 +13870,12 @@
             <a:effectLst/>
             <a:extLst>
               <a:ext uri="{909E8E84-426E-40dd-AFC4-6F175D3DCCD1}">
-                <a14:hiddenFill xmlns="" xmlns:a14="http://schemas.microsoft.com/office/drawing/2010/main">
+                <a14:hiddenFill xmlns:a14="http://schemas.microsoft.com/office/drawing/2010/main" xmlns="">
                   <a:noFill/>
                 </a14:hiddenFill>
               </a:ext>
               <a:ext uri="{AF507438-7753-43e0-B8FC-AC1667EBCBE1}">
-                <a14:hiddenEffects xmlns="" xmlns:a14="http://schemas.microsoft.com/office/drawing/2010/main">
+                <a14:hiddenEffects xmlns:a14="http://schemas.microsoft.com/office/drawing/2010/main" xmlns="">
                   <a:effectLst>
                     <a:outerShdw blurRad="63500" dist="38099" dir="2700000" algn="ctr" rotWithShape="0">
                       <a:srgbClr val="000000">
@@ -14070,12 +13928,12 @@
             <a:effectLst/>
             <a:extLst>
               <a:ext uri="{909E8E84-426E-40dd-AFC4-6F175D3DCCD1}">
-                <a14:hiddenFill xmlns="" xmlns:a14="http://schemas.microsoft.com/office/drawing/2010/main">
+                <a14:hiddenFill xmlns:a14="http://schemas.microsoft.com/office/drawing/2010/main" xmlns="">
                   <a:noFill/>
                 </a14:hiddenFill>
               </a:ext>
               <a:ext uri="{AF507438-7753-43e0-B8FC-AC1667EBCBE1}">
-                <a14:hiddenEffects xmlns="" xmlns:a14="http://schemas.microsoft.com/office/drawing/2010/main">
+                <a14:hiddenEffects xmlns:a14="http://schemas.microsoft.com/office/drawing/2010/main" xmlns="">
                   <a:effectLst>
                     <a:outerShdw blurRad="63500" dist="38099" dir="2700000" algn="ctr" rotWithShape="0">
                       <a:srgbClr val="000000">
@@ -14136,7 +13994,7 @@
             <a:effectLst/>
             <a:extLst>
               <a:ext uri="{909E8E84-426E-40dd-AFC4-6F175D3DCCD1}">
-                <a14:hiddenFill xmlns="" xmlns:a14="http://schemas.microsoft.com/office/drawing/2010/main">
+                <a14:hiddenFill xmlns:a14="http://schemas.microsoft.com/office/drawing/2010/main" xmlns="">
                   <a:blipFill dpi="0" rotWithShape="0">
                     <a:blip/>
                     <a:srcRect/>
@@ -14147,7 +14005,7 @@
                 </a14:hiddenFill>
               </a:ext>
               <a:ext uri="{91240B29-F687-4f45-9708-019B960494DF}">
-                <a14:hiddenLine xmlns="" xmlns:a14="http://schemas.microsoft.com/office/drawing/2010/main" w="9525">
+                <a14:hiddenLine xmlns:a14="http://schemas.microsoft.com/office/drawing/2010/main" xmlns="" w="9525">
                   <a:solidFill>
                     <a:srgbClr val="000000"/>
                   </a:solidFill>
@@ -14157,7 +14015,7 @@
                 </a14:hiddenLine>
               </a:ext>
               <a:ext uri="{AF507438-7753-43e0-B8FC-AC1667EBCBE1}">
-                <a14:hiddenEffects xmlns="" xmlns:a14="http://schemas.microsoft.com/office/drawing/2010/main">
+                <a14:hiddenEffects xmlns:a14="http://schemas.microsoft.com/office/drawing/2010/main" xmlns="">
                   <a:effectLst>
                     <a:outerShdw blurRad="63500" dist="38099" dir="2700000" algn="ctr" rotWithShape="0">
                       <a:srgbClr val="000000">
@@ -14290,7 +14148,7 @@
           <a:effectLst/>
           <a:extLst>
             <a:ext uri="{909E8E84-426E-40dd-AFC4-6F175D3DCCD1}">
-              <a14:hiddenFill xmlns:a14="http://schemas.microsoft.com/office/drawing/2010/main" xmlns="">
+              <a14:hiddenFill xmlns="" xmlns:a14="http://schemas.microsoft.com/office/drawing/2010/main">
                 <a:blipFill dpi="0" rotWithShape="0">
                   <a:blip/>
                   <a:srcRect/>
@@ -14301,7 +14159,7 @@
               </a14:hiddenFill>
             </a:ext>
             <a:ext uri="{91240B29-F687-4f45-9708-019B960494DF}">
-              <a14:hiddenLine xmlns:a14="http://schemas.microsoft.com/office/drawing/2010/main" xmlns="" w="9525">
+              <a14:hiddenLine xmlns="" xmlns:a14="http://schemas.microsoft.com/office/drawing/2010/main" w="9525">
                 <a:solidFill>
                   <a:srgbClr val="000000"/>
                 </a:solidFill>
@@ -14311,7 +14169,7 @@
               </a14:hiddenLine>
             </a:ext>
             <a:ext uri="{AF507438-7753-43e0-B8FC-AC1667EBCBE1}">
-              <a14:hiddenEffects xmlns:a14="http://schemas.microsoft.com/office/drawing/2010/main" xmlns="">
+              <a14:hiddenEffects xmlns="" xmlns:a14="http://schemas.microsoft.com/office/drawing/2010/main">
                 <a:effectLst>
                   <a:outerShdw blurRad="63500" dist="38099" dir="2700000" algn="ctr" rotWithShape="0">
                     <a:srgbClr val="000000">
@@ -14396,7 +14254,7 @@
           <a:effectLst/>
           <a:extLst>
             <a:ext uri="{909E8E84-426E-40dd-AFC4-6F175D3DCCD1}">
-              <a14:hiddenFill xmlns:a14="http://schemas.microsoft.com/office/drawing/2010/main" xmlns="">
+              <a14:hiddenFill xmlns="" xmlns:a14="http://schemas.microsoft.com/office/drawing/2010/main">
                 <a:blipFill dpi="0" rotWithShape="0">
                   <a:blip/>
                   <a:srcRect/>
@@ -14407,7 +14265,7 @@
               </a14:hiddenFill>
             </a:ext>
             <a:ext uri="{91240B29-F687-4f45-9708-019B960494DF}">
-              <a14:hiddenLine xmlns:a14="http://schemas.microsoft.com/office/drawing/2010/main" xmlns="" w="9525">
+              <a14:hiddenLine xmlns="" xmlns:a14="http://schemas.microsoft.com/office/drawing/2010/main" w="9525">
                 <a:solidFill>
                   <a:srgbClr val="000000"/>
                 </a:solidFill>
@@ -14417,7 +14275,7 @@
               </a14:hiddenLine>
             </a:ext>
             <a:ext uri="{AF507438-7753-43e0-B8FC-AC1667EBCBE1}">
-              <a14:hiddenEffects xmlns:a14="http://schemas.microsoft.com/office/drawing/2010/main" xmlns="">
+              <a14:hiddenEffects xmlns="" xmlns:a14="http://schemas.microsoft.com/office/drawing/2010/main">
                 <a:effectLst>
                   <a:outerShdw blurRad="63500" dist="38099" dir="2700000" algn="ctr" rotWithShape="0">
                     <a:srgbClr val="000000">
@@ -14502,7 +14360,7 @@
           <a:effectLst/>
           <a:extLst>
             <a:ext uri="{909E8E84-426E-40dd-AFC4-6F175D3DCCD1}">
-              <a14:hiddenFill xmlns:a14="http://schemas.microsoft.com/office/drawing/2010/main" xmlns="">
+              <a14:hiddenFill xmlns="" xmlns:a14="http://schemas.microsoft.com/office/drawing/2010/main">
                 <a:blipFill dpi="0" rotWithShape="0">
                   <a:blip/>
                   <a:srcRect/>
@@ -14513,7 +14371,7 @@
               </a14:hiddenFill>
             </a:ext>
             <a:ext uri="{91240B29-F687-4f45-9708-019B960494DF}">
-              <a14:hiddenLine xmlns:a14="http://schemas.microsoft.com/office/drawing/2010/main" xmlns="" w="9525">
+              <a14:hiddenLine xmlns="" xmlns:a14="http://schemas.microsoft.com/office/drawing/2010/main" w="9525">
                 <a:solidFill>
                   <a:srgbClr val="000000"/>
                 </a:solidFill>
@@ -14523,7 +14381,7 @@
               </a14:hiddenLine>
             </a:ext>
             <a:ext uri="{AF507438-7753-43e0-B8FC-AC1667EBCBE1}">
-              <a14:hiddenEffects xmlns:a14="http://schemas.microsoft.com/office/drawing/2010/main" xmlns="">
+              <a14:hiddenEffects xmlns="" xmlns:a14="http://schemas.microsoft.com/office/drawing/2010/main">
                 <a:effectLst>
                   <a:outerShdw blurRad="63500" dist="38099" dir="2700000" algn="ctr" rotWithShape="0">
                     <a:srgbClr val="000000">
@@ -14703,7 +14561,7 @@
           <a:effectLst/>
           <a:extLst>
             <a:ext uri="{909E8E84-426E-40dd-AFC4-6F175D3DCCD1}">
-              <a14:hiddenFill xmlns:a14="http://schemas.microsoft.com/office/drawing/2010/main" xmlns="">
+              <a14:hiddenFill xmlns="" xmlns:a14="http://schemas.microsoft.com/office/drawing/2010/main">
                 <a:blipFill dpi="0" rotWithShape="0">
                   <a:blip/>
                   <a:srcRect/>
@@ -14714,7 +14572,7 @@
               </a14:hiddenFill>
             </a:ext>
             <a:ext uri="{91240B29-F687-4f45-9708-019B960494DF}">
-              <a14:hiddenLine xmlns:a14="http://schemas.microsoft.com/office/drawing/2010/main" xmlns="" w="9525">
+              <a14:hiddenLine xmlns="" xmlns:a14="http://schemas.microsoft.com/office/drawing/2010/main" w="9525">
                 <a:solidFill>
                   <a:srgbClr val="000000"/>
                 </a:solidFill>
@@ -14724,7 +14582,7 @@
               </a14:hiddenLine>
             </a:ext>
             <a:ext uri="{AF507438-7753-43e0-B8FC-AC1667EBCBE1}">
-              <a14:hiddenEffects xmlns:a14="http://schemas.microsoft.com/office/drawing/2010/main" xmlns="">
+              <a14:hiddenEffects xmlns="" xmlns:a14="http://schemas.microsoft.com/office/drawing/2010/main">
                 <a:effectLst>
                   <a:outerShdw blurRad="63500" dist="38099" dir="2700000" algn="ctr" rotWithShape="0">
                     <a:srgbClr val="000000">
@@ -14802,7 +14660,7 @@
           <a:effectLst/>
           <a:extLst>
             <a:ext uri="{909E8E84-426E-40dd-AFC4-6F175D3DCCD1}">
-              <a14:hiddenFill xmlns:a14="http://schemas.microsoft.com/office/drawing/2010/main" xmlns="">
+              <a14:hiddenFill xmlns="" xmlns:a14="http://schemas.microsoft.com/office/drawing/2010/main">
                 <a:blipFill dpi="0" rotWithShape="0">
                   <a:blip/>
                   <a:srcRect/>
@@ -14813,7 +14671,7 @@
               </a14:hiddenFill>
             </a:ext>
             <a:ext uri="{91240B29-F687-4f45-9708-019B960494DF}">
-              <a14:hiddenLine xmlns:a14="http://schemas.microsoft.com/office/drawing/2010/main" xmlns="" w="9525">
+              <a14:hiddenLine xmlns="" xmlns:a14="http://schemas.microsoft.com/office/drawing/2010/main" w="9525">
                 <a:solidFill>
                   <a:srgbClr val="000000"/>
                 </a:solidFill>
@@ -14823,7 +14681,7 @@
               </a14:hiddenLine>
             </a:ext>
             <a:ext uri="{AF507438-7753-43e0-B8FC-AC1667EBCBE1}">
-              <a14:hiddenEffects xmlns:a14="http://schemas.microsoft.com/office/drawing/2010/main" xmlns="">
+              <a14:hiddenEffects xmlns="" xmlns:a14="http://schemas.microsoft.com/office/drawing/2010/main">
                 <a:effectLst>
                   <a:outerShdw blurRad="63500" dist="38099" dir="2700000" algn="ctr" rotWithShape="0">
                     <a:srgbClr val="000000">
@@ -14867,105 +14725,6 @@
       </p:sp>
       <p:pic>
         <p:nvPicPr>
-          <p:cNvPr id="61" name="Picture 162"/>
-          <p:cNvPicPr>
-            <a:picLocks noChangeAspect="1" noChangeArrowheads="1"/>
-          </p:cNvPicPr>
-          <p:nvPr/>
-        </p:nvPicPr>
-        <p:blipFill>
-          <a:blip r:embed="rId6">
-            <a:extLst>
-              <a:ext uri="{28A0092B-C50C-407E-A947-70E740481C1C}">
-                <a14:useLocalDpi xmlns:a14="http://schemas.microsoft.com/office/drawing/2010/main" val="0"/>
-              </a:ext>
-            </a:extLst>
-          </a:blip>
-          <a:srcRect/>
-          <a:stretch>
-            <a:fillRect/>
-          </a:stretch>
-        </p:blipFill>
-        <p:spPr bwMode="auto">
-          <a:xfrm>
-            <a:off x="8462299" y="3490858"/>
-            <a:ext cx="322326" cy="322326"/>
-          </a:xfrm>
-          <a:prstGeom prst="rect">
-            <a:avLst/>
-          </a:prstGeom>
-          <a:noFill/>
-          <a:ln>
-            <a:noFill/>
-          </a:ln>
-          <a:effectLst/>
-          <a:extLst>
-            <a:ext uri="{909E8E84-426E-40dd-AFC4-6F175D3DCCD1}">
-              <a14:hiddenFill xmlns:a14="http://schemas.microsoft.com/office/drawing/2010/main" xmlns="">
-                <a:blipFill dpi="0" rotWithShape="0">
-                  <a:blip/>
-                  <a:srcRect/>
-                  <a:stretch>
-                    <a:fillRect/>
-                  </a:stretch>
-                </a:blipFill>
-              </a14:hiddenFill>
-            </a:ext>
-            <a:ext uri="{91240B29-F687-4f45-9708-019B960494DF}">
-              <a14:hiddenLine xmlns:a14="http://schemas.microsoft.com/office/drawing/2010/main" xmlns="" w="9525">
-                <a:solidFill>
-                  <a:srgbClr val="000000"/>
-                </a:solidFill>
-                <a:round/>
-                <a:headEnd/>
-                <a:tailEnd/>
-              </a14:hiddenLine>
-            </a:ext>
-            <a:ext uri="{AF507438-7753-43e0-B8FC-AC1667EBCBE1}">
-              <a14:hiddenEffects xmlns:a14="http://schemas.microsoft.com/office/drawing/2010/main" xmlns="">
-                <a:effectLst>
-                  <a:outerShdw blurRad="63500" dist="38099" dir="2700000" algn="ctr" rotWithShape="0">
-                    <a:srgbClr val="000000">
-                      <a:alpha val="74998"/>
-                    </a:srgbClr>
-                  </a:outerShdw>
-                </a:effectLst>
-              </a14:hiddenEffects>
-            </a:ext>
-          </a:extLst>
-        </p:spPr>
-      </p:pic>
-      <p:sp>
-        <p:nvSpPr>
-          <p:cNvPr id="62" name="TextBox 61"/>
-          <p:cNvSpPr txBox="1"/>
-          <p:nvPr/>
-        </p:nvSpPr>
-        <p:spPr>
-          <a:xfrm>
-            <a:off x="8784625" y="3455408"/>
-            <a:ext cx="3391332" cy="400110"/>
-          </a:xfrm>
-          <a:prstGeom prst="rect">
-            <a:avLst/>
-          </a:prstGeom>
-          <a:noFill/>
-        </p:spPr>
-        <p:txBody>
-          <a:bodyPr wrap="square" rtlCol="0">
-            <a:spAutoFit/>
-          </a:bodyPr>
-          <a:lstStyle/>
-          <a:p>
-            <a:r>
-              <a:rPr lang="en-US" sz="2000" dirty="0"/>
-              <a:t>Sketches</a:t>
-            </a:r>
-          </a:p>
-        </p:txBody>
-      </p:sp>
-      <p:pic>
-        <p:nvPicPr>
           <p:cNvPr id="5" name="Picture 4"/>
           <p:cNvPicPr>
             <a:picLocks noChangeAspect="1"/>
@@ -14986,7 +14745,7 @@
         </p:blipFill>
         <p:spPr>
           <a:xfrm>
-            <a:off x="8462299" y="3922125"/>
+            <a:off x="8445217" y="3568089"/>
             <a:ext cx="305244" cy="514457"/>
           </a:xfrm>
           <a:prstGeom prst="rect">
@@ -15002,7 +14761,7 @@
         </p:nvSpPr>
         <p:spPr>
           <a:xfrm>
-            <a:off x="8767370" y="3943714"/>
+            <a:off x="8750288" y="3589678"/>
             <a:ext cx="2586257" cy="400110"/>
           </a:xfrm>
           <a:prstGeom prst="rect">
@@ -15289,7 +15048,7 @@
                                 </p:cTn>
                               </p:par>
                               <p:par>
-                                <p:cTn id="19" presetID="1" presetClass="entr" presetSubtype="0" fill="hold" grpId="0" nodeType="withEffect">
+                                <p:cTn id="19" presetID="1" presetClass="entr" presetSubtype="0" fill="hold" nodeType="withEffect">
                                   <p:stCondLst>
                                     <p:cond delay="0"/>
                                   </p:stCondLst>
@@ -15297,33 +15056,6 @@
                                     <p:set>
                                       <p:cBhvr>
                                         <p:cTn id="20" dur="1" fill="hold">
-                                          <p:stCondLst>
-                                            <p:cond delay="0"/>
-                                          </p:stCondLst>
-                                        </p:cTn>
-                                        <p:tgtEl>
-                                          <p:spTgt spid="62"/>
-                                        </p:tgtEl>
-                                        <p:attrNameLst>
-                                          <p:attrName>style.visibility</p:attrName>
-                                        </p:attrNameLst>
-                                      </p:cBhvr>
-                                      <p:to>
-                                        <p:strVal val="visible"/>
-                                      </p:to>
-                                    </p:set>
-                                  </p:childTnLst>
-                                </p:cTn>
-                              </p:par>
-                              <p:par>
-                                <p:cTn id="21" presetID="1" presetClass="entr" presetSubtype="0" fill="hold" nodeType="withEffect">
-                                  <p:stCondLst>
-                                    <p:cond delay="0"/>
-                                  </p:stCondLst>
-                                  <p:childTnLst>
-                                    <p:set>
-                                      <p:cBhvr>
-                                        <p:cTn id="22" dur="1" fill="hold">
                                           <p:stCondLst>
                                             <p:cond delay="0"/>
                                           </p:stCondLst>
@@ -15343,14 +15075,14 @@
                                 </p:cTn>
                               </p:par>
                               <p:par>
-                                <p:cTn id="23" presetID="1" presetClass="entr" presetSubtype="0" fill="hold" grpId="0" nodeType="withEffect">
+                                <p:cTn id="21" presetID="1" presetClass="entr" presetSubtype="0" fill="hold" grpId="0" nodeType="withEffect">
                                   <p:stCondLst>
                                     <p:cond delay="0"/>
                                   </p:stCondLst>
                                   <p:childTnLst>
                                     <p:set>
                                       <p:cBhvr>
-                                        <p:cTn id="24" dur="1" fill="hold">
+                                        <p:cTn id="22" dur="1" fill="hold">
                                           <p:stCondLst>
                                             <p:cond delay="0"/>
                                           </p:stCondLst>
@@ -15370,41 +15102,14 @@
                                 </p:cTn>
                               </p:par>
                               <p:par>
-                                <p:cTn id="25" presetID="1" presetClass="entr" presetSubtype="0" fill="hold" nodeType="withEffect">
+                                <p:cTn id="23" presetID="1" presetClass="entr" presetSubtype="0" fill="hold" nodeType="withEffect">
                                   <p:stCondLst>
                                     <p:cond delay="0"/>
                                   </p:stCondLst>
                                   <p:childTnLst>
                                     <p:set>
                                       <p:cBhvr>
-                                        <p:cTn id="26" dur="1" fill="hold">
-                                          <p:stCondLst>
-                                            <p:cond delay="0"/>
-                                          </p:stCondLst>
-                                        </p:cTn>
-                                        <p:tgtEl>
-                                          <p:spTgt spid="61"/>
-                                        </p:tgtEl>
-                                        <p:attrNameLst>
-                                          <p:attrName>style.visibility</p:attrName>
-                                        </p:attrNameLst>
-                                      </p:cBhvr>
-                                      <p:to>
-                                        <p:strVal val="visible"/>
-                                      </p:to>
-                                    </p:set>
-                                  </p:childTnLst>
-                                </p:cTn>
-                              </p:par>
-                              <p:par>
-                                <p:cTn id="27" presetID="1" presetClass="entr" presetSubtype="0" fill="hold" nodeType="withEffect">
-                                  <p:stCondLst>
-                                    <p:cond delay="0"/>
-                                  </p:stCondLst>
-                                  <p:childTnLst>
-                                    <p:set>
-                                      <p:cBhvr>
-                                        <p:cTn id="28" dur="1" fill="hold">
+                                        <p:cTn id="24" dur="1" fill="hold">
                                           <p:stCondLst>
                                             <p:cond delay="0"/>
                                           </p:stCondLst>
@@ -15424,14 +15129,14 @@
                                 </p:cTn>
                               </p:par>
                               <p:par>
-                                <p:cTn id="29" presetID="1" presetClass="entr" presetSubtype="0" fill="hold" grpId="0" nodeType="withEffect">
+                                <p:cTn id="25" presetID="1" presetClass="entr" presetSubtype="0" fill="hold" grpId="0" nodeType="withEffect">
                                   <p:stCondLst>
                                     <p:cond delay="0"/>
                                   </p:stCondLst>
                                   <p:childTnLst>
                                     <p:set>
                                       <p:cBhvr>
-                                        <p:cTn id="30" dur="1" fill="hold">
+                                        <p:cTn id="26" dur="1" fill="hold">
                                           <p:stCondLst>
                                             <p:cond delay="0"/>
                                           </p:stCondLst>
@@ -15457,26 +15162,26 @@
                     </p:cTn>
                   </p:par>
                   <p:par>
-                    <p:cTn id="31" fill="hold">
+                    <p:cTn id="27" fill="hold">
                       <p:stCondLst>
                         <p:cond delay="indefinite"/>
                       </p:stCondLst>
                       <p:childTnLst>
                         <p:par>
-                          <p:cTn id="32" fill="hold">
+                          <p:cTn id="28" fill="hold">
                             <p:stCondLst>
                               <p:cond delay="0"/>
                             </p:stCondLst>
                             <p:childTnLst>
                               <p:par>
-                                <p:cTn id="33" presetID="1" presetClass="entr" presetSubtype="0" fill="hold" grpId="0" nodeType="clickEffect">
+                                <p:cTn id="29" presetID="1" presetClass="entr" presetSubtype="0" fill="hold" grpId="0" nodeType="clickEffect">
                                   <p:stCondLst>
                                     <p:cond delay="0"/>
                                   </p:stCondLst>
                                   <p:childTnLst>
                                     <p:set>
                                       <p:cBhvr>
-                                        <p:cTn id="34" dur="1" fill="hold">
+                                        <p:cTn id="30" dur="1" fill="hold">
                                           <p:stCondLst>
                                             <p:cond delay="0"/>
                                           </p:stCondLst>
@@ -15496,14 +15201,14 @@
                                 </p:cTn>
                               </p:par>
                               <p:par>
-                                <p:cTn id="35" presetID="1" presetClass="entr" presetSubtype="0" fill="hold" grpId="0" nodeType="withEffect">
+                                <p:cTn id="31" presetID="1" presetClass="entr" presetSubtype="0" fill="hold" grpId="0" nodeType="withEffect">
                                   <p:stCondLst>
                                     <p:cond delay="0"/>
                                   </p:stCondLst>
                                   <p:childTnLst>
                                     <p:set>
                                       <p:cBhvr>
-                                        <p:cTn id="36" dur="1" fill="hold">
+                                        <p:cTn id="32" dur="1" fill="hold">
                                           <p:stCondLst>
                                             <p:cond delay="0"/>
                                           </p:stCondLst>
@@ -15556,7 +15261,6 @@
       <p:bldP spid="47" grpId="0"/>
       <p:bldP spid="58" grpId="0"/>
       <p:bldP spid="60" grpId="0"/>
-      <p:bldP spid="62" grpId="0"/>
       <p:bldP spid="63" grpId="0"/>
     </p:bldLst>
   </p:timing>
@@ -16791,7 +16495,7 @@
           <a:effectLst/>
           <a:extLst>
             <a:ext uri="{909E8E84-426E-40dd-AFC4-6F175D3DCCD1}">
-              <a14:hiddenFill xmlns="" xmlns:a14="http://schemas.microsoft.com/office/drawing/2010/main">
+              <a14:hiddenFill xmlns:a14="http://schemas.microsoft.com/office/drawing/2010/main" xmlns="">
                 <a:blipFill dpi="0" rotWithShape="0">
                   <a:blip/>
                   <a:srcRect/>
@@ -16802,7 +16506,7 @@
               </a14:hiddenFill>
             </a:ext>
             <a:ext uri="{91240B29-F687-4f45-9708-019B960494DF}">
-              <a14:hiddenLine xmlns="" xmlns:a14="http://schemas.microsoft.com/office/drawing/2010/main" w="9525">
+              <a14:hiddenLine xmlns:a14="http://schemas.microsoft.com/office/drawing/2010/main" xmlns="" w="9525">
                 <a:solidFill>
                   <a:srgbClr val="000000"/>
                 </a:solidFill>
@@ -16812,7 +16516,7 @@
               </a14:hiddenLine>
             </a:ext>
             <a:ext uri="{AF507438-7753-43e0-B8FC-AC1667EBCBE1}">
-              <a14:hiddenEffects xmlns="" xmlns:a14="http://schemas.microsoft.com/office/drawing/2010/main">
+              <a14:hiddenEffects xmlns:a14="http://schemas.microsoft.com/office/drawing/2010/main" xmlns="">
                 <a:effectLst>
                   <a:outerShdw blurRad="63500" dist="38099" dir="2700000" algn="ctr" rotWithShape="0">
                     <a:srgbClr val="000000">
@@ -18301,7 +18005,7 @@
           <a:effectLst/>
           <a:extLst>
             <a:ext uri="{909E8E84-426E-40dd-AFC4-6F175D3DCCD1}">
-              <a14:hiddenFill xmlns="" xmlns:a14="http://schemas.microsoft.com/office/drawing/2010/main">
+              <a14:hiddenFill xmlns:a14="http://schemas.microsoft.com/office/drawing/2010/main" xmlns="">
                 <a:blipFill dpi="0" rotWithShape="0">
                   <a:blip/>
                   <a:srcRect/>
@@ -18312,7 +18016,7 @@
               </a14:hiddenFill>
             </a:ext>
             <a:ext uri="{91240B29-F687-4f45-9708-019B960494DF}">
-              <a14:hiddenLine xmlns="" xmlns:a14="http://schemas.microsoft.com/office/drawing/2010/main" w="9525">
+              <a14:hiddenLine xmlns:a14="http://schemas.microsoft.com/office/drawing/2010/main" xmlns="" w="9525">
                 <a:solidFill>
                   <a:srgbClr val="000000"/>
                 </a:solidFill>
@@ -18322,7 +18026,7 @@
               </a14:hiddenLine>
             </a:ext>
             <a:ext uri="{AF507438-7753-43e0-B8FC-AC1667EBCBE1}">
-              <a14:hiddenEffects xmlns="" xmlns:a14="http://schemas.microsoft.com/office/drawing/2010/main">
+              <a14:hiddenEffects xmlns:a14="http://schemas.microsoft.com/office/drawing/2010/main" xmlns="">
                 <a:effectLst>
                   <a:outerShdw blurRad="63500" dist="38099" dir="2700000" algn="ctr" rotWithShape="0">
                     <a:srgbClr val="000000">
@@ -19807,7 +19511,7 @@
           <a:effectLst/>
           <a:extLst>
             <a:ext uri="{909E8E84-426E-40dd-AFC4-6F175D3DCCD1}">
-              <a14:hiddenFill xmlns="" xmlns:a14="http://schemas.microsoft.com/office/drawing/2010/main">
+              <a14:hiddenFill xmlns:a14="http://schemas.microsoft.com/office/drawing/2010/main" xmlns="">
                 <a:blipFill dpi="0" rotWithShape="0">
                   <a:blip/>
                   <a:srcRect/>
@@ -19818,7 +19522,7 @@
               </a14:hiddenFill>
             </a:ext>
             <a:ext uri="{91240B29-F687-4f45-9708-019B960494DF}">
-              <a14:hiddenLine xmlns="" xmlns:a14="http://schemas.microsoft.com/office/drawing/2010/main" w="9525">
+              <a14:hiddenLine xmlns:a14="http://schemas.microsoft.com/office/drawing/2010/main" xmlns="" w="9525">
                 <a:solidFill>
                   <a:srgbClr val="000000"/>
                 </a:solidFill>
@@ -19828,7 +19532,7 @@
               </a14:hiddenLine>
             </a:ext>
             <a:ext uri="{AF507438-7753-43e0-B8FC-AC1667EBCBE1}">
-              <a14:hiddenEffects xmlns="" xmlns:a14="http://schemas.microsoft.com/office/drawing/2010/main">
+              <a14:hiddenEffects xmlns:a14="http://schemas.microsoft.com/office/drawing/2010/main" xmlns="">
                 <a:effectLst>
                   <a:outerShdw blurRad="63500" dist="38099" dir="2700000" algn="ctr" rotWithShape="0">
                     <a:srgbClr val="000000">
@@ -19982,7 +19686,7 @@
           <a:effectLst/>
           <a:extLst>
             <a:ext uri="{909E8E84-426E-40dd-AFC4-6F175D3DCCD1}">
-              <a14:hiddenFill xmlns="" xmlns:a14="http://schemas.microsoft.com/office/drawing/2010/main">
+              <a14:hiddenFill xmlns:a14="http://schemas.microsoft.com/office/drawing/2010/main" xmlns="">
                 <a:blipFill dpi="0" rotWithShape="0">
                   <a:blip/>
                   <a:srcRect/>
@@ -19993,7 +19697,7 @@
               </a14:hiddenFill>
             </a:ext>
             <a:ext uri="{91240B29-F687-4f45-9708-019B960494DF}">
-              <a14:hiddenLine xmlns="" xmlns:a14="http://schemas.microsoft.com/office/drawing/2010/main" w="9525">
+              <a14:hiddenLine xmlns:a14="http://schemas.microsoft.com/office/drawing/2010/main" xmlns="" w="9525">
                 <a:solidFill>
                   <a:srgbClr val="000000"/>
                 </a:solidFill>
@@ -20003,7 +19707,7 @@
               </a14:hiddenLine>
             </a:ext>
             <a:ext uri="{AF507438-7753-43e0-B8FC-AC1667EBCBE1}">
-              <a14:hiddenEffects xmlns="" xmlns:a14="http://schemas.microsoft.com/office/drawing/2010/main">
+              <a14:hiddenEffects xmlns:a14="http://schemas.microsoft.com/office/drawing/2010/main" xmlns="">
                 <a:effectLst>
                   <a:outerShdw blurRad="63500" dist="38099" dir="2700000" algn="ctr" rotWithShape="0">
                     <a:srgbClr val="000000">
@@ -21796,7 +21500,7 @@
           <a:effectLst/>
           <a:extLst>
             <a:ext uri="{909E8E84-426E-40dd-AFC4-6F175D3DCCD1}">
-              <a14:hiddenFill xmlns="" xmlns:a14="http://schemas.microsoft.com/office/drawing/2010/main">
+              <a14:hiddenFill xmlns:a14="http://schemas.microsoft.com/office/drawing/2010/main" xmlns="">
                 <a:blipFill dpi="0" rotWithShape="0">
                   <a:blip/>
                   <a:srcRect/>
@@ -21807,7 +21511,7 @@
               </a14:hiddenFill>
             </a:ext>
             <a:ext uri="{91240B29-F687-4f45-9708-019B960494DF}">
-              <a14:hiddenLine xmlns="" xmlns:a14="http://schemas.microsoft.com/office/drawing/2010/main" w="9525">
+              <a14:hiddenLine xmlns:a14="http://schemas.microsoft.com/office/drawing/2010/main" xmlns="" w="9525">
                 <a:solidFill>
                   <a:srgbClr val="000000"/>
                 </a:solidFill>
@@ -21817,7 +21521,7 @@
               </a14:hiddenLine>
             </a:ext>
             <a:ext uri="{AF507438-7753-43e0-B8FC-AC1667EBCBE1}">
-              <a14:hiddenEffects xmlns="" xmlns:a14="http://schemas.microsoft.com/office/drawing/2010/main">
+              <a14:hiddenEffects xmlns:a14="http://schemas.microsoft.com/office/drawing/2010/main" xmlns="">
                 <a:effectLst>
                   <a:outerShdw blurRad="63500" dist="38099" dir="2700000" algn="ctr" rotWithShape="0">
                     <a:srgbClr val="000000">
@@ -24772,7 +24476,7 @@
           <a:effectLst/>
           <a:extLst>
             <a:ext uri="{909E8E84-426E-40dd-AFC4-6F175D3DCCD1}">
-              <a14:hiddenFill xmlns="" xmlns:a14="http://schemas.microsoft.com/office/drawing/2010/main">
+              <a14:hiddenFill xmlns:a14="http://schemas.microsoft.com/office/drawing/2010/main" xmlns="">
                 <a:blipFill dpi="0" rotWithShape="0">
                   <a:blip/>
                   <a:srcRect/>
@@ -24783,7 +24487,7 @@
               </a14:hiddenFill>
             </a:ext>
             <a:ext uri="{91240B29-F687-4f45-9708-019B960494DF}">
-              <a14:hiddenLine xmlns="" xmlns:a14="http://schemas.microsoft.com/office/drawing/2010/main" w="9525">
+              <a14:hiddenLine xmlns:a14="http://schemas.microsoft.com/office/drawing/2010/main" xmlns="" w="9525">
                 <a:solidFill>
                   <a:srgbClr val="000000"/>
                 </a:solidFill>
@@ -24793,7 +24497,7 @@
               </a14:hiddenLine>
             </a:ext>
             <a:ext uri="{AF507438-7753-43e0-B8FC-AC1667EBCBE1}">
-              <a14:hiddenEffects xmlns="" xmlns:a14="http://schemas.microsoft.com/office/drawing/2010/main">
+              <a14:hiddenEffects xmlns:a14="http://schemas.microsoft.com/office/drawing/2010/main" xmlns="">
                 <a:effectLst>
                   <a:outerShdw blurRad="63500" dist="38099" dir="2700000" algn="ctr" rotWithShape="0">
                     <a:srgbClr val="000000">
@@ -24872,7 +24576,7 @@
           <a:effectLst/>
           <a:extLst>
             <a:ext uri="{909E8E84-426E-40dd-AFC4-6F175D3DCCD1}">
-              <a14:hiddenFill xmlns="" xmlns:a14="http://schemas.microsoft.com/office/drawing/2010/main">
+              <a14:hiddenFill xmlns:a14="http://schemas.microsoft.com/office/drawing/2010/main" xmlns="">
                 <a:blipFill dpi="0" rotWithShape="0">
                   <a:blip/>
                   <a:srcRect/>
@@ -24883,7 +24587,7 @@
               </a14:hiddenFill>
             </a:ext>
             <a:ext uri="{91240B29-F687-4f45-9708-019B960494DF}">
-              <a14:hiddenLine xmlns="" xmlns:a14="http://schemas.microsoft.com/office/drawing/2010/main" w="9525">
+              <a14:hiddenLine xmlns:a14="http://schemas.microsoft.com/office/drawing/2010/main" xmlns="" w="9525">
                 <a:solidFill>
                   <a:srgbClr val="000000"/>
                 </a:solidFill>
@@ -24893,7 +24597,7 @@
               </a14:hiddenLine>
             </a:ext>
             <a:ext uri="{AF507438-7753-43e0-B8FC-AC1667EBCBE1}">
-              <a14:hiddenEffects xmlns="" xmlns:a14="http://schemas.microsoft.com/office/drawing/2010/main">
+              <a14:hiddenEffects xmlns:a14="http://schemas.microsoft.com/office/drawing/2010/main" xmlns="">
                 <a:effectLst>
                   <a:outerShdw blurRad="63500" dist="38099" dir="2700000" algn="ctr" rotWithShape="0">
                     <a:srgbClr val="000000">
@@ -26488,7 +26192,7 @@
           <a:effectLst/>
           <a:extLst>
             <a:ext uri="{909E8E84-426E-40dd-AFC4-6F175D3DCCD1}">
-              <a14:hiddenFill xmlns="" xmlns:a14="http://schemas.microsoft.com/office/drawing/2010/main">
+              <a14:hiddenFill xmlns:a14="http://schemas.microsoft.com/office/drawing/2010/main" xmlns="">
                 <a:blipFill dpi="0" rotWithShape="0">
                   <a:blip/>
                   <a:srcRect/>
@@ -26499,7 +26203,7 @@
               </a14:hiddenFill>
             </a:ext>
             <a:ext uri="{91240B29-F687-4f45-9708-019B960494DF}">
-              <a14:hiddenLine xmlns="" xmlns:a14="http://schemas.microsoft.com/office/drawing/2010/main" w="9525">
+              <a14:hiddenLine xmlns:a14="http://schemas.microsoft.com/office/drawing/2010/main" xmlns="" w="9525">
                 <a:solidFill>
                   <a:srgbClr val="000000"/>
                 </a:solidFill>
@@ -26509,7 +26213,7 @@
               </a14:hiddenLine>
             </a:ext>
             <a:ext uri="{AF507438-7753-43e0-B8FC-AC1667EBCBE1}">
-              <a14:hiddenEffects xmlns="" xmlns:a14="http://schemas.microsoft.com/office/drawing/2010/main">
+              <a14:hiddenEffects xmlns:a14="http://schemas.microsoft.com/office/drawing/2010/main" xmlns="">
                 <a:effectLst>
                   <a:outerShdw blurRad="63500" dist="38099" dir="2700000" algn="ctr" rotWithShape="0">
                     <a:srgbClr val="000000">
@@ -28157,7 +27861,7 @@
           <a:effectLst/>
           <a:extLst>
             <a:ext uri="{909E8E84-426E-40dd-AFC4-6F175D3DCCD1}">
-              <a14:hiddenFill xmlns="" xmlns:a14="http://schemas.microsoft.com/office/drawing/2010/main">
+              <a14:hiddenFill xmlns:a14="http://schemas.microsoft.com/office/drawing/2010/main" xmlns="">
                 <a:blipFill dpi="0" rotWithShape="0">
                   <a:blip/>
                   <a:srcRect/>
@@ -28168,7 +27872,7 @@
               </a14:hiddenFill>
             </a:ext>
             <a:ext uri="{91240B29-F687-4f45-9708-019B960494DF}">
-              <a14:hiddenLine xmlns="" xmlns:a14="http://schemas.microsoft.com/office/drawing/2010/main" w="9525">
+              <a14:hiddenLine xmlns:a14="http://schemas.microsoft.com/office/drawing/2010/main" xmlns="" w="9525">
                 <a:solidFill>
                   <a:srgbClr val="000000"/>
                 </a:solidFill>
@@ -28178,7 +27882,7 @@
               </a14:hiddenLine>
             </a:ext>
             <a:ext uri="{AF507438-7753-43e0-B8FC-AC1667EBCBE1}">
-              <a14:hiddenEffects xmlns="" xmlns:a14="http://schemas.microsoft.com/office/drawing/2010/main">
+              <a14:hiddenEffects xmlns:a14="http://schemas.microsoft.com/office/drawing/2010/main" xmlns="">
                 <a:effectLst>
                   <a:outerShdw blurRad="63500" dist="38099" dir="2700000" algn="ctr" rotWithShape="0">
                     <a:srgbClr val="000000">
@@ -29694,7 +29398,7 @@
           <a:effectLst/>
           <a:extLst>
             <a:ext uri="{909E8E84-426E-40dd-AFC4-6F175D3DCCD1}">
-              <a14:hiddenFill xmlns="" xmlns:a14="http://schemas.microsoft.com/office/drawing/2010/main">
+              <a14:hiddenFill xmlns:a14="http://schemas.microsoft.com/office/drawing/2010/main" xmlns="">
                 <a:blipFill dpi="0" rotWithShape="0">
                   <a:blip/>
                   <a:srcRect/>
@@ -29705,7 +29409,7 @@
               </a14:hiddenFill>
             </a:ext>
             <a:ext uri="{91240B29-F687-4f45-9708-019B960494DF}">
-              <a14:hiddenLine xmlns="" xmlns:a14="http://schemas.microsoft.com/office/drawing/2010/main" w="9525">
+              <a14:hiddenLine xmlns:a14="http://schemas.microsoft.com/office/drawing/2010/main" xmlns="" w="9525">
                 <a:solidFill>
                   <a:srgbClr val="000000"/>
                 </a:solidFill>
@@ -29715,7 +29419,7 @@
               </a14:hiddenLine>
             </a:ext>
             <a:ext uri="{AF507438-7753-43e0-B8FC-AC1667EBCBE1}">
-              <a14:hiddenEffects xmlns="" xmlns:a14="http://schemas.microsoft.com/office/drawing/2010/main">
+              <a14:hiddenEffects xmlns:a14="http://schemas.microsoft.com/office/drawing/2010/main" xmlns="">
                 <a:effectLst>
                   <a:outerShdw blurRad="63500" dist="38099" dir="2700000" algn="ctr" rotWithShape="0">
                     <a:srgbClr val="000000">
@@ -29846,7 +29550,7 @@
           <a:effectLst/>
           <a:extLst>
             <a:ext uri="{909E8E84-426E-40dd-AFC4-6F175D3DCCD1}">
-              <a14:hiddenFill xmlns="" xmlns:a14="http://schemas.microsoft.com/office/drawing/2010/main">
+              <a14:hiddenFill xmlns:a14="http://schemas.microsoft.com/office/drawing/2010/main" xmlns="">
                 <a:blipFill dpi="0" rotWithShape="0">
                   <a:blip/>
                   <a:srcRect/>
@@ -29857,7 +29561,7 @@
               </a14:hiddenFill>
             </a:ext>
             <a:ext uri="{91240B29-F687-4f45-9708-019B960494DF}">
-              <a14:hiddenLine xmlns="" xmlns:a14="http://schemas.microsoft.com/office/drawing/2010/main" w="9525">
+              <a14:hiddenLine xmlns:a14="http://schemas.microsoft.com/office/drawing/2010/main" xmlns="" w="9525">
                 <a:solidFill>
                   <a:srgbClr val="000000"/>
                 </a:solidFill>
@@ -29867,7 +29571,7 @@
               </a14:hiddenLine>
             </a:ext>
             <a:ext uri="{AF507438-7753-43e0-B8FC-AC1667EBCBE1}">
-              <a14:hiddenEffects xmlns="" xmlns:a14="http://schemas.microsoft.com/office/drawing/2010/main">
+              <a14:hiddenEffects xmlns:a14="http://schemas.microsoft.com/office/drawing/2010/main" xmlns="">
                 <a:effectLst>
                   <a:outerShdw blurRad="63500" dist="38099" dir="2700000" algn="ctr" rotWithShape="0">
                     <a:srgbClr val="000000">
@@ -31403,12 +31107,8 @@
           <a:lstStyle/>
           <a:p>
             <a:r>
-              <a:rPr lang="en-US" dirty="0" err="1"/>
-              <a:t>Mergeability</a:t>
-            </a:r>
-            <a:r>
               <a:rPr lang="en-US" dirty="0"/>
-              <a:t> beyond associative statistics</a:t>
+              <a:t>Mergeability beyond associative folds</a:t>
             </a:r>
           </a:p>
         </p:txBody>
@@ -31480,7 +31180,7 @@
           <a:p>
             <a:r>
               <a:rPr lang="en-US" dirty="0"/>
-              <a:t>Small: extra state size ≈ size of the statistics value being tracked</a:t>
+              <a:t>Small: extra state size ≈ size of the state being tracked</a:t>
             </a:r>
           </a:p>
         </p:txBody>
@@ -37791,7 +37491,7 @@
           <a:effectLst/>
           <a:extLst>
             <a:ext uri="{909E8E84-426E-40dd-AFC4-6F175D3DCCD1}">
-              <a14:hiddenFill xmlns:a14="http://schemas.microsoft.com/office/drawing/2010/main" xmlns="">
+              <a14:hiddenFill xmlns="" xmlns:a14="http://schemas.microsoft.com/office/drawing/2010/main">
                 <a:blipFill dpi="0" rotWithShape="0">
                   <a:blip/>
                   <a:srcRect/>
@@ -37802,7 +37502,7 @@
               </a14:hiddenFill>
             </a:ext>
             <a:ext uri="{91240B29-F687-4f45-9708-019B960494DF}">
-              <a14:hiddenLine xmlns:a14="http://schemas.microsoft.com/office/drawing/2010/main" xmlns="" w="9525">
+              <a14:hiddenLine xmlns="" xmlns:a14="http://schemas.microsoft.com/office/drawing/2010/main" w="9525">
                 <a:solidFill>
                   <a:srgbClr val="000000"/>
                 </a:solidFill>
@@ -37812,7 +37512,7 @@
               </a14:hiddenLine>
             </a:ext>
             <a:ext uri="{AF507438-7753-43e0-B8FC-AC1667EBCBE1}">
-              <a14:hiddenEffects xmlns:a14="http://schemas.microsoft.com/office/drawing/2010/main" xmlns="">
+              <a14:hiddenEffects xmlns="" xmlns:a14="http://schemas.microsoft.com/office/drawing/2010/main">
                 <a:effectLst>
                   <a:outerShdw blurRad="63500" dist="38099" dir="2700000" algn="ctr" rotWithShape="0">
                     <a:srgbClr val="000000">

</xml_diff>

<commit_message>
Fix merge operation slide
</commit_message>
<xml_diff>
--- a/marple_itx18.pptx
+++ b/marple_itx18.pptx
@@ -3010,7 +3010,16 @@
           <a:p>
             <a:r>
               <a:rPr lang="en-US" dirty="0"/>
-              <a:t>Mathematically, it means this. That if you computed the fold function over the first sequence of packets (prior to eviction) and computed the fold over the second sequence of the packets (after the eviction) and then merged them, it is equivalent to computing the fold over the entire packet sequence.</a:t>
+              <a:t>Mathematically, it means this. That if you computed the fold function over the first sequence of packets and computed the fold over the second sequence of the packets and then merged them, it is equivalent to computing the fold over the entire packet sequence.</a:t>
+            </a:r>
+          </a:p>
+          <a:p>
+            <a:endParaRPr lang="en-US" dirty="0"/>
+          </a:p>
+          <a:p>
+            <a:r>
+              <a:rPr lang="en-US" dirty="0"/>
+              <a:t>In our context, what is the physical interpretation of this? The first packet sequence is the sequence of packets before the first time the key-value pair was evicted. The second packet sequence is the sequence of packets seen in the cache.</a:t>
             </a:r>
           </a:p>
           <a:p>
@@ -12512,7 +12521,7 @@
           <a:effectLst/>
           <a:extLst>
             <a:ext uri="{909E8E84-426E-40dd-AFC4-6F175D3DCCD1}">
-              <a14:hiddenFill xmlns="" xmlns:a14="http://schemas.microsoft.com/office/drawing/2010/main">
+              <a14:hiddenFill xmlns:a14="http://schemas.microsoft.com/office/drawing/2010/main" xmlns="">
                 <a:blipFill dpi="0" rotWithShape="0">
                   <a:blip/>
                   <a:srcRect/>
@@ -12523,7 +12532,7 @@
               </a14:hiddenFill>
             </a:ext>
             <a:ext uri="{91240B29-F687-4f45-9708-019B960494DF}">
-              <a14:hiddenLine xmlns="" xmlns:a14="http://schemas.microsoft.com/office/drawing/2010/main" w="9525">
+              <a14:hiddenLine xmlns:a14="http://schemas.microsoft.com/office/drawing/2010/main" xmlns="" w="9525">
                 <a:solidFill>
                   <a:srgbClr val="000000"/>
                 </a:solidFill>
@@ -12533,7 +12542,7 @@
               </a14:hiddenLine>
             </a:ext>
             <a:ext uri="{AF507438-7753-43e0-B8FC-AC1667EBCBE1}">
-              <a14:hiddenEffects xmlns="" xmlns:a14="http://schemas.microsoft.com/office/drawing/2010/main">
+              <a14:hiddenEffects xmlns:a14="http://schemas.microsoft.com/office/drawing/2010/main" xmlns="">
                 <a:effectLst>
                   <a:outerShdw blurRad="63500" dist="38099" dir="2700000" algn="ctr" rotWithShape="0">
                     <a:srgbClr val="000000">
@@ -12582,7 +12591,7 @@
           <a:effectLst/>
           <a:extLst>
             <a:ext uri="{909E8E84-426E-40dd-AFC4-6F175D3DCCD1}">
-              <a14:hiddenFill xmlns="" xmlns:a14="http://schemas.microsoft.com/office/drawing/2010/main">
+              <a14:hiddenFill xmlns:a14="http://schemas.microsoft.com/office/drawing/2010/main" xmlns="">
                 <a:blipFill dpi="0" rotWithShape="0">
                   <a:blip/>
                   <a:srcRect/>
@@ -12593,7 +12602,7 @@
               </a14:hiddenFill>
             </a:ext>
             <a:ext uri="{91240B29-F687-4f45-9708-019B960494DF}">
-              <a14:hiddenLine xmlns="" xmlns:a14="http://schemas.microsoft.com/office/drawing/2010/main" w="9525">
+              <a14:hiddenLine xmlns:a14="http://schemas.microsoft.com/office/drawing/2010/main" xmlns="" w="9525">
                 <a:solidFill>
                   <a:srgbClr val="000000"/>
                 </a:solidFill>
@@ -12603,7 +12612,7 @@
               </a14:hiddenLine>
             </a:ext>
             <a:ext uri="{AF507438-7753-43e0-B8FC-AC1667EBCBE1}">
-              <a14:hiddenEffects xmlns="" xmlns:a14="http://schemas.microsoft.com/office/drawing/2010/main">
+              <a14:hiddenEffects xmlns:a14="http://schemas.microsoft.com/office/drawing/2010/main" xmlns="">
                 <a:effectLst>
                   <a:outerShdw blurRad="63500" dist="38099" dir="2700000" algn="ctr" rotWithShape="0">
                     <a:srgbClr val="000000">
@@ -12738,7 +12747,7 @@
             <a:effectLst/>
             <a:extLst>
               <a:ext uri="{909E8E84-426E-40dd-AFC4-6F175D3DCCD1}">
-                <a14:hiddenFill xmlns:a14="http://schemas.microsoft.com/office/drawing/2010/main" xmlns="">
+                <a14:hiddenFill xmlns="" xmlns:a14="http://schemas.microsoft.com/office/drawing/2010/main">
                   <a:blipFill dpi="0" rotWithShape="0">
                     <a:blip/>
                     <a:srcRect/>
@@ -12749,7 +12758,7 @@
                 </a14:hiddenFill>
               </a:ext>
               <a:ext uri="{91240B29-F687-4f45-9708-019B960494DF}">
-                <a14:hiddenLine xmlns:a14="http://schemas.microsoft.com/office/drawing/2010/main" xmlns="" w="9525">
+                <a14:hiddenLine xmlns="" xmlns:a14="http://schemas.microsoft.com/office/drawing/2010/main" w="9525">
                   <a:solidFill>
                     <a:srgbClr val="000000"/>
                   </a:solidFill>
@@ -12759,7 +12768,7 @@
                 </a14:hiddenLine>
               </a:ext>
               <a:ext uri="{AF507438-7753-43e0-B8FC-AC1667EBCBE1}">
-                <a14:hiddenEffects xmlns:a14="http://schemas.microsoft.com/office/drawing/2010/main" xmlns="">
+                <a14:hiddenEffects xmlns="" xmlns:a14="http://schemas.microsoft.com/office/drawing/2010/main">
                   <a:effectLst>
                     <a:outerShdw blurRad="63500" dist="38099" dir="2700000" algn="ctr" rotWithShape="0">
                       <a:srgbClr val="000000">
@@ -12808,7 +12817,7 @@
             <a:effectLst/>
             <a:extLst>
               <a:ext uri="{909E8E84-426E-40dd-AFC4-6F175D3DCCD1}">
-                <a14:hiddenFill xmlns:a14="http://schemas.microsoft.com/office/drawing/2010/main" xmlns="">
+                <a14:hiddenFill xmlns="" xmlns:a14="http://schemas.microsoft.com/office/drawing/2010/main">
                   <a:blipFill dpi="0" rotWithShape="0">
                     <a:blip/>
                     <a:srcRect/>
@@ -12819,7 +12828,7 @@
                 </a14:hiddenFill>
               </a:ext>
               <a:ext uri="{91240B29-F687-4f45-9708-019B960494DF}">
-                <a14:hiddenLine xmlns:a14="http://schemas.microsoft.com/office/drawing/2010/main" xmlns="" w="9525">
+                <a14:hiddenLine xmlns="" xmlns:a14="http://schemas.microsoft.com/office/drawing/2010/main" w="9525">
                   <a:solidFill>
                     <a:srgbClr val="000000"/>
                   </a:solidFill>
@@ -12829,7 +12838,7 @@
                 </a14:hiddenLine>
               </a:ext>
               <a:ext uri="{AF507438-7753-43e0-B8FC-AC1667EBCBE1}">
-                <a14:hiddenEffects xmlns:a14="http://schemas.microsoft.com/office/drawing/2010/main" xmlns="">
+                <a14:hiddenEffects xmlns="" xmlns:a14="http://schemas.microsoft.com/office/drawing/2010/main">
                   <a:effectLst>
                     <a:outerShdw blurRad="63500" dist="38099" dir="2700000" algn="ctr" rotWithShape="0">
                       <a:srgbClr val="000000">
@@ -12878,7 +12887,7 @@
             <a:effectLst/>
             <a:extLst>
               <a:ext uri="{909E8E84-426E-40dd-AFC4-6F175D3DCCD1}">
-                <a14:hiddenFill xmlns:a14="http://schemas.microsoft.com/office/drawing/2010/main" xmlns="">
+                <a14:hiddenFill xmlns="" xmlns:a14="http://schemas.microsoft.com/office/drawing/2010/main">
                   <a:blipFill dpi="0" rotWithShape="0">
                     <a:blip/>
                     <a:srcRect/>
@@ -12889,7 +12898,7 @@
                 </a14:hiddenFill>
               </a:ext>
               <a:ext uri="{91240B29-F687-4f45-9708-019B960494DF}">
-                <a14:hiddenLine xmlns:a14="http://schemas.microsoft.com/office/drawing/2010/main" xmlns="" w="9525">
+                <a14:hiddenLine xmlns="" xmlns:a14="http://schemas.microsoft.com/office/drawing/2010/main" w="9525">
                   <a:solidFill>
                     <a:srgbClr val="000000"/>
                   </a:solidFill>
@@ -12899,7 +12908,7 @@
                 </a14:hiddenLine>
               </a:ext>
               <a:ext uri="{AF507438-7753-43e0-B8FC-AC1667EBCBE1}">
-                <a14:hiddenEffects xmlns:a14="http://schemas.microsoft.com/office/drawing/2010/main" xmlns="">
+                <a14:hiddenEffects xmlns="" xmlns:a14="http://schemas.microsoft.com/office/drawing/2010/main">
                   <a:effectLst>
                     <a:outerShdw blurRad="63500" dist="38099" dir="2700000" algn="ctr" rotWithShape="0">
                       <a:srgbClr val="000000">
@@ -12940,12 +12949,12 @@
             <a:effectLst/>
             <a:extLst>
               <a:ext uri="{909E8E84-426E-40dd-AFC4-6F175D3DCCD1}">
-                <a14:hiddenFill xmlns:a14="http://schemas.microsoft.com/office/drawing/2010/main" xmlns="">
+                <a14:hiddenFill xmlns="" xmlns:a14="http://schemas.microsoft.com/office/drawing/2010/main">
                   <a:noFill/>
                 </a14:hiddenFill>
               </a:ext>
               <a:ext uri="{AF507438-7753-43e0-B8FC-AC1667EBCBE1}">
-                <a14:hiddenEffects xmlns:a14="http://schemas.microsoft.com/office/drawing/2010/main" xmlns="">
+                <a14:hiddenEffects xmlns="" xmlns:a14="http://schemas.microsoft.com/office/drawing/2010/main">
                   <a:effectLst>
                     <a:outerShdw blurRad="63500" dist="38099" dir="2700000" algn="ctr" rotWithShape="0">
                       <a:srgbClr val="000000">
@@ -12998,12 +13007,12 @@
             <a:effectLst/>
             <a:extLst>
               <a:ext uri="{909E8E84-426E-40dd-AFC4-6F175D3DCCD1}">
-                <a14:hiddenFill xmlns:a14="http://schemas.microsoft.com/office/drawing/2010/main" xmlns="">
+                <a14:hiddenFill xmlns="" xmlns:a14="http://schemas.microsoft.com/office/drawing/2010/main">
                   <a:noFill/>
                 </a14:hiddenFill>
               </a:ext>
               <a:ext uri="{AF507438-7753-43e0-B8FC-AC1667EBCBE1}">
-                <a14:hiddenEffects xmlns:a14="http://schemas.microsoft.com/office/drawing/2010/main" xmlns="">
+                <a14:hiddenEffects xmlns="" xmlns:a14="http://schemas.microsoft.com/office/drawing/2010/main">
                   <a:effectLst>
                     <a:outerShdw blurRad="63500" dist="38099" dir="2700000" algn="ctr" rotWithShape="0">
                       <a:srgbClr val="000000">
@@ -13056,12 +13065,12 @@
             <a:effectLst/>
             <a:extLst>
               <a:ext uri="{909E8E84-426E-40dd-AFC4-6F175D3DCCD1}">
-                <a14:hiddenFill xmlns:a14="http://schemas.microsoft.com/office/drawing/2010/main" xmlns="">
+                <a14:hiddenFill xmlns="" xmlns:a14="http://schemas.microsoft.com/office/drawing/2010/main">
                   <a:noFill/>
                 </a14:hiddenFill>
               </a:ext>
               <a:ext uri="{AF507438-7753-43e0-B8FC-AC1667EBCBE1}">
-                <a14:hiddenEffects xmlns:a14="http://schemas.microsoft.com/office/drawing/2010/main" xmlns="">
+                <a14:hiddenEffects xmlns="" xmlns:a14="http://schemas.microsoft.com/office/drawing/2010/main">
                   <a:effectLst>
                     <a:outerShdw blurRad="63500" dist="38099" dir="2700000" algn="ctr" rotWithShape="0">
                       <a:srgbClr val="000000">
@@ -13114,12 +13123,12 @@
             <a:effectLst/>
             <a:extLst>
               <a:ext uri="{909E8E84-426E-40dd-AFC4-6F175D3DCCD1}">
-                <a14:hiddenFill xmlns:a14="http://schemas.microsoft.com/office/drawing/2010/main" xmlns="">
+                <a14:hiddenFill xmlns="" xmlns:a14="http://schemas.microsoft.com/office/drawing/2010/main">
                   <a:noFill/>
                 </a14:hiddenFill>
               </a:ext>
               <a:ext uri="{AF507438-7753-43e0-B8FC-AC1667EBCBE1}">
-                <a14:hiddenEffects xmlns:a14="http://schemas.microsoft.com/office/drawing/2010/main" xmlns="">
+                <a14:hiddenEffects xmlns="" xmlns:a14="http://schemas.microsoft.com/office/drawing/2010/main">
                   <a:effectLst>
                     <a:outerShdw blurRad="63500" dist="38099" dir="2700000" algn="ctr" rotWithShape="0">
                       <a:srgbClr val="000000">
@@ -13172,12 +13181,12 @@
             <a:effectLst/>
             <a:extLst>
               <a:ext uri="{909E8E84-426E-40dd-AFC4-6F175D3DCCD1}">
-                <a14:hiddenFill xmlns:a14="http://schemas.microsoft.com/office/drawing/2010/main" xmlns="">
+                <a14:hiddenFill xmlns="" xmlns:a14="http://schemas.microsoft.com/office/drawing/2010/main">
                   <a:noFill/>
                 </a14:hiddenFill>
               </a:ext>
               <a:ext uri="{AF507438-7753-43e0-B8FC-AC1667EBCBE1}">
-                <a14:hiddenEffects xmlns:a14="http://schemas.microsoft.com/office/drawing/2010/main" xmlns="">
+                <a14:hiddenEffects xmlns="" xmlns:a14="http://schemas.microsoft.com/office/drawing/2010/main">
                   <a:effectLst>
                     <a:outerShdw blurRad="63500" dist="38099" dir="2700000" algn="ctr" rotWithShape="0">
                       <a:srgbClr val="000000">
@@ -13230,12 +13239,12 @@
             <a:effectLst/>
             <a:extLst>
               <a:ext uri="{909E8E84-426E-40dd-AFC4-6F175D3DCCD1}">
-                <a14:hiddenFill xmlns:a14="http://schemas.microsoft.com/office/drawing/2010/main" xmlns="">
+                <a14:hiddenFill xmlns="" xmlns:a14="http://schemas.microsoft.com/office/drawing/2010/main">
                   <a:noFill/>
                 </a14:hiddenFill>
               </a:ext>
               <a:ext uri="{AF507438-7753-43e0-B8FC-AC1667EBCBE1}">
-                <a14:hiddenEffects xmlns:a14="http://schemas.microsoft.com/office/drawing/2010/main" xmlns="">
+                <a14:hiddenEffects xmlns="" xmlns:a14="http://schemas.microsoft.com/office/drawing/2010/main">
                   <a:effectLst>
                     <a:outerShdw blurRad="63500" dist="38099" dir="2700000" algn="ctr" rotWithShape="0">
                       <a:srgbClr val="000000">
@@ -13288,12 +13297,12 @@
             <a:effectLst/>
             <a:extLst>
               <a:ext uri="{909E8E84-426E-40dd-AFC4-6F175D3DCCD1}">
-                <a14:hiddenFill xmlns:a14="http://schemas.microsoft.com/office/drawing/2010/main" xmlns="">
+                <a14:hiddenFill xmlns="" xmlns:a14="http://schemas.microsoft.com/office/drawing/2010/main">
                   <a:noFill/>
                 </a14:hiddenFill>
               </a:ext>
               <a:ext uri="{AF507438-7753-43e0-B8FC-AC1667EBCBE1}">
-                <a14:hiddenEffects xmlns:a14="http://schemas.microsoft.com/office/drawing/2010/main" xmlns="">
+                <a14:hiddenEffects xmlns="" xmlns:a14="http://schemas.microsoft.com/office/drawing/2010/main">
                   <a:effectLst>
                     <a:outerShdw blurRad="63500" dist="38099" dir="2700000" algn="ctr" rotWithShape="0">
                       <a:srgbClr val="000000">
@@ -13346,12 +13355,12 @@
             <a:effectLst/>
             <a:extLst>
               <a:ext uri="{909E8E84-426E-40dd-AFC4-6F175D3DCCD1}">
-                <a14:hiddenFill xmlns:a14="http://schemas.microsoft.com/office/drawing/2010/main" xmlns="">
+                <a14:hiddenFill xmlns="" xmlns:a14="http://schemas.microsoft.com/office/drawing/2010/main">
                   <a:noFill/>
                 </a14:hiddenFill>
               </a:ext>
               <a:ext uri="{AF507438-7753-43e0-B8FC-AC1667EBCBE1}">
-                <a14:hiddenEffects xmlns:a14="http://schemas.microsoft.com/office/drawing/2010/main" xmlns="">
+                <a14:hiddenEffects xmlns="" xmlns:a14="http://schemas.microsoft.com/office/drawing/2010/main">
                   <a:effectLst>
                     <a:outerShdw blurRad="63500" dist="38099" dir="2700000" algn="ctr" rotWithShape="0">
                       <a:srgbClr val="000000">
@@ -13404,12 +13413,12 @@
             <a:effectLst/>
             <a:extLst>
               <a:ext uri="{909E8E84-426E-40dd-AFC4-6F175D3DCCD1}">
-                <a14:hiddenFill xmlns:a14="http://schemas.microsoft.com/office/drawing/2010/main" xmlns="">
+                <a14:hiddenFill xmlns="" xmlns:a14="http://schemas.microsoft.com/office/drawing/2010/main">
                   <a:noFill/>
                 </a14:hiddenFill>
               </a:ext>
               <a:ext uri="{AF507438-7753-43e0-B8FC-AC1667EBCBE1}">
-                <a14:hiddenEffects xmlns:a14="http://schemas.microsoft.com/office/drawing/2010/main" xmlns="">
+                <a14:hiddenEffects xmlns="" xmlns:a14="http://schemas.microsoft.com/office/drawing/2010/main">
                   <a:effectLst>
                     <a:outerShdw blurRad="63500" dist="38099" dir="2700000" algn="ctr" rotWithShape="0">
                       <a:srgbClr val="000000">
@@ -13462,12 +13471,12 @@
             <a:effectLst/>
             <a:extLst>
               <a:ext uri="{909E8E84-426E-40dd-AFC4-6F175D3DCCD1}">
-                <a14:hiddenFill xmlns:a14="http://schemas.microsoft.com/office/drawing/2010/main" xmlns="">
+                <a14:hiddenFill xmlns="" xmlns:a14="http://schemas.microsoft.com/office/drawing/2010/main">
                   <a:noFill/>
                 </a14:hiddenFill>
               </a:ext>
               <a:ext uri="{AF507438-7753-43e0-B8FC-AC1667EBCBE1}">
-                <a14:hiddenEffects xmlns:a14="http://schemas.microsoft.com/office/drawing/2010/main" xmlns="">
+                <a14:hiddenEffects xmlns="" xmlns:a14="http://schemas.microsoft.com/office/drawing/2010/main">
                   <a:effectLst>
                     <a:outerShdw blurRad="63500" dist="38099" dir="2700000" algn="ctr" rotWithShape="0">
                       <a:srgbClr val="000000">
@@ -13528,7 +13537,7 @@
             <a:effectLst/>
             <a:extLst>
               <a:ext uri="{909E8E84-426E-40dd-AFC4-6F175D3DCCD1}">
-                <a14:hiddenFill xmlns:a14="http://schemas.microsoft.com/office/drawing/2010/main" xmlns="">
+                <a14:hiddenFill xmlns="" xmlns:a14="http://schemas.microsoft.com/office/drawing/2010/main">
                   <a:blipFill dpi="0" rotWithShape="0">
                     <a:blip/>
                     <a:srcRect/>
@@ -13539,7 +13548,7 @@
                 </a14:hiddenFill>
               </a:ext>
               <a:ext uri="{91240B29-F687-4f45-9708-019B960494DF}">
-                <a14:hiddenLine xmlns:a14="http://schemas.microsoft.com/office/drawing/2010/main" xmlns="" w="9525">
+                <a14:hiddenLine xmlns="" xmlns:a14="http://schemas.microsoft.com/office/drawing/2010/main" w="9525">
                   <a:solidFill>
                     <a:srgbClr val="000000"/>
                   </a:solidFill>
@@ -13549,7 +13558,7 @@
                 </a14:hiddenLine>
               </a:ext>
               <a:ext uri="{AF507438-7753-43e0-B8FC-AC1667EBCBE1}">
-                <a14:hiddenEffects xmlns:a14="http://schemas.microsoft.com/office/drawing/2010/main" xmlns="">
+                <a14:hiddenEffects xmlns="" xmlns:a14="http://schemas.microsoft.com/office/drawing/2010/main">
                   <a:effectLst>
                     <a:outerShdw blurRad="63500" dist="38099" dir="2700000" algn="ctr" rotWithShape="0">
                       <a:srgbClr val="000000">
@@ -13598,7 +13607,7 @@
             <a:effectLst/>
             <a:extLst>
               <a:ext uri="{909E8E84-426E-40dd-AFC4-6F175D3DCCD1}">
-                <a14:hiddenFill xmlns:a14="http://schemas.microsoft.com/office/drawing/2010/main" xmlns="">
+                <a14:hiddenFill xmlns="" xmlns:a14="http://schemas.microsoft.com/office/drawing/2010/main">
                   <a:blipFill dpi="0" rotWithShape="0">
                     <a:blip/>
                     <a:srcRect/>
@@ -13609,7 +13618,7 @@
                 </a14:hiddenFill>
               </a:ext>
               <a:ext uri="{91240B29-F687-4f45-9708-019B960494DF}">
-                <a14:hiddenLine xmlns:a14="http://schemas.microsoft.com/office/drawing/2010/main" xmlns="" w="9525">
+                <a14:hiddenLine xmlns="" xmlns:a14="http://schemas.microsoft.com/office/drawing/2010/main" w="9525">
                   <a:solidFill>
                     <a:srgbClr val="000000"/>
                   </a:solidFill>
@@ -13619,7 +13628,7 @@
                 </a14:hiddenLine>
               </a:ext>
               <a:ext uri="{AF507438-7753-43e0-B8FC-AC1667EBCBE1}">
-                <a14:hiddenEffects xmlns:a14="http://schemas.microsoft.com/office/drawing/2010/main" xmlns="">
+                <a14:hiddenEffects xmlns="" xmlns:a14="http://schemas.microsoft.com/office/drawing/2010/main">
                   <a:effectLst>
                     <a:outerShdw blurRad="63500" dist="38099" dir="2700000" algn="ctr" rotWithShape="0">
                       <a:srgbClr val="000000">
@@ -13668,7 +13677,7 @@
             <a:effectLst/>
             <a:extLst>
               <a:ext uri="{909E8E84-426E-40dd-AFC4-6F175D3DCCD1}">
-                <a14:hiddenFill xmlns:a14="http://schemas.microsoft.com/office/drawing/2010/main" xmlns="">
+                <a14:hiddenFill xmlns="" xmlns:a14="http://schemas.microsoft.com/office/drawing/2010/main">
                   <a:blipFill dpi="0" rotWithShape="0">
                     <a:blip/>
                     <a:srcRect/>
@@ -13679,7 +13688,7 @@
                 </a14:hiddenFill>
               </a:ext>
               <a:ext uri="{91240B29-F687-4f45-9708-019B960494DF}">
-                <a14:hiddenLine xmlns:a14="http://schemas.microsoft.com/office/drawing/2010/main" xmlns="" w="9525">
+                <a14:hiddenLine xmlns="" xmlns:a14="http://schemas.microsoft.com/office/drawing/2010/main" w="9525">
                   <a:solidFill>
                     <a:srgbClr val="000000"/>
                   </a:solidFill>
@@ -13689,7 +13698,7 @@
                 </a14:hiddenLine>
               </a:ext>
               <a:ext uri="{AF507438-7753-43e0-B8FC-AC1667EBCBE1}">
-                <a14:hiddenEffects xmlns:a14="http://schemas.microsoft.com/office/drawing/2010/main" xmlns="">
+                <a14:hiddenEffects xmlns="" xmlns:a14="http://schemas.microsoft.com/office/drawing/2010/main">
                   <a:effectLst>
                     <a:outerShdw blurRad="63500" dist="38099" dir="2700000" algn="ctr" rotWithShape="0">
                       <a:srgbClr val="000000">
@@ -13738,7 +13747,7 @@
             <a:effectLst/>
             <a:extLst>
               <a:ext uri="{909E8E84-426E-40dd-AFC4-6F175D3DCCD1}">
-                <a14:hiddenFill xmlns:a14="http://schemas.microsoft.com/office/drawing/2010/main" xmlns="">
+                <a14:hiddenFill xmlns="" xmlns:a14="http://schemas.microsoft.com/office/drawing/2010/main">
                   <a:blipFill dpi="0" rotWithShape="0">
                     <a:blip/>
                     <a:srcRect/>
@@ -13749,7 +13758,7 @@
                 </a14:hiddenFill>
               </a:ext>
               <a:ext uri="{91240B29-F687-4f45-9708-019B960494DF}">
-                <a14:hiddenLine xmlns:a14="http://schemas.microsoft.com/office/drawing/2010/main" xmlns="" w="9525">
+                <a14:hiddenLine xmlns="" xmlns:a14="http://schemas.microsoft.com/office/drawing/2010/main" w="9525">
                   <a:solidFill>
                     <a:srgbClr val="000000"/>
                   </a:solidFill>
@@ -13759,7 +13768,7 @@
                 </a14:hiddenLine>
               </a:ext>
               <a:ext uri="{AF507438-7753-43e0-B8FC-AC1667EBCBE1}">
-                <a14:hiddenEffects xmlns:a14="http://schemas.microsoft.com/office/drawing/2010/main" xmlns="">
+                <a14:hiddenEffects xmlns="" xmlns:a14="http://schemas.microsoft.com/office/drawing/2010/main">
                   <a:effectLst>
                     <a:outerShdw blurRad="63500" dist="38099" dir="2700000" algn="ctr" rotWithShape="0">
                       <a:srgbClr val="000000">
@@ -13808,7 +13817,7 @@
             <a:effectLst/>
             <a:extLst>
               <a:ext uri="{909E8E84-426E-40dd-AFC4-6F175D3DCCD1}">
-                <a14:hiddenFill xmlns:a14="http://schemas.microsoft.com/office/drawing/2010/main" xmlns="">
+                <a14:hiddenFill xmlns="" xmlns:a14="http://schemas.microsoft.com/office/drawing/2010/main">
                   <a:blipFill dpi="0" rotWithShape="0">
                     <a:blip/>
                     <a:srcRect/>
@@ -13819,7 +13828,7 @@
                 </a14:hiddenFill>
               </a:ext>
               <a:ext uri="{91240B29-F687-4f45-9708-019B960494DF}">
-                <a14:hiddenLine xmlns:a14="http://schemas.microsoft.com/office/drawing/2010/main" xmlns="" w="9525">
+                <a14:hiddenLine xmlns="" xmlns:a14="http://schemas.microsoft.com/office/drawing/2010/main" w="9525">
                   <a:solidFill>
                     <a:srgbClr val="000000"/>
                   </a:solidFill>
@@ -13829,7 +13838,7 @@
                 </a14:hiddenLine>
               </a:ext>
               <a:ext uri="{AF507438-7753-43e0-B8FC-AC1667EBCBE1}">
-                <a14:hiddenEffects xmlns:a14="http://schemas.microsoft.com/office/drawing/2010/main" xmlns="">
+                <a14:hiddenEffects xmlns="" xmlns:a14="http://schemas.microsoft.com/office/drawing/2010/main">
                   <a:effectLst>
                     <a:outerShdw blurRad="63500" dist="38099" dir="2700000" algn="ctr" rotWithShape="0">
                       <a:srgbClr val="000000">
@@ -13870,12 +13879,12 @@
             <a:effectLst/>
             <a:extLst>
               <a:ext uri="{909E8E84-426E-40dd-AFC4-6F175D3DCCD1}">
-                <a14:hiddenFill xmlns:a14="http://schemas.microsoft.com/office/drawing/2010/main" xmlns="">
+                <a14:hiddenFill xmlns="" xmlns:a14="http://schemas.microsoft.com/office/drawing/2010/main">
                   <a:noFill/>
                 </a14:hiddenFill>
               </a:ext>
               <a:ext uri="{AF507438-7753-43e0-B8FC-AC1667EBCBE1}">
-                <a14:hiddenEffects xmlns:a14="http://schemas.microsoft.com/office/drawing/2010/main" xmlns="">
+                <a14:hiddenEffects xmlns="" xmlns:a14="http://schemas.microsoft.com/office/drawing/2010/main">
                   <a:effectLst>
                     <a:outerShdw blurRad="63500" dist="38099" dir="2700000" algn="ctr" rotWithShape="0">
                       <a:srgbClr val="000000">
@@ -13928,12 +13937,12 @@
             <a:effectLst/>
             <a:extLst>
               <a:ext uri="{909E8E84-426E-40dd-AFC4-6F175D3DCCD1}">
-                <a14:hiddenFill xmlns:a14="http://schemas.microsoft.com/office/drawing/2010/main" xmlns="">
+                <a14:hiddenFill xmlns="" xmlns:a14="http://schemas.microsoft.com/office/drawing/2010/main">
                   <a:noFill/>
                 </a14:hiddenFill>
               </a:ext>
               <a:ext uri="{AF507438-7753-43e0-B8FC-AC1667EBCBE1}">
-                <a14:hiddenEffects xmlns:a14="http://schemas.microsoft.com/office/drawing/2010/main" xmlns="">
+                <a14:hiddenEffects xmlns="" xmlns:a14="http://schemas.microsoft.com/office/drawing/2010/main">
                   <a:effectLst>
                     <a:outerShdw blurRad="63500" dist="38099" dir="2700000" algn="ctr" rotWithShape="0">
                       <a:srgbClr val="000000">
@@ -13994,7 +14003,7 @@
             <a:effectLst/>
             <a:extLst>
               <a:ext uri="{909E8E84-426E-40dd-AFC4-6F175D3DCCD1}">
-                <a14:hiddenFill xmlns:a14="http://schemas.microsoft.com/office/drawing/2010/main" xmlns="">
+                <a14:hiddenFill xmlns="" xmlns:a14="http://schemas.microsoft.com/office/drawing/2010/main">
                   <a:blipFill dpi="0" rotWithShape="0">
                     <a:blip/>
                     <a:srcRect/>
@@ -14005,7 +14014,7 @@
                 </a14:hiddenFill>
               </a:ext>
               <a:ext uri="{91240B29-F687-4f45-9708-019B960494DF}">
-                <a14:hiddenLine xmlns:a14="http://schemas.microsoft.com/office/drawing/2010/main" xmlns="" w="9525">
+                <a14:hiddenLine xmlns="" xmlns:a14="http://schemas.microsoft.com/office/drawing/2010/main" w="9525">
                   <a:solidFill>
                     <a:srgbClr val="000000"/>
                   </a:solidFill>
@@ -14015,7 +14024,7 @@
                 </a14:hiddenLine>
               </a:ext>
               <a:ext uri="{AF507438-7753-43e0-B8FC-AC1667EBCBE1}">
-                <a14:hiddenEffects xmlns:a14="http://schemas.microsoft.com/office/drawing/2010/main" xmlns="">
+                <a14:hiddenEffects xmlns="" xmlns:a14="http://schemas.microsoft.com/office/drawing/2010/main">
                   <a:effectLst>
                     <a:outerShdw blurRad="63500" dist="38099" dir="2700000" algn="ctr" rotWithShape="0">
                       <a:srgbClr val="000000">
@@ -14148,7 +14157,7 @@
           <a:effectLst/>
           <a:extLst>
             <a:ext uri="{909E8E84-426E-40dd-AFC4-6F175D3DCCD1}">
-              <a14:hiddenFill xmlns="" xmlns:a14="http://schemas.microsoft.com/office/drawing/2010/main">
+              <a14:hiddenFill xmlns:a14="http://schemas.microsoft.com/office/drawing/2010/main" xmlns="">
                 <a:blipFill dpi="0" rotWithShape="0">
                   <a:blip/>
                   <a:srcRect/>
@@ -14159,7 +14168,7 @@
               </a14:hiddenFill>
             </a:ext>
             <a:ext uri="{91240B29-F687-4f45-9708-019B960494DF}">
-              <a14:hiddenLine xmlns="" xmlns:a14="http://schemas.microsoft.com/office/drawing/2010/main" w="9525">
+              <a14:hiddenLine xmlns:a14="http://schemas.microsoft.com/office/drawing/2010/main" xmlns="" w="9525">
                 <a:solidFill>
                   <a:srgbClr val="000000"/>
                 </a:solidFill>
@@ -14169,7 +14178,7 @@
               </a14:hiddenLine>
             </a:ext>
             <a:ext uri="{AF507438-7753-43e0-B8FC-AC1667EBCBE1}">
-              <a14:hiddenEffects xmlns="" xmlns:a14="http://schemas.microsoft.com/office/drawing/2010/main">
+              <a14:hiddenEffects xmlns:a14="http://schemas.microsoft.com/office/drawing/2010/main" xmlns="">
                 <a:effectLst>
                   <a:outerShdw blurRad="63500" dist="38099" dir="2700000" algn="ctr" rotWithShape="0">
                     <a:srgbClr val="000000">
@@ -14254,7 +14263,7 @@
           <a:effectLst/>
           <a:extLst>
             <a:ext uri="{909E8E84-426E-40dd-AFC4-6F175D3DCCD1}">
-              <a14:hiddenFill xmlns="" xmlns:a14="http://schemas.microsoft.com/office/drawing/2010/main">
+              <a14:hiddenFill xmlns:a14="http://schemas.microsoft.com/office/drawing/2010/main" xmlns="">
                 <a:blipFill dpi="0" rotWithShape="0">
                   <a:blip/>
                   <a:srcRect/>
@@ -14265,7 +14274,7 @@
               </a14:hiddenFill>
             </a:ext>
             <a:ext uri="{91240B29-F687-4f45-9708-019B960494DF}">
-              <a14:hiddenLine xmlns="" xmlns:a14="http://schemas.microsoft.com/office/drawing/2010/main" w="9525">
+              <a14:hiddenLine xmlns:a14="http://schemas.microsoft.com/office/drawing/2010/main" xmlns="" w="9525">
                 <a:solidFill>
                   <a:srgbClr val="000000"/>
                 </a:solidFill>
@@ -14275,7 +14284,7 @@
               </a14:hiddenLine>
             </a:ext>
             <a:ext uri="{AF507438-7753-43e0-B8FC-AC1667EBCBE1}">
-              <a14:hiddenEffects xmlns="" xmlns:a14="http://schemas.microsoft.com/office/drawing/2010/main">
+              <a14:hiddenEffects xmlns:a14="http://schemas.microsoft.com/office/drawing/2010/main" xmlns="">
                 <a:effectLst>
                   <a:outerShdw blurRad="63500" dist="38099" dir="2700000" algn="ctr" rotWithShape="0">
                     <a:srgbClr val="000000">
@@ -14360,7 +14369,7 @@
           <a:effectLst/>
           <a:extLst>
             <a:ext uri="{909E8E84-426E-40dd-AFC4-6F175D3DCCD1}">
-              <a14:hiddenFill xmlns="" xmlns:a14="http://schemas.microsoft.com/office/drawing/2010/main">
+              <a14:hiddenFill xmlns:a14="http://schemas.microsoft.com/office/drawing/2010/main" xmlns="">
                 <a:blipFill dpi="0" rotWithShape="0">
                   <a:blip/>
                   <a:srcRect/>
@@ -14371,7 +14380,7 @@
               </a14:hiddenFill>
             </a:ext>
             <a:ext uri="{91240B29-F687-4f45-9708-019B960494DF}">
-              <a14:hiddenLine xmlns="" xmlns:a14="http://schemas.microsoft.com/office/drawing/2010/main" w="9525">
+              <a14:hiddenLine xmlns:a14="http://schemas.microsoft.com/office/drawing/2010/main" xmlns="" w="9525">
                 <a:solidFill>
                   <a:srgbClr val="000000"/>
                 </a:solidFill>
@@ -14381,7 +14390,7 @@
               </a14:hiddenLine>
             </a:ext>
             <a:ext uri="{AF507438-7753-43e0-B8FC-AC1667EBCBE1}">
-              <a14:hiddenEffects xmlns="" xmlns:a14="http://schemas.microsoft.com/office/drawing/2010/main">
+              <a14:hiddenEffects xmlns:a14="http://schemas.microsoft.com/office/drawing/2010/main" xmlns="">
                 <a:effectLst>
                   <a:outerShdw blurRad="63500" dist="38099" dir="2700000" algn="ctr" rotWithShape="0">
                     <a:srgbClr val="000000">
@@ -14561,7 +14570,7 @@
           <a:effectLst/>
           <a:extLst>
             <a:ext uri="{909E8E84-426E-40dd-AFC4-6F175D3DCCD1}">
-              <a14:hiddenFill xmlns="" xmlns:a14="http://schemas.microsoft.com/office/drawing/2010/main">
+              <a14:hiddenFill xmlns:a14="http://schemas.microsoft.com/office/drawing/2010/main" xmlns="">
                 <a:blipFill dpi="0" rotWithShape="0">
                   <a:blip/>
                   <a:srcRect/>
@@ -14572,7 +14581,7 @@
               </a14:hiddenFill>
             </a:ext>
             <a:ext uri="{91240B29-F687-4f45-9708-019B960494DF}">
-              <a14:hiddenLine xmlns="" xmlns:a14="http://schemas.microsoft.com/office/drawing/2010/main" w="9525">
+              <a14:hiddenLine xmlns:a14="http://schemas.microsoft.com/office/drawing/2010/main" xmlns="" w="9525">
                 <a:solidFill>
                   <a:srgbClr val="000000"/>
                 </a:solidFill>
@@ -14582,7 +14591,7 @@
               </a14:hiddenLine>
             </a:ext>
             <a:ext uri="{AF507438-7753-43e0-B8FC-AC1667EBCBE1}">
-              <a14:hiddenEffects xmlns="" xmlns:a14="http://schemas.microsoft.com/office/drawing/2010/main">
+              <a14:hiddenEffects xmlns:a14="http://schemas.microsoft.com/office/drawing/2010/main" xmlns="">
                 <a:effectLst>
                   <a:outerShdw blurRad="63500" dist="38099" dir="2700000" algn="ctr" rotWithShape="0">
                     <a:srgbClr val="000000">
@@ -14660,7 +14669,7 @@
           <a:effectLst/>
           <a:extLst>
             <a:ext uri="{909E8E84-426E-40dd-AFC4-6F175D3DCCD1}">
-              <a14:hiddenFill xmlns="" xmlns:a14="http://schemas.microsoft.com/office/drawing/2010/main">
+              <a14:hiddenFill xmlns:a14="http://schemas.microsoft.com/office/drawing/2010/main" xmlns="">
                 <a:blipFill dpi="0" rotWithShape="0">
                   <a:blip/>
                   <a:srcRect/>
@@ -14671,7 +14680,7 @@
               </a14:hiddenFill>
             </a:ext>
             <a:ext uri="{91240B29-F687-4f45-9708-019B960494DF}">
-              <a14:hiddenLine xmlns="" xmlns:a14="http://schemas.microsoft.com/office/drawing/2010/main" w="9525">
+              <a14:hiddenLine xmlns:a14="http://schemas.microsoft.com/office/drawing/2010/main" xmlns="" w="9525">
                 <a:solidFill>
                   <a:srgbClr val="000000"/>
                 </a:solidFill>
@@ -14681,7 +14690,7 @@
               </a14:hiddenLine>
             </a:ext>
             <a:ext uri="{AF507438-7753-43e0-B8FC-AC1667EBCBE1}">
-              <a14:hiddenEffects xmlns="" xmlns:a14="http://schemas.microsoft.com/office/drawing/2010/main">
+              <a14:hiddenEffects xmlns:a14="http://schemas.microsoft.com/office/drawing/2010/main" xmlns="">
                 <a:effectLst>
                   <a:outerShdw blurRad="63500" dist="38099" dir="2700000" algn="ctr" rotWithShape="0">
                     <a:srgbClr val="000000">
@@ -16495,7 +16504,7 @@
           <a:effectLst/>
           <a:extLst>
             <a:ext uri="{909E8E84-426E-40dd-AFC4-6F175D3DCCD1}">
-              <a14:hiddenFill xmlns:a14="http://schemas.microsoft.com/office/drawing/2010/main" xmlns="">
+              <a14:hiddenFill xmlns="" xmlns:a14="http://schemas.microsoft.com/office/drawing/2010/main">
                 <a:blipFill dpi="0" rotWithShape="0">
                   <a:blip/>
                   <a:srcRect/>
@@ -16506,7 +16515,7 @@
               </a14:hiddenFill>
             </a:ext>
             <a:ext uri="{91240B29-F687-4f45-9708-019B960494DF}">
-              <a14:hiddenLine xmlns:a14="http://schemas.microsoft.com/office/drawing/2010/main" xmlns="" w="9525">
+              <a14:hiddenLine xmlns="" xmlns:a14="http://schemas.microsoft.com/office/drawing/2010/main" w="9525">
                 <a:solidFill>
                   <a:srgbClr val="000000"/>
                 </a:solidFill>
@@ -16516,7 +16525,7 @@
               </a14:hiddenLine>
             </a:ext>
             <a:ext uri="{AF507438-7753-43e0-B8FC-AC1667EBCBE1}">
-              <a14:hiddenEffects xmlns:a14="http://schemas.microsoft.com/office/drawing/2010/main" xmlns="">
+              <a14:hiddenEffects xmlns="" xmlns:a14="http://schemas.microsoft.com/office/drawing/2010/main">
                 <a:effectLst>
                   <a:outerShdw blurRad="63500" dist="38099" dir="2700000" algn="ctr" rotWithShape="0">
                     <a:srgbClr val="000000">
@@ -18005,7 +18014,7 @@
           <a:effectLst/>
           <a:extLst>
             <a:ext uri="{909E8E84-426E-40dd-AFC4-6F175D3DCCD1}">
-              <a14:hiddenFill xmlns:a14="http://schemas.microsoft.com/office/drawing/2010/main" xmlns="">
+              <a14:hiddenFill xmlns="" xmlns:a14="http://schemas.microsoft.com/office/drawing/2010/main">
                 <a:blipFill dpi="0" rotWithShape="0">
                   <a:blip/>
                   <a:srcRect/>
@@ -18016,7 +18025,7 @@
               </a14:hiddenFill>
             </a:ext>
             <a:ext uri="{91240B29-F687-4f45-9708-019B960494DF}">
-              <a14:hiddenLine xmlns:a14="http://schemas.microsoft.com/office/drawing/2010/main" xmlns="" w="9525">
+              <a14:hiddenLine xmlns="" xmlns:a14="http://schemas.microsoft.com/office/drawing/2010/main" w="9525">
                 <a:solidFill>
                   <a:srgbClr val="000000"/>
                 </a:solidFill>
@@ -18026,7 +18035,7 @@
               </a14:hiddenLine>
             </a:ext>
             <a:ext uri="{AF507438-7753-43e0-B8FC-AC1667EBCBE1}">
-              <a14:hiddenEffects xmlns:a14="http://schemas.microsoft.com/office/drawing/2010/main" xmlns="">
+              <a14:hiddenEffects xmlns="" xmlns:a14="http://schemas.microsoft.com/office/drawing/2010/main">
                 <a:effectLst>
                   <a:outerShdw blurRad="63500" dist="38099" dir="2700000" algn="ctr" rotWithShape="0">
                     <a:srgbClr val="000000">
@@ -19511,7 +19520,7 @@
           <a:effectLst/>
           <a:extLst>
             <a:ext uri="{909E8E84-426E-40dd-AFC4-6F175D3DCCD1}">
-              <a14:hiddenFill xmlns:a14="http://schemas.microsoft.com/office/drawing/2010/main" xmlns="">
+              <a14:hiddenFill xmlns="" xmlns:a14="http://schemas.microsoft.com/office/drawing/2010/main">
                 <a:blipFill dpi="0" rotWithShape="0">
                   <a:blip/>
                   <a:srcRect/>
@@ -19522,7 +19531,7 @@
               </a14:hiddenFill>
             </a:ext>
             <a:ext uri="{91240B29-F687-4f45-9708-019B960494DF}">
-              <a14:hiddenLine xmlns:a14="http://schemas.microsoft.com/office/drawing/2010/main" xmlns="" w="9525">
+              <a14:hiddenLine xmlns="" xmlns:a14="http://schemas.microsoft.com/office/drawing/2010/main" w="9525">
                 <a:solidFill>
                   <a:srgbClr val="000000"/>
                 </a:solidFill>
@@ -19532,7 +19541,7 @@
               </a14:hiddenLine>
             </a:ext>
             <a:ext uri="{AF507438-7753-43e0-B8FC-AC1667EBCBE1}">
-              <a14:hiddenEffects xmlns:a14="http://schemas.microsoft.com/office/drawing/2010/main" xmlns="">
+              <a14:hiddenEffects xmlns="" xmlns:a14="http://schemas.microsoft.com/office/drawing/2010/main">
                 <a:effectLst>
                   <a:outerShdw blurRad="63500" dist="38099" dir="2700000" algn="ctr" rotWithShape="0">
                     <a:srgbClr val="000000">
@@ -19686,7 +19695,7 @@
           <a:effectLst/>
           <a:extLst>
             <a:ext uri="{909E8E84-426E-40dd-AFC4-6F175D3DCCD1}">
-              <a14:hiddenFill xmlns:a14="http://schemas.microsoft.com/office/drawing/2010/main" xmlns="">
+              <a14:hiddenFill xmlns="" xmlns:a14="http://schemas.microsoft.com/office/drawing/2010/main">
                 <a:blipFill dpi="0" rotWithShape="0">
                   <a:blip/>
                   <a:srcRect/>
@@ -19697,7 +19706,7 @@
               </a14:hiddenFill>
             </a:ext>
             <a:ext uri="{91240B29-F687-4f45-9708-019B960494DF}">
-              <a14:hiddenLine xmlns:a14="http://schemas.microsoft.com/office/drawing/2010/main" xmlns="" w="9525">
+              <a14:hiddenLine xmlns="" xmlns:a14="http://schemas.microsoft.com/office/drawing/2010/main" w="9525">
                 <a:solidFill>
                   <a:srgbClr val="000000"/>
                 </a:solidFill>
@@ -19707,7 +19716,7 @@
               </a14:hiddenLine>
             </a:ext>
             <a:ext uri="{AF507438-7753-43e0-B8FC-AC1667EBCBE1}">
-              <a14:hiddenEffects xmlns:a14="http://schemas.microsoft.com/office/drawing/2010/main" xmlns="">
+              <a14:hiddenEffects xmlns="" xmlns:a14="http://schemas.microsoft.com/office/drawing/2010/main">
                 <a:effectLst>
                   <a:outerShdw blurRad="63500" dist="38099" dir="2700000" algn="ctr" rotWithShape="0">
                     <a:srgbClr val="000000">
@@ -21500,7 +21509,7 @@
           <a:effectLst/>
           <a:extLst>
             <a:ext uri="{909E8E84-426E-40dd-AFC4-6F175D3DCCD1}">
-              <a14:hiddenFill xmlns:a14="http://schemas.microsoft.com/office/drawing/2010/main" xmlns="">
+              <a14:hiddenFill xmlns="" xmlns:a14="http://schemas.microsoft.com/office/drawing/2010/main">
                 <a:blipFill dpi="0" rotWithShape="0">
                   <a:blip/>
                   <a:srcRect/>
@@ -21511,7 +21520,7 @@
               </a14:hiddenFill>
             </a:ext>
             <a:ext uri="{91240B29-F687-4f45-9708-019B960494DF}">
-              <a14:hiddenLine xmlns:a14="http://schemas.microsoft.com/office/drawing/2010/main" xmlns="" w="9525">
+              <a14:hiddenLine xmlns="" xmlns:a14="http://schemas.microsoft.com/office/drawing/2010/main" w="9525">
                 <a:solidFill>
                   <a:srgbClr val="000000"/>
                 </a:solidFill>
@@ -21521,7 +21530,7 @@
               </a14:hiddenLine>
             </a:ext>
             <a:ext uri="{AF507438-7753-43e0-B8FC-AC1667EBCBE1}">
-              <a14:hiddenEffects xmlns:a14="http://schemas.microsoft.com/office/drawing/2010/main" xmlns="">
+              <a14:hiddenEffects xmlns="" xmlns:a14="http://schemas.microsoft.com/office/drawing/2010/main">
                 <a:effectLst>
                   <a:outerShdw blurRad="63500" dist="38099" dir="2700000" algn="ctr" rotWithShape="0">
                     <a:srgbClr val="000000">
@@ -24476,7 +24485,7 @@
           <a:effectLst/>
           <a:extLst>
             <a:ext uri="{909E8E84-426E-40dd-AFC4-6F175D3DCCD1}">
-              <a14:hiddenFill xmlns:a14="http://schemas.microsoft.com/office/drawing/2010/main" xmlns="">
+              <a14:hiddenFill xmlns="" xmlns:a14="http://schemas.microsoft.com/office/drawing/2010/main">
                 <a:blipFill dpi="0" rotWithShape="0">
                   <a:blip/>
                   <a:srcRect/>
@@ -24487,7 +24496,7 @@
               </a14:hiddenFill>
             </a:ext>
             <a:ext uri="{91240B29-F687-4f45-9708-019B960494DF}">
-              <a14:hiddenLine xmlns:a14="http://schemas.microsoft.com/office/drawing/2010/main" xmlns="" w="9525">
+              <a14:hiddenLine xmlns="" xmlns:a14="http://schemas.microsoft.com/office/drawing/2010/main" w="9525">
                 <a:solidFill>
                   <a:srgbClr val="000000"/>
                 </a:solidFill>
@@ -24497,7 +24506,7 @@
               </a14:hiddenLine>
             </a:ext>
             <a:ext uri="{AF507438-7753-43e0-B8FC-AC1667EBCBE1}">
-              <a14:hiddenEffects xmlns:a14="http://schemas.microsoft.com/office/drawing/2010/main" xmlns="">
+              <a14:hiddenEffects xmlns="" xmlns:a14="http://schemas.microsoft.com/office/drawing/2010/main">
                 <a:effectLst>
                   <a:outerShdw blurRad="63500" dist="38099" dir="2700000" algn="ctr" rotWithShape="0">
                     <a:srgbClr val="000000">
@@ -24576,7 +24585,7 @@
           <a:effectLst/>
           <a:extLst>
             <a:ext uri="{909E8E84-426E-40dd-AFC4-6F175D3DCCD1}">
-              <a14:hiddenFill xmlns:a14="http://schemas.microsoft.com/office/drawing/2010/main" xmlns="">
+              <a14:hiddenFill xmlns="" xmlns:a14="http://schemas.microsoft.com/office/drawing/2010/main">
                 <a:blipFill dpi="0" rotWithShape="0">
                   <a:blip/>
                   <a:srcRect/>
@@ -24587,7 +24596,7 @@
               </a14:hiddenFill>
             </a:ext>
             <a:ext uri="{91240B29-F687-4f45-9708-019B960494DF}">
-              <a14:hiddenLine xmlns:a14="http://schemas.microsoft.com/office/drawing/2010/main" xmlns="" w="9525">
+              <a14:hiddenLine xmlns="" xmlns:a14="http://schemas.microsoft.com/office/drawing/2010/main" w="9525">
                 <a:solidFill>
                   <a:srgbClr val="000000"/>
                 </a:solidFill>
@@ -24597,7 +24606,7 @@
               </a14:hiddenLine>
             </a:ext>
             <a:ext uri="{AF507438-7753-43e0-B8FC-AC1667EBCBE1}">
-              <a14:hiddenEffects xmlns:a14="http://schemas.microsoft.com/office/drawing/2010/main" xmlns="">
+              <a14:hiddenEffects xmlns="" xmlns:a14="http://schemas.microsoft.com/office/drawing/2010/main">
                 <a:effectLst>
                   <a:outerShdw blurRad="63500" dist="38099" dir="2700000" algn="ctr" rotWithShape="0">
                     <a:srgbClr val="000000">
@@ -26192,7 +26201,7 @@
           <a:effectLst/>
           <a:extLst>
             <a:ext uri="{909E8E84-426E-40dd-AFC4-6F175D3DCCD1}">
-              <a14:hiddenFill xmlns:a14="http://schemas.microsoft.com/office/drawing/2010/main" xmlns="">
+              <a14:hiddenFill xmlns="" xmlns:a14="http://schemas.microsoft.com/office/drawing/2010/main">
                 <a:blipFill dpi="0" rotWithShape="0">
                   <a:blip/>
                   <a:srcRect/>
@@ -26203,7 +26212,7 @@
               </a14:hiddenFill>
             </a:ext>
             <a:ext uri="{91240B29-F687-4f45-9708-019B960494DF}">
-              <a14:hiddenLine xmlns:a14="http://schemas.microsoft.com/office/drawing/2010/main" xmlns="" w="9525">
+              <a14:hiddenLine xmlns="" xmlns:a14="http://schemas.microsoft.com/office/drawing/2010/main" w="9525">
                 <a:solidFill>
                   <a:srgbClr val="000000"/>
                 </a:solidFill>
@@ -26213,7 +26222,7 @@
               </a14:hiddenLine>
             </a:ext>
             <a:ext uri="{AF507438-7753-43e0-B8FC-AC1667EBCBE1}">
-              <a14:hiddenEffects xmlns:a14="http://schemas.microsoft.com/office/drawing/2010/main" xmlns="">
+              <a14:hiddenEffects xmlns="" xmlns:a14="http://schemas.microsoft.com/office/drawing/2010/main">
                 <a:effectLst>
                   <a:outerShdw blurRad="63500" dist="38099" dir="2700000" algn="ctr" rotWithShape="0">
                     <a:srgbClr val="000000">
@@ -27861,7 +27870,7 @@
           <a:effectLst/>
           <a:extLst>
             <a:ext uri="{909E8E84-426E-40dd-AFC4-6F175D3DCCD1}">
-              <a14:hiddenFill xmlns:a14="http://schemas.microsoft.com/office/drawing/2010/main" xmlns="">
+              <a14:hiddenFill xmlns="" xmlns:a14="http://schemas.microsoft.com/office/drawing/2010/main">
                 <a:blipFill dpi="0" rotWithShape="0">
                   <a:blip/>
                   <a:srcRect/>
@@ -27872,7 +27881,7 @@
               </a14:hiddenFill>
             </a:ext>
             <a:ext uri="{91240B29-F687-4f45-9708-019B960494DF}">
-              <a14:hiddenLine xmlns:a14="http://schemas.microsoft.com/office/drawing/2010/main" xmlns="" w="9525">
+              <a14:hiddenLine xmlns="" xmlns:a14="http://schemas.microsoft.com/office/drawing/2010/main" w="9525">
                 <a:solidFill>
                   <a:srgbClr val="000000"/>
                 </a:solidFill>
@@ -27882,7 +27891,7 @@
               </a14:hiddenLine>
             </a:ext>
             <a:ext uri="{AF507438-7753-43e0-B8FC-AC1667EBCBE1}">
-              <a14:hiddenEffects xmlns:a14="http://schemas.microsoft.com/office/drawing/2010/main" xmlns="">
+              <a14:hiddenEffects xmlns="" xmlns:a14="http://schemas.microsoft.com/office/drawing/2010/main">
                 <a:effectLst>
                   <a:outerShdw blurRad="63500" dist="38099" dir="2700000" algn="ctr" rotWithShape="0">
                     <a:srgbClr val="000000">
@@ -29168,7 +29177,7 @@
         </p:nvSpPr>
         <p:spPr>
           <a:xfrm>
-            <a:off x="3794525" y="3713753"/>
+            <a:off x="3794525" y="3646847"/>
             <a:ext cx="444352" cy="523220"/>
           </a:xfrm>
           <a:prstGeom prst="rect">
@@ -29200,7 +29209,7 @@
         </p:nvSpPr>
         <p:spPr>
           <a:xfrm>
-            <a:off x="4883233" y="3720848"/>
+            <a:off x="4883233" y="3653942"/>
             <a:ext cx="556563" cy="523220"/>
           </a:xfrm>
           <a:prstGeom prst="rect">
@@ -29398,7 +29407,7 @@
           <a:effectLst/>
           <a:extLst>
             <a:ext uri="{909E8E84-426E-40dd-AFC4-6F175D3DCCD1}">
-              <a14:hiddenFill xmlns:a14="http://schemas.microsoft.com/office/drawing/2010/main" xmlns="">
+              <a14:hiddenFill xmlns="" xmlns:a14="http://schemas.microsoft.com/office/drawing/2010/main">
                 <a:blipFill dpi="0" rotWithShape="0">
                   <a:blip/>
                   <a:srcRect/>
@@ -29409,7 +29418,7 @@
               </a14:hiddenFill>
             </a:ext>
             <a:ext uri="{91240B29-F687-4f45-9708-019B960494DF}">
-              <a14:hiddenLine xmlns:a14="http://schemas.microsoft.com/office/drawing/2010/main" xmlns="" w="9525">
+              <a14:hiddenLine xmlns="" xmlns:a14="http://schemas.microsoft.com/office/drawing/2010/main" w="9525">
                 <a:solidFill>
                   <a:srgbClr val="000000"/>
                 </a:solidFill>
@@ -29419,7 +29428,7 @@
               </a14:hiddenLine>
             </a:ext>
             <a:ext uri="{AF507438-7753-43e0-B8FC-AC1667EBCBE1}">
-              <a14:hiddenEffects xmlns:a14="http://schemas.microsoft.com/office/drawing/2010/main" xmlns="">
+              <a14:hiddenEffects xmlns="" xmlns:a14="http://schemas.microsoft.com/office/drawing/2010/main">
                 <a:effectLst>
                   <a:outerShdw blurRad="63500" dist="38099" dir="2700000" algn="ctr" rotWithShape="0">
                     <a:srgbClr val="000000">
@@ -29550,7 +29559,7 @@
           <a:effectLst/>
           <a:extLst>
             <a:ext uri="{909E8E84-426E-40dd-AFC4-6F175D3DCCD1}">
-              <a14:hiddenFill xmlns:a14="http://schemas.microsoft.com/office/drawing/2010/main" xmlns="">
+              <a14:hiddenFill xmlns="" xmlns:a14="http://schemas.microsoft.com/office/drawing/2010/main">
                 <a:blipFill dpi="0" rotWithShape="0">
                   <a:blip/>
                   <a:srcRect/>
@@ -29561,7 +29570,7 @@
               </a14:hiddenFill>
             </a:ext>
             <a:ext uri="{91240B29-F687-4f45-9708-019B960494DF}">
-              <a14:hiddenLine xmlns:a14="http://schemas.microsoft.com/office/drawing/2010/main" xmlns="" w="9525">
+              <a14:hiddenLine xmlns="" xmlns:a14="http://schemas.microsoft.com/office/drawing/2010/main" w="9525">
                 <a:solidFill>
                   <a:srgbClr val="000000"/>
                 </a:solidFill>
@@ -29571,7 +29580,7 @@
               </a14:hiddenLine>
             </a:ext>
             <a:ext uri="{AF507438-7753-43e0-B8FC-AC1667EBCBE1}">
-              <a14:hiddenEffects xmlns:a14="http://schemas.microsoft.com/office/drawing/2010/main" xmlns="">
+              <a14:hiddenEffects xmlns="" xmlns:a14="http://schemas.microsoft.com/office/drawing/2010/main">
                 <a:effectLst>
                   <a:outerShdw blurRad="63500" dist="38099" dir="2700000" algn="ctr" rotWithShape="0">
                     <a:srgbClr val="000000">
@@ -30205,7 +30214,23 @@
           <a:p>
             <a:r>
               <a:rPr lang="en-US" dirty="0"/>
-              <a:t>The Merge operation</a:t>
+              <a:t>Correctness of </a:t>
+            </a:r>
+            <a:r>
+              <a:rPr lang="en-US"/>
+              <a:t>the </a:t>
+            </a:r>
+            <a:r>
+              <a:rPr lang="en-US" dirty="0"/>
+              <a:t>m</a:t>
+            </a:r>
+            <a:r>
+              <a:rPr lang="en-US"/>
+              <a:t>erge </a:t>
+            </a:r>
+            <a:r>
+              <a:rPr lang="en-US" dirty="0"/>
+              <a:t>operation</a:t>
             </a:r>
           </a:p>
         </p:txBody>
@@ -30244,7 +30269,31 @@
                 <a:ea typeface="Ayuthaya" charset="-34"/>
                 <a:cs typeface="Ayuthaya" charset="-34"/>
               </a:rPr>
-              <a:t>merge(g([</a:t>
+              <a:t>merge(g([p</a:t>
+            </a:r>
+            <a:r>
+              <a:rPr lang="en-US" sz="5200" baseline="-25000" dirty="0">
+                <a:latin typeface="Ayuthaya" charset="-34"/>
+                <a:ea typeface="Ayuthaya" charset="-34"/>
+                <a:cs typeface="Ayuthaya" charset="-34"/>
+              </a:rPr>
+              <a:t>i</a:t>
+            </a:r>
+            <a:r>
+              <a:rPr lang="is-IS" sz="5200" dirty="0">
+                <a:latin typeface="Ayuthaya" charset="-34"/>
+                <a:ea typeface="Ayuthaya" charset="-34"/>
+                <a:cs typeface="Ayuthaya" charset="-34"/>
+              </a:rPr>
+              <a:t>]</a:t>
+            </a:r>
+            <a:r>
+              <a:rPr lang="en-US" sz="5200" dirty="0">
+                <a:latin typeface="Ayuthaya" charset="-34"/>
+                <a:ea typeface="Ayuthaya" charset="-34"/>
+                <a:cs typeface="Ayuthaya" charset="-34"/>
+              </a:rPr>
+              <a:t>), g([</a:t>
             </a:r>
             <a:r>
               <a:rPr lang="en-US" sz="5200" dirty="0" err="1">
@@ -30268,31 +30317,7 @@
                 <a:ea typeface="Ayuthaya" charset="-34"/>
                 <a:cs typeface="Ayuthaya" charset="-34"/>
               </a:rPr>
-              <a:t>]), g([p</a:t>
-            </a:r>
-            <a:r>
-              <a:rPr lang="en-US" sz="5200" baseline="-25000" dirty="0">
-                <a:latin typeface="Ayuthaya" charset="-34"/>
-                <a:ea typeface="Ayuthaya" charset="-34"/>
-                <a:cs typeface="Ayuthaya" charset="-34"/>
-              </a:rPr>
-              <a:t>i</a:t>
-            </a:r>
-            <a:r>
-              <a:rPr lang="is-IS" sz="5200" dirty="0">
-                <a:latin typeface="Ayuthaya" charset="-34"/>
-                <a:ea typeface="Ayuthaya" charset="-34"/>
-                <a:cs typeface="Ayuthaya" charset="-34"/>
-              </a:rPr>
-              <a:t>]</a:t>
-            </a:r>
-            <a:r>
-              <a:rPr lang="en-US" sz="5200" dirty="0">
-                <a:latin typeface="Ayuthaya" charset="-34"/>
-                <a:ea typeface="Ayuthaya" charset="-34"/>
-                <a:cs typeface="Ayuthaya" charset="-34"/>
-              </a:rPr>
-              <a:t>)) </a:t>
+              <a:t>])) </a:t>
             </a:r>
           </a:p>
           <a:p>
@@ -30395,7 +30420,7 @@
         </p:nvSpPr>
         <p:spPr>
           <a:xfrm>
-            <a:off x="4751715" y="1027906"/>
+            <a:off x="7152103" y="1250926"/>
             <a:ext cx="1982492" cy="707886"/>
           </a:xfrm>
           <a:prstGeom prst="rect">
@@ -30442,7 +30467,7 @@
         </p:nvSpPr>
         <p:spPr>
           <a:xfrm rot="16200000">
-            <a:off x="5279321" y="911860"/>
+            <a:off x="5279321" y="1134880"/>
             <a:ext cx="462749" cy="1932612"/>
           </a:xfrm>
           <a:prstGeom prst="rightBrace">
@@ -30485,7 +30510,7 @@
         </p:nvSpPr>
         <p:spPr>
           <a:xfrm>
-            <a:off x="7125518" y="967787"/>
+            <a:off x="4467925" y="1259789"/>
             <a:ext cx="1982492" cy="707886"/>
           </a:xfrm>
           <a:prstGeom prst="rect">
@@ -30532,7 +30557,7 @@
         </p:nvSpPr>
         <p:spPr>
           <a:xfrm rot="16200000">
-            <a:off x="7903385" y="839662"/>
+            <a:off x="7903385" y="1062682"/>
             <a:ext cx="462748" cy="2018482"/>
           </a:xfrm>
           <a:prstGeom prst="rightBrace">
@@ -30575,7 +30600,7 @@
         </p:nvSpPr>
         <p:spPr>
           <a:xfrm rot="5400000">
-            <a:off x="6243194" y="919456"/>
+            <a:off x="6064778" y="807946"/>
             <a:ext cx="591596" cy="6270449"/>
           </a:xfrm>
           <a:prstGeom prst="rightBrace">
@@ -30618,7 +30643,7 @@
         </p:nvSpPr>
         <p:spPr>
           <a:xfrm>
-            <a:off x="2409984" y="4365748"/>
+            <a:off x="2120054" y="4075822"/>
             <a:ext cx="8258016" cy="523220"/>
           </a:xfrm>
           <a:prstGeom prst="rect">
@@ -30691,7 +30716,7 @@
                             </p:stCondLst>
                             <p:childTnLst>
                               <p:par>
-                                <p:cTn id="5" presetID="1" presetClass="entr" presetSubtype="0" fill="hold" grpId="0" nodeType="clickEffect">
+                                <p:cTn id="5" presetID="1" presetClass="entr" presetSubtype="0" fill="hold" nodeType="clickEffect">
                                   <p:stCondLst>
                                     <p:cond delay="0"/>
                                   </p:stCondLst>
@@ -30704,7 +30729,11 @@
                                           </p:stCondLst>
                                         </p:cTn>
                                         <p:tgtEl>
-                                          <p:spTgt spid="16"/>
+                                          <p:spTgt spid="3">
+                                            <p:txEl>
+                                              <p:pRg st="1" end="1"/>
+                                            </p:txEl>
+                                          </p:spTgt>
                                         </p:tgtEl>
                                         <p:attrNameLst>
                                           <p:attrName>style.visibility</p:attrName>
@@ -30718,7 +30747,7 @@
                                 </p:cTn>
                               </p:par>
                               <p:par>
-                                <p:cTn id="7" presetID="1" presetClass="entr" presetSubtype="0" fill="hold" grpId="0" nodeType="withEffect">
+                                <p:cTn id="7" presetID="1" presetClass="entr" presetSubtype="0" fill="hold" nodeType="withEffect">
                                   <p:stCondLst>
                                     <p:cond delay="0"/>
                                   </p:stCondLst>
@@ -30731,7 +30760,11 @@
                                           </p:stCondLst>
                                         </p:cTn>
                                         <p:tgtEl>
-                                          <p:spTgt spid="15"/>
+                                          <p:spTgt spid="3">
+                                            <p:txEl>
+                                              <p:pRg st="3" end="3"/>
+                                            </p:txEl>
+                                          </p:spTgt>
                                         </p:tgtEl>
                                         <p:attrNameLst>
                                           <p:attrName>style.visibility</p:attrName>
@@ -30776,7 +30809,7 @@
                                           </p:stCondLst>
                                         </p:cTn>
                                         <p:tgtEl>
-                                          <p:spTgt spid="19"/>
+                                          <p:spTgt spid="18"/>
                                         </p:tgtEl>
                                         <p:attrNameLst>
                                           <p:attrName>style.visibility</p:attrName>
@@ -30803,7 +30836,7 @@
                                           </p:stCondLst>
                                         </p:cTn>
                                         <p:tgtEl>
-                                          <p:spTgt spid="18"/>
+                                          <p:spTgt spid="16"/>
                                         </p:tgtEl>
                                         <p:attrNameLst>
                                           <p:attrName>style.visibility</p:attrName>
@@ -30835,7 +30868,7 @@
                             </p:stCondLst>
                             <p:childTnLst>
                               <p:par>
-                                <p:cTn id="17" presetID="1" presetClass="entr" presetSubtype="0" fill="hold" nodeType="clickEffect">
+                                <p:cTn id="17" presetID="1" presetClass="entr" presetSubtype="0" fill="hold" grpId="0" nodeType="clickEffect">
                                   <p:stCondLst>
                                     <p:cond delay="0"/>
                                   </p:stCondLst>
@@ -30848,11 +30881,34 @@
                                           </p:stCondLst>
                                         </p:cTn>
                                         <p:tgtEl>
-                                          <p:spTgt spid="3">
-                                            <p:txEl>
-                                              <p:pRg st="3" end="3"/>
-                                            </p:txEl>
-                                          </p:spTgt>
+                                          <p:spTgt spid="19"/>
+                                        </p:tgtEl>
+                                        <p:attrNameLst>
+                                          <p:attrName>style.visibility</p:attrName>
+                                        </p:attrNameLst>
+                                      </p:cBhvr>
+                                      <p:to>
+                                        <p:strVal val="visible"/>
+                                      </p:to>
+                                    </p:set>
+                                  </p:childTnLst>
+                                </p:cTn>
+                              </p:par>
+                              <p:par>
+                                <p:cTn id="19" presetID="1" presetClass="entr" presetSubtype="0" fill="hold" grpId="0" nodeType="withEffect">
+                                  <p:stCondLst>
+                                    <p:cond delay="0"/>
+                                  </p:stCondLst>
+                                  <p:childTnLst>
+                                    <p:set>
+                                      <p:cBhvr>
+                                        <p:cTn id="20" dur="1" fill="hold">
+                                          <p:stCondLst>
+                                            <p:cond delay="0"/>
+                                          </p:stCondLst>
+                                        </p:cTn>
+                                        <p:tgtEl>
+                                          <p:spTgt spid="15"/>
                                         </p:tgtEl>
                                         <p:attrNameLst>
                                           <p:attrName>style.visibility</p:attrName>
@@ -30872,26 +30928,26 @@
                     </p:cTn>
                   </p:par>
                   <p:par>
-                    <p:cTn id="19" fill="hold">
+                    <p:cTn id="21" fill="hold">
                       <p:stCondLst>
                         <p:cond delay="indefinite"/>
                       </p:stCondLst>
                       <p:childTnLst>
                         <p:par>
-                          <p:cTn id="20" fill="hold">
+                          <p:cTn id="22" fill="hold">
                             <p:stCondLst>
                               <p:cond delay="0"/>
                             </p:stCondLst>
                             <p:childTnLst>
                               <p:par>
-                                <p:cTn id="21" presetID="1" presetClass="entr" presetSubtype="0" fill="hold" grpId="0" nodeType="clickEffect">
+                                <p:cTn id="23" presetID="1" presetClass="entr" presetSubtype="0" fill="hold" grpId="0" nodeType="clickEffect">
                                   <p:stCondLst>
                                     <p:cond delay="0"/>
                                   </p:stCondLst>
                                   <p:childTnLst>
                                     <p:set>
                                       <p:cBhvr>
-                                        <p:cTn id="22" dur="1" fill="hold">
+                                        <p:cTn id="24" dur="1" fill="hold">
                                           <p:stCondLst>
                                             <p:cond delay="0"/>
                                           </p:stCondLst>
@@ -30911,14 +30967,14 @@
                                 </p:cTn>
                               </p:par>
                               <p:par>
-                                <p:cTn id="23" presetID="1" presetClass="entr" presetSubtype="0" fill="hold" grpId="0" nodeType="withEffect">
+                                <p:cTn id="25" presetID="1" presetClass="entr" presetSubtype="0" fill="hold" grpId="0" nodeType="withEffect">
                                   <p:stCondLst>
                                     <p:cond delay="0"/>
                                   </p:stCondLst>
                                   <p:childTnLst>
                                     <p:set>
                                       <p:cBhvr>
-                                        <p:cTn id="24" dur="1" fill="hold">
+                                        <p:cTn id="26" dur="1" fill="hold">
                                           <p:stCondLst>
                                             <p:cond delay="0"/>
                                           </p:stCondLst>
@@ -30944,26 +31000,26 @@
                     </p:cTn>
                   </p:par>
                   <p:par>
-                    <p:cTn id="25" fill="hold">
+                    <p:cTn id="27" fill="hold">
                       <p:stCondLst>
                         <p:cond delay="indefinite"/>
                       </p:stCondLst>
                       <p:childTnLst>
                         <p:par>
-                          <p:cTn id="26" fill="hold">
+                          <p:cTn id="28" fill="hold">
                             <p:stCondLst>
                               <p:cond delay="0"/>
                             </p:stCondLst>
                             <p:childTnLst>
                               <p:par>
-                                <p:cTn id="27" presetID="1" presetClass="entr" presetSubtype="0" fill="hold" nodeType="clickEffect">
+                                <p:cTn id="29" presetID="1" presetClass="entr" presetSubtype="0" fill="hold" nodeType="clickEffect">
                                   <p:stCondLst>
                                     <p:cond delay="0"/>
                                   </p:stCondLst>
                                   <p:childTnLst>
                                     <p:set>
                                       <p:cBhvr>
-                                        <p:cTn id="28" dur="1" fill="hold">
+                                        <p:cTn id="30" dur="1" fill="hold">
                                           <p:stCondLst>
                                             <p:cond delay="0"/>
                                           </p:stCondLst>
@@ -30993,26 +31049,26 @@
                     </p:cTn>
                   </p:par>
                   <p:par>
-                    <p:cTn id="29" fill="hold">
+                    <p:cTn id="31" fill="hold">
                       <p:stCondLst>
                         <p:cond delay="indefinite"/>
                       </p:stCondLst>
                       <p:childTnLst>
                         <p:par>
-                          <p:cTn id="30" fill="hold">
+                          <p:cTn id="32" fill="hold">
                             <p:stCondLst>
                               <p:cond delay="0"/>
                             </p:stCondLst>
                             <p:childTnLst>
                               <p:par>
-                                <p:cTn id="31" presetID="1" presetClass="entr" presetSubtype="0" fill="hold" nodeType="clickEffect">
+                                <p:cTn id="33" presetID="1" presetClass="entr" presetSubtype="0" fill="hold" nodeType="clickEffect">
                                   <p:stCondLst>
                                     <p:cond delay="0"/>
                                   </p:stCondLst>
                                   <p:childTnLst>
                                     <p:set>
                                       <p:cBhvr>
-                                        <p:cTn id="32" dur="1" fill="hold">
+                                        <p:cTn id="34" dur="1" fill="hold">
                                           <p:stCondLst>
                                             <p:cond delay="0"/>
                                           </p:stCondLst>
@@ -37491,7 +37547,7 @@
           <a:effectLst/>
           <a:extLst>
             <a:ext uri="{909E8E84-426E-40dd-AFC4-6F175D3DCCD1}">
-              <a14:hiddenFill xmlns="" xmlns:a14="http://schemas.microsoft.com/office/drawing/2010/main">
+              <a14:hiddenFill xmlns:a14="http://schemas.microsoft.com/office/drawing/2010/main" xmlns="">
                 <a:blipFill dpi="0" rotWithShape="0">
                   <a:blip/>
                   <a:srcRect/>
@@ -37502,7 +37558,7 @@
               </a14:hiddenFill>
             </a:ext>
             <a:ext uri="{91240B29-F687-4f45-9708-019B960494DF}">
-              <a14:hiddenLine xmlns="" xmlns:a14="http://schemas.microsoft.com/office/drawing/2010/main" w="9525">
+              <a14:hiddenLine xmlns:a14="http://schemas.microsoft.com/office/drawing/2010/main" xmlns="" w="9525">
                 <a:solidFill>
                   <a:srgbClr val="000000"/>
                 </a:solidFill>
@@ -37512,7 +37568,7 @@
               </a14:hiddenLine>
             </a:ext>
             <a:ext uri="{AF507438-7753-43e0-B8FC-AC1667EBCBE1}">
-              <a14:hiddenEffects xmlns="" xmlns:a14="http://schemas.microsoft.com/office/drawing/2010/main">
+              <a14:hiddenEffects xmlns:a14="http://schemas.microsoft.com/office/drawing/2010/main" xmlns="">
                 <a:effectLst>
                   <a:outerShdw blurRad="63500" dist="38099" dir="2700000" algn="ctr" rotWithShape="0">
                     <a:srgbClr val="000000">
@@ -37699,7 +37755,7 @@
             <a:pPr algn="ctr"/>
             <a:r>
               <a:rPr lang="en-US" sz="4000" dirty="0"/>
-              <a:t>We want to build “future-proof” hardware:</a:t>
+              <a:t>We want to build future-proof hardware:</a:t>
             </a:r>
           </a:p>
           <a:p>

</xml_diff>

<commit_message>
Change the title slide
</commit_message>
<xml_diff>
--- a/marple_itx18.pptx
+++ b/marple_itx18.pptx
@@ -7709,7 +7709,7 @@
         </p:nvSpPr>
         <p:spPr>
           <a:xfrm>
-            <a:off x="476865" y="2421092"/>
+            <a:off x="476864" y="4950384"/>
             <a:ext cx="11238271" cy="1764217"/>
           </a:xfrm>
         </p:spPr>
@@ -7720,8 +7720,12 @@
           <a:lstStyle/>
           <a:p>
             <a:r>
+              <a:rPr lang="en-US" sz="3200"/>
+              <a:t>Joint </a:t>
+            </a:r>
+            <a:r>
               <a:rPr lang="en-US" sz="3200" dirty="0"/>
-              <a:t>Srinivas Narayana</a:t>
+              <a:t>work with Srinivas Narayana</a:t>
             </a:r>
             <a:r>
               <a:rPr lang="en-US" sz="3200" b="1" dirty="0"/>
@@ -7732,22 +7736,6 @@
               <a:t> </a:t>
             </a:r>
             <a:r>
-              <a:rPr lang="en-US" sz="3200" b="1" dirty="0" err="1"/>
-              <a:t>Anirudh</a:t>
-            </a:r>
-            <a:r>
-              <a:rPr lang="en-US" sz="3200" b="1" dirty="0"/>
-              <a:t> </a:t>
-            </a:r>
-            <a:r>
-              <a:rPr lang="en-US" sz="3200" b="1" dirty="0" err="1"/>
-              <a:t>Sivaraman</a:t>
-            </a:r>
-            <a:r>
-              <a:rPr lang="en-US" sz="3200" dirty="0"/>
-              <a:t>, </a:t>
-            </a:r>
-            <a:r>
               <a:rPr lang="en-US" sz="3200" dirty="0" err="1"/>
               <a:t>Vikram</a:t>
             </a:r>
@@ -7761,15 +7749,7 @@
             </a:r>
             <a:r>
               <a:rPr lang="en-US" sz="3200" dirty="0"/>
-              <a:t> Goyal, </a:t>
-            </a:r>
-            <a:r>
-              <a:rPr lang="en-US" sz="3200" dirty="0" err="1"/>
-              <a:t>Venkat</a:t>
-            </a:r>
-            <a:r>
-              <a:rPr lang="en-US" sz="3200" dirty="0"/>
-              <a:t> </a:t>
+              <a:t> Goyal, Venkat </a:t>
             </a:r>
             <a:r>
               <a:rPr lang="en-US" sz="3200" dirty="0" err="1"/>
@@ -7777,23 +7757,7 @@
             </a:r>
             <a:r>
               <a:rPr lang="en-US" sz="3200" dirty="0"/>
-              <a:t>, Mohammad </a:t>
-            </a:r>
-            <a:r>
-              <a:rPr lang="en-US" sz="3200" dirty="0" err="1"/>
-              <a:t>Alizadeh</a:t>
-            </a:r>
-            <a:r>
-              <a:rPr lang="en-US" sz="3200" dirty="0"/>
-              <a:t>, </a:t>
-            </a:r>
-            <a:r>
-              <a:rPr lang="en-US" sz="3200" dirty="0" err="1"/>
-              <a:t>Vimal</a:t>
-            </a:r>
-            <a:r>
-              <a:rPr lang="en-US" sz="3200" dirty="0"/>
-              <a:t> </a:t>
+              <a:t>, Mohammad Alizadeh, Vimal </a:t>
             </a:r>
             <a:r>
               <a:rPr lang="en-US" sz="3200" dirty="0" err="1"/>
@@ -7842,7 +7806,7 @@
         </p:blipFill>
         <p:spPr>
           <a:xfrm>
-            <a:off x="3549650" y="4415033"/>
+            <a:off x="3549648" y="3327913"/>
             <a:ext cx="5092700" cy="1070702"/>
           </a:xfrm>
           <a:prstGeom prst="rect">
@@ -7850,6 +7814,41 @@
           </a:prstGeom>
         </p:spPr>
       </p:pic>
+      <p:sp>
+        <p:nvSpPr>
+          <p:cNvPr id="4" name="Rectangle 3">
+            <a:extLst>
+              <a:ext uri="{FF2B5EF4-FFF2-40B4-BE49-F238E27FC236}">
+                <a16:creationId xmlns:a16="http://schemas.microsoft.com/office/drawing/2014/main" id="{2A900F76-5DBB-2D46-AC15-59FF11BB1F05}"/>
+              </a:ext>
+            </a:extLst>
+          </p:cNvPr>
+          <p:cNvSpPr/>
+          <p:nvPr/>
+        </p:nvSpPr>
+        <p:spPr>
+          <a:xfrm>
+            <a:off x="4067238" y="2693713"/>
+            <a:ext cx="4057521" cy="584775"/>
+          </a:xfrm>
+          <a:prstGeom prst="rect">
+            <a:avLst/>
+          </a:prstGeom>
+        </p:spPr>
+        <p:txBody>
+          <a:bodyPr wrap="none">
+            <a:spAutoFit/>
+          </a:bodyPr>
+          <a:lstStyle/>
+          <a:p>
+            <a:r>
+              <a:rPr lang="en-US" sz="3200" b="1" dirty="0"/>
+              <a:t>Anirudh Sivaraman</a:t>
+            </a:r>
+            <a:endParaRPr lang="en-US" sz="3200" dirty="0"/>
+          </a:p>
+        </p:txBody>
+      </p:sp>
     </p:spTree>
     <p:extLst>
       <p:ext uri="{BB962C8B-B14F-4D97-AF65-F5344CB8AC3E}">
@@ -12521,7 +12520,7 @@
           <a:effectLst/>
           <a:extLst>
             <a:ext uri="{909E8E84-426E-40dd-AFC4-6F175D3DCCD1}">
-              <a14:hiddenFill xmlns:a14="http://schemas.microsoft.com/office/drawing/2010/main" xmlns="">
+              <a14:hiddenFill xmlns="" xmlns:a14="http://schemas.microsoft.com/office/drawing/2010/main">
                 <a:blipFill dpi="0" rotWithShape="0">
                   <a:blip/>
                   <a:srcRect/>
@@ -12532,7 +12531,7 @@
               </a14:hiddenFill>
             </a:ext>
             <a:ext uri="{91240B29-F687-4f45-9708-019B960494DF}">
-              <a14:hiddenLine xmlns:a14="http://schemas.microsoft.com/office/drawing/2010/main" xmlns="" w="9525">
+              <a14:hiddenLine xmlns="" xmlns:a14="http://schemas.microsoft.com/office/drawing/2010/main" w="9525">
                 <a:solidFill>
                   <a:srgbClr val="000000"/>
                 </a:solidFill>
@@ -12542,7 +12541,7 @@
               </a14:hiddenLine>
             </a:ext>
             <a:ext uri="{AF507438-7753-43e0-B8FC-AC1667EBCBE1}">
-              <a14:hiddenEffects xmlns:a14="http://schemas.microsoft.com/office/drawing/2010/main" xmlns="">
+              <a14:hiddenEffects xmlns="" xmlns:a14="http://schemas.microsoft.com/office/drawing/2010/main">
                 <a:effectLst>
                   <a:outerShdw blurRad="63500" dist="38099" dir="2700000" algn="ctr" rotWithShape="0">
                     <a:srgbClr val="000000">
@@ -12591,7 +12590,7 @@
           <a:effectLst/>
           <a:extLst>
             <a:ext uri="{909E8E84-426E-40dd-AFC4-6F175D3DCCD1}">
-              <a14:hiddenFill xmlns:a14="http://schemas.microsoft.com/office/drawing/2010/main" xmlns="">
+              <a14:hiddenFill xmlns="" xmlns:a14="http://schemas.microsoft.com/office/drawing/2010/main">
                 <a:blipFill dpi="0" rotWithShape="0">
                   <a:blip/>
                   <a:srcRect/>
@@ -12602,7 +12601,7 @@
               </a14:hiddenFill>
             </a:ext>
             <a:ext uri="{91240B29-F687-4f45-9708-019B960494DF}">
-              <a14:hiddenLine xmlns:a14="http://schemas.microsoft.com/office/drawing/2010/main" xmlns="" w="9525">
+              <a14:hiddenLine xmlns="" xmlns:a14="http://schemas.microsoft.com/office/drawing/2010/main" w="9525">
                 <a:solidFill>
                   <a:srgbClr val="000000"/>
                 </a:solidFill>
@@ -12612,7 +12611,7 @@
               </a14:hiddenLine>
             </a:ext>
             <a:ext uri="{AF507438-7753-43e0-B8FC-AC1667EBCBE1}">
-              <a14:hiddenEffects xmlns:a14="http://schemas.microsoft.com/office/drawing/2010/main" xmlns="">
+              <a14:hiddenEffects xmlns="" xmlns:a14="http://schemas.microsoft.com/office/drawing/2010/main">
                 <a:effectLst>
                   <a:outerShdw blurRad="63500" dist="38099" dir="2700000" algn="ctr" rotWithShape="0">
                     <a:srgbClr val="000000">
@@ -12747,7 +12746,7 @@
             <a:effectLst/>
             <a:extLst>
               <a:ext uri="{909E8E84-426E-40dd-AFC4-6F175D3DCCD1}">
-                <a14:hiddenFill xmlns="" xmlns:a14="http://schemas.microsoft.com/office/drawing/2010/main">
+                <a14:hiddenFill xmlns:a14="http://schemas.microsoft.com/office/drawing/2010/main" xmlns="">
                   <a:blipFill dpi="0" rotWithShape="0">
                     <a:blip/>
                     <a:srcRect/>
@@ -12758,7 +12757,7 @@
                 </a14:hiddenFill>
               </a:ext>
               <a:ext uri="{91240B29-F687-4f45-9708-019B960494DF}">
-                <a14:hiddenLine xmlns="" xmlns:a14="http://schemas.microsoft.com/office/drawing/2010/main" w="9525">
+                <a14:hiddenLine xmlns:a14="http://schemas.microsoft.com/office/drawing/2010/main" xmlns="" w="9525">
                   <a:solidFill>
                     <a:srgbClr val="000000"/>
                   </a:solidFill>
@@ -12768,7 +12767,7 @@
                 </a14:hiddenLine>
               </a:ext>
               <a:ext uri="{AF507438-7753-43e0-B8FC-AC1667EBCBE1}">
-                <a14:hiddenEffects xmlns="" xmlns:a14="http://schemas.microsoft.com/office/drawing/2010/main">
+                <a14:hiddenEffects xmlns:a14="http://schemas.microsoft.com/office/drawing/2010/main" xmlns="">
                   <a:effectLst>
                     <a:outerShdw blurRad="63500" dist="38099" dir="2700000" algn="ctr" rotWithShape="0">
                       <a:srgbClr val="000000">
@@ -12817,7 +12816,7 @@
             <a:effectLst/>
             <a:extLst>
               <a:ext uri="{909E8E84-426E-40dd-AFC4-6F175D3DCCD1}">
-                <a14:hiddenFill xmlns="" xmlns:a14="http://schemas.microsoft.com/office/drawing/2010/main">
+                <a14:hiddenFill xmlns:a14="http://schemas.microsoft.com/office/drawing/2010/main" xmlns="">
                   <a:blipFill dpi="0" rotWithShape="0">
                     <a:blip/>
                     <a:srcRect/>
@@ -12828,7 +12827,7 @@
                 </a14:hiddenFill>
               </a:ext>
               <a:ext uri="{91240B29-F687-4f45-9708-019B960494DF}">
-                <a14:hiddenLine xmlns="" xmlns:a14="http://schemas.microsoft.com/office/drawing/2010/main" w="9525">
+                <a14:hiddenLine xmlns:a14="http://schemas.microsoft.com/office/drawing/2010/main" xmlns="" w="9525">
                   <a:solidFill>
                     <a:srgbClr val="000000"/>
                   </a:solidFill>
@@ -12838,7 +12837,7 @@
                 </a14:hiddenLine>
               </a:ext>
               <a:ext uri="{AF507438-7753-43e0-B8FC-AC1667EBCBE1}">
-                <a14:hiddenEffects xmlns="" xmlns:a14="http://schemas.microsoft.com/office/drawing/2010/main">
+                <a14:hiddenEffects xmlns:a14="http://schemas.microsoft.com/office/drawing/2010/main" xmlns="">
                   <a:effectLst>
                     <a:outerShdw blurRad="63500" dist="38099" dir="2700000" algn="ctr" rotWithShape="0">
                       <a:srgbClr val="000000">
@@ -12887,7 +12886,7 @@
             <a:effectLst/>
             <a:extLst>
               <a:ext uri="{909E8E84-426E-40dd-AFC4-6F175D3DCCD1}">
-                <a14:hiddenFill xmlns="" xmlns:a14="http://schemas.microsoft.com/office/drawing/2010/main">
+                <a14:hiddenFill xmlns:a14="http://schemas.microsoft.com/office/drawing/2010/main" xmlns="">
                   <a:blipFill dpi="0" rotWithShape="0">
                     <a:blip/>
                     <a:srcRect/>
@@ -12898,7 +12897,7 @@
                 </a14:hiddenFill>
               </a:ext>
               <a:ext uri="{91240B29-F687-4f45-9708-019B960494DF}">
-                <a14:hiddenLine xmlns="" xmlns:a14="http://schemas.microsoft.com/office/drawing/2010/main" w="9525">
+                <a14:hiddenLine xmlns:a14="http://schemas.microsoft.com/office/drawing/2010/main" xmlns="" w="9525">
                   <a:solidFill>
                     <a:srgbClr val="000000"/>
                   </a:solidFill>
@@ -12908,7 +12907,7 @@
                 </a14:hiddenLine>
               </a:ext>
               <a:ext uri="{AF507438-7753-43e0-B8FC-AC1667EBCBE1}">
-                <a14:hiddenEffects xmlns="" xmlns:a14="http://schemas.microsoft.com/office/drawing/2010/main">
+                <a14:hiddenEffects xmlns:a14="http://schemas.microsoft.com/office/drawing/2010/main" xmlns="">
                   <a:effectLst>
                     <a:outerShdw blurRad="63500" dist="38099" dir="2700000" algn="ctr" rotWithShape="0">
                       <a:srgbClr val="000000">
@@ -12949,12 +12948,12 @@
             <a:effectLst/>
             <a:extLst>
               <a:ext uri="{909E8E84-426E-40dd-AFC4-6F175D3DCCD1}">
-                <a14:hiddenFill xmlns="" xmlns:a14="http://schemas.microsoft.com/office/drawing/2010/main">
+                <a14:hiddenFill xmlns:a14="http://schemas.microsoft.com/office/drawing/2010/main" xmlns="">
                   <a:noFill/>
                 </a14:hiddenFill>
               </a:ext>
               <a:ext uri="{AF507438-7753-43e0-B8FC-AC1667EBCBE1}">
-                <a14:hiddenEffects xmlns="" xmlns:a14="http://schemas.microsoft.com/office/drawing/2010/main">
+                <a14:hiddenEffects xmlns:a14="http://schemas.microsoft.com/office/drawing/2010/main" xmlns="">
                   <a:effectLst>
                     <a:outerShdw blurRad="63500" dist="38099" dir="2700000" algn="ctr" rotWithShape="0">
                       <a:srgbClr val="000000">
@@ -13007,12 +13006,12 @@
             <a:effectLst/>
             <a:extLst>
               <a:ext uri="{909E8E84-426E-40dd-AFC4-6F175D3DCCD1}">
-                <a14:hiddenFill xmlns="" xmlns:a14="http://schemas.microsoft.com/office/drawing/2010/main">
+                <a14:hiddenFill xmlns:a14="http://schemas.microsoft.com/office/drawing/2010/main" xmlns="">
                   <a:noFill/>
                 </a14:hiddenFill>
               </a:ext>
               <a:ext uri="{AF507438-7753-43e0-B8FC-AC1667EBCBE1}">
-                <a14:hiddenEffects xmlns="" xmlns:a14="http://schemas.microsoft.com/office/drawing/2010/main">
+                <a14:hiddenEffects xmlns:a14="http://schemas.microsoft.com/office/drawing/2010/main" xmlns="">
                   <a:effectLst>
                     <a:outerShdw blurRad="63500" dist="38099" dir="2700000" algn="ctr" rotWithShape="0">
                       <a:srgbClr val="000000">
@@ -13065,12 +13064,12 @@
             <a:effectLst/>
             <a:extLst>
               <a:ext uri="{909E8E84-426E-40dd-AFC4-6F175D3DCCD1}">
-                <a14:hiddenFill xmlns="" xmlns:a14="http://schemas.microsoft.com/office/drawing/2010/main">
+                <a14:hiddenFill xmlns:a14="http://schemas.microsoft.com/office/drawing/2010/main" xmlns="">
                   <a:noFill/>
                 </a14:hiddenFill>
               </a:ext>
               <a:ext uri="{AF507438-7753-43e0-B8FC-AC1667EBCBE1}">
-                <a14:hiddenEffects xmlns="" xmlns:a14="http://schemas.microsoft.com/office/drawing/2010/main">
+                <a14:hiddenEffects xmlns:a14="http://schemas.microsoft.com/office/drawing/2010/main" xmlns="">
                   <a:effectLst>
                     <a:outerShdw blurRad="63500" dist="38099" dir="2700000" algn="ctr" rotWithShape="0">
                       <a:srgbClr val="000000">
@@ -13123,12 +13122,12 @@
             <a:effectLst/>
             <a:extLst>
               <a:ext uri="{909E8E84-426E-40dd-AFC4-6F175D3DCCD1}">
-                <a14:hiddenFill xmlns="" xmlns:a14="http://schemas.microsoft.com/office/drawing/2010/main">
+                <a14:hiddenFill xmlns:a14="http://schemas.microsoft.com/office/drawing/2010/main" xmlns="">
                   <a:noFill/>
                 </a14:hiddenFill>
               </a:ext>
               <a:ext uri="{AF507438-7753-43e0-B8FC-AC1667EBCBE1}">
-                <a14:hiddenEffects xmlns="" xmlns:a14="http://schemas.microsoft.com/office/drawing/2010/main">
+                <a14:hiddenEffects xmlns:a14="http://schemas.microsoft.com/office/drawing/2010/main" xmlns="">
                   <a:effectLst>
                     <a:outerShdw blurRad="63500" dist="38099" dir="2700000" algn="ctr" rotWithShape="0">
                       <a:srgbClr val="000000">
@@ -13181,12 +13180,12 @@
             <a:effectLst/>
             <a:extLst>
               <a:ext uri="{909E8E84-426E-40dd-AFC4-6F175D3DCCD1}">
-                <a14:hiddenFill xmlns="" xmlns:a14="http://schemas.microsoft.com/office/drawing/2010/main">
+                <a14:hiddenFill xmlns:a14="http://schemas.microsoft.com/office/drawing/2010/main" xmlns="">
                   <a:noFill/>
                 </a14:hiddenFill>
               </a:ext>
               <a:ext uri="{AF507438-7753-43e0-B8FC-AC1667EBCBE1}">
-                <a14:hiddenEffects xmlns="" xmlns:a14="http://schemas.microsoft.com/office/drawing/2010/main">
+                <a14:hiddenEffects xmlns:a14="http://schemas.microsoft.com/office/drawing/2010/main" xmlns="">
                   <a:effectLst>
                     <a:outerShdw blurRad="63500" dist="38099" dir="2700000" algn="ctr" rotWithShape="0">
                       <a:srgbClr val="000000">
@@ -13239,12 +13238,12 @@
             <a:effectLst/>
             <a:extLst>
               <a:ext uri="{909E8E84-426E-40dd-AFC4-6F175D3DCCD1}">
-                <a14:hiddenFill xmlns="" xmlns:a14="http://schemas.microsoft.com/office/drawing/2010/main">
+                <a14:hiddenFill xmlns:a14="http://schemas.microsoft.com/office/drawing/2010/main" xmlns="">
                   <a:noFill/>
                 </a14:hiddenFill>
               </a:ext>
               <a:ext uri="{AF507438-7753-43e0-B8FC-AC1667EBCBE1}">
-                <a14:hiddenEffects xmlns="" xmlns:a14="http://schemas.microsoft.com/office/drawing/2010/main">
+                <a14:hiddenEffects xmlns:a14="http://schemas.microsoft.com/office/drawing/2010/main" xmlns="">
                   <a:effectLst>
                     <a:outerShdw blurRad="63500" dist="38099" dir="2700000" algn="ctr" rotWithShape="0">
                       <a:srgbClr val="000000">
@@ -13297,12 +13296,12 @@
             <a:effectLst/>
             <a:extLst>
               <a:ext uri="{909E8E84-426E-40dd-AFC4-6F175D3DCCD1}">
-                <a14:hiddenFill xmlns="" xmlns:a14="http://schemas.microsoft.com/office/drawing/2010/main">
+                <a14:hiddenFill xmlns:a14="http://schemas.microsoft.com/office/drawing/2010/main" xmlns="">
                   <a:noFill/>
                 </a14:hiddenFill>
               </a:ext>
               <a:ext uri="{AF507438-7753-43e0-B8FC-AC1667EBCBE1}">
-                <a14:hiddenEffects xmlns="" xmlns:a14="http://schemas.microsoft.com/office/drawing/2010/main">
+                <a14:hiddenEffects xmlns:a14="http://schemas.microsoft.com/office/drawing/2010/main" xmlns="">
                   <a:effectLst>
                     <a:outerShdw blurRad="63500" dist="38099" dir="2700000" algn="ctr" rotWithShape="0">
                       <a:srgbClr val="000000">
@@ -13355,12 +13354,12 @@
             <a:effectLst/>
             <a:extLst>
               <a:ext uri="{909E8E84-426E-40dd-AFC4-6F175D3DCCD1}">
-                <a14:hiddenFill xmlns="" xmlns:a14="http://schemas.microsoft.com/office/drawing/2010/main">
+                <a14:hiddenFill xmlns:a14="http://schemas.microsoft.com/office/drawing/2010/main" xmlns="">
                   <a:noFill/>
                 </a14:hiddenFill>
               </a:ext>
               <a:ext uri="{AF507438-7753-43e0-B8FC-AC1667EBCBE1}">
-                <a14:hiddenEffects xmlns="" xmlns:a14="http://schemas.microsoft.com/office/drawing/2010/main">
+                <a14:hiddenEffects xmlns:a14="http://schemas.microsoft.com/office/drawing/2010/main" xmlns="">
                   <a:effectLst>
                     <a:outerShdw blurRad="63500" dist="38099" dir="2700000" algn="ctr" rotWithShape="0">
                       <a:srgbClr val="000000">
@@ -13413,12 +13412,12 @@
             <a:effectLst/>
             <a:extLst>
               <a:ext uri="{909E8E84-426E-40dd-AFC4-6F175D3DCCD1}">
-                <a14:hiddenFill xmlns="" xmlns:a14="http://schemas.microsoft.com/office/drawing/2010/main">
+                <a14:hiddenFill xmlns:a14="http://schemas.microsoft.com/office/drawing/2010/main" xmlns="">
                   <a:noFill/>
                 </a14:hiddenFill>
               </a:ext>
               <a:ext uri="{AF507438-7753-43e0-B8FC-AC1667EBCBE1}">
-                <a14:hiddenEffects xmlns="" xmlns:a14="http://schemas.microsoft.com/office/drawing/2010/main">
+                <a14:hiddenEffects xmlns:a14="http://schemas.microsoft.com/office/drawing/2010/main" xmlns="">
                   <a:effectLst>
                     <a:outerShdw blurRad="63500" dist="38099" dir="2700000" algn="ctr" rotWithShape="0">
                       <a:srgbClr val="000000">
@@ -13471,12 +13470,12 @@
             <a:effectLst/>
             <a:extLst>
               <a:ext uri="{909E8E84-426E-40dd-AFC4-6F175D3DCCD1}">
-                <a14:hiddenFill xmlns="" xmlns:a14="http://schemas.microsoft.com/office/drawing/2010/main">
+                <a14:hiddenFill xmlns:a14="http://schemas.microsoft.com/office/drawing/2010/main" xmlns="">
                   <a:noFill/>
                 </a14:hiddenFill>
               </a:ext>
               <a:ext uri="{AF507438-7753-43e0-B8FC-AC1667EBCBE1}">
-                <a14:hiddenEffects xmlns="" xmlns:a14="http://schemas.microsoft.com/office/drawing/2010/main">
+                <a14:hiddenEffects xmlns:a14="http://schemas.microsoft.com/office/drawing/2010/main" xmlns="">
                   <a:effectLst>
                     <a:outerShdw blurRad="63500" dist="38099" dir="2700000" algn="ctr" rotWithShape="0">
                       <a:srgbClr val="000000">
@@ -13537,7 +13536,7 @@
             <a:effectLst/>
             <a:extLst>
               <a:ext uri="{909E8E84-426E-40dd-AFC4-6F175D3DCCD1}">
-                <a14:hiddenFill xmlns="" xmlns:a14="http://schemas.microsoft.com/office/drawing/2010/main">
+                <a14:hiddenFill xmlns:a14="http://schemas.microsoft.com/office/drawing/2010/main" xmlns="">
                   <a:blipFill dpi="0" rotWithShape="0">
                     <a:blip/>
                     <a:srcRect/>
@@ -13548,7 +13547,7 @@
                 </a14:hiddenFill>
               </a:ext>
               <a:ext uri="{91240B29-F687-4f45-9708-019B960494DF}">
-                <a14:hiddenLine xmlns="" xmlns:a14="http://schemas.microsoft.com/office/drawing/2010/main" w="9525">
+                <a14:hiddenLine xmlns:a14="http://schemas.microsoft.com/office/drawing/2010/main" xmlns="" w="9525">
                   <a:solidFill>
                     <a:srgbClr val="000000"/>
                   </a:solidFill>
@@ -13558,7 +13557,7 @@
                 </a14:hiddenLine>
               </a:ext>
               <a:ext uri="{AF507438-7753-43e0-B8FC-AC1667EBCBE1}">
-                <a14:hiddenEffects xmlns="" xmlns:a14="http://schemas.microsoft.com/office/drawing/2010/main">
+                <a14:hiddenEffects xmlns:a14="http://schemas.microsoft.com/office/drawing/2010/main" xmlns="">
                   <a:effectLst>
                     <a:outerShdw blurRad="63500" dist="38099" dir="2700000" algn="ctr" rotWithShape="0">
                       <a:srgbClr val="000000">
@@ -13607,7 +13606,7 @@
             <a:effectLst/>
             <a:extLst>
               <a:ext uri="{909E8E84-426E-40dd-AFC4-6F175D3DCCD1}">
-                <a14:hiddenFill xmlns="" xmlns:a14="http://schemas.microsoft.com/office/drawing/2010/main">
+                <a14:hiddenFill xmlns:a14="http://schemas.microsoft.com/office/drawing/2010/main" xmlns="">
                   <a:blipFill dpi="0" rotWithShape="0">
                     <a:blip/>
                     <a:srcRect/>
@@ -13618,7 +13617,7 @@
                 </a14:hiddenFill>
               </a:ext>
               <a:ext uri="{91240B29-F687-4f45-9708-019B960494DF}">
-                <a14:hiddenLine xmlns="" xmlns:a14="http://schemas.microsoft.com/office/drawing/2010/main" w="9525">
+                <a14:hiddenLine xmlns:a14="http://schemas.microsoft.com/office/drawing/2010/main" xmlns="" w="9525">
                   <a:solidFill>
                     <a:srgbClr val="000000"/>
                   </a:solidFill>
@@ -13628,7 +13627,7 @@
                 </a14:hiddenLine>
               </a:ext>
               <a:ext uri="{AF507438-7753-43e0-B8FC-AC1667EBCBE1}">
-                <a14:hiddenEffects xmlns="" xmlns:a14="http://schemas.microsoft.com/office/drawing/2010/main">
+                <a14:hiddenEffects xmlns:a14="http://schemas.microsoft.com/office/drawing/2010/main" xmlns="">
                   <a:effectLst>
                     <a:outerShdw blurRad="63500" dist="38099" dir="2700000" algn="ctr" rotWithShape="0">
                       <a:srgbClr val="000000">
@@ -13677,7 +13676,7 @@
             <a:effectLst/>
             <a:extLst>
               <a:ext uri="{909E8E84-426E-40dd-AFC4-6F175D3DCCD1}">
-                <a14:hiddenFill xmlns="" xmlns:a14="http://schemas.microsoft.com/office/drawing/2010/main">
+                <a14:hiddenFill xmlns:a14="http://schemas.microsoft.com/office/drawing/2010/main" xmlns="">
                   <a:blipFill dpi="0" rotWithShape="0">
                     <a:blip/>
                     <a:srcRect/>
@@ -13688,7 +13687,7 @@
                 </a14:hiddenFill>
               </a:ext>
               <a:ext uri="{91240B29-F687-4f45-9708-019B960494DF}">
-                <a14:hiddenLine xmlns="" xmlns:a14="http://schemas.microsoft.com/office/drawing/2010/main" w="9525">
+                <a14:hiddenLine xmlns:a14="http://schemas.microsoft.com/office/drawing/2010/main" xmlns="" w="9525">
                   <a:solidFill>
                     <a:srgbClr val="000000"/>
                   </a:solidFill>
@@ -13698,7 +13697,7 @@
                 </a14:hiddenLine>
               </a:ext>
               <a:ext uri="{AF507438-7753-43e0-B8FC-AC1667EBCBE1}">
-                <a14:hiddenEffects xmlns="" xmlns:a14="http://schemas.microsoft.com/office/drawing/2010/main">
+                <a14:hiddenEffects xmlns:a14="http://schemas.microsoft.com/office/drawing/2010/main" xmlns="">
                   <a:effectLst>
                     <a:outerShdw blurRad="63500" dist="38099" dir="2700000" algn="ctr" rotWithShape="0">
                       <a:srgbClr val="000000">
@@ -13747,7 +13746,7 @@
             <a:effectLst/>
             <a:extLst>
               <a:ext uri="{909E8E84-426E-40dd-AFC4-6F175D3DCCD1}">
-                <a14:hiddenFill xmlns="" xmlns:a14="http://schemas.microsoft.com/office/drawing/2010/main">
+                <a14:hiddenFill xmlns:a14="http://schemas.microsoft.com/office/drawing/2010/main" xmlns="">
                   <a:blipFill dpi="0" rotWithShape="0">
                     <a:blip/>
                     <a:srcRect/>
@@ -13758,7 +13757,7 @@
                 </a14:hiddenFill>
               </a:ext>
               <a:ext uri="{91240B29-F687-4f45-9708-019B960494DF}">
-                <a14:hiddenLine xmlns="" xmlns:a14="http://schemas.microsoft.com/office/drawing/2010/main" w="9525">
+                <a14:hiddenLine xmlns:a14="http://schemas.microsoft.com/office/drawing/2010/main" xmlns="" w="9525">
                   <a:solidFill>
                     <a:srgbClr val="000000"/>
                   </a:solidFill>
@@ -13768,7 +13767,7 @@
                 </a14:hiddenLine>
               </a:ext>
               <a:ext uri="{AF507438-7753-43e0-B8FC-AC1667EBCBE1}">
-                <a14:hiddenEffects xmlns="" xmlns:a14="http://schemas.microsoft.com/office/drawing/2010/main">
+                <a14:hiddenEffects xmlns:a14="http://schemas.microsoft.com/office/drawing/2010/main" xmlns="">
                   <a:effectLst>
                     <a:outerShdw blurRad="63500" dist="38099" dir="2700000" algn="ctr" rotWithShape="0">
                       <a:srgbClr val="000000">
@@ -13817,7 +13816,7 @@
             <a:effectLst/>
             <a:extLst>
               <a:ext uri="{909E8E84-426E-40dd-AFC4-6F175D3DCCD1}">
-                <a14:hiddenFill xmlns="" xmlns:a14="http://schemas.microsoft.com/office/drawing/2010/main">
+                <a14:hiddenFill xmlns:a14="http://schemas.microsoft.com/office/drawing/2010/main" xmlns="">
                   <a:blipFill dpi="0" rotWithShape="0">
                     <a:blip/>
                     <a:srcRect/>
@@ -13828,7 +13827,7 @@
                 </a14:hiddenFill>
               </a:ext>
               <a:ext uri="{91240B29-F687-4f45-9708-019B960494DF}">
-                <a14:hiddenLine xmlns="" xmlns:a14="http://schemas.microsoft.com/office/drawing/2010/main" w="9525">
+                <a14:hiddenLine xmlns:a14="http://schemas.microsoft.com/office/drawing/2010/main" xmlns="" w="9525">
                   <a:solidFill>
                     <a:srgbClr val="000000"/>
                   </a:solidFill>
@@ -13838,7 +13837,7 @@
                 </a14:hiddenLine>
               </a:ext>
               <a:ext uri="{AF507438-7753-43e0-B8FC-AC1667EBCBE1}">
-                <a14:hiddenEffects xmlns="" xmlns:a14="http://schemas.microsoft.com/office/drawing/2010/main">
+                <a14:hiddenEffects xmlns:a14="http://schemas.microsoft.com/office/drawing/2010/main" xmlns="">
                   <a:effectLst>
                     <a:outerShdw blurRad="63500" dist="38099" dir="2700000" algn="ctr" rotWithShape="0">
                       <a:srgbClr val="000000">
@@ -13879,12 +13878,12 @@
             <a:effectLst/>
             <a:extLst>
               <a:ext uri="{909E8E84-426E-40dd-AFC4-6F175D3DCCD1}">
-                <a14:hiddenFill xmlns="" xmlns:a14="http://schemas.microsoft.com/office/drawing/2010/main">
+                <a14:hiddenFill xmlns:a14="http://schemas.microsoft.com/office/drawing/2010/main" xmlns="">
                   <a:noFill/>
                 </a14:hiddenFill>
               </a:ext>
               <a:ext uri="{AF507438-7753-43e0-B8FC-AC1667EBCBE1}">
-                <a14:hiddenEffects xmlns="" xmlns:a14="http://schemas.microsoft.com/office/drawing/2010/main">
+                <a14:hiddenEffects xmlns:a14="http://schemas.microsoft.com/office/drawing/2010/main" xmlns="">
                   <a:effectLst>
                     <a:outerShdw blurRad="63500" dist="38099" dir="2700000" algn="ctr" rotWithShape="0">
                       <a:srgbClr val="000000">
@@ -13937,12 +13936,12 @@
             <a:effectLst/>
             <a:extLst>
               <a:ext uri="{909E8E84-426E-40dd-AFC4-6F175D3DCCD1}">
-                <a14:hiddenFill xmlns="" xmlns:a14="http://schemas.microsoft.com/office/drawing/2010/main">
+                <a14:hiddenFill xmlns:a14="http://schemas.microsoft.com/office/drawing/2010/main" xmlns="">
                   <a:noFill/>
                 </a14:hiddenFill>
               </a:ext>
               <a:ext uri="{AF507438-7753-43e0-B8FC-AC1667EBCBE1}">
-                <a14:hiddenEffects xmlns="" xmlns:a14="http://schemas.microsoft.com/office/drawing/2010/main">
+                <a14:hiddenEffects xmlns:a14="http://schemas.microsoft.com/office/drawing/2010/main" xmlns="">
                   <a:effectLst>
                     <a:outerShdw blurRad="63500" dist="38099" dir="2700000" algn="ctr" rotWithShape="0">
                       <a:srgbClr val="000000">
@@ -14003,7 +14002,7 @@
             <a:effectLst/>
             <a:extLst>
               <a:ext uri="{909E8E84-426E-40dd-AFC4-6F175D3DCCD1}">
-                <a14:hiddenFill xmlns="" xmlns:a14="http://schemas.microsoft.com/office/drawing/2010/main">
+                <a14:hiddenFill xmlns:a14="http://schemas.microsoft.com/office/drawing/2010/main" xmlns="">
                   <a:blipFill dpi="0" rotWithShape="0">
                     <a:blip/>
                     <a:srcRect/>
@@ -14014,7 +14013,7 @@
                 </a14:hiddenFill>
               </a:ext>
               <a:ext uri="{91240B29-F687-4f45-9708-019B960494DF}">
-                <a14:hiddenLine xmlns="" xmlns:a14="http://schemas.microsoft.com/office/drawing/2010/main" w="9525">
+                <a14:hiddenLine xmlns:a14="http://schemas.microsoft.com/office/drawing/2010/main" xmlns="" w="9525">
                   <a:solidFill>
                     <a:srgbClr val="000000"/>
                   </a:solidFill>
@@ -14024,7 +14023,7 @@
                 </a14:hiddenLine>
               </a:ext>
               <a:ext uri="{AF507438-7753-43e0-B8FC-AC1667EBCBE1}">
-                <a14:hiddenEffects xmlns="" xmlns:a14="http://schemas.microsoft.com/office/drawing/2010/main">
+                <a14:hiddenEffects xmlns:a14="http://schemas.microsoft.com/office/drawing/2010/main" xmlns="">
                   <a:effectLst>
                     <a:outerShdw blurRad="63500" dist="38099" dir="2700000" algn="ctr" rotWithShape="0">
                       <a:srgbClr val="000000">
@@ -14157,7 +14156,7 @@
           <a:effectLst/>
           <a:extLst>
             <a:ext uri="{909E8E84-426E-40dd-AFC4-6F175D3DCCD1}">
-              <a14:hiddenFill xmlns:a14="http://schemas.microsoft.com/office/drawing/2010/main" xmlns="">
+              <a14:hiddenFill xmlns="" xmlns:a14="http://schemas.microsoft.com/office/drawing/2010/main">
                 <a:blipFill dpi="0" rotWithShape="0">
                   <a:blip/>
                   <a:srcRect/>
@@ -14168,7 +14167,7 @@
               </a14:hiddenFill>
             </a:ext>
             <a:ext uri="{91240B29-F687-4f45-9708-019B960494DF}">
-              <a14:hiddenLine xmlns:a14="http://schemas.microsoft.com/office/drawing/2010/main" xmlns="" w="9525">
+              <a14:hiddenLine xmlns="" xmlns:a14="http://schemas.microsoft.com/office/drawing/2010/main" w="9525">
                 <a:solidFill>
                   <a:srgbClr val="000000"/>
                 </a:solidFill>
@@ -14178,7 +14177,7 @@
               </a14:hiddenLine>
             </a:ext>
             <a:ext uri="{AF507438-7753-43e0-B8FC-AC1667EBCBE1}">
-              <a14:hiddenEffects xmlns:a14="http://schemas.microsoft.com/office/drawing/2010/main" xmlns="">
+              <a14:hiddenEffects xmlns="" xmlns:a14="http://schemas.microsoft.com/office/drawing/2010/main">
                 <a:effectLst>
                   <a:outerShdw blurRad="63500" dist="38099" dir="2700000" algn="ctr" rotWithShape="0">
                     <a:srgbClr val="000000">
@@ -14263,7 +14262,7 @@
           <a:effectLst/>
           <a:extLst>
             <a:ext uri="{909E8E84-426E-40dd-AFC4-6F175D3DCCD1}">
-              <a14:hiddenFill xmlns:a14="http://schemas.microsoft.com/office/drawing/2010/main" xmlns="">
+              <a14:hiddenFill xmlns="" xmlns:a14="http://schemas.microsoft.com/office/drawing/2010/main">
                 <a:blipFill dpi="0" rotWithShape="0">
                   <a:blip/>
                   <a:srcRect/>
@@ -14274,7 +14273,7 @@
               </a14:hiddenFill>
             </a:ext>
             <a:ext uri="{91240B29-F687-4f45-9708-019B960494DF}">
-              <a14:hiddenLine xmlns:a14="http://schemas.microsoft.com/office/drawing/2010/main" xmlns="" w="9525">
+              <a14:hiddenLine xmlns="" xmlns:a14="http://schemas.microsoft.com/office/drawing/2010/main" w="9525">
                 <a:solidFill>
                   <a:srgbClr val="000000"/>
                 </a:solidFill>
@@ -14284,7 +14283,7 @@
               </a14:hiddenLine>
             </a:ext>
             <a:ext uri="{AF507438-7753-43e0-B8FC-AC1667EBCBE1}">
-              <a14:hiddenEffects xmlns:a14="http://schemas.microsoft.com/office/drawing/2010/main" xmlns="">
+              <a14:hiddenEffects xmlns="" xmlns:a14="http://schemas.microsoft.com/office/drawing/2010/main">
                 <a:effectLst>
                   <a:outerShdw blurRad="63500" dist="38099" dir="2700000" algn="ctr" rotWithShape="0">
                     <a:srgbClr val="000000">
@@ -14369,7 +14368,7 @@
           <a:effectLst/>
           <a:extLst>
             <a:ext uri="{909E8E84-426E-40dd-AFC4-6F175D3DCCD1}">
-              <a14:hiddenFill xmlns:a14="http://schemas.microsoft.com/office/drawing/2010/main" xmlns="">
+              <a14:hiddenFill xmlns="" xmlns:a14="http://schemas.microsoft.com/office/drawing/2010/main">
                 <a:blipFill dpi="0" rotWithShape="0">
                   <a:blip/>
                   <a:srcRect/>
@@ -14380,7 +14379,7 @@
               </a14:hiddenFill>
             </a:ext>
             <a:ext uri="{91240B29-F687-4f45-9708-019B960494DF}">
-              <a14:hiddenLine xmlns:a14="http://schemas.microsoft.com/office/drawing/2010/main" xmlns="" w="9525">
+              <a14:hiddenLine xmlns="" xmlns:a14="http://schemas.microsoft.com/office/drawing/2010/main" w="9525">
                 <a:solidFill>
                   <a:srgbClr val="000000"/>
                 </a:solidFill>
@@ -14390,7 +14389,7 @@
               </a14:hiddenLine>
             </a:ext>
             <a:ext uri="{AF507438-7753-43e0-B8FC-AC1667EBCBE1}">
-              <a14:hiddenEffects xmlns:a14="http://schemas.microsoft.com/office/drawing/2010/main" xmlns="">
+              <a14:hiddenEffects xmlns="" xmlns:a14="http://schemas.microsoft.com/office/drawing/2010/main">
                 <a:effectLst>
                   <a:outerShdw blurRad="63500" dist="38099" dir="2700000" algn="ctr" rotWithShape="0">
                     <a:srgbClr val="000000">
@@ -14570,7 +14569,7 @@
           <a:effectLst/>
           <a:extLst>
             <a:ext uri="{909E8E84-426E-40dd-AFC4-6F175D3DCCD1}">
-              <a14:hiddenFill xmlns:a14="http://schemas.microsoft.com/office/drawing/2010/main" xmlns="">
+              <a14:hiddenFill xmlns="" xmlns:a14="http://schemas.microsoft.com/office/drawing/2010/main">
                 <a:blipFill dpi="0" rotWithShape="0">
                   <a:blip/>
                   <a:srcRect/>
@@ -14581,7 +14580,7 @@
               </a14:hiddenFill>
             </a:ext>
             <a:ext uri="{91240B29-F687-4f45-9708-019B960494DF}">
-              <a14:hiddenLine xmlns:a14="http://schemas.microsoft.com/office/drawing/2010/main" xmlns="" w="9525">
+              <a14:hiddenLine xmlns="" xmlns:a14="http://schemas.microsoft.com/office/drawing/2010/main" w="9525">
                 <a:solidFill>
                   <a:srgbClr val="000000"/>
                 </a:solidFill>
@@ -14591,7 +14590,7 @@
               </a14:hiddenLine>
             </a:ext>
             <a:ext uri="{AF507438-7753-43e0-B8FC-AC1667EBCBE1}">
-              <a14:hiddenEffects xmlns:a14="http://schemas.microsoft.com/office/drawing/2010/main" xmlns="">
+              <a14:hiddenEffects xmlns="" xmlns:a14="http://schemas.microsoft.com/office/drawing/2010/main">
                 <a:effectLst>
                   <a:outerShdw blurRad="63500" dist="38099" dir="2700000" algn="ctr" rotWithShape="0">
                     <a:srgbClr val="000000">
@@ -14669,7 +14668,7 @@
           <a:effectLst/>
           <a:extLst>
             <a:ext uri="{909E8E84-426E-40dd-AFC4-6F175D3DCCD1}">
-              <a14:hiddenFill xmlns:a14="http://schemas.microsoft.com/office/drawing/2010/main" xmlns="">
+              <a14:hiddenFill xmlns="" xmlns:a14="http://schemas.microsoft.com/office/drawing/2010/main">
                 <a:blipFill dpi="0" rotWithShape="0">
                   <a:blip/>
                   <a:srcRect/>
@@ -14680,7 +14679,7 @@
               </a14:hiddenFill>
             </a:ext>
             <a:ext uri="{91240B29-F687-4f45-9708-019B960494DF}">
-              <a14:hiddenLine xmlns:a14="http://schemas.microsoft.com/office/drawing/2010/main" xmlns="" w="9525">
+              <a14:hiddenLine xmlns="" xmlns:a14="http://schemas.microsoft.com/office/drawing/2010/main" w="9525">
                 <a:solidFill>
                   <a:srgbClr val="000000"/>
                 </a:solidFill>
@@ -14690,7 +14689,7 @@
               </a14:hiddenLine>
             </a:ext>
             <a:ext uri="{AF507438-7753-43e0-B8FC-AC1667EBCBE1}">
-              <a14:hiddenEffects xmlns:a14="http://schemas.microsoft.com/office/drawing/2010/main" xmlns="">
+              <a14:hiddenEffects xmlns="" xmlns:a14="http://schemas.microsoft.com/office/drawing/2010/main">
                 <a:effectLst>
                   <a:outerShdw blurRad="63500" dist="38099" dir="2700000" algn="ctr" rotWithShape="0">
                     <a:srgbClr val="000000">
@@ -16504,7 +16503,7 @@
           <a:effectLst/>
           <a:extLst>
             <a:ext uri="{909E8E84-426E-40dd-AFC4-6F175D3DCCD1}">
-              <a14:hiddenFill xmlns="" xmlns:a14="http://schemas.microsoft.com/office/drawing/2010/main">
+              <a14:hiddenFill xmlns:a14="http://schemas.microsoft.com/office/drawing/2010/main" xmlns="">
                 <a:blipFill dpi="0" rotWithShape="0">
                   <a:blip/>
                   <a:srcRect/>
@@ -16515,7 +16514,7 @@
               </a14:hiddenFill>
             </a:ext>
             <a:ext uri="{91240B29-F687-4f45-9708-019B960494DF}">
-              <a14:hiddenLine xmlns="" xmlns:a14="http://schemas.microsoft.com/office/drawing/2010/main" w="9525">
+              <a14:hiddenLine xmlns:a14="http://schemas.microsoft.com/office/drawing/2010/main" xmlns="" w="9525">
                 <a:solidFill>
                   <a:srgbClr val="000000"/>
                 </a:solidFill>
@@ -16525,7 +16524,7 @@
               </a14:hiddenLine>
             </a:ext>
             <a:ext uri="{AF507438-7753-43e0-B8FC-AC1667EBCBE1}">
-              <a14:hiddenEffects xmlns="" xmlns:a14="http://schemas.microsoft.com/office/drawing/2010/main">
+              <a14:hiddenEffects xmlns:a14="http://schemas.microsoft.com/office/drawing/2010/main" xmlns="">
                 <a:effectLst>
                   <a:outerShdw blurRad="63500" dist="38099" dir="2700000" algn="ctr" rotWithShape="0">
                     <a:srgbClr val="000000">
@@ -18014,7 +18013,7 @@
           <a:effectLst/>
           <a:extLst>
             <a:ext uri="{909E8E84-426E-40dd-AFC4-6F175D3DCCD1}">
-              <a14:hiddenFill xmlns="" xmlns:a14="http://schemas.microsoft.com/office/drawing/2010/main">
+              <a14:hiddenFill xmlns:a14="http://schemas.microsoft.com/office/drawing/2010/main" xmlns="">
                 <a:blipFill dpi="0" rotWithShape="0">
                   <a:blip/>
                   <a:srcRect/>
@@ -18025,7 +18024,7 @@
               </a14:hiddenFill>
             </a:ext>
             <a:ext uri="{91240B29-F687-4f45-9708-019B960494DF}">
-              <a14:hiddenLine xmlns="" xmlns:a14="http://schemas.microsoft.com/office/drawing/2010/main" w="9525">
+              <a14:hiddenLine xmlns:a14="http://schemas.microsoft.com/office/drawing/2010/main" xmlns="" w="9525">
                 <a:solidFill>
                   <a:srgbClr val="000000"/>
                 </a:solidFill>
@@ -18035,7 +18034,7 @@
               </a14:hiddenLine>
             </a:ext>
             <a:ext uri="{AF507438-7753-43e0-B8FC-AC1667EBCBE1}">
-              <a14:hiddenEffects xmlns="" xmlns:a14="http://schemas.microsoft.com/office/drawing/2010/main">
+              <a14:hiddenEffects xmlns:a14="http://schemas.microsoft.com/office/drawing/2010/main" xmlns="">
                 <a:effectLst>
                   <a:outerShdw blurRad="63500" dist="38099" dir="2700000" algn="ctr" rotWithShape="0">
                     <a:srgbClr val="000000">
@@ -19520,7 +19519,7 @@
           <a:effectLst/>
           <a:extLst>
             <a:ext uri="{909E8E84-426E-40dd-AFC4-6F175D3DCCD1}">
-              <a14:hiddenFill xmlns="" xmlns:a14="http://schemas.microsoft.com/office/drawing/2010/main">
+              <a14:hiddenFill xmlns:a14="http://schemas.microsoft.com/office/drawing/2010/main" xmlns="">
                 <a:blipFill dpi="0" rotWithShape="0">
                   <a:blip/>
                   <a:srcRect/>
@@ -19531,7 +19530,7 @@
               </a14:hiddenFill>
             </a:ext>
             <a:ext uri="{91240B29-F687-4f45-9708-019B960494DF}">
-              <a14:hiddenLine xmlns="" xmlns:a14="http://schemas.microsoft.com/office/drawing/2010/main" w="9525">
+              <a14:hiddenLine xmlns:a14="http://schemas.microsoft.com/office/drawing/2010/main" xmlns="" w="9525">
                 <a:solidFill>
                   <a:srgbClr val="000000"/>
                 </a:solidFill>
@@ -19541,7 +19540,7 @@
               </a14:hiddenLine>
             </a:ext>
             <a:ext uri="{AF507438-7753-43e0-B8FC-AC1667EBCBE1}">
-              <a14:hiddenEffects xmlns="" xmlns:a14="http://schemas.microsoft.com/office/drawing/2010/main">
+              <a14:hiddenEffects xmlns:a14="http://schemas.microsoft.com/office/drawing/2010/main" xmlns="">
                 <a:effectLst>
                   <a:outerShdw blurRad="63500" dist="38099" dir="2700000" algn="ctr" rotWithShape="0">
                     <a:srgbClr val="000000">
@@ -19695,7 +19694,7 @@
           <a:effectLst/>
           <a:extLst>
             <a:ext uri="{909E8E84-426E-40dd-AFC4-6F175D3DCCD1}">
-              <a14:hiddenFill xmlns="" xmlns:a14="http://schemas.microsoft.com/office/drawing/2010/main">
+              <a14:hiddenFill xmlns:a14="http://schemas.microsoft.com/office/drawing/2010/main" xmlns="">
                 <a:blipFill dpi="0" rotWithShape="0">
                   <a:blip/>
                   <a:srcRect/>
@@ -19706,7 +19705,7 @@
               </a14:hiddenFill>
             </a:ext>
             <a:ext uri="{91240B29-F687-4f45-9708-019B960494DF}">
-              <a14:hiddenLine xmlns="" xmlns:a14="http://schemas.microsoft.com/office/drawing/2010/main" w="9525">
+              <a14:hiddenLine xmlns:a14="http://schemas.microsoft.com/office/drawing/2010/main" xmlns="" w="9525">
                 <a:solidFill>
                   <a:srgbClr val="000000"/>
                 </a:solidFill>
@@ -19716,7 +19715,7 @@
               </a14:hiddenLine>
             </a:ext>
             <a:ext uri="{AF507438-7753-43e0-B8FC-AC1667EBCBE1}">
-              <a14:hiddenEffects xmlns="" xmlns:a14="http://schemas.microsoft.com/office/drawing/2010/main">
+              <a14:hiddenEffects xmlns:a14="http://schemas.microsoft.com/office/drawing/2010/main" xmlns="">
                 <a:effectLst>
                   <a:outerShdw blurRad="63500" dist="38099" dir="2700000" algn="ctr" rotWithShape="0">
                     <a:srgbClr val="000000">
@@ -21509,7 +21508,7 @@
           <a:effectLst/>
           <a:extLst>
             <a:ext uri="{909E8E84-426E-40dd-AFC4-6F175D3DCCD1}">
-              <a14:hiddenFill xmlns="" xmlns:a14="http://schemas.microsoft.com/office/drawing/2010/main">
+              <a14:hiddenFill xmlns:a14="http://schemas.microsoft.com/office/drawing/2010/main" xmlns="">
                 <a:blipFill dpi="0" rotWithShape="0">
                   <a:blip/>
                   <a:srcRect/>
@@ -21520,7 +21519,7 @@
               </a14:hiddenFill>
             </a:ext>
             <a:ext uri="{91240B29-F687-4f45-9708-019B960494DF}">
-              <a14:hiddenLine xmlns="" xmlns:a14="http://schemas.microsoft.com/office/drawing/2010/main" w="9525">
+              <a14:hiddenLine xmlns:a14="http://schemas.microsoft.com/office/drawing/2010/main" xmlns="" w="9525">
                 <a:solidFill>
                   <a:srgbClr val="000000"/>
                 </a:solidFill>
@@ -21530,7 +21529,7 @@
               </a14:hiddenLine>
             </a:ext>
             <a:ext uri="{AF507438-7753-43e0-B8FC-AC1667EBCBE1}">
-              <a14:hiddenEffects xmlns="" xmlns:a14="http://schemas.microsoft.com/office/drawing/2010/main">
+              <a14:hiddenEffects xmlns:a14="http://schemas.microsoft.com/office/drawing/2010/main" xmlns="">
                 <a:effectLst>
                   <a:outerShdw blurRad="63500" dist="38099" dir="2700000" algn="ctr" rotWithShape="0">
                     <a:srgbClr val="000000">
@@ -24485,7 +24484,7 @@
           <a:effectLst/>
           <a:extLst>
             <a:ext uri="{909E8E84-426E-40dd-AFC4-6F175D3DCCD1}">
-              <a14:hiddenFill xmlns="" xmlns:a14="http://schemas.microsoft.com/office/drawing/2010/main">
+              <a14:hiddenFill xmlns:a14="http://schemas.microsoft.com/office/drawing/2010/main" xmlns="">
                 <a:blipFill dpi="0" rotWithShape="0">
                   <a:blip/>
                   <a:srcRect/>
@@ -24496,7 +24495,7 @@
               </a14:hiddenFill>
             </a:ext>
             <a:ext uri="{91240B29-F687-4f45-9708-019B960494DF}">
-              <a14:hiddenLine xmlns="" xmlns:a14="http://schemas.microsoft.com/office/drawing/2010/main" w="9525">
+              <a14:hiddenLine xmlns:a14="http://schemas.microsoft.com/office/drawing/2010/main" xmlns="" w="9525">
                 <a:solidFill>
                   <a:srgbClr val="000000"/>
                 </a:solidFill>
@@ -24506,7 +24505,7 @@
               </a14:hiddenLine>
             </a:ext>
             <a:ext uri="{AF507438-7753-43e0-B8FC-AC1667EBCBE1}">
-              <a14:hiddenEffects xmlns="" xmlns:a14="http://schemas.microsoft.com/office/drawing/2010/main">
+              <a14:hiddenEffects xmlns:a14="http://schemas.microsoft.com/office/drawing/2010/main" xmlns="">
                 <a:effectLst>
                   <a:outerShdw blurRad="63500" dist="38099" dir="2700000" algn="ctr" rotWithShape="0">
                     <a:srgbClr val="000000">
@@ -24585,7 +24584,7 @@
           <a:effectLst/>
           <a:extLst>
             <a:ext uri="{909E8E84-426E-40dd-AFC4-6F175D3DCCD1}">
-              <a14:hiddenFill xmlns="" xmlns:a14="http://schemas.microsoft.com/office/drawing/2010/main">
+              <a14:hiddenFill xmlns:a14="http://schemas.microsoft.com/office/drawing/2010/main" xmlns="">
                 <a:blipFill dpi="0" rotWithShape="0">
                   <a:blip/>
                   <a:srcRect/>
@@ -24596,7 +24595,7 @@
               </a14:hiddenFill>
             </a:ext>
             <a:ext uri="{91240B29-F687-4f45-9708-019B960494DF}">
-              <a14:hiddenLine xmlns="" xmlns:a14="http://schemas.microsoft.com/office/drawing/2010/main" w="9525">
+              <a14:hiddenLine xmlns:a14="http://schemas.microsoft.com/office/drawing/2010/main" xmlns="" w="9525">
                 <a:solidFill>
                   <a:srgbClr val="000000"/>
                 </a:solidFill>
@@ -24606,7 +24605,7 @@
               </a14:hiddenLine>
             </a:ext>
             <a:ext uri="{AF507438-7753-43e0-B8FC-AC1667EBCBE1}">
-              <a14:hiddenEffects xmlns="" xmlns:a14="http://schemas.microsoft.com/office/drawing/2010/main">
+              <a14:hiddenEffects xmlns:a14="http://schemas.microsoft.com/office/drawing/2010/main" xmlns="">
                 <a:effectLst>
                   <a:outerShdw blurRad="63500" dist="38099" dir="2700000" algn="ctr" rotWithShape="0">
                     <a:srgbClr val="000000">
@@ -26201,7 +26200,7 @@
           <a:effectLst/>
           <a:extLst>
             <a:ext uri="{909E8E84-426E-40dd-AFC4-6F175D3DCCD1}">
-              <a14:hiddenFill xmlns="" xmlns:a14="http://schemas.microsoft.com/office/drawing/2010/main">
+              <a14:hiddenFill xmlns:a14="http://schemas.microsoft.com/office/drawing/2010/main" xmlns="">
                 <a:blipFill dpi="0" rotWithShape="0">
                   <a:blip/>
                   <a:srcRect/>
@@ -26212,7 +26211,7 @@
               </a14:hiddenFill>
             </a:ext>
             <a:ext uri="{91240B29-F687-4f45-9708-019B960494DF}">
-              <a14:hiddenLine xmlns="" xmlns:a14="http://schemas.microsoft.com/office/drawing/2010/main" w="9525">
+              <a14:hiddenLine xmlns:a14="http://schemas.microsoft.com/office/drawing/2010/main" xmlns="" w="9525">
                 <a:solidFill>
                   <a:srgbClr val="000000"/>
                 </a:solidFill>
@@ -26222,7 +26221,7 @@
               </a14:hiddenLine>
             </a:ext>
             <a:ext uri="{AF507438-7753-43e0-B8FC-AC1667EBCBE1}">
-              <a14:hiddenEffects xmlns="" xmlns:a14="http://schemas.microsoft.com/office/drawing/2010/main">
+              <a14:hiddenEffects xmlns:a14="http://schemas.microsoft.com/office/drawing/2010/main" xmlns="">
                 <a:effectLst>
                   <a:outerShdw blurRad="63500" dist="38099" dir="2700000" algn="ctr" rotWithShape="0">
                     <a:srgbClr val="000000">
@@ -27870,7 +27869,7 @@
           <a:effectLst/>
           <a:extLst>
             <a:ext uri="{909E8E84-426E-40dd-AFC4-6F175D3DCCD1}">
-              <a14:hiddenFill xmlns="" xmlns:a14="http://schemas.microsoft.com/office/drawing/2010/main">
+              <a14:hiddenFill xmlns:a14="http://schemas.microsoft.com/office/drawing/2010/main" xmlns="">
                 <a:blipFill dpi="0" rotWithShape="0">
                   <a:blip/>
                   <a:srcRect/>
@@ -27881,7 +27880,7 @@
               </a14:hiddenFill>
             </a:ext>
             <a:ext uri="{91240B29-F687-4f45-9708-019B960494DF}">
-              <a14:hiddenLine xmlns="" xmlns:a14="http://schemas.microsoft.com/office/drawing/2010/main" w="9525">
+              <a14:hiddenLine xmlns:a14="http://schemas.microsoft.com/office/drawing/2010/main" xmlns="" w="9525">
                 <a:solidFill>
                   <a:srgbClr val="000000"/>
                 </a:solidFill>
@@ -27891,7 +27890,7 @@
               </a14:hiddenLine>
             </a:ext>
             <a:ext uri="{AF507438-7753-43e0-B8FC-AC1667EBCBE1}">
-              <a14:hiddenEffects xmlns="" xmlns:a14="http://schemas.microsoft.com/office/drawing/2010/main">
+              <a14:hiddenEffects xmlns:a14="http://schemas.microsoft.com/office/drawing/2010/main" xmlns="">
                 <a:effectLst>
                   <a:outerShdw blurRad="63500" dist="38099" dir="2700000" algn="ctr" rotWithShape="0">
                     <a:srgbClr val="000000">
@@ -29407,7 +29406,7 @@
           <a:effectLst/>
           <a:extLst>
             <a:ext uri="{909E8E84-426E-40dd-AFC4-6F175D3DCCD1}">
-              <a14:hiddenFill xmlns="" xmlns:a14="http://schemas.microsoft.com/office/drawing/2010/main">
+              <a14:hiddenFill xmlns:a14="http://schemas.microsoft.com/office/drawing/2010/main" xmlns="">
                 <a:blipFill dpi="0" rotWithShape="0">
                   <a:blip/>
                   <a:srcRect/>
@@ -29418,7 +29417,7 @@
               </a14:hiddenFill>
             </a:ext>
             <a:ext uri="{91240B29-F687-4f45-9708-019B960494DF}">
-              <a14:hiddenLine xmlns="" xmlns:a14="http://schemas.microsoft.com/office/drawing/2010/main" w="9525">
+              <a14:hiddenLine xmlns:a14="http://schemas.microsoft.com/office/drawing/2010/main" xmlns="" w="9525">
                 <a:solidFill>
                   <a:srgbClr val="000000"/>
                 </a:solidFill>
@@ -29428,7 +29427,7 @@
               </a14:hiddenLine>
             </a:ext>
             <a:ext uri="{AF507438-7753-43e0-B8FC-AC1667EBCBE1}">
-              <a14:hiddenEffects xmlns="" xmlns:a14="http://schemas.microsoft.com/office/drawing/2010/main">
+              <a14:hiddenEffects xmlns:a14="http://schemas.microsoft.com/office/drawing/2010/main" xmlns="">
                 <a:effectLst>
                   <a:outerShdw blurRad="63500" dist="38099" dir="2700000" algn="ctr" rotWithShape="0">
                     <a:srgbClr val="000000">
@@ -29559,7 +29558,7 @@
           <a:effectLst/>
           <a:extLst>
             <a:ext uri="{909E8E84-426E-40dd-AFC4-6F175D3DCCD1}">
-              <a14:hiddenFill xmlns="" xmlns:a14="http://schemas.microsoft.com/office/drawing/2010/main">
+              <a14:hiddenFill xmlns:a14="http://schemas.microsoft.com/office/drawing/2010/main" xmlns="">
                 <a:blipFill dpi="0" rotWithShape="0">
                   <a:blip/>
                   <a:srcRect/>
@@ -29570,7 +29569,7 @@
               </a14:hiddenFill>
             </a:ext>
             <a:ext uri="{91240B29-F687-4f45-9708-019B960494DF}">
-              <a14:hiddenLine xmlns="" xmlns:a14="http://schemas.microsoft.com/office/drawing/2010/main" w="9525">
+              <a14:hiddenLine xmlns:a14="http://schemas.microsoft.com/office/drawing/2010/main" xmlns="" w="9525">
                 <a:solidFill>
                   <a:srgbClr val="000000"/>
                 </a:solidFill>
@@ -29580,7 +29579,7 @@
               </a14:hiddenLine>
             </a:ext>
             <a:ext uri="{AF507438-7753-43e0-B8FC-AC1667EBCBE1}">
-              <a14:hiddenEffects xmlns="" xmlns:a14="http://schemas.microsoft.com/office/drawing/2010/main">
+              <a14:hiddenEffects xmlns:a14="http://schemas.microsoft.com/office/drawing/2010/main" xmlns="">
                 <a:effectLst>
                   <a:outerShdw blurRad="63500" dist="38099" dir="2700000" algn="ctr" rotWithShape="0">
                     <a:srgbClr val="000000">
@@ -37547,7 +37546,7 @@
           <a:effectLst/>
           <a:extLst>
             <a:ext uri="{909E8E84-426E-40dd-AFC4-6F175D3DCCD1}">
-              <a14:hiddenFill xmlns:a14="http://schemas.microsoft.com/office/drawing/2010/main" xmlns="">
+              <a14:hiddenFill xmlns="" xmlns:a14="http://schemas.microsoft.com/office/drawing/2010/main">
                 <a:blipFill dpi="0" rotWithShape="0">
                   <a:blip/>
                   <a:srcRect/>
@@ -37558,7 +37557,7 @@
               </a14:hiddenFill>
             </a:ext>
             <a:ext uri="{91240B29-F687-4f45-9708-019B960494DF}">
-              <a14:hiddenLine xmlns:a14="http://schemas.microsoft.com/office/drawing/2010/main" xmlns="" w="9525">
+              <a14:hiddenLine xmlns="" xmlns:a14="http://schemas.microsoft.com/office/drawing/2010/main" w="9525">
                 <a:solidFill>
                   <a:srgbClr val="000000"/>
                 </a:solidFill>
@@ -37568,7 +37567,7 @@
               </a14:hiddenLine>
             </a:ext>
             <a:ext uri="{AF507438-7753-43e0-B8FC-AC1667EBCBE1}">
-              <a14:hiddenEffects xmlns:a14="http://schemas.microsoft.com/office/drawing/2010/main" xmlns="">
+              <a14:hiddenEffects xmlns="" xmlns:a14="http://schemas.microsoft.com/office/drawing/2010/main">
                 <a:effectLst>
                   <a:outerShdw blurRad="63500" dist="38099" dir="2700000" algn="ctr" rotWithShape="0">
                     <a:srgbClr val="000000">

</xml_diff>

<commit_message>
Some more minor changes
</commit_message>
<xml_diff>
--- a/marple_itx18.pptx
+++ b/marple_itx18.pptx
@@ -7720,16 +7720,12 @@
           <a:lstStyle/>
           <a:p>
             <a:r>
-              <a:rPr lang="en-US" sz="3200"/>
-              <a:t>Joint </a:t>
-            </a:r>
-            <a:r>
               <a:rPr lang="en-US" sz="3200" dirty="0"/>
-              <a:t>work with Srinivas Narayana</a:t>
+              <a:t>Joint work with </a:t>
             </a:r>
             <a:r>
               <a:rPr lang="en-US" sz="3200" b="1" dirty="0"/>
-              <a:t>,</a:t>
+              <a:t>Srinivas Narayana,</a:t>
             </a:r>
             <a:r>
               <a:rPr lang="en-US" sz="3600" b="1" dirty="0"/>
@@ -7806,7 +7802,7 @@
         </p:blipFill>
         <p:spPr>
           <a:xfrm>
-            <a:off x="3549648" y="3327913"/>
+            <a:off x="3549649" y="3327913"/>
             <a:ext cx="5092700" cy="1070702"/>
           </a:xfrm>
           <a:prstGeom prst="rect">
@@ -7828,7 +7824,7 @@
         </p:nvSpPr>
         <p:spPr>
           <a:xfrm>
-            <a:off x="4067238" y="2693713"/>
+            <a:off x="4067239" y="2693713"/>
             <a:ext cx="4057521" cy="584775"/>
           </a:xfrm>
           <a:prstGeom prst="rect">
@@ -12520,7 +12516,7 @@
           <a:effectLst/>
           <a:extLst>
             <a:ext uri="{909E8E84-426E-40dd-AFC4-6F175D3DCCD1}">
-              <a14:hiddenFill xmlns="" xmlns:a14="http://schemas.microsoft.com/office/drawing/2010/main">
+              <a14:hiddenFill xmlns:a14="http://schemas.microsoft.com/office/drawing/2010/main" xmlns="">
                 <a:blipFill dpi="0" rotWithShape="0">
                   <a:blip/>
                   <a:srcRect/>
@@ -12531,7 +12527,7 @@
               </a14:hiddenFill>
             </a:ext>
             <a:ext uri="{91240B29-F687-4f45-9708-019B960494DF}">
-              <a14:hiddenLine xmlns="" xmlns:a14="http://schemas.microsoft.com/office/drawing/2010/main" w="9525">
+              <a14:hiddenLine xmlns:a14="http://schemas.microsoft.com/office/drawing/2010/main" xmlns="" w="9525">
                 <a:solidFill>
                   <a:srgbClr val="000000"/>
                 </a:solidFill>
@@ -12541,7 +12537,7 @@
               </a14:hiddenLine>
             </a:ext>
             <a:ext uri="{AF507438-7753-43e0-B8FC-AC1667EBCBE1}">
-              <a14:hiddenEffects xmlns="" xmlns:a14="http://schemas.microsoft.com/office/drawing/2010/main">
+              <a14:hiddenEffects xmlns:a14="http://schemas.microsoft.com/office/drawing/2010/main" xmlns="">
                 <a:effectLst>
                   <a:outerShdw blurRad="63500" dist="38099" dir="2700000" algn="ctr" rotWithShape="0">
                     <a:srgbClr val="000000">
@@ -12590,7 +12586,7 @@
           <a:effectLst/>
           <a:extLst>
             <a:ext uri="{909E8E84-426E-40dd-AFC4-6F175D3DCCD1}">
-              <a14:hiddenFill xmlns="" xmlns:a14="http://schemas.microsoft.com/office/drawing/2010/main">
+              <a14:hiddenFill xmlns:a14="http://schemas.microsoft.com/office/drawing/2010/main" xmlns="">
                 <a:blipFill dpi="0" rotWithShape="0">
                   <a:blip/>
                   <a:srcRect/>
@@ -12601,7 +12597,7 @@
               </a14:hiddenFill>
             </a:ext>
             <a:ext uri="{91240B29-F687-4f45-9708-019B960494DF}">
-              <a14:hiddenLine xmlns="" xmlns:a14="http://schemas.microsoft.com/office/drawing/2010/main" w="9525">
+              <a14:hiddenLine xmlns:a14="http://schemas.microsoft.com/office/drawing/2010/main" xmlns="" w="9525">
                 <a:solidFill>
                   <a:srgbClr val="000000"/>
                 </a:solidFill>
@@ -12611,7 +12607,7 @@
               </a14:hiddenLine>
             </a:ext>
             <a:ext uri="{AF507438-7753-43e0-B8FC-AC1667EBCBE1}">
-              <a14:hiddenEffects xmlns="" xmlns:a14="http://schemas.microsoft.com/office/drawing/2010/main">
+              <a14:hiddenEffects xmlns:a14="http://schemas.microsoft.com/office/drawing/2010/main" xmlns="">
                 <a:effectLst>
                   <a:outerShdw blurRad="63500" dist="38099" dir="2700000" algn="ctr" rotWithShape="0">
                     <a:srgbClr val="000000">
@@ -12746,7 +12742,7 @@
             <a:effectLst/>
             <a:extLst>
               <a:ext uri="{909E8E84-426E-40dd-AFC4-6F175D3DCCD1}">
-                <a14:hiddenFill xmlns:a14="http://schemas.microsoft.com/office/drawing/2010/main" xmlns="">
+                <a14:hiddenFill xmlns="" xmlns:a14="http://schemas.microsoft.com/office/drawing/2010/main">
                   <a:blipFill dpi="0" rotWithShape="0">
                     <a:blip/>
                     <a:srcRect/>
@@ -12757,7 +12753,7 @@
                 </a14:hiddenFill>
               </a:ext>
               <a:ext uri="{91240B29-F687-4f45-9708-019B960494DF}">
-                <a14:hiddenLine xmlns:a14="http://schemas.microsoft.com/office/drawing/2010/main" xmlns="" w="9525">
+                <a14:hiddenLine xmlns="" xmlns:a14="http://schemas.microsoft.com/office/drawing/2010/main" w="9525">
                   <a:solidFill>
                     <a:srgbClr val="000000"/>
                   </a:solidFill>
@@ -12767,7 +12763,7 @@
                 </a14:hiddenLine>
               </a:ext>
               <a:ext uri="{AF507438-7753-43e0-B8FC-AC1667EBCBE1}">
-                <a14:hiddenEffects xmlns:a14="http://schemas.microsoft.com/office/drawing/2010/main" xmlns="">
+                <a14:hiddenEffects xmlns="" xmlns:a14="http://schemas.microsoft.com/office/drawing/2010/main">
                   <a:effectLst>
                     <a:outerShdw blurRad="63500" dist="38099" dir="2700000" algn="ctr" rotWithShape="0">
                       <a:srgbClr val="000000">
@@ -12816,7 +12812,7 @@
             <a:effectLst/>
             <a:extLst>
               <a:ext uri="{909E8E84-426E-40dd-AFC4-6F175D3DCCD1}">
-                <a14:hiddenFill xmlns:a14="http://schemas.microsoft.com/office/drawing/2010/main" xmlns="">
+                <a14:hiddenFill xmlns="" xmlns:a14="http://schemas.microsoft.com/office/drawing/2010/main">
                   <a:blipFill dpi="0" rotWithShape="0">
                     <a:blip/>
                     <a:srcRect/>
@@ -12827,7 +12823,7 @@
                 </a14:hiddenFill>
               </a:ext>
               <a:ext uri="{91240B29-F687-4f45-9708-019B960494DF}">
-                <a14:hiddenLine xmlns:a14="http://schemas.microsoft.com/office/drawing/2010/main" xmlns="" w="9525">
+                <a14:hiddenLine xmlns="" xmlns:a14="http://schemas.microsoft.com/office/drawing/2010/main" w="9525">
                   <a:solidFill>
                     <a:srgbClr val="000000"/>
                   </a:solidFill>
@@ -12837,7 +12833,7 @@
                 </a14:hiddenLine>
               </a:ext>
               <a:ext uri="{AF507438-7753-43e0-B8FC-AC1667EBCBE1}">
-                <a14:hiddenEffects xmlns:a14="http://schemas.microsoft.com/office/drawing/2010/main" xmlns="">
+                <a14:hiddenEffects xmlns="" xmlns:a14="http://schemas.microsoft.com/office/drawing/2010/main">
                   <a:effectLst>
                     <a:outerShdw blurRad="63500" dist="38099" dir="2700000" algn="ctr" rotWithShape="0">
                       <a:srgbClr val="000000">
@@ -12886,7 +12882,7 @@
             <a:effectLst/>
             <a:extLst>
               <a:ext uri="{909E8E84-426E-40dd-AFC4-6F175D3DCCD1}">
-                <a14:hiddenFill xmlns:a14="http://schemas.microsoft.com/office/drawing/2010/main" xmlns="">
+                <a14:hiddenFill xmlns="" xmlns:a14="http://schemas.microsoft.com/office/drawing/2010/main">
                   <a:blipFill dpi="0" rotWithShape="0">
                     <a:blip/>
                     <a:srcRect/>
@@ -12897,7 +12893,7 @@
                 </a14:hiddenFill>
               </a:ext>
               <a:ext uri="{91240B29-F687-4f45-9708-019B960494DF}">
-                <a14:hiddenLine xmlns:a14="http://schemas.microsoft.com/office/drawing/2010/main" xmlns="" w="9525">
+                <a14:hiddenLine xmlns="" xmlns:a14="http://schemas.microsoft.com/office/drawing/2010/main" w="9525">
                   <a:solidFill>
                     <a:srgbClr val="000000"/>
                   </a:solidFill>
@@ -12907,7 +12903,7 @@
                 </a14:hiddenLine>
               </a:ext>
               <a:ext uri="{AF507438-7753-43e0-B8FC-AC1667EBCBE1}">
-                <a14:hiddenEffects xmlns:a14="http://schemas.microsoft.com/office/drawing/2010/main" xmlns="">
+                <a14:hiddenEffects xmlns="" xmlns:a14="http://schemas.microsoft.com/office/drawing/2010/main">
                   <a:effectLst>
                     <a:outerShdw blurRad="63500" dist="38099" dir="2700000" algn="ctr" rotWithShape="0">
                       <a:srgbClr val="000000">
@@ -12948,12 +12944,12 @@
             <a:effectLst/>
             <a:extLst>
               <a:ext uri="{909E8E84-426E-40dd-AFC4-6F175D3DCCD1}">
-                <a14:hiddenFill xmlns:a14="http://schemas.microsoft.com/office/drawing/2010/main" xmlns="">
+                <a14:hiddenFill xmlns="" xmlns:a14="http://schemas.microsoft.com/office/drawing/2010/main">
                   <a:noFill/>
                 </a14:hiddenFill>
               </a:ext>
               <a:ext uri="{AF507438-7753-43e0-B8FC-AC1667EBCBE1}">
-                <a14:hiddenEffects xmlns:a14="http://schemas.microsoft.com/office/drawing/2010/main" xmlns="">
+                <a14:hiddenEffects xmlns="" xmlns:a14="http://schemas.microsoft.com/office/drawing/2010/main">
                   <a:effectLst>
                     <a:outerShdw blurRad="63500" dist="38099" dir="2700000" algn="ctr" rotWithShape="0">
                       <a:srgbClr val="000000">
@@ -13006,12 +13002,12 @@
             <a:effectLst/>
             <a:extLst>
               <a:ext uri="{909E8E84-426E-40dd-AFC4-6F175D3DCCD1}">
-                <a14:hiddenFill xmlns:a14="http://schemas.microsoft.com/office/drawing/2010/main" xmlns="">
+                <a14:hiddenFill xmlns="" xmlns:a14="http://schemas.microsoft.com/office/drawing/2010/main">
                   <a:noFill/>
                 </a14:hiddenFill>
               </a:ext>
               <a:ext uri="{AF507438-7753-43e0-B8FC-AC1667EBCBE1}">
-                <a14:hiddenEffects xmlns:a14="http://schemas.microsoft.com/office/drawing/2010/main" xmlns="">
+                <a14:hiddenEffects xmlns="" xmlns:a14="http://schemas.microsoft.com/office/drawing/2010/main">
                   <a:effectLst>
                     <a:outerShdw blurRad="63500" dist="38099" dir="2700000" algn="ctr" rotWithShape="0">
                       <a:srgbClr val="000000">
@@ -13064,12 +13060,12 @@
             <a:effectLst/>
             <a:extLst>
               <a:ext uri="{909E8E84-426E-40dd-AFC4-6F175D3DCCD1}">
-                <a14:hiddenFill xmlns:a14="http://schemas.microsoft.com/office/drawing/2010/main" xmlns="">
+                <a14:hiddenFill xmlns="" xmlns:a14="http://schemas.microsoft.com/office/drawing/2010/main">
                   <a:noFill/>
                 </a14:hiddenFill>
               </a:ext>
               <a:ext uri="{AF507438-7753-43e0-B8FC-AC1667EBCBE1}">
-                <a14:hiddenEffects xmlns:a14="http://schemas.microsoft.com/office/drawing/2010/main" xmlns="">
+                <a14:hiddenEffects xmlns="" xmlns:a14="http://schemas.microsoft.com/office/drawing/2010/main">
                   <a:effectLst>
                     <a:outerShdw blurRad="63500" dist="38099" dir="2700000" algn="ctr" rotWithShape="0">
                       <a:srgbClr val="000000">
@@ -13122,12 +13118,12 @@
             <a:effectLst/>
             <a:extLst>
               <a:ext uri="{909E8E84-426E-40dd-AFC4-6F175D3DCCD1}">
-                <a14:hiddenFill xmlns:a14="http://schemas.microsoft.com/office/drawing/2010/main" xmlns="">
+                <a14:hiddenFill xmlns="" xmlns:a14="http://schemas.microsoft.com/office/drawing/2010/main">
                   <a:noFill/>
                 </a14:hiddenFill>
               </a:ext>
               <a:ext uri="{AF507438-7753-43e0-B8FC-AC1667EBCBE1}">
-                <a14:hiddenEffects xmlns:a14="http://schemas.microsoft.com/office/drawing/2010/main" xmlns="">
+                <a14:hiddenEffects xmlns="" xmlns:a14="http://schemas.microsoft.com/office/drawing/2010/main">
                   <a:effectLst>
                     <a:outerShdw blurRad="63500" dist="38099" dir="2700000" algn="ctr" rotWithShape="0">
                       <a:srgbClr val="000000">
@@ -13180,12 +13176,12 @@
             <a:effectLst/>
             <a:extLst>
               <a:ext uri="{909E8E84-426E-40dd-AFC4-6F175D3DCCD1}">
-                <a14:hiddenFill xmlns:a14="http://schemas.microsoft.com/office/drawing/2010/main" xmlns="">
+                <a14:hiddenFill xmlns="" xmlns:a14="http://schemas.microsoft.com/office/drawing/2010/main">
                   <a:noFill/>
                 </a14:hiddenFill>
               </a:ext>
               <a:ext uri="{AF507438-7753-43e0-B8FC-AC1667EBCBE1}">
-                <a14:hiddenEffects xmlns:a14="http://schemas.microsoft.com/office/drawing/2010/main" xmlns="">
+                <a14:hiddenEffects xmlns="" xmlns:a14="http://schemas.microsoft.com/office/drawing/2010/main">
                   <a:effectLst>
                     <a:outerShdw blurRad="63500" dist="38099" dir="2700000" algn="ctr" rotWithShape="0">
                       <a:srgbClr val="000000">
@@ -13238,12 +13234,12 @@
             <a:effectLst/>
             <a:extLst>
               <a:ext uri="{909E8E84-426E-40dd-AFC4-6F175D3DCCD1}">
-                <a14:hiddenFill xmlns:a14="http://schemas.microsoft.com/office/drawing/2010/main" xmlns="">
+                <a14:hiddenFill xmlns="" xmlns:a14="http://schemas.microsoft.com/office/drawing/2010/main">
                   <a:noFill/>
                 </a14:hiddenFill>
               </a:ext>
               <a:ext uri="{AF507438-7753-43e0-B8FC-AC1667EBCBE1}">
-                <a14:hiddenEffects xmlns:a14="http://schemas.microsoft.com/office/drawing/2010/main" xmlns="">
+                <a14:hiddenEffects xmlns="" xmlns:a14="http://schemas.microsoft.com/office/drawing/2010/main">
                   <a:effectLst>
                     <a:outerShdw blurRad="63500" dist="38099" dir="2700000" algn="ctr" rotWithShape="0">
                       <a:srgbClr val="000000">
@@ -13296,12 +13292,12 @@
             <a:effectLst/>
             <a:extLst>
               <a:ext uri="{909E8E84-426E-40dd-AFC4-6F175D3DCCD1}">
-                <a14:hiddenFill xmlns:a14="http://schemas.microsoft.com/office/drawing/2010/main" xmlns="">
+                <a14:hiddenFill xmlns="" xmlns:a14="http://schemas.microsoft.com/office/drawing/2010/main">
                   <a:noFill/>
                 </a14:hiddenFill>
               </a:ext>
               <a:ext uri="{AF507438-7753-43e0-B8FC-AC1667EBCBE1}">
-                <a14:hiddenEffects xmlns:a14="http://schemas.microsoft.com/office/drawing/2010/main" xmlns="">
+                <a14:hiddenEffects xmlns="" xmlns:a14="http://schemas.microsoft.com/office/drawing/2010/main">
                   <a:effectLst>
                     <a:outerShdw blurRad="63500" dist="38099" dir="2700000" algn="ctr" rotWithShape="0">
                       <a:srgbClr val="000000">
@@ -13354,12 +13350,12 @@
             <a:effectLst/>
             <a:extLst>
               <a:ext uri="{909E8E84-426E-40dd-AFC4-6F175D3DCCD1}">
-                <a14:hiddenFill xmlns:a14="http://schemas.microsoft.com/office/drawing/2010/main" xmlns="">
+                <a14:hiddenFill xmlns="" xmlns:a14="http://schemas.microsoft.com/office/drawing/2010/main">
                   <a:noFill/>
                 </a14:hiddenFill>
               </a:ext>
               <a:ext uri="{AF507438-7753-43e0-B8FC-AC1667EBCBE1}">
-                <a14:hiddenEffects xmlns:a14="http://schemas.microsoft.com/office/drawing/2010/main" xmlns="">
+                <a14:hiddenEffects xmlns="" xmlns:a14="http://schemas.microsoft.com/office/drawing/2010/main">
                   <a:effectLst>
                     <a:outerShdw blurRad="63500" dist="38099" dir="2700000" algn="ctr" rotWithShape="0">
                       <a:srgbClr val="000000">
@@ -13412,12 +13408,12 @@
             <a:effectLst/>
             <a:extLst>
               <a:ext uri="{909E8E84-426E-40dd-AFC4-6F175D3DCCD1}">
-                <a14:hiddenFill xmlns:a14="http://schemas.microsoft.com/office/drawing/2010/main" xmlns="">
+                <a14:hiddenFill xmlns="" xmlns:a14="http://schemas.microsoft.com/office/drawing/2010/main">
                   <a:noFill/>
                 </a14:hiddenFill>
               </a:ext>
               <a:ext uri="{AF507438-7753-43e0-B8FC-AC1667EBCBE1}">
-                <a14:hiddenEffects xmlns:a14="http://schemas.microsoft.com/office/drawing/2010/main" xmlns="">
+                <a14:hiddenEffects xmlns="" xmlns:a14="http://schemas.microsoft.com/office/drawing/2010/main">
                   <a:effectLst>
                     <a:outerShdw blurRad="63500" dist="38099" dir="2700000" algn="ctr" rotWithShape="0">
                       <a:srgbClr val="000000">
@@ -13470,12 +13466,12 @@
             <a:effectLst/>
             <a:extLst>
               <a:ext uri="{909E8E84-426E-40dd-AFC4-6F175D3DCCD1}">
-                <a14:hiddenFill xmlns:a14="http://schemas.microsoft.com/office/drawing/2010/main" xmlns="">
+                <a14:hiddenFill xmlns="" xmlns:a14="http://schemas.microsoft.com/office/drawing/2010/main">
                   <a:noFill/>
                 </a14:hiddenFill>
               </a:ext>
               <a:ext uri="{AF507438-7753-43e0-B8FC-AC1667EBCBE1}">
-                <a14:hiddenEffects xmlns:a14="http://schemas.microsoft.com/office/drawing/2010/main" xmlns="">
+                <a14:hiddenEffects xmlns="" xmlns:a14="http://schemas.microsoft.com/office/drawing/2010/main">
                   <a:effectLst>
                     <a:outerShdw blurRad="63500" dist="38099" dir="2700000" algn="ctr" rotWithShape="0">
                       <a:srgbClr val="000000">
@@ -13536,7 +13532,7 @@
             <a:effectLst/>
             <a:extLst>
               <a:ext uri="{909E8E84-426E-40dd-AFC4-6F175D3DCCD1}">
-                <a14:hiddenFill xmlns:a14="http://schemas.microsoft.com/office/drawing/2010/main" xmlns="">
+                <a14:hiddenFill xmlns="" xmlns:a14="http://schemas.microsoft.com/office/drawing/2010/main">
                   <a:blipFill dpi="0" rotWithShape="0">
                     <a:blip/>
                     <a:srcRect/>
@@ -13547,7 +13543,7 @@
                 </a14:hiddenFill>
               </a:ext>
               <a:ext uri="{91240B29-F687-4f45-9708-019B960494DF}">
-                <a14:hiddenLine xmlns:a14="http://schemas.microsoft.com/office/drawing/2010/main" xmlns="" w="9525">
+                <a14:hiddenLine xmlns="" xmlns:a14="http://schemas.microsoft.com/office/drawing/2010/main" w="9525">
                   <a:solidFill>
                     <a:srgbClr val="000000"/>
                   </a:solidFill>
@@ -13557,7 +13553,7 @@
                 </a14:hiddenLine>
               </a:ext>
               <a:ext uri="{AF507438-7753-43e0-B8FC-AC1667EBCBE1}">
-                <a14:hiddenEffects xmlns:a14="http://schemas.microsoft.com/office/drawing/2010/main" xmlns="">
+                <a14:hiddenEffects xmlns="" xmlns:a14="http://schemas.microsoft.com/office/drawing/2010/main">
                   <a:effectLst>
                     <a:outerShdw blurRad="63500" dist="38099" dir="2700000" algn="ctr" rotWithShape="0">
                       <a:srgbClr val="000000">
@@ -13606,7 +13602,7 @@
             <a:effectLst/>
             <a:extLst>
               <a:ext uri="{909E8E84-426E-40dd-AFC4-6F175D3DCCD1}">
-                <a14:hiddenFill xmlns:a14="http://schemas.microsoft.com/office/drawing/2010/main" xmlns="">
+                <a14:hiddenFill xmlns="" xmlns:a14="http://schemas.microsoft.com/office/drawing/2010/main">
                   <a:blipFill dpi="0" rotWithShape="0">
                     <a:blip/>
                     <a:srcRect/>
@@ -13617,7 +13613,7 @@
                 </a14:hiddenFill>
               </a:ext>
               <a:ext uri="{91240B29-F687-4f45-9708-019B960494DF}">
-                <a14:hiddenLine xmlns:a14="http://schemas.microsoft.com/office/drawing/2010/main" xmlns="" w="9525">
+                <a14:hiddenLine xmlns="" xmlns:a14="http://schemas.microsoft.com/office/drawing/2010/main" w="9525">
                   <a:solidFill>
                     <a:srgbClr val="000000"/>
                   </a:solidFill>
@@ -13627,7 +13623,7 @@
                 </a14:hiddenLine>
               </a:ext>
               <a:ext uri="{AF507438-7753-43e0-B8FC-AC1667EBCBE1}">
-                <a14:hiddenEffects xmlns:a14="http://schemas.microsoft.com/office/drawing/2010/main" xmlns="">
+                <a14:hiddenEffects xmlns="" xmlns:a14="http://schemas.microsoft.com/office/drawing/2010/main">
                   <a:effectLst>
                     <a:outerShdw blurRad="63500" dist="38099" dir="2700000" algn="ctr" rotWithShape="0">
                       <a:srgbClr val="000000">
@@ -13676,7 +13672,7 @@
             <a:effectLst/>
             <a:extLst>
               <a:ext uri="{909E8E84-426E-40dd-AFC4-6F175D3DCCD1}">
-                <a14:hiddenFill xmlns:a14="http://schemas.microsoft.com/office/drawing/2010/main" xmlns="">
+                <a14:hiddenFill xmlns="" xmlns:a14="http://schemas.microsoft.com/office/drawing/2010/main">
                   <a:blipFill dpi="0" rotWithShape="0">
                     <a:blip/>
                     <a:srcRect/>
@@ -13687,7 +13683,7 @@
                 </a14:hiddenFill>
               </a:ext>
               <a:ext uri="{91240B29-F687-4f45-9708-019B960494DF}">
-                <a14:hiddenLine xmlns:a14="http://schemas.microsoft.com/office/drawing/2010/main" xmlns="" w="9525">
+                <a14:hiddenLine xmlns="" xmlns:a14="http://schemas.microsoft.com/office/drawing/2010/main" w="9525">
                   <a:solidFill>
                     <a:srgbClr val="000000"/>
                   </a:solidFill>
@@ -13697,7 +13693,7 @@
                 </a14:hiddenLine>
               </a:ext>
               <a:ext uri="{AF507438-7753-43e0-B8FC-AC1667EBCBE1}">
-                <a14:hiddenEffects xmlns:a14="http://schemas.microsoft.com/office/drawing/2010/main" xmlns="">
+                <a14:hiddenEffects xmlns="" xmlns:a14="http://schemas.microsoft.com/office/drawing/2010/main">
                   <a:effectLst>
                     <a:outerShdw blurRad="63500" dist="38099" dir="2700000" algn="ctr" rotWithShape="0">
                       <a:srgbClr val="000000">
@@ -13746,7 +13742,7 @@
             <a:effectLst/>
             <a:extLst>
               <a:ext uri="{909E8E84-426E-40dd-AFC4-6F175D3DCCD1}">
-                <a14:hiddenFill xmlns:a14="http://schemas.microsoft.com/office/drawing/2010/main" xmlns="">
+                <a14:hiddenFill xmlns="" xmlns:a14="http://schemas.microsoft.com/office/drawing/2010/main">
                   <a:blipFill dpi="0" rotWithShape="0">
                     <a:blip/>
                     <a:srcRect/>
@@ -13757,7 +13753,7 @@
                 </a14:hiddenFill>
               </a:ext>
               <a:ext uri="{91240B29-F687-4f45-9708-019B960494DF}">
-                <a14:hiddenLine xmlns:a14="http://schemas.microsoft.com/office/drawing/2010/main" xmlns="" w="9525">
+                <a14:hiddenLine xmlns="" xmlns:a14="http://schemas.microsoft.com/office/drawing/2010/main" w="9525">
                   <a:solidFill>
                     <a:srgbClr val="000000"/>
                   </a:solidFill>
@@ -13767,7 +13763,7 @@
                 </a14:hiddenLine>
               </a:ext>
               <a:ext uri="{AF507438-7753-43e0-B8FC-AC1667EBCBE1}">
-                <a14:hiddenEffects xmlns:a14="http://schemas.microsoft.com/office/drawing/2010/main" xmlns="">
+                <a14:hiddenEffects xmlns="" xmlns:a14="http://schemas.microsoft.com/office/drawing/2010/main">
                   <a:effectLst>
                     <a:outerShdw blurRad="63500" dist="38099" dir="2700000" algn="ctr" rotWithShape="0">
                       <a:srgbClr val="000000">
@@ -13816,7 +13812,7 @@
             <a:effectLst/>
             <a:extLst>
               <a:ext uri="{909E8E84-426E-40dd-AFC4-6F175D3DCCD1}">
-                <a14:hiddenFill xmlns:a14="http://schemas.microsoft.com/office/drawing/2010/main" xmlns="">
+                <a14:hiddenFill xmlns="" xmlns:a14="http://schemas.microsoft.com/office/drawing/2010/main">
                   <a:blipFill dpi="0" rotWithShape="0">
                     <a:blip/>
                     <a:srcRect/>
@@ -13827,7 +13823,7 @@
                 </a14:hiddenFill>
               </a:ext>
               <a:ext uri="{91240B29-F687-4f45-9708-019B960494DF}">
-                <a14:hiddenLine xmlns:a14="http://schemas.microsoft.com/office/drawing/2010/main" xmlns="" w="9525">
+                <a14:hiddenLine xmlns="" xmlns:a14="http://schemas.microsoft.com/office/drawing/2010/main" w="9525">
                   <a:solidFill>
                     <a:srgbClr val="000000"/>
                   </a:solidFill>
@@ -13837,7 +13833,7 @@
                 </a14:hiddenLine>
               </a:ext>
               <a:ext uri="{AF507438-7753-43e0-B8FC-AC1667EBCBE1}">
-                <a14:hiddenEffects xmlns:a14="http://schemas.microsoft.com/office/drawing/2010/main" xmlns="">
+                <a14:hiddenEffects xmlns="" xmlns:a14="http://schemas.microsoft.com/office/drawing/2010/main">
                   <a:effectLst>
                     <a:outerShdw blurRad="63500" dist="38099" dir="2700000" algn="ctr" rotWithShape="0">
                       <a:srgbClr val="000000">
@@ -13878,12 +13874,12 @@
             <a:effectLst/>
             <a:extLst>
               <a:ext uri="{909E8E84-426E-40dd-AFC4-6F175D3DCCD1}">
-                <a14:hiddenFill xmlns:a14="http://schemas.microsoft.com/office/drawing/2010/main" xmlns="">
+                <a14:hiddenFill xmlns="" xmlns:a14="http://schemas.microsoft.com/office/drawing/2010/main">
                   <a:noFill/>
                 </a14:hiddenFill>
               </a:ext>
               <a:ext uri="{AF507438-7753-43e0-B8FC-AC1667EBCBE1}">
-                <a14:hiddenEffects xmlns:a14="http://schemas.microsoft.com/office/drawing/2010/main" xmlns="">
+                <a14:hiddenEffects xmlns="" xmlns:a14="http://schemas.microsoft.com/office/drawing/2010/main">
                   <a:effectLst>
                     <a:outerShdw blurRad="63500" dist="38099" dir="2700000" algn="ctr" rotWithShape="0">
                       <a:srgbClr val="000000">
@@ -13936,12 +13932,12 @@
             <a:effectLst/>
             <a:extLst>
               <a:ext uri="{909E8E84-426E-40dd-AFC4-6F175D3DCCD1}">
-                <a14:hiddenFill xmlns:a14="http://schemas.microsoft.com/office/drawing/2010/main" xmlns="">
+                <a14:hiddenFill xmlns="" xmlns:a14="http://schemas.microsoft.com/office/drawing/2010/main">
                   <a:noFill/>
                 </a14:hiddenFill>
               </a:ext>
               <a:ext uri="{AF507438-7753-43e0-B8FC-AC1667EBCBE1}">
-                <a14:hiddenEffects xmlns:a14="http://schemas.microsoft.com/office/drawing/2010/main" xmlns="">
+                <a14:hiddenEffects xmlns="" xmlns:a14="http://schemas.microsoft.com/office/drawing/2010/main">
                   <a:effectLst>
                     <a:outerShdw blurRad="63500" dist="38099" dir="2700000" algn="ctr" rotWithShape="0">
                       <a:srgbClr val="000000">
@@ -14002,7 +13998,7 @@
             <a:effectLst/>
             <a:extLst>
               <a:ext uri="{909E8E84-426E-40dd-AFC4-6F175D3DCCD1}">
-                <a14:hiddenFill xmlns:a14="http://schemas.microsoft.com/office/drawing/2010/main" xmlns="">
+                <a14:hiddenFill xmlns="" xmlns:a14="http://schemas.microsoft.com/office/drawing/2010/main">
                   <a:blipFill dpi="0" rotWithShape="0">
                     <a:blip/>
                     <a:srcRect/>
@@ -14013,7 +14009,7 @@
                 </a14:hiddenFill>
               </a:ext>
               <a:ext uri="{91240B29-F687-4f45-9708-019B960494DF}">
-                <a14:hiddenLine xmlns:a14="http://schemas.microsoft.com/office/drawing/2010/main" xmlns="" w="9525">
+                <a14:hiddenLine xmlns="" xmlns:a14="http://schemas.microsoft.com/office/drawing/2010/main" w="9525">
                   <a:solidFill>
                     <a:srgbClr val="000000"/>
                   </a:solidFill>
@@ -14023,7 +14019,7 @@
                 </a14:hiddenLine>
               </a:ext>
               <a:ext uri="{AF507438-7753-43e0-B8FC-AC1667EBCBE1}">
-                <a14:hiddenEffects xmlns:a14="http://schemas.microsoft.com/office/drawing/2010/main" xmlns="">
+                <a14:hiddenEffects xmlns="" xmlns:a14="http://schemas.microsoft.com/office/drawing/2010/main">
                   <a:effectLst>
                     <a:outerShdw blurRad="63500" dist="38099" dir="2700000" algn="ctr" rotWithShape="0">
                       <a:srgbClr val="000000">
@@ -14156,7 +14152,7 @@
           <a:effectLst/>
           <a:extLst>
             <a:ext uri="{909E8E84-426E-40dd-AFC4-6F175D3DCCD1}">
-              <a14:hiddenFill xmlns="" xmlns:a14="http://schemas.microsoft.com/office/drawing/2010/main">
+              <a14:hiddenFill xmlns:a14="http://schemas.microsoft.com/office/drawing/2010/main" xmlns="">
                 <a:blipFill dpi="0" rotWithShape="0">
                   <a:blip/>
                   <a:srcRect/>
@@ -14167,7 +14163,7 @@
               </a14:hiddenFill>
             </a:ext>
             <a:ext uri="{91240B29-F687-4f45-9708-019B960494DF}">
-              <a14:hiddenLine xmlns="" xmlns:a14="http://schemas.microsoft.com/office/drawing/2010/main" w="9525">
+              <a14:hiddenLine xmlns:a14="http://schemas.microsoft.com/office/drawing/2010/main" xmlns="" w="9525">
                 <a:solidFill>
                   <a:srgbClr val="000000"/>
                 </a:solidFill>
@@ -14177,7 +14173,7 @@
               </a14:hiddenLine>
             </a:ext>
             <a:ext uri="{AF507438-7753-43e0-B8FC-AC1667EBCBE1}">
-              <a14:hiddenEffects xmlns="" xmlns:a14="http://schemas.microsoft.com/office/drawing/2010/main">
+              <a14:hiddenEffects xmlns:a14="http://schemas.microsoft.com/office/drawing/2010/main" xmlns="">
                 <a:effectLst>
                   <a:outerShdw blurRad="63500" dist="38099" dir="2700000" algn="ctr" rotWithShape="0">
                     <a:srgbClr val="000000">
@@ -14262,7 +14258,7 @@
           <a:effectLst/>
           <a:extLst>
             <a:ext uri="{909E8E84-426E-40dd-AFC4-6F175D3DCCD1}">
-              <a14:hiddenFill xmlns="" xmlns:a14="http://schemas.microsoft.com/office/drawing/2010/main">
+              <a14:hiddenFill xmlns:a14="http://schemas.microsoft.com/office/drawing/2010/main" xmlns="">
                 <a:blipFill dpi="0" rotWithShape="0">
                   <a:blip/>
                   <a:srcRect/>
@@ -14273,7 +14269,7 @@
               </a14:hiddenFill>
             </a:ext>
             <a:ext uri="{91240B29-F687-4f45-9708-019B960494DF}">
-              <a14:hiddenLine xmlns="" xmlns:a14="http://schemas.microsoft.com/office/drawing/2010/main" w="9525">
+              <a14:hiddenLine xmlns:a14="http://schemas.microsoft.com/office/drawing/2010/main" xmlns="" w="9525">
                 <a:solidFill>
                   <a:srgbClr val="000000"/>
                 </a:solidFill>
@@ -14283,7 +14279,7 @@
               </a14:hiddenLine>
             </a:ext>
             <a:ext uri="{AF507438-7753-43e0-B8FC-AC1667EBCBE1}">
-              <a14:hiddenEffects xmlns="" xmlns:a14="http://schemas.microsoft.com/office/drawing/2010/main">
+              <a14:hiddenEffects xmlns:a14="http://schemas.microsoft.com/office/drawing/2010/main" xmlns="">
                 <a:effectLst>
                   <a:outerShdw blurRad="63500" dist="38099" dir="2700000" algn="ctr" rotWithShape="0">
                     <a:srgbClr val="000000">
@@ -14368,7 +14364,7 @@
           <a:effectLst/>
           <a:extLst>
             <a:ext uri="{909E8E84-426E-40dd-AFC4-6F175D3DCCD1}">
-              <a14:hiddenFill xmlns="" xmlns:a14="http://schemas.microsoft.com/office/drawing/2010/main">
+              <a14:hiddenFill xmlns:a14="http://schemas.microsoft.com/office/drawing/2010/main" xmlns="">
                 <a:blipFill dpi="0" rotWithShape="0">
                   <a:blip/>
                   <a:srcRect/>
@@ -14379,7 +14375,7 @@
               </a14:hiddenFill>
             </a:ext>
             <a:ext uri="{91240B29-F687-4f45-9708-019B960494DF}">
-              <a14:hiddenLine xmlns="" xmlns:a14="http://schemas.microsoft.com/office/drawing/2010/main" w="9525">
+              <a14:hiddenLine xmlns:a14="http://schemas.microsoft.com/office/drawing/2010/main" xmlns="" w="9525">
                 <a:solidFill>
                   <a:srgbClr val="000000"/>
                 </a:solidFill>
@@ -14389,7 +14385,7 @@
               </a14:hiddenLine>
             </a:ext>
             <a:ext uri="{AF507438-7753-43e0-B8FC-AC1667EBCBE1}">
-              <a14:hiddenEffects xmlns="" xmlns:a14="http://schemas.microsoft.com/office/drawing/2010/main">
+              <a14:hiddenEffects xmlns:a14="http://schemas.microsoft.com/office/drawing/2010/main" xmlns="">
                 <a:effectLst>
                   <a:outerShdw blurRad="63500" dist="38099" dir="2700000" algn="ctr" rotWithShape="0">
                     <a:srgbClr val="000000">
@@ -14510,13 +14506,12 @@
               </a:rPr>
               <a:t> recs/s</a:t>
             </a:r>
-            <a:endParaRPr lang="en-US" sz="2400" dirty="0"/>
           </a:p>
           <a:p>
             <a:pPr algn="ctr"/>
             <a:r>
               <a:rPr lang="en-US" sz="2400" dirty="0"/>
-              <a:t>COTS: </a:t>
+              <a:t>KV stores can do </a:t>
             </a:r>
             <a:r>
               <a:rPr lang="en-US" sz="2400" dirty="0">
@@ -14524,11 +14519,11 @@
                   <a:srgbClr val="A31E34"/>
                 </a:solidFill>
               </a:rPr>
-              <a:t>100K-1M</a:t>
+              <a:t>100K-1M/</a:t>
             </a:r>
             <a:r>
               <a:rPr lang="en-US" sz="2400" dirty="0"/>
-              <a:t> recs/s/core</a:t>
+              <a:t>core</a:t>
             </a:r>
           </a:p>
         </p:txBody>
@@ -14569,7 +14564,7 @@
           <a:effectLst/>
           <a:extLst>
             <a:ext uri="{909E8E84-426E-40dd-AFC4-6F175D3DCCD1}">
-              <a14:hiddenFill xmlns="" xmlns:a14="http://schemas.microsoft.com/office/drawing/2010/main">
+              <a14:hiddenFill xmlns:a14="http://schemas.microsoft.com/office/drawing/2010/main" xmlns="">
                 <a:blipFill dpi="0" rotWithShape="0">
                   <a:blip/>
                   <a:srcRect/>
@@ -14580,7 +14575,7 @@
               </a14:hiddenFill>
             </a:ext>
             <a:ext uri="{91240B29-F687-4f45-9708-019B960494DF}">
-              <a14:hiddenLine xmlns="" xmlns:a14="http://schemas.microsoft.com/office/drawing/2010/main" w="9525">
+              <a14:hiddenLine xmlns:a14="http://schemas.microsoft.com/office/drawing/2010/main" xmlns="" w="9525">
                 <a:solidFill>
                   <a:srgbClr val="000000"/>
                 </a:solidFill>
@@ -14590,7 +14585,7 @@
               </a14:hiddenLine>
             </a:ext>
             <a:ext uri="{AF507438-7753-43e0-B8FC-AC1667EBCBE1}">
-              <a14:hiddenEffects xmlns="" xmlns:a14="http://schemas.microsoft.com/office/drawing/2010/main">
+              <a14:hiddenEffects xmlns:a14="http://schemas.microsoft.com/office/drawing/2010/main" xmlns="">
                 <a:effectLst>
                   <a:outerShdw blurRad="63500" dist="38099" dir="2700000" algn="ctr" rotWithShape="0">
                     <a:srgbClr val="000000">
@@ -14668,7 +14663,7 @@
           <a:effectLst/>
           <a:extLst>
             <a:ext uri="{909E8E84-426E-40dd-AFC4-6F175D3DCCD1}">
-              <a14:hiddenFill xmlns="" xmlns:a14="http://schemas.microsoft.com/office/drawing/2010/main">
+              <a14:hiddenFill xmlns:a14="http://schemas.microsoft.com/office/drawing/2010/main" xmlns="">
                 <a:blipFill dpi="0" rotWithShape="0">
                   <a:blip/>
                   <a:srcRect/>
@@ -14679,7 +14674,7 @@
               </a14:hiddenFill>
             </a:ext>
             <a:ext uri="{91240B29-F687-4f45-9708-019B960494DF}">
-              <a14:hiddenLine xmlns="" xmlns:a14="http://schemas.microsoft.com/office/drawing/2010/main" w="9525">
+              <a14:hiddenLine xmlns:a14="http://schemas.microsoft.com/office/drawing/2010/main" xmlns="" w="9525">
                 <a:solidFill>
                   <a:srgbClr val="000000"/>
                 </a:solidFill>
@@ -14689,7 +14684,7 @@
               </a14:hiddenLine>
             </a:ext>
             <a:ext uri="{AF507438-7753-43e0-B8FC-AC1667EBCBE1}">
-              <a14:hiddenEffects xmlns="" xmlns:a14="http://schemas.microsoft.com/office/drawing/2010/main">
+              <a14:hiddenEffects xmlns:a14="http://schemas.microsoft.com/office/drawing/2010/main" xmlns="">
                 <a:effectLst>
                   <a:outerShdw blurRad="63500" dist="38099" dir="2700000" algn="ctr" rotWithShape="0">
                     <a:srgbClr val="000000">
@@ -16503,7 +16498,7 @@
           <a:effectLst/>
           <a:extLst>
             <a:ext uri="{909E8E84-426E-40dd-AFC4-6F175D3DCCD1}">
-              <a14:hiddenFill xmlns:a14="http://schemas.microsoft.com/office/drawing/2010/main" xmlns="">
+              <a14:hiddenFill xmlns="" xmlns:a14="http://schemas.microsoft.com/office/drawing/2010/main">
                 <a:blipFill dpi="0" rotWithShape="0">
                   <a:blip/>
                   <a:srcRect/>
@@ -16514,7 +16509,7 @@
               </a14:hiddenFill>
             </a:ext>
             <a:ext uri="{91240B29-F687-4f45-9708-019B960494DF}">
-              <a14:hiddenLine xmlns:a14="http://schemas.microsoft.com/office/drawing/2010/main" xmlns="" w="9525">
+              <a14:hiddenLine xmlns="" xmlns:a14="http://schemas.microsoft.com/office/drawing/2010/main" w="9525">
                 <a:solidFill>
                   <a:srgbClr val="000000"/>
                 </a:solidFill>
@@ -16524,7 +16519,7 @@
               </a14:hiddenLine>
             </a:ext>
             <a:ext uri="{AF507438-7753-43e0-B8FC-AC1667EBCBE1}">
-              <a14:hiddenEffects xmlns:a14="http://schemas.microsoft.com/office/drawing/2010/main" xmlns="">
+              <a14:hiddenEffects xmlns="" xmlns:a14="http://schemas.microsoft.com/office/drawing/2010/main">
                 <a:effectLst>
                   <a:outerShdw blurRad="63500" dist="38099" dir="2700000" algn="ctr" rotWithShape="0">
                     <a:srgbClr val="000000">
@@ -18013,7 +18008,7 @@
           <a:effectLst/>
           <a:extLst>
             <a:ext uri="{909E8E84-426E-40dd-AFC4-6F175D3DCCD1}">
-              <a14:hiddenFill xmlns:a14="http://schemas.microsoft.com/office/drawing/2010/main" xmlns="">
+              <a14:hiddenFill xmlns="" xmlns:a14="http://schemas.microsoft.com/office/drawing/2010/main">
                 <a:blipFill dpi="0" rotWithShape="0">
                   <a:blip/>
                   <a:srcRect/>
@@ -18024,7 +18019,7 @@
               </a14:hiddenFill>
             </a:ext>
             <a:ext uri="{91240B29-F687-4f45-9708-019B960494DF}">
-              <a14:hiddenLine xmlns:a14="http://schemas.microsoft.com/office/drawing/2010/main" xmlns="" w="9525">
+              <a14:hiddenLine xmlns="" xmlns:a14="http://schemas.microsoft.com/office/drawing/2010/main" w="9525">
                 <a:solidFill>
                   <a:srgbClr val="000000"/>
                 </a:solidFill>
@@ -18034,7 +18029,7 @@
               </a14:hiddenLine>
             </a:ext>
             <a:ext uri="{AF507438-7753-43e0-B8FC-AC1667EBCBE1}">
-              <a14:hiddenEffects xmlns:a14="http://schemas.microsoft.com/office/drawing/2010/main" xmlns="">
+              <a14:hiddenEffects xmlns="" xmlns:a14="http://schemas.microsoft.com/office/drawing/2010/main">
                 <a:effectLst>
                   <a:outerShdw blurRad="63500" dist="38099" dir="2700000" algn="ctr" rotWithShape="0">
                     <a:srgbClr val="000000">
@@ -19519,7 +19514,7 @@
           <a:effectLst/>
           <a:extLst>
             <a:ext uri="{909E8E84-426E-40dd-AFC4-6F175D3DCCD1}">
-              <a14:hiddenFill xmlns:a14="http://schemas.microsoft.com/office/drawing/2010/main" xmlns="">
+              <a14:hiddenFill xmlns="" xmlns:a14="http://schemas.microsoft.com/office/drawing/2010/main">
                 <a:blipFill dpi="0" rotWithShape="0">
                   <a:blip/>
                   <a:srcRect/>
@@ -19530,7 +19525,7 @@
               </a14:hiddenFill>
             </a:ext>
             <a:ext uri="{91240B29-F687-4f45-9708-019B960494DF}">
-              <a14:hiddenLine xmlns:a14="http://schemas.microsoft.com/office/drawing/2010/main" xmlns="" w="9525">
+              <a14:hiddenLine xmlns="" xmlns:a14="http://schemas.microsoft.com/office/drawing/2010/main" w="9525">
                 <a:solidFill>
                   <a:srgbClr val="000000"/>
                 </a:solidFill>
@@ -19540,7 +19535,7 @@
               </a14:hiddenLine>
             </a:ext>
             <a:ext uri="{AF507438-7753-43e0-B8FC-AC1667EBCBE1}">
-              <a14:hiddenEffects xmlns:a14="http://schemas.microsoft.com/office/drawing/2010/main" xmlns="">
+              <a14:hiddenEffects xmlns="" xmlns:a14="http://schemas.microsoft.com/office/drawing/2010/main">
                 <a:effectLst>
                   <a:outerShdw blurRad="63500" dist="38099" dir="2700000" algn="ctr" rotWithShape="0">
                     <a:srgbClr val="000000">
@@ -19694,7 +19689,7 @@
           <a:effectLst/>
           <a:extLst>
             <a:ext uri="{909E8E84-426E-40dd-AFC4-6F175D3DCCD1}">
-              <a14:hiddenFill xmlns:a14="http://schemas.microsoft.com/office/drawing/2010/main" xmlns="">
+              <a14:hiddenFill xmlns="" xmlns:a14="http://schemas.microsoft.com/office/drawing/2010/main">
                 <a:blipFill dpi="0" rotWithShape="0">
                   <a:blip/>
                   <a:srcRect/>
@@ -19705,7 +19700,7 @@
               </a14:hiddenFill>
             </a:ext>
             <a:ext uri="{91240B29-F687-4f45-9708-019B960494DF}">
-              <a14:hiddenLine xmlns:a14="http://schemas.microsoft.com/office/drawing/2010/main" xmlns="" w="9525">
+              <a14:hiddenLine xmlns="" xmlns:a14="http://schemas.microsoft.com/office/drawing/2010/main" w="9525">
                 <a:solidFill>
                   <a:srgbClr val="000000"/>
                 </a:solidFill>
@@ -19715,7 +19710,7 @@
               </a14:hiddenLine>
             </a:ext>
             <a:ext uri="{AF507438-7753-43e0-B8FC-AC1667EBCBE1}">
-              <a14:hiddenEffects xmlns:a14="http://schemas.microsoft.com/office/drawing/2010/main" xmlns="">
+              <a14:hiddenEffects xmlns="" xmlns:a14="http://schemas.microsoft.com/office/drawing/2010/main">
                 <a:effectLst>
                   <a:outerShdw blurRad="63500" dist="38099" dir="2700000" algn="ctr" rotWithShape="0">
                     <a:srgbClr val="000000">
@@ -21508,7 +21503,7 @@
           <a:effectLst/>
           <a:extLst>
             <a:ext uri="{909E8E84-426E-40dd-AFC4-6F175D3DCCD1}">
-              <a14:hiddenFill xmlns:a14="http://schemas.microsoft.com/office/drawing/2010/main" xmlns="">
+              <a14:hiddenFill xmlns="" xmlns:a14="http://schemas.microsoft.com/office/drawing/2010/main">
                 <a:blipFill dpi="0" rotWithShape="0">
                   <a:blip/>
                   <a:srcRect/>
@@ -21519,7 +21514,7 @@
               </a14:hiddenFill>
             </a:ext>
             <a:ext uri="{91240B29-F687-4f45-9708-019B960494DF}">
-              <a14:hiddenLine xmlns:a14="http://schemas.microsoft.com/office/drawing/2010/main" xmlns="" w="9525">
+              <a14:hiddenLine xmlns="" xmlns:a14="http://schemas.microsoft.com/office/drawing/2010/main" w="9525">
                 <a:solidFill>
                   <a:srgbClr val="000000"/>
                 </a:solidFill>
@@ -21529,7 +21524,7 @@
               </a14:hiddenLine>
             </a:ext>
             <a:ext uri="{AF507438-7753-43e0-B8FC-AC1667EBCBE1}">
-              <a14:hiddenEffects xmlns:a14="http://schemas.microsoft.com/office/drawing/2010/main" xmlns="">
+              <a14:hiddenEffects xmlns="" xmlns:a14="http://schemas.microsoft.com/office/drawing/2010/main">
                 <a:effectLst>
                   <a:outerShdw blurRad="63500" dist="38099" dir="2700000" algn="ctr" rotWithShape="0">
                     <a:srgbClr val="000000">
@@ -24484,7 +24479,7 @@
           <a:effectLst/>
           <a:extLst>
             <a:ext uri="{909E8E84-426E-40dd-AFC4-6F175D3DCCD1}">
-              <a14:hiddenFill xmlns:a14="http://schemas.microsoft.com/office/drawing/2010/main" xmlns="">
+              <a14:hiddenFill xmlns="" xmlns:a14="http://schemas.microsoft.com/office/drawing/2010/main">
                 <a:blipFill dpi="0" rotWithShape="0">
                   <a:blip/>
                   <a:srcRect/>
@@ -24495,7 +24490,7 @@
               </a14:hiddenFill>
             </a:ext>
             <a:ext uri="{91240B29-F687-4f45-9708-019B960494DF}">
-              <a14:hiddenLine xmlns:a14="http://schemas.microsoft.com/office/drawing/2010/main" xmlns="" w="9525">
+              <a14:hiddenLine xmlns="" xmlns:a14="http://schemas.microsoft.com/office/drawing/2010/main" w="9525">
                 <a:solidFill>
                   <a:srgbClr val="000000"/>
                 </a:solidFill>
@@ -24505,7 +24500,7 @@
               </a14:hiddenLine>
             </a:ext>
             <a:ext uri="{AF507438-7753-43e0-B8FC-AC1667EBCBE1}">
-              <a14:hiddenEffects xmlns:a14="http://schemas.microsoft.com/office/drawing/2010/main" xmlns="">
+              <a14:hiddenEffects xmlns="" xmlns:a14="http://schemas.microsoft.com/office/drawing/2010/main">
                 <a:effectLst>
                   <a:outerShdw blurRad="63500" dist="38099" dir="2700000" algn="ctr" rotWithShape="0">
                     <a:srgbClr val="000000">
@@ -24584,7 +24579,7 @@
           <a:effectLst/>
           <a:extLst>
             <a:ext uri="{909E8E84-426E-40dd-AFC4-6F175D3DCCD1}">
-              <a14:hiddenFill xmlns:a14="http://schemas.microsoft.com/office/drawing/2010/main" xmlns="">
+              <a14:hiddenFill xmlns="" xmlns:a14="http://schemas.microsoft.com/office/drawing/2010/main">
                 <a:blipFill dpi="0" rotWithShape="0">
                   <a:blip/>
                   <a:srcRect/>
@@ -24595,7 +24590,7 @@
               </a14:hiddenFill>
             </a:ext>
             <a:ext uri="{91240B29-F687-4f45-9708-019B960494DF}">
-              <a14:hiddenLine xmlns:a14="http://schemas.microsoft.com/office/drawing/2010/main" xmlns="" w="9525">
+              <a14:hiddenLine xmlns="" xmlns:a14="http://schemas.microsoft.com/office/drawing/2010/main" w="9525">
                 <a:solidFill>
                   <a:srgbClr val="000000"/>
                 </a:solidFill>
@@ -24605,7 +24600,7 @@
               </a14:hiddenLine>
             </a:ext>
             <a:ext uri="{AF507438-7753-43e0-B8FC-AC1667EBCBE1}">
-              <a14:hiddenEffects xmlns:a14="http://schemas.microsoft.com/office/drawing/2010/main" xmlns="">
+              <a14:hiddenEffects xmlns="" xmlns:a14="http://schemas.microsoft.com/office/drawing/2010/main">
                 <a:effectLst>
                   <a:outerShdw blurRad="63500" dist="38099" dir="2700000" algn="ctr" rotWithShape="0">
                     <a:srgbClr val="000000">
@@ -26200,7 +26195,7 @@
           <a:effectLst/>
           <a:extLst>
             <a:ext uri="{909E8E84-426E-40dd-AFC4-6F175D3DCCD1}">
-              <a14:hiddenFill xmlns:a14="http://schemas.microsoft.com/office/drawing/2010/main" xmlns="">
+              <a14:hiddenFill xmlns="" xmlns:a14="http://schemas.microsoft.com/office/drawing/2010/main">
                 <a:blipFill dpi="0" rotWithShape="0">
                   <a:blip/>
                   <a:srcRect/>
@@ -26211,7 +26206,7 @@
               </a14:hiddenFill>
             </a:ext>
             <a:ext uri="{91240B29-F687-4f45-9708-019B960494DF}">
-              <a14:hiddenLine xmlns:a14="http://schemas.microsoft.com/office/drawing/2010/main" xmlns="" w="9525">
+              <a14:hiddenLine xmlns="" xmlns:a14="http://schemas.microsoft.com/office/drawing/2010/main" w="9525">
                 <a:solidFill>
                   <a:srgbClr val="000000"/>
                 </a:solidFill>
@@ -26221,7 +26216,7 @@
               </a14:hiddenLine>
             </a:ext>
             <a:ext uri="{AF507438-7753-43e0-B8FC-AC1667EBCBE1}">
-              <a14:hiddenEffects xmlns:a14="http://schemas.microsoft.com/office/drawing/2010/main" xmlns="">
+              <a14:hiddenEffects xmlns="" xmlns:a14="http://schemas.microsoft.com/office/drawing/2010/main">
                 <a:effectLst>
                   <a:outerShdw blurRad="63500" dist="38099" dir="2700000" algn="ctr" rotWithShape="0">
                     <a:srgbClr val="000000">
@@ -27869,7 +27864,7 @@
           <a:effectLst/>
           <a:extLst>
             <a:ext uri="{909E8E84-426E-40dd-AFC4-6F175D3DCCD1}">
-              <a14:hiddenFill xmlns:a14="http://schemas.microsoft.com/office/drawing/2010/main" xmlns="">
+              <a14:hiddenFill xmlns="" xmlns:a14="http://schemas.microsoft.com/office/drawing/2010/main">
                 <a:blipFill dpi="0" rotWithShape="0">
                   <a:blip/>
                   <a:srcRect/>
@@ -27880,7 +27875,7 @@
               </a14:hiddenFill>
             </a:ext>
             <a:ext uri="{91240B29-F687-4f45-9708-019B960494DF}">
-              <a14:hiddenLine xmlns:a14="http://schemas.microsoft.com/office/drawing/2010/main" xmlns="" w="9525">
+              <a14:hiddenLine xmlns="" xmlns:a14="http://schemas.microsoft.com/office/drawing/2010/main" w="9525">
                 <a:solidFill>
                   <a:srgbClr val="000000"/>
                 </a:solidFill>
@@ -27890,7 +27885,7 @@
               </a14:hiddenLine>
             </a:ext>
             <a:ext uri="{AF507438-7753-43e0-B8FC-AC1667EBCBE1}">
-              <a14:hiddenEffects xmlns:a14="http://schemas.microsoft.com/office/drawing/2010/main" xmlns="">
+              <a14:hiddenEffects xmlns="" xmlns:a14="http://schemas.microsoft.com/office/drawing/2010/main">
                 <a:effectLst>
                   <a:outerShdw blurRad="63500" dist="38099" dir="2700000" algn="ctr" rotWithShape="0">
                     <a:srgbClr val="000000">
@@ -29170,77 +29165,6 @@
       </p:sp>
       <p:sp>
         <p:nvSpPr>
-          <p:cNvPr id="42" name="TextBox 41"/>
-          <p:cNvSpPr txBox="1"/>
-          <p:nvPr/>
-        </p:nvSpPr>
-        <p:spPr>
-          <a:xfrm>
-            <a:off x="3794525" y="3646847"/>
-            <a:ext cx="444352" cy="523220"/>
-          </a:xfrm>
-          <a:prstGeom prst="rect">
-            <a:avLst/>
-          </a:prstGeom>
-          <a:noFill/>
-        </p:spPr>
-        <p:txBody>
-          <a:bodyPr wrap="none" rtlCol="0">
-            <a:spAutoFit/>
-          </a:bodyPr>
-          <a:lstStyle/>
-          <a:p>
-            <a:r>
-              <a:rPr lang="en-US" sz="2800" dirty="0">
-                <a:ea typeface="Gadugi" charset="0"/>
-                <a:cs typeface="Gadugi" charset="0"/>
-              </a:rPr>
-              <a:t>K</a:t>
-            </a:r>
-          </a:p>
-        </p:txBody>
-      </p:sp>
-      <p:sp>
-        <p:nvSpPr>
-          <p:cNvPr id="45" name="TextBox 44"/>
-          <p:cNvSpPr txBox="1"/>
-          <p:nvPr/>
-        </p:nvSpPr>
-        <p:spPr>
-          <a:xfrm>
-            <a:off x="4883233" y="3653942"/>
-            <a:ext cx="556563" cy="523220"/>
-          </a:xfrm>
-          <a:prstGeom prst="rect">
-            <a:avLst/>
-          </a:prstGeom>
-          <a:noFill/>
-        </p:spPr>
-        <p:txBody>
-          <a:bodyPr wrap="none" rtlCol="0">
-            <a:spAutoFit/>
-          </a:bodyPr>
-          <a:lstStyle/>
-          <a:p>
-            <a:r>
-              <a:rPr lang="en-US" sz="2800" dirty="0">
-                <a:ea typeface="Gadugi" charset="0"/>
-                <a:cs typeface="Gadugi" charset="0"/>
-              </a:rPr>
-              <a:t>V</a:t>
-            </a:r>
-            <a:r>
-              <a:rPr lang="en-US" sz="2800" baseline="-25000" dirty="0">
-                <a:ea typeface="Gadugi" charset="0"/>
-                <a:cs typeface="Gadugi" charset="0"/>
-              </a:rPr>
-              <a:t>0</a:t>
-            </a:r>
-          </a:p>
-        </p:txBody>
-      </p:sp>
-      <p:sp>
-        <p:nvSpPr>
           <p:cNvPr id="43" name="TextBox 42"/>
           <p:cNvSpPr txBox="1"/>
           <p:nvPr/>
@@ -29406,7 +29330,7 @@
           <a:effectLst/>
           <a:extLst>
             <a:ext uri="{909E8E84-426E-40dd-AFC4-6F175D3DCCD1}">
-              <a14:hiddenFill xmlns:a14="http://schemas.microsoft.com/office/drawing/2010/main" xmlns="">
+              <a14:hiddenFill xmlns="" xmlns:a14="http://schemas.microsoft.com/office/drawing/2010/main">
                 <a:blipFill dpi="0" rotWithShape="0">
                   <a:blip/>
                   <a:srcRect/>
@@ -29417,7 +29341,7 @@
               </a14:hiddenFill>
             </a:ext>
             <a:ext uri="{91240B29-F687-4f45-9708-019B960494DF}">
-              <a14:hiddenLine xmlns:a14="http://schemas.microsoft.com/office/drawing/2010/main" xmlns="" w="9525">
+              <a14:hiddenLine xmlns="" xmlns:a14="http://schemas.microsoft.com/office/drawing/2010/main" w="9525">
                 <a:solidFill>
                   <a:srgbClr val="000000"/>
                 </a:solidFill>
@@ -29427,7 +29351,7 @@
               </a14:hiddenLine>
             </a:ext>
             <a:ext uri="{AF507438-7753-43e0-B8FC-AC1667EBCBE1}">
-              <a14:hiddenEffects xmlns:a14="http://schemas.microsoft.com/office/drawing/2010/main" xmlns="">
+              <a14:hiddenEffects xmlns="" xmlns:a14="http://schemas.microsoft.com/office/drawing/2010/main">
                 <a:effectLst>
                   <a:outerShdw blurRad="63500" dist="38099" dir="2700000" algn="ctr" rotWithShape="0">
                     <a:srgbClr val="000000">
@@ -29558,7 +29482,7 @@
           <a:effectLst/>
           <a:extLst>
             <a:ext uri="{909E8E84-426E-40dd-AFC4-6F175D3DCCD1}">
-              <a14:hiddenFill xmlns:a14="http://schemas.microsoft.com/office/drawing/2010/main" xmlns="">
+              <a14:hiddenFill xmlns="" xmlns:a14="http://schemas.microsoft.com/office/drawing/2010/main">
                 <a:blipFill dpi="0" rotWithShape="0">
                   <a:blip/>
                   <a:srcRect/>
@@ -29569,7 +29493,7 @@
               </a14:hiddenFill>
             </a:ext>
             <a:ext uri="{91240B29-F687-4f45-9708-019B960494DF}">
-              <a14:hiddenLine xmlns:a14="http://schemas.microsoft.com/office/drawing/2010/main" xmlns="" w="9525">
+              <a14:hiddenLine xmlns="" xmlns:a14="http://schemas.microsoft.com/office/drawing/2010/main" w="9525">
                 <a:solidFill>
                   <a:srgbClr val="000000"/>
                 </a:solidFill>
@@ -29579,7 +29503,7 @@
               </a14:hiddenLine>
             </a:ext>
             <a:ext uri="{AF507438-7753-43e0-B8FC-AC1667EBCBE1}">
-              <a14:hiddenEffects xmlns:a14="http://schemas.microsoft.com/office/drawing/2010/main" xmlns="">
+              <a14:hiddenEffects xmlns="" xmlns:a14="http://schemas.microsoft.com/office/drawing/2010/main">
                 <a:effectLst>
                   <a:outerShdw blurRad="63500" dist="38099" dir="2700000" algn="ctr" rotWithShape="0">
                     <a:srgbClr val="000000">
@@ -29592,6 +29516,89 @@
           </a:extLst>
         </p:spPr>
       </p:pic>
+      <p:sp>
+        <p:nvSpPr>
+          <p:cNvPr id="52" name="TextBox 51">
+            <a:extLst>
+              <a:ext uri="{FF2B5EF4-FFF2-40B4-BE49-F238E27FC236}">
+                <a16:creationId xmlns:a16="http://schemas.microsoft.com/office/drawing/2014/main" id="{4A1FBAB1-3397-FB4C-BE02-A07D2D9E700C}"/>
+              </a:ext>
+            </a:extLst>
+          </p:cNvPr>
+          <p:cNvSpPr txBox="1"/>
+          <p:nvPr/>
+        </p:nvSpPr>
+        <p:spPr>
+          <a:xfrm>
+            <a:off x="3794525" y="3713753"/>
+            <a:ext cx="444352" cy="523220"/>
+          </a:xfrm>
+          <a:prstGeom prst="rect">
+            <a:avLst/>
+          </a:prstGeom>
+          <a:noFill/>
+        </p:spPr>
+        <p:txBody>
+          <a:bodyPr wrap="none" rtlCol="0">
+            <a:spAutoFit/>
+          </a:bodyPr>
+          <a:lstStyle/>
+          <a:p>
+            <a:r>
+              <a:rPr lang="en-US" sz="2800" dirty="0">
+                <a:ea typeface="Gadugi" charset="0"/>
+                <a:cs typeface="Gadugi" charset="0"/>
+              </a:rPr>
+              <a:t>K</a:t>
+            </a:r>
+          </a:p>
+        </p:txBody>
+      </p:sp>
+      <p:sp>
+        <p:nvSpPr>
+          <p:cNvPr id="53" name="TextBox 52">
+            <a:extLst>
+              <a:ext uri="{FF2B5EF4-FFF2-40B4-BE49-F238E27FC236}">
+                <a16:creationId xmlns:a16="http://schemas.microsoft.com/office/drawing/2014/main" id="{58711FC1-0E98-EB4B-8D47-5F7D1F1927BA}"/>
+              </a:ext>
+            </a:extLst>
+          </p:cNvPr>
+          <p:cNvSpPr txBox="1"/>
+          <p:nvPr/>
+        </p:nvSpPr>
+        <p:spPr>
+          <a:xfrm>
+            <a:off x="4883233" y="3720848"/>
+            <a:ext cx="556563" cy="523220"/>
+          </a:xfrm>
+          <a:prstGeom prst="rect">
+            <a:avLst/>
+          </a:prstGeom>
+          <a:noFill/>
+        </p:spPr>
+        <p:txBody>
+          <a:bodyPr wrap="none" rtlCol="0">
+            <a:spAutoFit/>
+          </a:bodyPr>
+          <a:lstStyle/>
+          <a:p>
+            <a:r>
+              <a:rPr lang="en-US" sz="2800" dirty="0">
+                <a:ea typeface="Gadugi" charset="0"/>
+                <a:cs typeface="Gadugi" charset="0"/>
+              </a:rPr>
+              <a:t>V</a:t>
+            </a:r>
+            <a:r>
+              <a:rPr lang="en-US" sz="2800" baseline="-25000" dirty="0">
+                <a:ea typeface="Gadugi" charset="0"/>
+                <a:cs typeface="Gadugi" charset="0"/>
+              </a:rPr>
+              <a:t>0</a:t>
+            </a:r>
+          </a:p>
+        </p:txBody>
+      </p:sp>
     </p:spTree>
     <p:extLst>
       <p:ext uri="{BB962C8B-B14F-4D97-AF65-F5344CB8AC3E}">
@@ -37364,7 +37371,7 @@
         </p:nvSpPr>
         <p:spPr>
           <a:xfrm>
-            <a:off x="3794525" y="3713753"/>
+            <a:off x="3794525" y="3646847"/>
             <a:ext cx="444352" cy="523220"/>
           </a:xfrm>
           <a:prstGeom prst="rect">
@@ -37396,7 +37403,7 @@
         </p:nvSpPr>
         <p:spPr>
           <a:xfrm>
-            <a:off x="4883233" y="3720848"/>
+            <a:off x="4883233" y="3653942"/>
             <a:ext cx="556563" cy="523220"/>
           </a:xfrm>
           <a:prstGeom prst="rect">
@@ -37546,7 +37553,7 @@
           <a:effectLst/>
           <a:extLst>
             <a:ext uri="{909E8E84-426E-40dd-AFC4-6F175D3DCCD1}">
-              <a14:hiddenFill xmlns="" xmlns:a14="http://schemas.microsoft.com/office/drawing/2010/main">
+              <a14:hiddenFill xmlns:a14="http://schemas.microsoft.com/office/drawing/2010/main" xmlns="">
                 <a:blipFill dpi="0" rotWithShape="0">
                   <a:blip/>
                   <a:srcRect/>
@@ -37557,7 +37564,7 @@
               </a14:hiddenFill>
             </a:ext>
             <a:ext uri="{91240B29-F687-4f45-9708-019B960494DF}">
-              <a14:hiddenLine xmlns="" xmlns:a14="http://schemas.microsoft.com/office/drawing/2010/main" w="9525">
+              <a14:hiddenLine xmlns:a14="http://schemas.microsoft.com/office/drawing/2010/main" xmlns="" w="9525">
                 <a:solidFill>
                   <a:srgbClr val="000000"/>
                 </a:solidFill>
@@ -37567,7 +37574,7 @@
               </a14:hiddenLine>
             </a:ext>
             <a:ext uri="{AF507438-7753-43e0-B8FC-AC1667EBCBE1}">
-              <a14:hiddenEffects xmlns="" xmlns:a14="http://schemas.microsoft.com/office/drawing/2010/main">
+              <a14:hiddenEffects xmlns:a14="http://schemas.microsoft.com/office/drawing/2010/main" xmlns="">
                 <a:effectLst>
                   <a:outerShdw blurRad="63500" dist="38099" dir="2700000" algn="ctr" rotWithShape="0">
                     <a:srgbClr val="000000">
@@ -37754,7 +37761,7 @@
             <a:pPr algn="ctr"/>
             <a:r>
               <a:rPr lang="en-US" sz="4000" dirty="0"/>
-              <a:t>We want to build future-proof hardware:</a:t>
+              <a:t>We want to build future-proof switch hardware:</a:t>
             </a:r>
           </a:p>
           <a:p>

</xml_diff>

<commit_message>
Change order of microburst animation.
</commit_message>
<xml_diff>
--- a/marple_itx18.pptx
+++ b/marple_itx18.pptx
@@ -12516,7 +12516,7 @@
           <a:effectLst/>
           <a:extLst>
             <a:ext uri="{909E8E84-426E-40dd-AFC4-6F175D3DCCD1}">
-              <a14:hiddenFill xmlns:a14="http://schemas.microsoft.com/office/drawing/2010/main" xmlns="">
+              <a14:hiddenFill xmlns="" xmlns:a14="http://schemas.microsoft.com/office/drawing/2010/main">
                 <a:blipFill dpi="0" rotWithShape="0">
                   <a:blip/>
                   <a:srcRect/>
@@ -12527,7 +12527,7 @@
               </a14:hiddenFill>
             </a:ext>
             <a:ext uri="{91240B29-F687-4f45-9708-019B960494DF}">
-              <a14:hiddenLine xmlns:a14="http://schemas.microsoft.com/office/drawing/2010/main" xmlns="" w="9525">
+              <a14:hiddenLine xmlns="" xmlns:a14="http://schemas.microsoft.com/office/drawing/2010/main" w="9525">
                 <a:solidFill>
                   <a:srgbClr val="000000"/>
                 </a:solidFill>
@@ -12537,7 +12537,7 @@
               </a14:hiddenLine>
             </a:ext>
             <a:ext uri="{AF507438-7753-43e0-B8FC-AC1667EBCBE1}">
-              <a14:hiddenEffects xmlns:a14="http://schemas.microsoft.com/office/drawing/2010/main" xmlns="">
+              <a14:hiddenEffects xmlns="" xmlns:a14="http://schemas.microsoft.com/office/drawing/2010/main">
                 <a:effectLst>
                   <a:outerShdw blurRad="63500" dist="38099" dir="2700000" algn="ctr" rotWithShape="0">
                     <a:srgbClr val="000000">
@@ -12586,7 +12586,7 @@
           <a:effectLst/>
           <a:extLst>
             <a:ext uri="{909E8E84-426E-40dd-AFC4-6F175D3DCCD1}">
-              <a14:hiddenFill xmlns:a14="http://schemas.microsoft.com/office/drawing/2010/main" xmlns="">
+              <a14:hiddenFill xmlns="" xmlns:a14="http://schemas.microsoft.com/office/drawing/2010/main">
                 <a:blipFill dpi="0" rotWithShape="0">
                   <a:blip/>
                   <a:srcRect/>
@@ -12597,7 +12597,7 @@
               </a14:hiddenFill>
             </a:ext>
             <a:ext uri="{91240B29-F687-4f45-9708-019B960494DF}">
-              <a14:hiddenLine xmlns:a14="http://schemas.microsoft.com/office/drawing/2010/main" xmlns="" w="9525">
+              <a14:hiddenLine xmlns="" xmlns:a14="http://schemas.microsoft.com/office/drawing/2010/main" w="9525">
                 <a:solidFill>
                   <a:srgbClr val="000000"/>
                 </a:solidFill>
@@ -12607,7 +12607,7 @@
               </a14:hiddenLine>
             </a:ext>
             <a:ext uri="{AF507438-7753-43e0-B8FC-AC1667EBCBE1}">
-              <a14:hiddenEffects xmlns:a14="http://schemas.microsoft.com/office/drawing/2010/main" xmlns="">
+              <a14:hiddenEffects xmlns="" xmlns:a14="http://schemas.microsoft.com/office/drawing/2010/main">
                 <a:effectLst>
                   <a:outerShdw blurRad="63500" dist="38099" dir="2700000" algn="ctr" rotWithShape="0">
                     <a:srgbClr val="000000">
@@ -12742,7 +12742,7 @@
             <a:effectLst/>
             <a:extLst>
               <a:ext uri="{909E8E84-426E-40dd-AFC4-6F175D3DCCD1}">
-                <a14:hiddenFill xmlns="" xmlns:a14="http://schemas.microsoft.com/office/drawing/2010/main">
+                <a14:hiddenFill xmlns:a14="http://schemas.microsoft.com/office/drawing/2010/main" xmlns="">
                   <a:blipFill dpi="0" rotWithShape="0">
                     <a:blip/>
                     <a:srcRect/>
@@ -12753,7 +12753,7 @@
                 </a14:hiddenFill>
               </a:ext>
               <a:ext uri="{91240B29-F687-4f45-9708-019B960494DF}">
-                <a14:hiddenLine xmlns="" xmlns:a14="http://schemas.microsoft.com/office/drawing/2010/main" w="9525">
+                <a14:hiddenLine xmlns:a14="http://schemas.microsoft.com/office/drawing/2010/main" xmlns="" w="9525">
                   <a:solidFill>
                     <a:srgbClr val="000000"/>
                   </a:solidFill>
@@ -12763,7 +12763,7 @@
                 </a14:hiddenLine>
               </a:ext>
               <a:ext uri="{AF507438-7753-43e0-B8FC-AC1667EBCBE1}">
-                <a14:hiddenEffects xmlns="" xmlns:a14="http://schemas.microsoft.com/office/drawing/2010/main">
+                <a14:hiddenEffects xmlns:a14="http://schemas.microsoft.com/office/drawing/2010/main" xmlns="">
                   <a:effectLst>
                     <a:outerShdw blurRad="63500" dist="38099" dir="2700000" algn="ctr" rotWithShape="0">
                       <a:srgbClr val="000000">
@@ -12812,7 +12812,7 @@
             <a:effectLst/>
             <a:extLst>
               <a:ext uri="{909E8E84-426E-40dd-AFC4-6F175D3DCCD1}">
-                <a14:hiddenFill xmlns="" xmlns:a14="http://schemas.microsoft.com/office/drawing/2010/main">
+                <a14:hiddenFill xmlns:a14="http://schemas.microsoft.com/office/drawing/2010/main" xmlns="">
                   <a:blipFill dpi="0" rotWithShape="0">
                     <a:blip/>
                     <a:srcRect/>
@@ -12823,7 +12823,7 @@
                 </a14:hiddenFill>
               </a:ext>
               <a:ext uri="{91240B29-F687-4f45-9708-019B960494DF}">
-                <a14:hiddenLine xmlns="" xmlns:a14="http://schemas.microsoft.com/office/drawing/2010/main" w="9525">
+                <a14:hiddenLine xmlns:a14="http://schemas.microsoft.com/office/drawing/2010/main" xmlns="" w="9525">
                   <a:solidFill>
                     <a:srgbClr val="000000"/>
                   </a:solidFill>
@@ -12833,7 +12833,7 @@
                 </a14:hiddenLine>
               </a:ext>
               <a:ext uri="{AF507438-7753-43e0-B8FC-AC1667EBCBE1}">
-                <a14:hiddenEffects xmlns="" xmlns:a14="http://schemas.microsoft.com/office/drawing/2010/main">
+                <a14:hiddenEffects xmlns:a14="http://schemas.microsoft.com/office/drawing/2010/main" xmlns="">
                   <a:effectLst>
                     <a:outerShdw blurRad="63500" dist="38099" dir="2700000" algn="ctr" rotWithShape="0">
                       <a:srgbClr val="000000">
@@ -12882,7 +12882,7 @@
             <a:effectLst/>
             <a:extLst>
               <a:ext uri="{909E8E84-426E-40dd-AFC4-6F175D3DCCD1}">
-                <a14:hiddenFill xmlns="" xmlns:a14="http://schemas.microsoft.com/office/drawing/2010/main">
+                <a14:hiddenFill xmlns:a14="http://schemas.microsoft.com/office/drawing/2010/main" xmlns="">
                   <a:blipFill dpi="0" rotWithShape="0">
                     <a:blip/>
                     <a:srcRect/>
@@ -12893,7 +12893,7 @@
                 </a14:hiddenFill>
               </a:ext>
               <a:ext uri="{91240B29-F687-4f45-9708-019B960494DF}">
-                <a14:hiddenLine xmlns="" xmlns:a14="http://schemas.microsoft.com/office/drawing/2010/main" w="9525">
+                <a14:hiddenLine xmlns:a14="http://schemas.microsoft.com/office/drawing/2010/main" xmlns="" w="9525">
                   <a:solidFill>
                     <a:srgbClr val="000000"/>
                   </a:solidFill>
@@ -12903,7 +12903,7 @@
                 </a14:hiddenLine>
               </a:ext>
               <a:ext uri="{AF507438-7753-43e0-B8FC-AC1667EBCBE1}">
-                <a14:hiddenEffects xmlns="" xmlns:a14="http://schemas.microsoft.com/office/drawing/2010/main">
+                <a14:hiddenEffects xmlns:a14="http://schemas.microsoft.com/office/drawing/2010/main" xmlns="">
                   <a:effectLst>
                     <a:outerShdw blurRad="63500" dist="38099" dir="2700000" algn="ctr" rotWithShape="0">
                       <a:srgbClr val="000000">
@@ -12944,12 +12944,12 @@
             <a:effectLst/>
             <a:extLst>
               <a:ext uri="{909E8E84-426E-40dd-AFC4-6F175D3DCCD1}">
-                <a14:hiddenFill xmlns="" xmlns:a14="http://schemas.microsoft.com/office/drawing/2010/main">
+                <a14:hiddenFill xmlns:a14="http://schemas.microsoft.com/office/drawing/2010/main" xmlns="">
                   <a:noFill/>
                 </a14:hiddenFill>
               </a:ext>
               <a:ext uri="{AF507438-7753-43e0-B8FC-AC1667EBCBE1}">
-                <a14:hiddenEffects xmlns="" xmlns:a14="http://schemas.microsoft.com/office/drawing/2010/main">
+                <a14:hiddenEffects xmlns:a14="http://schemas.microsoft.com/office/drawing/2010/main" xmlns="">
                   <a:effectLst>
                     <a:outerShdw blurRad="63500" dist="38099" dir="2700000" algn="ctr" rotWithShape="0">
                       <a:srgbClr val="000000">
@@ -13002,12 +13002,12 @@
             <a:effectLst/>
             <a:extLst>
               <a:ext uri="{909E8E84-426E-40dd-AFC4-6F175D3DCCD1}">
-                <a14:hiddenFill xmlns="" xmlns:a14="http://schemas.microsoft.com/office/drawing/2010/main">
+                <a14:hiddenFill xmlns:a14="http://schemas.microsoft.com/office/drawing/2010/main" xmlns="">
                   <a:noFill/>
                 </a14:hiddenFill>
               </a:ext>
               <a:ext uri="{AF507438-7753-43e0-B8FC-AC1667EBCBE1}">
-                <a14:hiddenEffects xmlns="" xmlns:a14="http://schemas.microsoft.com/office/drawing/2010/main">
+                <a14:hiddenEffects xmlns:a14="http://schemas.microsoft.com/office/drawing/2010/main" xmlns="">
                   <a:effectLst>
                     <a:outerShdw blurRad="63500" dist="38099" dir="2700000" algn="ctr" rotWithShape="0">
                       <a:srgbClr val="000000">
@@ -13060,12 +13060,12 @@
             <a:effectLst/>
             <a:extLst>
               <a:ext uri="{909E8E84-426E-40dd-AFC4-6F175D3DCCD1}">
-                <a14:hiddenFill xmlns="" xmlns:a14="http://schemas.microsoft.com/office/drawing/2010/main">
+                <a14:hiddenFill xmlns:a14="http://schemas.microsoft.com/office/drawing/2010/main" xmlns="">
                   <a:noFill/>
                 </a14:hiddenFill>
               </a:ext>
               <a:ext uri="{AF507438-7753-43e0-B8FC-AC1667EBCBE1}">
-                <a14:hiddenEffects xmlns="" xmlns:a14="http://schemas.microsoft.com/office/drawing/2010/main">
+                <a14:hiddenEffects xmlns:a14="http://schemas.microsoft.com/office/drawing/2010/main" xmlns="">
                   <a:effectLst>
                     <a:outerShdw blurRad="63500" dist="38099" dir="2700000" algn="ctr" rotWithShape="0">
                       <a:srgbClr val="000000">
@@ -13118,12 +13118,12 @@
             <a:effectLst/>
             <a:extLst>
               <a:ext uri="{909E8E84-426E-40dd-AFC4-6F175D3DCCD1}">
-                <a14:hiddenFill xmlns="" xmlns:a14="http://schemas.microsoft.com/office/drawing/2010/main">
+                <a14:hiddenFill xmlns:a14="http://schemas.microsoft.com/office/drawing/2010/main" xmlns="">
                   <a:noFill/>
                 </a14:hiddenFill>
               </a:ext>
               <a:ext uri="{AF507438-7753-43e0-B8FC-AC1667EBCBE1}">
-                <a14:hiddenEffects xmlns="" xmlns:a14="http://schemas.microsoft.com/office/drawing/2010/main">
+                <a14:hiddenEffects xmlns:a14="http://schemas.microsoft.com/office/drawing/2010/main" xmlns="">
                   <a:effectLst>
                     <a:outerShdw blurRad="63500" dist="38099" dir="2700000" algn="ctr" rotWithShape="0">
                       <a:srgbClr val="000000">
@@ -13176,12 +13176,12 @@
             <a:effectLst/>
             <a:extLst>
               <a:ext uri="{909E8E84-426E-40dd-AFC4-6F175D3DCCD1}">
-                <a14:hiddenFill xmlns="" xmlns:a14="http://schemas.microsoft.com/office/drawing/2010/main">
+                <a14:hiddenFill xmlns:a14="http://schemas.microsoft.com/office/drawing/2010/main" xmlns="">
                   <a:noFill/>
                 </a14:hiddenFill>
               </a:ext>
               <a:ext uri="{AF507438-7753-43e0-B8FC-AC1667EBCBE1}">
-                <a14:hiddenEffects xmlns="" xmlns:a14="http://schemas.microsoft.com/office/drawing/2010/main">
+                <a14:hiddenEffects xmlns:a14="http://schemas.microsoft.com/office/drawing/2010/main" xmlns="">
                   <a:effectLst>
                     <a:outerShdw blurRad="63500" dist="38099" dir="2700000" algn="ctr" rotWithShape="0">
                       <a:srgbClr val="000000">
@@ -13234,12 +13234,12 @@
             <a:effectLst/>
             <a:extLst>
               <a:ext uri="{909E8E84-426E-40dd-AFC4-6F175D3DCCD1}">
-                <a14:hiddenFill xmlns="" xmlns:a14="http://schemas.microsoft.com/office/drawing/2010/main">
+                <a14:hiddenFill xmlns:a14="http://schemas.microsoft.com/office/drawing/2010/main" xmlns="">
                   <a:noFill/>
                 </a14:hiddenFill>
               </a:ext>
               <a:ext uri="{AF507438-7753-43e0-B8FC-AC1667EBCBE1}">
-                <a14:hiddenEffects xmlns="" xmlns:a14="http://schemas.microsoft.com/office/drawing/2010/main">
+                <a14:hiddenEffects xmlns:a14="http://schemas.microsoft.com/office/drawing/2010/main" xmlns="">
                   <a:effectLst>
                     <a:outerShdw blurRad="63500" dist="38099" dir="2700000" algn="ctr" rotWithShape="0">
                       <a:srgbClr val="000000">
@@ -13292,12 +13292,12 @@
             <a:effectLst/>
             <a:extLst>
               <a:ext uri="{909E8E84-426E-40dd-AFC4-6F175D3DCCD1}">
-                <a14:hiddenFill xmlns="" xmlns:a14="http://schemas.microsoft.com/office/drawing/2010/main">
+                <a14:hiddenFill xmlns:a14="http://schemas.microsoft.com/office/drawing/2010/main" xmlns="">
                   <a:noFill/>
                 </a14:hiddenFill>
               </a:ext>
               <a:ext uri="{AF507438-7753-43e0-B8FC-AC1667EBCBE1}">
-                <a14:hiddenEffects xmlns="" xmlns:a14="http://schemas.microsoft.com/office/drawing/2010/main">
+                <a14:hiddenEffects xmlns:a14="http://schemas.microsoft.com/office/drawing/2010/main" xmlns="">
                   <a:effectLst>
                     <a:outerShdw blurRad="63500" dist="38099" dir="2700000" algn="ctr" rotWithShape="0">
                       <a:srgbClr val="000000">
@@ -13350,12 +13350,12 @@
             <a:effectLst/>
             <a:extLst>
               <a:ext uri="{909E8E84-426E-40dd-AFC4-6F175D3DCCD1}">
-                <a14:hiddenFill xmlns="" xmlns:a14="http://schemas.microsoft.com/office/drawing/2010/main">
+                <a14:hiddenFill xmlns:a14="http://schemas.microsoft.com/office/drawing/2010/main" xmlns="">
                   <a:noFill/>
                 </a14:hiddenFill>
               </a:ext>
               <a:ext uri="{AF507438-7753-43e0-B8FC-AC1667EBCBE1}">
-                <a14:hiddenEffects xmlns="" xmlns:a14="http://schemas.microsoft.com/office/drawing/2010/main">
+                <a14:hiddenEffects xmlns:a14="http://schemas.microsoft.com/office/drawing/2010/main" xmlns="">
                   <a:effectLst>
                     <a:outerShdw blurRad="63500" dist="38099" dir="2700000" algn="ctr" rotWithShape="0">
                       <a:srgbClr val="000000">
@@ -13408,12 +13408,12 @@
             <a:effectLst/>
             <a:extLst>
               <a:ext uri="{909E8E84-426E-40dd-AFC4-6F175D3DCCD1}">
-                <a14:hiddenFill xmlns="" xmlns:a14="http://schemas.microsoft.com/office/drawing/2010/main">
+                <a14:hiddenFill xmlns:a14="http://schemas.microsoft.com/office/drawing/2010/main" xmlns="">
                   <a:noFill/>
                 </a14:hiddenFill>
               </a:ext>
               <a:ext uri="{AF507438-7753-43e0-B8FC-AC1667EBCBE1}">
-                <a14:hiddenEffects xmlns="" xmlns:a14="http://schemas.microsoft.com/office/drawing/2010/main">
+                <a14:hiddenEffects xmlns:a14="http://schemas.microsoft.com/office/drawing/2010/main" xmlns="">
                   <a:effectLst>
                     <a:outerShdw blurRad="63500" dist="38099" dir="2700000" algn="ctr" rotWithShape="0">
                       <a:srgbClr val="000000">
@@ -13466,12 +13466,12 @@
             <a:effectLst/>
             <a:extLst>
               <a:ext uri="{909E8E84-426E-40dd-AFC4-6F175D3DCCD1}">
-                <a14:hiddenFill xmlns="" xmlns:a14="http://schemas.microsoft.com/office/drawing/2010/main">
+                <a14:hiddenFill xmlns:a14="http://schemas.microsoft.com/office/drawing/2010/main" xmlns="">
                   <a:noFill/>
                 </a14:hiddenFill>
               </a:ext>
               <a:ext uri="{AF507438-7753-43e0-B8FC-AC1667EBCBE1}">
-                <a14:hiddenEffects xmlns="" xmlns:a14="http://schemas.microsoft.com/office/drawing/2010/main">
+                <a14:hiddenEffects xmlns:a14="http://schemas.microsoft.com/office/drawing/2010/main" xmlns="">
                   <a:effectLst>
                     <a:outerShdw blurRad="63500" dist="38099" dir="2700000" algn="ctr" rotWithShape="0">
                       <a:srgbClr val="000000">
@@ -13532,7 +13532,7 @@
             <a:effectLst/>
             <a:extLst>
               <a:ext uri="{909E8E84-426E-40dd-AFC4-6F175D3DCCD1}">
-                <a14:hiddenFill xmlns="" xmlns:a14="http://schemas.microsoft.com/office/drawing/2010/main">
+                <a14:hiddenFill xmlns:a14="http://schemas.microsoft.com/office/drawing/2010/main" xmlns="">
                   <a:blipFill dpi="0" rotWithShape="0">
                     <a:blip/>
                     <a:srcRect/>
@@ -13543,7 +13543,7 @@
                 </a14:hiddenFill>
               </a:ext>
               <a:ext uri="{91240B29-F687-4f45-9708-019B960494DF}">
-                <a14:hiddenLine xmlns="" xmlns:a14="http://schemas.microsoft.com/office/drawing/2010/main" w="9525">
+                <a14:hiddenLine xmlns:a14="http://schemas.microsoft.com/office/drawing/2010/main" xmlns="" w="9525">
                   <a:solidFill>
                     <a:srgbClr val="000000"/>
                   </a:solidFill>
@@ -13553,7 +13553,7 @@
                 </a14:hiddenLine>
               </a:ext>
               <a:ext uri="{AF507438-7753-43e0-B8FC-AC1667EBCBE1}">
-                <a14:hiddenEffects xmlns="" xmlns:a14="http://schemas.microsoft.com/office/drawing/2010/main">
+                <a14:hiddenEffects xmlns:a14="http://schemas.microsoft.com/office/drawing/2010/main" xmlns="">
                   <a:effectLst>
                     <a:outerShdw blurRad="63500" dist="38099" dir="2700000" algn="ctr" rotWithShape="0">
                       <a:srgbClr val="000000">
@@ -13602,7 +13602,7 @@
             <a:effectLst/>
             <a:extLst>
               <a:ext uri="{909E8E84-426E-40dd-AFC4-6F175D3DCCD1}">
-                <a14:hiddenFill xmlns="" xmlns:a14="http://schemas.microsoft.com/office/drawing/2010/main">
+                <a14:hiddenFill xmlns:a14="http://schemas.microsoft.com/office/drawing/2010/main" xmlns="">
                   <a:blipFill dpi="0" rotWithShape="0">
                     <a:blip/>
                     <a:srcRect/>
@@ -13613,7 +13613,7 @@
                 </a14:hiddenFill>
               </a:ext>
               <a:ext uri="{91240B29-F687-4f45-9708-019B960494DF}">
-                <a14:hiddenLine xmlns="" xmlns:a14="http://schemas.microsoft.com/office/drawing/2010/main" w="9525">
+                <a14:hiddenLine xmlns:a14="http://schemas.microsoft.com/office/drawing/2010/main" xmlns="" w="9525">
                   <a:solidFill>
                     <a:srgbClr val="000000"/>
                   </a:solidFill>
@@ -13623,7 +13623,7 @@
                 </a14:hiddenLine>
               </a:ext>
               <a:ext uri="{AF507438-7753-43e0-B8FC-AC1667EBCBE1}">
-                <a14:hiddenEffects xmlns="" xmlns:a14="http://schemas.microsoft.com/office/drawing/2010/main">
+                <a14:hiddenEffects xmlns:a14="http://schemas.microsoft.com/office/drawing/2010/main" xmlns="">
                   <a:effectLst>
                     <a:outerShdw blurRad="63500" dist="38099" dir="2700000" algn="ctr" rotWithShape="0">
                       <a:srgbClr val="000000">
@@ -13672,7 +13672,7 @@
             <a:effectLst/>
             <a:extLst>
               <a:ext uri="{909E8E84-426E-40dd-AFC4-6F175D3DCCD1}">
-                <a14:hiddenFill xmlns="" xmlns:a14="http://schemas.microsoft.com/office/drawing/2010/main">
+                <a14:hiddenFill xmlns:a14="http://schemas.microsoft.com/office/drawing/2010/main" xmlns="">
                   <a:blipFill dpi="0" rotWithShape="0">
                     <a:blip/>
                     <a:srcRect/>
@@ -13683,7 +13683,7 @@
                 </a14:hiddenFill>
               </a:ext>
               <a:ext uri="{91240B29-F687-4f45-9708-019B960494DF}">
-                <a14:hiddenLine xmlns="" xmlns:a14="http://schemas.microsoft.com/office/drawing/2010/main" w="9525">
+                <a14:hiddenLine xmlns:a14="http://schemas.microsoft.com/office/drawing/2010/main" xmlns="" w="9525">
                   <a:solidFill>
                     <a:srgbClr val="000000"/>
                   </a:solidFill>
@@ -13693,7 +13693,7 @@
                 </a14:hiddenLine>
               </a:ext>
               <a:ext uri="{AF507438-7753-43e0-B8FC-AC1667EBCBE1}">
-                <a14:hiddenEffects xmlns="" xmlns:a14="http://schemas.microsoft.com/office/drawing/2010/main">
+                <a14:hiddenEffects xmlns:a14="http://schemas.microsoft.com/office/drawing/2010/main" xmlns="">
                   <a:effectLst>
                     <a:outerShdw blurRad="63500" dist="38099" dir="2700000" algn="ctr" rotWithShape="0">
                       <a:srgbClr val="000000">
@@ -13742,7 +13742,7 @@
             <a:effectLst/>
             <a:extLst>
               <a:ext uri="{909E8E84-426E-40dd-AFC4-6F175D3DCCD1}">
-                <a14:hiddenFill xmlns="" xmlns:a14="http://schemas.microsoft.com/office/drawing/2010/main">
+                <a14:hiddenFill xmlns:a14="http://schemas.microsoft.com/office/drawing/2010/main" xmlns="">
                   <a:blipFill dpi="0" rotWithShape="0">
                     <a:blip/>
                     <a:srcRect/>
@@ -13753,7 +13753,7 @@
                 </a14:hiddenFill>
               </a:ext>
               <a:ext uri="{91240B29-F687-4f45-9708-019B960494DF}">
-                <a14:hiddenLine xmlns="" xmlns:a14="http://schemas.microsoft.com/office/drawing/2010/main" w="9525">
+                <a14:hiddenLine xmlns:a14="http://schemas.microsoft.com/office/drawing/2010/main" xmlns="" w="9525">
                   <a:solidFill>
                     <a:srgbClr val="000000"/>
                   </a:solidFill>
@@ -13763,7 +13763,7 @@
                 </a14:hiddenLine>
               </a:ext>
               <a:ext uri="{AF507438-7753-43e0-B8FC-AC1667EBCBE1}">
-                <a14:hiddenEffects xmlns="" xmlns:a14="http://schemas.microsoft.com/office/drawing/2010/main">
+                <a14:hiddenEffects xmlns:a14="http://schemas.microsoft.com/office/drawing/2010/main" xmlns="">
                   <a:effectLst>
                     <a:outerShdw blurRad="63500" dist="38099" dir="2700000" algn="ctr" rotWithShape="0">
                       <a:srgbClr val="000000">
@@ -13812,7 +13812,7 @@
             <a:effectLst/>
             <a:extLst>
               <a:ext uri="{909E8E84-426E-40dd-AFC4-6F175D3DCCD1}">
-                <a14:hiddenFill xmlns="" xmlns:a14="http://schemas.microsoft.com/office/drawing/2010/main">
+                <a14:hiddenFill xmlns:a14="http://schemas.microsoft.com/office/drawing/2010/main" xmlns="">
                   <a:blipFill dpi="0" rotWithShape="0">
                     <a:blip/>
                     <a:srcRect/>
@@ -13823,7 +13823,7 @@
                 </a14:hiddenFill>
               </a:ext>
               <a:ext uri="{91240B29-F687-4f45-9708-019B960494DF}">
-                <a14:hiddenLine xmlns="" xmlns:a14="http://schemas.microsoft.com/office/drawing/2010/main" w="9525">
+                <a14:hiddenLine xmlns:a14="http://schemas.microsoft.com/office/drawing/2010/main" xmlns="" w="9525">
                   <a:solidFill>
                     <a:srgbClr val="000000"/>
                   </a:solidFill>
@@ -13833,7 +13833,7 @@
                 </a14:hiddenLine>
               </a:ext>
               <a:ext uri="{AF507438-7753-43e0-B8FC-AC1667EBCBE1}">
-                <a14:hiddenEffects xmlns="" xmlns:a14="http://schemas.microsoft.com/office/drawing/2010/main">
+                <a14:hiddenEffects xmlns:a14="http://schemas.microsoft.com/office/drawing/2010/main" xmlns="">
                   <a:effectLst>
                     <a:outerShdw blurRad="63500" dist="38099" dir="2700000" algn="ctr" rotWithShape="0">
                       <a:srgbClr val="000000">
@@ -13874,12 +13874,12 @@
             <a:effectLst/>
             <a:extLst>
               <a:ext uri="{909E8E84-426E-40dd-AFC4-6F175D3DCCD1}">
-                <a14:hiddenFill xmlns="" xmlns:a14="http://schemas.microsoft.com/office/drawing/2010/main">
+                <a14:hiddenFill xmlns:a14="http://schemas.microsoft.com/office/drawing/2010/main" xmlns="">
                   <a:noFill/>
                 </a14:hiddenFill>
               </a:ext>
               <a:ext uri="{AF507438-7753-43e0-B8FC-AC1667EBCBE1}">
-                <a14:hiddenEffects xmlns="" xmlns:a14="http://schemas.microsoft.com/office/drawing/2010/main">
+                <a14:hiddenEffects xmlns:a14="http://schemas.microsoft.com/office/drawing/2010/main" xmlns="">
                   <a:effectLst>
                     <a:outerShdw blurRad="63500" dist="38099" dir="2700000" algn="ctr" rotWithShape="0">
                       <a:srgbClr val="000000">
@@ -13932,12 +13932,12 @@
             <a:effectLst/>
             <a:extLst>
               <a:ext uri="{909E8E84-426E-40dd-AFC4-6F175D3DCCD1}">
-                <a14:hiddenFill xmlns="" xmlns:a14="http://schemas.microsoft.com/office/drawing/2010/main">
+                <a14:hiddenFill xmlns:a14="http://schemas.microsoft.com/office/drawing/2010/main" xmlns="">
                   <a:noFill/>
                 </a14:hiddenFill>
               </a:ext>
               <a:ext uri="{AF507438-7753-43e0-B8FC-AC1667EBCBE1}">
-                <a14:hiddenEffects xmlns="" xmlns:a14="http://schemas.microsoft.com/office/drawing/2010/main">
+                <a14:hiddenEffects xmlns:a14="http://schemas.microsoft.com/office/drawing/2010/main" xmlns="">
                   <a:effectLst>
                     <a:outerShdw blurRad="63500" dist="38099" dir="2700000" algn="ctr" rotWithShape="0">
                       <a:srgbClr val="000000">
@@ -13998,7 +13998,7 @@
             <a:effectLst/>
             <a:extLst>
               <a:ext uri="{909E8E84-426E-40dd-AFC4-6F175D3DCCD1}">
-                <a14:hiddenFill xmlns="" xmlns:a14="http://schemas.microsoft.com/office/drawing/2010/main">
+                <a14:hiddenFill xmlns:a14="http://schemas.microsoft.com/office/drawing/2010/main" xmlns="">
                   <a:blipFill dpi="0" rotWithShape="0">
                     <a:blip/>
                     <a:srcRect/>
@@ -14009,7 +14009,7 @@
                 </a14:hiddenFill>
               </a:ext>
               <a:ext uri="{91240B29-F687-4f45-9708-019B960494DF}">
-                <a14:hiddenLine xmlns="" xmlns:a14="http://schemas.microsoft.com/office/drawing/2010/main" w="9525">
+                <a14:hiddenLine xmlns:a14="http://schemas.microsoft.com/office/drawing/2010/main" xmlns="" w="9525">
                   <a:solidFill>
                     <a:srgbClr val="000000"/>
                   </a:solidFill>
@@ -14019,7 +14019,7 @@
                 </a14:hiddenLine>
               </a:ext>
               <a:ext uri="{AF507438-7753-43e0-B8FC-AC1667EBCBE1}">
-                <a14:hiddenEffects xmlns="" xmlns:a14="http://schemas.microsoft.com/office/drawing/2010/main">
+                <a14:hiddenEffects xmlns:a14="http://schemas.microsoft.com/office/drawing/2010/main" xmlns="">
                   <a:effectLst>
                     <a:outerShdw blurRad="63500" dist="38099" dir="2700000" algn="ctr" rotWithShape="0">
                       <a:srgbClr val="000000">
@@ -14152,7 +14152,7 @@
           <a:effectLst/>
           <a:extLst>
             <a:ext uri="{909E8E84-426E-40dd-AFC4-6F175D3DCCD1}">
-              <a14:hiddenFill xmlns:a14="http://schemas.microsoft.com/office/drawing/2010/main" xmlns="">
+              <a14:hiddenFill xmlns="" xmlns:a14="http://schemas.microsoft.com/office/drawing/2010/main">
                 <a:blipFill dpi="0" rotWithShape="0">
                   <a:blip/>
                   <a:srcRect/>
@@ -14163,7 +14163,7 @@
               </a14:hiddenFill>
             </a:ext>
             <a:ext uri="{91240B29-F687-4f45-9708-019B960494DF}">
-              <a14:hiddenLine xmlns:a14="http://schemas.microsoft.com/office/drawing/2010/main" xmlns="" w="9525">
+              <a14:hiddenLine xmlns="" xmlns:a14="http://schemas.microsoft.com/office/drawing/2010/main" w="9525">
                 <a:solidFill>
                   <a:srgbClr val="000000"/>
                 </a:solidFill>
@@ -14173,7 +14173,7 @@
               </a14:hiddenLine>
             </a:ext>
             <a:ext uri="{AF507438-7753-43e0-B8FC-AC1667EBCBE1}">
-              <a14:hiddenEffects xmlns:a14="http://schemas.microsoft.com/office/drawing/2010/main" xmlns="">
+              <a14:hiddenEffects xmlns="" xmlns:a14="http://schemas.microsoft.com/office/drawing/2010/main">
                 <a:effectLst>
                   <a:outerShdw blurRad="63500" dist="38099" dir="2700000" algn="ctr" rotWithShape="0">
                     <a:srgbClr val="000000">
@@ -14258,7 +14258,7 @@
           <a:effectLst/>
           <a:extLst>
             <a:ext uri="{909E8E84-426E-40dd-AFC4-6F175D3DCCD1}">
-              <a14:hiddenFill xmlns:a14="http://schemas.microsoft.com/office/drawing/2010/main" xmlns="">
+              <a14:hiddenFill xmlns="" xmlns:a14="http://schemas.microsoft.com/office/drawing/2010/main">
                 <a:blipFill dpi="0" rotWithShape="0">
                   <a:blip/>
                   <a:srcRect/>
@@ -14269,7 +14269,7 @@
               </a14:hiddenFill>
             </a:ext>
             <a:ext uri="{91240B29-F687-4f45-9708-019B960494DF}">
-              <a14:hiddenLine xmlns:a14="http://schemas.microsoft.com/office/drawing/2010/main" xmlns="" w="9525">
+              <a14:hiddenLine xmlns="" xmlns:a14="http://schemas.microsoft.com/office/drawing/2010/main" w="9525">
                 <a:solidFill>
                   <a:srgbClr val="000000"/>
                 </a:solidFill>
@@ -14279,7 +14279,7 @@
               </a14:hiddenLine>
             </a:ext>
             <a:ext uri="{AF507438-7753-43e0-B8FC-AC1667EBCBE1}">
-              <a14:hiddenEffects xmlns:a14="http://schemas.microsoft.com/office/drawing/2010/main" xmlns="">
+              <a14:hiddenEffects xmlns="" xmlns:a14="http://schemas.microsoft.com/office/drawing/2010/main">
                 <a:effectLst>
                   <a:outerShdw blurRad="63500" dist="38099" dir="2700000" algn="ctr" rotWithShape="0">
                     <a:srgbClr val="000000">
@@ -14364,7 +14364,7 @@
           <a:effectLst/>
           <a:extLst>
             <a:ext uri="{909E8E84-426E-40dd-AFC4-6F175D3DCCD1}">
-              <a14:hiddenFill xmlns:a14="http://schemas.microsoft.com/office/drawing/2010/main" xmlns="">
+              <a14:hiddenFill xmlns="" xmlns:a14="http://schemas.microsoft.com/office/drawing/2010/main">
                 <a:blipFill dpi="0" rotWithShape="0">
                   <a:blip/>
                   <a:srcRect/>
@@ -14375,7 +14375,7 @@
               </a14:hiddenFill>
             </a:ext>
             <a:ext uri="{91240B29-F687-4f45-9708-019B960494DF}">
-              <a14:hiddenLine xmlns:a14="http://schemas.microsoft.com/office/drawing/2010/main" xmlns="" w="9525">
+              <a14:hiddenLine xmlns="" xmlns:a14="http://schemas.microsoft.com/office/drawing/2010/main" w="9525">
                 <a:solidFill>
                   <a:srgbClr val="000000"/>
                 </a:solidFill>
@@ -14385,7 +14385,7 @@
               </a14:hiddenLine>
             </a:ext>
             <a:ext uri="{AF507438-7753-43e0-B8FC-AC1667EBCBE1}">
-              <a14:hiddenEffects xmlns:a14="http://schemas.microsoft.com/office/drawing/2010/main" xmlns="">
+              <a14:hiddenEffects xmlns="" xmlns:a14="http://schemas.microsoft.com/office/drawing/2010/main">
                 <a:effectLst>
                   <a:outerShdw blurRad="63500" dist="38099" dir="2700000" algn="ctr" rotWithShape="0">
                     <a:srgbClr val="000000">
@@ -14564,7 +14564,7 @@
           <a:effectLst/>
           <a:extLst>
             <a:ext uri="{909E8E84-426E-40dd-AFC4-6F175D3DCCD1}">
-              <a14:hiddenFill xmlns:a14="http://schemas.microsoft.com/office/drawing/2010/main" xmlns="">
+              <a14:hiddenFill xmlns="" xmlns:a14="http://schemas.microsoft.com/office/drawing/2010/main">
                 <a:blipFill dpi="0" rotWithShape="0">
                   <a:blip/>
                   <a:srcRect/>
@@ -14575,7 +14575,7 @@
               </a14:hiddenFill>
             </a:ext>
             <a:ext uri="{91240B29-F687-4f45-9708-019B960494DF}">
-              <a14:hiddenLine xmlns:a14="http://schemas.microsoft.com/office/drawing/2010/main" xmlns="" w="9525">
+              <a14:hiddenLine xmlns="" xmlns:a14="http://schemas.microsoft.com/office/drawing/2010/main" w="9525">
                 <a:solidFill>
                   <a:srgbClr val="000000"/>
                 </a:solidFill>
@@ -14585,7 +14585,7 @@
               </a14:hiddenLine>
             </a:ext>
             <a:ext uri="{AF507438-7753-43e0-B8FC-AC1667EBCBE1}">
-              <a14:hiddenEffects xmlns:a14="http://schemas.microsoft.com/office/drawing/2010/main" xmlns="">
+              <a14:hiddenEffects xmlns="" xmlns:a14="http://schemas.microsoft.com/office/drawing/2010/main">
                 <a:effectLst>
                   <a:outerShdw blurRad="63500" dist="38099" dir="2700000" algn="ctr" rotWithShape="0">
                     <a:srgbClr val="000000">
@@ -14663,7 +14663,7 @@
           <a:effectLst/>
           <a:extLst>
             <a:ext uri="{909E8E84-426E-40dd-AFC4-6F175D3DCCD1}">
-              <a14:hiddenFill xmlns:a14="http://schemas.microsoft.com/office/drawing/2010/main" xmlns="">
+              <a14:hiddenFill xmlns="" xmlns:a14="http://schemas.microsoft.com/office/drawing/2010/main">
                 <a:blipFill dpi="0" rotWithShape="0">
                   <a:blip/>
                   <a:srcRect/>
@@ -14674,7 +14674,7 @@
               </a14:hiddenFill>
             </a:ext>
             <a:ext uri="{91240B29-F687-4f45-9708-019B960494DF}">
-              <a14:hiddenLine xmlns:a14="http://schemas.microsoft.com/office/drawing/2010/main" xmlns="" w="9525">
+              <a14:hiddenLine xmlns="" xmlns:a14="http://schemas.microsoft.com/office/drawing/2010/main" w="9525">
                 <a:solidFill>
                   <a:srgbClr val="000000"/>
                 </a:solidFill>
@@ -14684,7 +14684,7 @@
               </a14:hiddenLine>
             </a:ext>
             <a:ext uri="{AF507438-7753-43e0-B8FC-AC1667EBCBE1}">
-              <a14:hiddenEffects xmlns:a14="http://schemas.microsoft.com/office/drawing/2010/main" xmlns="">
+              <a14:hiddenEffects xmlns="" xmlns:a14="http://schemas.microsoft.com/office/drawing/2010/main">
                 <a:effectLst>
                   <a:outerShdw blurRad="63500" dist="38099" dir="2700000" algn="ctr" rotWithShape="0">
                     <a:srgbClr val="000000">
@@ -14880,7 +14880,7 @@
                             </p:stCondLst>
                             <p:childTnLst>
                               <p:par>
-                                <p:cTn id="5" presetID="1" presetClass="entr" presetSubtype="0" fill="hold" nodeType="clickEffect">
+                                <p:cTn id="5" presetID="1" presetClass="entr" presetSubtype="0" fill="hold" grpId="0" nodeType="clickEffect">
                                   <p:stCondLst>
                                     <p:cond delay="0"/>
                                   </p:stCondLst>
@@ -14893,7 +14893,34 @@
                                           </p:stCondLst>
                                         </p:cTn>
                                         <p:tgtEl>
-                                          <p:spTgt spid="9"/>
+                                          <p:spTgt spid="7"/>
+                                        </p:tgtEl>
+                                        <p:attrNameLst>
+                                          <p:attrName>style.visibility</p:attrName>
+                                        </p:attrNameLst>
+                                      </p:cBhvr>
+                                      <p:to>
+                                        <p:strVal val="visible"/>
+                                      </p:to>
+                                    </p:set>
+                                  </p:childTnLst>
+                                </p:cTn>
+                              </p:par>
+                              <p:par>
+                                <p:cTn id="7" presetID="1" presetClass="entr" presetSubtype="0" fill="hold" grpId="0" nodeType="withEffect">
+                                  <p:stCondLst>
+                                    <p:cond delay="0"/>
+                                  </p:stCondLst>
+                                  <p:childTnLst>
+                                    <p:set>
+                                      <p:cBhvr>
+                                        <p:cTn id="8" dur="1" fill="hold">
+                                          <p:stCondLst>
+                                            <p:cond delay="0"/>
+                                          </p:stCondLst>
+                                        </p:cTn>
+                                        <p:tgtEl>
+                                          <p:spTgt spid="8"/>
                                         </p:tgtEl>
                                         <p:attrNameLst>
                                           <p:attrName>style.visibility</p:attrName>
@@ -14913,46 +14940,19 @@
                     </p:cTn>
                   </p:par>
                   <p:par>
-                    <p:cTn id="7" fill="hold">
+                    <p:cTn id="9" fill="hold">
                       <p:stCondLst>
                         <p:cond delay="indefinite"/>
                       </p:stCondLst>
                       <p:childTnLst>
                         <p:par>
-                          <p:cTn id="8" fill="hold">
+                          <p:cTn id="10" fill="hold">
                             <p:stCondLst>
                               <p:cond delay="0"/>
                             </p:stCondLst>
                             <p:childTnLst>
                               <p:par>
-                                <p:cTn id="9" presetID="1" presetClass="entr" presetSubtype="0" fill="hold" grpId="0" nodeType="clickEffect">
-                                  <p:stCondLst>
-                                    <p:cond delay="0"/>
-                                  </p:stCondLst>
-                                  <p:childTnLst>
-                                    <p:set>
-                                      <p:cBhvr>
-                                        <p:cTn id="10" dur="1" fill="hold">
-                                          <p:stCondLst>
-                                            <p:cond delay="0"/>
-                                          </p:stCondLst>
-                                        </p:cTn>
-                                        <p:tgtEl>
-                                          <p:spTgt spid="7"/>
-                                        </p:tgtEl>
-                                        <p:attrNameLst>
-                                          <p:attrName>style.visibility</p:attrName>
-                                        </p:attrNameLst>
-                                      </p:cBhvr>
-                                      <p:to>
-                                        <p:strVal val="visible"/>
-                                      </p:to>
-                                    </p:set>
-                                  </p:childTnLst>
-                                </p:cTn>
-                              </p:par>
-                              <p:par>
-                                <p:cTn id="11" presetID="1" presetClass="entr" presetSubtype="0" fill="hold" grpId="0" nodeType="withEffect">
+                                <p:cTn id="11" presetID="1" presetClass="entr" presetSubtype="0" fill="hold" nodeType="clickEffect">
                                   <p:stCondLst>
                                     <p:cond delay="0"/>
                                   </p:stCondLst>
@@ -14965,7 +14965,7 @@
                                           </p:stCondLst>
                                         </p:cTn>
                                         <p:tgtEl>
-                                          <p:spTgt spid="8"/>
+                                          <p:spTgt spid="9"/>
                                         </p:tgtEl>
                                         <p:attrNameLst>
                                           <p:attrName>style.visibility</p:attrName>
@@ -16498,7 +16498,7 @@
           <a:effectLst/>
           <a:extLst>
             <a:ext uri="{909E8E84-426E-40dd-AFC4-6F175D3DCCD1}">
-              <a14:hiddenFill xmlns="" xmlns:a14="http://schemas.microsoft.com/office/drawing/2010/main">
+              <a14:hiddenFill xmlns:a14="http://schemas.microsoft.com/office/drawing/2010/main" xmlns="">
                 <a:blipFill dpi="0" rotWithShape="0">
                   <a:blip/>
                   <a:srcRect/>
@@ -16509,7 +16509,7 @@
               </a14:hiddenFill>
             </a:ext>
             <a:ext uri="{91240B29-F687-4f45-9708-019B960494DF}">
-              <a14:hiddenLine xmlns="" xmlns:a14="http://schemas.microsoft.com/office/drawing/2010/main" w="9525">
+              <a14:hiddenLine xmlns:a14="http://schemas.microsoft.com/office/drawing/2010/main" xmlns="" w="9525">
                 <a:solidFill>
                   <a:srgbClr val="000000"/>
                 </a:solidFill>
@@ -16519,7 +16519,7 @@
               </a14:hiddenLine>
             </a:ext>
             <a:ext uri="{AF507438-7753-43e0-B8FC-AC1667EBCBE1}">
-              <a14:hiddenEffects xmlns="" xmlns:a14="http://schemas.microsoft.com/office/drawing/2010/main">
+              <a14:hiddenEffects xmlns:a14="http://schemas.microsoft.com/office/drawing/2010/main" xmlns="">
                 <a:effectLst>
                   <a:outerShdw blurRad="63500" dist="38099" dir="2700000" algn="ctr" rotWithShape="0">
                     <a:srgbClr val="000000">
@@ -18008,7 +18008,7 @@
           <a:effectLst/>
           <a:extLst>
             <a:ext uri="{909E8E84-426E-40dd-AFC4-6F175D3DCCD1}">
-              <a14:hiddenFill xmlns="" xmlns:a14="http://schemas.microsoft.com/office/drawing/2010/main">
+              <a14:hiddenFill xmlns:a14="http://schemas.microsoft.com/office/drawing/2010/main" xmlns="">
                 <a:blipFill dpi="0" rotWithShape="0">
                   <a:blip/>
                   <a:srcRect/>
@@ -18019,7 +18019,7 @@
               </a14:hiddenFill>
             </a:ext>
             <a:ext uri="{91240B29-F687-4f45-9708-019B960494DF}">
-              <a14:hiddenLine xmlns="" xmlns:a14="http://schemas.microsoft.com/office/drawing/2010/main" w="9525">
+              <a14:hiddenLine xmlns:a14="http://schemas.microsoft.com/office/drawing/2010/main" xmlns="" w="9525">
                 <a:solidFill>
                   <a:srgbClr val="000000"/>
                 </a:solidFill>
@@ -18029,7 +18029,7 @@
               </a14:hiddenLine>
             </a:ext>
             <a:ext uri="{AF507438-7753-43e0-B8FC-AC1667EBCBE1}">
-              <a14:hiddenEffects xmlns="" xmlns:a14="http://schemas.microsoft.com/office/drawing/2010/main">
+              <a14:hiddenEffects xmlns:a14="http://schemas.microsoft.com/office/drawing/2010/main" xmlns="">
                 <a:effectLst>
                   <a:outerShdw blurRad="63500" dist="38099" dir="2700000" algn="ctr" rotWithShape="0">
                     <a:srgbClr val="000000">
@@ -19514,7 +19514,7 @@
           <a:effectLst/>
           <a:extLst>
             <a:ext uri="{909E8E84-426E-40dd-AFC4-6F175D3DCCD1}">
-              <a14:hiddenFill xmlns="" xmlns:a14="http://schemas.microsoft.com/office/drawing/2010/main">
+              <a14:hiddenFill xmlns:a14="http://schemas.microsoft.com/office/drawing/2010/main" xmlns="">
                 <a:blipFill dpi="0" rotWithShape="0">
                   <a:blip/>
                   <a:srcRect/>
@@ -19525,7 +19525,7 @@
               </a14:hiddenFill>
             </a:ext>
             <a:ext uri="{91240B29-F687-4f45-9708-019B960494DF}">
-              <a14:hiddenLine xmlns="" xmlns:a14="http://schemas.microsoft.com/office/drawing/2010/main" w="9525">
+              <a14:hiddenLine xmlns:a14="http://schemas.microsoft.com/office/drawing/2010/main" xmlns="" w="9525">
                 <a:solidFill>
                   <a:srgbClr val="000000"/>
                 </a:solidFill>
@@ -19535,7 +19535,7 @@
               </a14:hiddenLine>
             </a:ext>
             <a:ext uri="{AF507438-7753-43e0-B8FC-AC1667EBCBE1}">
-              <a14:hiddenEffects xmlns="" xmlns:a14="http://schemas.microsoft.com/office/drawing/2010/main">
+              <a14:hiddenEffects xmlns:a14="http://schemas.microsoft.com/office/drawing/2010/main" xmlns="">
                 <a:effectLst>
                   <a:outerShdw blurRad="63500" dist="38099" dir="2700000" algn="ctr" rotWithShape="0">
                     <a:srgbClr val="000000">
@@ -19689,7 +19689,7 @@
           <a:effectLst/>
           <a:extLst>
             <a:ext uri="{909E8E84-426E-40dd-AFC4-6F175D3DCCD1}">
-              <a14:hiddenFill xmlns="" xmlns:a14="http://schemas.microsoft.com/office/drawing/2010/main">
+              <a14:hiddenFill xmlns:a14="http://schemas.microsoft.com/office/drawing/2010/main" xmlns="">
                 <a:blipFill dpi="0" rotWithShape="0">
                   <a:blip/>
                   <a:srcRect/>
@@ -19700,7 +19700,7 @@
               </a14:hiddenFill>
             </a:ext>
             <a:ext uri="{91240B29-F687-4f45-9708-019B960494DF}">
-              <a14:hiddenLine xmlns="" xmlns:a14="http://schemas.microsoft.com/office/drawing/2010/main" w="9525">
+              <a14:hiddenLine xmlns:a14="http://schemas.microsoft.com/office/drawing/2010/main" xmlns="" w="9525">
                 <a:solidFill>
                   <a:srgbClr val="000000"/>
                 </a:solidFill>
@@ -19710,7 +19710,7 @@
               </a14:hiddenLine>
             </a:ext>
             <a:ext uri="{AF507438-7753-43e0-B8FC-AC1667EBCBE1}">
-              <a14:hiddenEffects xmlns="" xmlns:a14="http://schemas.microsoft.com/office/drawing/2010/main">
+              <a14:hiddenEffects xmlns:a14="http://schemas.microsoft.com/office/drawing/2010/main" xmlns="">
                 <a:effectLst>
                   <a:outerShdw blurRad="63500" dist="38099" dir="2700000" algn="ctr" rotWithShape="0">
                     <a:srgbClr val="000000">
@@ -21503,7 +21503,7 @@
           <a:effectLst/>
           <a:extLst>
             <a:ext uri="{909E8E84-426E-40dd-AFC4-6F175D3DCCD1}">
-              <a14:hiddenFill xmlns="" xmlns:a14="http://schemas.microsoft.com/office/drawing/2010/main">
+              <a14:hiddenFill xmlns:a14="http://schemas.microsoft.com/office/drawing/2010/main" xmlns="">
                 <a:blipFill dpi="0" rotWithShape="0">
                   <a:blip/>
                   <a:srcRect/>
@@ -21514,7 +21514,7 @@
               </a14:hiddenFill>
             </a:ext>
             <a:ext uri="{91240B29-F687-4f45-9708-019B960494DF}">
-              <a14:hiddenLine xmlns="" xmlns:a14="http://schemas.microsoft.com/office/drawing/2010/main" w="9525">
+              <a14:hiddenLine xmlns:a14="http://schemas.microsoft.com/office/drawing/2010/main" xmlns="" w="9525">
                 <a:solidFill>
                   <a:srgbClr val="000000"/>
                 </a:solidFill>
@@ -21524,7 +21524,7 @@
               </a14:hiddenLine>
             </a:ext>
             <a:ext uri="{AF507438-7753-43e0-B8FC-AC1667EBCBE1}">
-              <a14:hiddenEffects xmlns="" xmlns:a14="http://schemas.microsoft.com/office/drawing/2010/main">
+              <a14:hiddenEffects xmlns:a14="http://schemas.microsoft.com/office/drawing/2010/main" xmlns="">
                 <a:effectLst>
                   <a:outerShdw blurRad="63500" dist="38099" dir="2700000" algn="ctr" rotWithShape="0">
                     <a:srgbClr val="000000">
@@ -24479,7 +24479,7 @@
           <a:effectLst/>
           <a:extLst>
             <a:ext uri="{909E8E84-426E-40dd-AFC4-6F175D3DCCD1}">
-              <a14:hiddenFill xmlns="" xmlns:a14="http://schemas.microsoft.com/office/drawing/2010/main">
+              <a14:hiddenFill xmlns:a14="http://schemas.microsoft.com/office/drawing/2010/main" xmlns="">
                 <a:blipFill dpi="0" rotWithShape="0">
                   <a:blip/>
                   <a:srcRect/>
@@ -24490,7 +24490,7 @@
               </a14:hiddenFill>
             </a:ext>
             <a:ext uri="{91240B29-F687-4f45-9708-019B960494DF}">
-              <a14:hiddenLine xmlns="" xmlns:a14="http://schemas.microsoft.com/office/drawing/2010/main" w="9525">
+              <a14:hiddenLine xmlns:a14="http://schemas.microsoft.com/office/drawing/2010/main" xmlns="" w="9525">
                 <a:solidFill>
                   <a:srgbClr val="000000"/>
                 </a:solidFill>
@@ -24500,7 +24500,7 @@
               </a14:hiddenLine>
             </a:ext>
             <a:ext uri="{AF507438-7753-43e0-B8FC-AC1667EBCBE1}">
-              <a14:hiddenEffects xmlns="" xmlns:a14="http://schemas.microsoft.com/office/drawing/2010/main">
+              <a14:hiddenEffects xmlns:a14="http://schemas.microsoft.com/office/drawing/2010/main" xmlns="">
                 <a:effectLst>
                   <a:outerShdw blurRad="63500" dist="38099" dir="2700000" algn="ctr" rotWithShape="0">
                     <a:srgbClr val="000000">
@@ -24579,7 +24579,7 @@
           <a:effectLst/>
           <a:extLst>
             <a:ext uri="{909E8E84-426E-40dd-AFC4-6F175D3DCCD1}">
-              <a14:hiddenFill xmlns="" xmlns:a14="http://schemas.microsoft.com/office/drawing/2010/main">
+              <a14:hiddenFill xmlns:a14="http://schemas.microsoft.com/office/drawing/2010/main" xmlns="">
                 <a:blipFill dpi="0" rotWithShape="0">
                   <a:blip/>
                   <a:srcRect/>
@@ -24590,7 +24590,7 @@
               </a14:hiddenFill>
             </a:ext>
             <a:ext uri="{91240B29-F687-4f45-9708-019B960494DF}">
-              <a14:hiddenLine xmlns="" xmlns:a14="http://schemas.microsoft.com/office/drawing/2010/main" w="9525">
+              <a14:hiddenLine xmlns:a14="http://schemas.microsoft.com/office/drawing/2010/main" xmlns="" w="9525">
                 <a:solidFill>
                   <a:srgbClr val="000000"/>
                 </a:solidFill>
@@ -24600,7 +24600,7 @@
               </a14:hiddenLine>
             </a:ext>
             <a:ext uri="{AF507438-7753-43e0-B8FC-AC1667EBCBE1}">
-              <a14:hiddenEffects xmlns="" xmlns:a14="http://schemas.microsoft.com/office/drawing/2010/main">
+              <a14:hiddenEffects xmlns:a14="http://schemas.microsoft.com/office/drawing/2010/main" xmlns="">
                 <a:effectLst>
                   <a:outerShdw blurRad="63500" dist="38099" dir="2700000" algn="ctr" rotWithShape="0">
                     <a:srgbClr val="000000">
@@ -26195,7 +26195,7 @@
           <a:effectLst/>
           <a:extLst>
             <a:ext uri="{909E8E84-426E-40dd-AFC4-6F175D3DCCD1}">
-              <a14:hiddenFill xmlns="" xmlns:a14="http://schemas.microsoft.com/office/drawing/2010/main">
+              <a14:hiddenFill xmlns:a14="http://schemas.microsoft.com/office/drawing/2010/main" xmlns="">
                 <a:blipFill dpi="0" rotWithShape="0">
                   <a:blip/>
                   <a:srcRect/>
@@ -26206,7 +26206,7 @@
               </a14:hiddenFill>
             </a:ext>
             <a:ext uri="{91240B29-F687-4f45-9708-019B960494DF}">
-              <a14:hiddenLine xmlns="" xmlns:a14="http://schemas.microsoft.com/office/drawing/2010/main" w="9525">
+              <a14:hiddenLine xmlns:a14="http://schemas.microsoft.com/office/drawing/2010/main" xmlns="" w="9525">
                 <a:solidFill>
                   <a:srgbClr val="000000"/>
                 </a:solidFill>
@@ -26216,7 +26216,7 @@
               </a14:hiddenLine>
             </a:ext>
             <a:ext uri="{AF507438-7753-43e0-B8FC-AC1667EBCBE1}">
-              <a14:hiddenEffects xmlns="" xmlns:a14="http://schemas.microsoft.com/office/drawing/2010/main">
+              <a14:hiddenEffects xmlns:a14="http://schemas.microsoft.com/office/drawing/2010/main" xmlns="">
                 <a:effectLst>
                   <a:outerShdw blurRad="63500" dist="38099" dir="2700000" algn="ctr" rotWithShape="0">
                     <a:srgbClr val="000000">
@@ -27864,7 +27864,7 @@
           <a:effectLst/>
           <a:extLst>
             <a:ext uri="{909E8E84-426E-40dd-AFC4-6F175D3DCCD1}">
-              <a14:hiddenFill xmlns="" xmlns:a14="http://schemas.microsoft.com/office/drawing/2010/main">
+              <a14:hiddenFill xmlns:a14="http://schemas.microsoft.com/office/drawing/2010/main" xmlns="">
                 <a:blipFill dpi="0" rotWithShape="0">
                   <a:blip/>
                   <a:srcRect/>
@@ -27875,7 +27875,7 @@
               </a14:hiddenFill>
             </a:ext>
             <a:ext uri="{91240B29-F687-4f45-9708-019B960494DF}">
-              <a14:hiddenLine xmlns="" xmlns:a14="http://schemas.microsoft.com/office/drawing/2010/main" w="9525">
+              <a14:hiddenLine xmlns:a14="http://schemas.microsoft.com/office/drawing/2010/main" xmlns="" w="9525">
                 <a:solidFill>
                   <a:srgbClr val="000000"/>
                 </a:solidFill>
@@ -27885,7 +27885,7 @@
               </a14:hiddenLine>
             </a:ext>
             <a:ext uri="{AF507438-7753-43e0-B8FC-AC1667EBCBE1}">
-              <a14:hiddenEffects xmlns="" xmlns:a14="http://schemas.microsoft.com/office/drawing/2010/main">
+              <a14:hiddenEffects xmlns:a14="http://schemas.microsoft.com/office/drawing/2010/main" xmlns="">
                 <a:effectLst>
                   <a:outerShdw blurRad="63500" dist="38099" dir="2700000" algn="ctr" rotWithShape="0">
                     <a:srgbClr val="000000">
@@ -29330,7 +29330,7 @@
           <a:effectLst/>
           <a:extLst>
             <a:ext uri="{909E8E84-426E-40dd-AFC4-6F175D3DCCD1}">
-              <a14:hiddenFill xmlns="" xmlns:a14="http://schemas.microsoft.com/office/drawing/2010/main">
+              <a14:hiddenFill xmlns:a14="http://schemas.microsoft.com/office/drawing/2010/main" xmlns="">
                 <a:blipFill dpi="0" rotWithShape="0">
                   <a:blip/>
                   <a:srcRect/>
@@ -29341,7 +29341,7 @@
               </a14:hiddenFill>
             </a:ext>
             <a:ext uri="{91240B29-F687-4f45-9708-019B960494DF}">
-              <a14:hiddenLine xmlns="" xmlns:a14="http://schemas.microsoft.com/office/drawing/2010/main" w="9525">
+              <a14:hiddenLine xmlns:a14="http://schemas.microsoft.com/office/drawing/2010/main" xmlns="" w="9525">
                 <a:solidFill>
                   <a:srgbClr val="000000"/>
                 </a:solidFill>
@@ -29351,7 +29351,7 @@
               </a14:hiddenLine>
             </a:ext>
             <a:ext uri="{AF507438-7753-43e0-B8FC-AC1667EBCBE1}">
-              <a14:hiddenEffects xmlns="" xmlns:a14="http://schemas.microsoft.com/office/drawing/2010/main">
+              <a14:hiddenEffects xmlns:a14="http://schemas.microsoft.com/office/drawing/2010/main" xmlns="">
                 <a:effectLst>
                   <a:outerShdw blurRad="63500" dist="38099" dir="2700000" algn="ctr" rotWithShape="0">
                     <a:srgbClr val="000000">
@@ -29482,7 +29482,7 @@
           <a:effectLst/>
           <a:extLst>
             <a:ext uri="{909E8E84-426E-40dd-AFC4-6F175D3DCCD1}">
-              <a14:hiddenFill xmlns="" xmlns:a14="http://schemas.microsoft.com/office/drawing/2010/main">
+              <a14:hiddenFill xmlns:a14="http://schemas.microsoft.com/office/drawing/2010/main" xmlns="">
                 <a:blipFill dpi="0" rotWithShape="0">
                   <a:blip/>
                   <a:srcRect/>
@@ -29493,7 +29493,7 @@
               </a14:hiddenFill>
             </a:ext>
             <a:ext uri="{91240B29-F687-4f45-9708-019B960494DF}">
-              <a14:hiddenLine xmlns="" xmlns:a14="http://schemas.microsoft.com/office/drawing/2010/main" w="9525">
+              <a14:hiddenLine xmlns:a14="http://schemas.microsoft.com/office/drawing/2010/main" xmlns="" w="9525">
                 <a:solidFill>
                   <a:srgbClr val="000000"/>
                 </a:solidFill>
@@ -29503,7 +29503,7 @@
               </a14:hiddenLine>
             </a:ext>
             <a:ext uri="{AF507438-7753-43e0-B8FC-AC1667EBCBE1}">
-              <a14:hiddenEffects xmlns="" xmlns:a14="http://schemas.microsoft.com/office/drawing/2010/main">
+              <a14:hiddenEffects xmlns:a14="http://schemas.microsoft.com/office/drawing/2010/main" xmlns="">
                 <a:effectLst>
                   <a:outerShdw blurRad="63500" dist="38099" dir="2700000" algn="ctr" rotWithShape="0">
                     <a:srgbClr val="000000">
@@ -37553,7 +37553,7 @@
           <a:effectLst/>
           <a:extLst>
             <a:ext uri="{909E8E84-426E-40dd-AFC4-6F175D3DCCD1}">
-              <a14:hiddenFill xmlns:a14="http://schemas.microsoft.com/office/drawing/2010/main" xmlns="">
+              <a14:hiddenFill xmlns="" xmlns:a14="http://schemas.microsoft.com/office/drawing/2010/main">
                 <a:blipFill dpi="0" rotWithShape="0">
                   <a:blip/>
                   <a:srcRect/>
@@ -37564,7 +37564,7 @@
               </a14:hiddenFill>
             </a:ext>
             <a:ext uri="{91240B29-F687-4f45-9708-019B960494DF}">
-              <a14:hiddenLine xmlns:a14="http://schemas.microsoft.com/office/drawing/2010/main" xmlns="" w="9525">
+              <a14:hiddenLine xmlns="" xmlns:a14="http://schemas.microsoft.com/office/drawing/2010/main" w="9525">
                 <a:solidFill>
                   <a:srgbClr val="000000"/>
                 </a:solidFill>
@@ -37574,7 +37574,7 @@
               </a14:hiddenLine>
             </a:ext>
             <a:ext uri="{AF507438-7753-43e0-B8FC-AC1667EBCBE1}">
-              <a14:hiddenEffects xmlns:a14="http://schemas.microsoft.com/office/drawing/2010/main" xmlns="">
+              <a14:hiddenEffects xmlns="" xmlns:a14="http://schemas.microsoft.com/office/drawing/2010/main">
                 <a:effectLst>
                   <a:outerShdw blurRad="63500" dist="38099" dir="2700000" algn="ctr" rotWithShape="0">
                     <a:srgbClr val="000000">

</xml_diff>

<commit_message>
One more pass; some cosmetic changes.
</commit_message>
<xml_diff>
--- a/marple_itx18.pptx
+++ b/marple_itx18.pptx
@@ -30426,7 +30426,7 @@
         </p:nvSpPr>
         <p:spPr>
           <a:xfrm>
-            <a:off x="7152103" y="1250926"/>
+            <a:off x="7152103" y="1161718"/>
             <a:ext cx="1982492" cy="707886"/>
           </a:xfrm>
           <a:prstGeom prst="rect">
@@ -30516,7 +30516,7 @@
         </p:nvSpPr>
         <p:spPr>
           <a:xfrm>
-            <a:off x="4467925" y="1259789"/>
+            <a:off x="4467925" y="1170581"/>
             <a:ext cx="1982492" cy="707886"/>
           </a:xfrm>
           <a:prstGeom prst="rect">

</xml_diff>

<commit_message>
One more pass; looks good to present.
</commit_message>
<xml_diff>
--- a/marple_itx18.pptx
+++ b/marple_itx18.pptx
@@ -12516,7 +12516,7 @@
           <a:effectLst/>
           <a:extLst>
             <a:ext uri="{909E8E84-426E-40dd-AFC4-6F175D3DCCD1}">
-              <a14:hiddenFill xmlns="" xmlns:a14="http://schemas.microsoft.com/office/drawing/2010/main">
+              <a14:hiddenFill xmlns:a14="http://schemas.microsoft.com/office/drawing/2010/main" xmlns="">
                 <a:blipFill dpi="0" rotWithShape="0">
                   <a:blip/>
                   <a:srcRect/>
@@ -12527,7 +12527,7 @@
               </a14:hiddenFill>
             </a:ext>
             <a:ext uri="{91240B29-F687-4f45-9708-019B960494DF}">
-              <a14:hiddenLine xmlns="" xmlns:a14="http://schemas.microsoft.com/office/drawing/2010/main" w="9525">
+              <a14:hiddenLine xmlns:a14="http://schemas.microsoft.com/office/drawing/2010/main" xmlns="" w="9525">
                 <a:solidFill>
                   <a:srgbClr val="000000"/>
                 </a:solidFill>
@@ -12537,7 +12537,7 @@
               </a14:hiddenLine>
             </a:ext>
             <a:ext uri="{AF507438-7753-43e0-B8FC-AC1667EBCBE1}">
-              <a14:hiddenEffects xmlns="" xmlns:a14="http://schemas.microsoft.com/office/drawing/2010/main">
+              <a14:hiddenEffects xmlns:a14="http://schemas.microsoft.com/office/drawing/2010/main" xmlns="">
                 <a:effectLst>
                   <a:outerShdw blurRad="63500" dist="38099" dir="2700000" algn="ctr" rotWithShape="0">
                     <a:srgbClr val="000000">
@@ -12586,7 +12586,7 @@
           <a:effectLst/>
           <a:extLst>
             <a:ext uri="{909E8E84-426E-40dd-AFC4-6F175D3DCCD1}">
-              <a14:hiddenFill xmlns="" xmlns:a14="http://schemas.microsoft.com/office/drawing/2010/main">
+              <a14:hiddenFill xmlns:a14="http://schemas.microsoft.com/office/drawing/2010/main" xmlns="">
                 <a:blipFill dpi="0" rotWithShape="0">
                   <a:blip/>
                   <a:srcRect/>
@@ -12597,7 +12597,7 @@
               </a14:hiddenFill>
             </a:ext>
             <a:ext uri="{91240B29-F687-4f45-9708-019B960494DF}">
-              <a14:hiddenLine xmlns="" xmlns:a14="http://schemas.microsoft.com/office/drawing/2010/main" w="9525">
+              <a14:hiddenLine xmlns:a14="http://schemas.microsoft.com/office/drawing/2010/main" xmlns="" w="9525">
                 <a:solidFill>
                   <a:srgbClr val="000000"/>
                 </a:solidFill>
@@ -12607,7 +12607,7 @@
               </a14:hiddenLine>
             </a:ext>
             <a:ext uri="{AF507438-7753-43e0-B8FC-AC1667EBCBE1}">
-              <a14:hiddenEffects xmlns="" xmlns:a14="http://schemas.microsoft.com/office/drawing/2010/main">
+              <a14:hiddenEffects xmlns:a14="http://schemas.microsoft.com/office/drawing/2010/main" xmlns="">
                 <a:effectLst>
                   <a:outerShdw blurRad="63500" dist="38099" dir="2700000" algn="ctr" rotWithShape="0">
                     <a:srgbClr val="000000">
@@ -12742,7 +12742,7 @@
             <a:effectLst/>
             <a:extLst>
               <a:ext uri="{909E8E84-426E-40dd-AFC4-6F175D3DCCD1}">
-                <a14:hiddenFill xmlns:a14="http://schemas.microsoft.com/office/drawing/2010/main" xmlns="">
+                <a14:hiddenFill xmlns="" xmlns:a14="http://schemas.microsoft.com/office/drawing/2010/main">
                   <a:blipFill dpi="0" rotWithShape="0">
                     <a:blip/>
                     <a:srcRect/>
@@ -12753,7 +12753,7 @@
                 </a14:hiddenFill>
               </a:ext>
               <a:ext uri="{91240B29-F687-4f45-9708-019B960494DF}">
-                <a14:hiddenLine xmlns:a14="http://schemas.microsoft.com/office/drawing/2010/main" xmlns="" w="9525">
+                <a14:hiddenLine xmlns="" xmlns:a14="http://schemas.microsoft.com/office/drawing/2010/main" w="9525">
                   <a:solidFill>
                     <a:srgbClr val="000000"/>
                   </a:solidFill>
@@ -12763,7 +12763,7 @@
                 </a14:hiddenLine>
               </a:ext>
               <a:ext uri="{AF507438-7753-43e0-B8FC-AC1667EBCBE1}">
-                <a14:hiddenEffects xmlns:a14="http://schemas.microsoft.com/office/drawing/2010/main" xmlns="">
+                <a14:hiddenEffects xmlns="" xmlns:a14="http://schemas.microsoft.com/office/drawing/2010/main">
                   <a:effectLst>
                     <a:outerShdw blurRad="63500" dist="38099" dir="2700000" algn="ctr" rotWithShape="0">
                       <a:srgbClr val="000000">
@@ -12812,7 +12812,7 @@
             <a:effectLst/>
             <a:extLst>
               <a:ext uri="{909E8E84-426E-40dd-AFC4-6F175D3DCCD1}">
-                <a14:hiddenFill xmlns:a14="http://schemas.microsoft.com/office/drawing/2010/main" xmlns="">
+                <a14:hiddenFill xmlns="" xmlns:a14="http://schemas.microsoft.com/office/drawing/2010/main">
                   <a:blipFill dpi="0" rotWithShape="0">
                     <a:blip/>
                     <a:srcRect/>
@@ -12823,7 +12823,7 @@
                 </a14:hiddenFill>
               </a:ext>
               <a:ext uri="{91240B29-F687-4f45-9708-019B960494DF}">
-                <a14:hiddenLine xmlns:a14="http://schemas.microsoft.com/office/drawing/2010/main" xmlns="" w="9525">
+                <a14:hiddenLine xmlns="" xmlns:a14="http://schemas.microsoft.com/office/drawing/2010/main" w="9525">
                   <a:solidFill>
                     <a:srgbClr val="000000"/>
                   </a:solidFill>
@@ -12833,7 +12833,7 @@
                 </a14:hiddenLine>
               </a:ext>
               <a:ext uri="{AF507438-7753-43e0-B8FC-AC1667EBCBE1}">
-                <a14:hiddenEffects xmlns:a14="http://schemas.microsoft.com/office/drawing/2010/main" xmlns="">
+                <a14:hiddenEffects xmlns="" xmlns:a14="http://schemas.microsoft.com/office/drawing/2010/main">
                   <a:effectLst>
                     <a:outerShdw blurRad="63500" dist="38099" dir="2700000" algn="ctr" rotWithShape="0">
                       <a:srgbClr val="000000">
@@ -12882,7 +12882,7 @@
             <a:effectLst/>
             <a:extLst>
               <a:ext uri="{909E8E84-426E-40dd-AFC4-6F175D3DCCD1}">
-                <a14:hiddenFill xmlns:a14="http://schemas.microsoft.com/office/drawing/2010/main" xmlns="">
+                <a14:hiddenFill xmlns="" xmlns:a14="http://schemas.microsoft.com/office/drawing/2010/main">
                   <a:blipFill dpi="0" rotWithShape="0">
                     <a:blip/>
                     <a:srcRect/>
@@ -12893,7 +12893,7 @@
                 </a14:hiddenFill>
               </a:ext>
               <a:ext uri="{91240B29-F687-4f45-9708-019B960494DF}">
-                <a14:hiddenLine xmlns:a14="http://schemas.microsoft.com/office/drawing/2010/main" xmlns="" w="9525">
+                <a14:hiddenLine xmlns="" xmlns:a14="http://schemas.microsoft.com/office/drawing/2010/main" w="9525">
                   <a:solidFill>
                     <a:srgbClr val="000000"/>
                   </a:solidFill>
@@ -12903,7 +12903,7 @@
                 </a14:hiddenLine>
               </a:ext>
               <a:ext uri="{AF507438-7753-43e0-B8FC-AC1667EBCBE1}">
-                <a14:hiddenEffects xmlns:a14="http://schemas.microsoft.com/office/drawing/2010/main" xmlns="">
+                <a14:hiddenEffects xmlns="" xmlns:a14="http://schemas.microsoft.com/office/drawing/2010/main">
                   <a:effectLst>
                     <a:outerShdw blurRad="63500" dist="38099" dir="2700000" algn="ctr" rotWithShape="0">
                       <a:srgbClr val="000000">
@@ -12944,12 +12944,12 @@
             <a:effectLst/>
             <a:extLst>
               <a:ext uri="{909E8E84-426E-40dd-AFC4-6F175D3DCCD1}">
-                <a14:hiddenFill xmlns:a14="http://schemas.microsoft.com/office/drawing/2010/main" xmlns="">
+                <a14:hiddenFill xmlns="" xmlns:a14="http://schemas.microsoft.com/office/drawing/2010/main">
                   <a:noFill/>
                 </a14:hiddenFill>
               </a:ext>
               <a:ext uri="{AF507438-7753-43e0-B8FC-AC1667EBCBE1}">
-                <a14:hiddenEffects xmlns:a14="http://schemas.microsoft.com/office/drawing/2010/main" xmlns="">
+                <a14:hiddenEffects xmlns="" xmlns:a14="http://schemas.microsoft.com/office/drawing/2010/main">
                   <a:effectLst>
                     <a:outerShdw blurRad="63500" dist="38099" dir="2700000" algn="ctr" rotWithShape="0">
                       <a:srgbClr val="000000">
@@ -13002,12 +13002,12 @@
             <a:effectLst/>
             <a:extLst>
               <a:ext uri="{909E8E84-426E-40dd-AFC4-6F175D3DCCD1}">
-                <a14:hiddenFill xmlns:a14="http://schemas.microsoft.com/office/drawing/2010/main" xmlns="">
+                <a14:hiddenFill xmlns="" xmlns:a14="http://schemas.microsoft.com/office/drawing/2010/main">
                   <a:noFill/>
                 </a14:hiddenFill>
               </a:ext>
               <a:ext uri="{AF507438-7753-43e0-B8FC-AC1667EBCBE1}">
-                <a14:hiddenEffects xmlns:a14="http://schemas.microsoft.com/office/drawing/2010/main" xmlns="">
+                <a14:hiddenEffects xmlns="" xmlns:a14="http://schemas.microsoft.com/office/drawing/2010/main">
                   <a:effectLst>
                     <a:outerShdw blurRad="63500" dist="38099" dir="2700000" algn="ctr" rotWithShape="0">
                       <a:srgbClr val="000000">
@@ -13060,12 +13060,12 @@
             <a:effectLst/>
             <a:extLst>
               <a:ext uri="{909E8E84-426E-40dd-AFC4-6F175D3DCCD1}">
-                <a14:hiddenFill xmlns:a14="http://schemas.microsoft.com/office/drawing/2010/main" xmlns="">
+                <a14:hiddenFill xmlns="" xmlns:a14="http://schemas.microsoft.com/office/drawing/2010/main">
                   <a:noFill/>
                 </a14:hiddenFill>
               </a:ext>
               <a:ext uri="{AF507438-7753-43e0-B8FC-AC1667EBCBE1}">
-                <a14:hiddenEffects xmlns:a14="http://schemas.microsoft.com/office/drawing/2010/main" xmlns="">
+                <a14:hiddenEffects xmlns="" xmlns:a14="http://schemas.microsoft.com/office/drawing/2010/main">
                   <a:effectLst>
                     <a:outerShdw blurRad="63500" dist="38099" dir="2700000" algn="ctr" rotWithShape="0">
                       <a:srgbClr val="000000">
@@ -13118,12 +13118,12 @@
             <a:effectLst/>
             <a:extLst>
               <a:ext uri="{909E8E84-426E-40dd-AFC4-6F175D3DCCD1}">
-                <a14:hiddenFill xmlns:a14="http://schemas.microsoft.com/office/drawing/2010/main" xmlns="">
+                <a14:hiddenFill xmlns="" xmlns:a14="http://schemas.microsoft.com/office/drawing/2010/main">
                   <a:noFill/>
                 </a14:hiddenFill>
               </a:ext>
               <a:ext uri="{AF507438-7753-43e0-B8FC-AC1667EBCBE1}">
-                <a14:hiddenEffects xmlns:a14="http://schemas.microsoft.com/office/drawing/2010/main" xmlns="">
+                <a14:hiddenEffects xmlns="" xmlns:a14="http://schemas.microsoft.com/office/drawing/2010/main">
                   <a:effectLst>
                     <a:outerShdw blurRad="63500" dist="38099" dir="2700000" algn="ctr" rotWithShape="0">
                       <a:srgbClr val="000000">
@@ -13176,12 +13176,12 @@
             <a:effectLst/>
             <a:extLst>
               <a:ext uri="{909E8E84-426E-40dd-AFC4-6F175D3DCCD1}">
-                <a14:hiddenFill xmlns:a14="http://schemas.microsoft.com/office/drawing/2010/main" xmlns="">
+                <a14:hiddenFill xmlns="" xmlns:a14="http://schemas.microsoft.com/office/drawing/2010/main">
                   <a:noFill/>
                 </a14:hiddenFill>
               </a:ext>
               <a:ext uri="{AF507438-7753-43e0-B8FC-AC1667EBCBE1}">
-                <a14:hiddenEffects xmlns:a14="http://schemas.microsoft.com/office/drawing/2010/main" xmlns="">
+                <a14:hiddenEffects xmlns="" xmlns:a14="http://schemas.microsoft.com/office/drawing/2010/main">
                   <a:effectLst>
                     <a:outerShdw blurRad="63500" dist="38099" dir="2700000" algn="ctr" rotWithShape="0">
                       <a:srgbClr val="000000">
@@ -13234,12 +13234,12 @@
             <a:effectLst/>
             <a:extLst>
               <a:ext uri="{909E8E84-426E-40dd-AFC4-6F175D3DCCD1}">
-                <a14:hiddenFill xmlns:a14="http://schemas.microsoft.com/office/drawing/2010/main" xmlns="">
+                <a14:hiddenFill xmlns="" xmlns:a14="http://schemas.microsoft.com/office/drawing/2010/main">
                   <a:noFill/>
                 </a14:hiddenFill>
               </a:ext>
               <a:ext uri="{AF507438-7753-43e0-B8FC-AC1667EBCBE1}">
-                <a14:hiddenEffects xmlns:a14="http://schemas.microsoft.com/office/drawing/2010/main" xmlns="">
+                <a14:hiddenEffects xmlns="" xmlns:a14="http://schemas.microsoft.com/office/drawing/2010/main">
                   <a:effectLst>
                     <a:outerShdw blurRad="63500" dist="38099" dir="2700000" algn="ctr" rotWithShape="0">
                       <a:srgbClr val="000000">
@@ -13292,12 +13292,12 @@
             <a:effectLst/>
             <a:extLst>
               <a:ext uri="{909E8E84-426E-40dd-AFC4-6F175D3DCCD1}">
-                <a14:hiddenFill xmlns:a14="http://schemas.microsoft.com/office/drawing/2010/main" xmlns="">
+                <a14:hiddenFill xmlns="" xmlns:a14="http://schemas.microsoft.com/office/drawing/2010/main">
                   <a:noFill/>
                 </a14:hiddenFill>
               </a:ext>
               <a:ext uri="{AF507438-7753-43e0-B8FC-AC1667EBCBE1}">
-                <a14:hiddenEffects xmlns:a14="http://schemas.microsoft.com/office/drawing/2010/main" xmlns="">
+                <a14:hiddenEffects xmlns="" xmlns:a14="http://schemas.microsoft.com/office/drawing/2010/main">
                   <a:effectLst>
                     <a:outerShdw blurRad="63500" dist="38099" dir="2700000" algn="ctr" rotWithShape="0">
                       <a:srgbClr val="000000">
@@ -13350,12 +13350,12 @@
             <a:effectLst/>
             <a:extLst>
               <a:ext uri="{909E8E84-426E-40dd-AFC4-6F175D3DCCD1}">
-                <a14:hiddenFill xmlns:a14="http://schemas.microsoft.com/office/drawing/2010/main" xmlns="">
+                <a14:hiddenFill xmlns="" xmlns:a14="http://schemas.microsoft.com/office/drawing/2010/main">
                   <a:noFill/>
                 </a14:hiddenFill>
               </a:ext>
               <a:ext uri="{AF507438-7753-43e0-B8FC-AC1667EBCBE1}">
-                <a14:hiddenEffects xmlns:a14="http://schemas.microsoft.com/office/drawing/2010/main" xmlns="">
+                <a14:hiddenEffects xmlns="" xmlns:a14="http://schemas.microsoft.com/office/drawing/2010/main">
                   <a:effectLst>
                     <a:outerShdw blurRad="63500" dist="38099" dir="2700000" algn="ctr" rotWithShape="0">
                       <a:srgbClr val="000000">
@@ -13408,12 +13408,12 @@
             <a:effectLst/>
             <a:extLst>
               <a:ext uri="{909E8E84-426E-40dd-AFC4-6F175D3DCCD1}">
-                <a14:hiddenFill xmlns:a14="http://schemas.microsoft.com/office/drawing/2010/main" xmlns="">
+                <a14:hiddenFill xmlns="" xmlns:a14="http://schemas.microsoft.com/office/drawing/2010/main">
                   <a:noFill/>
                 </a14:hiddenFill>
               </a:ext>
               <a:ext uri="{AF507438-7753-43e0-B8FC-AC1667EBCBE1}">
-                <a14:hiddenEffects xmlns:a14="http://schemas.microsoft.com/office/drawing/2010/main" xmlns="">
+                <a14:hiddenEffects xmlns="" xmlns:a14="http://schemas.microsoft.com/office/drawing/2010/main">
                   <a:effectLst>
                     <a:outerShdw blurRad="63500" dist="38099" dir="2700000" algn="ctr" rotWithShape="0">
                       <a:srgbClr val="000000">
@@ -13466,12 +13466,12 @@
             <a:effectLst/>
             <a:extLst>
               <a:ext uri="{909E8E84-426E-40dd-AFC4-6F175D3DCCD1}">
-                <a14:hiddenFill xmlns:a14="http://schemas.microsoft.com/office/drawing/2010/main" xmlns="">
+                <a14:hiddenFill xmlns="" xmlns:a14="http://schemas.microsoft.com/office/drawing/2010/main">
                   <a:noFill/>
                 </a14:hiddenFill>
               </a:ext>
               <a:ext uri="{AF507438-7753-43e0-B8FC-AC1667EBCBE1}">
-                <a14:hiddenEffects xmlns:a14="http://schemas.microsoft.com/office/drawing/2010/main" xmlns="">
+                <a14:hiddenEffects xmlns="" xmlns:a14="http://schemas.microsoft.com/office/drawing/2010/main">
                   <a:effectLst>
                     <a:outerShdw blurRad="63500" dist="38099" dir="2700000" algn="ctr" rotWithShape="0">
                       <a:srgbClr val="000000">
@@ -13532,7 +13532,7 @@
             <a:effectLst/>
             <a:extLst>
               <a:ext uri="{909E8E84-426E-40dd-AFC4-6F175D3DCCD1}">
-                <a14:hiddenFill xmlns:a14="http://schemas.microsoft.com/office/drawing/2010/main" xmlns="">
+                <a14:hiddenFill xmlns="" xmlns:a14="http://schemas.microsoft.com/office/drawing/2010/main">
                   <a:blipFill dpi="0" rotWithShape="0">
                     <a:blip/>
                     <a:srcRect/>
@@ -13543,7 +13543,7 @@
                 </a14:hiddenFill>
               </a:ext>
               <a:ext uri="{91240B29-F687-4f45-9708-019B960494DF}">
-                <a14:hiddenLine xmlns:a14="http://schemas.microsoft.com/office/drawing/2010/main" xmlns="" w="9525">
+                <a14:hiddenLine xmlns="" xmlns:a14="http://schemas.microsoft.com/office/drawing/2010/main" w="9525">
                   <a:solidFill>
                     <a:srgbClr val="000000"/>
                   </a:solidFill>
@@ -13553,7 +13553,7 @@
                 </a14:hiddenLine>
               </a:ext>
               <a:ext uri="{AF507438-7753-43e0-B8FC-AC1667EBCBE1}">
-                <a14:hiddenEffects xmlns:a14="http://schemas.microsoft.com/office/drawing/2010/main" xmlns="">
+                <a14:hiddenEffects xmlns="" xmlns:a14="http://schemas.microsoft.com/office/drawing/2010/main">
                   <a:effectLst>
                     <a:outerShdw blurRad="63500" dist="38099" dir="2700000" algn="ctr" rotWithShape="0">
                       <a:srgbClr val="000000">
@@ -13602,7 +13602,7 @@
             <a:effectLst/>
             <a:extLst>
               <a:ext uri="{909E8E84-426E-40dd-AFC4-6F175D3DCCD1}">
-                <a14:hiddenFill xmlns:a14="http://schemas.microsoft.com/office/drawing/2010/main" xmlns="">
+                <a14:hiddenFill xmlns="" xmlns:a14="http://schemas.microsoft.com/office/drawing/2010/main">
                   <a:blipFill dpi="0" rotWithShape="0">
                     <a:blip/>
                     <a:srcRect/>
@@ -13613,7 +13613,7 @@
                 </a14:hiddenFill>
               </a:ext>
               <a:ext uri="{91240B29-F687-4f45-9708-019B960494DF}">
-                <a14:hiddenLine xmlns:a14="http://schemas.microsoft.com/office/drawing/2010/main" xmlns="" w="9525">
+                <a14:hiddenLine xmlns="" xmlns:a14="http://schemas.microsoft.com/office/drawing/2010/main" w="9525">
                   <a:solidFill>
                     <a:srgbClr val="000000"/>
                   </a:solidFill>
@@ -13623,7 +13623,7 @@
                 </a14:hiddenLine>
               </a:ext>
               <a:ext uri="{AF507438-7753-43e0-B8FC-AC1667EBCBE1}">
-                <a14:hiddenEffects xmlns:a14="http://schemas.microsoft.com/office/drawing/2010/main" xmlns="">
+                <a14:hiddenEffects xmlns="" xmlns:a14="http://schemas.microsoft.com/office/drawing/2010/main">
                   <a:effectLst>
                     <a:outerShdw blurRad="63500" dist="38099" dir="2700000" algn="ctr" rotWithShape="0">
                       <a:srgbClr val="000000">
@@ -13672,7 +13672,7 @@
             <a:effectLst/>
             <a:extLst>
               <a:ext uri="{909E8E84-426E-40dd-AFC4-6F175D3DCCD1}">
-                <a14:hiddenFill xmlns:a14="http://schemas.microsoft.com/office/drawing/2010/main" xmlns="">
+                <a14:hiddenFill xmlns="" xmlns:a14="http://schemas.microsoft.com/office/drawing/2010/main">
                   <a:blipFill dpi="0" rotWithShape="0">
                     <a:blip/>
                     <a:srcRect/>
@@ -13683,7 +13683,7 @@
                 </a14:hiddenFill>
               </a:ext>
               <a:ext uri="{91240B29-F687-4f45-9708-019B960494DF}">
-                <a14:hiddenLine xmlns:a14="http://schemas.microsoft.com/office/drawing/2010/main" xmlns="" w="9525">
+                <a14:hiddenLine xmlns="" xmlns:a14="http://schemas.microsoft.com/office/drawing/2010/main" w="9525">
                   <a:solidFill>
                     <a:srgbClr val="000000"/>
                   </a:solidFill>
@@ -13693,7 +13693,7 @@
                 </a14:hiddenLine>
               </a:ext>
               <a:ext uri="{AF507438-7753-43e0-B8FC-AC1667EBCBE1}">
-                <a14:hiddenEffects xmlns:a14="http://schemas.microsoft.com/office/drawing/2010/main" xmlns="">
+                <a14:hiddenEffects xmlns="" xmlns:a14="http://schemas.microsoft.com/office/drawing/2010/main">
                   <a:effectLst>
                     <a:outerShdw blurRad="63500" dist="38099" dir="2700000" algn="ctr" rotWithShape="0">
                       <a:srgbClr val="000000">
@@ -13742,7 +13742,7 @@
             <a:effectLst/>
             <a:extLst>
               <a:ext uri="{909E8E84-426E-40dd-AFC4-6F175D3DCCD1}">
-                <a14:hiddenFill xmlns:a14="http://schemas.microsoft.com/office/drawing/2010/main" xmlns="">
+                <a14:hiddenFill xmlns="" xmlns:a14="http://schemas.microsoft.com/office/drawing/2010/main">
                   <a:blipFill dpi="0" rotWithShape="0">
                     <a:blip/>
                     <a:srcRect/>
@@ -13753,7 +13753,7 @@
                 </a14:hiddenFill>
               </a:ext>
               <a:ext uri="{91240B29-F687-4f45-9708-019B960494DF}">
-                <a14:hiddenLine xmlns:a14="http://schemas.microsoft.com/office/drawing/2010/main" xmlns="" w="9525">
+                <a14:hiddenLine xmlns="" xmlns:a14="http://schemas.microsoft.com/office/drawing/2010/main" w="9525">
                   <a:solidFill>
                     <a:srgbClr val="000000"/>
                   </a:solidFill>
@@ -13763,7 +13763,7 @@
                 </a14:hiddenLine>
               </a:ext>
               <a:ext uri="{AF507438-7753-43e0-B8FC-AC1667EBCBE1}">
-                <a14:hiddenEffects xmlns:a14="http://schemas.microsoft.com/office/drawing/2010/main" xmlns="">
+                <a14:hiddenEffects xmlns="" xmlns:a14="http://schemas.microsoft.com/office/drawing/2010/main">
                   <a:effectLst>
                     <a:outerShdw blurRad="63500" dist="38099" dir="2700000" algn="ctr" rotWithShape="0">
                       <a:srgbClr val="000000">
@@ -13812,7 +13812,7 @@
             <a:effectLst/>
             <a:extLst>
               <a:ext uri="{909E8E84-426E-40dd-AFC4-6F175D3DCCD1}">
-                <a14:hiddenFill xmlns:a14="http://schemas.microsoft.com/office/drawing/2010/main" xmlns="">
+                <a14:hiddenFill xmlns="" xmlns:a14="http://schemas.microsoft.com/office/drawing/2010/main">
                   <a:blipFill dpi="0" rotWithShape="0">
                     <a:blip/>
                     <a:srcRect/>
@@ -13823,7 +13823,7 @@
                 </a14:hiddenFill>
               </a:ext>
               <a:ext uri="{91240B29-F687-4f45-9708-019B960494DF}">
-                <a14:hiddenLine xmlns:a14="http://schemas.microsoft.com/office/drawing/2010/main" xmlns="" w="9525">
+                <a14:hiddenLine xmlns="" xmlns:a14="http://schemas.microsoft.com/office/drawing/2010/main" w="9525">
                   <a:solidFill>
                     <a:srgbClr val="000000"/>
                   </a:solidFill>
@@ -13833,7 +13833,7 @@
                 </a14:hiddenLine>
               </a:ext>
               <a:ext uri="{AF507438-7753-43e0-B8FC-AC1667EBCBE1}">
-                <a14:hiddenEffects xmlns:a14="http://schemas.microsoft.com/office/drawing/2010/main" xmlns="">
+                <a14:hiddenEffects xmlns="" xmlns:a14="http://schemas.microsoft.com/office/drawing/2010/main">
                   <a:effectLst>
                     <a:outerShdw blurRad="63500" dist="38099" dir="2700000" algn="ctr" rotWithShape="0">
                       <a:srgbClr val="000000">
@@ -13874,12 +13874,12 @@
             <a:effectLst/>
             <a:extLst>
               <a:ext uri="{909E8E84-426E-40dd-AFC4-6F175D3DCCD1}">
-                <a14:hiddenFill xmlns:a14="http://schemas.microsoft.com/office/drawing/2010/main" xmlns="">
+                <a14:hiddenFill xmlns="" xmlns:a14="http://schemas.microsoft.com/office/drawing/2010/main">
                   <a:noFill/>
                 </a14:hiddenFill>
               </a:ext>
               <a:ext uri="{AF507438-7753-43e0-B8FC-AC1667EBCBE1}">
-                <a14:hiddenEffects xmlns:a14="http://schemas.microsoft.com/office/drawing/2010/main" xmlns="">
+                <a14:hiddenEffects xmlns="" xmlns:a14="http://schemas.microsoft.com/office/drawing/2010/main">
                   <a:effectLst>
                     <a:outerShdw blurRad="63500" dist="38099" dir="2700000" algn="ctr" rotWithShape="0">
                       <a:srgbClr val="000000">
@@ -13932,12 +13932,12 @@
             <a:effectLst/>
             <a:extLst>
               <a:ext uri="{909E8E84-426E-40dd-AFC4-6F175D3DCCD1}">
-                <a14:hiddenFill xmlns:a14="http://schemas.microsoft.com/office/drawing/2010/main" xmlns="">
+                <a14:hiddenFill xmlns="" xmlns:a14="http://schemas.microsoft.com/office/drawing/2010/main">
                   <a:noFill/>
                 </a14:hiddenFill>
               </a:ext>
               <a:ext uri="{AF507438-7753-43e0-B8FC-AC1667EBCBE1}">
-                <a14:hiddenEffects xmlns:a14="http://schemas.microsoft.com/office/drawing/2010/main" xmlns="">
+                <a14:hiddenEffects xmlns="" xmlns:a14="http://schemas.microsoft.com/office/drawing/2010/main">
                   <a:effectLst>
                     <a:outerShdw blurRad="63500" dist="38099" dir="2700000" algn="ctr" rotWithShape="0">
                       <a:srgbClr val="000000">
@@ -13998,7 +13998,7 @@
             <a:effectLst/>
             <a:extLst>
               <a:ext uri="{909E8E84-426E-40dd-AFC4-6F175D3DCCD1}">
-                <a14:hiddenFill xmlns:a14="http://schemas.microsoft.com/office/drawing/2010/main" xmlns="">
+                <a14:hiddenFill xmlns="" xmlns:a14="http://schemas.microsoft.com/office/drawing/2010/main">
                   <a:blipFill dpi="0" rotWithShape="0">
                     <a:blip/>
                     <a:srcRect/>
@@ -14009,7 +14009,7 @@
                 </a14:hiddenFill>
               </a:ext>
               <a:ext uri="{91240B29-F687-4f45-9708-019B960494DF}">
-                <a14:hiddenLine xmlns:a14="http://schemas.microsoft.com/office/drawing/2010/main" xmlns="" w="9525">
+                <a14:hiddenLine xmlns="" xmlns:a14="http://schemas.microsoft.com/office/drawing/2010/main" w="9525">
                   <a:solidFill>
                     <a:srgbClr val="000000"/>
                   </a:solidFill>
@@ -14019,7 +14019,7 @@
                 </a14:hiddenLine>
               </a:ext>
               <a:ext uri="{AF507438-7753-43e0-B8FC-AC1667EBCBE1}">
-                <a14:hiddenEffects xmlns:a14="http://schemas.microsoft.com/office/drawing/2010/main" xmlns="">
+                <a14:hiddenEffects xmlns="" xmlns:a14="http://schemas.microsoft.com/office/drawing/2010/main">
                   <a:effectLst>
                     <a:outerShdw blurRad="63500" dist="38099" dir="2700000" algn="ctr" rotWithShape="0">
                       <a:srgbClr val="000000">
@@ -14152,7 +14152,7 @@
           <a:effectLst/>
           <a:extLst>
             <a:ext uri="{909E8E84-426E-40dd-AFC4-6F175D3DCCD1}">
-              <a14:hiddenFill xmlns="" xmlns:a14="http://schemas.microsoft.com/office/drawing/2010/main">
+              <a14:hiddenFill xmlns:a14="http://schemas.microsoft.com/office/drawing/2010/main" xmlns="">
                 <a:blipFill dpi="0" rotWithShape="0">
                   <a:blip/>
                   <a:srcRect/>
@@ -14163,7 +14163,7 @@
               </a14:hiddenFill>
             </a:ext>
             <a:ext uri="{91240B29-F687-4f45-9708-019B960494DF}">
-              <a14:hiddenLine xmlns="" xmlns:a14="http://schemas.microsoft.com/office/drawing/2010/main" w="9525">
+              <a14:hiddenLine xmlns:a14="http://schemas.microsoft.com/office/drawing/2010/main" xmlns="" w="9525">
                 <a:solidFill>
                   <a:srgbClr val="000000"/>
                 </a:solidFill>
@@ -14173,7 +14173,7 @@
               </a14:hiddenLine>
             </a:ext>
             <a:ext uri="{AF507438-7753-43e0-B8FC-AC1667EBCBE1}">
-              <a14:hiddenEffects xmlns="" xmlns:a14="http://schemas.microsoft.com/office/drawing/2010/main">
+              <a14:hiddenEffects xmlns:a14="http://schemas.microsoft.com/office/drawing/2010/main" xmlns="">
                 <a:effectLst>
                   <a:outerShdw blurRad="63500" dist="38099" dir="2700000" algn="ctr" rotWithShape="0">
                     <a:srgbClr val="000000">
@@ -14258,7 +14258,7 @@
           <a:effectLst/>
           <a:extLst>
             <a:ext uri="{909E8E84-426E-40dd-AFC4-6F175D3DCCD1}">
-              <a14:hiddenFill xmlns="" xmlns:a14="http://schemas.microsoft.com/office/drawing/2010/main">
+              <a14:hiddenFill xmlns:a14="http://schemas.microsoft.com/office/drawing/2010/main" xmlns="">
                 <a:blipFill dpi="0" rotWithShape="0">
                   <a:blip/>
                   <a:srcRect/>
@@ -14269,7 +14269,7 @@
               </a14:hiddenFill>
             </a:ext>
             <a:ext uri="{91240B29-F687-4f45-9708-019B960494DF}">
-              <a14:hiddenLine xmlns="" xmlns:a14="http://schemas.microsoft.com/office/drawing/2010/main" w="9525">
+              <a14:hiddenLine xmlns:a14="http://schemas.microsoft.com/office/drawing/2010/main" xmlns="" w="9525">
                 <a:solidFill>
                   <a:srgbClr val="000000"/>
                 </a:solidFill>
@@ -14279,7 +14279,7 @@
               </a14:hiddenLine>
             </a:ext>
             <a:ext uri="{AF507438-7753-43e0-B8FC-AC1667EBCBE1}">
-              <a14:hiddenEffects xmlns="" xmlns:a14="http://schemas.microsoft.com/office/drawing/2010/main">
+              <a14:hiddenEffects xmlns:a14="http://schemas.microsoft.com/office/drawing/2010/main" xmlns="">
                 <a:effectLst>
                   <a:outerShdw blurRad="63500" dist="38099" dir="2700000" algn="ctr" rotWithShape="0">
                     <a:srgbClr val="000000">
@@ -14364,7 +14364,7 @@
           <a:effectLst/>
           <a:extLst>
             <a:ext uri="{909E8E84-426E-40dd-AFC4-6F175D3DCCD1}">
-              <a14:hiddenFill xmlns="" xmlns:a14="http://schemas.microsoft.com/office/drawing/2010/main">
+              <a14:hiddenFill xmlns:a14="http://schemas.microsoft.com/office/drawing/2010/main" xmlns="">
                 <a:blipFill dpi="0" rotWithShape="0">
                   <a:blip/>
                   <a:srcRect/>
@@ -14375,7 +14375,7 @@
               </a14:hiddenFill>
             </a:ext>
             <a:ext uri="{91240B29-F687-4f45-9708-019B960494DF}">
-              <a14:hiddenLine xmlns="" xmlns:a14="http://schemas.microsoft.com/office/drawing/2010/main" w="9525">
+              <a14:hiddenLine xmlns:a14="http://schemas.microsoft.com/office/drawing/2010/main" xmlns="" w="9525">
                 <a:solidFill>
                   <a:srgbClr val="000000"/>
                 </a:solidFill>
@@ -14385,7 +14385,7 @@
               </a14:hiddenLine>
             </a:ext>
             <a:ext uri="{AF507438-7753-43e0-B8FC-AC1667EBCBE1}">
-              <a14:hiddenEffects xmlns="" xmlns:a14="http://schemas.microsoft.com/office/drawing/2010/main">
+              <a14:hiddenEffects xmlns:a14="http://schemas.microsoft.com/office/drawing/2010/main" xmlns="">
                 <a:effectLst>
                   <a:outerShdw blurRad="63500" dist="38099" dir="2700000" algn="ctr" rotWithShape="0">
                     <a:srgbClr val="000000">
@@ -14564,7 +14564,7 @@
           <a:effectLst/>
           <a:extLst>
             <a:ext uri="{909E8E84-426E-40dd-AFC4-6F175D3DCCD1}">
-              <a14:hiddenFill xmlns="" xmlns:a14="http://schemas.microsoft.com/office/drawing/2010/main">
+              <a14:hiddenFill xmlns:a14="http://schemas.microsoft.com/office/drawing/2010/main" xmlns="">
                 <a:blipFill dpi="0" rotWithShape="0">
                   <a:blip/>
                   <a:srcRect/>
@@ -14575,7 +14575,7 @@
               </a14:hiddenFill>
             </a:ext>
             <a:ext uri="{91240B29-F687-4f45-9708-019B960494DF}">
-              <a14:hiddenLine xmlns="" xmlns:a14="http://schemas.microsoft.com/office/drawing/2010/main" w="9525">
+              <a14:hiddenLine xmlns:a14="http://schemas.microsoft.com/office/drawing/2010/main" xmlns="" w="9525">
                 <a:solidFill>
                   <a:srgbClr val="000000"/>
                 </a:solidFill>
@@ -14585,7 +14585,7 @@
               </a14:hiddenLine>
             </a:ext>
             <a:ext uri="{AF507438-7753-43e0-B8FC-AC1667EBCBE1}">
-              <a14:hiddenEffects xmlns="" xmlns:a14="http://schemas.microsoft.com/office/drawing/2010/main">
+              <a14:hiddenEffects xmlns:a14="http://schemas.microsoft.com/office/drawing/2010/main" xmlns="">
                 <a:effectLst>
                   <a:outerShdw blurRad="63500" dist="38099" dir="2700000" algn="ctr" rotWithShape="0">
                     <a:srgbClr val="000000">
@@ -14663,7 +14663,7 @@
           <a:effectLst/>
           <a:extLst>
             <a:ext uri="{909E8E84-426E-40dd-AFC4-6F175D3DCCD1}">
-              <a14:hiddenFill xmlns="" xmlns:a14="http://schemas.microsoft.com/office/drawing/2010/main">
+              <a14:hiddenFill xmlns:a14="http://schemas.microsoft.com/office/drawing/2010/main" xmlns="">
                 <a:blipFill dpi="0" rotWithShape="0">
                   <a:blip/>
                   <a:srcRect/>
@@ -14674,7 +14674,7 @@
               </a14:hiddenFill>
             </a:ext>
             <a:ext uri="{91240B29-F687-4f45-9708-019B960494DF}">
-              <a14:hiddenLine xmlns="" xmlns:a14="http://schemas.microsoft.com/office/drawing/2010/main" w="9525">
+              <a14:hiddenLine xmlns:a14="http://schemas.microsoft.com/office/drawing/2010/main" xmlns="" w="9525">
                 <a:solidFill>
                   <a:srgbClr val="000000"/>
                 </a:solidFill>
@@ -14684,7 +14684,7 @@
               </a14:hiddenLine>
             </a:ext>
             <a:ext uri="{AF507438-7753-43e0-B8FC-AC1667EBCBE1}">
-              <a14:hiddenEffects xmlns="" xmlns:a14="http://schemas.microsoft.com/office/drawing/2010/main">
+              <a14:hiddenEffects xmlns:a14="http://schemas.microsoft.com/office/drawing/2010/main" xmlns="">
                 <a:effectLst>
                   <a:outerShdw blurRad="63500" dist="38099" dir="2700000" algn="ctr" rotWithShape="0">
                     <a:srgbClr val="000000">
@@ -16498,7 +16498,7 @@
           <a:effectLst/>
           <a:extLst>
             <a:ext uri="{909E8E84-426E-40dd-AFC4-6F175D3DCCD1}">
-              <a14:hiddenFill xmlns:a14="http://schemas.microsoft.com/office/drawing/2010/main" xmlns="">
+              <a14:hiddenFill xmlns="" xmlns:a14="http://schemas.microsoft.com/office/drawing/2010/main">
                 <a:blipFill dpi="0" rotWithShape="0">
                   <a:blip/>
                   <a:srcRect/>
@@ -16509,7 +16509,7 @@
               </a14:hiddenFill>
             </a:ext>
             <a:ext uri="{91240B29-F687-4f45-9708-019B960494DF}">
-              <a14:hiddenLine xmlns:a14="http://schemas.microsoft.com/office/drawing/2010/main" xmlns="" w="9525">
+              <a14:hiddenLine xmlns="" xmlns:a14="http://schemas.microsoft.com/office/drawing/2010/main" w="9525">
                 <a:solidFill>
                   <a:srgbClr val="000000"/>
                 </a:solidFill>
@@ -16519,7 +16519,7 @@
               </a14:hiddenLine>
             </a:ext>
             <a:ext uri="{AF507438-7753-43e0-B8FC-AC1667EBCBE1}">
-              <a14:hiddenEffects xmlns:a14="http://schemas.microsoft.com/office/drawing/2010/main" xmlns="">
+              <a14:hiddenEffects xmlns="" xmlns:a14="http://schemas.microsoft.com/office/drawing/2010/main">
                 <a:effectLst>
                   <a:outerShdw blurRad="63500" dist="38099" dir="2700000" algn="ctr" rotWithShape="0">
                     <a:srgbClr val="000000">
@@ -18008,7 +18008,7 @@
           <a:effectLst/>
           <a:extLst>
             <a:ext uri="{909E8E84-426E-40dd-AFC4-6F175D3DCCD1}">
-              <a14:hiddenFill xmlns:a14="http://schemas.microsoft.com/office/drawing/2010/main" xmlns="">
+              <a14:hiddenFill xmlns="" xmlns:a14="http://schemas.microsoft.com/office/drawing/2010/main">
                 <a:blipFill dpi="0" rotWithShape="0">
                   <a:blip/>
                   <a:srcRect/>
@@ -18019,7 +18019,7 @@
               </a14:hiddenFill>
             </a:ext>
             <a:ext uri="{91240B29-F687-4f45-9708-019B960494DF}">
-              <a14:hiddenLine xmlns:a14="http://schemas.microsoft.com/office/drawing/2010/main" xmlns="" w="9525">
+              <a14:hiddenLine xmlns="" xmlns:a14="http://schemas.microsoft.com/office/drawing/2010/main" w="9525">
                 <a:solidFill>
                   <a:srgbClr val="000000"/>
                 </a:solidFill>
@@ -18029,7 +18029,7 @@
               </a14:hiddenLine>
             </a:ext>
             <a:ext uri="{AF507438-7753-43e0-B8FC-AC1667EBCBE1}">
-              <a14:hiddenEffects xmlns:a14="http://schemas.microsoft.com/office/drawing/2010/main" xmlns="">
+              <a14:hiddenEffects xmlns="" xmlns:a14="http://schemas.microsoft.com/office/drawing/2010/main">
                 <a:effectLst>
                   <a:outerShdw blurRad="63500" dist="38099" dir="2700000" algn="ctr" rotWithShape="0">
                     <a:srgbClr val="000000">
@@ -19514,7 +19514,7 @@
           <a:effectLst/>
           <a:extLst>
             <a:ext uri="{909E8E84-426E-40dd-AFC4-6F175D3DCCD1}">
-              <a14:hiddenFill xmlns:a14="http://schemas.microsoft.com/office/drawing/2010/main" xmlns="">
+              <a14:hiddenFill xmlns="" xmlns:a14="http://schemas.microsoft.com/office/drawing/2010/main">
                 <a:blipFill dpi="0" rotWithShape="0">
                   <a:blip/>
                   <a:srcRect/>
@@ -19525,7 +19525,7 @@
               </a14:hiddenFill>
             </a:ext>
             <a:ext uri="{91240B29-F687-4f45-9708-019B960494DF}">
-              <a14:hiddenLine xmlns:a14="http://schemas.microsoft.com/office/drawing/2010/main" xmlns="" w="9525">
+              <a14:hiddenLine xmlns="" xmlns:a14="http://schemas.microsoft.com/office/drawing/2010/main" w="9525">
                 <a:solidFill>
                   <a:srgbClr val="000000"/>
                 </a:solidFill>
@@ -19535,7 +19535,7 @@
               </a14:hiddenLine>
             </a:ext>
             <a:ext uri="{AF507438-7753-43e0-B8FC-AC1667EBCBE1}">
-              <a14:hiddenEffects xmlns:a14="http://schemas.microsoft.com/office/drawing/2010/main" xmlns="">
+              <a14:hiddenEffects xmlns="" xmlns:a14="http://schemas.microsoft.com/office/drawing/2010/main">
                 <a:effectLst>
                   <a:outerShdw blurRad="63500" dist="38099" dir="2700000" algn="ctr" rotWithShape="0">
                     <a:srgbClr val="000000">
@@ -19689,7 +19689,7 @@
           <a:effectLst/>
           <a:extLst>
             <a:ext uri="{909E8E84-426E-40dd-AFC4-6F175D3DCCD1}">
-              <a14:hiddenFill xmlns:a14="http://schemas.microsoft.com/office/drawing/2010/main" xmlns="">
+              <a14:hiddenFill xmlns="" xmlns:a14="http://schemas.microsoft.com/office/drawing/2010/main">
                 <a:blipFill dpi="0" rotWithShape="0">
                   <a:blip/>
                   <a:srcRect/>
@@ -19700,7 +19700,7 @@
               </a14:hiddenFill>
             </a:ext>
             <a:ext uri="{91240B29-F687-4f45-9708-019B960494DF}">
-              <a14:hiddenLine xmlns:a14="http://schemas.microsoft.com/office/drawing/2010/main" xmlns="" w="9525">
+              <a14:hiddenLine xmlns="" xmlns:a14="http://schemas.microsoft.com/office/drawing/2010/main" w="9525">
                 <a:solidFill>
                   <a:srgbClr val="000000"/>
                 </a:solidFill>
@@ -19710,7 +19710,7 @@
               </a14:hiddenLine>
             </a:ext>
             <a:ext uri="{AF507438-7753-43e0-B8FC-AC1667EBCBE1}">
-              <a14:hiddenEffects xmlns:a14="http://schemas.microsoft.com/office/drawing/2010/main" xmlns="">
+              <a14:hiddenEffects xmlns="" xmlns:a14="http://schemas.microsoft.com/office/drawing/2010/main">
                 <a:effectLst>
                   <a:outerShdw blurRad="63500" dist="38099" dir="2700000" algn="ctr" rotWithShape="0">
                     <a:srgbClr val="000000">
@@ -21503,7 +21503,7 @@
           <a:effectLst/>
           <a:extLst>
             <a:ext uri="{909E8E84-426E-40dd-AFC4-6F175D3DCCD1}">
-              <a14:hiddenFill xmlns:a14="http://schemas.microsoft.com/office/drawing/2010/main" xmlns="">
+              <a14:hiddenFill xmlns="" xmlns:a14="http://schemas.microsoft.com/office/drawing/2010/main">
                 <a:blipFill dpi="0" rotWithShape="0">
                   <a:blip/>
                   <a:srcRect/>
@@ -21514,7 +21514,7 @@
               </a14:hiddenFill>
             </a:ext>
             <a:ext uri="{91240B29-F687-4f45-9708-019B960494DF}">
-              <a14:hiddenLine xmlns:a14="http://schemas.microsoft.com/office/drawing/2010/main" xmlns="" w="9525">
+              <a14:hiddenLine xmlns="" xmlns:a14="http://schemas.microsoft.com/office/drawing/2010/main" w="9525">
                 <a:solidFill>
                   <a:srgbClr val="000000"/>
                 </a:solidFill>
@@ -21524,7 +21524,7 @@
               </a14:hiddenLine>
             </a:ext>
             <a:ext uri="{AF507438-7753-43e0-B8FC-AC1667EBCBE1}">
-              <a14:hiddenEffects xmlns:a14="http://schemas.microsoft.com/office/drawing/2010/main" xmlns="">
+              <a14:hiddenEffects xmlns="" xmlns:a14="http://schemas.microsoft.com/office/drawing/2010/main">
                 <a:effectLst>
                   <a:outerShdw blurRad="63500" dist="38099" dir="2700000" algn="ctr" rotWithShape="0">
                     <a:srgbClr val="000000">
@@ -24479,7 +24479,7 @@
           <a:effectLst/>
           <a:extLst>
             <a:ext uri="{909E8E84-426E-40dd-AFC4-6F175D3DCCD1}">
-              <a14:hiddenFill xmlns:a14="http://schemas.microsoft.com/office/drawing/2010/main" xmlns="">
+              <a14:hiddenFill xmlns="" xmlns:a14="http://schemas.microsoft.com/office/drawing/2010/main">
                 <a:blipFill dpi="0" rotWithShape="0">
                   <a:blip/>
                   <a:srcRect/>
@@ -24490,7 +24490,7 @@
               </a14:hiddenFill>
             </a:ext>
             <a:ext uri="{91240B29-F687-4f45-9708-019B960494DF}">
-              <a14:hiddenLine xmlns:a14="http://schemas.microsoft.com/office/drawing/2010/main" xmlns="" w="9525">
+              <a14:hiddenLine xmlns="" xmlns:a14="http://schemas.microsoft.com/office/drawing/2010/main" w="9525">
                 <a:solidFill>
                   <a:srgbClr val="000000"/>
                 </a:solidFill>
@@ -24500,7 +24500,7 @@
               </a14:hiddenLine>
             </a:ext>
             <a:ext uri="{AF507438-7753-43e0-B8FC-AC1667EBCBE1}">
-              <a14:hiddenEffects xmlns:a14="http://schemas.microsoft.com/office/drawing/2010/main" xmlns="">
+              <a14:hiddenEffects xmlns="" xmlns:a14="http://schemas.microsoft.com/office/drawing/2010/main">
                 <a:effectLst>
                   <a:outerShdw blurRad="63500" dist="38099" dir="2700000" algn="ctr" rotWithShape="0">
                     <a:srgbClr val="000000">
@@ -24579,7 +24579,7 @@
           <a:effectLst/>
           <a:extLst>
             <a:ext uri="{909E8E84-426E-40dd-AFC4-6F175D3DCCD1}">
-              <a14:hiddenFill xmlns:a14="http://schemas.microsoft.com/office/drawing/2010/main" xmlns="">
+              <a14:hiddenFill xmlns="" xmlns:a14="http://schemas.microsoft.com/office/drawing/2010/main">
                 <a:blipFill dpi="0" rotWithShape="0">
                   <a:blip/>
                   <a:srcRect/>
@@ -24590,7 +24590,7 @@
               </a14:hiddenFill>
             </a:ext>
             <a:ext uri="{91240B29-F687-4f45-9708-019B960494DF}">
-              <a14:hiddenLine xmlns:a14="http://schemas.microsoft.com/office/drawing/2010/main" xmlns="" w="9525">
+              <a14:hiddenLine xmlns="" xmlns:a14="http://schemas.microsoft.com/office/drawing/2010/main" w="9525">
                 <a:solidFill>
                   <a:srgbClr val="000000"/>
                 </a:solidFill>
@@ -24600,7 +24600,7 @@
               </a14:hiddenLine>
             </a:ext>
             <a:ext uri="{AF507438-7753-43e0-B8FC-AC1667EBCBE1}">
-              <a14:hiddenEffects xmlns:a14="http://schemas.microsoft.com/office/drawing/2010/main" xmlns="">
+              <a14:hiddenEffects xmlns="" xmlns:a14="http://schemas.microsoft.com/office/drawing/2010/main">
                 <a:effectLst>
                   <a:outerShdw blurRad="63500" dist="38099" dir="2700000" algn="ctr" rotWithShape="0">
                     <a:srgbClr val="000000">
@@ -26195,7 +26195,7 @@
           <a:effectLst/>
           <a:extLst>
             <a:ext uri="{909E8E84-426E-40dd-AFC4-6F175D3DCCD1}">
-              <a14:hiddenFill xmlns:a14="http://schemas.microsoft.com/office/drawing/2010/main" xmlns="">
+              <a14:hiddenFill xmlns="" xmlns:a14="http://schemas.microsoft.com/office/drawing/2010/main">
                 <a:blipFill dpi="0" rotWithShape="0">
                   <a:blip/>
                   <a:srcRect/>
@@ -26206,7 +26206,7 @@
               </a14:hiddenFill>
             </a:ext>
             <a:ext uri="{91240B29-F687-4f45-9708-019B960494DF}">
-              <a14:hiddenLine xmlns:a14="http://schemas.microsoft.com/office/drawing/2010/main" xmlns="" w="9525">
+              <a14:hiddenLine xmlns="" xmlns:a14="http://schemas.microsoft.com/office/drawing/2010/main" w="9525">
                 <a:solidFill>
                   <a:srgbClr val="000000"/>
                 </a:solidFill>
@@ -26216,7 +26216,7 @@
               </a14:hiddenLine>
             </a:ext>
             <a:ext uri="{AF507438-7753-43e0-B8FC-AC1667EBCBE1}">
-              <a14:hiddenEffects xmlns:a14="http://schemas.microsoft.com/office/drawing/2010/main" xmlns="">
+              <a14:hiddenEffects xmlns="" xmlns:a14="http://schemas.microsoft.com/office/drawing/2010/main">
                 <a:effectLst>
                   <a:outerShdw blurRad="63500" dist="38099" dir="2700000" algn="ctr" rotWithShape="0">
                     <a:srgbClr val="000000">
@@ -27864,7 +27864,7 @@
           <a:effectLst/>
           <a:extLst>
             <a:ext uri="{909E8E84-426E-40dd-AFC4-6F175D3DCCD1}">
-              <a14:hiddenFill xmlns:a14="http://schemas.microsoft.com/office/drawing/2010/main" xmlns="">
+              <a14:hiddenFill xmlns="" xmlns:a14="http://schemas.microsoft.com/office/drawing/2010/main">
                 <a:blipFill dpi="0" rotWithShape="0">
                   <a:blip/>
                   <a:srcRect/>
@@ -27875,7 +27875,7 @@
               </a14:hiddenFill>
             </a:ext>
             <a:ext uri="{91240B29-F687-4f45-9708-019B960494DF}">
-              <a14:hiddenLine xmlns:a14="http://schemas.microsoft.com/office/drawing/2010/main" xmlns="" w="9525">
+              <a14:hiddenLine xmlns="" xmlns:a14="http://schemas.microsoft.com/office/drawing/2010/main" w="9525">
                 <a:solidFill>
                   <a:srgbClr val="000000"/>
                 </a:solidFill>
@@ -27885,7 +27885,7 @@
               </a14:hiddenLine>
             </a:ext>
             <a:ext uri="{AF507438-7753-43e0-B8FC-AC1667EBCBE1}">
-              <a14:hiddenEffects xmlns:a14="http://schemas.microsoft.com/office/drawing/2010/main" xmlns="">
+              <a14:hiddenEffects xmlns="" xmlns:a14="http://schemas.microsoft.com/office/drawing/2010/main">
                 <a:effectLst>
                   <a:outerShdw blurRad="63500" dist="38099" dir="2700000" algn="ctr" rotWithShape="0">
                     <a:srgbClr val="000000">
@@ -29330,7 +29330,7 @@
           <a:effectLst/>
           <a:extLst>
             <a:ext uri="{909E8E84-426E-40dd-AFC4-6F175D3DCCD1}">
-              <a14:hiddenFill xmlns:a14="http://schemas.microsoft.com/office/drawing/2010/main" xmlns="">
+              <a14:hiddenFill xmlns="" xmlns:a14="http://schemas.microsoft.com/office/drawing/2010/main">
                 <a:blipFill dpi="0" rotWithShape="0">
                   <a:blip/>
                   <a:srcRect/>
@@ -29341,7 +29341,7 @@
               </a14:hiddenFill>
             </a:ext>
             <a:ext uri="{91240B29-F687-4f45-9708-019B960494DF}">
-              <a14:hiddenLine xmlns:a14="http://schemas.microsoft.com/office/drawing/2010/main" xmlns="" w="9525">
+              <a14:hiddenLine xmlns="" xmlns:a14="http://schemas.microsoft.com/office/drawing/2010/main" w="9525">
                 <a:solidFill>
                   <a:srgbClr val="000000"/>
                 </a:solidFill>
@@ -29351,7 +29351,7 @@
               </a14:hiddenLine>
             </a:ext>
             <a:ext uri="{AF507438-7753-43e0-B8FC-AC1667EBCBE1}">
-              <a14:hiddenEffects xmlns:a14="http://schemas.microsoft.com/office/drawing/2010/main" xmlns="">
+              <a14:hiddenEffects xmlns="" xmlns:a14="http://schemas.microsoft.com/office/drawing/2010/main">
                 <a:effectLst>
                   <a:outerShdw blurRad="63500" dist="38099" dir="2700000" algn="ctr" rotWithShape="0">
                     <a:srgbClr val="000000">
@@ -29482,7 +29482,7 @@
           <a:effectLst/>
           <a:extLst>
             <a:ext uri="{909E8E84-426E-40dd-AFC4-6F175D3DCCD1}">
-              <a14:hiddenFill xmlns:a14="http://schemas.microsoft.com/office/drawing/2010/main" xmlns="">
+              <a14:hiddenFill xmlns="" xmlns:a14="http://schemas.microsoft.com/office/drawing/2010/main">
                 <a:blipFill dpi="0" rotWithShape="0">
                   <a:blip/>
                   <a:srcRect/>
@@ -29493,7 +29493,7 @@
               </a14:hiddenFill>
             </a:ext>
             <a:ext uri="{91240B29-F687-4f45-9708-019B960494DF}">
-              <a14:hiddenLine xmlns:a14="http://schemas.microsoft.com/office/drawing/2010/main" xmlns="" w="9525">
+              <a14:hiddenLine xmlns="" xmlns:a14="http://schemas.microsoft.com/office/drawing/2010/main" w="9525">
                 <a:solidFill>
                   <a:srgbClr val="000000"/>
                 </a:solidFill>
@@ -29503,7 +29503,7 @@
               </a14:hiddenLine>
             </a:ext>
             <a:ext uri="{AF507438-7753-43e0-B8FC-AC1667EBCBE1}">
-              <a14:hiddenEffects xmlns:a14="http://schemas.microsoft.com/office/drawing/2010/main" xmlns="">
+              <a14:hiddenEffects xmlns="" xmlns:a14="http://schemas.microsoft.com/office/drawing/2010/main">
                 <a:effectLst>
                   <a:outerShdw blurRad="63500" dist="38099" dir="2700000" algn="ctr" rotWithShape="0">
                     <a:srgbClr val="000000">
@@ -37553,7 +37553,7 @@
           <a:effectLst/>
           <a:extLst>
             <a:ext uri="{909E8E84-426E-40dd-AFC4-6F175D3DCCD1}">
-              <a14:hiddenFill xmlns="" xmlns:a14="http://schemas.microsoft.com/office/drawing/2010/main">
+              <a14:hiddenFill xmlns:a14="http://schemas.microsoft.com/office/drawing/2010/main" xmlns="">
                 <a:blipFill dpi="0" rotWithShape="0">
                   <a:blip/>
                   <a:srcRect/>
@@ -37564,7 +37564,7 @@
               </a14:hiddenFill>
             </a:ext>
             <a:ext uri="{91240B29-F687-4f45-9708-019B960494DF}">
-              <a14:hiddenLine xmlns="" xmlns:a14="http://schemas.microsoft.com/office/drawing/2010/main" w="9525">
+              <a14:hiddenLine xmlns:a14="http://schemas.microsoft.com/office/drawing/2010/main" xmlns="" w="9525">
                 <a:solidFill>
                   <a:srgbClr val="000000"/>
                 </a:solidFill>
@@ -37574,7 +37574,7 @@
               </a14:hiddenLine>
             </a:ext>
             <a:ext uri="{AF507438-7753-43e0-B8FC-AC1667EBCBE1}">
-              <a14:hiddenEffects xmlns="" xmlns:a14="http://schemas.microsoft.com/office/drawing/2010/main">
+              <a14:hiddenEffects xmlns:a14="http://schemas.microsoft.com/office/drawing/2010/main" xmlns="">
                 <a:effectLst>
                   <a:outerShdw blurRad="63500" dist="38099" dir="2700000" algn="ctr" rotWithShape="0">
                     <a:srgbClr val="000000">

</xml_diff>

<commit_message>
Proof read notes quickly
</commit_message>
<xml_diff>
--- a/marple_itx18.pptx
+++ b/marple_itx18.pptx
@@ -12516,7 +12516,7 @@
           <a:effectLst/>
           <a:extLst>
             <a:ext uri="{909E8E84-426E-40dd-AFC4-6F175D3DCCD1}">
-              <a14:hiddenFill xmlns:a14="http://schemas.microsoft.com/office/drawing/2010/main" xmlns="">
+              <a14:hiddenFill xmlns="" xmlns:a14="http://schemas.microsoft.com/office/drawing/2010/main">
                 <a:blipFill dpi="0" rotWithShape="0">
                   <a:blip/>
                   <a:srcRect/>
@@ -12527,7 +12527,7 @@
               </a14:hiddenFill>
             </a:ext>
             <a:ext uri="{91240B29-F687-4f45-9708-019B960494DF}">
-              <a14:hiddenLine xmlns:a14="http://schemas.microsoft.com/office/drawing/2010/main" xmlns="" w="9525">
+              <a14:hiddenLine xmlns="" xmlns:a14="http://schemas.microsoft.com/office/drawing/2010/main" w="9525">
                 <a:solidFill>
                   <a:srgbClr val="000000"/>
                 </a:solidFill>
@@ -12537,7 +12537,7 @@
               </a14:hiddenLine>
             </a:ext>
             <a:ext uri="{AF507438-7753-43e0-B8FC-AC1667EBCBE1}">
-              <a14:hiddenEffects xmlns:a14="http://schemas.microsoft.com/office/drawing/2010/main" xmlns="">
+              <a14:hiddenEffects xmlns="" xmlns:a14="http://schemas.microsoft.com/office/drawing/2010/main">
                 <a:effectLst>
                   <a:outerShdw blurRad="63500" dist="38099" dir="2700000" algn="ctr" rotWithShape="0">
                     <a:srgbClr val="000000">
@@ -12586,7 +12586,7 @@
           <a:effectLst/>
           <a:extLst>
             <a:ext uri="{909E8E84-426E-40dd-AFC4-6F175D3DCCD1}">
-              <a14:hiddenFill xmlns:a14="http://schemas.microsoft.com/office/drawing/2010/main" xmlns="">
+              <a14:hiddenFill xmlns="" xmlns:a14="http://schemas.microsoft.com/office/drawing/2010/main">
                 <a:blipFill dpi="0" rotWithShape="0">
                   <a:blip/>
                   <a:srcRect/>
@@ -12597,7 +12597,7 @@
               </a14:hiddenFill>
             </a:ext>
             <a:ext uri="{91240B29-F687-4f45-9708-019B960494DF}">
-              <a14:hiddenLine xmlns:a14="http://schemas.microsoft.com/office/drawing/2010/main" xmlns="" w="9525">
+              <a14:hiddenLine xmlns="" xmlns:a14="http://schemas.microsoft.com/office/drawing/2010/main" w="9525">
                 <a:solidFill>
                   <a:srgbClr val="000000"/>
                 </a:solidFill>
@@ -12607,7 +12607,7 @@
               </a14:hiddenLine>
             </a:ext>
             <a:ext uri="{AF507438-7753-43e0-B8FC-AC1667EBCBE1}">
-              <a14:hiddenEffects xmlns:a14="http://schemas.microsoft.com/office/drawing/2010/main" xmlns="">
+              <a14:hiddenEffects xmlns="" xmlns:a14="http://schemas.microsoft.com/office/drawing/2010/main">
                 <a:effectLst>
                   <a:outerShdw blurRad="63500" dist="38099" dir="2700000" algn="ctr" rotWithShape="0">
                     <a:srgbClr val="000000">
@@ -12742,7 +12742,7 @@
             <a:effectLst/>
             <a:extLst>
               <a:ext uri="{909E8E84-426E-40dd-AFC4-6F175D3DCCD1}">
-                <a14:hiddenFill xmlns="" xmlns:a14="http://schemas.microsoft.com/office/drawing/2010/main">
+                <a14:hiddenFill xmlns:a14="http://schemas.microsoft.com/office/drawing/2010/main" xmlns="">
                   <a:blipFill dpi="0" rotWithShape="0">
                     <a:blip/>
                     <a:srcRect/>
@@ -12753,7 +12753,7 @@
                 </a14:hiddenFill>
               </a:ext>
               <a:ext uri="{91240B29-F687-4f45-9708-019B960494DF}">
-                <a14:hiddenLine xmlns="" xmlns:a14="http://schemas.microsoft.com/office/drawing/2010/main" w="9525">
+                <a14:hiddenLine xmlns:a14="http://schemas.microsoft.com/office/drawing/2010/main" xmlns="" w="9525">
                   <a:solidFill>
                     <a:srgbClr val="000000"/>
                   </a:solidFill>
@@ -12763,7 +12763,7 @@
                 </a14:hiddenLine>
               </a:ext>
               <a:ext uri="{AF507438-7753-43e0-B8FC-AC1667EBCBE1}">
-                <a14:hiddenEffects xmlns="" xmlns:a14="http://schemas.microsoft.com/office/drawing/2010/main">
+                <a14:hiddenEffects xmlns:a14="http://schemas.microsoft.com/office/drawing/2010/main" xmlns="">
                   <a:effectLst>
                     <a:outerShdw blurRad="63500" dist="38099" dir="2700000" algn="ctr" rotWithShape="0">
                       <a:srgbClr val="000000">
@@ -12812,7 +12812,7 @@
             <a:effectLst/>
             <a:extLst>
               <a:ext uri="{909E8E84-426E-40dd-AFC4-6F175D3DCCD1}">
-                <a14:hiddenFill xmlns="" xmlns:a14="http://schemas.microsoft.com/office/drawing/2010/main">
+                <a14:hiddenFill xmlns:a14="http://schemas.microsoft.com/office/drawing/2010/main" xmlns="">
                   <a:blipFill dpi="0" rotWithShape="0">
                     <a:blip/>
                     <a:srcRect/>
@@ -12823,7 +12823,7 @@
                 </a14:hiddenFill>
               </a:ext>
               <a:ext uri="{91240B29-F687-4f45-9708-019B960494DF}">
-                <a14:hiddenLine xmlns="" xmlns:a14="http://schemas.microsoft.com/office/drawing/2010/main" w="9525">
+                <a14:hiddenLine xmlns:a14="http://schemas.microsoft.com/office/drawing/2010/main" xmlns="" w="9525">
                   <a:solidFill>
                     <a:srgbClr val="000000"/>
                   </a:solidFill>
@@ -12833,7 +12833,7 @@
                 </a14:hiddenLine>
               </a:ext>
               <a:ext uri="{AF507438-7753-43e0-B8FC-AC1667EBCBE1}">
-                <a14:hiddenEffects xmlns="" xmlns:a14="http://schemas.microsoft.com/office/drawing/2010/main">
+                <a14:hiddenEffects xmlns:a14="http://schemas.microsoft.com/office/drawing/2010/main" xmlns="">
                   <a:effectLst>
                     <a:outerShdw blurRad="63500" dist="38099" dir="2700000" algn="ctr" rotWithShape="0">
                       <a:srgbClr val="000000">
@@ -12882,7 +12882,7 @@
             <a:effectLst/>
             <a:extLst>
               <a:ext uri="{909E8E84-426E-40dd-AFC4-6F175D3DCCD1}">
-                <a14:hiddenFill xmlns="" xmlns:a14="http://schemas.microsoft.com/office/drawing/2010/main">
+                <a14:hiddenFill xmlns:a14="http://schemas.microsoft.com/office/drawing/2010/main" xmlns="">
                   <a:blipFill dpi="0" rotWithShape="0">
                     <a:blip/>
                     <a:srcRect/>
@@ -12893,7 +12893,7 @@
                 </a14:hiddenFill>
               </a:ext>
               <a:ext uri="{91240B29-F687-4f45-9708-019B960494DF}">
-                <a14:hiddenLine xmlns="" xmlns:a14="http://schemas.microsoft.com/office/drawing/2010/main" w="9525">
+                <a14:hiddenLine xmlns:a14="http://schemas.microsoft.com/office/drawing/2010/main" xmlns="" w="9525">
                   <a:solidFill>
                     <a:srgbClr val="000000"/>
                   </a:solidFill>
@@ -12903,7 +12903,7 @@
                 </a14:hiddenLine>
               </a:ext>
               <a:ext uri="{AF507438-7753-43e0-B8FC-AC1667EBCBE1}">
-                <a14:hiddenEffects xmlns="" xmlns:a14="http://schemas.microsoft.com/office/drawing/2010/main">
+                <a14:hiddenEffects xmlns:a14="http://schemas.microsoft.com/office/drawing/2010/main" xmlns="">
                   <a:effectLst>
                     <a:outerShdw blurRad="63500" dist="38099" dir="2700000" algn="ctr" rotWithShape="0">
                       <a:srgbClr val="000000">
@@ -12944,12 +12944,12 @@
             <a:effectLst/>
             <a:extLst>
               <a:ext uri="{909E8E84-426E-40dd-AFC4-6F175D3DCCD1}">
-                <a14:hiddenFill xmlns="" xmlns:a14="http://schemas.microsoft.com/office/drawing/2010/main">
+                <a14:hiddenFill xmlns:a14="http://schemas.microsoft.com/office/drawing/2010/main" xmlns="">
                   <a:noFill/>
                 </a14:hiddenFill>
               </a:ext>
               <a:ext uri="{AF507438-7753-43e0-B8FC-AC1667EBCBE1}">
-                <a14:hiddenEffects xmlns="" xmlns:a14="http://schemas.microsoft.com/office/drawing/2010/main">
+                <a14:hiddenEffects xmlns:a14="http://schemas.microsoft.com/office/drawing/2010/main" xmlns="">
                   <a:effectLst>
                     <a:outerShdw blurRad="63500" dist="38099" dir="2700000" algn="ctr" rotWithShape="0">
                       <a:srgbClr val="000000">
@@ -13002,12 +13002,12 @@
             <a:effectLst/>
             <a:extLst>
               <a:ext uri="{909E8E84-426E-40dd-AFC4-6F175D3DCCD1}">
-                <a14:hiddenFill xmlns="" xmlns:a14="http://schemas.microsoft.com/office/drawing/2010/main">
+                <a14:hiddenFill xmlns:a14="http://schemas.microsoft.com/office/drawing/2010/main" xmlns="">
                   <a:noFill/>
                 </a14:hiddenFill>
               </a:ext>
               <a:ext uri="{AF507438-7753-43e0-B8FC-AC1667EBCBE1}">
-                <a14:hiddenEffects xmlns="" xmlns:a14="http://schemas.microsoft.com/office/drawing/2010/main">
+                <a14:hiddenEffects xmlns:a14="http://schemas.microsoft.com/office/drawing/2010/main" xmlns="">
                   <a:effectLst>
                     <a:outerShdw blurRad="63500" dist="38099" dir="2700000" algn="ctr" rotWithShape="0">
                       <a:srgbClr val="000000">
@@ -13060,12 +13060,12 @@
             <a:effectLst/>
             <a:extLst>
               <a:ext uri="{909E8E84-426E-40dd-AFC4-6F175D3DCCD1}">
-                <a14:hiddenFill xmlns="" xmlns:a14="http://schemas.microsoft.com/office/drawing/2010/main">
+                <a14:hiddenFill xmlns:a14="http://schemas.microsoft.com/office/drawing/2010/main" xmlns="">
                   <a:noFill/>
                 </a14:hiddenFill>
               </a:ext>
               <a:ext uri="{AF507438-7753-43e0-B8FC-AC1667EBCBE1}">
-                <a14:hiddenEffects xmlns="" xmlns:a14="http://schemas.microsoft.com/office/drawing/2010/main">
+                <a14:hiddenEffects xmlns:a14="http://schemas.microsoft.com/office/drawing/2010/main" xmlns="">
                   <a:effectLst>
                     <a:outerShdw blurRad="63500" dist="38099" dir="2700000" algn="ctr" rotWithShape="0">
                       <a:srgbClr val="000000">
@@ -13118,12 +13118,12 @@
             <a:effectLst/>
             <a:extLst>
               <a:ext uri="{909E8E84-426E-40dd-AFC4-6F175D3DCCD1}">
-                <a14:hiddenFill xmlns="" xmlns:a14="http://schemas.microsoft.com/office/drawing/2010/main">
+                <a14:hiddenFill xmlns:a14="http://schemas.microsoft.com/office/drawing/2010/main" xmlns="">
                   <a:noFill/>
                 </a14:hiddenFill>
               </a:ext>
               <a:ext uri="{AF507438-7753-43e0-B8FC-AC1667EBCBE1}">
-                <a14:hiddenEffects xmlns="" xmlns:a14="http://schemas.microsoft.com/office/drawing/2010/main">
+                <a14:hiddenEffects xmlns:a14="http://schemas.microsoft.com/office/drawing/2010/main" xmlns="">
                   <a:effectLst>
                     <a:outerShdw blurRad="63500" dist="38099" dir="2700000" algn="ctr" rotWithShape="0">
                       <a:srgbClr val="000000">
@@ -13176,12 +13176,12 @@
             <a:effectLst/>
             <a:extLst>
               <a:ext uri="{909E8E84-426E-40dd-AFC4-6F175D3DCCD1}">
-                <a14:hiddenFill xmlns="" xmlns:a14="http://schemas.microsoft.com/office/drawing/2010/main">
+                <a14:hiddenFill xmlns:a14="http://schemas.microsoft.com/office/drawing/2010/main" xmlns="">
                   <a:noFill/>
                 </a14:hiddenFill>
               </a:ext>
               <a:ext uri="{AF507438-7753-43e0-B8FC-AC1667EBCBE1}">
-                <a14:hiddenEffects xmlns="" xmlns:a14="http://schemas.microsoft.com/office/drawing/2010/main">
+                <a14:hiddenEffects xmlns:a14="http://schemas.microsoft.com/office/drawing/2010/main" xmlns="">
                   <a:effectLst>
                     <a:outerShdw blurRad="63500" dist="38099" dir="2700000" algn="ctr" rotWithShape="0">
                       <a:srgbClr val="000000">
@@ -13234,12 +13234,12 @@
             <a:effectLst/>
             <a:extLst>
               <a:ext uri="{909E8E84-426E-40dd-AFC4-6F175D3DCCD1}">
-                <a14:hiddenFill xmlns="" xmlns:a14="http://schemas.microsoft.com/office/drawing/2010/main">
+                <a14:hiddenFill xmlns:a14="http://schemas.microsoft.com/office/drawing/2010/main" xmlns="">
                   <a:noFill/>
                 </a14:hiddenFill>
               </a:ext>
               <a:ext uri="{AF507438-7753-43e0-B8FC-AC1667EBCBE1}">
-                <a14:hiddenEffects xmlns="" xmlns:a14="http://schemas.microsoft.com/office/drawing/2010/main">
+                <a14:hiddenEffects xmlns:a14="http://schemas.microsoft.com/office/drawing/2010/main" xmlns="">
                   <a:effectLst>
                     <a:outerShdw blurRad="63500" dist="38099" dir="2700000" algn="ctr" rotWithShape="0">
                       <a:srgbClr val="000000">
@@ -13292,12 +13292,12 @@
             <a:effectLst/>
             <a:extLst>
               <a:ext uri="{909E8E84-426E-40dd-AFC4-6F175D3DCCD1}">
-                <a14:hiddenFill xmlns="" xmlns:a14="http://schemas.microsoft.com/office/drawing/2010/main">
+                <a14:hiddenFill xmlns:a14="http://schemas.microsoft.com/office/drawing/2010/main" xmlns="">
                   <a:noFill/>
                 </a14:hiddenFill>
               </a:ext>
               <a:ext uri="{AF507438-7753-43e0-B8FC-AC1667EBCBE1}">
-                <a14:hiddenEffects xmlns="" xmlns:a14="http://schemas.microsoft.com/office/drawing/2010/main">
+                <a14:hiddenEffects xmlns:a14="http://schemas.microsoft.com/office/drawing/2010/main" xmlns="">
                   <a:effectLst>
                     <a:outerShdw blurRad="63500" dist="38099" dir="2700000" algn="ctr" rotWithShape="0">
                       <a:srgbClr val="000000">
@@ -13350,12 +13350,12 @@
             <a:effectLst/>
             <a:extLst>
               <a:ext uri="{909E8E84-426E-40dd-AFC4-6F175D3DCCD1}">
-                <a14:hiddenFill xmlns="" xmlns:a14="http://schemas.microsoft.com/office/drawing/2010/main">
+                <a14:hiddenFill xmlns:a14="http://schemas.microsoft.com/office/drawing/2010/main" xmlns="">
                   <a:noFill/>
                 </a14:hiddenFill>
               </a:ext>
               <a:ext uri="{AF507438-7753-43e0-B8FC-AC1667EBCBE1}">
-                <a14:hiddenEffects xmlns="" xmlns:a14="http://schemas.microsoft.com/office/drawing/2010/main">
+                <a14:hiddenEffects xmlns:a14="http://schemas.microsoft.com/office/drawing/2010/main" xmlns="">
                   <a:effectLst>
                     <a:outerShdw blurRad="63500" dist="38099" dir="2700000" algn="ctr" rotWithShape="0">
                       <a:srgbClr val="000000">
@@ -13408,12 +13408,12 @@
             <a:effectLst/>
             <a:extLst>
               <a:ext uri="{909E8E84-426E-40dd-AFC4-6F175D3DCCD1}">
-                <a14:hiddenFill xmlns="" xmlns:a14="http://schemas.microsoft.com/office/drawing/2010/main">
+                <a14:hiddenFill xmlns:a14="http://schemas.microsoft.com/office/drawing/2010/main" xmlns="">
                   <a:noFill/>
                 </a14:hiddenFill>
               </a:ext>
               <a:ext uri="{AF507438-7753-43e0-B8FC-AC1667EBCBE1}">
-                <a14:hiddenEffects xmlns="" xmlns:a14="http://schemas.microsoft.com/office/drawing/2010/main">
+                <a14:hiddenEffects xmlns:a14="http://schemas.microsoft.com/office/drawing/2010/main" xmlns="">
                   <a:effectLst>
                     <a:outerShdw blurRad="63500" dist="38099" dir="2700000" algn="ctr" rotWithShape="0">
                       <a:srgbClr val="000000">
@@ -13466,12 +13466,12 @@
             <a:effectLst/>
             <a:extLst>
               <a:ext uri="{909E8E84-426E-40dd-AFC4-6F175D3DCCD1}">
-                <a14:hiddenFill xmlns="" xmlns:a14="http://schemas.microsoft.com/office/drawing/2010/main">
+                <a14:hiddenFill xmlns:a14="http://schemas.microsoft.com/office/drawing/2010/main" xmlns="">
                   <a:noFill/>
                 </a14:hiddenFill>
               </a:ext>
               <a:ext uri="{AF507438-7753-43e0-B8FC-AC1667EBCBE1}">
-                <a14:hiddenEffects xmlns="" xmlns:a14="http://schemas.microsoft.com/office/drawing/2010/main">
+                <a14:hiddenEffects xmlns:a14="http://schemas.microsoft.com/office/drawing/2010/main" xmlns="">
                   <a:effectLst>
                     <a:outerShdw blurRad="63500" dist="38099" dir="2700000" algn="ctr" rotWithShape="0">
                       <a:srgbClr val="000000">
@@ -13532,7 +13532,7 @@
             <a:effectLst/>
             <a:extLst>
               <a:ext uri="{909E8E84-426E-40dd-AFC4-6F175D3DCCD1}">
-                <a14:hiddenFill xmlns="" xmlns:a14="http://schemas.microsoft.com/office/drawing/2010/main">
+                <a14:hiddenFill xmlns:a14="http://schemas.microsoft.com/office/drawing/2010/main" xmlns="">
                   <a:blipFill dpi="0" rotWithShape="0">
                     <a:blip/>
                     <a:srcRect/>
@@ -13543,7 +13543,7 @@
                 </a14:hiddenFill>
               </a:ext>
               <a:ext uri="{91240B29-F687-4f45-9708-019B960494DF}">
-                <a14:hiddenLine xmlns="" xmlns:a14="http://schemas.microsoft.com/office/drawing/2010/main" w="9525">
+                <a14:hiddenLine xmlns:a14="http://schemas.microsoft.com/office/drawing/2010/main" xmlns="" w="9525">
                   <a:solidFill>
                     <a:srgbClr val="000000"/>
                   </a:solidFill>
@@ -13553,7 +13553,7 @@
                 </a14:hiddenLine>
               </a:ext>
               <a:ext uri="{AF507438-7753-43e0-B8FC-AC1667EBCBE1}">
-                <a14:hiddenEffects xmlns="" xmlns:a14="http://schemas.microsoft.com/office/drawing/2010/main">
+                <a14:hiddenEffects xmlns:a14="http://schemas.microsoft.com/office/drawing/2010/main" xmlns="">
                   <a:effectLst>
                     <a:outerShdw blurRad="63500" dist="38099" dir="2700000" algn="ctr" rotWithShape="0">
                       <a:srgbClr val="000000">
@@ -13602,7 +13602,7 @@
             <a:effectLst/>
             <a:extLst>
               <a:ext uri="{909E8E84-426E-40dd-AFC4-6F175D3DCCD1}">
-                <a14:hiddenFill xmlns="" xmlns:a14="http://schemas.microsoft.com/office/drawing/2010/main">
+                <a14:hiddenFill xmlns:a14="http://schemas.microsoft.com/office/drawing/2010/main" xmlns="">
                   <a:blipFill dpi="0" rotWithShape="0">
                     <a:blip/>
                     <a:srcRect/>
@@ -13613,7 +13613,7 @@
                 </a14:hiddenFill>
               </a:ext>
               <a:ext uri="{91240B29-F687-4f45-9708-019B960494DF}">
-                <a14:hiddenLine xmlns="" xmlns:a14="http://schemas.microsoft.com/office/drawing/2010/main" w="9525">
+                <a14:hiddenLine xmlns:a14="http://schemas.microsoft.com/office/drawing/2010/main" xmlns="" w="9525">
                   <a:solidFill>
                     <a:srgbClr val="000000"/>
                   </a:solidFill>
@@ -13623,7 +13623,7 @@
                 </a14:hiddenLine>
               </a:ext>
               <a:ext uri="{AF507438-7753-43e0-B8FC-AC1667EBCBE1}">
-                <a14:hiddenEffects xmlns="" xmlns:a14="http://schemas.microsoft.com/office/drawing/2010/main">
+                <a14:hiddenEffects xmlns:a14="http://schemas.microsoft.com/office/drawing/2010/main" xmlns="">
                   <a:effectLst>
                     <a:outerShdw blurRad="63500" dist="38099" dir="2700000" algn="ctr" rotWithShape="0">
                       <a:srgbClr val="000000">
@@ -13672,7 +13672,7 @@
             <a:effectLst/>
             <a:extLst>
               <a:ext uri="{909E8E84-426E-40dd-AFC4-6F175D3DCCD1}">
-                <a14:hiddenFill xmlns="" xmlns:a14="http://schemas.microsoft.com/office/drawing/2010/main">
+                <a14:hiddenFill xmlns:a14="http://schemas.microsoft.com/office/drawing/2010/main" xmlns="">
                   <a:blipFill dpi="0" rotWithShape="0">
                     <a:blip/>
                     <a:srcRect/>
@@ -13683,7 +13683,7 @@
                 </a14:hiddenFill>
               </a:ext>
               <a:ext uri="{91240B29-F687-4f45-9708-019B960494DF}">
-                <a14:hiddenLine xmlns="" xmlns:a14="http://schemas.microsoft.com/office/drawing/2010/main" w="9525">
+                <a14:hiddenLine xmlns:a14="http://schemas.microsoft.com/office/drawing/2010/main" xmlns="" w="9525">
                   <a:solidFill>
                     <a:srgbClr val="000000"/>
                   </a:solidFill>
@@ -13693,7 +13693,7 @@
                 </a14:hiddenLine>
               </a:ext>
               <a:ext uri="{AF507438-7753-43e0-B8FC-AC1667EBCBE1}">
-                <a14:hiddenEffects xmlns="" xmlns:a14="http://schemas.microsoft.com/office/drawing/2010/main">
+                <a14:hiddenEffects xmlns:a14="http://schemas.microsoft.com/office/drawing/2010/main" xmlns="">
                   <a:effectLst>
                     <a:outerShdw blurRad="63500" dist="38099" dir="2700000" algn="ctr" rotWithShape="0">
                       <a:srgbClr val="000000">
@@ -13742,7 +13742,7 @@
             <a:effectLst/>
             <a:extLst>
               <a:ext uri="{909E8E84-426E-40dd-AFC4-6F175D3DCCD1}">
-                <a14:hiddenFill xmlns="" xmlns:a14="http://schemas.microsoft.com/office/drawing/2010/main">
+                <a14:hiddenFill xmlns:a14="http://schemas.microsoft.com/office/drawing/2010/main" xmlns="">
                   <a:blipFill dpi="0" rotWithShape="0">
                     <a:blip/>
                     <a:srcRect/>
@@ -13753,7 +13753,7 @@
                 </a14:hiddenFill>
               </a:ext>
               <a:ext uri="{91240B29-F687-4f45-9708-019B960494DF}">
-                <a14:hiddenLine xmlns="" xmlns:a14="http://schemas.microsoft.com/office/drawing/2010/main" w="9525">
+                <a14:hiddenLine xmlns:a14="http://schemas.microsoft.com/office/drawing/2010/main" xmlns="" w="9525">
                   <a:solidFill>
                     <a:srgbClr val="000000"/>
                   </a:solidFill>
@@ -13763,7 +13763,7 @@
                 </a14:hiddenLine>
               </a:ext>
               <a:ext uri="{AF507438-7753-43e0-B8FC-AC1667EBCBE1}">
-                <a14:hiddenEffects xmlns="" xmlns:a14="http://schemas.microsoft.com/office/drawing/2010/main">
+                <a14:hiddenEffects xmlns:a14="http://schemas.microsoft.com/office/drawing/2010/main" xmlns="">
                   <a:effectLst>
                     <a:outerShdw blurRad="63500" dist="38099" dir="2700000" algn="ctr" rotWithShape="0">
                       <a:srgbClr val="000000">
@@ -13812,7 +13812,7 @@
             <a:effectLst/>
             <a:extLst>
               <a:ext uri="{909E8E84-426E-40dd-AFC4-6F175D3DCCD1}">
-                <a14:hiddenFill xmlns="" xmlns:a14="http://schemas.microsoft.com/office/drawing/2010/main">
+                <a14:hiddenFill xmlns:a14="http://schemas.microsoft.com/office/drawing/2010/main" xmlns="">
                   <a:blipFill dpi="0" rotWithShape="0">
                     <a:blip/>
                     <a:srcRect/>
@@ -13823,7 +13823,7 @@
                 </a14:hiddenFill>
               </a:ext>
               <a:ext uri="{91240B29-F687-4f45-9708-019B960494DF}">
-                <a14:hiddenLine xmlns="" xmlns:a14="http://schemas.microsoft.com/office/drawing/2010/main" w="9525">
+                <a14:hiddenLine xmlns:a14="http://schemas.microsoft.com/office/drawing/2010/main" xmlns="" w="9525">
                   <a:solidFill>
                     <a:srgbClr val="000000"/>
                   </a:solidFill>
@@ -13833,7 +13833,7 @@
                 </a14:hiddenLine>
               </a:ext>
               <a:ext uri="{AF507438-7753-43e0-B8FC-AC1667EBCBE1}">
-                <a14:hiddenEffects xmlns="" xmlns:a14="http://schemas.microsoft.com/office/drawing/2010/main">
+                <a14:hiddenEffects xmlns:a14="http://schemas.microsoft.com/office/drawing/2010/main" xmlns="">
                   <a:effectLst>
                     <a:outerShdw blurRad="63500" dist="38099" dir="2700000" algn="ctr" rotWithShape="0">
                       <a:srgbClr val="000000">
@@ -13874,12 +13874,12 @@
             <a:effectLst/>
             <a:extLst>
               <a:ext uri="{909E8E84-426E-40dd-AFC4-6F175D3DCCD1}">
-                <a14:hiddenFill xmlns="" xmlns:a14="http://schemas.microsoft.com/office/drawing/2010/main">
+                <a14:hiddenFill xmlns:a14="http://schemas.microsoft.com/office/drawing/2010/main" xmlns="">
                   <a:noFill/>
                 </a14:hiddenFill>
               </a:ext>
               <a:ext uri="{AF507438-7753-43e0-B8FC-AC1667EBCBE1}">
-                <a14:hiddenEffects xmlns="" xmlns:a14="http://schemas.microsoft.com/office/drawing/2010/main">
+                <a14:hiddenEffects xmlns:a14="http://schemas.microsoft.com/office/drawing/2010/main" xmlns="">
                   <a:effectLst>
                     <a:outerShdw blurRad="63500" dist="38099" dir="2700000" algn="ctr" rotWithShape="0">
                       <a:srgbClr val="000000">
@@ -13932,12 +13932,12 @@
             <a:effectLst/>
             <a:extLst>
               <a:ext uri="{909E8E84-426E-40dd-AFC4-6F175D3DCCD1}">
-                <a14:hiddenFill xmlns="" xmlns:a14="http://schemas.microsoft.com/office/drawing/2010/main">
+                <a14:hiddenFill xmlns:a14="http://schemas.microsoft.com/office/drawing/2010/main" xmlns="">
                   <a:noFill/>
                 </a14:hiddenFill>
               </a:ext>
               <a:ext uri="{AF507438-7753-43e0-B8FC-AC1667EBCBE1}">
-                <a14:hiddenEffects xmlns="" xmlns:a14="http://schemas.microsoft.com/office/drawing/2010/main">
+                <a14:hiddenEffects xmlns:a14="http://schemas.microsoft.com/office/drawing/2010/main" xmlns="">
                   <a:effectLst>
                     <a:outerShdw blurRad="63500" dist="38099" dir="2700000" algn="ctr" rotWithShape="0">
                       <a:srgbClr val="000000">
@@ -13998,7 +13998,7 @@
             <a:effectLst/>
             <a:extLst>
               <a:ext uri="{909E8E84-426E-40dd-AFC4-6F175D3DCCD1}">
-                <a14:hiddenFill xmlns="" xmlns:a14="http://schemas.microsoft.com/office/drawing/2010/main">
+                <a14:hiddenFill xmlns:a14="http://schemas.microsoft.com/office/drawing/2010/main" xmlns="">
                   <a:blipFill dpi="0" rotWithShape="0">
                     <a:blip/>
                     <a:srcRect/>
@@ -14009,7 +14009,7 @@
                 </a14:hiddenFill>
               </a:ext>
               <a:ext uri="{91240B29-F687-4f45-9708-019B960494DF}">
-                <a14:hiddenLine xmlns="" xmlns:a14="http://schemas.microsoft.com/office/drawing/2010/main" w="9525">
+                <a14:hiddenLine xmlns:a14="http://schemas.microsoft.com/office/drawing/2010/main" xmlns="" w="9525">
                   <a:solidFill>
                     <a:srgbClr val="000000"/>
                   </a:solidFill>
@@ -14019,7 +14019,7 @@
                 </a14:hiddenLine>
               </a:ext>
               <a:ext uri="{AF507438-7753-43e0-B8FC-AC1667EBCBE1}">
-                <a14:hiddenEffects xmlns="" xmlns:a14="http://schemas.microsoft.com/office/drawing/2010/main">
+                <a14:hiddenEffects xmlns:a14="http://schemas.microsoft.com/office/drawing/2010/main" xmlns="">
                   <a:effectLst>
                     <a:outerShdw blurRad="63500" dist="38099" dir="2700000" algn="ctr" rotWithShape="0">
                       <a:srgbClr val="000000">
@@ -14152,7 +14152,7 @@
           <a:effectLst/>
           <a:extLst>
             <a:ext uri="{909E8E84-426E-40dd-AFC4-6F175D3DCCD1}">
-              <a14:hiddenFill xmlns:a14="http://schemas.microsoft.com/office/drawing/2010/main" xmlns="">
+              <a14:hiddenFill xmlns="" xmlns:a14="http://schemas.microsoft.com/office/drawing/2010/main">
                 <a:blipFill dpi="0" rotWithShape="0">
                   <a:blip/>
                   <a:srcRect/>
@@ -14163,7 +14163,7 @@
               </a14:hiddenFill>
             </a:ext>
             <a:ext uri="{91240B29-F687-4f45-9708-019B960494DF}">
-              <a14:hiddenLine xmlns:a14="http://schemas.microsoft.com/office/drawing/2010/main" xmlns="" w="9525">
+              <a14:hiddenLine xmlns="" xmlns:a14="http://schemas.microsoft.com/office/drawing/2010/main" w="9525">
                 <a:solidFill>
                   <a:srgbClr val="000000"/>
                 </a:solidFill>
@@ -14173,7 +14173,7 @@
               </a14:hiddenLine>
             </a:ext>
             <a:ext uri="{AF507438-7753-43e0-B8FC-AC1667EBCBE1}">
-              <a14:hiddenEffects xmlns:a14="http://schemas.microsoft.com/office/drawing/2010/main" xmlns="">
+              <a14:hiddenEffects xmlns="" xmlns:a14="http://schemas.microsoft.com/office/drawing/2010/main">
                 <a:effectLst>
                   <a:outerShdw blurRad="63500" dist="38099" dir="2700000" algn="ctr" rotWithShape="0">
                     <a:srgbClr val="000000">
@@ -14258,7 +14258,7 @@
           <a:effectLst/>
           <a:extLst>
             <a:ext uri="{909E8E84-426E-40dd-AFC4-6F175D3DCCD1}">
-              <a14:hiddenFill xmlns:a14="http://schemas.microsoft.com/office/drawing/2010/main" xmlns="">
+              <a14:hiddenFill xmlns="" xmlns:a14="http://schemas.microsoft.com/office/drawing/2010/main">
                 <a:blipFill dpi="0" rotWithShape="0">
                   <a:blip/>
                   <a:srcRect/>
@@ -14269,7 +14269,7 @@
               </a14:hiddenFill>
             </a:ext>
             <a:ext uri="{91240B29-F687-4f45-9708-019B960494DF}">
-              <a14:hiddenLine xmlns:a14="http://schemas.microsoft.com/office/drawing/2010/main" xmlns="" w="9525">
+              <a14:hiddenLine xmlns="" xmlns:a14="http://schemas.microsoft.com/office/drawing/2010/main" w="9525">
                 <a:solidFill>
                   <a:srgbClr val="000000"/>
                 </a:solidFill>
@@ -14279,7 +14279,7 @@
               </a14:hiddenLine>
             </a:ext>
             <a:ext uri="{AF507438-7753-43e0-B8FC-AC1667EBCBE1}">
-              <a14:hiddenEffects xmlns:a14="http://schemas.microsoft.com/office/drawing/2010/main" xmlns="">
+              <a14:hiddenEffects xmlns="" xmlns:a14="http://schemas.microsoft.com/office/drawing/2010/main">
                 <a:effectLst>
                   <a:outerShdw blurRad="63500" dist="38099" dir="2700000" algn="ctr" rotWithShape="0">
                     <a:srgbClr val="000000">
@@ -14364,7 +14364,7 @@
           <a:effectLst/>
           <a:extLst>
             <a:ext uri="{909E8E84-426E-40dd-AFC4-6F175D3DCCD1}">
-              <a14:hiddenFill xmlns:a14="http://schemas.microsoft.com/office/drawing/2010/main" xmlns="">
+              <a14:hiddenFill xmlns="" xmlns:a14="http://schemas.microsoft.com/office/drawing/2010/main">
                 <a:blipFill dpi="0" rotWithShape="0">
                   <a:blip/>
                   <a:srcRect/>
@@ -14375,7 +14375,7 @@
               </a14:hiddenFill>
             </a:ext>
             <a:ext uri="{91240B29-F687-4f45-9708-019B960494DF}">
-              <a14:hiddenLine xmlns:a14="http://schemas.microsoft.com/office/drawing/2010/main" xmlns="" w="9525">
+              <a14:hiddenLine xmlns="" xmlns:a14="http://schemas.microsoft.com/office/drawing/2010/main" w="9525">
                 <a:solidFill>
                   <a:srgbClr val="000000"/>
                 </a:solidFill>
@@ -14385,7 +14385,7 @@
               </a14:hiddenLine>
             </a:ext>
             <a:ext uri="{AF507438-7753-43e0-B8FC-AC1667EBCBE1}">
-              <a14:hiddenEffects xmlns:a14="http://schemas.microsoft.com/office/drawing/2010/main" xmlns="">
+              <a14:hiddenEffects xmlns="" xmlns:a14="http://schemas.microsoft.com/office/drawing/2010/main">
                 <a:effectLst>
                   <a:outerShdw blurRad="63500" dist="38099" dir="2700000" algn="ctr" rotWithShape="0">
                     <a:srgbClr val="000000">
@@ -14564,7 +14564,7 @@
           <a:effectLst/>
           <a:extLst>
             <a:ext uri="{909E8E84-426E-40dd-AFC4-6F175D3DCCD1}">
-              <a14:hiddenFill xmlns:a14="http://schemas.microsoft.com/office/drawing/2010/main" xmlns="">
+              <a14:hiddenFill xmlns="" xmlns:a14="http://schemas.microsoft.com/office/drawing/2010/main">
                 <a:blipFill dpi="0" rotWithShape="0">
                   <a:blip/>
                   <a:srcRect/>
@@ -14575,7 +14575,7 @@
               </a14:hiddenFill>
             </a:ext>
             <a:ext uri="{91240B29-F687-4f45-9708-019B960494DF}">
-              <a14:hiddenLine xmlns:a14="http://schemas.microsoft.com/office/drawing/2010/main" xmlns="" w="9525">
+              <a14:hiddenLine xmlns="" xmlns:a14="http://schemas.microsoft.com/office/drawing/2010/main" w="9525">
                 <a:solidFill>
                   <a:srgbClr val="000000"/>
                 </a:solidFill>
@@ -14585,7 +14585,7 @@
               </a14:hiddenLine>
             </a:ext>
             <a:ext uri="{AF507438-7753-43e0-B8FC-AC1667EBCBE1}">
-              <a14:hiddenEffects xmlns:a14="http://schemas.microsoft.com/office/drawing/2010/main" xmlns="">
+              <a14:hiddenEffects xmlns="" xmlns:a14="http://schemas.microsoft.com/office/drawing/2010/main">
                 <a:effectLst>
                   <a:outerShdw blurRad="63500" dist="38099" dir="2700000" algn="ctr" rotWithShape="0">
                     <a:srgbClr val="000000">
@@ -14663,7 +14663,7 @@
           <a:effectLst/>
           <a:extLst>
             <a:ext uri="{909E8E84-426E-40dd-AFC4-6F175D3DCCD1}">
-              <a14:hiddenFill xmlns:a14="http://schemas.microsoft.com/office/drawing/2010/main" xmlns="">
+              <a14:hiddenFill xmlns="" xmlns:a14="http://schemas.microsoft.com/office/drawing/2010/main">
                 <a:blipFill dpi="0" rotWithShape="0">
                   <a:blip/>
                   <a:srcRect/>
@@ -14674,7 +14674,7 @@
               </a14:hiddenFill>
             </a:ext>
             <a:ext uri="{91240B29-F687-4f45-9708-019B960494DF}">
-              <a14:hiddenLine xmlns:a14="http://schemas.microsoft.com/office/drawing/2010/main" xmlns="" w="9525">
+              <a14:hiddenLine xmlns="" xmlns:a14="http://schemas.microsoft.com/office/drawing/2010/main" w="9525">
                 <a:solidFill>
                   <a:srgbClr val="000000"/>
                 </a:solidFill>
@@ -14684,7 +14684,7 @@
               </a14:hiddenLine>
             </a:ext>
             <a:ext uri="{AF507438-7753-43e0-B8FC-AC1667EBCBE1}">
-              <a14:hiddenEffects xmlns:a14="http://schemas.microsoft.com/office/drawing/2010/main" xmlns="">
+              <a14:hiddenEffects xmlns="" xmlns:a14="http://schemas.microsoft.com/office/drawing/2010/main">
                 <a:effectLst>
                   <a:outerShdw blurRad="63500" dist="38099" dir="2700000" algn="ctr" rotWithShape="0">
                     <a:srgbClr val="000000">
@@ -16498,7 +16498,7 @@
           <a:effectLst/>
           <a:extLst>
             <a:ext uri="{909E8E84-426E-40dd-AFC4-6F175D3DCCD1}">
-              <a14:hiddenFill xmlns="" xmlns:a14="http://schemas.microsoft.com/office/drawing/2010/main">
+              <a14:hiddenFill xmlns:a14="http://schemas.microsoft.com/office/drawing/2010/main" xmlns="">
                 <a:blipFill dpi="0" rotWithShape="0">
                   <a:blip/>
                   <a:srcRect/>
@@ -16509,7 +16509,7 @@
               </a14:hiddenFill>
             </a:ext>
             <a:ext uri="{91240B29-F687-4f45-9708-019B960494DF}">
-              <a14:hiddenLine xmlns="" xmlns:a14="http://schemas.microsoft.com/office/drawing/2010/main" w="9525">
+              <a14:hiddenLine xmlns:a14="http://schemas.microsoft.com/office/drawing/2010/main" xmlns="" w="9525">
                 <a:solidFill>
                   <a:srgbClr val="000000"/>
                 </a:solidFill>
@@ -16519,7 +16519,7 @@
               </a14:hiddenLine>
             </a:ext>
             <a:ext uri="{AF507438-7753-43e0-B8FC-AC1667EBCBE1}">
-              <a14:hiddenEffects xmlns="" xmlns:a14="http://schemas.microsoft.com/office/drawing/2010/main">
+              <a14:hiddenEffects xmlns:a14="http://schemas.microsoft.com/office/drawing/2010/main" xmlns="">
                 <a:effectLst>
                   <a:outerShdw blurRad="63500" dist="38099" dir="2700000" algn="ctr" rotWithShape="0">
                     <a:srgbClr val="000000">
@@ -18008,7 +18008,7 @@
           <a:effectLst/>
           <a:extLst>
             <a:ext uri="{909E8E84-426E-40dd-AFC4-6F175D3DCCD1}">
-              <a14:hiddenFill xmlns="" xmlns:a14="http://schemas.microsoft.com/office/drawing/2010/main">
+              <a14:hiddenFill xmlns:a14="http://schemas.microsoft.com/office/drawing/2010/main" xmlns="">
                 <a:blipFill dpi="0" rotWithShape="0">
                   <a:blip/>
                   <a:srcRect/>
@@ -18019,7 +18019,7 @@
               </a14:hiddenFill>
             </a:ext>
             <a:ext uri="{91240B29-F687-4f45-9708-019B960494DF}">
-              <a14:hiddenLine xmlns="" xmlns:a14="http://schemas.microsoft.com/office/drawing/2010/main" w="9525">
+              <a14:hiddenLine xmlns:a14="http://schemas.microsoft.com/office/drawing/2010/main" xmlns="" w="9525">
                 <a:solidFill>
                   <a:srgbClr val="000000"/>
                 </a:solidFill>
@@ -18029,7 +18029,7 @@
               </a14:hiddenLine>
             </a:ext>
             <a:ext uri="{AF507438-7753-43e0-B8FC-AC1667EBCBE1}">
-              <a14:hiddenEffects xmlns="" xmlns:a14="http://schemas.microsoft.com/office/drawing/2010/main">
+              <a14:hiddenEffects xmlns:a14="http://schemas.microsoft.com/office/drawing/2010/main" xmlns="">
                 <a:effectLst>
                   <a:outerShdw blurRad="63500" dist="38099" dir="2700000" algn="ctr" rotWithShape="0">
                     <a:srgbClr val="000000">
@@ -19514,7 +19514,7 @@
           <a:effectLst/>
           <a:extLst>
             <a:ext uri="{909E8E84-426E-40dd-AFC4-6F175D3DCCD1}">
-              <a14:hiddenFill xmlns="" xmlns:a14="http://schemas.microsoft.com/office/drawing/2010/main">
+              <a14:hiddenFill xmlns:a14="http://schemas.microsoft.com/office/drawing/2010/main" xmlns="">
                 <a:blipFill dpi="0" rotWithShape="0">
                   <a:blip/>
                   <a:srcRect/>
@@ -19525,7 +19525,7 @@
               </a14:hiddenFill>
             </a:ext>
             <a:ext uri="{91240B29-F687-4f45-9708-019B960494DF}">
-              <a14:hiddenLine xmlns="" xmlns:a14="http://schemas.microsoft.com/office/drawing/2010/main" w="9525">
+              <a14:hiddenLine xmlns:a14="http://schemas.microsoft.com/office/drawing/2010/main" xmlns="" w="9525">
                 <a:solidFill>
                   <a:srgbClr val="000000"/>
                 </a:solidFill>
@@ -19535,7 +19535,7 @@
               </a14:hiddenLine>
             </a:ext>
             <a:ext uri="{AF507438-7753-43e0-B8FC-AC1667EBCBE1}">
-              <a14:hiddenEffects xmlns="" xmlns:a14="http://schemas.microsoft.com/office/drawing/2010/main">
+              <a14:hiddenEffects xmlns:a14="http://schemas.microsoft.com/office/drawing/2010/main" xmlns="">
                 <a:effectLst>
                   <a:outerShdw blurRad="63500" dist="38099" dir="2700000" algn="ctr" rotWithShape="0">
                     <a:srgbClr val="000000">
@@ -19689,7 +19689,7 @@
           <a:effectLst/>
           <a:extLst>
             <a:ext uri="{909E8E84-426E-40dd-AFC4-6F175D3DCCD1}">
-              <a14:hiddenFill xmlns="" xmlns:a14="http://schemas.microsoft.com/office/drawing/2010/main">
+              <a14:hiddenFill xmlns:a14="http://schemas.microsoft.com/office/drawing/2010/main" xmlns="">
                 <a:blipFill dpi="0" rotWithShape="0">
                   <a:blip/>
                   <a:srcRect/>
@@ -19700,7 +19700,7 @@
               </a14:hiddenFill>
             </a:ext>
             <a:ext uri="{91240B29-F687-4f45-9708-019B960494DF}">
-              <a14:hiddenLine xmlns="" xmlns:a14="http://schemas.microsoft.com/office/drawing/2010/main" w="9525">
+              <a14:hiddenLine xmlns:a14="http://schemas.microsoft.com/office/drawing/2010/main" xmlns="" w="9525">
                 <a:solidFill>
                   <a:srgbClr val="000000"/>
                 </a:solidFill>
@@ -19710,7 +19710,7 @@
               </a14:hiddenLine>
             </a:ext>
             <a:ext uri="{AF507438-7753-43e0-B8FC-AC1667EBCBE1}">
-              <a14:hiddenEffects xmlns="" xmlns:a14="http://schemas.microsoft.com/office/drawing/2010/main">
+              <a14:hiddenEffects xmlns:a14="http://schemas.microsoft.com/office/drawing/2010/main" xmlns="">
                 <a:effectLst>
                   <a:outerShdw blurRad="63500" dist="38099" dir="2700000" algn="ctr" rotWithShape="0">
                     <a:srgbClr val="000000">
@@ -21503,7 +21503,7 @@
           <a:effectLst/>
           <a:extLst>
             <a:ext uri="{909E8E84-426E-40dd-AFC4-6F175D3DCCD1}">
-              <a14:hiddenFill xmlns="" xmlns:a14="http://schemas.microsoft.com/office/drawing/2010/main">
+              <a14:hiddenFill xmlns:a14="http://schemas.microsoft.com/office/drawing/2010/main" xmlns="">
                 <a:blipFill dpi="0" rotWithShape="0">
                   <a:blip/>
                   <a:srcRect/>
@@ -21514,7 +21514,7 @@
               </a14:hiddenFill>
             </a:ext>
             <a:ext uri="{91240B29-F687-4f45-9708-019B960494DF}">
-              <a14:hiddenLine xmlns="" xmlns:a14="http://schemas.microsoft.com/office/drawing/2010/main" w="9525">
+              <a14:hiddenLine xmlns:a14="http://schemas.microsoft.com/office/drawing/2010/main" xmlns="" w="9525">
                 <a:solidFill>
                   <a:srgbClr val="000000"/>
                 </a:solidFill>
@@ -21524,7 +21524,7 @@
               </a14:hiddenLine>
             </a:ext>
             <a:ext uri="{AF507438-7753-43e0-B8FC-AC1667EBCBE1}">
-              <a14:hiddenEffects xmlns="" xmlns:a14="http://schemas.microsoft.com/office/drawing/2010/main">
+              <a14:hiddenEffects xmlns:a14="http://schemas.microsoft.com/office/drawing/2010/main" xmlns="">
                 <a:effectLst>
                   <a:outerShdw blurRad="63500" dist="38099" dir="2700000" algn="ctr" rotWithShape="0">
                     <a:srgbClr val="000000">
@@ -24479,7 +24479,7 @@
           <a:effectLst/>
           <a:extLst>
             <a:ext uri="{909E8E84-426E-40dd-AFC4-6F175D3DCCD1}">
-              <a14:hiddenFill xmlns="" xmlns:a14="http://schemas.microsoft.com/office/drawing/2010/main">
+              <a14:hiddenFill xmlns:a14="http://schemas.microsoft.com/office/drawing/2010/main" xmlns="">
                 <a:blipFill dpi="0" rotWithShape="0">
                   <a:blip/>
                   <a:srcRect/>
@@ -24490,7 +24490,7 @@
               </a14:hiddenFill>
             </a:ext>
             <a:ext uri="{91240B29-F687-4f45-9708-019B960494DF}">
-              <a14:hiddenLine xmlns="" xmlns:a14="http://schemas.microsoft.com/office/drawing/2010/main" w="9525">
+              <a14:hiddenLine xmlns:a14="http://schemas.microsoft.com/office/drawing/2010/main" xmlns="" w="9525">
                 <a:solidFill>
                   <a:srgbClr val="000000"/>
                 </a:solidFill>
@@ -24500,7 +24500,7 @@
               </a14:hiddenLine>
             </a:ext>
             <a:ext uri="{AF507438-7753-43e0-B8FC-AC1667EBCBE1}">
-              <a14:hiddenEffects xmlns="" xmlns:a14="http://schemas.microsoft.com/office/drawing/2010/main">
+              <a14:hiddenEffects xmlns:a14="http://schemas.microsoft.com/office/drawing/2010/main" xmlns="">
                 <a:effectLst>
                   <a:outerShdw blurRad="63500" dist="38099" dir="2700000" algn="ctr" rotWithShape="0">
                     <a:srgbClr val="000000">
@@ -24579,7 +24579,7 @@
           <a:effectLst/>
           <a:extLst>
             <a:ext uri="{909E8E84-426E-40dd-AFC4-6F175D3DCCD1}">
-              <a14:hiddenFill xmlns="" xmlns:a14="http://schemas.microsoft.com/office/drawing/2010/main">
+              <a14:hiddenFill xmlns:a14="http://schemas.microsoft.com/office/drawing/2010/main" xmlns="">
                 <a:blipFill dpi="0" rotWithShape="0">
                   <a:blip/>
                   <a:srcRect/>
@@ -24590,7 +24590,7 @@
               </a14:hiddenFill>
             </a:ext>
             <a:ext uri="{91240B29-F687-4f45-9708-019B960494DF}">
-              <a14:hiddenLine xmlns="" xmlns:a14="http://schemas.microsoft.com/office/drawing/2010/main" w="9525">
+              <a14:hiddenLine xmlns:a14="http://schemas.microsoft.com/office/drawing/2010/main" xmlns="" w="9525">
                 <a:solidFill>
                   <a:srgbClr val="000000"/>
                 </a:solidFill>
@@ -24600,7 +24600,7 @@
               </a14:hiddenLine>
             </a:ext>
             <a:ext uri="{AF507438-7753-43e0-B8FC-AC1667EBCBE1}">
-              <a14:hiddenEffects xmlns="" xmlns:a14="http://schemas.microsoft.com/office/drawing/2010/main">
+              <a14:hiddenEffects xmlns:a14="http://schemas.microsoft.com/office/drawing/2010/main" xmlns="">
                 <a:effectLst>
                   <a:outerShdw blurRad="63500" dist="38099" dir="2700000" algn="ctr" rotWithShape="0">
                     <a:srgbClr val="000000">
@@ -26195,7 +26195,7 @@
           <a:effectLst/>
           <a:extLst>
             <a:ext uri="{909E8E84-426E-40dd-AFC4-6F175D3DCCD1}">
-              <a14:hiddenFill xmlns="" xmlns:a14="http://schemas.microsoft.com/office/drawing/2010/main">
+              <a14:hiddenFill xmlns:a14="http://schemas.microsoft.com/office/drawing/2010/main" xmlns="">
                 <a:blipFill dpi="0" rotWithShape="0">
                   <a:blip/>
                   <a:srcRect/>
@@ -26206,7 +26206,7 @@
               </a14:hiddenFill>
             </a:ext>
             <a:ext uri="{91240B29-F687-4f45-9708-019B960494DF}">
-              <a14:hiddenLine xmlns="" xmlns:a14="http://schemas.microsoft.com/office/drawing/2010/main" w="9525">
+              <a14:hiddenLine xmlns:a14="http://schemas.microsoft.com/office/drawing/2010/main" xmlns="" w="9525">
                 <a:solidFill>
                   <a:srgbClr val="000000"/>
                 </a:solidFill>
@@ -26216,7 +26216,7 @@
               </a14:hiddenLine>
             </a:ext>
             <a:ext uri="{AF507438-7753-43e0-B8FC-AC1667EBCBE1}">
-              <a14:hiddenEffects xmlns="" xmlns:a14="http://schemas.microsoft.com/office/drawing/2010/main">
+              <a14:hiddenEffects xmlns:a14="http://schemas.microsoft.com/office/drawing/2010/main" xmlns="">
                 <a:effectLst>
                   <a:outerShdw blurRad="63500" dist="38099" dir="2700000" algn="ctr" rotWithShape="0">
                     <a:srgbClr val="000000">
@@ -27864,7 +27864,7 @@
           <a:effectLst/>
           <a:extLst>
             <a:ext uri="{909E8E84-426E-40dd-AFC4-6F175D3DCCD1}">
-              <a14:hiddenFill xmlns="" xmlns:a14="http://schemas.microsoft.com/office/drawing/2010/main">
+              <a14:hiddenFill xmlns:a14="http://schemas.microsoft.com/office/drawing/2010/main" xmlns="">
                 <a:blipFill dpi="0" rotWithShape="0">
                   <a:blip/>
                   <a:srcRect/>
@@ -27875,7 +27875,7 @@
               </a14:hiddenFill>
             </a:ext>
             <a:ext uri="{91240B29-F687-4f45-9708-019B960494DF}">
-              <a14:hiddenLine xmlns="" xmlns:a14="http://schemas.microsoft.com/office/drawing/2010/main" w="9525">
+              <a14:hiddenLine xmlns:a14="http://schemas.microsoft.com/office/drawing/2010/main" xmlns="" w="9525">
                 <a:solidFill>
                   <a:srgbClr val="000000"/>
                 </a:solidFill>
@@ -27885,7 +27885,7 @@
               </a14:hiddenLine>
             </a:ext>
             <a:ext uri="{AF507438-7753-43e0-B8FC-AC1667EBCBE1}">
-              <a14:hiddenEffects xmlns="" xmlns:a14="http://schemas.microsoft.com/office/drawing/2010/main">
+              <a14:hiddenEffects xmlns:a14="http://schemas.microsoft.com/office/drawing/2010/main" xmlns="">
                 <a:effectLst>
                   <a:outerShdw blurRad="63500" dist="38099" dir="2700000" algn="ctr" rotWithShape="0">
                     <a:srgbClr val="000000">
@@ -29330,7 +29330,7 @@
           <a:effectLst/>
           <a:extLst>
             <a:ext uri="{909E8E84-426E-40dd-AFC4-6F175D3DCCD1}">
-              <a14:hiddenFill xmlns="" xmlns:a14="http://schemas.microsoft.com/office/drawing/2010/main">
+              <a14:hiddenFill xmlns:a14="http://schemas.microsoft.com/office/drawing/2010/main" xmlns="">
                 <a:blipFill dpi="0" rotWithShape="0">
                   <a:blip/>
                   <a:srcRect/>
@@ -29341,7 +29341,7 @@
               </a14:hiddenFill>
             </a:ext>
             <a:ext uri="{91240B29-F687-4f45-9708-019B960494DF}">
-              <a14:hiddenLine xmlns="" xmlns:a14="http://schemas.microsoft.com/office/drawing/2010/main" w="9525">
+              <a14:hiddenLine xmlns:a14="http://schemas.microsoft.com/office/drawing/2010/main" xmlns="" w="9525">
                 <a:solidFill>
                   <a:srgbClr val="000000"/>
                 </a:solidFill>
@@ -29351,7 +29351,7 @@
               </a14:hiddenLine>
             </a:ext>
             <a:ext uri="{AF507438-7753-43e0-B8FC-AC1667EBCBE1}">
-              <a14:hiddenEffects xmlns="" xmlns:a14="http://schemas.microsoft.com/office/drawing/2010/main">
+              <a14:hiddenEffects xmlns:a14="http://schemas.microsoft.com/office/drawing/2010/main" xmlns="">
                 <a:effectLst>
                   <a:outerShdw blurRad="63500" dist="38099" dir="2700000" algn="ctr" rotWithShape="0">
                     <a:srgbClr val="000000">
@@ -29482,7 +29482,7 @@
           <a:effectLst/>
           <a:extLst>
             <a:ext uri="{909E8E84-426E-40dd-AFC4-6F175D3DCCD1}">
-              <a14:hiddenFill xmlns="" xmlns:a14="http://schemas.microsoft.com/office/drawing/2010/main">
+              <a14:hiddenFill xmlns:a14="http://schemas.microsoft.com/office/drawing/2010/main" xmlns="">
                 <a:blipFill dpi="0" rotWithShape="0">
                   <a:blip/>
                   <a:srcRect/>
@@ -29493,7 +29493,7 @@
               </a14:hiddenFill>
             </a:ext>
             <a:ext uri="{91240B29-F687-4f45-9708-019B960494DF}">
-              <a14:hiddenLine xmlns="" xmlns:a14="http://schemas.microsoft.com/office/drawing/2010/main" w="9525">
+              <a14:hiddenLine xmlns:a14="http://schemas.microsoft.com/office/drawing/2010/main" xmlns="" w="9525">
                 <a:solidFill>
                   <a:srgbClr val="000000"/>
                 </a:solidFill>
@@ -29503,7 +29503,7 @@
               </a14:hiddenLine>
             </a:ext>
             <a:ext uri="{AF507438-7753-43e0-B8FC-AC1667EBCBE1}">
-              <a14:hiddenEffects xmlns="" xmlns:a14="http://schemas.microsoft.com/office/drawing/2010/main">
+              <a14:hiddenEffects xmlns:a14="http://schemas.microsoft.com/office/drawing/2010/main" xmlns="">
                 <a:effectLst>
                   <a:outerShdw blurRad="63500" dist="38099" dir="2700000" algn="ctr" rotWithShape="0">
                     <a:srgbClr val="000000">
@@ -37553,7 +37553,7 @@
           <a:effectLst/>
           <a:extLst>
             <a:ext uri="{909E8E84-426E-40dd-AFC4-6F175D3DCCD1}">
-              <a14:hiddenFill xmlns:a14="http://schemas.microsoft.com/office/drawing/2010/main" xmlns="">
+              <a14:hiddenFill xmlns="" xmlns:a14="http://schemas.microsoft.com/office/drawing/2010/main">
                 <a:blipFill dpi="0" rotWithShape="0">
                   <a:blip/>
                   <a:srcRect/>
@@ -37564,7 +37564,7 @@
               </a14:hiddenFill>
             </a:ext>
             <a:ext uri="{91240B29-F687-4f45-9708-019B960494DF}">
-              <a14:hiddenLine xmlns:a14="http://schemas.microsoft.com/office/drawing/2010/main" xmlns="" w="9525">
+              <a14:hiddenLine xmlns="" xmlns:a14="http://schemas.microsoft.com/office/drawing/2010/main" w="9525">
                 <a:solidFill>
                   <a:srgbClr val="000000"/>
                 </a:solidFill>
@@ -37574,7 +37574,7 @@
               </a14:hiddenLine>
             </a:ext>
             <a:ext uri="{AF507438-7753-43e0-B8FC-AC1667EBCBE1}">
-              <a14:hiddenEffects xmlns:a14="http://schemas.microsoft.com/office/drawing/2010/main" xmlns="">
+              <a14:hiddenEffects xmlns="" xmlns:a14="http://schemas.microsoft.com/office/drawing/2010/main">
                 <a:effectLst>
                   <a:outerShdw blurRad="63500" dist="38099" dir="2700000" algn="ctr" rotWithShape="0">
                     <a:srgbClr val="000000">

</xml_diff>